<commit_message>
Added the flowchart and trello images in the presentation
</commit_message>
<xml_diff>
--- a/WELCOME TO THE FANTASY ADVENTURE.pptx
+++ b/WELCOME TO THE FANTASY ADVENTURE.pptx
@@ -6,11 +6,13 @@
   </p:sldMasterIdLst>
   <p:sldIdLst>
     <p:sldId id="256" r:id="rId6"/>
-    <p:sldId id="257" r:id="rId7"/>
-    <p:sldId id="258" r:id="rId8"/>
-    <p:sldId id="260" r:id="rId9"/>
-    <p:sldId id="261" r:id="rId10"/>
-    <p:sldId id="259" r:id="rId11"/>
+    <p:sldId id="262" r:id="rId7"/>
+    <p:sldId id="263" r:id="rId8"/>
+    <p:sldId id="257" r:id="rId9"/>
+    <p:sldId id="258" r:id="rId10"/>
+    <p:sldId id="260" r:id="rId11"/>
+    <p:sldId id="261" r:id="rId12"/>
+    <p:sldId id="259" r:id="rId13"/>
   </p:sldIdLst>
   <p:sldSz cx="9144000" cy="6858000"/>
   <p:notesSz cx="6858000" cy="9144000"/>
@@ -241,7 +243,7 @@
             <a:spLocks noGrp="1" noChangeArrowheads="1"/>
             <a:extLst>
               <a:ext uri="smNativeData">
-                <pr:smNativeData xmlns:pr="smNativeData" val="SMDATA_13_FAOrYBMAAAAlAAAAZAAAAA8BAAAAkAAAAEgAAACQAAAASAAAAAAAAAABAAAAAAAAAAEAAABQAAAAAAAAAAAA4D8AAAAAAADgPwAAAAAAAOA/AAAAAAAA4D8AAAAAAADgPwAAAAAAAOA/AAAAAAAA4D8AAAAAAADgPwAAAAAAAOA/AAAAAAAA4D8CAAAAjAAAAAAAAAAAAAAAu+DjDP///wgAAAAAAAAAAAAAAAAAAAAAAAAAAAAAAAAAAAAAZAAAAAEAAABAAAAAAAAAAAAAAAAAAAAAAAAAAAAAAAAAAAAAAAAAAAAAAAAAAAAAAAAAAAAAAAAAAAAAAAAAAAAAAAAAAAAAAAAAAAAAAAAAAAAAAAAAAAAAAAAAAAAAFAAAADwAAAAAAAAAAAAAAAAAAAkUAAAAAQAAABQAAAAUAAAAFAAAAAEAAAAAAAAAZAAAAGQAAAAAAAAAZAAAAGQAAAAVAAAAYAAAAAAAAAAAAAAADwAAACADAAAAAAAAAAAAAAEAAACgMgAAVgcAAKr4//8BAAAAf39/AAEAAABkAAAAAAAAABQAAABAHwAAAAAAACYAAAAAAAAAwOD//wAAAAAmAAAAZAAAABYAAABMAAAAAAAAAAAAAAAEAAAAAAAAAAEAAACAgIAKAAAAACgAAAAoAAAAZAAAAGQAAAAAAAAAzMzMAAAAAABQAAAAUAAAAGQAAABkAAAAAAAAABcAAAAUAAAAAAAAAAAAAAD/fwAA/38AAAAAAAAJAAAABAAAAAAAAAAMAAAAEAAAAAAAAAAAAAAAAAAAAAAAAAAeAAAAaAAAAAAAAAAAAAAAAAAAAAAAAAAAAAAAECcAABAnAAAAAAAAAAAAAAAAAAAAAAAAAAAAAAAAAAAAAAAAAAAAABQAAAAAAAAAwMD/AAAAAABkAAAAMgAAAAAAAABkAAAAAAAAAH9/fwAKAAAAHwAAAFQAAAAAAAAFAAAAAQAAAAAAAAAAAAAAAAAAAAAAAAAAAAAAAAAAAAAAAAAAAAAAAn9/fwAAAAADzMzMAMDA/wB/f38AAAAAAAAAAAAAAAAAAAAAAAAAAAAhAAAAGAAAABQAAAA4BAAAGg0AAAg0AAAmFgAAAAAAACYAAAAIAAAAAYAAAAAAAAA="/>
+                <pr:smNativeData xmlns:pr="smNativeData" val="SMDATA_13_HjisYBMAAAAlAAAAZAAAAA8BAAAAkAAAAEgAAACQAAAASAAAAAAAAAABAAAAAAAAAAEAAABQAAAAAAAAAAAA4D8AAAAAAADgPwAAAAAAAOA/AAAAAAAA4D8AAAAAAADgPwAAAAAAAOA/AAAAAAAA4D8AAAAAAADgPwAAAAAAAOA/AAAAAAAA4D8CAAAAjAAAAAAAAAAAAAAAu+DjDP///wgAAAAAAAAAAAAAAAAAAAAAAAAAAAAAAAAAAAAAZAAAAAEAAABAAAAAAAAAAAAAAAAAAAAAAAAAAAAAAAAAAAAAAAAAAAAAAAAAAAAAAAAAAAAAAAAAAAAAAAAAAAAAAAAAAAAAAAAAAAAAAAAAAAAAAAAAAAAAAAAAAAAAFAAAADwAAAAAAAAAAAAAAAAAAAkUAAAAAQAAABQAAAAUAAAAFAAAAAEAAAAAAAAAZAAAAGQAAAAAAAAAZAAAAGQAAAAVAAAAYAAAAAAAAAAAAAAADwAAACADAAAAAAAAAAAAAAEAAACgMgAAVgcAAKr4//8BAAAAf39/AAEAAABkAAAAAAAAABQAAABAHwAAAAAAACYAAAAAAAAAwOD//wAAAAAmAAAAZAAAABYAAABMAAAAAAAAAAAAAAAEAAAAAAAAAAEAAACAgIAKAAAAACgAAAAoAAAAZAAAAGQAAAAAAAAAzMzMAAAAAABQAAAAUAAAAGQAAABkAAAAAAAAABcAAAAUAAAAAAAAAAAAAAD/fwAA/38AAAAAAAAJAAAABAAAAAAAAAAMAAAAEAAAAAAAAAAAAAAAAAAAAAAAAAAeAAAAaAAAAAAAAAAAAAAAAAAAAAAAAAAAAAAAECcAABAnAAAAAAAAAAAAAAAAAAAAAAAAAAAAAAAAAAAAAAAAAAAAABQAAAAAAAAAwMD/AAAAAABkAAAAMgAAAAAAAABkAAAAAAAAAH9/fwAKAAAAHwAAAFQAAAAAAAAFAAAAAQAAAAAAAAAAAAAAAAAAAAAAAAAAAAAAAAAAAAAAAAAAAAAAAn9/fwAAAAADzMzMAMDA/wB/f38AAAAAAAAAAAAAAAAAAAAAAAAAAAAhAAAAGAAAABQAAAA4BAAAGg0AAAg0AAAmFgAAEAAAACYAAAAIAAAAAQAAAAAAAAA="/>
               </a:ext>
             </a:extLst>
           </p:cNvSpPr>
@@ -273,7 +275,7 @@
             <a:spLocks noGrp="1" noChangeArrowheads="1"/>
             <a:extLst>
               <a:ext uri="smNativeData">
-                <pr:smNativeData xmlns:pr="smNativeData" val="SMDATA_13_FAOrYBMAAAAlAAAAZAAAAA8BAAAAkAAAAEgAAACQAAAASAAAAAAAAAAAAAAAAAAAAAEAAABQAAAAAAAAAAAA4D8AAAAAAADgPwAAAAAAAOA/AAAAAAAA4D8AAAAAAADgPwAAAAAAAOA/AAAAAAAA4D8AAAAAAADgPwAAAAAAAOA/AAAAAAAA4D8CAAAAjAAAAAAAAAAAAAAAu+DjDP///wgAAAAAAAAAAAAAAAAAAAAAAAAAAAAAAAAAAAAAZAAAAAEAAABAAAAAAAAAAAAAAAAAAAAAAAAAAAAAAAAAAAAAAAAAAAAAAAAAAAAAAAAAAAAAAAAAAAAAAAAAAAAAAAAAAAAAAAAAAAAAAAAAAAAAAAAAAAAAAAAAAAAAFAAAADwAAAAAAAAAAAAAAAAAAAkUAAAAAQAAABQAAAAUAAAAFAAAAAEAAAAAAAAAZAAAAGQAAAAAAAAAZAAAAGQAAAAVAAAAYAAAAAAAAAAAAAAADwAAACADAAAAAAAAAAAAAAEAAACgMgAAVgcAAKr4//8BAAAAf39/AAEAAABkAAAAAAAAABQAAABAHwAAAAAAACYAAAAAAAAAwOD//wAAAAAmAAAAZAAAABYAAABMAAAAAAAAAAAAAAAEAAAAAAAAAAEAAACAgIAKAAAAACgAAAAoAAAAZAAAAGQAAAAAAAAAzMzMAAAAAABQAAAAUAAAAGQAAABkAAAAAAAAABcAAAAUAAAAAAAAAAAAAAD/fwAA/38AAAAAAAAJAAAABAAAAAAAAAAMAAAAEAAAAAAAAAAAAAAAAAAAAAAAAAAeAAAAaAAAAAAAAAAAAAAAAAAAAAAAAAAAAAAAECcAABAnAAAAAAAAAAAAAAAAAAAAAAAAAAAAAAAAAAAAAAAAAAAAABQAAAAAAAAAwMD/AAAAAABkAAAAMgAAAAAAAABkAAAAAAAAAH9/fwAKAAAAHwAAAFQAAAAAAAAFAAAAAQAAAAAAAAAAAAAAAAAAAAAAAAAAAAAAAAAAAAAAAAAAAAAAAn9/fwAAAAADzMzMAMDA/wB/f38AAAAAAAAAAAAAAAAAAAAAAAAAAAAhAAAAGAAAABQAAABwCAAA6BcAANAvAACwIgAAAAAAACYAAAAIAAAAAYAAAAAAAAA="/>
+                <pr:smNativeData xmlns:pr="smNativeData" val="SMDATA_13_HjisYBMAAAAlAAAAZAAAAA8BAAAAkAAAAEgAAACQAAAASAAAAAAAAAAAAAAAAAAAAAEAAABQAAAAAAAAAAAA4D8AAAAAAADgPwAAAAAAAOA/AAAAAAAA4D8AAAAAAADgPwAAAAAAAOA/AAAAAAAA4D8AAAAAAADgPwAAAAAAAOA/AAAAAAAA4D8CAAAAjAAAAAAAAAAAAAAAu+DjDP///wgAAAAAAAAAAAAAAAAAAAAAAAAAAAAAAAAAAAAAZAAAAAEAAABAAAAAAAAAAAAAAAAAAAAAAAAAAAAAAAAAAAAAAAAAAAAAAAAAAAAAAAAAAAAAAAAAAAAAAAAAAAAAAAAAAAAAAAAAAAAAAAAAAAAAAAAAAAAAAAAAAAAAFAAAADwAAAAAAAAAAAAAAAAAAAkUAAAAAQAAABQAAAAUAAAAFAAAAAEAAAAAAAAAZAAAAGQAAAAAAAAAZAAAAGQAAAAVAAAAYAAAAAAAAAAAAAAADwAAACADAAAAAAAAAAAAAAEAAACgMgAAVgcAAKr4//8BAAAAf39/AAEAAABkAAAAAAAAABQAAABAHwAAAAAAACYAAAAAAAAAwOD//wAAAAAmAAAAZAAAABYAAABMAAAAAAAAAAAAAAAEAAAAAAAAAAEAAACAgIAKAAAAACgAAAAoAAAAZAAAAGQAAAAAAAAAzMzMAAAAAABQAAAAUAAAAGQAAABkAAAAAAAAABcAAAAUAAAAAAAAAAAAAAD/fwAA/38AAAAAAAAJAAAABAAAAAAAAAAMAAAAEAAAAAAAAAAAAAAAAAAAAAAAAAAeAAAAaAAAAAAAAAAAAAAAAAAAAAAAAAAAAAAAECcAABAnAAAAAAAAAAAAAAAAAAAAAAAAAAAAAAAAAAAAAAAAAAAAABQAAAAAAAAAwMD/AAAAAABkAAAAMgAAAAAAAABkAAAAAAAAAH9/fwAKAAAAHwAAAFQAAAAAAAAFAAAAAQAAAAAAAAAAAAAAAAAAAAAAAAAAAAAAAAAAAAAAAAAAAAAAAn9/fwAAAAADzMzMAMDA/wB/f38AAAAAAAAAAAAAAAAAAAAAAAAAAAAhAAAAGAAAABQAAABwCAAA6BcAANAvAACwIgAAEAAAACYAAAAIAAAAAYAAAAAAAAA="/>
               </a:ext>
             </a:extLst>
           </p:cNvSpPr>
@@ -333,7 +335,7 @@
             <a:spLocks noGrp="1" noChangeArrowheads="1"/>
             <a:extLst>
               <a:ext uri="smNativeData">
-                <pr:smNativeData xmlns:pr="smNativeData" val="SMDATA_13_FAOrYBMAAAAlAAAAZAAAAA8BAAAAkAAAAEgAAACQAAAASAAAAAAAAAABAAAAAAAAAAEAAABQAAAAAAAAAAAA4D8AAAAAAADgPwAAAAAAAOA/AAAAAAAA4D8AAAAAAADgPwAAAAAAAOA/AAAAAAAA4D8AAAAAAADgPwAAAAAAAOA/AAAAAAAA4D8CAAAAjAAAAAAAAAAAAAAAu+DjDP///wgAAAAAAAAAAAAAAAAAAAAAAAAAAAAAAAAAAAAAZAAAAAEAAABAAAAAAAAAAAAAAAAAAAAAAAAAAAAAAAAAAAAAAAAAAAAAAAAAAAAAAAAAAAAAAAAAAAAAAAAAAAAAAAAAAAAAAAAAAAAAAAAAAAAAAAAAAAAAAAAAAAAAFAAAADwAAAAAAAAAAAAAAAAAAAkUAAAAAQAAABQAAAAUAAAAFAAAAAEAAAAAAAAAZAAAAGQAAAAAAAAAZAAAAGQAAAAVAAAAYAAAAAAAAAAAAAAADwAAACADAAAAAAAAAAAAAAEAAACgMgAAVgcAAKr4//8BAAAAf39/AAEAAABkAAAAAAAAABQAAABAHwAAAAAAACYAAAAAAAAAwOD//wAAAAAmAAAAZAAAABYAAABMAAAAAAAAAAAAAAAEAAAAAAAAAAEAAACAgIAKAAAAACgAAAAoAAAAZAAAAGQAAAAAAAAAzMzMAAAAAABQAAAAUAAAAGQAAABkAAAAAAAAABcAAAAUAAAAAAAAAAAAAAD/fwAA/38AAAAAAAAJAAAABAAAAAAAAAAMAAAAEAAAAAAAAAAAAAAAAAAAAAAAAAAeAAAAaAAAAAAAAAAAAAAAAAAAAAAAAAAAAAAAECcAABAnAAAAAAAAAAAAAAAAAAAAAAAAAAAAAAAAAAAAAAAAAAAAABQAAAAAAAAAwMD/AAAAAABkAAAAMgAAAAAAAABkAAAAAAAAAH9/fwAKAAAAHwAAAFQAAAAAAAAFAAAAAQAAAAAAAAAAAAAAAAAAAAAAAAAAAAAAAAAAAAAAAAAAAAAAAn9/fwAAAAADzMzMAMDA/wB/f38AAAAAAAAAAAAAAAAAAAAAAAAAAAAhAAAAGAAAABQAAADQAgAAGycAAPAPAABZKQAAAAAAACYAAAAIAAAAAAAAAAAAAAA="/>
+                <pr:smNativeData xmlns:pr="smNativeData" val="SMDATA_13_HjisYBMAAAAlAAAAZAAAAA8BAAAAkAAAAEgAAACQAAAASAAAAAAAAAABAAAAAAAAAAEAAABQAAAAAAAAAAAA4D8AAAAAAADgPwAAAAAAAOA/AAAAAAAA4D8AAAAAAADgPwAAAAAAAOA/AAAAAAAA4D8AAAAAAADgPwAAAAAAAOA/AAAAAAAA4D8CAAAAjAAAAAAAAAAAAAAAu+DjDP///wgAAAAAAAAAAAAAAAAAAAAAAAAAAAAAAAAAAAAAZAAAAAEAAABAAAAAAAAAAAAAAAAAAAAAAAAAAAAAAAAAAAAAAAAAAAAAAAAAAAAAAAAAAAAAAAAAAAAAAAAAAAAAAAAAAAAAAAAAAAAAAAAAAAAAAAAAAAAAAAAAAAAAFAAAADwAAAAAAAAAAAAAAAAAAAkUAAAAAQAAABQAAAAUAAAAFAAAAAEAAAAAAAAAZAAAAGQAAAAAAAAAZAAAAGQAAAAVAAAAYAAAAAAAAAAAAAAADwAAACADAAAAAAAAAAAAAAEAAACgMgAAVgcAAKr4//8BAAAAf39/AAEAAABkAAAAAAAAABQAAABAHwAAAAAAACYAAAAAAAAAwOD//wAAAAAmAAAAZAAAABYAAABMAAAAAAAAAAAAAAAEAAAAAAAAAAEAAACAgIAKAAAAACgAAAAoAAAAZAAAAGQAAAAAAAAAzMzMAAAAAABQAAAAUAAAAGQAAABkAAAAAAAAABcAAAAUAAAAAAAAAAAAAAD/fwAA/38AAAAAAAAJAAAABAAAAAAAAAAMAAAAEAAAAAAAAAAAAAAAAAAAAAAAAAAeAAAAaAAAAAAAAAAAAAAAAAAAAAAAAAAAAAAAECcAABAnAAAAAAAAAAAAAAAAAAAAAAAAAAAAAAAAAAAAAAAAAAAAABQAAAAAAAAAwMD/AAAAAABkAAAAMgAAAAAAAABkAAAAAAAAAH9/fwAKAAAAHwAAAFQAAAAAAAAFAAAAAQAAAAAAAAAAAAAAAAAAAAAAAAAAAAAAAAAAAAAAAAAAAAAAAn9/fwAAAAADzMzMAMDA/wB/f38AAAAAAAAAAAAAAAAAAAAAAAAAAAAhAAAAGAAAABQAAADQAgAAGycAAPAPAABZKQAAEAAAACYAAAAIAAAAAAAAAAAAAAA="/>
               </a:ext>
             </a:extLst>
           </p:cNvSpPr>
@@ -347,7 +349,7 @@
           <a:lstStyle/>
           <a:p>
             <a:pPr/>
-            <a:fld id="{26342E12-5CCB-61D8-858C-AA8D60C273FF}" type="datetime1">
+            <a:fld id="{3F74CFB5-FBD2-2139-9CCC-0D6C81826A58}" type="datetime1">
               <a:t/>
             </a:fld>
           </a:p>
@@ -360,7 +362,7 @@
             <a:spLocks noGrp="1" noChangeArrowheads="1"/>
             <a:extLst>
               <a:ext uri="smNativeData">
-                <pr:smNativeData xmlns:pr="smNativeData" val="SMDATA_13_FAOrYBMAAAAlAAAAZAAAAA8BAAAAkAAAAEgAAACQAAAASAAAAAAAAAABAAAAAAAAAAEAAABQAAAAAAAAAAAA4D8AAAAAAADgPwAAAAAAAOA/AAAAAAAA4D8AAAAAAADgPwAAAAAAAOA/AAAAAAAA4D8AAAAAAADgPwAAAAAAAOA/AAAAAAAA4D8CAAAAjAAAAAAAAAAAAAAAu+DjDP///wgAAAAAAAAAAAAAAAAAAAAAAAAAAAAAAAAAAAAAZAAAAAEAAABAAAAAAAAAAAAAAAAAAAAAAAAAAAAAAAAAAAAAAAAAAAAAAAAAAAAAAAAAAAAAAAAAAAAAAAAAAAAAAAAAAAAAAAAAAAAAAAAAAAAAAAAAAAAAAAAAAAAAFAAAADwAAAAAAAAAAAAAAAAAAAkUAAAAAQAAABQAAAAUAAAAFAAAAAEAAAAAAAAAZAAAAGQAAAAAAAAAZAAAAGQAAAAVAAAAYAAAAAAAAAAAAAAADwAAACADAAAAAAAAAAAAAAEAAACgMgAAVgcAAKr4//8BAAAAf39/AAEAAABkAAAAAAAAABQAAABAHwAAAAAAACYAAAAAAAAAwOD//wAAAAAmAAAAZAAAABYAAABMAAAAAAAAAAAAAAAEAAAAAAAAAAEAAACAgIAKAAAAACgAAAAoAAAAZAAAAGQAAAAAAAAAzMzMAAAAAABQAAAAUAAAAGQAAABkAAAAAAAAABcAAAAUAAAAAAAAAAAAAAD/fwAA/38AAAAAAAAJAAAABAAAAAAAAAAMAAAAEAAAAAAAAAAAAAAAAAAAAAAAAAAeAAAAaAAAAAAAAAAAAAAAAAAAAAAAAAAAAAAAECcAABAnAAAAAAAAAAAAAAAAAAAAAAAAAAAAAAAAAAAAAAAAAAAAABQAAAAAAAAAwMD/AAAAAABkAAAAMgAAAAAAAABkAAAAAAAAAH9/fwAKAAAAHwAAAFQAAAAAAAAFAAAAAQAAAAAAAAAAAAAAAAAAAAAAAAAAAAAAAAAAAAAAAAAAAAAAAn9/fwAAAAADzMzMAMDA/wB/f38AAAAAAAAAAAAAAAAAAAAAAAAAAAAhAAAAGAAAABQAAAA4EwAAGycAAAglAABZKQAAAAAAACYAAAAIAAAAAAAAAAAAAAA="/>
+                <pr:smNativeData xmlns:pr="smNativeData" val="SMDATA_13_HjisYBMAAAAlAAAAZAAAAA8BAAAAkAAAAEgAAACQAAAASAAAAAAAAAABAAAAAAAAAAEAAABQAAAAAAAAAAAA4D8AAAAAAADgPwAAAAAAAOA/AAAAAAAA4D8AAAAAAADgPwAAAAAAAOA/AAAAAAAA4D8AAAAAAADgPwAAAAAAAOA/AAAAAAAA4D8CAAAAjAAAAAAAAAAAAAAAu+DjDP///wgAAAAAAAAAAAAAAAAAAAAAAAAAAAAAAAAAAAAAZAAAAAEAAABAAAAAAAAAAAAAAAAAAAAAAAAAAAAAAAAAAAAAAAAAAAAAAAAAAAAAAAAAAAAAAAAAAAAAAAAAAAAAAAAAAAAAAAAAAAAAAAAAAAAAAAAAAAAAAAAAAAAAFAAAADwAAAAAAAAAAAAAAAAAAAkUAAAAAQAAABQAAAAUAAAAFAAAAAEAAAAAAAAAZAAAAGQAAAAAAAAAZAAAAGQAAAAVAAAAYAAAAAAAAAAAAAAADwAAACADAAAAAAAAAAAAAAEAAACgMgAAVgcAAKr4//8BAAAAf39/AAEAAABkAAAAAAAAABQAAABAHwAAAAAAACYAAAAAAAAAwOD//wAAAAAmAAAAZAAAABYAAABMAAAAAAAAAAAAAAAEAAAAAAAAAAEAAACAgIAKAAAAACgAAAAoAAAAZAAAAGQAAAAAAAAAzMzMAAAAAABQAAAAUAAAAGQAAABkAAAAAAAAABcAAAAUAAAAAAAAAAAAAAD/fwAA/38AAAAAAAAJAAAABAAAAAAAAAAMAAAAEAAAAAAAAAAAAAAAAAAAAAAAAAAeAAAAaAAAAAAAAAAAAAAAAAAAAAAAAAAAAAAAECcAABAnAAAAAAAAAAAAAAAAAAAAAAAAAAAAAAAAAAAAAAAAAAAAABQAAAAAAAAAwMD/AAAAAABkAAAAMgAAAAAAAABkAAAAAAAAAH9/fwAKAAAAHwAAAFQAAAAAAAAFAAAAAQAAAAAAAAAAAAAAAAAAAAAAAAAAAAAAAAAAAAAAAAAAAAAAAn9/fwAAAAADzMzMAMDA/wB/f38AAAAAAAAAAAAAAAAAAAAAAAAAAAAhAAAAGAAAABQAAAA4EwAAGycAAAglAABZKQAAEAAAACYAAAAIAAAAAAAAAAAAAAA="/>
               </a:ext>
             </a:extLst>
           </p:cNvSpPr>
@@ -374,9 +376,6 @@
           <a:lstStyle/>
           <a:p>
             <a:pPr/>
-            <a:r>
-              <a:t/>
-            </a:r>
           </a:p>
         </p:txBody>
       </p:sp>
@@ -387,7 +386,7 @@
             <a:spLocks noGrp="1" noChangeArrowheads="1"/>
             <a:extLst>
               <a:ext uri="smNativeData">
-                <pr:smNativeData xmlns:pr="smNativeData" val="SMDATA_13_FAOrYBMAAAAlAAAAZAAAAA8BAAAAkAAAAEgAAACQAAAASAAAAAAAAAABAAAAAAAAAAEAAABQAAAAAAAAAAAA4D8AAAAAAADgPwAAAAAAAOA/AAAAAAAA4D8AAAAAAADgPwAAAAAAAOA/AAAAAAAA4D8AAAAAAADgPwAAAAAAAOA/AAAAAAAA4D8CAAAAjAAAAAAAAAAAAAAAu+DjDP///wgAAAAAAAAAAAAAAAAAAAAAAAAAAAAAAAAAAAAAZAAAAAEAAABAAAAAAAAAAAAAAAAAAAAAAAAAAAAAAAAAAAAAAAAAAAAAAAAAAAAAAAAAAAAAAAAAAAAAAAAAAAAAAAAAAAAAAAAAAAAAAAAAAAAAAAAAAAAAAAAAAAAAFAAAADwAAAAAAAAAAAAAAAAAAAkUAAAAAQAAABQAAAAUAAAAFAAAAAEAAAAAAAAAZAAAAGQAAAAAAAAAZAAAAGQAAAAVAAAAYAAAAAAAAAAAAAAADwAAACADAAAAAAAAAAAAAAEAAACgMgAAVgcAAKr4//8BAAAAf39/AAEAAABkAAAAAAAAABQAAABAHwAAAAAAACYAAAAAAAAAwOD//wAAAAAmAAAAZAAAABYAAABMAAAAAAAAAAAAAAAEAAAAAAAAAAEAAACAgIAKAAAAACgAAAAoAAAAZAAAAGQAAAAAAAAAzMzMAAAAAABQAAAAUAAAAGQAAABkAAAAAAAAABcAAAAUAAAAAAAAAAAAAAD/fwAA/38AAAAAAAAJAAAABAAAAAAAAAAMAAAAEAAAAAAAAAAAAAAAAAAAAAAAAAAeAAAAaAAAAAAAAAAAAAAAAAAAAAAAAAAAAAAAECcAABAnAAAAAAAAAAAAAAAAAAAAAAAAAAAAAAAAAAAAAAAAAAAAABQAAAAAAAAAwMD/AAAAAABkAAAAMgAAAAAAAABkAAAAAAAAAH9/fwAKAAAAHwAAAFQAAAAAAAAFAAAAAQAAAAAAAAAAAAAAAAAAAAAAAAAAAAAAAAAAAAAAAAAAAAAAAn9/fwAAAAADzMzMAMDA/wB/f38AAAAAAAAAAAAAAAAAAAAAAAAAAAAhAAAAGAAAABQAAABQKAAAGycAAHA1AABZKQAAAAAAACYAAAAIAAAAAAAAAAAAAAA="/>
+                <pr:smNativeData xmlns:pr="smNativeData" val="SMDATA_13_HjisYBMAAAAlAAAAZAAAAA8BAAAAkAAAAEgAAACQAAAASAAAAAAAAAABAAAAAAAAAAEAAABQAAAAAAAAAAAA4D8AAAAAAADgPwAAAAAAAOA/AAAAAAAA4D8AAAAAAADgPwAAAAAAAOA/AAAAAAAA4D8AAAAAAADgPwAAAAAAAOA/AAAAAAAA4D8CAAAAjAAAAAAAAAAAAAAAu+DjDP///wgAAAAAAAAAAAAAAAAAAAAAAAAAAAAAAAAAAAAAZAAAAAEAAABAAAAAAAAAAAAAAAAAAAAAAAAAAAAAAAAAAAAAAAAAAAAAAAAAAAAAAAAAAAAAAAAAAAAAAAAAAAAAAAAAAAAAAAAAAAAAAAAAAAAAAAAAAAAAAAAAAAAAFAAAADwAAAAAAAAAAAAAAAAAAAkUAAAAAQAAABQAAAAUAAAAFAAAAAEAAAAAAAAAZAAAAGQAAAAAAAAAZAAAAGQAAAAVAAAAYAAAAAAAAAAAAAAADwAAACADAAAAAAAAAAAAAAEAAACgMgAAVgcAAKr4//8BAAAAf39/AAEAAABkAAAAAAAAABQAAABAHwAAAAAAACYAAAAAAAAAwOD//wAAAAAmAAAAZAAAABYAAABMAAAAAAAAAAAAAAAEAAAAAAAAAAEAAACAgIAKAAAAACgAAAAoAAAAZAAAAGQAAAAAAAAAzMzMAAAAAABQAAAAUAAAAGQAAABkAAAAAAAAABcAAAAUAAAAAAAAAAAAAAD/fwAA/38AAAAAAAAJAAAABAAAAAAAAAAMAAAAEAAAAAAAAAAAAAAAAAAAAAAAAAAeAAAAaAAAAAAAAAAAAAAAAAAAAAAAAAAAAAAAECcAABAnAAAAAAAAAAAAAAAAAAAAAAAAAAAAAAAAAAAAAAAAAAAAABQAAAAAAAAAwMD/AAAAAABkAAAAMgAAAAAAAABkAAAAAAAAAH9/fwAKAAAAHwAAAFQAAAAAAAAFAAAAAQAAAAAAAAAAAAAAAAAAAAAAAAAAAAAAAAAAAAAAAAAAAAAAAn9/fwAAAAADzMzMAMDA/wB/f38AAAAAAAAAAAAAAAAAAAAAAAAAAAAhAAAAGAAAABQAAABQKAAAGycAAHA1AABZKQAAEAAAACYAAAAIAAAAAAAAAAAAAAA="/>
               </a:ext>
             </a:extLst>
           </p:cNvSpPr>
@@ -401,7 +400,7 @@
           <a:lstStyle/>
           <a:p>
             <a:pPr/>
-            <a:fld id="{26343B1F-51CB-61CD-858C-A79875C273F2}" type="slidenum">
+            <a:fld id="{3F74BB2D-63D2-214D-9CCC-9518F5826AC0}" type="slidenum">
               <a:t/>
             </a:fld>
           </a:p>
@@ -439,7 +438,7 @@
             <a:spLocks noGrp="1" noChangeArrowheads="1"/>
             <a:extLst>
               <a:ext uri="smNativeData">
-                <pr:smNativeData xmlns:pr="smNativeData" val="SMDATA_13_FAOrYBMAAAAlAAAAZAAAAA8BAAAAkAAAAEgAAACQAAAASAAAAAAAAAABAAAAAAAAAAEAAABQAAAAAAAAAAAA4D8AAAAAAADgPwAAAAAAAOA/AAAAAAAA4D8AAAAAAADgPwAAAAAAAOA/AAAAAAAA4D8AAAAAAADgPwAAAAAAAOA/AAAAAAAA4D8CAAAAjAAAAAAAAAAAAAAAu+DjDP///wgAAAAAAAAAAAAAAAAAAAAAAAAAAAAAAAAAAAAAZAAAAAEAAABAAAAAAAAAAAAAAAAAAAAAAAAAAAAAAAAAAAAAAAAAAAAAAAAAAAAAAAAAAAAAAAAAAAAAAAAAAAAAAAAAAAAAAAAAAAAAAAAAAAAAAAAAAAAAAAAAAAAAFAAAADwAAAAAAAAAAAAAAAAAAAkUAAAAAQAAABQAAAAUAAAAFAAAAAEAAAAAAAAAZAAAAGQAAAAAAAAAZAAAAGQAAAAVAAAAYAAAAAAAAAAAAAAADwAAACADAAAAAAAAAAAAAAEAAACgMgAAVgcAAKr4//8BAAAAf39/AAEAAABkAAAAAAAAABQAAABAHwAAAAAAACYAAAAAAAAAwOD//wAAAAAmAAAAZAAAABYAAABMAAAAAAAAAAAAAAAEAAAAAAAAAAEAAACAgIAKAAAAACgAAAAoAAAAZAAAAGQAAAAAAAAAzMzMAAAAAABQAAAAUAAAAGQAAABkAAAAAAAAABcAAAAUAAAAAAAAAAAAAAD/fwAA/38AAAAAAAAJAAAABAAAAKI+BAAMAAAAEAAAAAAAAAAAAAAAAAAAAAAAAAAeAAAAaAAAAAAAAAAAAAAAAAAAAAAAAAAAAAAAECcAABAnAAAAAAAAAAAAAAAAAAAAAAAAAAAAAAAAAAAAAAAAAAAAABQAAAAAAAAAwMD/AAAAAABkAAAAMgAAAAAAAABkAAAAAAAAAH9/fwAKAAAAHwAAAFQAAAAAAAAFAAAAAQAAAAAAAAAAAAAAAAAAAAAAAAAAAAAAAAAAAAAAAAAAAAAAAn9/fwAAAAADzMzMAMDA/wB/f38AAAAAAAAAAAAAAAAAAAAAAAAAAAAhAAAAGAAAABQAAADQAgAAsAEAAHA1AAC4CAAAAAAAACYAAAAIAAAAAAAAAAAAAAA="/>
+                <pr:smNativeData xmlns:pr="smNativeData" val="SMDATA_13_HjisYBMAAAAlAAAAZAAAAA8BAAAAkAAAAEgAAACQAAAASAAAAAAAAAABAAAAAAAAAAEAAABQAAAAAAAAAAAA4D8AAAAAAADgPwAAAAAAAOA/AAAAAAAA4D8AAAAAAADgPwAAAAAAAOA/AAAAAAAA4D8AAAAAAADgPwAAAAAAAOA/AAAAAAAA4D8CAAAAjAAAAAAAAAAAAAAAu+DjDP///wgAAAAAAAAAAAAAAAAAAAAAAAAAAAAAAAAAAAAAZAAAAAEAAABAAAAAAAAAAAAAAAAAAAAAAAAAAAAAAAAAAAAAAAAAAAAAAAAAAAAAAAAAAAAAAAAAAAAAAAAAAAAAAAAAAAAAAAAAAAAAAAAAAAAAAAAAAAAAAAAAAAAAFAAAADwAAAAAAAAAAAAAAAAAAAkUAAAAAQAAABQAAAAUAAAAFAAAAAEAAAAAAAAAZAAAAGQAAAAAAAAAZAAAAGQAAAAVAAAAYAAAAAAAAAAAAAAADwAAACADAAAAAAAAAAAAAAEAAACgMgAAVgcAAKr4//8BAAAAf39/AAEAAABkAAAAAAAAABQAAABAHwAAAAAAACYAAAAAAAAAwOD//wAAAAAmAAAAZAAAABYAAABMAAAAAAAAAAAAAAAEAAAAAAAAAAEAAACAgIAKAAAAACgAAAAoAAAAZAAAAGQAAAAAAAAAzMzMAAAAAABQAAAAUAAAAGQAAABkAAAAAAAAABcAAAAUAAAAAAAAAAAAAAD/fwAA/38AAAAAAAAJAAAABAAAAKI+BAAMAAAAEAAAAAAAAAAAAAAAAAAAAAAAAAAeAAAAaAAAAAAAAAAAAAAAAAAAAAAAAAAAAAAAECcAABAnAAAAAAAAAAAAAAAAAAAAAAAAAAAAAAAAAAAAAAAAAAAAABQAAAAAAAAAwMD/AAAAAABkAAAAMgAAAAAAAABkAAAAAAAAAH9/fwAKAAAAHwAAAFQAAAAAAAAFAAAAAQAAAAAAAAAAAAAAAAAAAAAAAAAAAAAAAAAAAAAAAAAAAAAAAn9/fwAAAAADzMzMAMDA/wB/f38AAAAAAAAAAAAAAAAAAAAAAAAAAAAhAAAAGAAAABQAAADQAgAAsAEAAHA1AAC4CAAAEAAAACYAAAAIAAAAAAAAAAAAAAA="/>
               </a:ext>
             </a:extLst>
           </p:cNvSpPr>
@@ -466,7 +465,7 @@
             <a:spLocks noGrp="1" noChangeArrowheads="1"/>
             <a:extLst>
               <a:ext uri="smNativeData">
-                <pr:smNativeData xmlns:pr="smNativeData" val="SMDATA_13_FAOrYBMAAAAlAAAAZAAAAA8BAAAAkAAAAEgAAACQAAAASAAAAAAAAAAAAAAAAQAAAAEAAABQAAAAAAAAAAAA4D8AAAAAAADgPwAAAAAAAOA/AAAAAAAA4D8AAAAAAADgPwAAAAAAAOA/AAAAAAAA4D8AAAAAAADgPwAAAAAAAOA/AAAAAAAA4D8CAAAAjAAAAAAAAAAAAAAAu+DjDP///wgAAAAAAAAAAAAAAAAAAAAAAAAAAAAAAAAAAAAAZAAAAAEAAABAAAAAAAAAAAAAAAAAAAAAAAAAAAAAAAAAAAAAAAAAAAAAAAAAAAAAAAAAAAAAAAAAAAAAAAAAAAAAAAAAAAAAAAAAAAAAAAAAAAAAAAAAAAAAAAAAAAAAFAAAADwAAAAAAAAAAAAAAAAAAAkUAAAAAQAAABQAAAAUAAAAFAAAAAEAAAAAAAAAZAAAAGQAAAAAAAAAZAAAAGQAAAAVAAAAYAAAAAAAAAAAAAAADwAAACADAAAAAAAAAAAAAAEAAACgMgAAVgcAAKr4//8BAAAAf39/AAEAAABkAAAAAAAAABQAAABAHwAAAAAAACYAAAAAAAAAwOD//wAAAAAmAAAAZAAAABYAAABMAAAAAAAAAAAAAAAEAAAAAAAAAAEAAACAgIAKAAAAACgAAAAoAAAAZAAAAGQAAAAAAAAAzMzMAAAAAABQAAAAUAAAAGQAAABkAAAAAAAAABcAAAAUAAAAAAAAAAAAAAD/fwAA/38AAAAAAAAJAAAABAAAAAAAAAAMAAAAEAAAAAAAAAAAAAAAAAAAAAAAAAAeAAAAaAAAAAAAAAAAAAAAAAAAAAAAAAAAAAAAECcAABAnAAAAAAAAAAAAAAAAAAAAAAAAAAAAAAAAAAAAAAAAAAAAABQAAAAAAAAAwMD/AAAAAABkAAAAMgAAAAAAAABkAAAAAAAAAH9/fwAKAAAAHwAAAFQAAAAAAAAFAAAAAQAAAAAAAAAAAAAAAAAAAAAAAAAAAAAAAAAAAAAAAAAAAAAAAn9/fwAAAAADzMzMAMDA/wB/f38AAAAAAAAAAAAAAAAAAAAAAAAAAAAhAAAAGAAAABQAAADQAgAA2AkAAHA1AACwJQAAAAAAACYAAAAIAAAAAgAAAAAAAAA="/>
+                <pr:smNativeData xmlns:pr="smNativeData" val="SMDATA_13_HjisYBMAAAAlAAAAZAAAAA8BAAAAkAAAAEgAAACQAAAASAAAAAAAAAAAAAAAAQAAAAEAAABQAAAAAAAAAAAA4D8AAAAAAADgPwAAAAAAAOA/AAAAAAAA4D8AAAAAAADgPwAAAAAAAOA/AAAAAAAA4D8AAAAAAADgPwAAAAAAAOA/AAAAAAAA4D8CAAAAjAAAAAAAAAAAAAAAu+DjDP///wgAAAAAAAAAAAAAAAAAAAAAAAAAAAAAAAAAAAAAZAAAAAEAAABAAAAAAAAAAAAAAAAAAAAAAAAAAAAAAAAAAAAAAAAAAAAAAAAAAAAAAAAAAAAAAAAAAAAAAAAAAAAAAAAAAAAAAAAAAAAAAAAAAAAAAAAAAAAAAAAAAAAAFAAAADwAAAAAAAAAAAAAAAAAAAkUAAAAAQAAABQAAAAUAAAAFAAAAAEAAAAAAAAAZAAAAGQAAAAAAAAAZAAAAGQAAAAVAAAAYAAAAAAAAAAAAAAADwAAACADAAAAAAAAAAAAAAEAAACgMgAAVgcAAKr4//8BAAAAf39/AAEAAABkAAAAAAAAABQAAABAHwAAAAAAACYAAAAAAAAAwOD//wAAAAAmAAAAZAAAABYAAABMAAAAAAAAAAAAAAAEAAAAAAAAAAEAAACAgIAKAAAAACgAAAAoAAAAZAAAAGQAAAAAAAAAzMzMAAAAAABQAAAAUAAAAGQAAABkAAAAAAAAABcAAAAUAAAAAAAAAAAAAAD/fwAA/38AAAAAAAAJAAAABAAAAAAAAAAMAAAAEAAAAAAAAAAAAAAAAAAAAAAAAAAeAAAAaAAAAAAAAAAAAAAAAAAAAAAAAAAAAAAAECcAABAnAAAAAAAAAAAAAAAAAAAAAAAAAAAAAAAAAAAAAAAAAAAAABQAAAAAAAAAwMD/AAAAAABkAAAAMgAAAAAAAABkAAAAAAAAAH9/fwAKAAAAHwAAAFQAAAAAAAAFAAAAAQAAAAAAAAAAAAAAAAAAAAAAAAAAAAAAAAAAAAAAAAAAAAAAAn9/fwAAAAADzMzMAMDA/wB/f38AAAAAAAAAAAAAAAAAAAAAAAAAAAAhAAAAGAAAABQAAADQAgAA2AkAAHA1AACwJQAAEAAAACYAAAAIAAAAAgAAAAAAAAA="/>
               </a:ext>
             </a:extLst>
           </p:cNvSpPr>
@@ -521,7 +520,7 @@
             <a:spLocks noGrp="1" noChangeArrowheads="1"/>
             <a:extLst>
               <a:ext uri="smNativeData">
-                <pr:smNativeData xmlns:pr="smNativeData" val="SMDATA_13_FAOrYBMAAAAlAAAAZAAAAA8BAAAAkAAAAEgAAACQAAAASAAAAAAAAAABAAAAAAAAAAEAAABQAAAAAAAAAAAA4D8AAAAAAADgPwAAAAAAAOA/AAAAAAAA4D8AAAAAAADgPwAAAAAAAOA/AAAAAAAA4D8AAAAAAADgPwAAAAAAAOA/AAAAAAAA4D8CAAAAjAAAAAAAAAAAAAAAu+DjDP///wgAAAAAAAAAAAAAAAAAAAAAAAAAAAAAAAAAAAAAZAAAAAEAAABAAAAAAAAAAAAAAAAAAAAAAAAAAAAAAAAAAAAAAAAAAAAAAAAAAAAAAAAAAAAAAAAAAAAAAAAAAAAAAAAAAAAAAAAAAAAAAAAAAAAAAAAAAAAAAAAAAAAAFAAAADwAAAAAAAAAAAAAAAAAAAkUAAAAAQAAABQAAAAUAAAAFAAAAAEAAAAAAAAAZAAAAGQAAAAAAAAAZAAAAGQAAAAVAAAAYAAAAAAAAAAAAAAADwAAACADAAAAAAAAAAAAAAEAAACgMgAAVgcAAKr4//8BAAAAf39/AAEAAABkAAAAAAAAABQAAABAHwAAAAAAACYAAAAAAAAAwOD//wAAAAAmAAAAZAAAABYAAABMAAAAAAAAAAAAAAAEAAAAAAAAAAEAAACAgIAKAAAAACgAAAAoAAAAZAAAAGQAAAAAAAAAzMzMAAAAAABQAAAAUAAAAGQAAABkAAAAAAAAABcAAAAUAAAAAAAAAAAAAAD/fwAA/38AAAAAAAAJAAAABAAAAAAAAAAMAAAAEAAAAAAAAAAAAAAAAAAAAAAAAAAeAAAAaAAAAAAAAAAAAAAAAAAAAAAAAAAAAAAAECcAABAnAAAAAAAAAAAAAAAAAAAAAAAAAAAAAAAAAAAAAAAAAAAAABQAAAAAAAAAwMD/AAAAAABkAAAAMgAAAAAAAABkAAAAAAAAAH9/fwAKAAAAHwAAAFQAAAAAAAAFAAAAAQAAAAAAAAAAAAAAAAAAAAAAAAAAAAAAAAAAAAAAAAAAAAAAAn9/fwAAAAADzMzMAMDA/wB/f38AAAAAAAAAAAAAAAAAAAAAAAAAAAAhAAAAGAAAABQAAADQAgAAGycAAPAPAABZKQAAAAAAACYAAAAIAAAAAAAAAAAAAAA="/>
+                <pr:smNativeData xmlns:pr="smNativeData" val="SMDATA_13_HjisYBMAAAAlAAAAZAAAAA8BAAAAkAAAAEgAAACQAAAASAAAAAAAAAABAAAAAAAAAAEAAABQAAAAAAAAAAAA4D8AAAAAAADgPwAAAAAAAOA/AAAAAAAA4D8AAAAAAADgPwAAAAAAAOA/AAAAAAAA4D8AAAAAAADgPwAAAAAAAOA/AAAAAAAA4D8CAAAAjAAAAAAAAAAAAAAAu+DjDP///wgAAAAAAAAAAAAAAAAAAAAAAAAAAAAAAAAAAAAAZAAAAAEAAABAAAAAAAAAAAAAAAAAAAAAAAAAAAAAAAAAAAAAAAAAAAAAAAAAAAAAAAAAAAAAAAAAAAAAAAAAAAAAAAAAAAAAAAAAAAAAAAAAAAAAAAAAAAAAAAAAAAAAFAAAADwAAAAAAAAAAAAAAAAAAAkUAAAAAQAAABQAAAAUAAAAFAAAAAEAAAAAAAAAZAAAAGQAAAAAAAAAZAAAAGQAAAAVAAAAYAAAAAAAAAAAAAAADwAAACADAAAAAAAAAAAAAAEAAACgMgAAVgcAAKr4//8BAAAAf39/AAEAAABkAAAAAAAAABQAAABAHwAAAAAAACYAAAAAAAAAwOD//wAAAAAmAAAAZAAAABYAAABMAAAAAAAAAAAAAAAEAAAAAAAAAAEAAACAgIAKAAAAACgAAAAoAAAAZAAAAGQAAAAAAAAAzMzMAAAAAABQAAAAUAAAAGQAAABkAAAAAAAAABcAAAAUAAAAAAAAAAAAAAD/fwAA/38AAAAAAAAJAAAABAAAAAAAAAAMAAAAEAAAAAAAAAAAAAAAAAAAAAAAAAAeAAAAaAAAAAAAAAAAAAAAAAAAAAAAAAAAAAAAECcAABAnAAAAAAAAAAAAAAAAAAAAAAAAAAAAAAAAAAAAAAAAAAAAABQAAAAAAAAAwMD/AAAAAABkAAAAMgAAAAAAAABkAAAAAAAAAH9/fwAKAAAAHwAAAFQAAAAAAAAFAAAAAQAAAAAAAAAAAAAAAAAAAAAAAAAAAAAAAAAAAAAAAAAAAAAAAn9/fwAAAAADzMzMAMDA/wB/f38AAAAAAAAAAAAAAAAAAAAAAAAAAAAhAAAAGAAAABQAAADQAgAAGycAAPAPAABZKQAAEAAAACYAAAAIAAAAAAAAAAAAAAA="/>
               </a:ext>
             </a:extLst>
           </p:cNvSpPr>
@@ -535,7 +534,7 @@
           <a:lstStyle/>
           <a:p>
             <a:pPr/>
-            <a:fld id="{263454CC-82CB-61A2-858C-74F71AC27321}" type="datetime1">
+            <a:fld id="{3F74B51A-54D2-2143-9CCC-A216FB826AF7}" type="datetime1">
               <a:t/>
             </a:fld>
           </a:p>
@@ -548,7 +547,7 @@
             <a:spLocks noGrp="1" noChangeArrowheads="1"/>
             <a:extLst>
               <a:ext uri="smNativeData">
-                <pr:smNativeData xmlns:pr="smNativeData" val="SMDATA_13_FAOrYBMAAAAlAAAAZAAAAA8BAAAAkAAAAEgAAACQAAAASAAAAAAAAAABAAAAAAAAAAEAAABQAAAAAAAAAAAA4D8AAAAAAADgPwAAAAAAAOA/AAAAAAAA4D8AAAAAAADgPwAAAAAAAOA/AAAAAAAA4D8AAAAAAADgPwAAAAAAAOA/AAAAAAAA4D8CAAAAjAAAAAAAAAAAAAAAu+DjDP///wgAAAAAAAAAAAAAAAAAAAAAAAAAAAAAAAAAAAAAZAAAAAEAAABAAAAAAAAAAAAAAAAAAAAAAAAAAAAAAAAAAAAAAAAAAAAAAAAAAAAAAAAAAAAAAAAAAAAAAAAAAAAAAAAAAAAAAAAAAAAAAAAAAAAAAAAAAAAAAAAAAAAAFAAAADwAAAAAAAAAAAAAAAAAAAkUAAAAAQAAABQAAAAUAAAAFAAAAAEAAAAAAAAAZAAAAGQAAAAAAAAAZAAAAGQAAAAVAAAAYAAAAAAAAAAAAAAADwAAACADAAAAAAAAAAAAAAEAAACgMgAAVgcAAKr4//8BAAAAf39/AAEAAABkAAAAAAAAABQAAABAHwAAAAAAACYAAAAAAAAAwOD//wAAAAAmAAAAZAAAABYAAABMAAAAAAAAAAAAAAAEAAAAAAAAAAEAAACAgIAKAAAAACgAAAAoAAAAZAAAAGQAAAAAAAAAzMzMAAAAAABQAAAAUAAAAGQAAABkAAAAAAAAABcAAAAUAAAAAAAAAAAAAAD/fwAA/38AAAAAAAAJAAAABAAAADM/bWMMAAAAEAAAAAAAAAAAAAAAAAAAAAAAAAAeAAAAaAAAAAAAAAAAAAAAAAAAAAAAAAAAAAAAECcAABAnAAAAAAAAAAAAAAAAAAAAAAAAAAAAAAAAAAAAAAAAAAAAABQAAAAAAAAAwMD/AAAAAABkAAAAMgAAAAAAAABkAAAAAAAAAH9/fwAKAAAAHwAAAFQAAAAAAAAFAAAAAQAAAAAAAAAAAAAAAAAAAAAAAAAAAAAAAAAAAAAAAAAAAAAAAn9/fwAAAAADzMzMAMDA/wB/f38AAAAAAAAAAAAAAAAAAAAAAAAAAAAhAAAAGAAAABQAAAA4EwAAGycAAAglAABZKQAAAAAAACYAAAAIAAAAAAAAAAAAAAA="/>
+                <pr:smNativeData xmlns:pr="smNativeData" val="SMDATA_13_HjisYBMAAAAlAAAAZAAAAA8BAAAAkAAAAEgAAACQAAAASAAAAAAAAAABAAAAAAAAAAEAAABQAAAAAAAAAAAA4D8AAAAAAADgPwAAAAAAAOA/AAAAAAAA4D8AAAAAAADgPwAAAAAAAOA/AAAAAAAA4D8AAAAAAADgPwAAAAAAAOA/AAAAAAAA4D8CAAAAjAAAAAAAAAAAAAAAu+DjDP///wgAAAAAAAAAAAAAAAAAAAAAAAAAAAAAAAAAAAAAZAAAAAEAAABAAAAAAAAAAAAAAAAAAAAAAAAAAAAAAAAAAAAAAAAAAAAAAAAAAAAAAAAAAAAAAAAAAAAAAAAAAAAAAAAAAAAAAAAAAAAAAAAAAAAAAAAAAAAAAAAAAAAAFAAAADwAAAAAAAAAAAAAAAAAAAkUAAAAAQAAABQAAAAUAAAAFAAAAAEAAAAAAAAAZAAAAGQAAAAAAAAAZAAAAGQAAAAVAAAAYAAAAAAAAAAAAAAADwAAACADAAAAAAAAAAAAAAEAAACgMgAAVgcAAKr4//8BAAAAf39/AAEAAABkAAAAAAAAABQAAABAHwAAAAAAACYAAAAAAAAAwOD//wAAAAAmAAAAZAAAABYAAABMAAAAAAAAAAAAAAAEAAAAAAAAAAEAAACAgIAKAAAAACgAAAAoAAAAZAAAAGQAAAAAAAAAzMzMAAAAAABQAAAAUAAAAGQAAABkAAAAAAAAABcAAAAUAAAAAAAAAAAAAAD/fwAA/38AAAAAAAAJAAAABAAAADM/bWMMAAAAEAAAAAAAAAAAAAAAAAAAAAAAAAAeAAAAaAAAAAAAAAAAAAAAAAAAAAAAAAAAAAAAECcAABAnAAAAAAAAAAAAAAAAAAAAAAAAAAAAAAAAAAAAAAAAAAAAABQAAAAAAAAAwMD/AAAAAABkAAAAMgAAAAAAAABkAAAAAAAAAH9/fwAKAAAAHwAAAFQAAAAAAAAFAAAAAQAAAAAAAAAAAAAAAAAAAAAAAAAAAAAAAAAAAAAAAAAAAAAAAn9/fwAAAAADzMzMAMDA/wB/f38AAAAAAAAAAAAAAAAAAAAAAAAAAAAhAAAAGAAAABQAAAA4EwAAGycAAAglAABZKQAAEAAAACYAAAAIAAAAAAAAAAAAAAA="/>
               </a:ext>
             </a:extLst>
           </p:cNvSpPr>
@@ -562,9 +561,6 @@
           <a:lstStyle/>
           <a:p>
             <a:pPr/>
-            <a:r>
-              <a:t/>
-            </a:r>
           </a:p>
         </p:txBody>
       </p:sp>
@@ -575,7 +571,7 @@
             <a:spLocks noGrp="1" noChangeArrowheads="1"/>
             <a:extLst>
               <a:ext uri="smNativeData">
-                <pr:smNativeData xmlns:pr="smNativeData" val="SMDATA_13_FAOrYBMAAAAlAAAAZAAAAA8BAAAAkAAAAEgAAACQAAAASAAAAAAAAAABAAAAAAAAAAEAAABQAAAAAAAAAAAA4D8AAAAAAADgPwAAAAAAAOA/AAAAAAAA4D8AAAAAAADgPwAAAAAAAOA/AAAAAAAA4D8AAAAAAADgPwAAAAAAAOA/AAAAAAAA4D8CAAAAjAAAAAAAAAAAAAAAu+DjDP///wgAAAAAAAAAAAAAAAAAAAAAAAAAAAAAAAAAAAAAZAAAAAEAAABAAAAAAAAAAAAAAAAAAAAAAAAAAAAAAAAAAAAAAAAAAAAAAAAAAAAAAAAAAAAAAAAAAAAAAAAAAAAAAAAAAAAAAAAAAAAAAAAAAAAAAAAAAAAAAAAAAAAAFAAAADwAAAAAAAAAAAAAAAAAAAkUAAAAAQAAABQAAAAUAAAAFAAAAAEAAAAAAAAAZAAAAGQAAAAAAAAAZAAAAGQAAAAVAAAAYAAAAAAAAAAAAAAADwAAACADAAAAAAAAAAAAAAEAAACgMgAAVgcAAKr4//8BAAAAf39/AAEAAABkAAAAAAAAABQAAABAHwAAAAAAACYAAAAAAAAAwOD//wAAAAAmAAAAZAAAABYAAABMAAAAAAAAAAAAAAAEAAAAAAAAAAEAAACAgIAKAAAAACgAAAAoAAAAZAAAAGQAAAAAAAAAzMzMAAAAAABQAAAAUAAAAGQAAABkAAAAAAAAABcAAAAUAAAAAAAAAAAAAAD/fwAA/38AAAAAAAAJAAAABAAAAAAAAAAMAAAAEAAAAAAAAAAAAAAAAAAAAAAAAAAeAAAAaAAAAAAAAAAAAAAAAAAAAAAAAAAAAAAAECcAABAnAAAAAAAAAAAAAAAAAAAAAAAAAAAAAAAAAAAAAAAAAAAAABQAAAAAAAAAwMD/AAAAAABkAAAAMgAAAAAAAABkAAAAAAAAAH9/fwAKAAAAHwAAAFQAAAAAAAAFAAAAAQAAAAAAAAAAAAAAAAAAAAAAAAAAAAAAAAAAAAAAAAAAAAAAAn9/fwAAAAADzMzMAMDA/wB/f38AAAAAAAAAAAAAAAAAAAAAAAAAAAAhAAAAGAAAABQAAABQKAAAGycAAHA1AABZKQAAAAAAACYAAAAIAAAAAAAAAAAAAAA="/>
+                <pr:smNativeData xmlns:pr="smNativeData" val="SMDATA_13_HjisYBMAAAAlAAAAZAAAAA8BAAAAkAAAAEgAAACQAAAASAAAAAAAAAABAAAAAAAAAAEAAABQAAAAAAAAAAAA4D8AAAAAAADgPwAAAAAAAOA/AAAAAAAA4D8AAAAAAADgPwAAAAAAAOA/AAAAAAAA4D8AAAAAAADgPwAAAAAAAOA/AAAAAAAA4D8CAAAAjAAAAAAAAAAAAAAAu+DjDP///wgAAAAAAAAAAAAAAAAAAAAAAAAAAAAAAAAAAAAAZAAAAAEAAABAAAAAAAAAAAAAAAAAAAAAAAAAAAAAAAAAAAAAAAAAAAAAAAAAAAAAAAAAAAAAAAAAAAAAAAAAAAAAAAAAAAAAAAAAAAAAAAAAAAAAAAAAAAAAAAAAAAAAFAAAADwAAAAAAAAAAAAAAAAAAAkUAAAAAQAAABQAAAAUAAAAFAAAAAEAAAAAAAAAZAAAAGQAAAAAAAAAZAAAAGQAAAAVAAAAYAAAAAAAAAAAAAAADwAAACADAAAAAAAAAAAAAAEAAACgMgAAVgcAAKr4//8BAAAAf39/AAEAAABkAAAAAAAAABQAAABAHwAAAAAAACYAAAAAAAAAwOD//wAAAAAmAAAAZAAAABYAAABMAAAAAAAAAAAAAAAEAAAAAAAAAAEAAACAgIAKAAAAACgAAAAoAAAAZAAAAGQAAAAAAAAAzMzMAAAAAABQAAAAUAAAAGQAAABkAAAAAAAAABcAAAAUAAAAAAAAAAAAAAD/fwAA/38AAAAAAAAJAAAABAAAAAAAAAAMAAAAEAAAAAAAAAAAAAAAAAAAAAAAAAAeAAAAaAAAAAAAAAAAAAAAAAAAAAAAAAAAAAAAECcAABAnAAAAAAAAAAAAAAAAAAAAAAAAAAAAAAAAAAAAAAAAAAAAABQAAAAAAAAAwMD/AAAAAABkAAAAMgAAAAAAAABkAAAAAAAAAH9/fwAKAAAAHwAAAFQAAAAAAAAFAAAAAQAAAAAAAAAAAAAAAAAAAAAAAAAAAAAAAAAAAAAAAAAAAAAAAn9/fwAAAAADzMzMAMDA/wB/f38AAAAAAAAAAAAAAAAAAAAAAAAAAAAhAAAAGAAAABQAAABQKAAAGycAAHA1AABZKQAAEAAAACYAAAAIAAAAAAAAAAAAAAA="/>
               </a:ext>
             </a:extLst>
           </p:cNvSpPr>
@@ -589,7 +585,7 @@
           <a:lstStyle/>
           <a:p>
             <a:pPr/>
-            <a:fld id="{26344021-6FCB-61B6-858C-99E30EC273CC}" type="slidenum">
+            <a:fld id="{3F74C7D6-98D2-2131-9CCC-6E6489826A3B}" type="slidenum">
               <a:t/>
             </a:fld>
           </a:p>
@@ -627,7 +623,7 @@
             <a:spLocks noGrp="1" noChangeArrowheads="1"/>
             <a:extLst>
               <a:ext uri="smNativeData">
-                <pr:smNativeData xmlns:pr="smNativeData" val="SMDATA_13_FAOrYBMAAAAlAAAAZAAAAA8BAAAAkAAAAEgAAACQAAAASAAAAAAAAAACAAAAAQAAAAEAAABQAAAAAAAAAAAA4D8AAAAAAADgPwAAAAAAAOA/AAAAAAAA4D8AAAAAAADgPwAAAAAAAOA/AAAAAAAA4D8AAAAAAADgPwAAAAAAAOA/AAAAAAAA4D8CAAAAjAAAAAAAAAAAAAAAu+DjDP///wgAAAAAAAAAAAAAAAAAAAAAAAAAAAAAAAAAAAAAZAAAAAEAAABAAAAAAAAAAAAAAAAAAAAAAAAAAAAAAAAAAAAAAAAAAAAAAAAAAAAAAAAAAAAAAAAAAAAAAAAAAAAAAAAAAAAAAAAAAAAAAAAAAAAAAAAAAAAAAAAAAAAAFAAAADwAAAAAAAAAAAAAAAAAAAkUAAAAAQAAABQAAAAUAAAAFAAAAAEAAAAAAAAAZAAAAGQAAAAAAAAAZAAAAGQAAAAVAAAAYAAAAAAAAAAAAAAADwAAACADAAAAAAAAAAAAAAEAAACgMgAAVgcAAKr4//8BAAAAf39/AAEAAABkAAAAAAAAABQAAABAHwAAAAAAACYAAAAAAAAAwOD//wAAAAAmAAAAZAAAABYAAABMAAAAAAAAAAAAAAAEAAAAAAAAAAEAAACAgIAKAAAAACgAAAAoAAAAZAAAAGQAAAAAAAAAzMzMAAAAAABQAAAAUAAAAGQAAABkAAAAAAAAABcAAAAUAAAAAAAAAAAAAAD/fwAA/38AAAAAAAAJAAAABAAAAAAAAAAMAAAAEAAAAAAAAAAAAAAAAAAAAAAAAAAeAAAAaAAAAAAAAAAAAAAAAAAAAAAAAAAAAAAAECcAABAnAAAAAAAAAAAAAAAAAAAAAAAAAAAAAAAAAAAAAAAAAAAAABQAAAAAAAAAwMD/AAAAAABkAAAAMgAAAAAAAABkAAAAAAAAAH9/fwAKAAAAHwAAAFQAAAAAAAAFAAAAAQAAAAAAAAAAAAAAAAAAAAAAAAAAAAAAAAAAAAAAAAAAAAAAAn9/fwAAAAADzMzMAMDA/wB/f38AAAAAAAAAAAAAAAAAAAAAAAAAAAAhAAAAGAAAABQAAADIKAAAsAEAAHA1AACwJQAAAAAAACYAAAAIAAAAgwAAAAAAAAA="/>
+                <pr:smNativeData xmlns:pr="smNativeData" val="SMDATA_13_HjisYBMAAAAlAAAAZAAAAA8BAAAAkAAAAEgAAACQAAAASAAAAAAAAAACAAAAAQAAAAEAAABQAAAAAAAAAAAA4D8AAAAAAADgPwAAAAAAAOA/AAAAAAAA4D8AAAAAAADgPwAAAAAAAOA/AAAAAAAA4D8AAAAAAADgPwAAAAAAAOA/AAAAAAAA4D8CAAAAjAAAAAAAAAAAAAAAu+DjDP///wgAAAAAAAAAAAAAAAAAAAAAAAAAAAAAAAAAAAAAZAAAAAEAAABAAAAAAAAAAAAAAAAAAAAAAAAAAAAAAAAAAAAAAAAAAAAAAAAAAAAAAAAAAAAAAAAAAAAAAAAAAAAAAAAAAAAAAAAAAAAAAAAAAAAAAAAAAAAAAAAAAAAAFAAAADwAAAAAAAAAAAAAAAAAAAkUAAAAAQAAABQAAAAUAAAAFAAAAAEAAAAAAAAAZAAAAGQAAAAAAAAAZAAAAGQAAAAVAAAAYAAAAAAAAAAAAAAADwAAACADAAAAAAAAAAAAAAEAAACgMgAAVgcAAKr4//8BAAAAf39/AAEAAABkAAAAAAAAABQAAABAHwAAAAAAACYAAAAAAAAAwOD//wAAAAAmAAAAZAAAABYAAABMAAAAAAAAAAAAAAAEAAAAAAAAAAEAAACAgIAKAAAAACgAAAAoAAAAZAAAAGQAAAAAAAAAzMzMAAAAAABQAAAAUAAAAGQAAABkAAAAAAAAABcAAAAUAAAAAAAAAAAAAAD/fwAA/38AAAAAAAAJAAAABAAAAAAAAAAMAAAAEAAAAAAAAAAAAAAAAAAAAAAAAAAeAAAAaAAAAAAAAAAAAAAAAAAAAAAAAAAAAAAAECcAABAnAAAAAAAAAAAAAAAAAAAAAAAAAAAAAAAAAAAAAAAAAAAAABQAAAAAAAAAwMD/AAAAAABkAAAAMgAAAAAAAABkAAAAAAAAAH9/fwAKAAAAHwAAAFQAAAAAAAAFAAAAAQAAAAAAAAAAAAAAAAAAAAAAAAAAAAAAAAAAAAAAAAAAAAAAAn9/fwAAAAADzMzMAMDA/wB/f38AAAAAAAAAAAAAAAAAAAAAAAAAAAAhAAAAGAAAABQAAADIKAAAsAEAAHA1AACwJQAAEAAAACYAAAAIAAAAgwAAAAAAAAA="/>
               </a:ext>
             </a:extLst>
           </p:cNvSpPr>
@@ -663,7 +659,7 @@
             <a:spLocks noGrp="1" noChangeArrowheads="1"/>
             <a:extLst>
               <a:ext uri="smNativeData">
-                <pr:smNativeData xmlns:pr="smNativeData" val="SMDATA_13_FAOrYBMAAAAlAAAAZAAAAA8BAAAAkAAAAEgAAACQAAAASAAAAAAAAAAAAAAAAQAAAAEAAABQAAAAAAAAAAAA4D8AAAAAAADgPwAAAAAAAOA/AAAAAAAA4D8AAAAAAADgPwAAAAAAAOA/AAAAAAAA4D8AAAAAAADgPwAAAAAAAOA/AAAAAAAA4D8CAAAAjAAAAAAAAAAAAAAAu+DjDP///wgAAAAAAAAAAAAAAAAAAAAAAAAAAAAAAAAAAAAAZAAAAAEAAABAAAAAAAAAAAAAAAAAAAAAAAAAAAAAAAAAAAAAAAAAAAAAAAAAAAAAAAAAAAAAAAAAAAAAAAAAAAAAAAAAAAAAAAAAAAAAAAAAAAAAAAAAAAAAAAAAAAAAFAAAADwAAAAAAAAAAAAAAAAAAAkUAAAAAQAAABQAAAAUAAAAFAAAAAEAAAAAAAAAZAAAAGQAAAAAAAAAZAAAAGQAAAAVAAAAYAAAAAAAAAAAAAAADwAAACADAAAAAAAAAAAAAAEAAACgMgAAVgcAAKr4//8BAAAAf39/AAEAAABkAAAAAAAAABQAAABAHwAAAAAAACYAAAAAAAAAwOD//wAAAAAmAAAAZAAAABYAAABMAAAAAAAAAAAAAAAEAAAAAAAAAAEAAACAgIAKAAAAACgAAAAoAAAAZAAAAGQAAAAAAAAAzMzMAAAAAABQAAAAUAAAAGQAAABkAAAAAAAAABcAAAAUAAAAAAAAAAAAAAD/fwAA/38AAAAAAAAJAAAABAAAAAAAAAAMAAAAEAAAAAAAAAAAAAAAAAAAAAAAAAAeAAAAaAAAAAAAAAAAAAAAAAAAAAAAAAAAAAAAECcAABAnAAAAAAAAAAAAAAAAAAAAAAAAAAAAAAAAAAAAAAAAAAAAABQAAAAAAAAAwMD/AAAAAABkAAAAMgAAAAAAAABkAAAAAAAAAH9/fwAKAAAAHwAAAFQAAAAAAAAFAAAAAQAAAAAAAAAAAAAAAAAAAAAAAAAAAAAAAAAAAAAAAAAAAAAAAn9/fwAAAAADzMzMAMDA/wB/f38AAAAAAAAAAAAAAAAAAAAAAAAAAAAhAAAAGAAAABQAAADQAgAAsAEAANgnAACwJQAAAAAAACYAAAAIAAAAAwAAAAAAAAA="/>
+                <pr:smNativeData xmlns:pr="smNativeData" val="SMDATA_13_HjisYBMAAAAlAAAAZAAAAA8BAAAAkAAAAEgAAACQAAAASAAAAAAAAAAAAAAAAQAAAAEAAABQAAAAAAAAAAAA4D8AAAAAAADgPwAAAAAAAOA/AAAAAAAA4D8AAAAAAADgPwAAAAAAAOA/AAAAAAAA4D8AAAAAAADgPwAAAAAAAOA/AAAAAAAA4D8CAAAAjAAAAAAAAAAAAAAAu+DjDP///wgAAAAAAAAAAAAAAAAAAAAAAAAAAAAAAAAAAAAAZAAAAAEAAABAAAAAAAAAAAAAAAAAAAAAAAAAAAAAAAAAAAAAAAAAAAAAAAAAAAAAAAAAAAAAAAAAAAAAAAAAAAAAAAAAAAAAAAAAAAAAAAAAAAAAAAAAAAAAAAAAAAAAFAAAADwAAAAAAAAAAAAAAAAAAAkUAAAAAQAAABQAAAAUAAAAFAAAAAEAAAAAAAAAZAAAAGQAAAAAAAAAZAAAAGQAAAAVAAAAYAAAAAAAAAAAAAAADwAAACADAAAAAAAAAAAAAAEAAACgMgAAVgcAAKr4//8BAAAAf39/AAEAAABkAAAAAAAAABQAAABAHwAAAAAAACYAAAAAAAAAwOD//wAAAAAmAAAAZAAAABYAAABMAAAAAAAAAAAAAAAEAAAAAAAAAAEAAACAgIAKAAAAACgAAAAoAAAAZAAAAGQAAAAAAAAAzMzMAAAAAABQAAAAUAAAAGQAAABkAAAAAAAAABcAAAAUAAAAAAAAAAAAAAD/fwAA/38AAAAAAAAJAAAABAAAAAAAAAAMAAAAEAAAAAAAAAAAAAAAAAAAAAAAAAAeAAAAaAAAAAAAAAAAAAAAAAAAAAAAAAAAAAAAECcAABAnAAAAAAAAAAAAAAAAAAAAAAAAAAAAAAAAAAAAAAAAAAAAABQAAAAAAAAAwMD/AAAAAABkAAAAMgAAAAAAAABkAAAAAAAAAH9/fwAKAAAAHwAAAFQAAAAAAAAFAAAAAQAAAAAAAAAAAAAAAAAAAAAAAAAAAAAAAAAAAAAAAAAAAAAAAn9/fwAAAAADzMzMAMDA/wB/f38AAAAAAAAAAAAAAAAAAAAAAAAAAAAhAAAAGAAAABQAAADQAgAAsAEAANgnAACwJQAAEAAAACYAAAAIAAAAAwAAAAAAAAA="/>
               </a:ext>
             </a:extLst>
           </p:cNvSpPr>
@@ -723,7 +719,7 @@
             <a:spLocks noGrp="1" noChangeArrowheads="1"/>
             <a:extLst>
               <a:ext uri="smNativeData">
-                <pr:smNativeData xmlns:pr="smNativeData" val="SMDATA_13_FAOrYBMAAAAlAAAAZAAAAA8BAAAAkAAAAEgAAACQAAAASAAAAAAAAAABAAAAAAAAAAEAAABQAAAAAAAAAAAA4D8AAAAAAADgPwAAAAAAAOA/AAAAAAAA4D8AAAAAAADgPwAAAAAAAOA/AAAAAAAA4D8AAAAAAADgPwAAAAAAAOA/AAAAAAAA4D8CAAAAjAAAAAAAAAAAAAAAu+DjDP///wgAAAAAAAAAAAAAAAAAAAAAAAAAAAAAAAAAAAAAZAAAAAEAAABAAAAAAAAAAAAAAAAAAAAAAAAAAAAAAAAAAAAAAAAAAAAAAAAAAAAAAAAAAAAAAAAAAAAAAAAAAAAAAAAAAAAAAAAAAAAAAAAAAAAAAAAAAAAAAAAAAAAAFAAAADwAAAAAAAAAAAAAAAAAAAkUAAAAAQAAABQAAAAUAAAAFAAAAAEAAAAAAAAAZAAAAGQAAAAAAAAAZAAAAGQAAAAVAAAAYAAAAAAAAAAAAAAADwAAACADAAAAAAAAAAAAAAEAAACgMgAAVgcAAKr4//8BAAAAf39/AAEAAABkAAAAAAAAABQAAABAHwAAAAAAACYAAAAAAAAAwOD//wAAAAAmAAAAZAAAABYAAABMAAAAAAAAAAAAAAAEAAAAAAAAAAEAAACAgIAKAAAAACgAAAAoAAAAZAAAAGQAAAAAAAAAzMzMAAAAAABQAAAAUAAAAGQAAABkAAAAAAAAABcAAAAUAAAAAAAAAAAAAAD/fwAA/38AAAAAAAAJAAAABAAAAAAAAAAMAAAAEAAAAAAAAAAAAAAAAAAAAAAAAAAeAAAAaAAAAAAAAAAAAAAAAAAAAAAAAAAAAAAAECcAABAnAAAAAAAAAAAAAAAAAAAAAAAAAAAAAAAAAAAAAAAAAAAAABQAAAAAAAAAwMD/AAAAAABkAAAAMgAAAAAAAABkAAAAAAAAAH9/fwAKAAAAHwAAAFQAAAAAAAAFAAAAAQAAAAAAAAAAAAAAAAAAAAAAAAAAAAAAAAAAAAAAAAAAAAAAAn9/fwAAAAADzMzMAMDA/wB/f38AAAAAAAAAAAAAAAAAAAAAAAAAAAAhAAAAGAAAABQAAADQAgAAGycAAPAPAABZKQAAAAAAACYAAAAIAAAAAAAAAAAAAAA="/>
+                <pr:smNativeData xmlns:pr="smNativeData" val="SMDATA_13_HjisYBMAAAAlAAAAZAAAAA8BAAAAkAAAAEgAAACQAAAASAAAAAAAAAABAAAAAAAAAAEAAABQAAAAAAAAAAAA4D8AAAAAAADgPwAAAAAAAOA/AAAAAAAA4D8AAAAAAADgPwAAAAAAAOA/AAAAAAAA4D8AAAAAAADgPwAAAAAAAOA/AAAAAAAA4D8CAAAAjAAAAAAAAAAAAAAAu+DjDP///wgAAAAAAAAAAAAAAAAAAAAAAAAAAAAAAAAAAAAAZAAAAAEAAABAAAAAAAAAAAAAAAAAAAAAAAAAAAAAAAAAAAAAAAAAAAAAAAAAAAAAAAAAAAAAAAAAAAAAAAAAAAAAAAAAAAAAAAAAAAAAAAAAAAAAAAAAAAAAAAAAAAAAFAAAADwAAAAAAAAAAAAAAAAAAAkUAAAAAQAAABQAAAAUAAAAFAAAAAEAAAAAAAAAZAAAAGQAAAAAAAAAZAAAAGQAAAAVAAAAYAAAAAAAAAAAAAAADwAAACADAAAAAAAAAAAAAAEAAACgMgAAVgcAAKr4//8BAAAAf39/AAEAAABkAAAAAAAAABQAAABAHwAAAAAAACYAAAAAAAAAwOD//wAAAAAmAAAAZAAAABYAAABMAAAAAAAAAAAAAAAEAAAAAAAAAAEAAACAgIAKAAAAACgAAAAoAAAAZAAAAGQAAAAAAAAAzMzMAAAAAABQAAAAUAAAAGQAAABkAAAAAAAAABcAAAAUAAAAAAAAAAAAAAD/fwAA/38AAAAAAAAJAAAABAAAAAAAAAAMAAAAEAAAAAAAAAAAAAAAAAAAAAAAAAAeAAAAaAAAAAAAAAAAAAAAAAAAAAAAAAAAAAAAECcAABAnAAAAAAAAAAAAAAAAAAAAAAAAAAAAAAAAAAAAAAAAAAAAABQAAAAAAAAAwMD/AAAAAABkAAAAMgAAAAAAAABkAAAAAAAAAH9/fwAKAAAAHwAAAFQAAAAAAAAFAAAAAQAAAAAAAAAAAAAAAAAAAAAAAAAAAAAAAAAAAAAAAAAAAAAAAn9/fwAAAAADzMzMAMDA/wB/f38AAAAAAAAAAAAAAAAAAAAAAAAAAAAhAAAAGAAAABQAAADQAgAAGycAAPAPAABZKQAAEAAAACYAAAAIAAAAAAAAAAAAAAA="/>
               </a:ext>
             </a:extLst>
           </p:cNvSpPr>
@@ -737,7 +733,7 @@
           <a:lstStyle/>
           <a:p>
             <a:pPr/>
-            <a:fld id="{26342F50-1ECB-61D9-858C-E88C61C273BD}" type="datetime1">
+            <a:fld id="{3F74FE38-76D2-2108-9CCC-805DB0826AD5}" type="datetime1">
               <a:t/>
             </a:fld>
           </a:p>
@@ -750,7 +746,7 @@
             <a:spLocks noGrp="1" noChangeArrowheads="1"/>
             <a:extLst>
               <a:ext uri="smNativeData">
-                <pr:smNativeData xmlns:pr="smNativeData" val="SMDATA_13_FAOrYBMAAAAlAAAAZAAAAA8BAAAAkAAAAEgAAACQAAAASAAAAAAAAAABAAAAAAAAAAEAAABQAAAAAAAAAAAA4D8AAAAAAADgPwAAAAAAAOA/AAAAAAAA4D8AAAAAAADgPwAAAAAAAOA/AAAAAAAA4D8AAAAAAADgPwAAAAAAAOA/AAAAAAAA4D8CAAAAjAAAAAAAAAAAAAAAu+DjDP///wgAAAAAAAAAAAAAAAAAAAAAAAAAAAAAAAAAAAAAZAAAAAEAAABAAAAAAAAAAAAAAAAAAAAAAAAAAAAAAAAAAAAAAAAAAAAAAAAAAAAAAAAAAAAAAAAAAAAAAAAAAAAAAAAAAAAAAAAAAAAAAAAAAAAAAAAAAAAAAAAAAAAAFAAAADwAAAAAAAAAAAAAAAAAAAkUAAAAAQAAABQAAAAUAAAAFAAAAAEAAAAAAAAAZAAAAGQAAAAAAAAAZAAAAGQAAAAVAAAAYAAAAAAAAAAAAAAADwAAACADAAAAAAAAAAAAAAEAAACgMgAAVgcAAKr4//8BAAAAf39/AAEAAABkAAAAAAAAABQAAABAHwAAAAAAACYAAAAAAAAAwOD//wAAAAAmAAAAZAAAABYAAABMAAAAAAAAAAAAAAAEAAAAAAAAAAEAAACAgIAKAAAAACgAAAAoAAAAZAAAAGQAAAAAAAAAzMzMAAAAAABQAAAAUAAAAGQAAABkAAAAAAAAABcAAAAUAAAAAAAAAAAAAAD/fwAA/38AAAAAAAAJAAAABAAAAIZZAwAMAAAAEAAAAAAAAAAAAAAAAAAAAAAAAAAeAAAAaAAAAAAAAAAAAAAAAAAAAAAAAAAAAAAAECcAABAnAAAAAAAAAAAAAAAAAAAAAAAAAAAAAAAAAAAAAAAAAAAAABQAAAAAAAAAwMD/AAAAAABkAAAAMgAAAAAAAABkAAAAAAAAAH9/fwAKAAAAHwAAAFQAAAAAAAAFAAAAAQAAAAAAAAAAAAAAAAAAAAAAAAAAAAAAAAAAAAAAAAAAAAAAAn9/fwAAAAADzMzMAMDA/wB/f38AAAAAAAAAAAAAAAAAAAAAAAAAAAAhAAAAGAAAABQAAAA4EwAAGycAAAglAABZKQAAAAAAACYAAAAIAAAAAAAAAAAAAAA="/>
+                <pr:smNativeData xmlns:pr="smNativeData" val="SMDATA_13_HjisYBMAAAAlAAAAZAAAAA8BAAAAkAAAAEgAAACQAAAASAAAAAAAAAABAAAAAAAAAAEAAABQAAAAAAAAAAAA4D8AAAAAAADgPwAAAAAAAOA/AAAAAAAA4D8AAAAAAADgPwAAAAAAAOA/AAAAAAAA4D8AAAAAAADgPwAAAAAAAOA/AAAAAAAA4D8CAAAAjAAAAAAAAAAAAAAAu+DjDP///wgAAAAAAAAAAAAAAAAAAAAAAAAAAAAAAAAAAAAAZAAAAAEAAABAAAAAAAAAAAAAAAAAAAAAAAAAAAAAAAAAAAAAAAAAAAAAAAAAAAAAAAAAAAAAAAAAAAAAAAAAAAAAAAAAAAAAAAAAAAAAAAAAAAAAAAAAAAAAAAAAAAAAFAAAADwAAAAAAAAAAAAAAAAAAAkUAAAAAQAAABQAAAAUAAAAFAAAAAEAAAAAAAAAZAAAAGQAAAAAAAAAZAAAAGQAAAAVAAAAYAAAAAAAAAAAAAAADwAAACADAAAAAAAAAAAAAAEAAACgMgAAVgcAAKr4//8BAAAAf39/AAEAAABkAAAAAAAAABQAAABAHwAAAAAAACYAAAAAAAAAwOD//wAAAAAmAAAAZAAAABYAAABMAAAAAAAAAAAAAAAEAAAAAAAAAAEAAACAgIAKAAAAACgAAAAoAAAAZAAAAGQAAAAAAAAAzMzMAAAAAABQAAAAUAAAAGQAAABkAAAAAAAAABcAAAAUAAAAAAAAAAAAAAD/fwAA/38AAAAAAAAJAAAABAAAAIZZAwAMAAAAEAAAAAAAAAAAAAAAAAAAAAAAAAAeAAAAaAAAAAAAAAAAAAAAAAAAAAAAAAAAAAAAECcAABAnAAAAAAAAAAAAAAAAAAAAAAAAAAAAAAAAAAAAAAAAAAAAABQAAAAAAAAAwMD/AAAAAABkAAAAMgAAAAAAAABkAAAAAAAAAH9/fwAKAAAAHwAAAFQAAAAAAAAFAAAAAQAAAAAAAAAAAAAAAAAAAAAAAAAAAAAAAAAAAAAAAAAAAAAAAn9/fwAAAAADzMzMAMDA/wB/f38AAAAAAAAAAAAAAAAAAAAAAAAAAAAhAAAAGAAAABQAAAA4EwAAGycAAAglAABZKQAAEAAAACYAAAAIAAAAAAAAAAAAAAA="/>
               </a:ext>
             </a:extLst>
           </p:cNvSpPr>
@@ -764,9 +760,6 @@
           <a:lstStyle/>
           <a:p>
             <a:pPr/>
-            <a:r>
-              <a:t/>
-            </a:r>
           </a:p>
         </p:txBody>
       </p:sp>
@@ -777,7 +770,7 @@
             <a:spLocks noGrp="1" noChangeArrowheads="1"/>
             <a:extLst>
               <a:ext uri="smNativeData">
-                <pr:smNativeData xmlns:pr="smNativeData" val="SMDATA_13_FAOrYBMAAAAlAAAAZAAAAA8BAAAAkAAAAEgAAACQAAAASAAAAAAAAAABAAAAAAAAAAEAAABQAAAAAAAAAAAA4D8AAAAAAADgPwAAAAAAAOA/AAAAAAAA4D8AAAAAAADgPwAAAAAAAOA/AAAAAAAA4D8AAAAAAADgPwAAAAAAAOA/AAAAAAAA4D8CAAAAjAAAAAAAAAAAAAAAu+DjDP///wgAAAAAAAAAAAAAAAAAAAAAAAAAAAAAAAAAAAAAZAAAAAEAAABAAAAAAAAAAAAAAAAAAAAAAAAAAAAAAAAAAAAAAAAAAAAAAAAAAAAAAAAAAAAAAAAAAAAAAAAAAAAAAAAAAAAAAAAAAAAAAAAAAAAAAAAAAAAAAAAAAAAAFAAAADwAAAAAAAAAAAAAAAAAAAkUAAAAAQAAABQAAAAUAAAAFAAAAAEAAAAAAAAAZAAAAGQAAAAAAAAAZAAAAGQAAAAVAAAAYAAAAAAAAAAAAAAADwAAACADAAAAAAAAAAAAAAEAAACgMgAAVgcAAKr4//8BAAAAf39/AAEAAABkAAAAAAAAABQAAABAHwAAAAAAACYAAAAAAAAAwOD//wAAAAAmAAAAZAAAABYAAABMAAAAAAAAAAAAAAAEAAAAAAAAAAEAAACAgIAKAAAAACgAAAAoAAAAZAAAAGQAAAAAAAAAzMzMAAAAAABQAAAAUAAAAGQAAABkAAAAAAAAABcAAAAUAAAAAAAAAAAAAAD/fwAA/38AAAAAAAAJAAAABAAAAAAAAAAMAAAAEAAAAAAAAAAAAAAAAAAAAAAAAAAeAAAAaAAAAAAAAAAAAAAAAAAAAAAAAAAAAAAAECcAABAnAAAAAAAAAAAAAAAAAAAAAAAAAAAAAAAAAAAAAAAAAAAAABQAAAAAAAAAwMD/AAAAAABkAAAAMgAAAAAAAABkAAAAAAAAAH9/fwAKAAAAHwAAAFQAAAAAAAAFAAAAAQAAAAAAAAAAAAAAAAAAAAAAAAAAAAAAAAAAAAAAAAAAAAAAAn9/fwAAAAADzMzMAMDA/wB/f38AAAAAAAAAAAAAAAAAAAAAAAAAAAAhAAAAGAAAABQAAABQKAAAGycAAHA1AABZKQAAAAAAACYAAAAIAAAAAAAAAAAAAAA="/>
+                <pr:smNativeData xmlns:pr="smNativeData" val="SMDATA_13_HjisYBMAAAAlAAAAZAAAAA8BAAAAkAAAAEgAAACQAAAASAAAAAAAAAABAAAAAAAAAAEAAABQAAAAAAAAAAAA4D8AAAAAAADgPwAAAAAAAOA/AAAAAAAA4D8AAAAAAADgPwAAAAAAAOA/AAAAAAAA4D8AAAAAAADgPwAAAAAAAOA/AAAAAAAA4D8CAAAAjAAAAAAAAAAAAAAAu+DjDP///wgAAAAAAAAAAAAAAAAAAAAAAAAAAAAAAAAAAAAAZAAAAAEAAABAAAAAAAAAAAAAAAAAAAAAAAAAAAAAAAAAAAAAAAAAAAAAAAAAAAAAAAAAAAAAAAAAAAAAAAAAAAAAAAAAAAAAAAAAAAAAAAAAAAAAAAAAAAAAAAAAAAAAFAAAADwAAAAAAAAAAAAAAAAAAAkUAAAAAQAAABQAAAAUAAAAFAAAAAEAAAAAAAAAZAAAAGQAAAAAAAAAZAAAAGQAAAAVAAAAYAAAAAAAAAAAAAAADwAAACADAAAAAAAAAAAAAAEAAACgMgAAVgcAAKr4//8BAAAAf39/AAEAAABkAAAAAAAAABQAAABAHwAAAAAAACYAAAAAAAAAwOD//wAAAAAmAAAAZAAAABYAAABMAAAAAAAAAAAAAAAEAAAAAAAAAAEAAACAgIAKAAAAACgAAAAoAAAAZAAAAGQAAAAAAAAAzMzMAAAAAABQAAAAUAAAAGQAAABkAAAAAAAAABcAAAAUAAAAAAAAAAAAAAD/fwAA/38AAAAAAAAJAAAABAAAAAAAAAAMAAAAEAAAAAAAAAAAAAAAAAAAAAAAAAAeAAAAaAAAAAAAAAAAAAAAAAAAAAAAAAAAAAAAECcAABAnAAAAAAAAAAAAAAAAAAAAAAAAAAAAAAAAAAAAAAAAAAAAABQAAAAAAAAAwMD/AAAAAABkAAAAMgAAAAAAAABkAAAAAAAAAH9/fwAKAAAAHwAAAFQAAAAAAAAFAAAAAQAAAAAAAAAAAAAAAAAAAAAAAAAAAAAAAAAAAAAAAAAAAAAAAn9/fwAAAAADzMzMAMDA/wB/f38AAAAAAAAAAAAAAAAAAAAAAAAAAAAhAAAAGAAAABQAAABQKAAAGycAAHA1AABZKQAAEAAAACYAAAAIAAAAAAAAAAAAAAA="/>
               </a:ext>
             </a:extLst>
           </p:cNvSpPr>
@@ -791,7 +784,7 @@
           <a:lstStyle/>
           <a:p>
             <a:pPr/>
-            <a:fld id="{263450CD-83CB-61A6-858C-75F31EC27320}" type="slidenum">
+            <a:fld id="{3F749E19-57D2-2168-9CCC-A13DD0826AF4}" type="slidenum">
               <a:t/>
             </a:fld>
           </a:p>
@@ -829,7 +822,7 @@
             <a:spLocks noGrp="1" noChangeArrowheads="1"/>
             <a:extLst>
               <a:ext uri="smNativeData">
-                <pr:smNativeData xmlns:pr="smNativeData" val="SMDATA_13_FAOrYBMAAAAlAAAAZAAAAA8BAAAAkAAAAEgAAACQAAAASAAAAAAAAAABAAAAAAAAAAEAAABQAAAAAAAAAAAA4D8AAAAAAADgPwAAAAAAAOA/AAAAAAAA4D8AAAAAAADgPwAAAAAAAOA/AAAAAAAA4D8AAAAAAADgPwAAAAAAAOA/AAAAAAAA4D8CAAAAjAAAAAAAAAAAAAAAu+DjDP///wgAAAAAAAAAAAAAAAAAAAAAAAAAAAAAAAAAAAAAZAAAAAEAAABAAAAAAAAAAAAAAAAAAAAAAAAAAAAAAAAAAAAAAAAAAAAAAAAAAAAAAAAAAAAAAAAAAAAAAAAAAAAAAAAAAAAAAAAAAAAAAAAAAAAAAAAAAAAAAAAAAAAAFAAAADwAAAAAAAAAAAAAAAAAAAkUAAAAAQAAABQAAAAUAAAAFAAAAAEAAAAAAAAAZAAAAGQAAAAAAAAAZAAAAGQAAAAVAAAAYAAAAAAAAAAAAAAADwAAACADAAAAAAAAAAAAAAEAAACgMgAAVgcAAKr4//8BAAAAf39/AAEAAABkAAAAAAAAABQAAABAHwAAAAAAACYAAAAAAAAAwOD//wAAAAAmAAAAZAAAABYAAABMAAAAAAAAAAAAAAAEAAAAAAAAAAEAAACAgIAKAAAAACgAAAAoAAAAZAAAAGQAAAAAAAAAzMzMAAAAAABQAAAAUAAAAGQAAABkAAAAAAAAABcAAAAUAAAAAAAAAAAAAAD/fwAA/38AAAAAAAAJAAAABAAAAAAAAAAMAAAAEAAAAAAAAAAAAAAAAAAAAAAAAAAeAAAAaAAAAAAAAAAAAAAAAAAAAAAAAAAAAAAAECcAABAnAAAAAAAAAAAAAAAAAAAAAAAAAAAAAAAAAAAAAAAAAAAAABQAAAAAAAAAwMD/AAAAAABkAAAAMgAAAAAAAABkAAAAAAAAAH9/fwAKAAAAHwAAAFQAAAAAAAAFAAAAAQAAAAAAAAAAAAAAAAAAAAAAAAAAAAAAAAAAAAAAAAAAAAAAAn9/fwAAAAADzMzMAMDA/wB/f38AAAAAAAAAAAAAAAAAAAAAAAAAAAAhAAAAGAAAABQAAADQAgAAsAEAAHA1AAC4CAAAAAAAACYAAAAIAAAAAAAAAAAAAAA="/>
+                <pr:smNativeData xmlns:pr="smNativeData" val="SMDATA_13_HjisYBMAAAAlAAAAZAAAAA8BAAAAkAAAAEgAAACQAAAASAAAAAAAAAABAAAAAAAAAAEAAABQAAAAAAAAAAAA4D8AAAAAAADgPwAAAAAAAOA/AAAAAAAA4D8AAAAAAADgPwAAAAAAAOA/AAAAAAAA4D8AAAAAAADgPwAAAAAAAOA/AAAAAAAA4D8CAAAAjAAAAAAAAAAAAAAAu+DjDP///wgAAAAAAAAAAAAAAAAAAAAAAAAAAAAAAAAAAAAAZAAAAAEAAABAAAAAAAAAAAAAAAAAAAAAAAAAAAAAAAAAAAAAAAAAAAAAAAAAAAAAAAAAAAAAAAAAAAAAAAAAAAAAAAAAAAAAAAAAAAAAAAAAAAAAAAAAAAAAAAAAAAAAFAAAADwAAAAAAAAAAAAAAAAAAAkUAAAAAQAAABQAAAAUAAAAFAAAAAEAAAAAAAAAZAAAAGQAAAAAAAAAZAAAAGQAAAAVAAAAYAAAAAAAAAAAAAAADwAAACADAAAAAAAAAAAAAAEAAACgMgAAVgcAAKr4//8BAAAAf39/AAEAAABkAAAAAAAAABQAAABAHwAAAAAAACYAAAAAAAAAwOD//wAAAAAmAAAAZAAAABYAAABMAAAAAAAAAAAAAAAEAAAAAAAAAAEAAACAgIAKAAAAACgAAAAoAAAAZAAAAGQAAAAAAAAAzMzMAAAAAABQAAAAUAAAAGQAAABkAAAAAAAAABcAAAAUAAAAAAAAAAAAAAD/fwAA/38AAAAAAAAJAAAABAAAAAAAAAAMAAAAEAAAAAAAAAAAAAAAAAAAAAAAAAAeAAAAaAAAAAAAAAAAAAAAAAAAAAAAAAAAAAAAECcAABAnAAAAAAAAAAAAAAAAAAAAAAAAAAAAAAAAAAAAAAAAAAAAABQAAAAAAAAAwMD/AAAAAABkAAAAMgAAAAAAAABkAAAAAAAAAH9/fwAKAAAAHwAAAFQAAAAAAAAFAAAAAQAAAAAAAAAAAAAAAAAAAAAAAAAAAAAAAAAAAAAAAAAAAAAAAn9/fwAAAAADzMzMAMDA/wB/f38AAAAAAAAAAAAAAAAAAAAAAAAAAAAhAAAAGAAAABQAAADQAgAAsAEAAHA1AAC4CAAAEAAAACYAAAAIAAAAAAAAAAAAAAA="/>
               </a:ext>
             </a:extLst>
           </p:cNvSpPr>
@@ -856,7 +849,7 @@
             <a:spLocks noGrp="1" noChangeArrowheads="1"/>
             <a:extLst>
               <a:ext uri="smNativeData">
-                <pr:smNativeData xmlns:pr="smNativeData" val="SMDATA_13_FAOrYBMAAAAlAAAAZAAAAA8BAAAAkAAAAEgAAACQAAAASAAAAAAAAAAAAAAAAAAAAAEAAABQAAAAAAAAAAAA4D8AAAAAAADgPwAAAAAAAOA/AAAAAAAA4D8AAAAAAADgPwAAAAAAAOA/AAAAAAAA4D8AAAAAAADgPwAAAAAAAOA/AAAAAAAA4D8CAAAAjAAAAAAAAAAAAAAAu+DjDP///wgAAAAAAAAAAAAAAAAAAAAAAAAAAAAAAAAAAAAAZAAAAAEAAABAAAAAAAAAAAAAAAAAAAAAAAAAAAAAAAAAAAAAAAAAAAAAAAAAAAAAAAAAAAAAAAAAAAAAAAAAAAAAAAAAAAAAAAAAAAAAAAAAAAAAAAAAAAAAAAAAAAAAFAAAADwAAAAAAAAAAAAAAAAAAAkUAAAAAQAAABQAAAAUAAAAFAAAAAEAAAAAAAAAZAAAAGQAAAAAAAAAZAAAAGQAAAAVAAAAYAAAAAAAAAAAAAAADwAAACADAAAAAAAAAAAAAAEAAACgMgAAVgcAAKr4//8BAAAAf39/AAEAAABkAAAAAAAAABQAAABAHwAAAAAAACYAAAAAAAAAwOD//wAAAAAmAAAAZAAAABYAAABMAAAAAAAAAAAAAAAEAAAAAAAAAAEAAACAgIAKAAAAACgAAAAoAAAAZAAAAGQAAAAAAAAAzMzMAAAAAABQAAAAUAAAAGQAAABkAAAAAAAAABcAAAAUAAAAAAAAAAAAAAD/fwAA/38AAAAAAAAJAAAABAAAAAAAAAAMAAAAEAAAAAAAAAAAAAAAAAAAAAAAAAAeAAAAaAAAAAAAAAAAAAAAAAAAAAAAAAAAAAAAECcAABAnAAAAAAAAAAAAAAAAAAAAAAAAAAAAAAAAAAAAAAAAAAAAABQAAAAAAAAAwMD/AAAAAABkAAAAMgAAAAAAAABkAAAAAAAAAH9/fwAKAAAAHwAAAFQAAAAAAAAFAAAAAQAAAAAAAAAAAAAAAAAAAAAAAAAAAAAAAAAAAAAAAAAAAAAAAn9/fwAAAAADzMzMAMDA/wB/f38AAAAAAAAAAAAAAAAAAAAAAAAAAAAhAAAAGAAAABQAAADQAgAA2AkAAHA1AACwJQAAAAAAACYAAAAIAAAAAAAAAAAAAAA="/>
+                <pr:smNativeData xmlns:pr="smNativeData" val="SMDATA_13_HjisYBMAAAAlAAAAZAAAAA8BAAAAkAAAAEgAAACQAAAASAAAAAAAAAAAAAAAAAAAAAEAAABQAAAAAAAAAAAA4D8AAAAAAADgPwAAAAAAAOA/AAAAAAAA4D8AAAAAAADgPwAAAAAAAOA/AAAAAAAA4D8AAAAAAADgPwAAAAAAAOA/AAAAAAAA4D8CAAAAjAAAAAAAAAAAAAAAu+DjDP///wgAAAAAAAAAAAAAAAAAAAAAAAAAAAAAAAAAAAAAZAAAAAEAAABAAAAAAAAAAAAAAAAAAAAAAAAAAAAAAAAAAAAAAAAAAAAAAAAAAAAAAAAAAAAAAAAAAAAAAAAAAAAAAAAAAAAAAAAAAAAAAAAAAAAAAAAAAAAAAAAAAAAAFAAAADwAAAAAAAAAAAAAAAAAAAkUAAAAAQAAABQAAAAUAAAAFAAAAAEAAAAAAAAAZAAAAGQAAAAAAAAAZAAAAGQAAAAVAAAAYAAAAAAAAAAAAAAADwAAACADAAAAAAAAAAAAAAEAAACgMgAAVgcAAKr4//8BAAAAf39/AAEAAABkAAAAAAAAABQAAABAHwAAAAAAACYAAAAAAAAAwOD//wAAAAAmAAAAZAAAABYAAABMAAAAAAAAAAAAAAAEAAAAAAAAAAEAAACAgIAKAAAAACgAAAAoAAAAZAAAAGQAAAAAAAAAzMzMAAAAAABQAAAAUAAAAGQAAABkAAAAAAAAABcAAAAUAAAAAAAAAAAAAAD/fwAA/38AAAAAAAAJAAAABAAAAAAAAAAMAAAAEAAAAAAAAAAAAAAAAAAAAAAAAAAeAAAAaAAAAAAAAAAAAAAAAAAAAAAAAAAAAAAAECcAABAnAAAAAAAAAAAAAAAAAAAAAAAAAAAAAAAAAAAAAAAAAAAAABQAAAAAAAAAwMD/AAAAAABkAAAAMgAAAAAAAABkAAAAAAAAAH9/fwAKAAAAHwAAAFQAAAAAAAAFAAAAAQAAAAAAAAAAAAAAAAAAAAAAAAAAAAAAAAAAAAAAAAAAAAAAAn9/fwAAAAADzMzMAMDA/wB/f38AAAAAAAAAAAAAAAAAAAAAAAAAAAAhAAAAGAAAABQAAADQAgAA2AkAAHA1AACwJQAAEAAAACYAAAAIAAAAAAAAAAAAAAA="/>
               </a:ext>
             </a:extLst>
           </p:cNvSpPr>
@@ -907,7 +900,7 @@
             <a:spLocks noGrp="1" noChangeArrowheads="1"/>
             <a:extLst>
               <a:ext uri="smNativeData">
-                <pr:smNativeData xmlns:pr="smNativeData" val="SMDATA_13_FAOrYBMAAAAlAAAAZAAAAA8BAAAAkAAAAEgAAACQAAAASAAAAAAAAAABAAAAAAAAAAEAAABQAAAAAAAAAAAA4D8AAAAAAADgPwAAAAAAAOA/AAAAAAAA4D8AAAAAAADgPwAAAAAAAOA/AAAAAAAA4D8AAAAAAADgPwAAAAAAAOA/AAAAAAAA4D8CAAAAjAAAAAAAAAAAAAAAu+DjDP///wgAAAAAAAAAAAAAAAAAAAAAAAAAAAAAAAAAAAAAZAAAAAEAAABAAAAAAAAAAAAAAAAAAAAAAAAAAAAAAAAAAAAAAAAAAAAAAAAAAAAAAAAAAAAAAAAAAAAAAAAAAAAAAAAAAAAAAAAAAAAAAAAAAAAAAAAAAAAAAAAAAAAAFAAAADwAAAAAAAAAAAAAAAAAAAkUAAAAAQAAABQAAAAUAAAAFAAAAAEAAAAAAAAAZAAAAGQAAAAAAAAAZAAAAGQAAAAVAAAAYAAAAAAAAAAAAAAADwAAACADAAAAAAAAAAAAAAEAAACgMgAAVgcAAKr4//8BAAAAf39/AAEAAABkAAAAAAAAABQAAABAHwAAAAAAACYAAAAAAAAAwOD//wAAAAAmAAAAZAAAABYAAABMAAAAAAAAAAAAAAAEAAAAAAAAAAEAAACAgIAKAAAAACgAAAAoAAAAZAAAAGQAAAAAAAAAzMzMAAAAAABQAAAAUAAAAGQAAABkAAAAAAAAABcAAAAUAAAAAAAAAAAAAAD/fwAA/38AAAAAAAAJAAAABAAAAHQAIAAMAAAAEAAAAAAAAAAAAAAAAAAAAAAAAAAeAAAAaAAAAAAAAAAAAAAAAAAAAAAAAAAAAAAAECcAABAnAAAAAAAAAAAAAAAAAAAAAAAAAAAAAAAAAAAAAAAAAAAAABQAAAAAAAAAwMD/AAAAAABkAAAAMgAAAAAAAABkAAAAAAAAAH9/fwAKAAAAHwAAAFQAAAAAAAAFAAAAAQAAAAAAAAAAAAAAAAAAAAAAAAAAAAAAAAAAAAAAAAAAAAAAAn9/fwAAAAADzMzMAMDA/wB/f38AAAAAAAAAAAAAAAAAAAAAAAAAAAAhAAAAGAAAABQAAADQAgAAGycAAPAPAABZKQAAAAAAACYAAAAIAAAAAAAAAAAAAAA="/>
+                <pr:smNativeData xmlns:pr="smNativeData" val="SMDATA_13_HjisYBMAAAAlAAAAZAAAAA8BAAAAkAAAAEgAAACQAAAASAAAAAAAAAABAAAAAAAAAAEAAABQAAAAAAAAAAAA4D8AAAAAAADgPwAAAAAAAOA/AAAAAAAA4D8AAAAAAADgPwAAAAAAAOA/AAAAAAAA4D8AAAAAAADgPwAAAAAAAOA/AAAAAAAA4D8CAAAAjAAAAAAAAAAAAAAAu+DjDP///wgAAAAAAAAAAAAAAAAAAAAAAAAAAAAAAAAAAAAAZAAAAAEAAABAAAAAAAAAAAAAAAAAAAAAAAAAAAAAAAAAAAAAAAAAAAAAAAAAAAAAAAAAAAAAAAAAAAAAAAAAAAAAAAAAAAAAAAAAAAAAAAAAAAAAAAAAAAAAAAAAAAAAFAAAADwAAAAAAAAAAAAAAAAAAAkUAAAAAQAAABQAAAAUAAAAFAAAAAEAAAAAAAAAZAAAAGQAAAAAAAAAZAAAAGQAAAAVAAAAYAAAAAAAAAAAAAAADwAAACADAAAAAAAAAAAAAAEAAACgMgAAVgcAAKr4//8BAAAAf39/AAEAAABkAAAAAAAAABQAAABAHwAAAAAAACYAAAAAAAAAwOD//wAAAAAmAAAAZAAAABYAAABMAAAAAAAAAAAAAAAEAAAAAAAAAAEAAACAgIAKAAAAACgAAAAoAAAAZAAAAGQAAAAAAAAAzMzMAAAAAABQAAAAUAAAAGQAAABkAAAAAAAAABcAAAAUAAAAAAAAAAAAAAD/fwAA/38AAAAAAAAJAAAABAAAAHQAIAAMAAAAEAAAAAAAAAAAAAAAAAAAAAAAAAAeAAAAaAAAAAAAAAAAAAAAAAAAAAAAAAAAAAAAECcAABAnAAAAAAAAAAAAAAAAAAAAAAAAAAAAAAAAAAAAAAAAAAAAABQAAAAAAAAAwMD/AAAAAABkAAAAMgAAAAAAAABkAAAAAAAAAH9/fwAKAAAAHwAAAFQAAAAAAAAFAAAAAQAAAAAAAAAAAAAAAAAAAAAAAAAAAAAAAAAAAAAAAAAAAAAAAn9/fwAAAAADzMzMAMDA/wB/f38AAAAAAAAAAAAAAAAAAAAAAAAAAAAhAAAAGAAAABQAAADQAgAAGycAAPAPAABZKQAAEAAAACYAAAAIAAAAAAAAAAAAAAA="/>
               </a:ext>
             </a:extLst>
           </p:cNvSpPr>
@@ -921,7 +914,7 @@
           <a:lstStyle/>
           <a:p>
             <a:pPr/>
-            <a:fld id="{2634275F-11CB-61D1-858C-E78469C273B2}" type="datetime1">
+            <a:fld id="{3F74E363-2DD2-2115-9CCC-DB40AD826A8E}" type="datetime1">
               <a:t/>
             </a:fld>
           </a:p>
@@ -934,7 +927,7 @@
             <a:spLocks noGrp="1" noChangeArrowheads="1"/>
             <a:extLst>
               <a:ext uri="smNativeData">
-                <pr:smNativeData xmlns:pr="smNativeData" val="SMDATA_13_FAOrYBMAAAAlAAAAZAAAAA8BAAAAkAAAAEgAAACQAAAASAAAAAAAAAABAAAAAAAAAAEAAABQAAAAAAAAAAAA4D8AAAAAAADgPwAAAAAAAOA/AAAAAAAA4D8AAAAAAADgPwAAAAAAAOA/AAAAAAAA4D8AAAAAAADgPwAAAAAAAOA/AAAAAAAA4D8CAAAAjAAAAAAAAAAAAAAAu+DjDP///wgAAAAAAAAAAAAAAAAAAAAAAAAAAAAAAAAAAAAAZAAAAAEAAABAAAAAAAAAAAAAAAAAAAAAAAAAAAAAAAAAAAAAAAAAAAAAAAAAAAAAAAAAAAAAAAAAAAAAAAAAAAAAAAAAAAAAAAAAAAAAAAAAAAAAAAAAAAAAAAAAAAAAFAAAADwAAAAAAAAAAAAAAAAAAAkUAAAAAQAAABQAAAAUAAAAFAAAAAEAAAAAAAAAZAAAAGQAAAAAAAAAZAAAAGQAAAAVAAAAYAAAAAAAAAAAAAAADwAAACADAAAAAAAAAAAAAAEAAACgMgAAVgcAAKr4//8BAAAAf39/AAEAAABkAAAAAAAAABQAAABAHwAAAAAAACYAAAAAAAAAwOD//wAAAAAmAAAAZAAAABYAAABMAAAAAAAAAAAAAAAEAAAAAAAAAAEAAACAgIAKAAAAACgAAAAoAAAAZAAAAGQAAAAAAAAAzMzMAAAAAABQAAAAUAAAAGQAAABkAAAAAAAAABcAAAAUAAAAAAAAAAAAAAD/fwAA/38AAAAAAAAJAAAABAAAAAAAAAAMAAAAEAAAAAAAAAAAAAAAAAAAAAAAAAAeAAAAaAAAAAAAAAAAAAAAAAAAAAAAAAAAAAAAECcAABAnAAAAAAAAAAAAAAAAAAAAAAAAAAAAAAAAAAAAAAAAAAAAABQAAAAAAAAAwMD/AAAAAABkAAAAMgAAAAAAAABkAAAAAAAAAH9/fwAKAAAAHwAAAFQAAAAAAAAFAAAAAQAAAAAAAAAAAAAAAAAAAAAAAAAAAAAAAAAAAAAAAAAAAAAAAn9/fwAAAAADzMzMAMDA/wB/f38AAAAAAAAAAAAAAAAAAAAAAAAAAAAhAAAAGAAAABQAAAA4EwAAGycAAAglAABZKQAAAAAAACYAAAAIAAAAAAAAAAAAAAA="/>
+                <pr:smNativeData xmlns:pr="smNativeData" val="SMDATA_13_HjisYBMAAAAlAAAAZAAAAA8BAAAAkAAAAEgAAACQAAAASAAAAAAAAAABAAAAAAAAAAEAAABQAAAAAAAAAAAA4D8AAAAAAADgPwAAAAAAAOA/AAAAAAAA4D8AAAAAAADgPwAAAAAAAOA/AAAAAAAA4D8AAAAAAADgPwAAAAAAAOA/AAAAAAAA4D8CAAAAjAAAAAAAAAAAAAAAu+DjDP///wgAAAAAAAAAAAAAAAAAAAAAAAAAAAAAAAAAAAAAZAAAAAEAAABAAAAAAAAAAAAAAAAAAAAAAAAAAAAAAAAAAAAAAAAAAAAAAAAAAAAAAAAAAAAAAAAAAAAAAAAAAAAAAAAAAAAAAAAAAAAAAAAAAAAAAAAAAAAAAAAAAAAAFAAAADwAAAAAAAAAAAAAAAAAAAkUAAAAAQAAABQAAAAUAAAAFAAAAAEAAAAAAAAAZAAAAGQAAAAAAAAAZAAAAGQAAAAVAAAAYAAAAAAAAAAAAAAADwAAACADAAAAAAAAAAAAAAEAAACgMgAAVgcAAKr4//8BAAAAf39/AAEAAABkAAAAAAAAABQAAABAHwAAAAAAACYAAAAAAAAAwOD//wAAAAAmAAAAZAAAABYAAABMAAAAAAAAAAAAAAAEAAAAAAAAAAEAAACAgIAKAAAAACgAAAAoAAAAZAAAAGQAAAAAAAAAzMzMAAAAAABQAAAAUAAAAGQAAABkAAAAAAAAABcAAAAUAAAAAAAAAAAAAAD/fwAA/38AAAAAAAAJAAAABAAAAAAAAAAMAAAAEAAAAAAAAAAAAAAAAAAAAAAAAAAeAAAAaAAAAAAAAAAAAAAAAAAAAAAAAAAAAAAAECcAABAnAAAAAAAAAAAAAAAAAAAAAAAAAAAAAAAAAAAAAAAAAAAAABQAAAAAAAAAwMD/AAAAAABkAAAAMgAAAAAAAABkAAAAAAAAAH9/fwAKAAAAHwAAAFQAAAAAAAAFAAAAAQAAAAAAAAAAAAAAAAAAAAAAAAAAAAAAAAAAAAAAAAAAAAAAAn9/fwAAAAADzMzMAMDA/wB/f38AAAAAAAAAAAAAAAAAAAAAAAAAAAAhAAAAGAAAABQAAAA4EwAAGycAAAglAABZKQAAEAAAACYAAAAIAAAAAAAAAAAAAAA="/>
               </a:ext>
             </a:extLst>
           </p:cNvSpPr>
@@ -948,9 +941,6 @@
           <a:lstStyle/>
           <a:p>
             <a:pPr/>
-            <a:r>
-              <a:t/>
-            </a:r>
           </a:p>
         </p:txBody>
       </p:sp>
@@ -961,7 +951,7 @@
             <a:spLocks noGrp="1" noChangeArrowheads="1"/>
             <a:extLst>
               <a:ext uri="smNativeData">
-                <pr:smNativeData xmlns:pr="smNativeData" val="SMDATA_13_FAOrYBMAAAAlAAAAZAAAAA8BAAAAkAAAAEgAAACQAAAASAAAAAAAAAABAAAAAAAAAAEAAABQAAAAAAAAAAAA4D8AAAAAAADgPwAAAAAAAOA/AAAAAAAA4D8AAAAAAADgPwAAAAAAAOA/AAAAAAAA4D8AAAAAAADgPwAAAAAAAOA/AAAAAAAA4D8CAAAAjAAAAAAAAAAAAAAAu+DjDP///wgAAAAAAAAAAAAAAAAAAAAAAAAAAAAAAAAAAAAAZAAAAAEAAABAAAAAAAAAAAAAAAAAAAAAAAAAAAAAAAAAAAAAAAAAAAAAAAAAAAAAAAAAAAAAAAAAAAAAAAAAAAAAAAAAAAAAAAAAAAAAAAAAAAAAAAAAAAAAAAAAAAAAFAAAADwAAAAAAAAAAAAAAAAAAAkUAAAAAQAAABQAAAAUAAAAFAAAAAEAAAAAAAAAZAAAAGQAAAAAAAAAZAAAAGQAAAAVAAAAYAAAAAAAAAAAAAAADwAAACADAAAAAAAAAAAAAAEAAACgMgAAVgcAAKr4//8BAAAAf39/AAEAAABkAAAAAAAAABQAAABAHwAAAAAAACYAAAAAAAAAwOD//wAAAAAmAAAAZAAAABYAAABMAAAAAAAAAAAAAAAEAAAAAAAAAAEAAACAgIAKAAAAACgAAAAoAAAAZAAAAGQAAAAAAAAAzMzMAAAAAABQAAAAUAAAAGQAAABkAAAAAAAAABcAAAAUAAAAAAAAAAAAAAD/fwAA/38AAAAAAAAJAAAABAAAAAAAAAAMAAAAEAAAAAAAAAAAAAAAAAAAAAAAAAAeAAAAaAAAAAAAAAAAAAAAAAAAAAAAAAAAAAAAECcAABAnAAAAAAAAAAAAAAAAAAAAAAAAAAAAAAAAAAAAAAAAAAAAABQAAAAAAAAAwMD/AAAAAABkAAAAMgAAAAAAAABkAAAAAAAAAH9/fwAKAAAAHwAAAFQAAAAAAAAFAAAAAQAAAAAAAAAAAAAAAAAAAAAAAAAAAAAAAAAAAAAAAAAAAAAAAn9/fwAAAAADzMzMAMDA/wB/f38AAAAAAAAAAAAAAAAAAAAAAAAAAAAhAAAAGAAAABQAAABQKAAAGycAAHA1AABZKQAAAAAAACYAAAAIAAAAAAAAAAAAAAA="/>
+                <pr:smNativeData xmlns:pr="smNativeData" val="SMDATA_13_HjisYBMAAAAlAAAAZAAAAA8BAAAAkAAAAEgAAACQAAAASAAAAAAAAAABAAAAAAAAAAEAAABQAAAAAAAAAAAA4D8AAAAAAADgPwAAAAAAAOA/AAAAAAAA4D8AAAAAAADgPwAAAAAAAOA/AAAAAAAA4D8AAAAAAADgPwAAAAAAAOA/AAAAAAAA4D8CAAAAjAAAAAAAAAAAAAAAu+DjDP///wgAAAAAAAAAAAAAAAAAAAAAAAAAAAAAAAAAAAAAZAAAAAEAAABAAAAAAAAAAAAAAAAAAAAAAAAAAAAAAAAAAAAAAAAAAAAAAAAAAAAAAAAAAAAAAAAAAAAAAAAAAAAAAAAAAAAAAAAAAAAAAAAAAAAAAAAAAAAAAAAAAAAAFAAAADwAAAAAAAAAAAAAAAAAAAkUAAAAAQAAABQAAAAUAAAAFAAAAAEAAAAAAAAAZAAAAGQAAAAAAAAAZAAAAGQAAAAVAAAAYAAAAAAAAAAAAAAADwAAACADAAAAAAAAAAAAAAEAAACgMgAAVgcAAKr4//8BAAAAf39/AAEAAABkAAAAAAAAABQAAABAHwAAAAAAACYAAAAAAAAAwOD//wAAAAAmAAAAZAAAABYAAABMAAAAAAAAAAAAAAAEAAAAAAAAAAEAAACAgIAKAAAAACgAAAAoAAAAZAAAAGQAAAAAAAAAzMzMAAAAAABQAAAAUAAAAGQAAABkAAAAAAAAABcAAAAUAAAAAAAAAAAAAAD/fwAA/38AAAAAAAAJAAAABAAAAAAAAAAMAAAAEAAAAAAAAAAAAAAAAAAAAAAAAAAeAAAAaAAAAAAAAAAAAAAAAAAAAAAAAAAAAAAAECcAABAnAAAAAAAAAAAAAAAAAAAAAAAAAAAAAAAAAAAAAAAAAAAAABQAAAAAAAAAwMD/AAAAAABkAAAAMgAAAAAAAABkAAAAAAAAAH9/fwAKAAAAHwAAAFQAAAAAAAAFAAAAAQAAAAAAAAAAAAAAAAAAAAAAAAAAAAAAAAAAAAAAAAAAAAAAAn9/fwAAAAADzMzMAMDA/wB/f38AAAAAAAAAAAAAAAAAAAAAAAAAAAAhAAAAGAAAABQAAABQKAAAGycAAHA1AABZKQAAEAAAACYAAAAIAAAAAAAAAAAAAAA="/>
               </a:ext>
             </a:extLst>
           </p:cNvSpPr>
@@ -975,7 +965,7 @@
           <a:lstStyle/>
           <a:p>
             <a:pPr/>
-            <a:fld id="{263437BB-F5CB-61C1-858C-039479C27356}" type="slidenum">
+            <a:fld id="{3F7491C9-87D2-2167-9CCC-7132DF826A24}" type="slidenum">
               <a:t/>
             </a:fld>
           </a:p>
@@ -1013,7 +1003,7 @@
             <a:spLocks noGrp="1" noChangeArrowheads="1"/>
             <a:extLst>
               <a:ext uri="smNativeData">
-                <pr:smNativeData xmlns:pr="smNativeData" val="SMDATA_13_FAOrYBMAAAAlAAAAZAAAAA8BAAAAkAAAAEgAAACQAAAASAAAAAAAAAAAAAAAAAAAAAEAAABQAAAAAAAAAAAA4D8AAAAAAADgPwAAAAAAAOA/AAAAAAAA4D8AAAAAAADgPwAAAAAAAOA/AAAAAAAA4D8AAAAAAADgPwAAAAAAAOA/AAAAAAAA4D8CAAAAjAAAAAAAAAAAAAAAu+DjDP///wgAAAAAAAAAAAAAAAAAAAAAAAAAAAAAAAAAAAAAZAAAAAEAAABAAAAAAAAAAAAAAAAAAAAAAAAAAAAAAAAAAAAAAAAAAAAAAAAAAAAAAAAAAAAAAAAAAAAAAAAAAAAAAAAAAAAAAAAAAAAAAAAAAAAAAAAAAAAAAAAAAAAAFAAAADwAAAAAAAAAAAAAAAAAAAkUAAAAAQAAABQAAAAUAAAAFAAAAAEAAAAAAAAAZAAAAGQAAAAAAAAAZAAAAGQAAAAVAAAAYAAAAAAAAAAAAAAADwAAACADAAAAAAAAAAAAAAEAAACgMgAAVgcAAKr4//8BAAAAf39/AAEAAABkAAAAAAAAABQAAABAHwAAAAAAACYAAAAAAAAAwOD//wAAAAAmAAAAZAAAABYAAABMAAAAAAAAAAAAAAAEAAAAAAAAAAEAAACAgIAKAAAAACgAAAAoAAAAZAAAAGQAAAAAAAAAzMzMAAAAAABQAAAAUAAAAGQAAABkAAAAAAAAABcAAAAUAAAAAAAAAAAAAAD/fwAA/38AAAAAAAAJAAAABAAAAAAAAAAMAAAAEAAAAAAAAAAAAAAAAAAAAAAAAAAeAAAAaAAAAAAAAAAAAAAAAAAAAAAAAAAAAAAAECcAABAnAAAAAAAAAAAAAAAAAAAAAAAAAAAAAAAAAAAAAAAAAAAAABQAAAAAAAAAwMD/AAAAAABkAAAAMgAAAAAAAABkAAAAAAAAAH9/fwAKAAAAHwAAAFQAAAAAAAAFAAAAAQAAAAAAAAAAAAAAAAAAAAAAAAAAAAAAAAAAAAAAAAAAAAAAAn9/fwAAAAADzMzMAMDA/wB/f38AAAAAAAAAAAAAAAAAAAAAAAAAAAAhAAAAGAAAABQAAAByBAAAHBsAAEI0AAB9IwAAAAAAACYAAAAIAAAAgYAAAAAAAAA="/>
+                <pr:smNativeData xmlns:pr="smNativeData" val="SMDATA_13_HjisYBMAAAAlAAAAZAAAAA8BAAAAkAAAAEgAAACQAAAASAAAAAAAAAAAAAAAAAAAAAEAAABQAAAAAAAAAAAA4D8AAAAAAADgPwAAAAAAAOA/AAAAAAAA4D8AAAAAAADgPwAAAAAAAOA/AAAAAAAA4D8AAAAAAADgPwAAAAAAAOA/AAAAAAAA4D8CAAAAjAAAAAAAAAAAAAAAu+DjDP///wgAAAAAAAAAAAAAAAAAAAAAAAAAAAAAAAAAAAAAZAAAAAEAAABAAAAAAAAAAAAAAAAAAAAAAAAAAAAAAAAAAAAAAAAAAAAAAAAAAAAAAAAAAAAAAAAAAAAAAAAAAAAAAAAAAAAAAAAAAAAAAAAAAAAAAAAAAAAAAAAAAAAAFAAAADwAAAAAAAAAAAAAAAAAAAkUAAAAAQAAABQAAAAUAAAAFAAAAAEAAAAAAAAAZAAAAGQAAAAAAAAAZAAAAGQAAAAVAAAAYAAAAAAAAAAAAAAADwAAACADAAAAAAAAAAAAAAEAAACgMgAAVgcAAKr4//8BAAAAf39/AAEAAABkAAAAAAAAABQAAABAHwAAAAAAACYAAAAAAAAAwOD//wAAAAAmAAAAZAAAABYAAABMAAAAAAAAAAAAAAAEAAAAAAAAAAEAAACAgIAKAAAAACgAAAAoAAAAZAAAAGQAAAAAAAAAzMzMAAAAAABQAAAAUAAAAGQAAABkAAAAAAAAABcAAAAUAAAAAAAAAAAAAAD/fwAA/38AAAAAAAAJAAAABAAAAAAAAAAMAAAAEAAAAAAAAAAAAAAAAAAAAAAAAAAeAAAAaAAAAAAAAAAAAAAAAAAAAAAAAAAAAAAAECcAABAnAAAAAAAAAAAAAAAAAAAAAAAAAAAAAAAAAAAAAAAAAAAAABQAAAAAAAAAwMD/AAAAAABkAAAAMgAAAAAAAABkAAAAAAAAAH9/fwAKAAAAHwAAAFQAAAAAAAAFAAAAAQAAAAAAAAAAAAAAAAAAAAAAAAAAAAAAAAAAAAAAAAAAAAAAAn9/fwAAAAADzMzMAMDA/wB/f38AAAAAAAAAAAAAAAAAAAAAAAAAAAAhAAAAGAAAABQAAAByBAAAHBsAAEI0AAB9IwAAEAAAACYAAAAIAAAAgYAAAAAAAAA="/>
               </a:ext>
             </a:extLst>
           </p:cNvSpPr>
@@ -1055,7 +1045,7 @@
             <a:spLocks noGrp="1" noChangeArrowheads="1"/>
             <a:extLst>
               <a:ext uri="smNativeData">
-                <pr:smNativeData xmlns:pr="smNativeData" val="SMDATA_13_FAOrYBMAAAAlAAAAZAAAAA8BAAAAkAAAAEgAAACQAAAASAAAAAAAAAACAAAAAAAAAAEAAABQAAAAAAAAAAAA4D8AAAAAAADgPwAAAAAAAOA/AAAAAAAA4D8AAAAAAADgPwAAAAAAAOA/AAAAAAAA4D8AAAAAAADgPwAAAAAAAOA/AAAAAAAA4D8CAAAAjAAAAAAAAAAAAAAAu+DjDP///wgAAAAAAAAAAAAAAAAAAAAAAAAAAAAAAAAAAAAAZAAAAAEAAABAAAAAAAAAAAAAAAAAAAAAAAAAAAAAAAAAAAAAAAAAAAAAAAAAAAAAAAAAAAAAAAAAAAAAAAAAAAAAAAAAAAAAAAAAAAAAAAAAAAAAAAAAAAAAAAAAAAAAFAAAADwAAAAAAAAAAAAAAAAAAAkUAAAAAQAAABQAAAAUAAAAFAAAAAEAAAAAAAAAZAAAAGQAAAAAAAAAZAAAAGQAAAAVAAAAYAAAAAAAAAAAAAAADwAAACADAAAAAAAAAAAAAAEAAACgMgAAVgcAAKr4//8BAAAAf39/AAEAAABkAAAAAAAAABQAAABAHwAAAAAAACYAAAAAAAAAwOD//wAAAAAmAAAAZAAAABYAAABMAAAAAAAAAAAAAAAEAAAAAAAAAAEAAACAgIAKAAAAACgAAAAoAAAAZAAAAGQAAAAAAAAAzMzMAAAAAABQAAAAUAAAAGQAAABkAAAAAAAAABcAAAAUAAAAAAAAAAAAAAD/fwAA/38AAAAAAAAJAAAABAAAAAAAAAAMAAAAEAAAAAAAAAAAAAAAAAAAAAAAAAAeAAAAaAAAAAAAAAAAAAAAAAAAAAAAAAAAAAAAECcAABAnAAAAAAAAAAAAAAAAAAAAAAAAAAAAAAAAAAAAAAAAAAAAABQAAAAAAAAAwMD/AAAAAABkAAAAMgAAAAAAAABkAAAAAAAAAH9/fwAKAAAAHwAAAFQAAAAAAAAFAAAAAQAAAAAAAAAAAAAAAAAAAAAAAAAAAAAAAAAAAAAAAAAAAAAAAn9/fwAAAAADzMzMAMDA/wB/f38AAAAAAAAAAAAAAAAAAAAAAAAAAAAhAAAAGAAAABQAAAByBAAA4REAAEI0AAAcGwAAAAAAACYAAAAIAAAAgYAAAAAAAAA="/>
+                <pr:smNativeData xmlns:pr="smNativeData" val="SMDATA_13_HjisYBMAAAAlAAAAZAAAAA8BAAAAkAAAAEgAAACQAAAASAAAAAAAAAACAAAAAAAAAAEAAABQAAAAAAAAAAAA4D8AAAAAAADgPwAAAAAAAOA/AAAAAAAA4D8AAAAAAADgPwAAAAAAAOA/AAAAAAAA4D8AAAAAAADgPwAAAAAAAOA/AAAAAAAA4D8CAAAAjAAAAAAAAAAAAAAAu+DjDP///wgAAAAAAAAAAAAAAAAAAAAAAAAAAAAAAAAAAAAAZAAAAAEAAABAAAAAAAAAAAAAAAAAAAAAAAAAAAAAAAAAAAAAAAAAAAAAAAAAAAAAAAAAAAAAAAAAAAAAAAAAAAAAAAAAAAAAAAAAAAAAAAAAAAAAAAAAAAAAAAAAAAAAFAAAADwAAAAAAAAAAAAAAAAAAAkUAAAAAQAAABQAAAAUAAAAFAAAAAEAAAAAAAAAZAAAAGQAAAAAAAAAZAAAAGQAAAAVAAAAYAAAAAAAAAAAAAAADwAAACADAAAAAAAAAAAAAAEAAACgMgAAVgcAAKr4//8BAAAAf39/AAEAAABkAAAAAAAAABQAAABAHwAAAAAAACYAAAAAAAAAwOD//wAAAAAmAAAAZAAAABYAAABMAAAAAAAAAAAAAAAEAAAAAAAAAAEAAACAgIAKAAAAACgAAAAoAAAAZAAAAGQAAAAAAAAAzMzMAAAAAABQAAAAUAAAAGQAAABkAAAAAAAAABcAAAAUAAAAAAAAAAAAAAD/fwAA/38AAAAAAAAJAAAABAAAAAAAAAAMAAAAEAAAAAAAAAAAAAAAAAAAAAAAAAAeAAAAaAAAAAAAAAAAAAAAAAAAAAAAAAAAAAAAECcAABAnAAAAAAAAAAAAAAAAAAAAAAAAAAAAAAAAAAAAAAAAAAAAABQAAAAAAAAAwMD/AAAAAABkAAAAMgAAAAAAAABkAAAAAAAAAH9/fwAKAAAAHwAAAFQAAAAAAAAFAAAAAQAAAAAAAAAAAAAAAAAAAAAAAAAAAAAAAAAAAAAAAAAAAAAAAn9/fwAAAAADzMzMAMDA/wB/f38AAAAAAAAAAAAAAAAAAAAAAAAAAAAhAAAAGAAAABQAAAByBAAA4REAAEI0AAAcGwAAEAAAACYAAAAIAAAAgYAAAAAAAAA="/>
               </a:ext>
             </a:extLst>
           </p:cNvSpPr>
@@ -1128,7 +1118,7 @@
             <a:spLocks noGrp="1" noChangeArrowheads="1"/>
             <a:extLst>
               <a:ext uri="smNativeData">
-                <pr:smNativeData xmlns:pr="smNativeData" val="SMDATA_13_FAOrYBMAAAAlAAAAZAAAAA8BAAAAkAAAAEgAAACQAAAASAAAAAAAAAABAAAAAAAAAAEAAABQAAAAAAAAAAAA4D8AAAAAAADgPwAAAAAAAOA/AAAAAAAA4D8AAAAAAADgPwAAAAAAAOA/AAAAAAAA4D8AAAAAAADgPwAAAAAAAOA/AAAAAAAA4D8CAAAAjAAAAAAAAAAAAAAAu+DjDP///wgAAAAAAAAAAAAAAAAAAAAAAAAAAAAAAAAAAAAAZAAAAAEAAABAAAAAAAAAAAAAAAAAAAAAAAAAAAAAAAAAAAAAAAAAAAAAAAAAAAAAAAAAAAAAAAAAAAAAAAAAAAAAAAAAAAAAAAAAAAAAAAAAAAAAAAAAAAAAAAAAAAAAFAAAADwAAAAAAAAAAAAAAAAAAAkUAAAAAQAAABQAAAAUAAAAFAAAAAEAAAAAAAAAZAAAAGQAAAAAAAAAZAAAAGQAAAAVAAAAYAAAAAAAAAAAAAAADwAAACADAAAAAAAAAAAAAAEAAACgMgAAVgcAAKr4//8BAAAAf39/AAEAAABkAAAAAAAAABQAAABAHwAAAAAAACYAAAAAAAAAwOD//wAAAAAmAAAAZAAAABYAAABMAAAAAAAAAAAAAAAEAAAAAAAAAAEAAACAgIAKAAAAACgAAAAoAAAAZAAAAGQAAAAAAAAAzMzMAAAAAABQAAAAUAAAAGQAAABkAAAAAAAAABcAAAAUAAAAAAAAAAAAAAD/fwAA/38AAAAAAAAJAAAABAAAAAAAAAAMAAAAEAAAAAAAAAAAAAAAAAAAAAAAAAAeAAAAaAAAAAAAAAAAAAAAAAAAAAAAAAAAAAAAECcAABAnAAAAAAAAAAAAAAAAAAAAAAAAAAAAAAAAAAAAAAAAAAAAABQAAAAAAAAAwMD/AAAAAABkAAAAMgAAAAAAAABkAAAAAAAAAH9/fwAKAAAAHwAAAFQAAAAAAAAFAAAAAQAAAAAAAAAAAAAAAAAAAAAAAAAAAAAAAAAAAAAAAAAAAAAAAn9/fwAAAAADzMzMAMDA/wB/f38AAAAAAAAAAAAAAAAAAAAAAAAAAAAhAAAAGAAAABQAAADQAgAAGycAAPAPAABZKQAAAAAAACYAAAAIAAAAAAAAAAAAAAA="/>
+                <pr:smNativeData xmlns:pr="smNativeData" val="SMDATA_13_HjisYBMAAAAlAAAAZAAAAA8BAAAAkAAAAEgAAACQAAAASAAAAAAAAAABAAAAAAAAAAEAAABQAAAAAAAAAAAA4D8AAAAAAADgPwAAAAAAAOA/AAAAAAAA4D8AAAAAAADgPwAAAAAAAOA/AAAAAAAA4D8AAAAAAADgPwAAAAAAAOA/AAAAAAAA4D8CAAAAjAAAAAAAAAAAAAAAu+DjDP///wgAAAAAAAAAAAAAAAAAAAAAAAAAAAAAAAAAAAAAZAAAAAEAAABAAAAAAAAAAAAAAAAAAAAAAAAAAAAAAAAAAAAAAAAAAAAAAAAAAAAAAAAAAAAAAAAAAAAAAAAAAAAAAAAAAAAAAAAAAAAAAAAAAAAAAAAAAAAAAAAAAAAAFAAAADwAAAAAAAAAAAAAAAAAAAkUAAAAAQAAABQAAAAUAAAAFAAAAAEAAAAAAAAAZAAAAGQAAAAAAAAAZAAAAGQAAAAVAAAAYAAAAAAAAAAAAAAADwAAACADAAAAAAAAAAAAAAEAAACgMgAAVgcAAKr4//8BAAAAf39/AAEAAABkAAAAAAAAABQAAABAHwAAAAAAACYAAAAAAAAAwOD//wAAAAAmAAAAZAAAABYAAABMAAAAAAAAAAAAAAAEAAAAAAAAAAEAAACAgIAKAAAAACgAAAAoAAAAZAAAAGQAAAAAAAAAzMzMAAAAAABQAAAAUAAAAGQAAABkAAAAAAAAABcAAAAUAAAAAAAAAAAAAAD/fwAA/38AAAAAAAAJAAAABAAAAAAAAAAMAAAAEAAAAAAAAAAAAAAAAAAAAAAAAAAeAAAAaAAAAAAAAAAAAAAAAAAAAAAAAAAAAAAAECcAABAnAAAAAAAAAAAAAAAAAAAAAAAAAAAAAAAAAAAAAAAAAAAAABQAAAAAAAAAwMD/AAAAAABkAAAAMgAAAAAAAABkAAAAAAAAAH9/fwAKAAAAHwAAAFQAAAAAAAAFAAAAAQAAAAAAAAAAAAAAAAAAAAAAAAAAAAAAAAAAAAAAAAAAAAAAAn9/fwAAAAADzMzMAMDA/wB/f38AAAAAAAAAAAAAAAAAAAAAAAAAAAAhAAAAGAAAABQAAADQAgAAGycAAPAPAABZKQAAEAAAACYAAAAIAAAAAAAAAAAAAAA="/>
               </a:ext>
             </a:extLst>
           </p:cNvSpPr>
@@ -1142,7 +1132,7 @@
           <a:lstStyle/>
           <a:p>
             <a:pPr/>
-            <a:fld id="{26341059-17CB-61E6-858C-E1B35EC273B4}" type="datetime1">
+            <a:fld id="{3F74B7C8-86D2-2141-9CCC-7014F9826A25}" type="datetime1">
               <a:t/>
             </a:fld>
           </a:p>
@@ -1155,7 +1145,7 @@
             <a:spLocks noGrp="1" noChangeArrowheads="1"/>
             <a:extLst>
               <a:ext uri="smNativeData">
-                <pr:smNativeData xmlns:pr="smNativeData" val="SMDATA_13_FAOrYBMAAAAlAAAAZAAAAA8BAAAAkAAAAEgAAACQAAAASAAAAAAAAAABAAAAAAAAAAEAAABQAAAAAAAAAAAA4D8AAAAAAADgPwAAAAAAAOA/AAAAAAAA4D8AAAAAAADgPwAAAAAAAOA/AAAAAAAA4D8AAAAAAADgPwAAAAAAAOA/AAAAAAAA4D8CAAAAjAAAAAAAAAAAAAAAu+DjDP///wgAAAAAAAAAAAAAAAAAAAAAAAAAAAAAAAAAAAAAZAAAAAEAAABAAAAAAAAAAAAAAAAAAAAAAAAAAAAAAAAAAAAAAAAAAAAAAAAAAAAAAAAAAAAAAAAAAAAAAAAAAAAAAAAAAAAAAAAAAAAAAAAAAAAAAAAAAAAAAAAAAAAAFAAAADwAAAAAAAAAAAAAAAAAAAkUAAAAAQAAABQAAAAUAAAAFAAAAAEAAAAAAAAAZAAAAGQAAAAAAAAAZAAAAGQAAAAVAAAAYAAAAAAAAAAAAAAADwAAACADAAAAAAAAAAAAAAEAAACgMgAAVgcAAKr4//8BAAAAf39/AAEAAABkAAAAAAAAABQAAABAHwAAAAAAACYAAAAAAAAAwOD//wAAAAAmAAAAZAAAABYAAABMAAAAAAAAAAAAAAAEAAAAAAAAAAEAAACAgIAKAAAAACgAAAAoAAAAZAAAAGQAAAAAAAAAzMzMAAAAAABQAAAAUAAAAGQAAABkAAAAAAAAABcAAAAUAAAAAAAAAAAAAAD/fwAA/38AAAAAAAAJAAAABAAAAGKZAwAMAAAAEAAAAAAAAAAAAAAAAAAAAAAAAAAeAAAAaAAAAAAAAAAAAAAAAAAAAAAAAAAAAAAAECcAABAnAAAAAAAAAAAAAAAAAAAAAAAAAAAAAAAAAAAAAAAAAAAAABQAAAAAAAAAwMD/AAAAAABkAAAAMgAAAAAAAABkAAAAAAAAAH9/fwAKAAAAHwAAAFQAAAAAAAAFAAAAAQAAAAAAAAAAAAAAAAAAAAAAAAAAAAAAAAAAAAAAAAAAAAAAAn9/fwAAAAADzMzMAMDA/wB/f38AAAAAAAAAAAAAAAAAAAAAAAAAAAAhAAAAGAAAABQAAAA4EwAAGycAAAglAABZKQAAAAAAACYAAAAIAAAAAAAAAAAAAAA="/>
+                <pr:smNativeData xmlns:pr="smNativeData" val="SMDATA_13_HjisYBMAAAAlAAAAZAAAAA8BAAAAkAAAAEgAAACQAAAASAAAAAAAAAABAAAAAAAAAAEAAABQAAAAAAAAAAAA4D8AAAAAAADgPwAAAAAAAOA/AAAAAAAA4D8AAAAAAADgPwAAAAAAAOA/AAAAAAAA4D8AAAAAAADgPwAAAAAAAOA/AAAAAAAA4D8CAAAAjAAAAAAAAAAAAAAAu+DjDP///wgAAAAAAAAAAAAAAAAAAAAAAAAAAAAAAAAAAAAAZAAAAAEAAABAAAAAAAAAAAAAAAAAAAAAAAAAAAAAAAAAAAAAAAAAAAAAAAAAAAAAAAAAAAAAAAAAAAAAAAAAAAAAAAAAAAAAAAAAAAAAAAAAAAAAAAAAAAAAAAAAAAAAFAAAADwAAAAAAAAAAAAAAAAAAAkUAAAAAQAAABQAAAAUAAAAFAAAAAEAAAAAAAAAZAAAAGQAAAAAAAAAZAAAAGQAAAAVAAAAYAAAAAAAAAAAAAAADwAAACADAAAAAAAAAAAAAAEAAACgMgAAVgcAAKr4//8BAAAAf39/AAEAAABkAAAAAAAAABQAAABAHwAAAAAAACYAAAAAAAAAwOD//wAAAAAmAAAAZAAAABYAAABMAAAAAAAAAAAAAAAEAAAAAAAAAAEAAACAgIAKAAAAACgAAAAoAAAAZAAAAGQAAAAAAAAAzMzMAAAAAABQAAAAUAAAAGQAAABkAAAAAAAAABcAAAAUAAAAAAAAAAAAAAD/fwAA/38AAAAAAAAJAAAABAAAAGKZAwAMAAAAEAAAAAAAAAAAAAAAAAAAAAAAAAAeAAAAaAAAAAAAAAAAAAAAAAAAAAAAAAAAAAAAECcAABAnAAAAAAAAAAAAAAAAAAAAAAAAAAAAAAAAAAAAAAAAAAAAABQAAAAAAAAAwMD/AAAAAABkAAAAMgAAAAAAAABkAAAAAAAAAH9/fwAKAAAAHwAAAFQAAAAAAAAFAAAAAQAAAAAAAAAAAAAAAAAAAAAAAAAAAAAAAAAAAAAAAAAAAAAAAn9/fwAAAAADzMzMAMDA/wB/f38AAAAAAAAAAAAAAAAAAAAAAAAAAAAhAAAAGAAAABQAAAA4EwAAGycAAAglAABZKQAAEAAAACYAAAAIAAAAAAAAAAAAAAA="/>
               </a:ext>
             </a:extLst>
           </p:cNvSpPr>
@@ -1169,9 +1159,6 @@
           <a:lstStyle/>
           <a:p>
             <a:pPr/>
-            <a:r>
-              <a:t/>
-            </a:r>
           </a:p>
         </p:txBody>
       </p:sp>
@@ -1182,7 +1169,7 @@
             <a:spLocks noGrp="1" noChangeArrowheads="1"/>
             <a:extLst>
               <a:ext uri="smNativeData">
-                <pr:smNativeData xmlns:pr="smNativeData" val="SMDATA_13_FAOrYBMAAAAlAAAAZAAAAA8BAAAAkAAAAEgAAACQAAAASAAAAAAAAAABAAAAAAAAAAEAAABQAAAAAAAAAAAA4D8AAAAAAADgPwAAAAAAAOA/AAAAAAAA4D8AAAAAAADgPwAAAAAAAOA/AAAAAAAA4D8AAAAAAADgPwAAAAAAAOA/AAAAAAAA4D8CAAAAjAAAAAAAAAAAAAAAu+DjDP///wgAAAAAAAAAAAAAAAAAAAAAAAAAAAAAAAAAAAAAZAAAAAEAAABAAAAAAAAAAAAAAAAAAAAAAAAAAAAAAAAAAAAAAAAAAAAAAAAAAAAAAAAAAAAAAAAAAAAAAAAAAAAAAAAAAAAAAAAAAAAAAAAAAAAAAAAAAAAAAAAAAAAAFAAAADwAAAAAAAAAAAAAAAAAAAkUAAAAAQAAABQAAAAUAAAAFAAAAAEAAAAAAAAAZAAAAGQAAAAAAAAAZAAAAGQAAAAVAAAAYAAAAAAAAAAAAAAADwAAACADAAAAAAAAAAAAAAEAAACgMgAAVgcAAKr4//8BAAAAf39/AAEAAABkAAAAAAAAABQAAABAHwAAAAAAACYAAAAAAAAAwOD//wAAAAAmAAAAZAAAABYAAABMAAAAAAAAAAAAAAAEAAAAAAAAAAEAAACAgIAKAAAAACgAAAAoAAAAZAAAAGQAAAAAAAAAzMzMAAAAAABQAAAAUAAAAGQAAABkAAAAAAAAABcAAAAUAAAAAAAAAAAAAAD/fwAA/38AAAAAAAAJAAAABAAAAAMAhj4MAAAAEAAAAAAAAAAAAAAAAAAAAAAAAAAeAAAAaAAAAAAAAAAAAAAAAAAAAAAAAAAAAAAAECcAABAnAAAAAAAAAAAAAAAAAAAAAAAAAAAAAAAAAAAAAAAAAAAAABQAAAAAAAAAwMD/AAAAAABkAAAAMgAAAAAAAABkAAAAAAAAAH9/fwAKAAAAHwAAAFQAAAAAAAAFAAAAAQAAAAAAAAAAAAAAAAAAAAAAAAAAAAAAAAAAAAAAAAAAAAAAAn9/fwAAAAADzMzMAMDA/wB/f38AAAAAAAAAAAAAAAAAAAAAAAAAAAAhAAAAGAAAABQAAABQKAAAGycAAHA1AABZKQAAAAAAACYAAAAIAAAAAAAAAAAAAAA="/>
+                <pr:smNativeData xmlns:pr="smNativeData" val="SMDATA_13_HjisYBMAAAAlAAAAZAAAAA8BAAAAkAAAAEgAAACQAAAASAAAAAAAAAABAAAAAAAAAAEAAABQAAAAAAAAAAAA4D8AAAAAAADgPwAAAAAAAOA/AAAAAAAA4D8AAAAAAADgPwAAAAAAAOA/AAAAAAAA4D8AAAAAAADgPwAAAAAAAOA/AAAAAAAA4D8CAAAAjAAAAAAAAAAAAAAAu+DjDP///wgAAAAAAAAAAAAAAAAAAAAAAAAAAAAAAAAAAAAAZAAAAAEAAABAAAAAAAAAAAAAAAAAAAAAAAAAAAAAAAAAAAAAAAAAAAAAAAAAAAAAAAAAAAAAAAAAAAAAAAAAAAAAAAAAAAAAAAAAAAAAAAAAAAAAAAAAAAAAAAAAAAAAFAAAADwAAAAAAAAAAAAAAAAAAAkUAAAAAQAAABQAAAAUAAAAFAAAAAEAAAAAAAAAZAAAAGQAAAAAAAAAZAAAAGQAAAAVAAAAYAAAAAAAAAAAAAAADwAAACADAAAAAAAAAAAAAAEAAACgMgAAVgcAAKr4//8BAAAAf39/AAEAAABkAAAAAAAAABQAAABAHwAAAAAAACYAAAAAAAAAwOD//wAAAAAmAAAAZAAAABYAAABMAAAAAAAAAAAAAAAEAAAAAAAAAAEAAACAgIAKAAAAACgAAAAoAAAAZAAAAGQAAAAAAAAAzMzMAAAAAABQAAAAUAAAAGQAAABkAAAAAAAAABcAAAAUAAAAAAAAAAAAAAD/fwAA/38AAAAAAAAJAAAABAAAAAMAhj4MAAAAEAAAAAAAAAAAAAAAAAAAAAAAAAAeAAAAaAAAAAAAAAAAAAAAAAAAAAAAAAAAAAAAECcAABAnAAAAAAAAAAAAAAAAAAAAAAAAAAAAAAAAAAAAAAAAAAAAABQAAAAAAAAAwMD/AAAAAABkAAAAMgAAAAAAAABkAAAAAAAAAH9/fwAKAAAAHwAAAFQAAAAAAAAFAAAAAQAAAAAAAAAAAAAAAAAAAAAAAAAAAAAAAAAAAAAAAAAAAAAAAn9/fwAAAAADzMzMAMDA/wB/f38AAAAAAAAAAAAAAAAAAAAAAAAAAAAhAAAAGAAAABQAAABQKAAAGycAAHA1AABZKQAAEAAAACYAAAAIAAAAAAAAAAAAAAA="/>
               </a:ext>
             </a:extLst>
           </p:cNvSpPr>
@@ -1196,7 +1183,7 @@
           <a:lstStyle/>
           <a:p>
             <a:pPr/>
-            <a:fld id="{26345692-DCCB-61A0-858C-2AF518C2737F}" type="slidenum">
+            <a:fld id="{3F74D0C7-89D2-2126-9CCC-7F739E826A2A}" type="slidenum">
               <a:t/>
             </a:fld>
           </a:p>
@@ -1234,7 +1221,7 @@
             <a:spLocks noGrp="1" noChangeArrowheads="1"/>
             <a:extLst>
               <a:ext uri="smNativeData">
-                <pr:smNativeData xmlns:pr="smNativeData" val="SMDATA_13_FAOrYBMAAAAlAAAAZAAAAA8BAAAAkAAAAEgAAACQAAAASAAAAAAAAAABAAAAAAAAAAEAAABQAAAAAAAAAAAA4D8AAAAAAADgPwAAAAAAAOA/AAAAAAAA4D8AAAAAAADgPwAAAAAAAOA/AAAAAAAA4D8AAAAAAADgPwAAAAAAAOA/AAAAAAAA4D8CAAAAjAAAAAAAAAAAAAAAu+DjDP///wgAAAAAAAAAAAAAAAAAAAAAAAAAAAAAAAAAAAAAZAAAAAEAAABAAAAAAAAAAAAAAAAAAAAAAAAAAAAAAAAAAAAAAAAAAAAAAAAAAAAAAAAAAAAAAAAAAAAAAAAAAAAAAAAAAAAAAAAAAAAAAAAAAAAAAAAAAAAAAAAAAAAAFAAAADwAAAAAAAAAAAAAAAAAAAkUAAAAAQAAABQAAAAUAAAAFAAAAAEAAAAAAAAAZAAAAGQAAAAAAAAAZAAAAGQAAAAVAAAAYAAAAAAAAAAAAAAADwAAACADAAAAAAAAAAAAAAEAAACgMgAAVgcAAKr4//8BAAAAf39/AAEAAABkAAAAAAAAABQAAABAHwAAAAAAACYAAAAAAAAAwOD//wAAAAAmAAAAZAAAABYAAABMAAAAAAAAAAAAAAAEAAAAAAAAAAEAAACAgIAKAAAAACgAAAAoAAAAZAAAAGQAAAAAAAAAzMzMAAAAAABQAAAAUAAAAGQAAABkAAAAAAAAABcAAAAUAAAAAAAAAAAAAAD/fwAA/38AAAAAAAAJAAAABAAAAPBCT4sMAAAAEAAAAAAAAAAAAAAAAAAAAAAAAAAeAAAAaAAAAAAAAAAAAAAAAAAAAAAAAAAAAAAAECcAABAnAAAAAAAAAAAAAAAAAAAAAAAAAAAAAAAAAAAAAAAAAAAAABQAAAAAAAAAwMD/AAAAAABkAAAAMgAAAAAAAABkAAAAAAAAAH9/fwAKAAAAHwAAAFQAAAAAAAAFAAAAAQAAAAAAAAAAAAAAAAAAAAAAAAAAAAAAAAAAAAAAAAAAAAAAAn9/fwAAAAADzMzMAMDA/wB/f38AAAAAAAAAAAAAAAAAAAAAAAAAAAAhAAAAGAAAABQAAADQAgAAsAEAAHA1AAC4CAAAAAAAACYAAAAIAAAAAAAAAAAAAAA="/>
+                <pr:smNativeData xmlns:pr="smNativeData" val="SMDATA_13_HjisYBMAAAAlAAAAZAAAAA8BAAAAkAAAAEgAAACQAAAASAAAAAAAAAABAAAAAAAAAAEAAABQAAAAAAAAAAAA4D8AAAAAAADgPwAAAAAAAOA/AAAAAAAA4D8AAAAAAADgPwAAAAAAAOA/AAAAAAAA4D8AAAAAAADgPwAAAAAAAOA/AAAAAAAA4D8CAAAAjAAAAAAAAAAAAAAAu+DjDP///wgAAAAAAAAAAAAAAAAAAAAAAAAAAAAAAAAAAAAAZAAAAAEAAABAAAAAAAAAAAAAAAAAAAAAAAAAAAAAAAAAAAAAAAAAAAAAAAAAAAAAAAAAAAAAAAAAAAAAAAAAAAAAAAAAAAAAAAAAAAAAAAAAAAAAAAAAAAAAAAAAAAAAFAAAADwAAAAAAAAAAAAAAAAAAAkUAAAAAQAAABQAAAAUAAAAFAAAAAEAAAAAAAAAZAAAAGQAAAAAAAAAZAAAAGQAAAAVAAAAYAAAAAAAAAAAAAAADwAAACADAAAAAAAAAAAAAAEAAACgMgAAVgcAAKr4//8BAAAAf39/AAEAAABkAAAAAAAAABQAAABAHwAAAAAAACYAAAAAAAAAwOD//wAAAAAmAAAAZAAAABYAAABMAAAAAAAAAAAAAAAEAAAAAAAAAAEAAACAgIAKAAAAACgAAAAoAAAAZAAAAGQAAAAAAAAAzMzMAAAAAABQAAAAUAAAAGQAAABkAAAAAAAAABcAAAAUAAAAAAAAAAAAAAD/fwAA/38AAAAAAAAJAAAABAAAAPBCT4sMAAAAEAAAAAAAAAAAAAAAAAAAAAAAAAAeAAAAaAAAAAAAAAAAAAAAAAAAAAAAAAAAAAAAECcAABAnAAAAAAAAAAAAAAAAAAAAAAAAAAAAAAAAAAAAAAAAAAAAABQAAAAAAAAAwMD/AAAAAABkAAAAMgAAAAAAAABkAAAAAAAAAH9/fwAKAAAAHwAAAFQAAAAAAAAFAAAAAQAAAAAAAAAAAAAAAAAAAAAAAAAAAAAAAAAAAAAAAAAAAAAAAn9/fwAAAAADzMzMAMDA/wB/f38AAAAAAAAAAAAAAAAAAAAAAAAAAAAhAAAAGAAAABQAAADQAgAAsAEAAHA1AAC4CAAAEAAAACYAAAAIAAAAAAAAAAAAAAA="/>
               </a:ext>
             </a:extLst>
           </p:cNvSpPr>
@@ -1261,12 +1248,12 @@
             <a:spLocks noGrp="1" noChangeArrowheads="1"/>
             <a:extLst>
               <a:ext uri="smNativeData">
-                <pr:smNativeData xmlns:pr="smNativeData" val="SMDATA_13_FAOrYBMAAAAlAAAAZAAAAA8BAAAAkAAAAEgAAACQAAAASAAAAAAAAAAAAAAAAAAAAAEAAABQAAAAAAAAAAAA4D8AAAAAAADgPwAAAAAAAOA/AAAAAAAA4D8AAAAAAADgPwAAAAAAAOA/AAAAAAAA4D8AAAAAAADgPwAAAAAAAOA/AAAAAAAA4D8CAAAAjAAAAAAAAAAAAAAAu+DjDP///wgAAAAAAAAAAAAAAAAAAAAAAAAAAAAAAAAAAAAAZAAAAAEAAABAAAAAAAAAAAAAAAAAAAAAAAAAAAAAAAAAAAAAAAAAAAAAAAAAAAAAAAAAAAAAAAAAAAAAAAAAAAAAAAAAAAAAAAAAAAAAAAAAAAAAAAAAAAAAAAAAAAAAFAAAADwAAAAAAAAAAAAAAAAAAAkUAAAAAQAAABQAAAAUAAAAFAAAAAEAAAAAAAAAZAAAAGQAAAAAAAAAZAAAAGQAAAAVAAAAYAAAAAAAAAAAAAAADwAAACADAAAAAAAAAAAAAAEAAACgMgAAVgcAAKr4//8BAAAAf39/AAEAAABkAAAAAAAAABQAAABAHwAAAAAAACYAAAAAAAAAwOD//wAAAAAmAAAAZAAAABYAAABMAAAAAAAAAAAAAAAEAAAAAAAAAAEAAACAgIAKAAAAACgAAAAoAAAAZAAAAGQAAAAAAAAAzMzMAAAAAABQAAAAUAAAAGQAAABkAAAAAAAAABcAAAAUAAAAAAAAAAAAAAD/fwAA/38AAAAAAAAJAAAABAAAAOJ+AwAMAAAAEAAAAAAAAAAAAAAAAAAAAAAAAAAeAAAAaAAAAAAAAAAAAAAAAAAAAAAAAAAAAAAAECcAABAnAAAAAAAAAAAAAAAAAAAAAAAAAAAAAAAAAAAAAAAAAAAAABQAAAAAAAAAwMD/AAAAAABkAAAAMgAAAAAAAABkAAAAAAAAAH9/fwAKAAAAHwAAAFQAAAAAAAAFAAAAAQAAAAAAAAAAAAAAAAAAAAAAAAAAAAAAAAAAAAAAAAAAAAAAAn9/fwAAAAADzMzMAMDA/wB/f38AAAAAAAAAAAAAAAAAAAAAAAAAAAAhAAAAGAAAABQAAADQAgAA2AkAAKgbAACwJQAAAAAAACYAAAAIAAAAAYAAAAAAAAA="/>
-              </a:ext>
-            </a:extLst>
-          </p:cNvSpPr>
-          <p:nvPr>
-            <p:ph sz="half" idx="1"/>
+                <pr:smNativeData xmlns:pr="smNativeData" val="SMDATA_13_HjisYBMAAAAlAAAAZAAAAA8BAAAAkAAAAEgAAACQAAAASAAAAAAAAAAAAAAAAAAAAAEAAABQAAAAAAAAAAAA4D8AAAAAAADgPwAAAAAAAOA/AAAAAAAA4D8AAAAAAADgPwAAAAAAAOA/AAAAAAAA4D8AAAAAAADgPwAAAAAAAOA/AAAAAAAA4D8CAAAAjAAAAAAAAAAAAAAAu+DjDP///wgAAAAAAAAAAAAAAAAAAAAAAAAAAAAAAAAAAAAAZAAAAAEAAABAAAAAAAAAAAAAAAAAAAAAAAAAAAAAAAAAAAAAAAAAAAAAAAAAAAAAAAAAAAAAAAAAAAAAAAAAAAAAAAAAAAAAAAAAAAAAAAAAAAAAAAAAAAAAAAAAAAAAFAAAADwAAAAAAAAAAAAAAAAAAAkUAAAAAQAAABQAAAAUAAAAFAAAAAEAAAAAAAAAZAAAAGQAAAAAAAAAZAAAAGQAAAAVAAAAYAAAAAAAAAAAAAAADwAAACADAAAAAAAAAAAAAAEAAACgMgAAVgcAAKr4//8BAAAAf39/AAEAAABkAAAAAAAAABQAAABAHwAAAAAAACYAAAAAAAAAwOD//wAAAAAmAAAAZAAAABYAAABMAAAAAAAAAAAAAAAEAAAAAAAAAAEAAACAgIAKAAAAACgAAAAoAAAAZAAAAGQAAAAAAAAAzMzMAAAAAABQAAAAUAAAAGQAAABkAAAAAAAAABcAAAAUAAAAAAAAAAAAAAD/fwAA/38AAAAAAAAJAAAABAAAAOJ+AwAMAAAAEAAAAAAAAAAAAAAAAAAAAAAAAAAeAAAAaAAAAAAAAAAAAAAAAAAAAAAAAAAAAAAAECcAABAnAAAAAAAAAAAAAAAAAAAAAAAAAAAAAAAAAAAAAAAAAAAAABQAAAAAAAAAwMD/AAAAAABkAAAAMgAAAAAAAABkAAAAAAAAAH9/fwAKAAAAHwAAAFQAAAAAAAAFAAAAAQAAAAAAAAAAAAAAAAAAAAAAAAAAAAAAAAAAAAAAAAAAAAAAAn9/fwAAAAADzMzMAMDA/wB/f38AAAAAAAAAAAAAAAAAAAAAAAAAAAAhAAAAGAAAABQAAADQAgAA2AkAAKgbAACwJQAAEAAAACYAAAAIAAAAAYAAAAAAAAA="/>
+              </a:ext>
+            </a:extLst>
+          </p:cNvSpPr>
+          <p:nvPr>
+            <p:ph idx="1"/>
           </p:nvPr>
         </p:nvSpPr>
         <p:spPr>
@@ -1345,12 +1332,12 @@
             <a:spLocks noGrp="1" noChangeArrowheads="1"/>
             <a:extLst>
               <a:ext uri="smNativeData">
-                <pr:smNativeData xmlns:pr="smNativeData" val="SMDATA_13_FAOrYBMAAAAlAAAAZAAAAA8BAAAAkAAAAEgAAACQAAAASAAAAAAAAAAAAAAAAAAAAAEAAABQAAAAAAAAAAAA4D8AAAAAAADgPwAAAAAAAOA/AAAAAAAA4D8AAAAAAADgPwAAAAAAAOA/AAAAAAAA4D8AAAAAAADgPwAAAAAAAOA/AAAAAAAA4D8CAAAAjAAAAAAAAAAAAAAAu+DjDP///wgAAAAAAAAAAAAAAAAAAAAAAAAAAAAAAAAAAAAAZAAAAAEAAABAAAAAAAAAAAAAAAAAAAAAAAAAAAAAAAAAAAAAAAAAAAAAAAAAAAAAAAAAAAAAAAAAAAAAAAAAAAAAAAAAAAAAAAAAAAAAAAAAAAAAAAAAAAAAAAAAAAAAFAAAADwAAAAAAAAAAAAAAAAAAAkUAAAAAQAAABQAAAAUAAAAFAAAAAEAAAAAAAAAZAAAAGQAAAAAAAAAZAAAAGQAAAAVAAAAYAAAAAAAAAAAAAAADwAAACADAAAAAAAAAAAAAAEAAACgMgAAVgcAAKr4//8BAAAAf39/AAEAAABkAAAAAAAAABQAAABAHwAAAAAAACYAAAAAAAAAwOD//wAAAAAmAAAAZAAAABYAAABMAAAAAAAAAAAAAAAEAAAAAAAAAAEAAACAgIAKAAAAACgAAAAoAAAAZAAAAGQAAAAAAAAAzMzMAAAAAABQAAAAUAAAAGQAAABkAAAAAAAAABcAAAAUAAAAAAAAAAAAAAD/fwAA/38AAAAAAAAJAAAABAAAAAMAbkEMAAAAEAAAAAAAAAAAAAAAAAAAAAAAAAAeAAAAaAAAAAAAAAAAAAAAAAAAAAAAAAAAAAAAECcAABAnAAAAAAAAAAAAAAAAAAAAAAAAAAAAAAAAAAAAAAAAAAAAABQAAAAAAAAAwMD/AAAAAABkAAAAMgAAAAAAAABkAAAAAAAAAH9/fwAKAAAAHwAAAFQAAAAAAAAFAAAAAQAAAAAAAAAAAAAAAAAAAAAAAAAAAAAAAAAAAAAAAAAAAAAAAn9/fwAAAAADzMzMAMDA/wB/f38AAAAAAAAAAAAAAAAAAAAAAAAAAAAhAAAAGAAAABQAAACYHAAA2AkAAHA1AACwJQAAAAAAACYAAAAIAAAAAYAAAAAAAAA="/>
-              </a:ext>
-            </a:extLst>
-          </p:cNvSpPr>
-          <p:nvPr>
-            <p:ph sz="half" idx="2"/>
+                <pr:smNativeData xmlns:pr="smNativeData" val="SMDATA_13_HjisYBMAAAAlAAAAZAAAAA8BAAAAkAAAAEgAAACQAAAASAAAAAAAAAAAAAAAAAAAAAEAAABQAAAAAAAAAAAA4D8AAAAAAADgPwAAAAAAAOA/AAAAAAAA4D8AAAAAAADgPwAAAAAAAOA/AAAAAAAA4D8AAAAAAADgPwAAAAAAAOA/AAAAAAAA4D8CAAAAjAAAAAAAAAAAAAAAu+DjDP///wgAAAAAAAAAAAAAAAAAAAAAAAAAAAAAAAAAAAAAZAAAAAEAAABAAAAAAAAAAAAAAAAAAAAAAAAAAAAAAAAAAAAAAAAAAAAAAAAAAAAAAAAAAAAAAAAAAAAAAAAAAAAAAAAAAAAAAAAAAAAAAAAAAAAAAAAAAAAAAAAAAAAAFAAAADwAAAAAAAAAAAAAAAAAAAkUAAAAAQAAABQAAAAUAAAAFAAAAAEAAAAAAAAAZAAAAGQAAAAAAAAAZAAAAGQAAAAVAAAAYAAAAAAAAAAAAAAADwAAACADAAAAAAAAAAAAAAEAAACgMgAAVgcAAKr4//8BAAAAf39/AAEAAABkAAAAAAAAABQAAABAHwAAAAAAACYAAAAAAAAAwOD//wAAAAAmAAAAZAAAABYAAABMAAAAAAAAAAAAAAAEAAAAAAAAAAEAAACAgIAKAAAAACgAAAAoAAAAZAAAAGQAAAAAAAAAzMzMAAAAAABQAAAAUAAAAGQAAABkAAAAAAAAABcAAAAUAAAAAAAAAAAAAAD/fwAA/38AAAAAAAAJAAAABAAAAAMAbkEMAAAAEAAAAAAAAAAAAAAAAAAAAAAAAAAeAAAAaAAAAAAAAAAAAAAAAAAAAAAAAAAAAAAAECcAABAnAAAAAAAAAAAAAAAAAAAAAAAAAAAAAAAAAAAAAAAAAAAAABQAAAAAAAAAwMD/AAAAAABkAAAAMgAAAAAAAABkAAAAAAAAAH9/fwAKAAAAHwAAAFQAAAAAAAAFAAAAAQAAAAAAAAAAAAAAAAAAAAAAAAAAAAAAAAAAAAAAAAAAAAAAAn9/fwAAAAADzMzMAMDA/wB/f38AAAAAAAAAAAAAAAAAAAAAAAAAAAAhAAAAGAAAABQAAACYHAAA2AkAAHA1AACwJQAAEAAAACYAAAAIAAAAAYAAAAAAAAA="/>
+              </a:ext>
+            </a:extLst>
+          </p:cNvSpPr>
+          <p:nvPr>
+            <p:ph idx="2"/>
           </p:nvPr>
         </p:nvSpPr>
         <p:spPr>
@@ -1429,7 +1416,7 @@
             <a:spLocks noGrp="1" noChangeArrowheads="1"/>
             <a:extLst>
               <a:ext uri="smNativeData">
-                <pr:smNativeData xmlns:pr="smNativeData" val="SMDATA_13_FAOrYBMAAAAlAAAAZAAAAA8BAAAAkAAAAEgAAACQAAAASAAAAAAAAAABAAAAAAAAAAEAAABQAAAAAAAAAAAA4D8AAAAAAADgPwAAAAAAAOA/AAAAAAAA4D8AAAAAAADgPwAAAAAAAOA/AAAAAAAA4D8AAAAAAADgPwAAAAAAAOA/AAAAAAAA4D8CAAAAjAAAAAAAAAAAAAAAu+DjDP///wgAAAAAAAAAAAAAAAAAAAAAAAAAAAAAAAAAAAAAZAAAAAEAAABAAAAAAAAAAAAAAAAAAAAAAAAAAAAAAAAAAAAAAAAAAAAAAAAAAAAAAAAAAAAAAAAAAAAAAAAAAAAAAAAAAAAAAAAAAAAAAAAAAAAAAAAAAAAAAAAAAAAAFAAAADwAAAAAAAAAAAAAAAAAAAkUAAAAAQAAABQAAAAUAAAAFAAAAAEAAAAAAAAAZAAAAGQAAAAAAAAAZAAAAGQAAAAVAAAAYAAAAAAAAAAAAAAADwAAACADAAAAAAAAAAAAAAEAAACgMgAAVgcAAKr4//8BAAAAf39/AAEAAABkAAAAAAAAABQAAABAHwAAAAAAACYAAAAAAAAAwOD//wAAAAAmAAAAZAAAABYAAABMAAAAAAAAAAAAAAAEAAAAAAAAAAEAAACAgIAKAAAAACgAAAAoAAAAZAAAAGQAAAAAAAAAzMzMAAAAAABQAAAAUAAAAGQAAABkAAAAAAAAABcAAAAUAAAAAAAAAAAAAAD/fwAA/38AAAAAAAAJAAAABAAAAB5eAwAMAAAAEAAAAAAAAAAAAAAAAAAAAAAAAAAeAAAAaAAAAAAAAAAAAAAAAAAAAAAAAAAAAAAAECcAABAnAAAAAAAAAAAAAAAAAAAAAAAAAAAAAAAAAAAAAAAAAAAAABQAAAAAAAAAwMD/AAAAAABkAAAAMgAAAAAAAABkAAAAAAAAAH9/fwAKAAAAHwAAAFQAAAAAAAAFAAAAAQAAAAAAAAAAAAAAAAAAAAAAAAAAAAAAAAAAAAAAAAAAAAAAAn9/fwAAAAADzMzMAMDA/wB/f38AAAAAAAAAAAAAAAAAAAAAAAAAAAAhAAAAGAAAABQAAADQAgAAGycAAPAPAABZKQAAAAAAACYAAAAIAAAAAAAAAAAAAAA="/>
+                <pr:smNativeData xmlns:pr="smNativeData" val="SMDATA_13_HjisYBMAAAAlAAAAZAAAAA8BAAAAkAAAAEgAAACQAAAASAAAAAAAAAABAAAAAAAAAAEAAABQAAAAAAAAAAAA4D8AAAAAAADgPwAAAAAAAOA/AAAAAAAA4D8AAAAAAADgPwAAAAAAAOA/AAAAAAAA4D8AAAAAAADgPwAAAAAAAOA/AAAAAAAA4D8CAAAAjAAAAAAAAAAAAAAAu+DjDP///wgAAAAAAAAAAAAAAAAAAAAAAAAAAAAAAAAAAAAAZAAAAAEAAABAAAAAAAAAAAAAAAAAAAAAAAAAAAAAAAAAAAAAAAAAAAAAAAAAAAAAAAAAAAAAAAAAAAAAAAAAAAAAAAAAAAAAAAAAAAAAAAAAAAAAAAAAAAAAAAAAAAAAFAAAADwAAAAAAAAAAAAAAAAAAAkUAAAAAQAAABQAAAAUAAAAFAAAAAEAAAAAAAAAZAAAAGQAAAAAAAAAZAAAAGQAAAAVAAAAYAAAAAAAAAAAAAAADwAAACADAAAAAAAAAAAAAAEAAACgMgAAVgcAAKr4//8BAAAAf39/AAEAAABkAAAAAAAAABQAAABAHwAAAAAAACYAAAAAAAAAwOD//wAAAAAmAAAAZAAAABYAAABMAAAAAAAAAAAAAAAEAAAAAAAAAAEAAACAgIAKAAAAACgAAAAoAAAAZAAAAGQAAAAAAAAAzMzMAAAAAABQAAAAUAAAAGQAAABkAAAAAAAAABcAAAAUAAAAAAAAAAAAAAD/fwAA/38AAAAAAAAJAAAABAAAAB5eAwAMAAAAEAAAAAAAAAAAAAAAAAAAAAAAAAAeAAAAaAAAAAAAAAAAAAAAAAAAAAAAAAAAAAAAECcAABAnAAAAAAAAAAAAAAAAAAAAAAAAAAAAAAAAAAAAAAAAAAAAABQAAAAAAAAAwMD/AAAAAABkAAAAMgAAAAAAAABkAAAAAAAAAH9/fwAKAAAAHwAAAFQAAAAAAAAFAAAAAQAAAAAAAAAAAAAAAAAAAAAAAAAAAAAAAAAAAAAAAAAAAAAAAn9/fwAAAAADzMzMAMDA/wB/f38AAAAAAAAAAAAAAAAAAAAAAAAAAAAhAAAAGAAAABQAAADQAgAAGycAAPAPAABZKQAAEAAAACYAAAAIAAAAAAAAAAAAAAA="/>
               </a:ext>
             </a:extLst>
           </p:cNvSpPr>
@@ -1443,7 +1430,7 @@
           <a:lstStyle/>
           <a:p>
             <a:pPr/>
-            <a:fld id="{263451B0-FECB-61A7-858C-08F21FC2735D}" type="datetime1">
+            <a:fld id="{3F74E582-CCD2-2113-9CCC-3A46AB826A6F}" type="datetime1">
               <a:t/>
             </a:fld>
           </a:p>
@@ -1456,7 +1443,7 @@
             <a:spLocks noGrp="1" noChangeArrowheads="1"/>
             <a:extLst>
               <a:ext uri="smNativeData">
-                <pr:smNativeData xmlns:pr="smNativeData" val="SMDATA_13_FAOrYBMAAAAlAAAAZAAAAA8BAAAAkAAAAEgAAACQAAAASAAAAAAAAAABAAAAAAAAAAEAAABQAAAAAAAAAAAA4D8AAAAAAADgPwAAAAAAAOA/AAAAAAAA4D8AAAAAAADgPwAAAAAAAOA/AAAAAAAA4D8AAAAAAADgPwAAAAAAAOA/AAAAAAAA4D8CAAAAjAAAAAAAAAAAAAAAu+DjDP///wgAAAAAAAAAAAAAAAAAAAAAAAAAAAAAAAAAAAAAZAAAAAEAAABAAAAAAAAAAAAAAAAAAAAAAAAAAAAAAAAAAAAAAAAAAAAAAAAAAAAAAAAAAAAAAAAAAAAAAAAAAAAAAAAAAAAAAAAAAAAAAAAAAAAAAAAAAAAAAAAAAAAAFAAAADwAAAAAAAAAAAAAAAAAAAkUAAAAAQAAABQAAAAUAAAAFAAAAAEAAAAAAAAAZAAAAGQAAAAAAAAAZAAAAGQAAAAVAAAAYAAAAAAAAAAAAAAADwAAACADAAAAAAAAAAAAAAEAAACgMgAAVgcAAKr4//8BAAAAf39/AAEAAABkAAAAAAAAABQAAABAHwAAAAAAACYAAAAAAAAAwOD//wAAAAAmAAAAZAAAABYAAABMAAAAAAAAAAAAAAAEAAAAAAAAAAEAAACAgIAKAAAAACgAAAAoAAAAZAAAAGQAAAAAAAAAzMzMAAAAAABQAAAAUAAAAGQAAABkAAAAAAAAABcAAAAUAAAAAAAAAAAAAAD/fwAA/38AAAAAAAAJAAAABAAAAKVG86EMAAAAEAAAAAAAAAAAAAAAAAAAAAAAAAAeAAAAaAAAAAAAAAAAAAAAAAAAAAAAAAAAAAAAECcAABAnAAAAAAAAAAAAAAAAAAAAAAAAAAAAAAAAAAAAAAAAAAAAABQAAAAAAAAAwMD/AAAAAABkAAAAMgAAAAAAAABkAAAAAAAAAH9/fwAKAAAAHwAAAFQAAAAAAAAFAAAAAQAAAAAAAAAAAAAAAAAAAAAAAAAAAAAAAAAAAAAAAAAAAAAAAn9/fwAAAAADzMzMAMDA/wB/f38AAAAAAAAAAAAAAAAAAAAAAAAAAAAhAAAAGAAAABQAAAA4EwAAGycAAAglAABZKQAAAAAAACYAAAAIAAAAAAAAAAAAAAA="/>
+                <pr:smNativeData xmlns:pr="smNativeData" val="SMDATA_13_HjisYBMAAAAlAAAAZAAAAA8BAAAAkAAAAEgAAACQAAAASAAAAAAAAAABAAAAAAAAAAEAAABQAAAAAAAAAAAA4D8AAAAAAADgPwAAAAAAAOA/AAAAAAAA4D8AAAAAAADgPwAAAAAAAOA/AAAAAAAA4D8AAAAAAADgPwAAAAAAAOA/AAAAAAAA4D8CAAAAjAAAAAAAAAAAAAAAu+DjDP///wgAAAAAAAAAAAAAAAAAAAAAAAAAAAAAAAAAAAAAZAAAAAEAAABAAAAAAAAAAAAAAAAAAAAAAAAAAAAAAAAAAAAAAAAAAAAAAAAAAAAAAAAAAAAAAAAAAAAAAAAAAAAAAAAAAAAAAAAAAAAAAAAAAAAAAAAAAAAAAAAAAAAAFAAAADwAAAAAAAAAAAAAAAAAAAkUAAAAAQAAABQAAAAUAAAAFAAAAAEAAAAAAAAAZAAAAGQAAAAAAAAAZAAAAGQAAAAVAAAAYAAAAAAAAAAAAAAADwAAACADAAAAAAAAAAAAAAEAAACgMgAAVgcAAKr4//8BAAAAf39/AAEAAABkAAAAAAAAABQAAABAHwAAAAAAACYAAAAAAAAAwOD//wAAAAAmAAAAZAAAABYAAABMAAAAAAAAAAAAAAAEAAAAAAAAAAEAAACAgIAKAAAAACgAAAAoAAAAZAAAAGQAAAAAAAAAzMzMAAAAAABQAAAAUAAAAGQAAABkAAAAAAAAABcAAAAUAAAAAAAAAAAAAAD/fwAA/38AAAAAAAAJAAAABAAAAKVG86EMAAAAEAAAAAAAAAAAAAAAAAAAAAAAAAAeAAAAaAAAAAAAAAAAAAAAAAAAAAAAAAAAAAAAECcAABAnAAAAAAAAAAAAAAAAAAAAAAAAAAAAAAAAAAAAAAAAAAAAABQAAAAAAAAAwMD/AAAAAABkAAAAMgAAAAAAAABkAAAAAAAAAH9/fwAKAAAAHwAAAFQAAAAAAAAFAAAAAQAAAAAAAAAAAAAAAAAAAAAAAAAAAAAAAAAAAAAAAAAAAAAAAn9/fwAAAAADzMzMAMDA/wB/f38AAAAAAAAAAAAAAAAAAAAAAAAAAAAhAAAAGAAAABQAAAA4EwAAGycAAAglAABZKQAAEAAAACYAAAAIAAAAAAAAAAAAAAA="/>
               </a:ext>
             </a:extLst>
           </p:cNvSpPr>
@@ -1470,9 +1457,6 @@
           <a:lstStyle/>
           <a:p>
             <a:pPr/>
-            <a:r>
-              <a:t/>
-            </a:r>
           </a:p>
         </p:txBody>
       </p:sp>
@@ -1483,7 +1467,7 @@
             <a:spLocks noGrp="1" noChangeArrowheads="1"/>
             <a:extLst>
               <a:ext uri="smNativeData">
-                <pr:smNativeData xmlns:pr="smNativeData" val="SMDATA_13_FAOrYBMAAAAlAAAAZAAAAA8BAAAAkAAAAEgAAACQAAAASAAAAAAAAAABAAAAAAAAAAEAAABQAAAAAAAAAAAA4D8AAAAAAADgPwAAAAAAAOA/AAAAAAAA4D8AAAAAAADgPwAAAAAAAOA/AAAAAAAA4D8AAAAAAADgPwAAAAAAAOA/AAAAAAAA4D8CAAAAjAAAAAAAAAAAAAAAu+DjDP///wgAAAAAAAAAAAAAAAAAAAAAAAAAAAAAAAAAAAAAZAAAAAEAAABAAAAAAAAAAAAAAAAAAAAAAAAAAAAAAAAAAAAAAAAAAAAAAAAAAAAAAAAAAAAAAAAAAAAAAAAAAAAAAAAAAAAAAAAAAAAAAAAAAAAAAAAAAAAAAAAAAAAAFAAAADwAAAAAAAAAAAAAAAAAAAkUAAAAAQAAABQAAAAUAAAAFAAAAAEAAAAAAAAAZAAAAGQAAAAAAAAAZAAAAGQAAAAVAAAAYAAAAAAAAAAAAAAADwAAACADAAAAAAAAAAAAAAEAAACgMgAAVgcAAKr4//8BAAAAf39/AAEAAABkAAAAAAAAABQAAABAHwAAAAAAACYAAAAAAAAAwOD//wAAAAAmAAAAZAAAABYAAABMAAAAAAAAAAAAAAAEAAAAAAAAAAEAAACAgIAKAAAAACgAAAAoAAAAZAAAAGQAAAAAAAAAzMzMAAAAAABQAAAAUAAAAGQAAABkAAAAAAAAABcAAAAUAAAAAAAAAAAAAAD/fwAA/38AAAAAAAAJAAAABAAAAM9Ay2gMAAAAEAAAAAAAAAAAAAAAAAAAAAAAAAAeAAAAaAAAAAAAAAAAAAAAAAAAAAAAAAAAAAAAECcAABAnAAAAAAAAAAAAAAAAAAAAAAAAAAAAAAAAAAAAAAAAAAAAABQAAAAAAAAAwMD/AAAAAABkAAAAMgAAAAAAAABkAAAAAAAAAH9/fwAKAAAAHwAAAFQAAAAAAAAFAAAAAQAAAAAAAAAAAAAAAAAAAAAAAAAAAAAAAAAAAAAAAAAAAAAAAn9/fwAAAAADzMzMAMDA/wB/f38AAAAAAAAAAAAAAAAAAAAAAAAAAAAhAAAAGAAAABQAAABQKAAAGycAAHA1AABZKQAAAAAAACYAAAAIAAAAAAAAAAAAAAA="/>
+                <pr:smNativeData xmlns:pr="smNativeData" val="SMDATA_13_HjisYBMAAAAlAAAAZAAAAA8BAAAAkAAAAEgAAACQAAAASAAAAAAAAAABAAAAAAAAAAEAAABQAAAAAAAAAAAA4D8AAAAAAADgPwAAAAAAAOA/AAAAAAAA4D8AAAAAAADgPwAAAAAAAOA/AAAAAAAA4D8AAAAAAADgPwAAAAAAAOA/AAAAAAAA4D8CAAAAjAAAAAAAAAAAAAAAu+DjDP///wgAAAAAAAAAAAAAAAAAAAAAAAAAAAAAAAAAAAAAZAAAAAEAAABAAAAAAAAAAAAAAAAAAAAAAAAAAAAAAAAAAAAAAAAAAAAAAAAAAAAAAAAAAAAAAAAAAAAAAAAAAAAAAAAAAAAAAAAAAAAAAAAAAAAAAAAAAAAAAAAAAAAAFAAAADwAAAAAAAAAAAAAAAAAAAkUAAAAAQAAABQAAAAUAAAAFAAAAAEAAAAAAAAAZAAAAGQAAAAAAAAAZAAAAGQAAAAVAAAAYAAAAAAAAAAAAAAADwAAACADAAAAAAAAAAAAAAEAAACgMgAAVgcAAKr4//8BAAAAf39/AAEAAABkAAAAAAAAABQAAABAHwAAAAAAACYAAAAAAAAAwOD//wAAAAAmAAAAZAAAABYAAABMAAAAAAAAAAAAAAAEAAAAAAAAAAEAAACAgIAKAAAAACgAAAAoAAAAZAAAAGQAAAAAAAAAzMzMAAAAAABQAAAAUAAAAGQAAABkAAAAAAAAABcAAAAUAAAAAAAAAAAAAAD/fwAA/38AAAAAAAAJAAAABAAAAM9Ay2gMAAAAEAAAAAAAAAAAAAAAAAAAAAAAAAAeAAAAaAAAAAAAAAAAAAAAAAAAAAAAAAAAAAAAECcAABAnAAAAAAAAAAAAAAAAAAAAAAAAAAAAAAAAAAAAAAAAAAAAABQAAAAAAAAAwMD/AAAAAABkAAAAMgAAAAAAAABkAAAAAAAAAH9/fwAKAAAAHwAAAFQAAAAAAAAFAAAAAQAAAAAAAAAAAAAAAAAAAAAAAAAAAAAAAAAAAAAAAAAAAAAAAn9/fwAAAAADzMzMAMDA/wB/f38AAAAAAAAAAAAAAAAAAAAAAAAAAAAhAAAAGAAAABQAAABQKAAAGycAAHA1AABZKQAAEAAAACYAAAAIAAAAAAAAAAAAAAA="/>
               </a:ext>
             </a:extLst>
           </p:cNvSpPr>
@@ -1497,7 +1481,7 @@
           <a:lstStyle/>
           <a:p>
             <a:pPr/>
-            <a:fld id="{263477E9-A7CB-6181-858C-51D439C27304}" type="slidenum">
+            <a:fld id="{3F74E099-D7D2-2116-9CCC-2143AE826A74}" type="slidenum">
               <a:t/>
             </a:fld>
           </a:p>
@@ -1535,7 +1519,7 @@
             <a:spLocks noGrp="1" noChangeArrowheads="1"/>
             <a:extLst>
               <a:ext uri="smNativeData">
-                <pr:smNativeData xmlns:pr="smNativeData" val="SMDATA_13_FAOrYBMAAAAlAAAAZAAAAA8BAAAAkAAAAEgAAACQAAAASAAAAAAAAAABAAAAAAAAAAEAAABQAAAAAAAAAAAA4D8AAAAAAADgPwAAAAAAAOA/AAAAAAAA4D8AAAAAAADgPwAAAAAAAOA/AAAAAAAA4D8AAAAAAADgPwAAAAAAAOA/AAAAAAAA4D8CAAAAjAAAAAAAAAAAAAAAu+DjDP///wgAAAAAAAAAAAAAAAAAAAAAAAAAAAAAAAAAAAAAZAAAAAEAAABAAAAAAAAAAAAAAAAAAAAAAAAAAAAAAAAAAAAAAAAAAAAAAAAAAAAAAAAAAAAAAAAAAAAAAAAAAAAAAAAAAAAAAAAAAAAAAAAAAAAAAAAAAAAAAAAAAAAAFAAAADwAAAAAAAAAAAAAAAAAAAkUAAAAAQAAABQAAAAUAAAAFAAAAAEAAAAAAAAAZAAAAGQAAAAAAAAAZAAAAGQAAAAVAAAAYAAAAAAAAAAAAAAADwAAACADAAAAAAAAAAAAAAEAAACgMgAAVgcAAKr4//8BAAAAf39/AAEAAABkAAAAAAAAABQAAABAHwAAAAAAACYAAAAAAAAAwOD//wAAAAAmAAAAZAAAABYAAABMAAAAAAAAAAAAAAAEAAAAAAAAAAEAAACAgIAKAAAAACgAAAAoAAAAZAAAAGQAAAAAAAAAzMzMAAAAAABQAAAAUAAAAGQAAABkAAAAAAAAABcAAAAUAAAAAAAAAAAAAAD/fwAA/38AAAAAAAAJAAAABAAAAAMAhUEMAAAAEAAAAAAAAAAAAAAAAAAAAAAAAAAeAAAAaAAAAAAAAAAAAAAAAAAAAAAAAAAAAAAAECcAABAnAAAAAAAAAAAAAAAAAAAAAAAAAAAAAAAAAAAAAAAAAAAAABQAAAAAAAAAwMD/AAAAAABkAAAAMgAAAAAAAABkAAAAAAAAAH9/fwAKAAAAHwAAAFQAAAAAAAAFAAAAAQAAAAAAAAAAAAAAAAAAAAAAAAAAAAAAAAAAAAAAAAAAAAAAAn9/fwAAAAADzMzMAMDA/wB/f38AAAAAAAAAAAAAAAAAAAAAAAAAAAAhAAAAGAAAABQAAADQAgAAsAEAAHA1AAC4CAAAAAAAACYAAAAIAAAAAAAAAAAAAAA="/>
+                <pr:smNativeData xmlns:pr="smNativeData" val="SMDATA_13_HjisYBMAAAAlAAAAZAAAAA8BAAAAkAAAAEgAAACQAAAASAAAAAAAAAABAAAAAAAAAAEAAABQAAAAAAAAAAAA4D8AAAAAAADgPwAAAAAAAOA/AAAAAAAA4D8AAAAAAADgPwAAAAAAAOA/AAAAAAAA4D8AAAAAAADgPwAAAAAAAOA/AAAAAAAA4D8CAAAAjAAAAAAAAAAAAAAAu+DjDP///wgAAAAAAAAAAAAAAAAAAAAAAAAAAAAAAAAAAAAAZAAAAAEAAABAAAAAAAAAAAAAAAAAAAAAAAAAAAAAAAAAAAAAAAAAAAAAAAAAAAAAAAAAAAAAAAAAAAAAAAAAAAAAAAAAAAAAAAAAAAAAAAAAAAAAAAAAAAAAAAAAAAAAFAAAADwAAAAAAAAAAAAAAAAAAAkUAAAAAQAAABQAAAAUAAAAFAAAAAEAAAAAAAAAZAAAAGQAAAAAAAAAZAAAAGQAAAAVAAAAYAAAAAAAAAAAAAAADwAAACADAAAAAAAAAAAAAAEAAACgMgAAVgcAAKr4//8BAAAAf39/AAEAAABkAAAAAAAAABQAAABAHwAAAAAAACYAAAAAAAAAwOD//wAAAAAmAAAAZAAAABYAAABMAAAAAAAAAAAAAAAEAAAAAAAAAAEAAACAgIAKAAAAACgAAAAoAAAAZAAAAGQAAAAAAAAAzMzMAAAAAABQAAAAUAAAAGQAAABkAAAAAAAAABcAAAAUAAAAAAAAAAAAAAD/fwAA/38AAAAAAAAJAAAABAAAAAMAhUEMAAAAEAAAAAAAAAAAAAAAAAAAAAAAAAAeAAAAaAAAAAAAAAAAAAAAAAAAAAAAAAAAAAAAECcAABAnAAAAAAAAAAAAAAAAAAAAAAAAAAAAAAAAAAAAAAAAAAAAABQAAAAAAAAAwMD/AAAAAABkAAAAMgAAAAAAAABkAAAAAAAAAH9/fwAKAAAAHwAAAFQAAAAAAAAFAAAAAQAAAAAAAAAAAAAAAAAAAAAAAAAAAAAAAAAAAAAAAAAAAAAAAn9/fwAAAAADzMzMAMDA/wB/f38AAAAAAAAAAAAAAAAAAAAAAAAAAAAhAAAAGAAAABQAAADQAgAAsAEAAHA1AAC4CAAAEAAAACYAAAAIAAAAAAAAAAAAAAA="/>
               </a:ext>
             </a:extLst>
           </p:cNvSpPr>
@@ -1562,7 +1546,7 @@
             <a:spLocks noGrp="1" noChangeArrowheads="1"/>
             <a:extLst>
               <a:ext uri="smNativeData">
-                <pr:smNativeData xmlns:pr="smNativeData" val="SMDATA_13_FAOrYBMAAAAlAAAAZAAAAA8BAAAAkAAAAEgAAACQAAAASAAAAAAAAAACAAAAAAAAAAEAAABQAAAAAAAAAAAA4D8AAAAAAADgPwAAAAAAAOA/AAAAAAAA4D8AAAAAAADgPwAAAAAAAOA/AAAAAAAA4D8AAAAAAADgPwAAAAAAAOA/AAAAAAAA4D8CAAAAjAAAAAAAAAAAAAAAu+DjDP///wgAAAAAAAAAAAAAAAAAAAAAAAAAAAAAAAAAAAAAZAAAAAEAAABAAAAAAAAAAAAAAAAAAAAAAAAAAAAAAAAAAAAAAAAAAAAAAAAAAAAAAAAAAAAAAAAAAAAAAAAAAAAAAAAAAAAAAAAAAAAAAAAAAAAAAAAAAAAAAAAAAAAAFAAAADwAAAAAAAAAAAAAAAAAAAkUAAAAAQAAABQAAAAUAAAAFAAAAAEAAAAAAAAAZAAAAGQAAAAAAAAAZAAAAGQAAAAVAAAAYAAAAAAAAAAAAAAADwAAACADAAAAAAAAAAAAAAEAAACgMgAAVgcAAKr4//8BAAAAf39/AAEAAABkAAAAAAAAABQAAABAHwAAAAAAACYAAAAAAAAAwOD//wAAAAAmAAAAZAAAABYAAABMAAAAAAAAAAAAAAAEAAAAAAAAAAEAAACAgIAKAAAAACgAAAAoAAAAZAAAAGQAAAAAAAAAzMzMAAAAAABQAAAAUAAAAGQAAABkAAAAAAAAABcAAAAUAAAAAAAAAAAAAAD/fwAA/38AAAAAAAAJAAAABAAAAAMAjgwMAAAAEAAAAAAAAAAAAAAAAAAAAAAAAAAeAAAAaAAAAAAAAAAAAAAAAAAAAAAAAAAAAAAAECcAABAnAAAAAAAAAAAAAAAAAAAAAAAAAAAAAAAAAAAAAAAAAAAAABQAAAAAAAAAwMD/AAAAAABkAAAAMgAAAAAAAABkAAAAAAAAAH9/fwAKAAAAHwAAAFQAAAAAAAAFAAAAAQAAAAAAAAAAAAAAAAAAAAAAAAAAAAAAAAAAAAAAAAAAAAAAAn9/fwAAAAADzMzMAMDA/wB/f38AAAAAAAAAAAAAAAAAAAAAAAAAAAAhAAAAGAAAABQAAADQAgAAcQkAAKobAABhDQAAAAAAACYAAAAIAAAAgYAAAAAAAAA="/>
+                <pr:smNativeData xmlns:pr="smNativeData" val="SMDATA_13_HjisYBMAAAAlAAAAZAAAAA8BAAAAkAAAAEgAAACQAAAASAAAAAAAAAACAAAAAAAAAAEAAABQAAAAAAAAAAAA4D8AAAAAAADgPwAAAAAAAOA/AAAAAAAA4D8AAAAAAADgPwAAAAAAAOA/AAAAAAAA4D8AAAAAAADgPwAAAAAAAOA/AAAAAAAA4D8CAAAAjAAAAAAAAAAAAAAAu+DjDP///wgAAAAAAAAAAAAAAAAAAAAAAAAAAAAAAAAAAAAAZAAAAAEAAABAAAAAAAAAAAAAAAAAAAAAAAAAAAAAAAAAAAAAAAAAAAAAAAAAAAAAAAAAAAAAAAAAAAAAAAAAAAAAAAAAAAAAAAAAAAAAAAAAAAAAAAAAAAAAAAAAAAAAFAAAADwAAAAAAAAAAAAAAAAAAAkUAAAAAQAAABQAAAAUAAAAFAAAAAEAAAAAAAAAZAAAAGQAAAAAAAAAZAAAAGQAAAAVAAAAYAAAAAAAAAAAAAAADwAAACADAAAAAAAAAAAAAAEAAACgMgAAVgcAAKr4//8BAAAAf39/AAEAAABkAAAAAAAAABQAAABAHwAAAAAAACYAAAAAAAAAwOD//wAAAAAmAAAAZAAAABYAAABMAAAAAAAAAAAAAAAEAAAAAAAAAAEAAACAgIAKAAAAACgAAAAoAAAAZAAAAGQAAAAAAAAAzMzMAAAAAABQAAAAUAAAAGQAAABkAAAAAAAAABcAAAAUAAAAAAAAAAAAAAD/fwAA/38AAAAAAAAJAAAABAAAAAMAjgwMAAAAEAAAAAAAAAAAAAAAAAAAAAAAAAAeAAAAaAAAAAAAAAAAAAAAAAAAAAAAAAAAAAAAECcAABAnAAAAAAAAAAAAAAAAAAAAAAAAAAAAAAAAAAAAAAAAAAAAABQAAAAAAAAAwMD/AAAAAABkAAAAMgAAAAAAAABkAAAAAAAAAH9/fwAKAAAAHwAAAFQAAAAAAAAFAAAAAQAAAAAAAAAAAAAAAAAAAAAAAAAAAAAAAAAAAAAAAAAAAAAAAn9/fwAAAAADzMzMAMDA/wB/f38AAAAAAAAAAAAAAAAAAAAAAAAAAAAhAAAAGAAAABQAAADQAgAAcQkAAKobAABhDQAAEAAAACYAAAAIAAAAgYAAAAAAAAA="/>
               </a:ext>
             </a:extLst>
           </p:cNvSpPr>
@@ -1635,12 +1619,12 @@
             <a:spLocks noGrp="1" noChangeArrowheads="1"/>
             <a:extLst>
               <a:ext uri="smNativeData">
-                <pr:smNativeData xmlns:pr="smNativeData" val="SMDATA_13_FAOrYBMAAAAlAAAAZAAAAA8BAAAAkAAAAEgAAACQAAAASAAAAAAAAAAAAAAAAAAAAAEAAABQAAAAAAAAAAAA4D8AAAAAAADgPwAAAAAAAOA/AAAAAAAA4D8AAAAAAADgPwAAAAAAAOA/AAAAAAAA4D8AAAAAAADgPwAAAAAAAOA/AAAAAAAA4D8CAAAAjAAAAAAAAAAAAAAAu+DjDP///wgAAAAAAAAAAAAAAAAAAAAAAAAAAAAAAAAAAAAAZAAAAAEAAABAAAAAAAAAAAAAAAAAAAAAAAAAAAAAAAAAAAAAAAAAAAAAAAAAAAAAAAAAAAAAAAAAAAAAAAAAAAAAAAAAAAAAAAAAAAAAAAAAAAAAAAAAAAAAAAAAAAAAFAAAADwAAAAAAAAAAAAAAAAAAAkUAAAAAQAAABQAAAAUAAAAFAAAAAEAAAAAAAAAZAAAAGQAAAAAAAAAZAAAAGQAAAAVAAAAYAAAAAAAAAAAAAAADwAAACADAAAAAAAAAAAAAAEAAACgMgAAVgcAAKr4//8BAAAAf39/AAEAAABkAAAAAAAAABQAAABAHwAAAAAAACYAAAAAAAAAwOD//wAAAAAmAAAAZAAAABYAAABMAAAAAAAAAAAAAAAEAAAAAAAAAAEAAACAgIAKAAAAACgAAAAoAAAAZAAAAGQAAAAAAAAAzMzMAAAAAABQAAAAUAAAAGQAAABkAAAAAAAAABcAAAAUAAAAAAAAAAAAAAD/fwAA/38AAAAAAAAJAAAABAAAAJJHd9YMAAAAEAAAAAAAAAAAAAAAAAAAAAAAAAAeAAAAaAAAAAAAAAAAAAAAAAAAAAAAAAAAAAAAECcAABAnAAAAAAAAAAAAAAAAAAAAAAAAAAAAAAAAAAAAAAAAAAAAABQAAAAAAAAAwMD/AAAAAABkAAAAMgAAAAAAAABkAAAAAAAAAH9/fwAKAAAAHwAAAFQAAAAAAAAFAAAAAQAAAAAAAAAAAAAAAAAAAAAAAAAAAAAAAAAAAAAAAAAAAAAAAn9/fwAAAAADzMzMAMDA/wB/f38AAAAAAAAAAAAAAAAAAAAAAAAAAAAhAAAAGAAAABQAAADQAgAAYQ0AAKobAACwJQAAAAAAACYAAAAIAAAAAYAAAAAAAAA="/>
-              </a:ext>
-            </a:extLst>
-          </p:cNvSpPr>
-          <p:nvPr>
-            <p:ph sz="half" idx="2"/>
+                <pr:smNativeData xmlns:pr="smNativeData" val="SMDATA_13_HjisYBMAAAAlAAAAZAAAAA8BAAAAkAAAAEgAAACQAAAASAAAAAAAAAAAAAAAAAAAAAEAAABQAAAAAAAAAAAA4D8AAAAAAADgPwAAAAAAAOA/AAAAAAAA4D8AAAAAAADgPwAAAAAAAOA/AAAAAAAA4D8AAAAAAADgPwAAAAAAAOA/AAAAAAAA4D8CAAAAjAAAAAAAAAAAAAAAu+DjDP///wgAAAAAAAAAAAAAAAAAAAAAAAAAAAAAAAAAAAAAZAAAAAEAAABAAAAAAAAAAAAAAAAAAAAAAAAAAAAAAAAAAAAAAAAAAAAAAAAAAAAAAAAAAAAAAAAAAAAAAAAAAAAAAAAAAAAAAAAAAAAAAAAAAAAAAAAAAAAAAAAAAAAAFAAAADwAAAAAAAAAAAAAAAAAAAkUAAAAAQAAABQAAAAUAAAAFAAAAAEAAAAAAAAAZAAAAGQAAAAAAAAAZAAAAGQAAAAVAAAAYAAAAAAAAAAAAAAADwAAACADAAAAAAAAAAAAAAEAAACgMgAAVgcAAKr4//8BAAAAf39/AAEAAABkAAAAAAAAABQAAABAHwAAAAAAACYAAAAAAAAAwOD//wAAAAAmAAAAZAAAABYAAABMAAAAAAAAAAAAAAAEAAAAAAAAAAEAAACAgIAKAAAAACgAAAAoAAAAZAAAAGQAAAAAAAAAzMzMAAAAAABQAAAAUAAAAGQAAABkAAAAAAAAABcAAAAUAAAAAAAAAAAAAAD/fwAA/38AAAAAAAAJAAAABAAAAJJHd9YMAAAAEAAAAAAAAAAAAAAAAAAAAAAAAAAeAAAAaAAAAAAAAAAAAAAAAAAAAAAAAAAAAAAAECcAABAnAAAAAAAAAAAAAAAAAAAAAAAAAAAAAAAAAAAAAAAAAAAAABQAAAAAAAAAwMD/AAAAAABkAAAAMgAAAAAAAABkAAAAAAAAAH9/fwAKAAAAHwAAAFQAAAAAAAAFAAAAAQAAAAAAAAAAAAAAAAAAAAAAAAAAAAAAAAAAAAAAAAAAAAAAAn9/fwAAAAADzMzMAMDA/wB/f38AAAAAAAAAAAAAAAAAAAAAAAAAAAAhAAAAGAAAABQAAADQAgAAYQ0AAKobAACwJQAAEAAAACYAAAAIAAAAAYAAAAAAAAA="/>
+              </a:ext>
+            </a:extLst>
+          </p:cNvSpPr>
+          <p:nvPr>
+            <p:ph idx="2"/>
           </p:nvPr>
         </p:nvSpPr>
         <p:spPr>
@@ -1719,7 +1703,7 @@
             <a:spLocks noGrp="1" noChangeArrowheads="1"/>
             <a:extLst>
               <a:ext uri="smNativeData">
-                <pr:smNativeData xmlns:pr="smNativeData" val="SMDATA_13_FAOrYBMAAAAlAAAAZAAAAA8BAAAAkAAAAEgAAACQAAAASAAAAAAAAAACAAAAAAAAAAEAAABQAAAAAAAAAAAA4D8AAAAAAADgPwAAAAAAAOA/AAAAAAAA4D8AAAAAAADgPwAAAAAAAOA/AAAAAAAA4D8AAAAAAADgPwAAAAAAAOA/AAAAAAAA4D8CAAAAjAAAAAAAAAAAAAAAu+DjDP///wgAAAAAAAAAAAAAAAAAAAAAAAAAAAAAAAAAAAAAZAAAAAEAAABAAAAAAAAAAAAAAAAAAAAAAAAAAAAAAAAAAAAAAAAAAAAAAAAAAAAAAAAAAAAAAAAAAAAAAAAAAAAAAAAAAAAAAAAAAAAAAAAAAAAAAAAAAAAAAAAAAAAAFAAAADwAAAAAAAAAAAAAAAAAAAkUAAAAAQAAABQAAAAUAAAAFAAAAAEAAAAAAAAAZAAAAGQAAAAAAAAAZAAAAGQAAAAVAAAAYAAAAAAAAAAAAAAADwAAACADAAAAAAAAAAAAAAEAAACgMgAAVgcAAKr4//8BAAAAf39/AAEAAABkAAAAAAAAABQAAABAHwAAAAAAACYAAAAAAAAAwOD//wAAAAAmAAAAZAAAABYAAABMAAAAAAAAAAAAAAAEAAAAAAAAAAEAAACAgIAKAAAAACgAAAAoAAAAZAAAAGQAAAAAAAAAzMzMAAAAAABQAAAAUAAAAGQAAABkAAAAAAAAABcAAAAUAAAAAAAAAAAAAAD/fwAA/38AAAAAAAAJAAAABAAAAGvGAwAMAAAAEAAAAAAAAAAAAAAAAAAAAAAAAAAeAAAAaAAAAAAAAAAAAAAAAAAAAAAAAAAAAAAAECcAABAnAAAAAAAAAAAAAAAAAAAAAAAAAAAAAAAAAAAAAAAAAAAAABQAAAAAAAAAwMD/AAAAAABkAAAAMgAAAAAAAABkAAAAAAAAAH9/fwAKAAAAHwAAAFQAAAAAAAAFAAAAAQAAAAAAAAAAAAAAAAAAAAAAAAAAAAAAAAAAAAAAAAAAAAAAAn9/fwAAAAADzMzMAMDA/wB/f38AAAAAAAAAAAAAAAAAAAAAAAAAAAAhAAAAGAAAABQAAACWHAAAcQkAAHA1AABhDQAAAAAAACYAAAAIAAAAgYAAAAAAAAA="/>
+                <pr:smNativeData xmlns:pr="smNativeData" val="SMDATA_13_HjisYBMAAAAlAAAAZAAAAA8BAAAAkAAAAEgAAACQAAAASAAAAAAAAAACAAAAAAAAAAEAAABQAAAAAAAAAAAA4D8AAAAAAADgPwAAAAAAAOA/AAAAAAAA4D8AAAAAAADgPwAAAAAAAOA/AAAAAAAA4D8AAAAAAADgPwAAAAAAAOA/AAAAAAAA4D8CAAAAjAAAAAAAAAAAAAAAu+DjDP///wgAAAAAAAAAAAAAAAAAAAAAAAAAAAAAAAAAAAAAZAAAAAEAAABAAAAAAAAAAAAAAAAAAAAAAAAAAAAAAAAAAAAAAAAAAAAAAAAAAAAAAAAAAAAAAAAAAAAAAAAAAAAAAAAAAAAAAAAAAAAAAAAAAAAAAAAAAAAAAAAAAAAAFAAAADwAAAAAAAAAAAAAAAAAAAkUAAAAAQAAABQAAAAUAAAAFAAAAAEAAAAAAAAAZAAAAGQAAAAAAAAAZAAAAGQAAAAVAAAAYAAAAAAAAAAAAAAADwAAACADAAAAAAAAAAAAAAEAAACgMgAAVgcAAKr4//8BAAAAf39/AAEAAABkAAAAAAAAABQAAABAHwAAAAAAACYAAAAAAAAAwOD//wAAAAAmAAAAZAAAABYAAABMAAAAAAAAAAAAAAAEAAAAAAAAAAEAAACAgIAKAAAAACgAAAAoAAAAZAAAAGQAAAAAAAAAzMzMAAAAAABQAAAAUAAAAGQAAABkAAAAAAAAABcAAAAUAAAAAAAAAAAAAAD/fwAA/38AAAAAAAAJAAAABAAAAGvGAwAMAAAAEAAAAAAAAAAAAAAAAAAAAAAAAAAeAAAAaAAAAAAAAAAAAAAAAAAAAAAAAAAAAAAAECcAABAnAAAAAAAAAAAAAAAAAAAAAAAAAAAAAAAAAAAAAAAAAAAAABQAAAAAAAAAwMD/AAAAAABkAAAAMgAAAAAAAABkAAAAAAAAAH9/fwAKAAAAHwAAAFQAAAAAAAAFAAAAAQAAAAAAAAAAAAAAAAAAAAAAAAAAAAAAAAAAAAAAAAAAAAAAAn9/fwAAAAADzMzMAMDA/wB/f38AAAAAAAAAAAAAAAAAAAAAAAAAAAAhAAAAGAAAABQAAACWHAAAcQkAAHA1AABhDQAAEAAAACYAAAAIAAAAgYAAAAAAAAA="/>
               </a:ext>
             </a:extLst>
           </p:cNvSpPr>
@@ -1792,12 +1776,12 @@
             <a:spLocks noGrp="1" noChangeArrowheads="1"/>
             <a:extLst>
               <a:ext uri="smNativeData">
-                <pr:smNativeData xmlns:pr="smNativeData" val="SMDATA_13_FAOrYBMAAAAlAAAAZAAAAA8BAAAAkAAAAEgAAACQAAAASAAAAAAAAAAAAAAAAAAAAAEAAABQAAAAAAAAAAAA4D8AAAAAAADgPwAAAAAAAOA/AAAAAAAA4D8AAAAAAADgPwAAAAAAAOA/AAAAAAAA4D8AAAAAAADgPwAAAAAAAOA/AAAAAAAA4D8CAAAAjAAAAAAAAAAAAAAAu+DjDP///wgAAAAAAAAAAAAAAAAAAAAAAAAAAAAAAAAAAAAAZAAAAAEAAABAAAAAAAAAAAAAAAAAAAAAAAAAAAAAAAAAAAAAAAAAAAAAAAAAAAAAAAAAAAAAAAAAAAAAAAAAAAAAAAAAAAAAAAAAAAAAAAAAAAAAAAAAAAAAAAAAAAAAFAAAADwAAAAAAAAAAAAAAAAAAAkUAAAAAQAAABQAAAAUAAAAFAAAAAEAAAAAAAAAZAAAAGQAAAAAAAAAZAAAAGQAAAAVAAAAYAAAAAAAAAAAAAAADwAAACADAAAAAAAAAAAAAAEAAACgMgAAVgcAAKr4//8BAAAAf39/AAEAAABkAAAAAAAAABQAAABAHwAAAAAAACYAAAAAAAAAwOD//wAAAAAmAAAAZAAAABYAAABMAAAAAAAAAAAAAAAEAAAAAAAAAAEAAACAgIAKAAAAACgAAAAoAAAAZAAAAGQAAAAAAAAAzMzMAAAAAABQAAAAUAAAAGQAAABkAAAAAAAAABcAAAAUAAAAAAAAAAAAAAD/fwAA/38AAAAAAAAJAAAABAAAAD8wAwAMAAAAEAAAAAAAAAAAAAAAAAAAAAAAAAAeAAAAaAAAAAAAAAAAAAAAAAAAAAAAAAAAAAAAECcAABAnAAAAAAAAAAAAAAAAAAAAAAAAAAAAAAAAAAAAAAAAAAAAABQAAAAAAAAAwMD/AAAAAABkAAAAMgAAAAAAAABkAAAAAAAAAH9/fwAKAAAAHwAAAFQAAAAAAAAFAAAAAQAAAAAAAAAAAAAAAAAAAAAAAAAAAAAAAAAAAAAAAAAAAAAAAn9/fwAAAAADzMzMAMDA/wB/f38AAAAAAAAAAAAAAAAAAAAAAAAAAAAhAAAAGAAAABQAAACWHAAAYQ0AAHA1AACwJQAAAAAAACYAAAAIAAAAAYAAAAAAAAA="/>
-              </a:ext>
-            </a:extLst>
-          </p:cNvSpPr>
-          <p:nvPr>
-            <p:ph sz="half" idx="4"/>
+                <pr:smNativeData xmlns:pr="smNativeData" val="SMDATA_13_HjisYBMAAAAlAAAAZAAAAA8BAAAAkAAAAEgAAACQAAAASAAAAAAAAAAAAAAAAAAAAAEAAABQAAAAAAAAAAAA4D8AAAAAAADgPwAAAAAAAOA/AAAAAAAA4D8AAAAAAADgPwAAAAAAAOA/AAAAAAAA4D8AAAAAAADgPwAAAAAAAOA/AAAAAAAA4D8CAAAAjAAAAAAAAAAAAAAAu+DjDP///wgAAAAAAAAAAAAAAAAAAAAAAAAAAAAAAAAAAAAAZAAAAAEAAABAAAAAAAAAAAAAAAAAAAAAAAAAAAAAAAAAAAAAAAAAAAAAAAAAAAAAAAAAAAAAAAAAAAAAAAAAAAAAAAAAAAAAAAAAAAAAAAAAAAAAAAAAAAAAAAAAAAAAFAAAADwAAAAAAAAAAAAAAAAAAAkUAAAAAQAAABQAAAAUAAAAFAAAAAEAAAAAAAAAZAAAAGQAAAAAAAAAZAAAAGQAAAAVAAAAYAAAAAAAAAAAAAAADwAAACADAAAAAAAAAAAAAAEAAACgMgAAVgcAAKr4//8BAAAAf39/AAEAAABkAAAAAAAAABQAAABAHwAAAAAAACYAAAAAAAAAwOD//wAAAAAmAAAAZAAAABYAAABMAAAAAAAAAAAAAAAEAAAAAAAAAAEAAACAgIAKAAAAACgAAAAoAAAAZAAAAGQAAAAAAAAAzMzMAAAAAABQAAAAUAAAAGQAAABkAAAAAAAAABcAAAAUAAAAAAAAAAAAAAD/fwAA/38AAAAAAAAJAAAABAAAAD8wAwAMAAAAEAAAAAAAAAAAAAAAAAAAAAAAAAAeAAAAaAAAAAAAAAAAAAAAAAAAAAAAAAAAAAAAECcAABAnAAAAAAAAAAAAAAAAAAAAAAAAAAAAAAAAAAAAAAAAAAAAABQAAAAAAAAAwMD/AAAAAABkAAAAMgAAAAAAAABkAAAAAAAAAH9/fwAKAAAAHwAAAFQAAAAAAAAFAAAAAQAAAAAAAAAAAAAAAAAAAAAAAAAAAAAAAAAAAAAAAAAAAAAAAn9/fwAAAAADzMzMAMDA/wB/f38AAAAAAAAAAAAAAAAAAAAAAAAAAAAhAAAAGAAAABQAAACWHAAAYQ0AAHA1AACwJQAAEAAAACYAAAAIAAAAAYAAAAAAAAA="/>
+              </a:ext>
+            </a:extLst>
+          </p:cNvSpPr>
+          <p:nvPr>
+            <p:ph idx="4"/>
           </p:nvPr>
         </p:nvSpPr>
         <p:spPr>
@@ -1876,7 +1860,7 @@
             <a:spLocks noGrp="1" noChangeArrowheads="1"/>
             <a:extLst>
               <a:ext uri="smNativeData">
-                <pr:smNativeData xmlns:pr="smNativeData" val="SMDATA_13_FAOrYBMAAAAlAAAAZAAAAA8BAAAAkAAAAEgAAACQAAAASAAAAAAAAAABAAAAAAAAAAEAAABQAAAAAAAAAAAA4D8AAAAAAADgPwAAAAAAAOA/AAAAAAAA4D8AAAAAAADgPwAAAAAAAOA/AAAAAAAA4D8AAAAAAADgPwAAAAAAAOA/AAAAAAAA4D8CAAAAjAAAAAAAAAAAAAAAu+DjDP///wgAAAAAAAAAAAAAAAAAAAAAAAAAAAAAAAAAAAAAZAAAAAEAAABAAAAAAAAAAAAAAAAAAAAAAAAAAAAAAAAAAAAAAAAAAAAAAAAAAAAAAAAAAAAAAAAAAAAAAAAAAAAAAAAAAAAAAAAAAAAAAAAAAAAAAAAAAAAAAAAAAAAAFAAAADwAAAAAAAAAAAAAAAAAAAkUAAAAAQAAABQAAAAUAAAAFAAAAAEAAAAAAAAAZAAAAGQAAAAAAAAAZAAAAGQAAAAVAAAAYAAAAAAAAAAAAAAADwAAACADAAAAAAAAAAAAAAEAAACgMgAAVgcAAKr4//8BAAAAf39/AAEAAABkAAAAAAAAABQAAABAHwAAAAAAACYAAAAAAAAAwOD//wAAAAAmAAAAZAAAABYAAABMAAAAAAAAAAAAAAAEAAAAAAAAAAEAAACAgIAKAAAAACgAAAAoAAAAZAAAAGQAAAAAAAAAzMzMAAAAAABQAAAAUAAAAGQAAABkAAAAAAAAABcAAAAUAAAAAAAAAAAAAAD/fwAA/38AAAAAAAAJAAAABAAAAAMAf0oMAAAAEAAAAAAAAAAAAAAAAAAAAAAAAAAeAAAAaAAAAAAAAAAAAAAAAAAAAAAAAAAAAAAAECcAABAnAAAAAAAAAAAAAAAAAAAAAAAAAAAAAAAAAAAAAAAAAAAAABQAAAAAAAAAwMD/AAAAAABkAAAAMgAAAAAAAABkAAAAAAAAAH9/fwAKAAAAHwAAAFQAAAAAAAAFAAAAAQAAAAAAAAAAAAAAAAAAAAAAAAAAAAAAAAAAAAAAAAAAAAAAAn9/fwAAAAADzMzMAMDA/wB/f38AAAAAAAAAAAAAAAAAAAAAAAAAAAAhAAAAGAAAABQAAADQAgAAGycAAPAPAABZKQAAAAAAACYAAAAIAAAAAAAAAAAAAAA="/>
+                <pr:smNativeData xmlns:pr="smNativeData" val="SMDATA_13_HjisYBMAAAAlAAAAZAAAAA8BAAAAkAAAAEgAAACQAAAASAAAAAAAAAABAAAAAAAAAAEAAABQAAAAAAAAAAAA4D8AAAAAAADgPwAAAAAAAOA/AAAAAAAA4D8AAAAAAADgPwAAAAAAAOA/AAAAAAAA4D8AAAAAAADgPwAAAAAAAOA/AAAAAAAA4D8CAAAAjAAAAAAAAAAAAAAAu+DjDP///wgAAAAAAAAAAAAAAAAAAAAAAAAAAAAAAAAAAAAAZAAAAAEAAABAAAAAAAAAAAAAAAAAAAAAAAAAAAAAAAAAAAAAAAAAAAAAAAAAAAAAAAAAAAAAAAAAAAAAAAAAAAAAAAAAAAAAAAAAAAAAAAAAAAAAAAAAAAAAAAAAAAAAFAAAADwAAAAAAAAAAAAAAAAAAAkUAAAAAQAAABQAAAAUAAAAFAAAAAEAAAAAAAAAZAAAAGQAAAAAAAAAZAAAAGQAAAAVAAAAYAAAAAAAAAAAAAAADwAAACADAAAAAAAAAAAAAAEAAACgMgAAVgcAAKr4//8BAAAAf39/AAEAAABkAAAAAAAAABQAAABAHwAAAAAAACYAAAAAAAAAwOD//wAAAAAmAAAAZAAAABYAAABMAAAAAAAAAAAAAAAEAAAAAAAAAAEAAACAgIAKAAAAACgAAAAoAAAAZAAAAGQAAAAAAAAAzMzMAAAAAABQAAAAUAAAAGQAAABkAAAAAAAAABcAAAAUAAAAAAAAAAAAAAD/fwAA/38AAAAAAAAJAAAABAAAAAMAf0oMAAAAEAAAAAAAAAAAAAAAAAAAAAAAAAAeAAAAaAAAAAAAAAAAAAAAAAAAAAAAAAAAAAAAECcAABAnAAAAAAAAAAAAAAAAAAAAAAAAAAAAAAAAAAAAAAAAAAAAABQAAAAAAAAAwMD/AAAAAABkAAAAMgAAAAAAAABkAAAAAAAAAH9/fwAKAAAAHwAAAFQAAAAAAAAFAAAAAQAAAAAAAAAAAAAAAAAAAAAAAAAAAAAAAAAAAAAAAAAAAAAAAn9/fwAAAAADzMzMAMDA/wB/f38AAAAAAAAAAAAAAAAAAAAAAAAAAAAhAAAAGAAAABQAAADQAgAAGycAAPAPAABZKQAAEAAAACYAAAAIAAAAAAAAAAAAAAA="/>
               </a:ext>
             </a:extLst>
           </p:cNvSpPr>
@@ -1890,7 +1874,7 @@
           <a:lstStyle/>
           <a:p>
             <a:pPr/>
-            <a:fld id="{26343138-76CB-61C7-858C-80927FC273D5}" type="datetime1">
+            <a:fld id="{3F74A144-0AD2-2157-9CCC-FC02EF826AA9}" type="datetime1">
               <a:t/>
             </a:fld>
           </a:p>
@@ -1903,7 +1887,7 @@
             <a:spLocks noGrp="1" noChangeArrowheads="1"/>
             <a:extLst>
               <a:ext uri="smNativeData">
-                <pr:smNativeData xmlns:pr="smNativeData" val="SMDATA_13_FAOrYBMAAAAlAAAAZAAAAA8BAAAAkAAAAEgAAACQAAAASAAAAAAAAAABAAAAAAAAAAEAAABQAAAAAAAAAAAA4D8AAAAAAADgPwAAAAAAAOA/AAAAAAAA4D8AAAAAAADgPwAAAAAAAOA/AAAAAAAA4D8AAAAAAADgPwAAAAAAAOA/AAAAAAAA4D8CAAAAjAAAAAAAAAAAAAAAu+DjDP///wgAAAAAAAAAAAAAAAAAAAAAAAAAAAAAAAAAAAAAZAAAAAEAAABAAAAAAAAAAAAAAAAAAAAAAAAAAAAAAAAAAAAAAAAAAAAAAAAAAAAAAAAAAAAAAAAAAAAAAAAAAAAAAAAAAAAAAAAAAAAAAAAAAAAAAAAAAAAAAAAAAAAAFAAAADwAAAAAAAAAAAAAAAAAAAkUAAAAAQAAABQAAAAUAAAAFAAAAAEAAAAAAAAAZAAAAGQAAAAAAAAAZAAAAGQAAAAVAAAAYAAAAAAAAAAAAAAADwAAACADAAAAAAAAAAAAAAEAAACgMgAAVgcAAKr4//8BAAAAf39/AAEAAABkAAAAAAAAABQAAABAHwAAAAAAACYAAAAAAAAAwOD//wAAAAAmAAAAZAAAABYAAABMAAAAAAAAAAAAAAAEAAAAAAAAAAEAAACAgIAKAAAAACgAAAAoAAAAZAAAAGQAAAAAAAAAzMzMAAAAAABQAAAAUAAAAGQAAABkAAAAAAAAABcAAAAUAAAAAAAAAAAAAAD/fwAA/38AAAAAAAAJAAAABAAAAJ4RBAAMAAAAEAAAAAAAAAAAAAAAAAAAAAAAAAAeAAAAaAAAAAAAAAAAAAAAAAAAAAAAAAAAAAAAECcAABAnAAAAAAAAAAAAAAAAAAAAAAAAAAAAAAAAAAAAAAAAAAAAABQAAAAAAAAAwMD/AAAAAABkAAAAMgAAAAAAAABkAAAAAAAAAH9/fwAKAAAAHwAAAFQAAAAAAAAFAAAAAQAAAAAAAAAAAAAAAAAAAAAAAAAAAAAAAAAAAAAAAAAAAAAAAn9/fwAAAAADzMzMAMDA/wB/f38AAAAAAAAAAAAAAAAAAAAAAAAAAAAhAAAAGAAAABQAAAA4EwAAGycAAAglAABZKQAAAAAAACYAAAAIAAAAAAAAAAAAAAA="/>
+                <pr:smNativeData xmlns:pr="smNativeData" val="SMDATA_13_HjisYBMAAAAlAAAAZAAAAA8BAAAAkAAAAEgAAACQAAAASAAAAAAAAAABAAAAAAAAAAEAAABQAAAAAAAAAAAA4D8AAAAAAADgPwAAAAAAAOA/AAAAAAAA4D8AAAAAAADgPwAAAAAAAOA/AAAAAAAA4D8AAAAAAADgPwAAAAAAAOA/AAAAAAAA4D8CAAAAjAAAAAAAAAAAAAAAu+DjDP///wgAAAAAAAAAAAAAAAAAAAAAAAAAAAAAAAAAAAAAZAAAAAEAAABAAAAAAAAAAAAAAAAAAAAAAAAAAAAAAAAAAAAAAAAAAAAAAAAAAAAAAAAAAAAAAAAAAAAAAAAAAAAAAAAAAAAAAAAAAAAAAAAAAAAAAAAAAAAAAAAAAAAAFAAAADwAAAAAAAAAAAAAAAAAAAkUAAAAAQAAABQAAAAUAAAAFAAAAAEAAAAAAAAAZAAAAGQAAAAAAAAAZAAAAGQAAAAVAAAAYAAAAAAAAAAAAAAADwAAACADAAAAAAAAAAAAAAEAAACgMgAAVgcAAKr4//8BAAAAf39/AAEAAABkAAAAAAAAABQAAABAHwAAAAAAACYAAAAAAAAAwOD//wAAAAAmAAAAZAAAABYAAABMAAAAAAAAAAAAAAAEAAAAAAAAAAEAAACAgIAKAAAAACgAAAAoAAAAZAAAAGQAAAAAAAAAzMzMAAAAAABQAAAAUAAAAGQAAABkAAAAAAAAABcAAAAUAAAAAAAAAAAAAAD/fwAA/38AAAAAAAAJAAAABAAAAJ4RBAAMAAAAEAAAAAAAAAAAAAAAAAAAAAAAAAAeAAAAaAAAAAAAAAAAAAAAAAAAAAAAAAAAAAAAECcAABAnAAAAAAAAAAAAAAAAAAAAAAAAAAAAAAAAAAAAAAAAAAAAABQAAAAAAAAAwMD/AAAAAABkAAAAMgAAAAAAAABkAAAAAAAAAH9/fwAKAAAAHwAAAFQAAAAAAAAFAAAAAQAAAAAAAAAAAAAAAAAAAAAAAAAAAAAAAAAAAAAAAAAAAAAAAn9/fwAAAAADzMzMAMDA/wB/f38AAAAAAAAAAAAAAAAAAAAAAAAAAAAhAAAAGAAAABQAAAA4EwAAGycAAAglAABZKQAAEAAAACYAAAAIAAAAAAAAAAAAAAA="/>
               </a:ext>
             </a:extLst>
           </p:cNvSpPr>
@@ -1917,9 +1901,6 @@
           <a:lstStyle/>
           <a:p>
             <a:pPr/>
-            <a:r>
-              <a:t/>
-            </a:r>
           </a:p>
         </p:txBody>
       </p:sp>
@@ -1930,7 +1911,7 @@
             <a:spLocks noGrp="1" noChangeArrowheads="1"/>
             <a:extLst>
               <a:ext uri="smNativeData">
-                <pr:smNativeData xmlns:pr="smNativeData" val="SMDATA_13_FAOrYBMAAAAlAAAAZAAAAA8BAAAAkAAAAEgAAACQAAAASAAAAAAAAAABAAAAAAAAAAEAAABQAAAAAAAAAAAA4D8AAAAAAADgPwAAAAAAAOA/AAAAAAAA4D8AAAAAAADgPwAAAAAAAOA/AAAAAAAA4D8AAAAAAADgPwAAAAAAAOA/AAAAAAAA4D8CAAAAjAAAAAAAAAAAAAAAu+DjDP///wgAAAAAAAAAAAAAAAAAAAAAAAAAAAAAAAAAAAAAZAAAAAEAAABAAAAAAAAAAAAAAAAAAAAAAAAAAAAAAAAAAAAAAAAAAAAAAAAAAAAAAAAAAAAAAAAAAAAAAAAAAAAAAAAAAAAAAAAAAAAAAAAAAAAAAAAAAAAAAAAAAAAAFAAAADwAAAAAAAAAAAAAAAAAAAkUAAAAAQAAABQAAAAUAAAAFAAAAAEAAAAAAAAAZAAAAGQAAAAAAAAAZAAAAGQAAAAVAAAAYAAAAAAAAAAAAAAADwAAACADAAAAAAAAAAAAAAEAAACgMgAAVgcAAKr4//8BAAAAf39/AAEAAABkAAAAAAAAABQAAABAHwAAAAAAACYAAAAAAAAAwOD//wAAAAAmAAAAZAAAABYAAABMAAAAAAAAAAAAAAAEAAAAAAAAAAEAAACAgIAKAAAAACgAAAAoAAAAZAAAAGQAAAAAAAAAzMzMAAAAAABQAAAAUAAAAGQAAABkAAAAAAAAABcAAAAUAAAAAAAAAAAAAAD/fwAA/38AAAAAAAAJAAAABAAAAAQAxWgMAAAAEAAAAAAAAAAAAAAAAAAAAAAAAAAeAAAAaAAAAAAAAAAAAAAAAAAAAAAAAAAAAAAAECcAABAnAAAAAAAAAAAAAAAAAAAAAAAAAAAAAAAAAAAAAAAAAAAAABQAAAAAAAAAwMD/AAAAAABkAAAAMgAAAAAAAABkAAAAAAAAAH9/fwAKAAAAHwAAAFQAAAAAAAAFAAAAAQAAAAAAAAAAAAAAAAAAAAAAAAAAAAAAAAAAAAAAAAAAAAAAAn9/fwAAAAADzMzMAMDA/wB/f38AAAAAAAAAAAAAAAAAAAAAAAAAAAAhAAAAGAAAABQAAABQKAAAGycAAHA1AABZKQAAAAAAACYAAAAIAAAAAAAAAAAAAAA="/>
+                <pr:smNativeData xmlns:pr="smNativeData" val="SMDATA_13_HjisYBMAAAAlAAAAZAAAAA8BAAAAkAAAAEgAAACQAAAASAAAAAAAAAABAAAAAAAAAAEAAABQAAAAAAAAAAAA4D8AAAAAAADgPwAAAAAAAOA/AAAAAAAA4D8AAAAAAADgPwAAAAAAAOA/AAAAAAAA4D8AAAAAAADgPwAAAAAAAOA/AAAAAAAA4D8CAAAAjAAAAAAAAAAAAAAAu+DjDP///wgAAAAAAAAAAAAAAAAAAAAAAAAAAAAAAAAAAAAAZAAAAAEAAABAAAAAAAAAAAAAAAAAAAAAAAAAAAAAAAAAAAAAAAAAAAAAAAAAAAAAAAAAAAAAAAAAAAAAAAAAAAAAAAAAAAAAAAAAAAAAAAAAAAAAAAAAAAAAAAAAAAAAFAAAADwAAAAAAAAAAAAAAAAAAAkUAAAAAQAAABQAAAAUAAAAFAAAAAEAAAAAAAAAZAAAAGQAAAAAAAAAZAAAAGQAAAAVAAAAYAAAAAAAAAAAAAAADwAAACADAAAAAAAAAAAAAAEAAACgMgAAVgcAAKr4//8BAAAAf39/AAEAAABkAAAAAAAAABQAAABAHwAAAAAAACYAAAAAAAAAwOD//wAAAAAmAAAAZAAAABYAAABMAAAAAAAAAAAAAAAEAAAAAAAAAAEAAACAgIAKAAAAACgAAAAoAAAAZAAAAGQAAAAAAAAAzMzMAAAAAABQAAAAUAAAAGQAAABkAAAAAAAAABcAAAAUAAAAAAAAAAAAAAD/fwAA/38AAAAAAAAJAAAABAAAAAQAxWgMAAAAEAAAAAAAAAAAAAAAAAAAAAAAAAAeAAAAaAAAAAAAAAAAAAAAAAAAAAAAAAAAAAAAECcAABAnAAAAAAAAAAAAAAAAAAAAAAAAAAAAAAAAAAAAAAAAAAAAABQAAAAAAAAAwMD/AAAAAABkAAAAMgAAAAAAAABkAAAAAAAAAH9/fwAKAAAAHwAAAFQAAAAAAAAFAAAAAQAAAAAAAAAAAAAAAAAAAAAAAAAAAAAAAAAAAAAAAAAAAAAAAn9/fwAAAAADzMzMAMDA/wB/f38AAAAAAAAAAAAAAAAAAAAAAAAAAAAhAAAAGAAAABQAAABQKAAAGycAAHA1AABZKQAAEAAAACYAAAAIAAAAAAAAAAAAAAA="/>
               </a:ext>
             </a:extLst>
           </p:cNvSpPr>
@@ -1944,7 +1925,7 @@
           <a:lstStyle/>
           <a:p>
             <a:pPr/>
-            <a:fld id="{263467F5-BBCB-6191-858C-4DC429C27318}" type="slidenum">
+            <a:fld id="{3F74F9BC-F2D2-210F-9CCC-045AB7826A51}" type="slidenum">
               <a:t/>
             </a:fld>
           </a:p>
@@ -1982,7 +1963,7 @@
             <a:spLocks noGrp="1" noChangeArrowheads="1"/>
             <a:extLst>
               <a:ext uri="smNativeData">
-                <pr:smNativeData xmlns:pr="smNativeData" val="SMDATA_13_FAOrYBMAAAAlAAAAZAAAAA8BAAAAkAAAAEgAAACQAAAASAAAAAAAAAABAAAAAAAAAAEAAABQAAAAAAAAAAAA4D8AAAAAAADgPwAAAAAAAOA/AAAAAAAA4D8AAAAAAADgPwAAAAAAAOA/AAAAAAAA4D8AAAAAAADgPwAAAAAAAOA/AAAAAAAA4D8CAAAAjAAAAAAAAAAAAAAAu+DjDP///wgAAAAAAAAAAAAAAAAAAAAAAAAAAAAAAAAAAAAAZAAAAAEAAABAAAAAAAAAAAAAAAAAAAAAAAAAAAAAAAAAAAAAAAAAAAAAAAAAAAAAAAAAAAAAAAAAAAAAAAAAAAAAAAAAAAAAAAAAAAAAAAAAAAAAAAAAAAAAAAAAAAAAFAAAADwAAAAAAAAAAAAAAAAAAAkUAAAAAQAAABQAAAAUAAAAFAAAAAEAAAAAAAAAZAAAAGQAAAAAAAAAZAAAAGQAAAAVAAAAYAAAAAAAAAAAAAAADwAAACADAAAAAAAAAAAAAAEAAACgMgAAVgcAAKr4//8BAAAAf39/AAEAAABkAAAAAAAAABQAAABAHwAAAAAAACYAAAAAAAAAwOD//wAAAAAmAAAAZAAAABYAAABMAAAAAAAAAAAAAAAEAAAAAAAAAAEAAACAgIAKAAAAACgAAAAoAAAAZAAAAGQAAAAAAAAAzMzMAAAAAABQAAAAUAAAAGQAAABkAAAAAAAAABcAAAAUAAAAAAAAAAAAAAD/fwAA/38AAAAAAAAJAAAABAAAAPhLhyMMAAAAEAAAAAAAAAAAAAAAAAAAAAAAAAAeAAAAaAAAAAAAAAAAAAAAAAAAAAAAAAAAAAAAECcAABAnAAAAAAAAAAAAAAAAAAAAAAAAAAAAAAAAAAAAAAAAAAAAABQAAAAAAAAAwMD/AAAAAABkAAAAMgAAAAAAAABkAAAAAAAAAH9/fwAKAAAAHwAAAFQAAAAAAAAFAAAAAQAAAAAAAAAAAAAAAAAAAAAAAAAAAAAAAAAAAAAAAAAAAAAAAn9/fwAAAAADzMzMAMDA/wB/f38AAAAAAAAAAAAAAAAAAAAAAAAAAAAhAAAAGAAAABQAAADQAgAAsAEAAHA1AAC4CAAAAAAAACYAAAAIAAAAAAAAAAAAAAA="/>
+                <pr:smNativeData xmlns:pr="smNativeData" val="SMDATA_13_HjisYBMAAAAlAAAAZAAAAA8BAAAAkAAAAEgAAACQAAAASAAAAAAAAAABAAAAAAAAAAEAAABQAAAAAAAAAAAA4D8AAAAAAADgPwAAAAAAAOA/AAAAAAAA4D8AAAAAAADgPwAAAAAAAOA/AAAAAAAA4D8AAAAAAADgPwAAAAAAAOA/AAAAAAAA4D8CAAAAjAAAAAAAAAAAAAAAu+DjDP///wgAAAAAAAAAAAAAAAAAAAAAAAAAAAAAAAAAAAAAZAAAAAEAAABAAAAAAAAAAAAAAAAAAAAAAAAAAAAAAAAAAAAAAAAAAAAAAAAAAAAAAAAAAAAAAAAAAAAAAAAAAAAAAAAAAAAAAAAAAAAAAAAAAAAAAAAAAAAAAAAAAAAAFAAAADwAAAAAAAAAAAAAAAAAAAkUAAAAAQAAABQAAAAUAAAAFAAAAAEAAAAAAAAAZAAAAGQAAAAAAAAAZAAAAGQAAAAVAAAAYAAAAAAAAAAAAAAADwAAACADAAAAAAAAAAAAAAEAAACgMgAAVgcAAKr4//8BAAAAf39/AAEAAABkAAAAAAAAABQAAABAHwAAAAAAACYAAAAAAAAAwOD//wAAAAAmAAAAZAAAABYAAABMAAAAAAAAAAAAAAAEAAAAAAAAAAEAAACAgIAKAAAAACgAAAAoAAAAZAAAAGQAAAAAAAAAzMzMAAAAAABQAAAAUAAAAGQAAABkAAAAAAAAABcAAAAUAAAAAAAAAAAAAAD/fwAA/38AAAAAAAAJAAAABAAAAPhLhyMMAAAAEAAAAAAAAAAAAAAAAAAAAAAAAAAeAAAAaAAAAAAAAAAAAAAAAAAAAAAAAAAAAAAAECcAABAnAAAAAAAAAAAAAAAAAAAAAAAAAAAAAAAAAAAAAAAAAAAAABQAAAAAAAAAwMD/AAAAAABkAAAAMgAAAAAAAABkAAAAAAAAAH9/fwAKAAAAHwAAAFQAAAAAAAAFAAAAAQAAAAAAAAAAAAAAAAAAAAAAAAAAAAAAAAAAAAAAAAAAAAAAAn9/fwAAAAADzMzMAMDA/wB/f38AAAAAAAAAAAAAAAAAAAAAAAAAAAAhAAAAGAAAABQAAADQAgAAsAEAAHA1AAC4CAAAEAAAACYAAAAIAAAAAAAAAAAAAAA="/>
               </a:ext>
             </a:extLst>
           </p:cNvSpPr>
@@ -2009,7 +1990,7 @@
             <a:spLocks noGrp="1" noChangeArrowheads="1"/>
             <a:extLst>
               <a:ext uri="smNativeData">
-                <pr:smNativeData xmlns:pr="smNativeData" val="SMDATA_13_FAOrYBMAAAAlAAAAZAAAAA8BAAAAkAAAAEgAAACQAAAASAAAAAAAAAABAAAAAAAAAAEAAABQAAAAAAAAAAAA4D8AAAAAAADgPwAAAAAAAOA/AAAAAAAA4D8AAAAAAADgPwAAAAAAAOA/AAAAAAAA4D8AAAAAAADgPwAAAAAAAOA/AAAAAAAA4D8CAAAAjAAAAAAAAAAAAAAAu+DjDP///wgAAAAAAAAAAAAAAAAAAAAAAAAAAAAAAAAAAAAAZAAAAAEAAABAAAAAAAAAAAAAAAAAAAAAAAAAAAAAAAAAAAAAAAAAAAAAAAAAAAAAAAAAAAAAAAAAAAAAAAAAAAAAAAAAAAAAAAAAAAAAAAAAAAAAAAAAAAAAAAAAAAAAFAAAADwAAAAAAAAAAAAAAAAAAAkUAAAAAQAAABQAAAAUAAAAFAAAAAEAAAAAAAAAZAAAAGQAAAAAAAAAZAAAAGQAAAAVAAAAYAAAAAAAAAAAAAAADwAAACADAAAAAAAAAAAAAAEAAACgMgAAVgcAAKr4//8BAAAAf39/AAEAAABkAAAAAAAAABQAAABAHwAAAAAAACYAAAAAAAAAwOD//wAAAAAmAAAAZAAAABYAAABMAAAAAAAAAAAAAAAEAAAAAAAAAAEAAACAgIAKAAAAACgAAAAoAAAAZAAAAGQAAAAAAAAAzMzMAAAAAABQAAAAUAAAAGQAAABkAAAAAAAAABcAAAAUAAAAAAAAAAAAAAD/fwAA/38AAAAAAAAJAAAABAAAANMZg0QMAAAAEAAAAAAAAAAAAAAAAAAAAAAAAAAeAAAAaAAAAAAAAAAAAAAAAAAAAAAAAAAAAAAAECcAABAnAAAAAAAAAAAAAAAAAAAAAAAAAAAAAAAAAAAAAAAAAAAAABQAAAAAAAAAwMD/AAAAAABkAAAAMgAAAAAAAABkAAAAAAAAAH9/fwAKAAAAHwAAAFQAAAAAAAAFAAAAAQAAAAAAAAAAAAAAAAAAAAAAAAAAAAAAAAAAAAAAAAAAAAAAAn9/fwAAAAADzMzMAMDA/wB/f38AAAAAAAAAAAAAAAAAAAAAAAAAAAAhAAAAGAAAABQAAADQAgAAGycAAPAPAABZKQAAAAAAACYAAAAIAAAAAAAAAAAAAAA="/>
+                <pr:smNativeData xmlns:pr="smNativeData" val="SMDATA_13_HjisYBMAAAAlAAAAZAAAAA8BAAAAkAAAAEgAAACQAAAASAAAAAAAAAABAAAAAAAAAAEAAABQAAAAAAAAAAAA4D8AAAAAAADgPwAAAAAAAOA/AAAAAAAA4D8AAAAAAADgPwAAAAAAAOA/AAAAAAAA4D8AAAAAAADgPwAAAAAAAOA/AAAAAAAA4D8CAAAAjAAAAAAAAAAAAAAAu+DjDP///wgAAAAAAAAAAAAAAAAAAAAAAAAAAAAAAAAAAAAAZAAAAAEAAABAAAAAAAAAAAAAAAAAAAAAAAAAAAAAAAAAAAAAAAAAAAAAAAAAAAAAAAAAAAAAAAAAAAAAAAAAAAAAAAAAAAAAAAAAAAAAAAAAAAAAAAAAAAAAAAAAAAAAFAAAADwAAAAAAAAAAAAAAAAAAAkUAAAAAQAAABQAAAAUAAAAFAAAAAEAAAAAAAAAZAAAAGQAAAAAAAAAZAAAAGQAAAAVAAAAYAAAAAAAAAAAAAAADwAAACADAAAAAAAAAAAAAAEAAACgMgAAVgcAAKr4//8BAAAAf39/AAEAAABkAAAAAAAAABQAAABAHwAAAAAAACYAAAAAAAAAwOD//wAAAAAmAAAAZAAAABYAAABMAAAAAAAAAAAAAAAEAAAAAAAAAAEAAACAgIAKAAAAACgAAAAoAAAAZAAAAGQAAAAAAAAAzMzMAAAAAABQAAAAUAAAAGQAAABkAAAAAAAAABcAAAAUAAAAAAAAAAAAAAD/fwAA/38AAAAAAAAJAAAABAAAANMZg0QMAAAAEAAAAAAAAAAAAAAAAAAAAAAAAAAeAAAAaAAAAAAAAAAAAAAAAAAAAAAAAAAAAAAAECcAABAnAAAAAAAAAAAAAAAAAAAAAAAAAAAAAAAAAAAAAAAAAAAAABQAAAAAAAAAwMD/AAAAAABkAAAAMgAAAAAAAABkAAAAAAAAAH9/fwAKAAAAHwAAAFQAAAAAAAAFAAAAAQAAAAAAAAAAAAAAAAAAAAAAAAAAAAAAAAAAAAAAAAAAAAAAAn9/fwAAAAADzMzMAMDA/wB/f38AAAAAAAAAAAAAAAAAAAAAAAAAAAAhAAAAGAAAABQAAADQAgAAGycAAPAPAABZKQAAEAAAACYAAAAIAAAAAAAAAAAAAAA="/>
               </a:ext>
             </a:extLst>
           </p:cNvSpPr>
@@ -2023,7 +2004,7 @@
           <a:lstStyle/>
           <a:p>
             <a:pPr/>
-            <a:fld id="{26343BBB-F5CB-61CD-858C-039875C27356}" type="datetime1">
+            <a:fld id="{3F74EE22-6CD2-2118-9CCC-9A4DA0826ACF}" type="datetime1">
               <a:t/>
             </a:fld>
           </a:p>
@@ -2036,7 +2017,7 @@
             <a:spLocks noGrp="1" noChangeArrowheads="1"/>
             <a:extLst>
               <a:ext uri="smNativeData">
-                <pr:smNativeData xmlns:pr="smNativeData" val="SMDATA_13_FAOrYBMAAAAlAAAAZAAAAA8BAAAAkAAAAEgAAACQAAAASAAAAAAAAAABAAAAAAAAAAEAAABQAAAAAAAAAAAA4D8AAAAAAADgPwAAAAAAAOA/AAAAAAAA4D8AAAAAAADgPwAAAAAAAOA/AAAAAAAA4D8AAAAAAADgPwAAAAAAAOA/AAAAAAAA4D8CAAAAjAAAAAAAAAAAAAAAu+DjDP///wgAAAAAAAAAAAAAAAAAAAAAAAAAAAAAAAAAAAAAZAAAAAEAAABAAAAAAAAAAAAAAAAAAAAAAAAAAAAAAAAAAAAAAAAAAAAAAAAAAAAAAAAAAAAAAAAAAAAAAAAAAAAAAAAAAAAAAAAAAAAAAAAAAAAAAAAAAAAAAAAAAAAAFAAAADwAAAAAAAAAAAAAAAAAAAkUAAAAAQAAABQAAAAUAAAAFAAAAAEAAAAAAAAAZAAAAGQAAAAAAAAAZAAAAGQAAAAVAAAAYAAAAAAAAAAAAAAADwAAACADAAAAAAAAAAAAAAEAAACgMgAAVgcAAKr4//8BAAAAf39/AAEAAABkAAAAAAAAABQAAABAHwAAAAAAACYAAAAAAAAAwOD//wAAAAAmAAAAZAAAABYAAABMAAAAAAAAAAAAAAAEAAAAAAAAAAEAAACAgIAKAAAAACgAAAAoAAAAZAAAAGQAAAAAAAAAzMzMAAAAAABQAAAAUAAAAGQAAABkAAAAAAAAABcAAAAUAAAAAAAAAAAAAAD/fwAA/38AAAAAAAAJAAAABAAAANd5BAAMAAAAEAAAAAAAAAAAAAAAAAAAAAAAAAAeAAAAaAAAAAAAAAAAAAAAAAAAAAAAAAAAAAAAECcAABAnAAAAAAAAAAAAAAAAAAAAAAAAAAAAAAAAAAAAAAAAAAAAABQAAAAAAAAAwMD/AAAAAABkAAAAMgAAAAAAAABkAAAAAAAAAH9/fwAKAAAAHwAAAFQAAAAAAAAFAAAAAQAAAAAAAAAAAAAAAAAAAAAAAAAAAAAAAAAAAAAAAAAAAAAAAn9/fwAAAAADzMzMAMDA/wB/f38AAAAAAAAAAAAAAAAAAAAAAAAAAAAhAAAAGAAAABQAAAA4EwAAGycAAAglAABZKQAAAAAAACYAAAAIAAAAAAAAAAAAAAA="/>
+                <pr:smNativeData xmlns:pr="smNativeData" val="SMDATA_13_HjisYBMAAAAlAAAAZAAAAA8BAAAAkAAAAEgAAACQAAAASAAAAAAAAAABAAAAAAAAAAEAAABQAAAAAAAAAAAA4D8AAAAAAADgPwAAAAAAAOA/AAAAAAAA4D8AAAAAAADgPwAAAAAAAOA/AAAAAAAA4D8AAAAAAADgPwAAAAAAAOA/AAAAAAAA4D8CAAAAjAAAAAAAAAAAAAAAu+DjDP///wgAAAAAAAAAAAAAAAAAAAAAAAAAAAAAAAAAAAAAZAAAAAEAAABAAAAAAAAAAAAAAAAAAAAAAAAAAAAAAAAAAAAAAAAAAAAAAAAAAAAAAAAAAAAAAAAAAAAAAAAAAAAAAAAAAAAAAAAAAAAAAAAAAAAAAAAAAAAAAAAAAAAAFAAAADwAAAAAAAAAAAAAAAAAAAkUAAAAAQAAABQAAAAUAAAAFAAAAAEAAAAAAAAAZAAAAGQAAAAAAAAAZAAAAGQAAAAVAAAAYAAAAAAAAAAAAAAADwAAACADAAAAAAAAAAAAAAEAAACgMgAAVgcAAKr4//8BAAAAf39/AAEAAABkAAAAAAAAABQAAABAHwAAAAAAACYAAAAAAAAAwOD//wAAAAAmAAAAZAAAABYAAABMAAAAAAAAAAAAAAAEAAAAAAAAAAEAAACAgIAKAAAAACgAAAAoAAAAZAAAAGQAAAAAAAAAzMzMAAAAAABQAAAAUAAAAGQAAABkAAAAAAAAABcAAAAUAAAAAAAAAAAAAAD/fwAA/38AAAAAAAAJAAAABAAAANd5BAAMAAAAEAAAAAAAAAAAAAAAAAAAAAAAAAAeAAAAaAAAAAAAAAAAAAAAAAAAAAAAAAAAAAAAECcAABAnAAAAAAAAAAAAAAAAAAAAAAAAAAAAAAAAAAAAAAAAAAAAABQAAAAAAAAAwMD/AAAAAABkAAAAMgAAAAAAAABkAAAAAAAAAH9/fwAKAAAAHwAAAFQAAAAAAAAFAAAAAQAAAAAAAAAAAAAAAAAAAAAAAAAAAAAAAAAAAAAAAAAAAAAAAn9/fwAAAAADzMzMAMDA/wB/f38AAAAAAAAAAAAAAAAAAAAAAAAAAAAhAAAAGAAAABQAAAA4EwAAGycAAAglAABZKQAAEAAAACYAAAAIAAAAAAAAAAAAAAA="/>
               </a:ext>
             </a:extLst>
           </p:cNvSpPr>
@@ -2050,9 +2031,6 @@
           <a:lstStyle/>
           <a:p>
             <a:pPr/>
-            <a:r>
-              <a:t/>
-            </a:r>
           </a:p>
         </p:txBody>
       </p:sp>
@@ -2063,7 +2041,7 @@
             <a:spLocks noGrp="1" noChangeArrowheads="1"/>
             <a:extLst>
               <a:ext uri="smNativeData">
-                <pr:smNativeData xmlns:pr="smNativeData" val="SMDATA_13_FAOrYBMAAAAlAAAAZAAAAA8BAAAAkAAAAEgAAACQAAAASAAAAAAAAAABAAAAAAAAAAEAAABQAAAAAAAAAAAA4D8AAAAAAADgPwAAAAAAAOA/AAAAAAAA4D8AAAAAAADgPwAAAAAAAOA/AAAAAAAA4D8AAAAAAADgPwAAAAAAAOA/AAAAAAAA4D8CAAAAjAAAAAAAAAAAAAAAu+DjDP///wgAAAAAAAAAAAAAAAAAAAAAAAAAAAAAAAAAAAAAZAAAAAEAAABAAAAAAAAAAAAAAAAAAAAAAAAAAAAAAAAAAAAAAAAAAAAAAAAAAAAAAAAAAAAAAAAAAAAAAAAAAAAAAAAAAAAAAAAAAAAAAAAAAAAAAAAAAAAAAAAAAAAAFAAAADwAAAAAAAAAAAAAAAAAAAkUAAAAAQAAABQAAAAUAAAAFAAAAAEAAAAAAAAAZAAAAGQAAAAAAAAAZAAAAGQAAAAVAAAAYAAAAAAAAAAAAAAADwAAACADAAAAAAAAAAAAAAEAAACgMgAAVgcAAKr4//8BAAAAf39/AAEAAABkAAAAAAAAABQAAABAHwAAAAAAACYAAAAAAAAAwOD//wAAAAAmAAAAZAAAABYAAABMAAAAAAAAAAAAAAAEAAAAAAAAAAEAAACAgIAKAAAAACgAAAAoAAAAZAAAAGQAAAAAAAAAzMzMAAAAAABQAAAAUAAAAGQAAABkAAAAAAAAABcAAAAUAAAAAAAAAAAAAAD/fwAA/38AAAAAAAAJAAAABAAAAP////8MAAAAEAAAAAAAAAAAAAAAAAAAAAAAAAAeAAAAaAAAAAAAAAAAAAAAAAAAAAAAAAAAAAAAECcAABAnAAAAAAAAAAAAAAAAAAAAAAAAAAAAAAAAAAAAAAAAAAAAABQAAAAAAAAAwMD/AAAAAABkAAAAMgAAAAAAAABkAAAAAAAAAH9/fwAKAAAAHwAAAFQAAAAAAAAFAAAAAQAAAAAAAAAAAAAAAAAAAAAAAAAAAAAAAAAAAAAAAAAAAAAAAn9/fwAAAAADzMzMAMDA/wB/f38AAAAAAAAAAAAAAAAAAAAAAAAAAAAhAAAAGAAAABQAAABQKAAAGycAAHA1AABZKQAAAAAAACYAAAAIAAAAAAAAAAAAAAA="/>
+                <pr:smNativeData xmlns:pr="smNativeData" val="SMDATA_13_HjisYBMAAAAlAAAAZAAAAA8BAAAAkAAAAEgAAACQAAAASAAAAAAAAAABAAAAAAAAAAEAAABQAAAAAAAAAAAA4D8AAAAAAADgPwAAAAAAAOA/AAAAAAAA4D8AAAAAAADgPwAAAAAAAOA/AAAAAAAA4D8AAAAAAADgPwAAAAAAAOA/AAAAAAAA4D8CAAAAjAAAAAAAAAAAAAAAu+DjDP///wgAAAAAAAAAAAAAAAAAAAAAAAAAAAAAAAAAAAAAZAAAAAEAAABAAAAAAAAAAAAAAAAAAAAAAAAAAAAAAAAAAAAAAAAAAAAAAAAAAAAAAAAAAAAAAAAAAAAAAAAAAAAAAAAAAAAAAAAAAAAAAAAAAAAAAAAAAAAAAAAAAAAAFAAAADwAAAAAAAAAAAAAAAAAAAkUAAAAAQAAABQAAAAUAAAAFAAAAAEAAAAAAAAAZAAAAGQAAAAAAAAAZAAAAGQAAAAVAAAAYAAAAAAAAAAAAAAADwAAACADAAAAAAAAAAAAAAEAAACgMgAAVgcAAKr4//8BAAAAf39/AAEAAABkAAAAAAAAABQAAABAHwAAAAAAACYAAAAAAAAAwOD//wAAAAAmAAAAZAAAABYAAABMAAAAAAAAAAAAAAAEAAAAAAAAAAEAAACAgIAKAAAAACgAAAAoAAAAZAAAAGQAAAAAAAAAzMzMAAAAAABQAAAAUAAAAGQAAABkAAAAAAAAABcAAAAUAAAAAAAAAAAAAAD/fwAA/38AAAAAAAAJAAAABAAAAP////8MAAAAEAAAAAAAAAAAAAAAAAAAAAAAAAAeAAAAaAAAAAAAAAAAAAAAAAAAAAAAAAAAAAAAECcAABAnAAAAAAAAAAAAAAAAAAAAAAAAAAAAAAAAAAAAAAAAAAAAABQAAAAAAAAAwMD/AAAAAABkAAAAMgAAAAAAAABkAAAAAAAAAH9/fwAKAAAAHwAAAFQAAAAAAAAFAAAAAQAAAAAAAAAAAAAAAAAAAAAAAAAAAAAAAAAAAAAAAAAAAAAAAn9/fwAAAAADzMzMAMDA/wB/f38AAAAAAAAAAAAAAAAAAAAAAAAAAAAhAAAAGAAAABQAAABQKAAAGycAAHA1AABZKQAAEAAAACYAAAAIAAAAAAAAAAAAAAA="/>
               </a:ext>
             </a:extLst>
           </p:cNvSpPr>
@@ -2077,7 +2055,7 @@
           <a:lstStyle/>
           <a:p>
             <a:pPr/>
-            <a:fld id="{26345364-2ACB-61A5-858C-DCF01DC27389}" type="slidenum">
+            <a:fld id="{3F74D2EE-A0D2-2124-9CCC-56719C826A03}" type="slidenum">
               <a:t/>
             </a:fld>
           </a:p>
@@ -2115,7 +2093,7 @@
             <a:spLocks noGrp="1" noChangeArrowheads="1"/>
             <a:extLst>
               <a:ext uri="smNativeData">
-                <pr:smNativeData xmlns:pr="smNativeData" val="SMDATA_13_FAOrYBMAAAAlAAAAZAAAAA8BAAAAkAAAAEgAAACQAAAASAAAAAAAAAABAAAAAAAAAAEAAABQAAAAAAAAAAAA4D8AAAAAAADgPwAAAAAAAOA/AAAAAAAA4D8AAAAAAADgPwAAAAAAAOA/AAAAAAAA4D8AAAAAAADgPwAAAAAAAOA/AAAAAAAA4D8CAAAAjAAAAAAAAAAAAAAAu+DjDP///wgAAAAAAAAAAAAAAAAAAAAAAAAAAAAAAAAAAAAAZAAAAAEAAABAAAAAAAAAAAAAAAAAAAAAAAAAAAAAAAAAAAAAAAAAAAAAAAAAAAAAAAAAAAAAAAAAAAAAAAAAAAAAAAAAAAAAAAAAAAAAAAAAAAAAAAAAAAAAAAAAAAAAFAAAADwAAAAAAAAAAAAAAAAAAAkUAAAAAQAAABQAAAAUAAAAFAAAAAEAAAAAAAAAZAAAAGQAAAAAAAAAZAAAAGQAAAAVAAAAYAAAAAAAAAAAAAAADwAAACADAAAAAAAAAAAAAAEAAACgMgAAVgcAAKr4//8BAAAAf39/AAEAAABkAAAAAAAAABQAAABAHwAAAAAAACYAAAAAAAAAwOD//wAAAAAmAAAAZAAAABYAAABMAAAAAAAAAAAAAAAEAAAAAAAAAAEAAACAgIAKAAAAACgAAAAoAAAAZAAAAGQAAAAAAAAAzMzMAAAAAABQAAAAUAAAAGQAAABkAAAAAAAAABcAAAAUAAAAAAAAAAAAAAD/fwAA/38AAAAAAAAJAAAABAAAAAQACUoMAAAAEAAAAAAAAAAAAAAAAAAAAAAAAAAeAAAAaAAAAAAAAAAAAAAAAAAAAAAAAAAAAAAAECcAABAnAAAAAAAAAAAAAAAAAAAAAAAAAAAAAAAAAAAAAAAAAAAAABQAAAAAAAAAwMD/AAAAAABkAAAAMgAAAAAAAABkAAAAAAAAAH9/fwAKAAAAHwAAAFQAAAAAAAAFAAAAAQAAAAAAAAAAAAAAAAAAAAAAAAAAAAAAAAAAAAAAAAAAAAAAAn9/fwAAAAADzMzMAMDA/wB/f38AAAAAAAAAAAAAAAAAAAAAAAAAAAAhAAAAGAAAABQAAADQAgAAGycAAPAPAABZKQAAAAAAACYAAAAIAAAAAAAAAAAAAAA="/>
+                <pr:smNativeData xmlns:pr="smNativeData" val="SMDATA_13_HjisYBMAAAAlAAAAZAAAAA8BAAAAkAAAAEgAAACQAAAASAAAAAAAAAABAAAAAAAAAAEAAABQAAAAAAAAAAAA4D8AAAAAAADgPwAAAAAAAOA/AAAAAAAA4D8AAAAAAADgPwAAAAAAAOA/AAAAAAAA4D8AAAAAAADgPwAAAAAAAOA/AAAAAAAA4D8CAAAAjAAAAAAAAAAAAAAAu+DjDP///wgAAAAAAAAAAAAAAAAAAAAAAAAAAAAAAAAAAAAAZAAAAAEAAABAAAAAAAAAAAAAAAAAAAAAAAAAAAAAAAAAAAAAAAAAAAAAAAAAAAAAAAAAAAAAAAAAAAAAAAAAAAAAAAAAAAAAAAAAAAAAAAAAAAAAAAAAAAAAAAAAAAAAFAAAADwAAAAAAAAAAAAAAAAAAAkUAAAAAQAAABQAAAAUAAAAFAAAAAEAAAAAAAAAZAAAAGQAAAAAAAAAZAAAAGQAAAAVAAAAYAAAAAAAAAAAAAAADwAAACADAAAAAAAAAAAAAAEAAACgMgAAVgcAAKr4//8BAAAAf39/AAEAAABkAAAAAAAAABQAAABAHwAAAAAAACYAAAAAAAAAwOD//wAAAAAmAAAAZAAAABYAAABMAAAAAAAAAAAAAAAEAAAAAAAAAAEAAACAgIAKAAAAACgAAAAoAAAAZAAAAGQAAAAAAAAAzMzMAAAAAABQAAAAUAAAAGQAAABkAAAAAAAAABcAAAAUAAAAAAAAAAAAAAD/fwAA/38AAAAAAAAJAAAABAAAAAQACUoMAAAAEAAAAAAAAAAAAAAAAAAAAAAAAAAeAAAAaAAAAAAAAAAAAAAAAAAAAAAAAAAAAAAAECcAABAnAAAAAAAAAAAAAAAAAAAAAAAAAAAAAAAAAAAAAAAAAAAAABQAAAAAAAAAwMD/AAAAAABkAAAAMgAAAAAAAABkAAAAAAAAAH9/fwAKAAAAHwAAAFQAAAAAAAAFAAAAAQAAAAAAAAAAAAAAAAAAAAAAAAAAAAAAAAAAAAAAAAAAAAAAAn9/fwAAAAADzMzMAMDA/wB/f38AAAAAAAAAAAAAAAAAAAAAAAAAAAAhAAAAGAAAABQAAADQAgAAGycAAPAPAABZKQAAEAAAACYAAAAIAAAAAAAAAAAAAAA="/>
               </a:ext>
             </a:extLst>
           </p:cNvSpPr>
@@ -2129,7 +2107,7 @@
           <a:lstStyle/>
           <a:p>
             <a:pPr/>
-            <a:fld id="{26341EB5-FBCB-61E8-858C-0DBD50C27358}" type="datetime1">
+            <a:fld id="{3F74DC43-0DD2-212A-9CCC-FB7F92826AAE}" type="datetime1">
               <a:t/>
             </a:fld>
           </a:p>
@@ -2142,7 +2120,7 @@
             <a:spLocks noGrp="1" noChangeArrowheads="1"/>
             <a:extLst>
               <a:ext uri="smNativeData">
-                <pr:smNativeData xmlns:pr="smNativeData" val="SMDATA_13_FAOrYBMAAAAlAAAAZAAAAA8BAAAAkAAAAEgAAACQAAAASAAAAAAAAAABAAAAAAAAAAEAAABQAAAAAAAAAAAA4D8AAAAAAADgPwAAAAAAAOA/AAAAAAAA4D8AAAAAAADgPwAAAAAAAOA/AAAAAAAA4D8AAAAAAADgPwAAAAAAAOA/AAAAAAAA4D8CAAAAjAAAAAAAAAAAAAAAu+DjDP///wgAAAAAAAAAAAAAAAAAAAAAAAAAAAAAAAAAAAAAZAAAAAEAAABAAAAAAAAAAAAAAAAAAAAAAAAAAAAAAAAAAAAAAAAAAAAAAAAAAAAAAAAAAAAAAAAAAAAAAAAAAAAAAAAAAAAAAAAAAAAAAAAAAAAAAAAAAAAAAAAAAAAAFAAAADwAAAAAAAAAAAAAAAAAAAkUAAAAAQAAABQAAAAUAAAAFAAAAAEAAAAAAAAAZAAAAGQAAAAAAAAAZAAAAGQAAAAVAAAAYAAAAAAAAAAAAAAADwAAACADAAAAAAAAAAAAAAEAAACgMgAAVgcAAKr4//8BAAAAf39/AAEAAABkAAAAAAAAABQAAABAHwAAAAAAACYAAAAAAAAAwOD//wAAAAAmAAAAZAAAABYAAABMAAAAAAAAAAAAAAAEAAAAAAAAAAEAAACAgIAKAAAAACgAAAAoAAAAZAAAAGQAAAAAAAAAzMzMAAAAAABQAAAAUAAAAGQAAABkAAAAAAAAABcAAAAUAAAAAAAAAAAAAAD/fwAA/38AAAAAAAAJAAAABAAAAP////8MAAAAEAAAAAAAAAAAAAAAAAAAAAAAAAAeAAAAaAAAAAAAAAAAAAAAAAAAAAAAAAAAAAAAECcAABAnAAAAAAAAAAAAAAAAAAAAAAAAAAAAAAAAAAAAAAAAAAAAABQAAAAAAAAAwMD/AAAAAABkAAAAMgAAAAAAAABkAAAAAAAAAH9/fwAKAAAAHwAAAFQAAAAAAAAFAAAAAQAAAAAAAAAAAAAAAAAAAAAAAAAAAAAAAAAAAAAAAAAAAAAAAn9/fwAAAAADzMzMAMDA/wB/f38AAAAAAAAAAAAAAAAAAAAAAAAAAAAhAAAAGAAAABQAAAA4EwAAGycAAAglAABZKQAAAAAAACYAAAAIAAAAAAAAAAAAAAA="/>
+                <pr:smNativeData xmlns:pr="smNativeData" val="SMDATA_13_HjisYBMAAAAlAAAAZAAAAA8BAAAAkAAAAEgAAACQAAAASAAAAAAAAAABAAAAAAAAAAEAAABQAAAAAAAAAAAA4D8AAAAAAADgPwAAAAAAAOA/AAAAAAAA4D8AAAAAAADgPwAAAAAAAOA/AAAAAAAA4D8AAAAAAADgPwAAAAAAAOA/AAAAAAAA4D8CAAAAjAAAAAAAAAAAAAAAu+DjDP///wgAAAAAAAAAAAAAAAAAAAAAAAAAAAAAAAAAAAAAZAAAAAEAAABAAAAAAAAAAAAAAAAAAAAAAAAAAAAAAAAAAAAAAAAAAAAAAAAAAAAAAAAAAAAAAAAAAAAAAAAAAAAAAAAAAAAAAAAAAAAAAAAAAAAAAAAAAAAAAAAAAAAAFAAAADwAAAAAAAAAAAAAAAAAAAkUAAAAAQAAABQAAAAUAAAAFAAAAAEAAAAAAAAAZAAAAGQAAAAAAAAAZAAAAGQAAAAVAAAAYAAAAAAAAAAAAAAADwAAACADAAAAAAAAAAAAAAEAAACgMgAAVgcAAKr4//8BAAAAf39/AAEAAABkAAAAAAAAABQAAABAHwAAAAAAACYAAAAAAAAAwOD//wAAAAAmAAAAZAAAABYAAABMAAAAAAAAAAAAAAAEAAAAAAAAAAEAAACAgIAKAAAAACgAAAAoAAAAZAAAAGQAAAAAAAAAzMzMAAAAAABQAAAAUAAAAGQAAABkAAAAAAAAABcAAAAUAAAAAAAAAAAAAAD/fwAA/38AAAAAAAAJAAAABAAAAP////8MAAAAEAAAAAAAAAAAAAAAAAAAAAAAAAAeAAAAaAAAAAAAAAAAAAAAAAAAAAAAAAAAAAAAECcAABAnAAAAAAAAAAAAAAAAAAAAAAAAAAAAAAAAAAAAAAAAAAAAABQAAAAAAAAAwMD/AAAAAABkAAAAMgAAAAAAAABkAAAAAAAAAH9/fwAKAAAAHwAAAFQAAAAAAAAFAAAAAQAAAAAAAAAAAAAAAAAAAAAAAAAAAAAAAAAAAAAAAAAAAAAAAn9/fwAAAAADzMzMAMDA/wB/f38AAAAAAAAAAAAAAAAAAAAAAAAAAAAhAAAAGAAAABQAAAA4EwAAGycAAAglAABZKQAAEAAAACYAAAAIAAAAAAAAAAAAAAA="/>
               </a:ext>
             </a:extLst>
           </p:cNvSpPr>
@@ -2156,9 +2134,6 @@
           <a:lstStyle/>
           <a:p>
             <a:pPr/>
-            <a:r>
-              <a:t/>
-            </a:r>
           </a:p>
         </p:txBody>
       </p:sp>
@@ -2169,7 +2144,7 @@
             <a:spLocks noGrp="1" noChangeArrowheads="1"/>
             <a:extLst>
               <a:ext uri="smNativeData">
-                <pr:smNativeData xmlns:pr="smNativeData" val="SMDATA_13_FAOrYBMAAAAlAAAAZAAAAA8BAAAAkAAAAEgAAACQAAAASAAAAAAAAAABAAAAAAAAAAEAAABQAAAAAAAAAAAA4D8AAAAAAADgPwAAAAAAAOA/AAAAAAAA4D8AAAAAAADgPwAAAAAAAOA/AAAAAAAA4D8AAAAAAADgPwAAAAAAAOA/AAAAAAAA4D8CAAAAjAAAAAAAAAAAAAAAu+DjDP///wgAAAAAAAAAAAAAAAAAAAAAAAAAAAAAAAAAAAAAZAAAAAEAAABAAAAAAAAAAAAAAAAAAAAAAAAAAAAAAAAAAAAAAAAAAAAAAAAAAAAAAAAAAAAAAAAAAAAAAAAAAAAAAAAAAAAAAAAAAAAAAAAAAAAAAAAAAAAAAAAAAAAAFAAAADwAAAAAAAAAAAAAAAAAAAkUAAAAAQAAABQAAAAUAAAAFAAAAAEAAAAAAAAAZAAAAGQAAAAAAAAAZAAAAGQAAAAVAAAAYAAAAAAAAAAAAAAADwAAACADAAAAAAAAAAAAAAEAAACgMgAAVgcAAKr4//8BAAAAf39/AAEAAABkAAAAAAAAABQAAABAHwAAAAAAACYAAAAAAAAAwOD//wAAAAAmAAAAZAAAABYAAABMAAAAAAAAAAAAAAAEAAAAAAAAAAEAAACAgIAKAAAAACgAAAAoAAAAZAAAAGQAAAAAAAAAzMzMAAAAAABQAAAAUAAAAGQAAABkAAAAAAAAABcAAAAUAAAAAAAAAAAAAAD/fwAA/38AAAAAAAAJAAAABAAAAP////8MAAAAEAAAAAAAAAAAAAAAAAAAAAAAAAAeAAAAaAAAAAAAAAAAAAAAAAAAAAAAAAAAAAAAECcAABAnAAAAAAAAAAAAAAAAAAAAAAAAAAAAAAAAAAAAAAAAAAAAABQAAAAAAAAAwMD/AAAAAABkAAAAMgAAAAAAAABkAAAAAAAAAH9/fwAKAAAAHwAAAFQAAAAAAAAFAAAAAQAAAAAAAAAAAAAAAAAAAAAAAAAAAAAAAAAAAAAAAAAAAAAAAn9/fwAAAAADzMzMAMDA/wB/f38AAAAAAAAAAAAAAAAAAAAAAAAAAAAhAAAAGAAAABQAAABQKAAAGycAAHA1AABZKQAAAAAAACYAAAAIAAAAAAAAAAAAAAA="/>
+                <pr:smNativeData xmlns:pr="smNativeData" val="SMDATA_13_HjisYBMAAAAlAAAAZAAAAA8BAAAAkAAAAEgAAACQAAAASAAAAAAAAAABAAAAAAAAAAEAAABQAAAAAAAAAAAA4D8AAAAAAADgPwAAAAAAAOA/AAAAAAAA4D8AAAAAAADgPwAAAAAAAOA/AAAAAAAA4D8AAAAAAADgPwAAAAAAAOA/AAAAAAAA4D8CAAAAjAAAAAAAAAAAAAAAu+DjDP///wgAAAAAAAAAAAAAAAAAAAAAAAAAAAAAAAAAAAAAZAAAAAEAAABAAAAAAAAAAAAAAAAAAAAAAAAAAAAAAAAAAAAAAAAAAAAAAAAAAAAAAAAAAAAAAAAAAAAAAAAAAAAAAAAAAAAAAAAAAAAAAAAAAAAAAAAAAAAAAAAAAAAAFAAAADwAAAAAAAAAAAAAAAAAAAkUAAAAAQAAABQAAAAUAAAAFAAAAAEAAAAAAAAAZAAAAGQAAAAAAAAAZAAAAGQAAAAVAAAAYAAAAAAAAAAAAAAADwAAACADAAAAAAAAAAAAAAEAAACgMgAAVgcAAKr4//8BAAAAf39/AAEAAABkAAAAAAAAABQAAABAHwAAAAAAACYAAAAAAAAAwOD//wAAAAAmAAAAZAAAABYAAABMAAAAAAAAAAAAAAAEAAAAAAAAAAEAAACAgIAKAAAAACgAAAAoAAAAZAAAAGQAAAAAAAAAzMzMAAAAAABQAAAAUAAAAGQAAABkAAAAAAAAABcAAAAUAAAAAAAAAAAAAAD/fwAA/38AAAAAAAAJAAAABAAAAP////8MAAAAEAAAAAAAAAAAAAAAAAAAAAAAAAAeAAAAaAAAAAAAAAAAAAAAAAAAAAAAAAAAAAAAECcAABAnAAAAAAAAAAAAAAAAAAAAAAAAAAAAAAAAAAAAAAAAAAAAABQAAAAAAAAAwMD/AAAAAABkAAAAMgAAAAAAAABkAAAAAAAAAH9/fwAKAAAAHwAAAFQAAAAAAAAFAAAAAQAAAAAAAAAAAAAAAAAAAAAAAAAAAAAAAAAAAAAAAAAAAAAAAn9/fwAAAAADzMzMAMDA/wB/f38AAAAAAAAAAAAAAAAAAAAAAAAAAAAhAAAAGAAAABQAAABQKAAAGycAAHA1AABZKQAAEAAAACYAAAAIAAAAAAAAAAAAAAA="/>
               </a:ext>
             </a:extLst>
           </p:cNvSpPr>
@@ -2183,7 +2158,7 @@
           <a:lstStyle/>
           <a:p>
             <a:pPr/>
-            <a:fld id="{26343423-6DCB-61C2-858C-9B977AC273CE}" type="slidenum">
+            <a:fld id="{3F74E195-DBD2-2117-9CCC-2D42AF826A78}" type="slidenum">
               <a:t/>
             </a:fld>
           </a:p>
@@ -2221,7 +2196,7 @@
             <a:spLocks noGrp="1" noChangeArrowheads="1"/>
             <a:extLst>
               <a:ext uri="smNativeData">
-                <pr:smNativeData xmlns:pr="smNativeData" val="SMDATA_13_FAOrYBMAAAAlAAAAZAAAAA8BAAAAkAAAAEgAAACQAAAASAAAAAAAAAACAAAAAAAAAAEAAABQAAAAAAAAAAAA4D8AAAAAAADgPwAAAAAAAOA/AAAAAAAA4D8AAAAAAADgPwAAAAAAAOA/AAAAAAAA4D8AAAAAAADgPwAAAAAAAOA/AAAAAAAA4D8CAAAAjAAAAAAAAAAAAAAAu+DjDP///wgAAAAAAAAAAAAAAAAAAAAAAAAAAAAAAAAAAAAAZAAAAAEAAABAAAAAAAAAAAAAAAAAAAAAAAAAAAAAAAAAAAAAAAAAAAAAAAAAAAAAAAAAAAAAAAAAAAAAAAAAAAAAAAAAAAAAAAAAAAAAAAAAAAAAAAAAAAAAAAAAAAAAFAAAADwAAAAAAAAAAAAAAAAAAAkUAAAAAQAAABQAAAAUAAAAFAAAAAEAAAAAAAAAZAAAAGQAAAAAAAAAZAAAAGQAAAAVAAAAYAAAAAAAAAAAAAAADwAAACADAAAAAAAAAAAAAAEAAACgMgAAVgcAAKr4//8BAAAAf39/AAEAAABkAAAAAAAAABQAAABAHwAAAAAAACYAAAAAAAAAwOD//wAAAAAmAAAAZAAAABYAAABMAAAAAAAAAAAAAAAEAAAAAAAAAAEAAACAgIAKAAAAACgAAAAoAAAAZAAAAGQAAAAAAAAAzMzMAAAAAABQAAAAUAAAAGQAAABkAAAAAAAAABcAAAAUAAAAAAAAAAAAAAD/fwAA/38AAAAAAAAJAAAABAAAAItEHmgMAAAAEAAAAAAAAAAAAAAAAAAAAAAAAAAeAAAAaAAAAAAAAAAAAAAAAAAAAAAAAAAAAAAAECcAABAnAAAAAAAAAAAAAAAAAAAAAAAAAAAAAAAAAAAAAAAAAAAAABQAAAAAAAAAwMD/AAAAAABkAAAAMgAAAAAAAABkAAAAAAAAAH9/fwAKAAAAHwAAAFQAAAAAAAAFAAAAAQAAAAAAAAAAAAAAAAAAAAAAAAAAAAAAAAAAAAAAAAAAAAAAAn9/fwAAAAADzMzMAMDA/wB/f38AAAAAAAAAAAAAAAAAAAAAAAAAAAAhAAAAGAAAABQAAADQAgAArgEAAFIVAADUCAAAAAAAACYAAAAIAAAAgYAAAAAAAAA="/>
+                <pr:smNativeData xmlns:pr="smNativeData" val="SMDATA_13_HjisYBMAAAAlAAAAZAAAAA8BAAAAkAAAAEgAAACQAAAASAAAAAAAAAACAAAAAAAAAAEAAABQAAAAAAAAAAAA4D8AAAAAAADgPwAAAAAAAOA/AAAAAAAA4D8AAAAAAADgPwAAAAAAAOA/AAAAAAAA4D8AAAAAAADgPwAAAAAAAOA/AAAAAAAA4D8CAAAAjAAAAAAAAAAAAAAAu+DjDP///wgAAAAAAAAAAAAAAAAAAAAAAAAAAAAAAAAAAAAAZAAAAAEAAABAAAAAAAAAAAAAAAAAAAAAAAAAAAAAAAAAAAAAAAAAAAAAAAAAAAAAAAAAAAAAAAAAAAAAAAAAAAAAAAAAAAAAAAAAAAAAAAAAAAAAAAAAAAAAAAAAAAAAFAAAADwAAAAAAAAAAAAAAAAAAAkUAAAAAQAAABQAAAAUAAAAFAAAAAEAAAAAAAAAZAAAAGQAAAAAAAAAZAAAAGQAAAAVAAAAYAAAAAAAAAAAAAAADwAAACADAAAAAAAAAAAAAAEAAACgMgAAVgcAAKr4//8BAAAAf39/AAEAAABkAAAAAAAAABQAAABAHwAAAAAAACYAAAAAAAAAwOD//wAAAAAmAAAAZAAAABYAAABMAAAAAAAAAAAAAAAEAAAAAAAAAAEAAACAgIAKAAAAACgAAAAoAAAAZAAAAGQAAAAAAAAAzMzMAAAAAABQAAAAUAAAAGQAAABkAAAAAAAAABcAAAAUAAAAAAAAAAAAAAD/fwAA/38AAAAAAAAJAAAABAAAAItEHmgMAAAAEAAAAAAAAAAAAAAAAAAAAAAAAAAeAAAAaAAAAAAAAAAAAAAAAAAAAAAAAAAAAAAAECcAABAnAAAAAAAAAAAAAAAAAAAAAAAAAAAAAAAAAAAAAAAAAAAAABQAAAAAAAAAwMD/AAAAAABkAAAAMgAAAAAAAABkAAAAAAAAAH9/fwAKAAAAHwAAAFQAAAAAAAAFAAAAAQAAAAAAAAAAAAAAAAAAAAAAAAAAAAAAAAAAAAAAAAAAAAAAAn9/fwAAAAADzMzMAMDA/wB/f38AAAAAAAAAAAAAAAAAAAAAAAAAAAAhAAAAGAAAABQAAADQAgAArgEAAFIVAADUCAAAEAAAACYAAAAIAAAAgYAAAAAAAAA="/>
               </a:ext>
             </a:extLst>
           </p:cNvSpPr>
@@ -2261,7 +2236,7 @@
             <a:spLocks noGrp="1" noChangeArrowheads="1"/>
             <a:extLst>
               <a:ext uri="smNativeData">
-                <pr:smNativeData xmlns:pr="smNativeData" val="SMDATA_13_FAOrYBMAAAAlAAAAZAAAAA8BAAAAkAAAAEgAAACQAAAASAAAAAAAAAAAAAAAAAAAAAEAAABQAAAAAAAAAAAA4D8AAAAAAADgPwAAAAAAAOA/AAAAAAAA4D8AAAAAAADgPwAAAAAAAOA/AAAAAAAA4D8AAAAAAADgPwAAAAAAAOA/AAAAAAAA4D8CAAAAjAAAAAAAAAAAAAAAu+DjDP///wgAAAAAAAAAAAAAAAAAAAAAAAAAAAAAAAAAAAAAZAAAAAEAAABAAAAAAAAAAAAAAAAAAAAAAAAAAAAAAAAAAAAAAAAAAAAAAAAAAAAAAAAAAAAAAAAAAAAAAAAAAAAAAAAAAAAAAAAAAAAAAAAAAAAAAAAAAAAAAAAAAAAAFAAAADwAAAAAAAAAAAAAAAAAAAkUAAAAAQAAABQAAAAUAAAAFAAAAAEAAAAAAAAAZAAAAGQAAAAAAAAAZAAAAGQAAAAVAAAAYAAAAAAAAAAAAAAADwAAACADAAAAAAAAAAAAAAEAAACgMgAAVgcAAKr4//8BAAAAf39/AAEAAABkAAAAAAAAABQAAABAHwAAAAAAACYAAAAAAAAAwOD//wAAAAAmAAAAZAAAABYAAABMAAAAAAAAAAAAAAAEAAAAAAAAAAEAAACAgIAKAAAAACgAAAAoAAAAZAAAAGQAAAAAAAAAzMzMAAAAAABQAAAAUAAAAGQAAABkAAAAAAAAABcAAAAUAAAAAAAAAAAAAAD/fwAA/38AAAAAAAAJAAAABAAAAAAAAAAMAAAAEAAAAAAAAAAAAAAAAAAAAAAAAAAeAAAAaAAAAAAAAAAAAAAAAAAAAAAAAAAAAAAAECcAABAnAAAAAAAAAAAAAAAAAAAAAAAAAAAAAAAAAAAAAAAAAAAAABQAAAAAAAAAwMD/AAAAAABkAAAAMgAAAAAAAABkAAAAAAAAAH9/fwAKAAAAHwAAAFQAAAAAAAAFAAAAAQAAAAAAAAAAAAAAAAAAAAAAAAAAAAAAAAAAAAAAAAAAAAAAAn9/fwAAAAADzMzMAMDA/wB/f38AAAAAAAAAAAAAAAAAAAAAAAAAAAAhAAAAGAAAABQAAAD+FQAArgEAAHA1AACwJQAAAAAAACYAAAAIAAAAAYAAAAAAAAA="/>
+                <pr:smNativeData xmlns:pr="smNativeData" val="SMDATA_13_HjisYBMAAAAlAAAAZAAAAA8BAAAAkAAAAEgAAACQAAAASAAAAAAAAAAAAAAAAAAAAAEAAABQAAAAAAAAAAAA4D8AAAAAAADgPwAAAAAAAOA/AAAAAAAA4D8AAAAAAADgPwAAAAAAAOA/AAAAAAAA4D8AAAAAAADgPwAAAAAAAOA/AAAAAAAA4D8CAAAAjAAAAAAAAAAAAAAAu+DjDP///wgAAAAAAAAAAAAAAAAAAAAAAAAAAAAAAAAAAAAAZAAAAAEAAABAAAAAAAAAAAAAAAAAAAAAAAAAAAAAAAAAAAAAAAAAAAAAAAAAAAAAAAAAAAAAAAAAAAAAAAAAAAAAAAAAAAAAAAAAAAAAAAAAAAAAAAAAAAAAAAAAAAAAFAAAADwAAAAAAAAAAAAAAAAAAAkUAAAAAQAAABQAAAAUAAAAFAAAAAEAAAAAAAAAZAAAAGQAAAAAAAAAZAAAAGQAAAAVAAAAYAAAAAAAAAAAAAAADwAAACADAAAAAAAAAAAAAAEAAACgMgAAVgcAAKr4//8BAAAAf39/AAEAAABkAAAAAAAAABQAAABAHwAAAAAAACYAAAAAAAAAwOD//wAAAAAmAAAAZAAAABYAAABMAAAAAAAAAAAAAAAEAAAAAAAAAAEAAACAgIAKAAAAACgAAAAoAAAAZAAAAGQAAAAAAAAAzMzMAAAAAABQAAAAUAAAAGQAAABkAAAAAAAAABcAAAAUAAAAAAAAAAAAAAD/fwAA/38AAAAAAAAJAAAABAAAAAAAAAAMAAAAEAAAAAAAAAAAAAAAAAAAAAAAAAAeAAAAaAAAAAAAAAAAAAAAAAAAAAAAAAAAAAAAECcAABAnAAAAAAAAAAAAAAAAAAAAAAAAAAAAAAAAAAAAAAAAAAAAABQAAAAAAAAAwMD/AAAAAABkAAAAMgAAAAAAAABkAAAAAAAAAH9/fwAKAAAAHwAAAFQAAAAAAAAFAAAAAQAAAAAAAAAAAAAAAAAAAAAAAAAAAAAAAAAAAAAAAAAAAAAAAn9/fwAAAAADzMzMAMDA/wB/f38AAAAAAAAAAAAAAAAAAAAAAAAAAAAhAAAAGAAAABQAAAD+FQAArgEAAHA1AACwJQAAEAAAACYAAAAIAAAAAYAAAAAAAAA="/>
               </a:ext>
             </a:extLst>
           </p:cNvSpPr>
@@ -2345,12 +2320,12 @@
             <a:spLocks noGrp="1" noChangeArrowheads="1"/>
             <a:extLst>
               <a:ext uri="smNativeData">
-                <pr:smNativeData xmlns:pr="smNativeData" val="SMDATA_13_FAOrYBMAAAAlAAAAZAAAAA8BAAAAkAAAAEgAAACQAAAASAAAAAAAAAAAAAAAAAAAAAEAAABQAAAAAAAAAAAA4D8AAAAAAADgPwAAAAAAAOA/AAAAAAAA4D8AAAAAAADgPwAAAAAAAOA/AAAAAAAA4D8AAAAAAADgPwAAAAAAAOA/AAAAAAAA4D8CAAAAjAAAAAAAAAAAAAAAu+DjDP///wgAAAAAAAAAAAAAAAAAAAAAAAAAAAAAAAAAAAAAZAAAAAEAAABAAAAAAAAAAAAAAAAAAAAAAAAAAAAAAAAAAAAAAAAAAAAAAAAAAAAAAAAAAAAAAAAAAAAAAAAAAAAAAAAAAAAAAAAAAAAAAAAAAAAAAAAAAAAAAAAAAAAAFAAAADwAAAAAAAAAAAAAAAAAAAkUAAAAAQAAABQAAAAUAAAAFAAAAAEAAAAAAAAAZAAAAGQAAAAAAAAAZAAAAGQAAAAVAAAAYAAAAAAAAAAAAAAADwAAACADAAAAAAAAAAAAAAEAAACgMgAAVgcAAKr4//8BAAAAf39/AAEAAABkAAAAAAAAABQAAABAHwAAAAAAACYAAAAAAAAAwOD//wAAAAAmAAAAZAAAABYAAABMAAAAAAAAAAAAAAAEAAAAAAAAAAEAAACAgIAKAAAAACgAAAAoAAAAZAAAAGQAAAAAAAAAzMzMAAAAAABQAAAAUAAAAGQAAABkAAAAAAAAABcAAAAUAAAAAAAAAAAAAAD/fwAA/38AAAAAAAAJAAAABAAAAAAAAAAMAAAAEAAAAAAAAAAAAAAAAAAAAAAAAAAeAAAAaAAAAAAAAAAAAAAAAAAAAAAAAAAAAAAAECcAABAnAAAAAAAAAAAAAAAAAAAAAAAAAAAAAAAAAAAAAAAAAAAAABQAAAAAAAAAwMD/AAAAAABkAAAAMgAAAAAAAABkAAAAAAAAAH9/fwAKAAAAHwAAAFQAAAAAAAAFAAAAAQAAAAAAAAAAAAAAAAAAAAAAAAAAAAAAAAAAAAAAAAAAAAAAAn9/fwAAAAADzMzMAMDA/wB/f38AAAAAAAAAAAAAAAAAAAAAAAAAAAAhAAAAGAAAABQAAADQAgAA1AgAAFIVAACwJQAAAAAAACYAAAAIAAAAAYAAAAAAAAA="/>
-              </a:ext>
-            </a:extLst>
-          </p:cNvSpPr>
-          <p:nvPr>
-            <p:ph sz="half" idx="2"/>
+                <pr:smNativeData xmlns:pr="smNativeData" val="SMDATA_13_HjisYBMAAAAlAAAAZAAAAA8BAAAAkAAAAEgAAACQAAAASAAAAAAAAAAAAAAAAAAAAAEAAABQAAAAAAAAAAAA4D8AAAAAAADgPwAAAAAAAOA/AAAAAAAA4D8AAAAAAADgPwAAAAAAAOA/AAAAAAAA4D8AAAAAAADgPwAAAAAAAOA/AAAAAAAA4D8CAAAAjAAAAAAAAAAAAAAAu+DjDP///wgAAAAAAAAAAAAAAAAAAAAAAAAAAAAAAAAAAAAAZAAAAAEAAABAAAAAAAAAAAAAAAAAAAAAAAAAAAAAAAAAAAAAAAAAAAAAAAAAAAAAAAAAAAAAAAAAAAAAAAAAAAAAAAAAAAAAAAAAAAAAAAAAAAAAAAAAAAAAAAAAAAAAFAAAADwAAAAAAAAAAAAAAAAAAAkUAAAAAQAAABQAAAAUAAAAFAAAAAEAAAAAAAAAZAAAAGQAAAAAAAAAZAAAAGQAAAAVAAAAYAAAAAAAAAAAAAAADwAAACADAAAAAAAAAAAAAAEAAACgMgAAVgcAAKr4//8BAAAAf39/AAEAAABkAAAAAAAAABQAAABAHwAAAAAAACYAAAAAAAAAwOD//wAAAAAmAAAAZAAAABYAAABMAAAAAAAAAAAAAAAEAAAAAAAAAAEAAACAgIAKAAAAACgAAAAoAAAAZAAAAGQAAAAAAAAAzMzMAAAAAABQAAAAUAAAAGQAAABkAAAAAAAAABcAAAAUAAAAAAAAAAAAAAD/fwAA/38AAAAAAAAJAAAABAAAAAAAAAAMAAAAEAAAAAAAAAAAAAAAAAAAAAAAAAAeAAAAaAAAAAAAAAAAAAAAAAAAAAAAAAAAAAAAECcAABAnAAAAAAAAAAAAAAAAAAAAAAAAAAAAAAAAAAAAAAAAAAAAABQAAAAAAAAAwMD/AAAAAABkAAAAMgAAAAAAAABkAAAAAAAAAH9/fwAKAAAAHwAAAFQAAAAAAAAFAAAAAQAAAAAAAAAAAAAAAAAAAAAAAAAAAAAAAAAAAAAAAAAAAAAAAn9/fwAAAAADzMzMAMDA/wB/f38AAAAAAAAAAAAAAAAAAAAAAAAAAAAhAAAAGAAAABQAAADQAgAA1AgAAFIVAACwJQAAEAAAACYAAAAIAAAAAYAAAAAAAAA="/>
+              </a:ext>
+            </a:extLst>
+          </p:cNvSpPr>
+          <p:nvPr>
+            <p:ph idx="2"/>
           </p:nvPr>
         </p:nvSpPr>
         <p:spPr>
@@ -2414,7 +2389,7 @@
             <a:spLocks noGrp="1" noChangeArrowheads="1"/>
             <a:extLst>
               <a:ext uri="smNativeData">
-                <pr:smNativeData xmlns:pr="smNativeData" val="SMDATA_13_FAOrYBMAAAAlAAAAZAAAAA8BAAAAkAAAAEgAAACQAAAASAAAAAAAAAABAAAAAAAAAAEAAABQAAAAAAAAAAAA4D8AAAAAAADgPwAAAAAAAOA/AAAAAAAA4D8AAAAAAADgPwAAAAAAAOA/AAAAAAAA4D8AAAAAAADgPwAAAAAAAOA/AAAAAAAA4D8CAAAAjAAAAAAAAAAAAAAAu+DjDP///wgAAAAAAAAAAAAAAAAAAAAAAAAAAAAAAAAAAAAAZAAAAAEAAABAAAAAAAAAAAAAAAAAAAAAAAAAAAAAAAAAAAAAAAAAAAAAAAAAAAAAAAAAAAAAAAAAAAAAAAAAAAAAAAAAAAAAAAAAAAAAAAAAAAAAAAAAAAAAAAAAAAAAFAAAADwAAAAAAAAAAAAAAAAAAAkUAAAAAQAAABQAAAAUAAAAFAAAAAEAAAAAAAAAZAAAAGQAAAAAAAAAZAAAAGQAAAAVAAAAYAAAAAAAAAAAAAAADwAAACADAAAAAAAAAAAAAAEAAACgMgAAVgcAAKr4//8BAAAAf39/AAEAAABkAAAAAAAAABQAAABAHwAAAAAAACYAAAAAAAAAwOD//wAAAAAmAAAAZAAAABYAAABMAAAAAAAAAAAAAAAEAAAAAAAAAAEAAACAgIAKAAAAACgAAAAoAAAAZAAAAGQAAAAAAAAAzMzMAAAAAABQAAAAUAAAAGQAAABkAAAAAAAAABcAAAAUAAAAAAAAAAAAAAD/fwAA/38AAAAAAAAJAAAABAAAAAAAAAAMAAAAEAAAAAAAAAAAAAAAAAAAAAAAAAAeAAAAaAAAAAAAAAAAAAAAAAAAAAAAAAAAAAAAECcAABAnAAAAAAAAAAAAAAAAAAAAAAAAAAAAAAAAAAAAAAAAAAAAABQAAAAAAAAAwMD/AAAAAABkAAAAMgAAAAAAAABkAAAAAAAAAH9/fwAKAAAAHwAAAFQAAAAAAAAFAAAAAQAAAAAAAAAAAAAAAAAAAAAAAAAAAAAAAAAAAAAAAAAAAAAAAn9/fwAAAAADzMzMAMDA/wB/f38AAAAAAAAAAAAAAAAAAAAAAAAAAAAhAAAAGAAAABQAAADQAgAAGycAAPAPAABZKQAAAAAAACYAAAAIAAAAAAAAAAAAAAA="/>
+                <pr:smNativeData xmlns:pr="smNativeData" val="SMDATA_13_HjisYBMAAAAlAAAAZAAAAA8BAAAAkAAAAEgAAACQAAAASAAAAAAAAAABAAAAAAAAAAEAAABQAAAAAAAAAAAA4D8AAAAAAADgPwAAAAAAAOA/AAAAAAAA4D8AAAAAAADgPwAAAAAAAOA/AAAAAAAA4D8AAAAAAADgPwAAAAAAAOA/AAAAAAAA4D8CAAAAjAAAAAAAAAAAAAAAu+DjDP///wgAAAAAAAAAAAAAAAAAAAAAAAAAAAAAAAAAAAAAZAAAAAEAAABAAAAAAAAAAAAAAAAAAAAAAAAAAAAAAAAAAAAAAAAAAAAAAAAAAAAAAAAAAAAAAAAAAAAAAAAAAAAAAAAAAAAAAAAAAAAAAAAAAAAAAAAAAAAAAAAAAAAAFAAAADwAAAAAAAAAAAAAAAAAAAkUAAAAAQAAABQAAAAUAAAAFAAAAAEAAAAAAAAAZAAAAGQAAAAAAAAAZAAAAGQAAAAVAAAAYAAAAAAAAAAAAAAADwAAACADAAAAAAAAAAAAAAEAAACgMgAAVgcAAKr4//8BAAAAf39/AAEAAABkAAAAAAAAABQAAABAHwAAAAAAACYAAAAAAAAAwOD//wAAAAAmAAAAZAAAABYAAABMAAAAAAAAAAAAAAAEAAAAAAAAAAEAAACAgIAKAAAAACgAAAAoAAAAZAAAAGQAAAAAAAAAzMzMAAAAAABQAAAAUAAAAGQAAABkAAAAAAAAABcAAAAUAAAAAAAAAAAAAAD/fwAA/38AAAAAAAAJAAAABAAAAAAAAAAMAAAAEAAAAAAAAAAAAAAAAAAAAAAAAAAeAAAAaAAAAAAAAAAAAAAAAAAAAAAAAAAAAAAAECcAABAnAAAAAAAAAAAAAAAAAAAAAAAAAAAAAAAAAAAAAAAAAAAAABQAAAAAAAAAwMD/AAAAAABkAAAAMgAAAAAAAABkAAAAAAAAAH9/fwAKAAAAHwAAAFQAAAAAAAAFAAAAAQAAAAAAAAAAAAAAAAAAAAAAAAAAAAAAAAAAAAAAAAAAAAAAAn9/fwAAAAADzMzMAMDA/wB/f38AAAAAAAAAAAAAAAAAAAAAAAAAAAAhAAAAGAAAABQAAADQAgAAGycAAPAPAABZKQAAEAAAACYAAAAIAAAAAAAAAAAAAAA="/>
               </a:ext>
             </a:extLst>
           </p:cNvSpPr>
@@ -2428,7 +2403,7 @@
           <a:lstStyle/>
           <a:p>
             <a:pPr/>
-            <a:fld id="{2634152C-62CB-61E3-858C-94B65BC273C1}" type="datetime1">
+            <a:fld id="{3F74A62A-64D2-2150-9CCC-9205E8826AC7}" type="datetime1">
               <a:t/>
             </a:fld>
           </a:p>
@@ -2441,7 +2416,7 @@
             <a:spLocks noGrp="1" noChangeArrowheads="1"/>
             <a:extLst>
               <a:ext uri="smNativeData">
-                <pr:smNativeData xmlns:pr="smNativeData" val="SMDATA_13_FAOrYBMAAAAlAAAAZAAAAA8BAAAAkAAAAEgAAACQAAAASAAAAAAAAAABAAAAAAAAAAEAAABQAAAAAAAAAAAA4D8AAAAAAADgPwAAAAAAAOA/AAAAAAAA4D8AAAAAAADgPwAAAAAAAOA/AAAAAAAA4D8AAAAAAADgPwAAAAAAAOA/AAAAAAAA4D8CAAAAjAAAAAAAAAAAAAAAu+DjDP///wgAAAAAAAAAAAAAAAAAAAAAAAAAAAAAAAAAAAAAZAAAAAEAAABAAAAAAAAAAAAAAAAAAAAAAAAAAAAAAAAAAAAAAAAAAAAAAAAAAAAAAAAAAAAAAAAAAAAAAAAAAAAAAAAAAAAAAAAAAAAAAAAAAAAAAAAAAAAAAAAAAAAAFAAAADwAAAAAAAAAAAAAAAAAAAkUAAAAAQAAABQAAAAUAAAAFAAAAAEAAAAAAAAAZAAAAGQAAAAAAAAAZAAAAGQAAAAVAAAAYAAAAAAAAAAAAAAADwAAACADAAAAAAAAAAAAAAEAAACgMgAAVgcAAKr4//8BAAAAf39/AAEAAABkAAAAAAAAABQAAABAHwAAAAAAACYAAAAAAAAAwOD//wAAAAAmAAAAZAAAABYAAABMAAAAAAAAAAAAAAAEAAAAAAAAAAEAAACAgIAKAAAAACgAAAAoAAAAZAAAAGQAAAAAAAAAzMzMAAAAAABQAAAAUAAAAGQAAABkAAAAAAAAABcAAAAUAAAAAAAAAAAAAAD/fwAA/38AAAAAAAAJAAAABAAAAP////8MAAAAEAAAAAAAAAAAAAAAAAAAAAAAAAAeAAAAaAAAAAAAAAAAAAAAAAAAAAAAAAAAAAAAECcAABAnAAAAAAAAAAAAAAAAAAAAAAAAAAAAAAAAAAAAAAAAAAAAABQAAAAAAAAAwMD/AAAAAABkAAAAMgAAAAAAAABkAAAAAAAAAH9/fwAKAAAAHwAAAFQAAAAAAAAFAAAAAQAAAAAAAAAAAAAAAAAAAAAAAAAAAAAAAAAAAAAAAAAAAAAAAn9/fwAAAAADzMzMAMDA/wB/f38AAAAAAAAAAAAAAAAAAAAAAAAAAAAhAAAAGAAAABQAAAA4EwAAGycAAAglAABZKQAAAAAAACYAAAAIAAAAAAAAAAAAAAA="/>
+                <pr:smNativeData xmlns:pr="smNativeData" val="SMDATA_13_HjisYBMAAAAlAAAAZAAAAA8BAAAAkAAAAEgAAACQAAAASAAAAAAAAAABAAAAAAAAAAEAAABQAAAAAAAAAAAA4D8AAAAAAADgPwAAAAAAAOA/AAAAAAAA4D8AAAAAAADgPwAAAAAAAOA/AAAAAAAA4D8AAAAAAADgPwAAAAAAAOA/AAAAAAAA4D8CAAAAjAAAAAAAAAAAAAAAu+DjDP///wgAAAAAAAAAAAAAAAAAAAAAAAAAAAAAAAAAAAAAZAAAAAEAAABAAAAAAAAAAAAAAAAAAAAAAAAAAAAAAAAAAAAAAAAAAAAAAAAAAAAAAAAAAAAAAAAAAAAAAAAAAAAAAAAAAAAAAAAAAAAAAAAAAAAAAAAAAAAAAAAAAAAAFAAAADwAAAAAAAAAAAAAAAAAAAkUAAAAAQAAABQAAAAUAAAAFAAAAAEAAAAAAAAAZAAAAGQAAAAAAAAAZAAAAGQAAAAVAAAAYAAAAAAAAAAAAAAADwAAACADAAAAAAAAAAAAAAEAAACgMgAAVgcAAKr4//8BAAAAf39/AAEAAABkAAAAAAAAABQAAABAHwAAAAAAACYAAAAAAAAAwOD//wAAAAAmAAAAZAAAABYAAABMAAAAAAAAAAAAAAAEAAAAAAAAAAEAAACAgIAKAAAAACgAAAAoAAAAZAAAAGQAAAAAAAAAzMzMAAAAAABQAAAAUAAAAGQAAABkAAAAAAAAABcAAAAUAAAAAAAAAAAAAAD/fwAA/38AAAAAAAAJAAAABAAAAP////8MAAAAEAAAAAAAAAAAAAAAAAAAAAAAAAAeAAAAaAAAAAAAAAAAAAAAAAAAAAAAAAAAAAAAECcAABAnAAAAAAAAAAAAAAAAAAAAAAAAAAAAAAAAAAAAAAAAAAAAABQAAAAAAAAAwMD/AAAAAABkAAAAMgAAAAAAAABkAAAAAAAAAH9/fwAKAAAAHwAAAFQAAAAAAAAFAAAAAQAAAAAAAAAAAAAAAAAAAAAAAAAAAAAAAAAAAAAAAAAAAAAAAn9/fwAAAAADzMzMAMDA/wB/f38AAAAAAAAAAAAAAAAAAAAAAAAAAAAhAAAAGAAAABQAAAA4EwAAGycAAAglAABZKQAAEAAAACYAAAAIAAAAAAAAAAAAAAA="/>
               </a:ext>
             </a:extLst>
           </p:cNvSpPr>
@@ -2455,9 +2430,6 @@
           <a:lstStyle/>
           <a:p>
             <a:pPr/>
-            <a:r>
-              <a:t/>
-            </a:r>
           </a:p>
         </p:txBody>
       </p:sp>
@@ -2468,7 +2440,7 @@
             <a:spLocks noGrp="1" noChangeArrowheads="1"/>
             <a:extLst>
               <a:ext uri="smNativeData">
-                <pr:smNativeData xmlns:pr="smNativeData" val="SMDATA_13_FAOrYBMAAAAlAAAAZAAAAA8BAAAAkAAAAEgAAACQAAAASAAAAAAAAAABAAAAAAAAAAEAAABQAAAAAAAAAAAA4D8AAAAAAADgPwAAAAAAAOA/AAAAAAAA4D8AAAAAAADgPwAAAAAAAOA/AAAAAAAA4D8AAAAAAADgPwAAAAAAAOA/AAAAAAAA4D8CAAAAjAAAAAAAAAAAAAAAu+DjDP///wgAAAAAAAAAAAAAAAAAAAAAAAAAAAAAAAAAAAAAZAAAAAEAAABAAAAAAAAAAAAAAAAAAAAAAAAAAAAAAAAAAAAAAAAAAAAAAAAAAAAAAAAAAAAAAAAAAAAAAAAAAAAAAAAAAAAAAAAAAAAAAAAAAAAAAAAAAAAAAAAAAAAAFAAAADwAAAAAAAAAAAAAAAAAAAkUAAAAAQAAABQAAAAUAAAAFAAAAAEAAAAAAAAAZAAAAGQAAAAAAAAAZAAAAGQAAAAVAAAAYAAAAAAAAAAAAAAADwAAACADAAAAAAAAAAAAAAEAAACgMgAAVgcAAKr4//8BAAAAf39/AAEAAABkAAAAAAAAABQAAABAHwAAAAAAACYAAAAAAAAAwOD//wAAAAAmAAAAZAAAABYAAABMAAAAAAAAAAAAAAAEAAAAAAAAAAEAAACAgIAKAAAAACgAAAAoAAAAZAAAAGQAAAAAAAAAzMzMAAAAAABQAAAAUAAAAGQAAABkAAAAAAAAABcAAAAUAAAAAAAAAAAAAAD/fwAA/38AAAAAAAAJAAAABAAAAAAAAAAMAAAAEAAAAAAAAAAAAAAAAAAAAAAAAAAeAAAAaAAAAAAAAAAAAAAAAAAAAAAAAAAAAAAAECcAABAnAAAAAAAAAAAAAAAAAAAAAAAAAAAAAAAAAAAAAAAAAAAAABQAAAAAAAAAwMD/AAAAAABkAAAAMgAAAAAAAABkAAAAAAAAAH9/fwAKAAAAHwAAAFQAAAAAAAAFAAAAAQAAAAAAAAAAAAAAAAAAAAAAAAAAAAAAAAAAAAAAAAAAAAAAAn9/fwAAAAADzMzMAMDA/wB/f38AAAAAAAAAAAAAAAAAAAAAAAAAAAAhAAAAGAAAABQAAABQKAAAGycAAHA1AABZKQAAAAAAACYAAAAIAAAAAAAAAAAAAAA="/>
+                <pr:smNativeData xmlns:pr="smNativeData" val="SMDATA_13_HjisYBMAAAAlAAAAZAAAAA8BAAAAkAAAAEgAAACQAAAASAAAAAAAAAABAAAAAAAAAAEAAABQAAAAAAAAAAAA4D8AAAAAAADgPwAAAAAAAOA/AAAAAAAA4D8AAAAAAADgPwAAAAAAAOA/AAAAAAAA4D8AAAAAAADgPwAAAAAAAOA/AAAAAAAA4D8CAAAAjAAAAAAAAAAAAAAAu+DjDP///wgAAAAAAAAAAAAAAAAAAAAAAAAAAAAAAAAAAAAAZAAAAAEAAABAAAAAAAAAAAAAAAAAAAAAAAAAAAAAAAAAAAAAAAAAAAAAAAAAAAAAAAAAAAAAAAAAAAAAAAAAAAAAAAAAAAAAAAAAAAAAAAAAAAAAAAAAAAAAAAAAAAAAFAAAADwAAAAAAAAAAAAAAAAAAAkUAAAAAQAAABQAAAAUAAAAFAAAAAEAAAAAAAAAZAAAAGQAAAAAAAAAZAAAAGQAAAAVAAAAYAAAAAAAAAAAAAAADwAAACADAAAAAAAAAAAAAAEAAACgMgAAVgcAAKr4//8BAAAAf39/AAEAAABkAAAAAAAAABQAAABAHwAAAAAAACYAAAAAAAAAwOD//wAAAAAmAAAAZAAAABYAAABMAAAAAAAAAAAAAAAEAAAAAAAAAAEAAACAgIAKAAAAACgAAAAoAAAAZAAAAGQAAAAAAAAAzMzMAAAAAABQAAAAUAAAAGQAAABkAAAAAAAAABcAAAAUAAAAAAAAAAAAAAD/fwAA/38AAAAAAAAJAAAABAAAAAAAAAAMAAAAEAAAAAAAAAAAAAAAAAAAAAAAAAAeAAAAaAAAAAAAAAAAAAAAAAAAAAAAAAAAAAAAECcAABAnAAAAAAAAAAAAAAAAAAAAAAAAAAAAAAAAAAAAAAAAAAAAABQAAAAAAAAAwMD/AAAAAABkAAAAMgAAAAAAAABkAAAAAAAAAH9/fwAKAAAAHwAAAFQAAAAAAAAFAAAAAQAAAAAAAAAAAAAAAAAAAAAAAAAAAAAAAAAAAAAAAAAAAAAAAn9/fwAAAAADzMzMAMDA/wB/f38AAAAAAAAAAAAAAAAAAAAAAAAAAAAhAAAAGAAAABQAAABQKAAAGycAAHA1AABZKQAAEAAAACYAAAAIAAAAAAAAAAAAAAA="/>
               </a:ext>
             </a:extLst>
           </p:cNvSpPr>
@@ -2482,7 +2454,7 @@
           <a:lstStyle/>
           <a:p>
             <a:pPr/>
-            <a:fld id="{26344FB0-FECB-61B9-858C-08EC01C2735D}" type="slidenum">
+            <a:fld id="{3F74C8A9-E7D2-213E-9CCC-116B86826A44}" type="slidenum">
               <a:t/>
             </a:fld>
           </a:p>
@@ -2520,7 +2492,7 @@
             <a:spLocks noGrp="1" noChangeArrowheads="1"/>
             <a:extLst>
               <a:ext uri="smNativeData">
-                <pr:smNativeData xmlns:pr="smNativeData" val="SMDATA_13_FAOrYBMAAAAlAAAAZAAAAA8BAAAAkAAAAEgAAACQAAAASAAAAAAAAAACAAAAAAAAAAEAAABQAAAAAAAAAAAA4D8AAAAAAADgPwAAAAAAAOA/AAAAAAAA4D8AAAAAAADgPwAAAAAAAOA/AAAAAAAA4D8AAAAAAADgPwAAAAAAAOA/AAAAAAAA4D8CAAAAjAAAAAAAAAAAAAAAu+DjDP///wgAAAAAAAAAAAAAAAAAAAAAAAAAAAAAAAAAAAAAZAAAAAEAAABAAAAAAAAAAAAAAAAAAAAAAAAAAAAAAAAAAAAAAAAAAAAAAAAAAAAAAAAAAAAAAAAAAAAAAAAAAAAAAAAAAAAAAAAAAAAAAAAAAAAAAAAAAAAAAAAAAAAAFAAAADwAAAAAAAAAAAAAAAAAAAkUAAAAAQAAABQAAAAUAAAAFAAAAAEAAAAAAAAAZAAAAGQAAAAAAAAAZAAAAGQAAAAVAAAAYAAAAAAAAAAAAAAADwAAACADAAAAAAAAAAAAAAEAAACgMgAAVgcAAKr4//8BAAAAf39/AAEAAABkAAAAAAAAABQAAABAHwAAAAAAACYAAAAAAAAAwOD//wAAAAAmAAAAZAAAABYAAABMAAAAAAAAAAAAAAAEAAAAAAAAAAEAAACAgIAKAAAAACgAAAAoAAAAZAAAAGQAAAAAAAAAzMzMAAAAAABQAAAAUAAAAGQAAABkAAAAAAAAABcAAAAUAAAAAAAAAAAAAAD/fwAA/38AAAAAAAAJAAAABAAAAAAAAAAMAAAAEAAAAAAAAAAAAAAAAAAAAAAAAAAeAAAAaAAAAAAAAAAAAAAAAAAAAAAAAAAAAAAAECcAABAnAAAAAAAAAAAAAAAAAAAAAAAAAAAAAAAAAAAAAAAAAAAAABQAAAAAAAAAwMD/AAAAAABkAAAAMgAAAAAAAABkAAAAAAAAAH9/fwAKAAAAHwAAAFQAAAAAAAAFAAAAAQAAAAAAAAAAAAAAAAAAAAAAAAAAAAAAAAAAAAAAAAAAAAAAAn9/fwAAAAADzMzMAMDA/wB/f38AAAAAAAAAAAAAAAAAAAAAAAAAAAAhAAAAGAAAABQAAAAGCwAAiB0AAMYsAAAEIQAAAAAAACYAAAAIAAAAgYAAAAAAAAA="/>
+                <pr:smNativeData xmlns:pr="smNativeData" val="SMDATA_13_HjisYBMAAAAlAAAAZAAAAA8BAAAAkAAAAEgAAACQAAAASAAAAAAAAAACAAAAAAAAAAEAAABQAAAAAAAAAAAA4D8AAAAAAADgPwAAAAAAAOA/AAAAAAAA4D8AAAAAAADgPwAAAAAAAOA/AAAAAAAA4D8AAAAAAADgPwAAAAAAAOA/AAAAAAAA4D8CAAAAjAAAAAAAAAAAAAAAu+DjDP///wgAAAAAAAAAAAAAAAAAAAAAAAAAAAAAAAAAAAAAZAAAAAEAAABAAAAAAAAAAAAAAAAAAAAAAAAAAAAAAAAAAAAAAAAAAAAAAAAAAAAAAAAAAAAAAAAAAAAAAAAAAAAAAAAAAAAAAAAAAAAAAAAAAAAAAAAAAAAAAAAAAAAAFAAAADwAAAAAAAAAAAAAAAAAAAkUAAAAAQAAABQAAAAUAAAAFAAAAAEAAAAAAAAAZAAAAGQAAAAAAAAAZAAAAGQAAAAVAAAAYAAAAAAAAAAAAAAADwAAACADAAAAAAAAAAAAAAEAAACgMgAAVgcAAKr4//8BAAAAf39/AAEAAABkAAAAAAAAABQAAABAHwAAAAAAACYAAAAAAAAAwOD//wAAAAAmAAAAZAAAABYAAABMAAAAAAAAAAAAAAAEAAAAAAAAAAEAAACAgIAKAAAAACgAAAAoAAAAZAAAAGQAAAAAAAAAzMzMAAAAAABQAAAAUAAAAGQAAABkAAAAAAAAABcAAAAUAAAAAAAAAAAAAAD/fwAA/38AAAAAAAAJAAAABAAAAAAAAAAMAAAAEAAAAAAAAAAAAAAAAAAAAAAAAAAeAAAAaAAAAAAAAAAAAAAAAAAAAAAAAAAAAAAAECcAABAnAAAAAAAAAAAAAAAAAAAAAAAAAAAAAAAAAAAAAAAAAAAAABQAAAAAAAAAwMD/AAAAAABkAAAAMgAAAAAAAABkAAAAAAAAAH9/fwAKAAAAHwAAAFQAAAAAAAAFAAAAAQAAAAAAAAAAAAAAAAAAAAAAAAAAAAAAAAAAAAAAAAAAAAAAAn9/fwAAAAADzMzMAMDA/wB/f38AAAAAAAAAAAAAAAAAAAAAAAAAAAAhAAAAGAAAABQAAAAGCwAAiB0AAMYsAAAEIQAAEAAAACYAAAAIAAAAgYAAAAAAAAA="/>
               </a:ext>
             </a:extLst>
           </p:cNvSpPr>
@@ -2560,7 +2532,7 @@
             <a:spLocks noGrp="1" noChangeArrowheads="1"/>
             <a:extLst>
               <a:ext uri="smNativeData">
-                <pr:smNativeData xmlns:pr="smNativeData" val="SMDATA_13_FAOrYBMAAAAlAAAAZAAAAA8BAAAAkAAAAEgAAACQAAAASAAAAAAAAAAAAAAAAAAAAAEAAABQAAAAAAAAAAAA4D8AAAAAAADgPwAAAAAAAOA/AAAAAAAA4D8AAAAAAADgPwAAAAAAAOA/AAAAAAAA4D8AAAAAAADgPwAAAAAAAOA/AAAAAAAA4D8CAAAAjAAAAAAAAAAAAAAAu+DjDP///wgAAAAAAAAAAAAAAAAAAAAAAAAAAAAAAAAAAAAAZAAAAAEAAABAAAAAAAAAAAAAAAAAAAAAAAAAAAAAAAAAAAAAAAAAAAAAAAAAAAAAAAAAAAAAAAAAAAAAAAAAAAAAAAAAAAAAAAAAAAAAAAAAAAAAAAAAAAAAAAAAAAAAFAAAADwAAAAAAAAAAAAAAAAAAAkUAAAAAQAAABQAAAAUAAAAFAAAAAEAAAAAAAAAZAAAAGQAAAAAAAAAZAAAAGQAAAAVAAAAYAAAAAAAAAAAAAAADwAAACADAAAAAAAAAAAAAAEAAACgMgAAVgcAAKr4//8BAAAAf39/AAEAAABkAAAAAAAAABQAAABAHwAAAAAAACYAAAAAAAAAwOD//wAAAAAmAAAAZAAAABYAAABMAAAAAAAAAAAAAAAEAAAAAAAAAAEAAACAgIAKAAAAACgAAAAoAAAAZAAAAGQAAAAAAAAAzMzMAAAAAABQAAAAUAAAAGQAAABkAAAAAAAAABcAAAAUAAAAAAAAAAAAAAD/fwAA/38AAAAAAAAJAAAABAAAAAQAK0UMAAAAEAAAAAAAAAAAAAAAAAAAAAAAAAAeAAAAaAAAAAAAAAAAAAAAAAAAAAAAAAAAAAAAECcAABAnAAAAAAAAAAAAAAAAAAAAAAAAAAAAAAAAAAAAAAAAAAAAABQAAAAAAAAAwMD/AAAAAABkAAAAMgAAAAAAAABkAAAAAAAAAH9/fwAKAAAAHwAAAFQAAAAAAAAFAAAAAQAAAAAAAAAAAAAAAAAAAAAAAAAAAAAAAAAAAAAAAAAAAAAAAn9/fwAAAAADzMzMAMDA/wB/f38AAAAAAAAAAAAAAAAAAAAAAAAAAAAhAAAAGAAAABQAAAAGCwAAxgMAAMYsAAAWHQAAAAAAACYAAAAIAAAAAYAAAAAAAAA="/>
+                <pr:smNativeData xmlns:pr="smNativeData" val="SMDATA_13_HjisYBMAAAAlAAAAZAAAAA8BAAAAkAAAAEgAAACQAAAASAAAAAAAAAAAAAAAAAAAAAEAAABQAAAAAAAAAAAA4D8AAAAAAADgPwAAAAAAAOA/AAAAAAAA4D8AAAAAAADgPwAAAAAAAOA/AAAAAAAA4D8AAAAAAADgPwAAAAAAAOA/AAAAAAAA4D8CAAAAjAAAAAAAAAAAAAAAu+DjDP///wgAAAAAAAAAAAAAAAAAAAAAAAAAAAAAAAAAAAAAZAAAAAEAAABAAAAAAAAAAAAAAAAAAAAAAAAAAAAAAAAAAAAAAAAAAAAAAAAAAAAAAAAAAAAAAAAAAAAAAAAAAAAAAAAAAAAAAAAAAAAAAAAAAAAAAAAAAAAAAAAAAAAAFAAAADwAAAAAAAAAAAAAAAAAAAkUAAAAAQAAABQAAAAUAAAAFAAAAAEAAAAAAAAAZAAAAGQAAAAAAAAAZAAAAGQAAAAVAAAAYAAAAAAAAAAAAAAADwAAACADAAAAAAAAAAAAAAEAAACgMgAAVgcAAKr4//8BAAAAf39/AAEAAABkAAAAAAAAABQAAABAHwAAAAAAACYAAAAAAAAAwOD//wAAAAAmAAAAZAAAABYAAABMAAAAAAAAAAAAAAAEAAAAAAAAAAEAAACAgIAKAAAAACgAAAAoAAAAZAAAAGQAAAAAAAAAzMzMAAAAAABQAAAAUAAAAGQAAABkAAAAAAAAABcAAAAUAAAAAAAAAAAAAAD/fwAA/38AAAAAAAAJAAAABAAAAAQAK0UMAAAAEAAAAAAAAAAAAAAAAAAAAAAAAAAeAAAAaAAAAAAAAAAAAAAAAAAAAAAAAAAAAAAAECcAABAnAAAAAAAAAAAAAAAAAAAAAAAAAAAAAAAAAAAAAAAAAAAAABQAAAAAAAAAwMD/AAAAAABkAAAAMgAAAAAAAABkAAAAAAAAAH9/fwAKAAAAHwAAAFQAAAAAAAAFAAAAAQAAAAAAAAAAAAAAAAAAAAAAAAAAAAAAAAAAAAAAAAAAAAAAAn9/fwAAAAADzMzMAMDA/wB/f38AAAAAAAAAAAAAAAAAAAAAAAAAAAAhAAAAGAAAABQAAAAGCwAAxgMAAMYsAAAWHQAAEAAAACYAAAAIAAAAAYAAAAAAAAA="/>
               </a:ext>
             </a:extLst>
           </p:cNvSpPr>
@@ -2629,12 +2601,12 @@
             <a:spLocks noGrp="1" noChangeArrowheads="1"/>
             <a:extLst>
               <a:ext uri="smNativeData">
-                <pr:smNativeData xmlns:pr="smNativeData" val="SMDATA_13_FAOrYBMAAAAlAAAAZAAAAA8BAAAAkAAAAEgAAACQAAAASAAAAAAAAAAAAAAAAAAAAAEAAABQAAAAAAAAAAAA4D8AAAAAAADgPwAAAAAAAOA/AAAAAAAA4D8AAAAAAADgPwAAAAAAAOA/AAAAAAAA4D8AAAAAAADgPwAAAAAAAOA/AAAAAAAA4D8CAAAAjAAAAAAAAAAAAAAAu+DjDP///wgAAAAAAAAAAAAAAAAAAAAAAAAAAAAAAAAAAAAAZAAAAAEAAABAAAAAAAAAAAAAAAAAAAAAAAAAAAAAAAAAAAAAAAAAAAAAAAAAAAAAAAAAAAAAAAAAAAAAAAAAAAAAAAAAAAAAAAAAAAAAAAAAAAAAAAAAAAAAAAAAAAAAFAAAADwAAAAAAAAAAAAAAAAAAAkUAAAAAQAAABQAAAAUAAAAFAAAAAEAAAAAAAAAZAAAAGQAAAAAAAAAZAAAAGQAAAAVAAAAYAAAAAAAAAAAAAAADwAAACADAAAAAAAAAAAAAAEAAACgMgAAVgcAAKr4//8BAAAAf39/AAEAAABkAAAAAAAAABQAAABAHwAAAAAAACYAAAAAAAAAwOD//wAAAAAmAAAAZAAAABYAAABMAAAAAAAAAAAAAAAEAAAAAAAAAAEAAACAgIAKAAAAACgAAAAoAAAAZAAAAGQAAAAAAAAAzMzMAAAAAABQAAAAUAAAAGQAAABkAAAAAAAAABcAAAAUAAAAAAAAAAAAAAD/fwAA/38AAAAAAAAJAAAABAAAAAhNxYMMAAAAEAAAAAAAAAAAAAAAAAAAAAAAAAAeAAAAaAAAAAAAAAAAAAAAAAAAAAAAAAAAAAAAECcAABAnAAAAAAAAAAAAAAAAAAAAAAAAAAAAAAAAAAAAAAAAAAAAABQAAAAAAAAAwMD/AAAAAABkAAAAMgAAAAAAAABkAAAAAAAAAH9/fwAKAAAAHwAAAFQAAAAAAAAFAAAAAQAAAAAAAAAAAAAAAAAAAAAAAAAAAAAAAAAAAAAAAAAAAAAAAn9/fwAAAAADzMzMAMDA/wB/f38AAAAAAAAAAAAAAAAAAAAAAAAAAAAhAAAAGAAAABQAAAAGCwAABCEAAMYsAAD4JQAAAAAAACYAAAAIAAAAAYAAAAAAAAA="/>
-              </a:ext>
-            </a:extLst>
-          </p:cNvSpPr>
-          <p:nvPr>
-            <p:ph sz="half" idx="2"/>
+                <pr:smNativeData xmlns:pr="smNativeData" val="SMDATA_13_HjisYBMAAAAlAAAAZAAAAA8BAAAAkAAAAEgAAACQAAAASAAAAAAAAAAAAAAAAAAAAAEAAABQAAAAAAAAAAAA4D8AAAAAAADgPwAAAAAAAOA/AAAAAAAA4D8AAAAAAADgPwAAAAAAAOA/AAAAAAAA4D8AAAAAAADgPwAAAAAAAOA/AAAAAAAA4D8CAAAAjAAAAAAAAAAAAAAAu+DjDP///wgAAAAAAAAAAAAAAAAAAAAAAAAAAAAAAAAAAAAAZAAAAAEAAABAAAAAAAAAAAAAAAAAAAAAAAAAAAAAAAAAAAAAAAAAAAAAAAAAAAAAAAAAAAAAAAAAAAAAAAAAAAAAAAAAAAAAAAAAAAAAAAAAAAAAAAAAAAAAAAAAAAAAFAAAADwAAAAAAAAAAAAAAAAAAAkUAAAAAQAAABQAAAAUAAAAFAAAAAEAAAAAAAAAZAAAAGQAAAAAAAAAZAAAAGQAAAAVAAAAYAAAAAAAAAAAAAAADwAAACADAAAAAAAAAAAAAAEAAACgMgAAVgcAAKr4//8BAAAAf39/AAEAAABkAAAAAAAAABQAAABAHwAAAAAAACYAAAAAAAAAwOD//wAAAAAmAAAAZAAAABYAAABMAAAAAAAAAAAAAAAEAAAAAAAAAAEAAACAgIAKAAAAACgAAAAoAAAAZAAAAGQAAAAAAAAAzMzMAAAAAABQAAAAUAAAAGQAAABkAAAAAAAAABcAAAAUAAAAAAAAAAAAAAD/fwAA/38AAAAAAAAJAAAABAAAAAhNxYMMAAAAEAAAAAAAAAAAAAAAAAAAAAAAAAAeAAAAaAAAAAAAAAAAAAAAAAAAAAAAAAAAAAAAECcAABAnAAAAAAAAAAAAAAAAAAAAAAAAAAAAAAAAAAAAAAAAAAAAABQAAAAAAAAAwMD/AAAAAABkAAAAMgAAAAAAAABkAAAAAAAAAH9/fwAKAAAAHwAAAFQAAAAAAAAFAAAAAQAAAAAAAAAAAAAAAAAAAAAAAAAAAAAAAAAAAAAAAAAAAAAAAn9/fwAAAAADzMzMAMDA/wB/f38AAAAAAAAAAAAAAAAAAAAAAAAAAAAhAAAAGAAAABQAAAAGCwAABCEAAMYsAAD4JQAAEAAAACYAAAAIAAAAAYAAAAAAAAA="/>
+              </a:ext>
+            </a:extLst>
+          </p:cNvSpPr>
+          <p:nvPr>
+            <p:ph idx="2"/>
           </p:nvPr>
         </p:nvSpPr>
         <p:spPr>
@@ -2698,7 +2670,7 @@
             <a:spLocks noGrp="1" noChangeArrowheads="1"/>
             <a:extLst>
               <a:ext uri="smNativeData">
-                <pr:smNativeData xmlns:pr="smNativeData" val="SMDATA_13_FAOrYBMAAAAlAAAAZAAAAA8BAAAAkAAAAEgAAACQAAAASAAAAAAAAAABAAAAAAAAAAEAAABQAAAAAAAAAAAA4D8AAAAAAADgPwAAAAAAAOA/AAAAAAAA4D8AAAAAAADgPwAAAAAAAOA/AAAAAAAA4D8AAAAAAADgPwAAAAAAAOA/AAAAAAAA4D8CAAAAjAAAAAAAAAAAAAAAu+DjDP///wgAAAAAAAAAAAAAAAAAAAAAAAAAAAAAAAAAAAAAZAAAAAEAAABAAAAAAAAAAAAAAAAAAAAAAAAAAAAAAAAAAAAAAAAAAAAAAAAAAAAAAAAAAAAAAAAAAAAAAAAAAAAAAAAAAAAAAAAAAAAAAAAAAAAAAAAAAAAAAAAAAAAAFAAAADwAAAAAAAAAAAAAAAAAAAkUAAAAAQAAABQAAAAUAAAAFAAAAAEAAAAAAAAAZAAAAGQAAAAAAAAAZAAAAGQAAAAVAAAAYAAAAAAAAAAAAAAADwAAACADAAAAAAAAAAAAAAEAAACgMgAAVgcAAKr4//8BAAAAf39/AAEAAABkAAAAAAAAABQAAABAHwAAAAAAACYAAAAAAAAAwOD//wAAAAAmAAAAZAAAABYAAABMAAAAAAAAAAAAAAAEAAAAAAAAAAEAAACAgIAKAAAAACgAAAAoAAAAZAAAAGQAAAAAAAAAzMzMAAAAAABQAAAAUAAAAGQAAABkAAAAAAAAABcAAAAUAAAAAAAAAAAAAAD/fwAA/38AAAAAAAAJAAAABAAAAAAAAAAMAAAAEAAAAAAAAAAAAAAAAAAAAAAAAAAeAAAAaAAAAAAAAAAAAAAAAAAAAAAAAAAAAAAAECcAABAnAAAAAAAAAAAAAAAAAAAAAAAAAAAAAAAAAAAAAAAAAAAAABQAAAAAAAAAwMD/AAAAAABkAAAAMgAAAAAAAABkAAAAAAAAAH9/fwAKAAAAHwAAAFQAAAAAAAAFAAAAAQAAAAAAAAAAAAAAAAAAAAAAAAAAAAAAAAAAAAAAAAAAAAAAAn9/fwAAAAADzMzMAMDA/wB/f38AAAAAAAAAAAAAAAAAAAAAAAAAAAAhAAAAGAAAABQAAADQAgAAGycAAPAPAABZKQAAAAAAACYAAAAIAAAAAAAAAAAAAAA="/>
+                <pr:smNativeData xmlns:pr="smNativeData" val="SMDATA_13_HjisYBMAAAAlAAAAZAAAAA8BAAAAkAAAAEgAAACQAAAASAAAAAAAAAABAAAAAAAAAAEAAABQAAAAAAAAAAAA4D8AAAAAAADgPwAAAAAAAOA/AAAAAAAA4D8AAAAAAADgPwAAAAAAAOA/AAAAAAAA4D8AAAAAAADgPwAAAAAAAOA/AAAAAAAA4D8CAAAAjAAAAAAAAAAAAAAAu+DjDP///wgAAAAAAAAAAAAAAAAAAAAAAAAAAAAAAAAAAAAAZAAAAAEAAABAAAAAAAAAAAAAAAAAAAAAAAAAAAAAAAAAAAAAAAAAAAAAAAAAAAAAAAAAAAAAAAAAAAAAAAAAAAAAAAAAAAAAAAAAAAAAAAAAAAAAAAAAAAAAAAAAAAAAFAAAADwAAAAAAAAAAAAAAAAAAAkUAAAAAQAAABQAAAAUAAAAFAAAAAEAAAAAAAAAZAAAAGQAAAAAAAAAZAAAAGQAAAAVAAAAYAAAAAAAAAAAAAAADwAAACADAAAAAAAAAAAAAAEAAACgMgAAVgcAAKr4//8BAAAAf39/AAEAAABkAAAAAAAAABQAAABAHwAAAAAAACYAAAAAAAAAwOD//wAAAAAmAAAAZAAAABYAAABMAAAAAAAAAAAAAAAEAAAAAAAAAAEAAACAgIAKAAAAACgAAAAoAAAAZAAAAGQAAAAAAAAAzMzMAAAAAABQAAAAUAAAAGQAAABkAAAAAAAAABcAAAAUAAAAAAAAAAAAAAD/fwAA/38AAAAAAAAJAAAABAAAAAAAAAAMAAAAEAAAAAAAAAAAAAAAAAAAAAAAAAAeAAAAaAAAAAAAAAAAAAAAAAAAAAAAAAAAAAAAECcAABAnAAAAAAAAAAAAAAAAAAAAAAAAAAAAAAAAAAAAAAAAAAAAABQAAAAAAAAAwMD/AAAAAABkAAAAMgAAAAAAAABkAAAAAAAAAH9/fwAKAAAAHwAAAFQAAAAAAAAFAAAAAQAAAAAAAAAAAAAAAAAAAAAAAAAAAAAAAAAAAAAAAAAAAAAAAn9/fwAAAAADzMzMAMDA/wB/f38AAAAAAAAAAAAAAAAAAAAAAAAAAAAhAAAAGAAAABQAAADQAgAAGycAAPAPAABZKQAAEAAAACYAAAAIAAAAAAAAAAAAAAA="/>
               </a:ext>
             </a:extLst>
           </p:cNvSpPr>
@@ -2712,7 +2684,7 @@
           <a:lstStyle/>
           <a:p>
             <a:pPr/>
-            <a:fld id="{26343CC2-8CCB-61CA-858C-7A9F72C2732F}" type="datetime1">
+            <a:fld id="{3F74D770-3ED2-2121-9CCC-C87499826A9D}" type="datetime1">
               <a:t/>
             </a:fld>
           </a:p>
@@ -2725,7 +2697,7 @@
             <a:spLocks noGrp="1" noChangeArrowheads="1"/>
             <a:extLst>
               <a:ext uri="smNativeData">
-                <pr:smNativeData xmlns:pr="smNativeData" val="SMDATA_13_FAOrYBMAAAAlAAAAZAAAAA8BAAAAkAAAAEgAAACQAAAASAAAAAAAAAABAAAAAAAAAAEAAABQAAAAAAAAAAAA4D8AAAAAAADgPwAAAAAAAOA/AAAAAAAA4D8AAAAAAADgPwAAAAAAAOA/AAAAAAAA4D8AAAAAAADgPwAAAAAAAOA/AAAAAAAA4D8CAAAAjAAAAAAAAAAAAAAAu+DjDP///wgAAAAAAAAAAAAAAAAAAAAAAAAAAAAAAAAAAAAAZAAAAAEAAABAAAAAAAAAAAAAAAAAAAAAAAAAAAAAAAAAAAAAAAAAAAAAAAAAAAAAAAAAAAAAAAAAAAAAAAAAAAAAAAAAAAAAAAAAAAAAAAAAAAAAAAAAAAAAAAAAAAAAFAAAADwAAAAAAAAAAAAAAAAAAAkUAAAAAQAAABQAAAAUAAAAFAAAAAEAAAAAAAAAZAAAAGQAAAAAAAAAZAAAAGQAAAAVAAAAYAAAAAAAAAAAAAAADwAAACADAAAAAAAAAAAAAAEAAACgMgAAVgcAAKr4//8BAAAAf39/AAEAAABkAAAAAAAAABQAAABAHwAAAAAAACYAAAAAAAAAwOD//wAAAAAmAAAAZAAAABYAAABMAAAAAAAAAAAAAAAEAAAAAAAAAAEAAACAgIAKAAAAACgAAAAoAAAAZAAAAGQAAAAAAAAAzMzMAAAAAABQAAAAUAAAAGQAAABkAAAAAAAAABcAAAAUAAAAAAAAAAAAAAD/fwAA/38AAAAAAAAJAAAABAAAAA9eBAAMAAAAEAAAAAAAAAAAAAAAAAAAAAAAAAAeAAAAaAAAAAAAAAAAAAAAAAAAAAAAAAAAAAAAECcAABAnAAAAAAAAAAAAAAAAAAAAAAAAAAAAAAAAAAAAAAAAAAAAABQAAAAAAAAAwMD/AAAAAABkAAAAMgAAAAAAAABkAAAAAAAAAH9/fwAKAAAAHwAAAFQAAAAAAAAFAAAAAQAAAAAAAAAAAAAAAAAAAAAAAAAAAAAAAAAAAAAAAAAAAAAAAn9/fwAAAAADzMzMAMDA/wB/f38AAAAAAAAAAAAAAAAAAAAAAAAAAAAhAAAAGAAAABQAAAA4EwAAGycAAAglAABZKQAAAAAAACYAAAAIAAAAAAAAAAAAAAA="/>
+                <pr:smNativeData xmlns:pr="smNativeData" val="SMDATA_13_HjisYBMAAAAlAAAAZAAAAA8BAAAAkAAAAEgAAACQAAAASAAAAAAAAAABAAAAAAAAAAEAAABQAAAAAAAAAAAA4D8AAAAAAADgPwAAAAAAAOA/AAAAAAAA4D8AAAAAAADgPwAAAAAAAOA/AAAAAAAA4D8AAAAAAADgPwAAAAAAAOA/AAAAAAAA4D8CAAAAjAAAAAAAAAAAAAAAu+DjDP///wgAAAAAAAAAAAAAAAAAAAAAAAAAAAAAAAAAAAAAZAAAAAEAAABAAAAAAAAAAAAAAAAAAAAAAAAAAAAAAAAAAAAAAAAAAAAAAAAAAAAAAAAAAAAAAAAAAAAAAAAAAAAAAAAAAAAAAAAAAAAAAAAAAAAAAAAAAAAAAAAAAAAAFAAAADwAAAAAAAAAAAAAAAAAAAkUAAAAAQAAABQAAAAUAAAAFAAAAAEAAAAAAAAAZAAAAGQAAAAAAAAAZAAAAGQAAAAVAAAAYAAAAAAAAAAAAAAADwAAACADAAAAAAAAAAAAAAEAAACgMgAAVgcAAKr4//8BAAAAf39/AAEAAABkAAAAAAAAABQAAABAHwAAAAAAACYAAAAAAAAAwOD//wAAAAAmAAAAZAAAABYAAABMAAAAAAAAAAAAAAAEAAAAAAAAAAEAAACAgIAKAAAAACgAAAAoAAAAZAAAAGQAAAAAAAAAzMzMAAAAAABQAAAAUAAAAGQAAABkAAAAAAAAABcAAAAUAAAAAAAAAAAAAAD/fwAA/38AAAAAAAAJAAAABAAAAA9eBAAMAAAAEAAAAAAAAAAAAAAAAAAAAAAAAAAeAAAAaAAAAAAAAAAAAAAAAAAAAAAAAAAAAAAAECcAABAnAAAAAAAAAAAAAAAAAAAAAAAAAAAAAAAAAAAAAAAAAAAAABQAAAAAAAAAwMD/AAAAAABkAAAAMgAAAAAAAABkAAAAAAAAAH9/fwAKAAAAHwAAAFQAAAAAAAAFAAAAAQAAAAAAAAAAAAAAAAAAAAAAAAAAAAAAAAAAAAAAAAAAAAAAAn9/fwAAAAADzMzMAMDA/wB/f38AAAAAAAAAAAAAAAAAAAAAAAAAAAAhAAAAGAAAABQAAAA4EwAAGycAAAglAABZKQAAEAAAACYAAAAIAAAAAAAAAAAAAAA="/>
               </a:ext>
             </a:extLst>
           </p:cNvSpPr>
@@ -2739,9 +2711,6 @@
           <a:lstStyle/>
           <a:p>
             <a:pPr/>
-            <a:r>
-              <a:t/>
-            </a:r>
           </a:p>
         </p:txBody>
       </p:sp>
@@ -2752,7 +2721,7 @@
             <a:spLocks noGrp="1" noChangeArrowheads="1"/>
             <a:extLst>
               <a:ext uri="smNativeData">
-                <pr:smNativeData xmlns:pr="smNativeData" val="SMDATA_13_FAOrYBMAAAAlAAAAZAAAAA8BAAAAkAAAAEgAAACQAAAASAAAAAAAAAABAAAAAAAAAAEAAABQAAAAAAAAAAAA4D8AAAAAAADgPwAAAAAAAOA/AAAAAAAA4D8AAAAAAADgPwAAAAAAAOA/AAAAAAAA4D8AAAAAAADgPwAAAAAAAOA/AAAAAAAA4D8CAAAAjAAAAAAAAAAAAAAAu+DjDP///wgAAAAAAAAAAAAAAAAAAAAAAAAAAAAAAAAAAAAAZAAAAAEAAABAAAAAAAAAAAAAAAAAAAAAAAAAAAAAAAAAAAAAAAAAAAAAAAAAAAAAAAAAAAAAAAAAAAAAAAAAAAAAAAAAAAAAAAAAAAAAAAAAAAAAAAAAAAAAAAAAAAAAFAAAADwAAAAAAAAAAAAAAAAAAAkUAAAAAQAAABQAAAAUAAAAFAAAAAEAAAAAAAAAZAAAAGQAAAAAAAAAZAAAAGQAAAAVAAAAYAAAAAAAAAAAAAAADwAAACADAAAAAAAAAAAAAAEAAACgMgAAVgcAAKr4//8BAAAAf39/AAEAAABkAAAAAAAAABQAAABAHwAAAAAAACYAAAAAAAAAwOD//wAAAAAmAAAAZAAAABYAAABMAAAAAAAAAAAAAAAEAAAAAAAAAAEAAACAgIAKAAAAACgAAAAoAAAAZAAAAGQAAAAAAAAAzMzMAAAAAABQAAAAUAAAAGQAAABkAAAAAAAAABcAAAAUAAAAAAAAAAAAAAD/fwAA/38AAAAAAAAJAAAABAAAAIRJp0YMAAAAEAAAAAAAAAAAAAAAAAAAAAAAAAAeAAAAaAAAAAAAAAAAAAAAAAAAAAAAAAAAAAAAECcAABAnAAAAAAAAAAAAAAAAAAAAAAAAAAAAAAAAAAAAAAAAAAAAABQAAAAAAAAAwMD/AAAAAABkAAAAMgAAAAAAAABkAAAAAAAAAH9/fwAKAAAAHwAAAFQAAAAAAAAFAAAAAQAAAAAAAAAAAAAAAAAAAAAAAAAAAAAAAAAAAAAAAAAAAAAAAn9/fwAAAAADzMzMAMDA/wB/f38AAAAAAAAAAAAAAAAAAAAAAAAAAAAhAAAAGAAAABQAAABQKAAAGycAAHA1AABZKQAAAAAAACYAAAAIAAAAAAAAAAAAAAA="/>
+                <pr:smNativeData xmlns:pr="smNativeData" val="SMDATA_13_HjisYBMAAAAlAAAAZAAAAA8BAAAAkAAAAEgAAACQAAAASAAAAAAAAAABAAAAAAAAAAEAAABQAAAAAAAAAAAA4D8AAAAAAADgPwAAAAAAAOA/AAAAAAAA4D8AAAAAAADgPwAAAAAAAOA/AAAAAAAA4D8AAAAAAADgPwAAAAAAAOA/AAAAAAAA4D8CAAAAjAAAAAAAAAAAAAAAu+DjDP///wgAAAAAAAAAAAAAAAAAAAAAAAAAAAAAAAAAAAAAZAAAAAEAAABAAAAAAAAAAAAAAAAAAAAAAAAAAAAAAAAAAAAAAAAAAAAAAAAAAAAAAAAAAAAAAAAAAAAAAAAAAAAAAAAAAAAAAAAAAAAAAAAAAAAAAAAAAAAAAAAAAAAAFAAAADwAAAAAAAAAAAAAAAAAAAkUAAAAAQAAABQAAAAUAAAAFAAAAAEAAAAAAAAAZAAAAGQAAAAAAAAAZAAAAGQAAAAVAAAAYAAAAAAAAAAAAAAADwAAACADAAAAAAAAAAAAAAEAAACgMgAAVgcAAKr4//8BAAAAf39/AAEAAABkAAAAAAAAABQAAABAHwAAAAAAACYAAAAAAAAAwOD//wAAAAAmAAAAZAAAABYAAABMAAAAAAAAAAAAAAAEAAAAAAAAAAEAAACAgIAKAAAAACgAAAAoAAAAZAAAAGQAAAAAAAAAzMzMAAAAAABQAAAAUAAAAGQAAABkAAAAAAAAABcAAAAUAAAAAAAAAAAAAAD/fwAA/38AAAAAAAAJAAAABAAAAIRJp0YMAAAAEAAAAAAAAAAAAAAAAAAAAAAAAAAeAAAAaAAAAAAAAAAAAAAAAAAAAAAAAAAAAAAAECcAABAnAAAAAAAAAAAAAAAAAAAAAAAAAAAAAAAAAAAAAAAAAAAAABQAAAAAAAAAwMD/AAAAAABkAAAAMgAAAAAAAABkAAAAAAAAAH9/fwAKAAAAHwAAAFQAAAAAAAAFAAAAAQAAAAAAAAAAAAAAAAAAAAAAAAAAAAAAAAAAAAAAAAAAAAAAAn9/fwAAAAADzMzMAMDA/wB/f38AAAAAAAAAAAAAAAAAAAAAAAAAAAAhAAAAGAAAABQAAABQKAAAGycAAHA1AABZKQAAEAAAACYAAAAIAAAAAAAAAAAAAAA="/>
               </a:ext>
             </a:extLst>
           </p:cNvSpPr>
@@ -2766,7 +2735,7 @@
           <a:lstStyle/>
           <a:p>
             <a:pPr/>
-            <a:fld id="{2634791E-50CB-618F-858C-A6DA37C273F3}" type="slidenum">
+            <a:fld id="{3F74CA29-67D2-213C-9CCC-916984826AC4}" type="slidenum">
               <a:t/>
             </a:fld>
           </a:p>
@@ -2812,7 +2781,7 @@
             <a:spLocks noGrp="1" noChangeArrowheads="1"/>
             <a:extLst>
               <a:ext uri="smNativeData">
-                <pr:smNativeData xmlns:pr="smNativeData" val="SMDATA_13_FAOrYBMAAAAlAAAAZAAAAA8BAAAAkAAAAEgAAACQAAAASAAAAAAAAAABAAAAAAAAAAEAAABQAAAAAAAAAAAA4D8AAAAAAADgPwAAAAAAAOA/AAAAAAAA4D8AAAAAAADgPwAAAAAAAOA/AAAAAAAA4D8AAAAAAADgPwAAAAAAAOA/AAAAAAAA4D8CAAAAjAAAAAAAAAAAAAAAu+DjDP///wgAAAAAAAAAAAAAAAAAAAAAAAAAAAAAAAAAAAAAZAAAAAEAAABAAAAAAAAAAAAAAAAAAAAAAAAAAAAAAAAAAAAAAAAAAAAAAAAAAAAAAAAAAAAAAAAAAAAAAAAAAAAAAAAAAAAAAAAAAAAAAAAAAAAAAAAAAAAAAAAAAAAAFAAAADwAAAAAAAAAAAAAAAAAAAkUAAAAAQAAABQAAAAUAAAAFAAAAAEAAAAAAAAAZAAAAGQAAAAAAAAAZAAAAGQAAAAVAAAAYAAAAAAAAAAAAAAADwAAACADAAAAAAAAAAAAAAEAAACgMgAAVgcAAKr4//8BAAAAf39/AAEAAABkAAAAAAAAABQAAABAHwAAAAAAACYAAAAAAAAAwOD//wAAAAAmAAAAZAAAABYAAABMAAAAAAAAAAAAAAAEAAAAAAAAAAEAAACAgIAKAAAAACgAAAAoAAAAZAAAAGQAAAAAAAAAzMzMAAAAAABQAAAAUAAAAGQAAABkAAAAAAAAABcAAAAUAAAAAAAAAAAAAAD/fwAA/38AAAAAAAAJAAAABAAAAAAAAAAMAAAAEAAAAAAAAAAAAAAAAAAAAAAAAAAeAAAAaAAAAAAAAAAAAAAAAAAAAAAAAAAAAAAAECcAABAnAAAAAAAAAAAAAAAAAAAAAAAAAAAAAAAAAAAAAAAAAAAAABQAAAAAAAAAwMD/AAAAAABkAAAAMgAAAAAAAABkAAAAAAAAAH9/fwAKAAAAHwAAAFQAAAAAAAAFAAAAAQAAAAAAAAAAAAAAAAAAAAAAAAAAAAAAAAAAAAAAAAAAAAAAAn9/fwAAAAADzMzMAMDA/wB/f38AAAAAAAAAAAAAAAAAAAAAAAAAAAAhAAAAGAAAABQAAADQAgAAsAEAAHA1AAC4CAAAAAAAACYAAAAIAAAA//////////8="/>
+                <pr:smNativeData xmlns:pr="smNativeData" val="SMDATA_13_HjisYBMAAAAlAAAAZAAAAA8BAAAAkAAAAEgAAACQAAAASAAAAAAAAAABAAAAAAAAAAEAAABQAAAAAAAAAAAA4D8AAAAAAADgPwAAAAAAAOA/AAAAAAAA4D8AAAAAAADgPwAAAAAAAOA/AAAAAAAA4D8AAAAAAADgPwAAAAAAAOA/AAAAAAAA4D8CAAAAjAAAAAAAAAAAAAAAu+DjDP///wgAAAAAAAAAAAAAAAAAAAAAAAAAAAAAAAAAAAAAZAAAAAEAAABAAAAAAAAAAAAAAAAAAAAAAAAAAAAAAAAAAAAAAAAAAAAAAAAAAAAAAAAAAAAAAAAAAAAAAAAAAAAAAAAAAAAAAAAAAAAAAAAAAAAAAAAAAAAAAAAAAAAAFAAAADwAAAAAAAAAAAAAAAAAAAkUAAAAAQAAABQAAAAUAAAAFAAAAAEAAAAAAAAAZAAAAGQAAAAAAAAAZAAAAGQAAAAVAAAAYAAAAAAAAAAAAAAADwAAACADAAAAAAAAAAAAAAEAAACgMgAAVgcAAKr4//8BAAAAf39/AAEAAABkAAAAAAAAABQAAABAHwAAAAAAACYAAAAAAAAAwOD//wAAAAAmAAAAZAAAABYAAABMAAAAAAAAAAAAAAAEAAAAAAAAAAEAAACAgIAKAAAAACgAAAAoAAAAZAAAAGQAAAAAAAAAzMzMAAAAAABQAAAAUAAAAGQAAABkAAAAAAAAABcAAAAUAAAAAAAAAAAAAAD/fwAA/38AAAAAAAAJAAAABAAAAAAAAAAMAAAAEAAAAAAAAAAAAAAAAAAAAAAAAAAeAAAAaAAAAAAAAAAAAAAAAAAAAAAAAAAAAAAAECcAABAnAAAAAAAAAAAAAAAAAAAAAAAAAAAAAAAAAAAAAAAAAAAAABQAAAAAAAAAwMD/AAAAAABkAAAAMgAAAAAAAABkAAAAAAAAAH9/fwAKAAAAHwAAAFQAAAAAAAAFAAAAAQAAAAAAAAAAAAAAAAAAAAAAAAAAAAAAAAAAAAAAAAAAAAAAAn9/fwAAAAADzMzMAMDA/wB/f38AAAAAAAAAAAAAAAAAAAAAAAAAAAAhAAAAGAAAABQAAADQAgAAsAEAAHA1AAC4CAAAEAAAACYAAAAIAAAA//////////8="/>
               </a:ext>
             </a:extLst>
           </p:cNvSpPr>
@@ -2856,7 +2825,7 @@
             <a:spLocks noGrp="1" noChangeArrowheads="1"/>
             <a:extLst>
               <a:ext uri="smNativeData">
-                <pr:smNativeData xmlns:pr="smNativeData" val="SMDATA_13_FAOrYBMAAAAlAAAAZAAAAA8BAAAAkAAAAEgAAACQAAAASAAAAAAAAAAAAAAAAAAAAAEAAABQAAAAAAAAAAAA4D8AAAAAAADgPwAAAAAAAOA/AAAAAAAA4D8AAAAAAADgPwAAAAAAAOA/AAAAAAAA4D8AAAAAAADgPwAAAAAAAOA/AAAAAAAA4D8CAAAAjAAAAAAAAAAAAAAAu+DjDP///wgAAAAAAAAAAAAAAAAAAAAAAAAAAAAAAAAAAAAAZAAAAAEAAABAAAAAAAAAAAAAAAAAAAAAAAAAAAAAAAAAAAAAAAAAAAAAAAAAAAAAAAAAAAAAAAAAAAAAAAAAAAAAAAAAAAAAAAAAAAAAAAAAAAAAAAAAAAAAAAAAAAAAFAAAADwAAAAAAAAAAAAAAAAAAAkUAAAAAQAAABQAAAAUAAAAFAAAAAEAAAAAAAAAZAAAAGQAAAAAAAAAZAAAAGQAAAAVAAAAYAAAAAAAAAAAAAAADwAAACADAAAAAAAAAAAAAAEAAACgMgAAVgcAAKr4//8BAAAAf39/AAEAAABkAAAAAAAAABQAAABAHwAAAAAAACYAAAAAAAAAwOD//wAAAAAmAAAAZAAAABYAAABMAAAAAAAAAAAAAAAEAAAAAAAAAAEAAACAgIAKAAAAACgAAAAoAAAAZAAAAGQAAAAAAAAAzMzMAAAAAABQAAAAUAAAAGQAAABkAAAAAAAAABcAAAAUAAAAAAAAAAAAAAD/fwAA/38AAAAAAAAJAAAABAAAAAAAAAAMAAAAEAAAAAAAAAAAAAAAAAAAAAAAAAAeAAAAaAAAAAAAAAAAAAAAAAAAAAAAAAAAAAAAECcAABAnAAAAAAAAAAAAAAAAAAAAAAAAAAAAAAAAAAAAAAAAAAAAABQAAAAAAAAAwMD/AAAAAABkAAAAMgAAAAAAAABkAAAAAAAAAH9/fwAKAAAAHwAAAFQAAAAAAAAFAAAAAQAAAAAAAAAAAAAAAAAAAAAAAAAAAAAAAAAAAAAAAAAAAAAAAn9/fwAAAAADzMzMAMDA/wB/f38AAAAAAAAAAAAAAAAAAAAAAAAAAAAhAAAAGAAAABQAAADQAgAA2AkAAHA1AACwJQAAAAAAACYAAAAIAAAA//////////8="/>
+                <pr:smNativeData xmlns:pr="smNativeData" val="SMDATA_13_HjisYBMAAAAlAAAAZAAAAA8BAAAAkAAAAEgAAACQAAAASAAAAAAAAAAAAAAAAAAAAAEAAABQAAAAAAAAAAAA4D8AAAAAAADgPwAAAAAAAOA/AAAAAAAA4D8AAAAAAADgPwAAAAAAAOA/AAAAAAAA4D8AAAAAAADgPwAAAAAAAOA/AAAAAAAA4D8CAAAAjAAAAAAAAAAAAAAAu+DjDP///wgAAAAAAAAAAAAAAAAAAAAAAAAAAAAAAAAAAAAAZAAAAAEAAABAAAAAAAAAAAAAAAAAAAAAAAAAAAAAAAAAAAAAAAAAAAAAAAAAAAAAAAAAAAAAAAAAAAAAAAAAAAAAAAAAAAAAAAAAAAAAAAAAAAAAAAAAAAAAAAAAAAAAFAAAADwAAAAAAAAAAAAAAAAAAAkUAAAAAQAAABQAAAAUAAAAFAAAAAEAAAAAAAAAZAAAAGQAAAAAAAAAZAAAAGQAAAAVAAAAYAAAAAAAAAAAAAAADwAAACADAAAAAAAAAAAAAAEAAACgMgAAVgcAAKr4//8BAAAAf39/AAEAAABkAAAAAAAAABQAAABAHwAAAAAAACYAAAAAAAAAwOD//wAAAAAmAAAAZAAAABYAAABMAAAAAAAAAAAAAAAEAAAAAAAAAAEAAACAgIAKAAAAACgAAAAoAAAAZAAAAGQAAAAAAAAAzMzMAAAAAABQAAAAUAAAAGQAAABkAAAAAAAAABcAAAAUAAAAAAAAAAAAAAD/fwAA/38AAAAAAAAJAAAABAAAAAAAAAAMAAAAEAAAAAAAAAAAAAAAAAAAAAAAAAAeAAAAaAAAAAAAAAAAAAAAAAAAAAAAAAAAAAAAECcAABAnAAAAAAAAAAAAAAAAAAAAAAAAAAAAAAAAAAAAAAAAAAAAABQAAAAAAAAAwMD/AAAAAABkAAAAMgAAAAAAAABkAAAAAAAAAH9/fwAKAAAAHwAAAFQAAAAAAAAFAAAAAQAAAAAAAAAAAAAAAAAAAAAAAAAAAAAAAAAAAAAAAAAAAAAAAn9/fwAAAAADzMzMAMDA/wB/f38AAAAAAAAAAAAAAAAAAAAAAAAAAAAhAAAAGAAAABQAAADQAgAA2AkAAHA1AACwJQAAEAAAACYAAAAIAAAA//////////8="/>
               </a:ext>
             </a:extLst>
           </p:cNvSpPr>
@@ -2924,7 +2893,7 @@
             <a:spLocks noGrp="1" noChangeArrowheads="1"/>
             <a:extLst>
               <a:ext uri="smNativeData">
-                <pr:smNativeData xmlns:pr="smNativeData" val="SMDATA_13_FAOrYBMAAAAlAAAAZAAAAA8BAAAAkAAAAEgAAACQAAAASAAAAAAAAAABAAAAAAAAAAEAAABQAAAAAAAAAAAA4D8AAAAAAADgPwAAAAAAAOA/AAAAAAAA4D8AAAAAAADgPwAAAAAAAOA/AAAAAAAA4D8AAAAAAADgPwAAAAAAAOA/AAAAAAAA4D8CAAAAjAAAAAAAAAAAAAAAu+DjDP///wgAAAAAAAAAAAAAAAAAAAAAAAAAAAAAAAAAAAAAZAAAAAEAAABAAAAAAAAAAAAAAAAAAAAAAAAAAAAAAAAAAAAAAAAAAAAAAAAAAAAAAAAAAAAAAAAAAAAAAAAAAAAAAAAAAAAAAAAAAAAAAAAAAAAAAAAAAAAAAAAAAAAAFAAAADwAAAAAAAAAAAAAAAAAAAkUAAAAAQAAABQAAAAUAAAAFAAAAAEAAAAAAAAAZAAAAGQAAAAAAAAAZAAAAGQAAAAVAAAAYAAAAAAAAAAAAAAADwAAACADAAAAAAAAAAAAAAEAAACgMgAAVgcAAKr4//8BAAAAf39/AAEAAABkAAAAAAAAABQAAABAHwAAAAAAACYAAAAAAAAAwOD//wAAAAAmAAAAZAAAABYAAABMAAAAAAAAAAAAAAAEAAAAAAAAAAEAAACAgIAKAAAAACgAAAAoAAAAZAAAAGQAAAAAAAAAzMzMAAAAAABQAAAAUAAAAGQAAABkAAAAAAAAABcAAAAUAAAAAAAAAAAAAAD/fwAA/38AAAAAAAAJAAAABAAAAAAAAAAMAAAAEAAAAAAAAAAAAAAAAAAAAAAAAAAeAAAAaAAAAAAAAAAAAAAAAAAAAAAAAAAAAAAAECcAABAnAAAAAAAAAAAAAAAAAAAAAAAAAAAAAAAAAAAAAAAAAAAAABQAAAAAAAAAwMD/AAAAAABkAAAAMgAAAAAAAABkAAAAAAAAAH9/fwAKAAAAHwAAAFQAAAAAAAAFAAAAAQAAAAAAAAAAAAAAAAAAAAAAAAAAAAAAAAAAAAAAAAAAAAAAAn9/fwAAAAADzMzMAMDA/wB/f38AAAAAAAAAAAAAAAAAAAAAAAAAAAAhAAAAGAAAABQAAADQAgAAGycAAPAPAABZKQAAAAAAACYAAAAIAAAA//////////8="/>
+                <pr:smNativeData xmlns:pr="smNativeData" val="SMDATA_13_HjisYBMAAAAlAAAAZAAAAA8BAAAAkAAAAEgAAACQAAAASAAAAAAAAAABAAAAAAAAAAEAAABQAAAAAAAAAAAA4D8AAAAAAADgPwAAAAAAAOA/AAAAAAAA4D8AAAAAAADgPwAAAAAAAOA/AAAAAAAA4D8AAAAAAADgPwAAAAAAAOA/AAAAAAAA4D8CAAAAjAAAAAAAAAAAAAAAu+DjDP///wgAAAAAAAAAAAAAAAAAAAAAAAAAAAAAAAAAAAAAZAAAAAEAAABAAAAAAAAAAAAAAAAAAAAAAAAAAAAAAAAAAAAAAAAAAAAAAAAAAAAAAAAAAAAAAAAAAAAAAAAAAAAAAAAAAAAAAAAAAAAAAAAAAAAAAAAAAAAAAAAAAAAAFAAAADwAAAAAAAAAAAAAAAAAAAkUAAAAAQAAABQAAAAUAAAAFAAAAAEAAAAAAAAAZAAAAGQAAAAAAAAAZAAAAGQAAAAVAAAAYAAAAAAAAAAAAAAADwAAACADAAAAAAAAAAAAAAEAAACgMgAAVgcAAKr4//8BAAAAf39/AAEAAABkAAAAAAAAABQAAABAHwAAAAAAACYAAAAAAAAAwOD//wAAAAAmAAAAZAAAABYAAABMAAAAAAAAAAAAAAAEAAAAAAAAAAEAAACAgIAKAAAAACgAAAAoAAAAZAAAAGQAAAAAAAAAzMzMAAAAAABQAAAAUAAAAGQAAABkAAAAAAAAABcAAAAUAAAAAAAAAAAAAAD/fwAA/38AAAAAAAAJAAAABAAAAAAAAAAMAAAAEAAAAAAAAAAAAAAAAAAAAAAAAAAeAAAAaAAAAAAAAAAAAAAAAAAAAAAAAAAAAAAAECcAABAnAAAAAAAAAAAAAAAAAAAAAAAAAAAAAAAAAAAAAAAAAAAAABQAAAAAAAAAwMD/AAAAAABkAAAAMgAAAAAAAABkAAAAAAAAAH9/fwAKAAAAHwAAAFQAAAAAAAAFAAAAAQAAAAAAAAAAAAAAAAAAAAAAAAAAAAAAAAAAAAAAAAAAAAAAAn9/fwAAAAADzMzMAMDA/wB/f38AAAAAAAAAAAAAAAAAAAAAAAAAAAAhAAAAGAAAABQAAADQAgAAGycAAPAPAABZKQAAEAAAACYAAAAIAAAA//////////8="/>
               </a:ext>
             </a:extLst>
           </p:cNvSpPr>
@@ -2959,7 +2928,7 @@
           </a:lstStyle>
           <a:p>
             <a:pPr/>
-            <a:fld id="{263455C5-8BCB-61A3-858C-7DF61BC27328}" type="datetime1">
+            <a:fld id="{3F74CB77-39D2-213D-9CCC-CF6885826A9A}" type="datetime1">
               <a:t/>
             </a:fld>
           </a:p>
@@ -2972,7 +2941,7 @@
             <a:spLocks noGrp="1" noChangeArrowheads="1"/>
             <a:extLst>
               <a:ext uri="smNativeData">
-                <pr:smNativeData xmlns:pr="smNativeData" val="SMDATA_13_FAOrYBMAAAAlAAAAZAAAAA8BAAAAkAAAAEgAAACQAAAASAAAAAAAAAABAAAAAAAAAAEAAABQAAAAAAAAAAAA4D8AAAAAAADgPwAAAAAAAOA/AAAAAAAA4D8AAAAAAADgPwAAAAAAAOA/AAAAAAAA4D8AAAAAAADgPwAAAAAAAOA/AAAAAAAA4D8CAAAAjAAAAAAAAAAAAAAAu+DjDP///wgAAAAAAAAAAAAAAAAAAAAAAAAAAAAAAAAAAAAAZAAAAAEAAABAAAAAAAAAAAAAAAAAAAAAAAAAAAAAAAAAAAAAAAAAAAAAAAAAAAAAAAAAAAAAAAAAAAAAAAAAAAAAAAAAAAAAAAAAAAAAAAAAAAAAAAAAAAAAAAAAAAAAFAAAADwAAAAAAAAAAAAAAAAAAAkUAAAAAQAAABQAAAAUAAAAFAAAAAEAAAAAAAAAZAAAAGQAAAAAAAAAZAAAAGQAAAAVAAAAYAAAAAAAAAAAAAAADwAAACADAAAAAAAAAAAAAAEAAACgMgAAVgcAAKr4//8BAAAAf39/AAEAAABkAAAAAAAAABQAAABAHwAAAAAAACYAAAAAAAAAwOD//wAAAAAmAAAAZAAAABYAAABMAAAAAAAAAAAAAAAEAAAAAAAAAAEAAACAgIAKAAAAACgAAAAoAAAAZAAAAGQAAAAAAAAAzMzMAAAAAABQAAAAUAAAAGQAAABkAAAAAAAAABcAAAAUAAAAAAAAAAAAAAD/fwAA/38AAAAAAAAJAAAABAAAAAAAAAAMAAAAEAAAAAAAAAAAAAAAAAAAAAAAAAAeAAAAaAAAAAAAAAAAAAAAAAAAAAAAAAAAAAAAECcAABAnAAAAAAAAAAAAAAAAAAAAAAAAAAAAAAAAAAAAAAAAAAAAABQAAAAAAAAAwMD/AAAAAABkAAAAMgAAAAAAAABkAAAAAAAAAH9/fwAKAAAAHwAAAFQAAAAAAAAFAAAAAQAAAAAAAAAAAAAAAAAAAAAAAAAAAAAAAAAAAAAAAAAAAAAAAn9/fwAAAAADzMzMAMDA/wB/f38AAAAAAAAAAAAAAAAAAAAAAAAAAAAhAAAAGAAAABQAAAA4EwAAGycAAAglAABZKQAAAAAAACYAAAAIAAAA//////////8="/>
+                <pr:smNativeData xmlns:pr="smNativeData" val="SMDATA_13_HjisYBMAAAAlAAAAZAAAAA8BAAAAkAAAAEgAAACQAAAASAAAAAAAAAABAAAAAAAAAAEAAABQAAAAAAAAAAAA4D8AAAAAAADgPwAAAAAAAOA/AAAAAAAA4D8AAAAAAADgPwAAAAAAAOA/AAAAAAAA4D8AAAAAAADgPwAAAAAAAOA/AAAAAAAA4D8CAAAAjAAAAAAAAAAAAAAAu+DjDP///wgAAAAAAAAAAAAAAAAAAAAAAAAAAAAAAAAAAAAAZAAAAAEAAABAAAAAAAAAAAAAAAAAAAAAAAAAAAAAAAAAAAAAAAAAAAAAAAAAAAAAAAAAAAAAAAAAAAAAAAAAAAAAAAAAAAAAAAAAAAAAAAAAAAAAAAAAAAAAAAAAAAAAFAAAADwAAAAAAAAAAAAAAAAAAAkUAAAAAQAAABQAAAAUAAAAFAAAAAEAAAAAAAAAZAAAAGQAAAAAAAAAZAAAAGQAAAAVAAAAYAAAAAAAAAAAAAAADwAAACADAAAAAAAAAAAAAAEAAACgMgAAVgcAAKr4//8BAAAAf39/AAEAAABkAAAAAAAAABQAAABAHwAAAAAAACYAAAAAAAAAwOD//wAAAAAmAAAAZAAAABYAAABMAAAAAAAAAAAAAAAEAAAAAAAAAAEAAACAgIAKAAAAACgAAAAoAAAAZAAAAGQAAAAAAAAAzMzMAAAAAABQAAAAUAAAAGQAAABkAAAAAAAAABcAAAAUAAAAAAAAAAAAAAD/fwAA/38AAAAAAAAJAAAABAAAAAAAAAAMAAAAEAAAAAAAAAAAAAAAAAAAAAAAAAAeAAAAaAAAAAAAAAAAAAAAAAAAAAAAAAAAAAAAECcAABAnAAAAAAAAAAAAAAAAAAAAAAAAAAAAAAAAAAAAAAAAAAAAABQAAAAAAAAAwMD/AAAAAABkAAAAMgAAAAAAAABkAAAAAAAAAH9/fwAKAAAAHwAAAFQAAAAAAAAFAAAAAQAAAAAAAAAAAAAAAAAAAAAAAAAAAAAAAAAAAAAAAAAAAAAAAn9/fwAAAAADzMzMAMDA/wB/f38AAAAAAAAAAAAAAAAAAAAAAAAAAAAhAAAAGAAAABQAAAA4EwAAGycAAAglAABZKQAAEAAAACYAAAAIAAAA//////////8="/>
               </a:ext>
             </a:extLst>
           </p:cNvSpPr>
@@ -3007,9 +2976,6 @@
           </a:lstStyle>
           <a:p>
             <a:pPr/>
-            <a:r>
-              <a:t/>
-            </a:r>
           </a:p>
         </p:txBody>
       </p:sp>
@@ -3020,7 +2986,7 @@
             <a:spLocks noGrp="1" noChangeArrowheads="1"/>
             <a:extLst>
               <a:ext uri="smNativeData">
-                <pr:smNativeData xmlns:pr="smNativeData" val="SMDATA_13_FAOrYBMAAAAlAAAAZAAAAA8BAAAAkAAAAEgAAACQAAAASAAAAAAAAAABAAAAAAAAAAEAAABQAAAAAAAAAAAA4D8AAAAAAADgPwAAAAAAAOA/AAAAAAAA4D8AAAAAAADgPwAAAAAAAOA/AAAAAAAA4D8AAAAAAADgPwAAAAAAAOA/AAAAAAAA4D8CAAAAjAAAAAAAAAAAAAAAu+DjDP///wgAAAAAAAAAAAAAAAAAAAAAAAAAAAAAAAAAAAAAZAAAAAEAAABAAAAAAAAAAAAAAAAAAAAAAAAAAAAAAAAAAAAAAAAAAAAAAAAAAAAAAAAAAAAAAAAAAAAAAAAAAAAAAAAAAAAAAAAAAAAAAAAAAAAAAAAAAAAAAAAAAAAAFAAAADwAAAAAAAAAAAAAAAAAAAkUAAAAAQAAABQAAAAUAAAAFAAAAAEAAAAAAAAAZAAAAGQAAAAAAAAAZAAAAGQAAAAVAAAAYAAAAAAAAAAAAAAADwAAACADAAAAAAAAAAAAAAEAAACgMgAAVgcAAKr4//8BAAAAf39/AAEAAABkAAAAAAAAABQAAABAHwAAAAAAACYAAAAAAAAAwOD//wAAAAAmAAAAZAAAABYAAABMAAAAAAAAAAAAAAAEAAAAAAAAAAEAAACAgIAKAAAAACgAAAAoAAAAZAAAAGQAAAAAAAAAzMzMAAAAAABQAAAAUAAAAGQAAABkAAAAAAAAABcAAAAUAAAAAAAAAAAAAAD/fwAA/38AAAAAAAAJAAAABAAAAAAAAAAMAAAAEAAAAAAAAAAAAAAAAAAAAAAAAAAeAAAAaAAAAAAAAAAAAAAAAAAAAAAAAAAAAAAAECcAABAnAAAAAAAAAAAAAAAAAAAAAAAAAAAAAAAAAAAAAAAAAAAAABQAAAAAAAAAwMD/AAAAAABkAAAAMgAAAAAAAABkAAAAAAAAAH9/fwAKAAAAHwAAAFQAAAAAAAAFAAAAAQAAAAAAAAAAAAAAAAAAAAAAAAAAAAAAAAAAAAAAAAAAAAAAAn9/fwAAAAADzMzMAMDA/wB/f38AAAAAAAAAAAAAAAAAAAAAAAAAAAAhAAAAGAAAABQAAABQKAAAGycAAHA1AABZKQAAAAAAACYAAAAIAAAA//////////8="/>
+                <pr:smNativeData xmlns:pr="smNativeData" val="SMDATA_13_HjisYBMAAAAlAAAAZAAAAA8BAAAAkAAAAEgAAACQAAAASAAAAAAAAAABAAAAAAAAAAEAAABQAAAAAAAAAAAA4D8AAAAAAADgPwAAAAAAAOA/AAAAAAAA4D8AAAAAAADgPwAAAAAAAOA/AAAAAAAA4D8AAAAAAADgPwAAAAAAAOA/AAAAAAAA4D8CAAAAjAAAAAAAAAAAAAAAu+DjDP///wgAAAAAAAAAAAAAAAAAAAAAAAAAAAAAAAAAAAAAZAAAAAEAAABAAAAAAAAAAAAAAAAAAAAAAAAAAAAAAAAAAAAAAAAAAAAAAAAAAAAAAAAAAAAAAAAAAAAAAAAAAAAAAAAAAAAAAAAAAAAAAAAAAAAAAAAAAAAAAAAAAAAAFAAAADwAAAAAAAAAAAAAAAAAAAkUAAAAAQAAABQAAAAUAAAAFAAAAAEAAAAAAAAAZAAAAGQAAAAAAAAAZAAAAGQAAAAVAAAAYAAAAAAAAAAAAAAADwAAACADAAAAAAAAAAAAAAEAAACgMgAAVgcAAKr4//8BAAAAf39/AAEAAABkAAAAAAAAABQAAABAHwAAAAAAACYAAAAAAAAAwOD//wAAAAAmAAAAZAAAABYAAABMAAAAAAAAAAAAAAAEAAAAAAAAAAEAAACAgIAKAAAAACgAAAAoAAAAZAAAAGQAAAAAAAAAzMzMAAAAAABQAAAAUAAAAGQAAABkAAAAAAAAABcAAAAUAAAAAAAAAAAAAAD/fwAA/38AAAAAAAAJAAAABAAAAAAAAAAMAAAAEAAAAAAAAAAAAAAAAAAAAAAAAAAeAAAAaAAAAAAAAAAAAAAAAAAAAAAAAAAAAAAAECcAABAnAAAAAAAAAAAAAAAAAAAAAAAAAAAAAAAAAAAAAAAAAAAAABQAAAAAAAAAwMD/AAAAAABkAAAAMgAAAAAAAABkAAAAAAAAAH9/fwAKAAAAHwAAAFQAAAAAAAAFAAAAAQAAAAAAAAAAAAAAAAAAAAAAAAAAAAAAAAAAAAAAAAAAAAAAAn9/fwAAAAADzMzMAMDA/wB/f38AAAAAAAAAAAAAAAAAAAAAAAAAAAAhAAAAGAAAABQAAABQKAAAGycAAHA1AABZKQAAEAAAACYAAAAIAAAA//////////8="/>
               </a:ext>
             </a:extLst>
           </p:cNvSpPr>
@@ -3055,7 +3021,7 @@
           </a:lstStyle>
           <a:p>
             <a:pPr/>
-            <a:fld id="{263407B5-FBCB-61F1-858C-0DA449C27358}" type="slidenum">
+            <a:fld id="{3F7492BB-F5D2-2164-9CCC-0331DC826A56}" type="slidenum">
               <a:t/>
             </a:fld>
           </a:p>
@@ -3102,6 +3068,182 @@
           <a:cs typeface="Times New Roman" pitchFamily="1" charset="0"/>
         </a:defRPr>
       </a:lvl1pPr>
+      <a:lvl2pPr marL="457200" marR="0" indent="0" algn="l" defTabSz="449580">
+        <a:lnSpc>
+          <a:spcPct val="100000"/>
+        </a:lnSpc>
+        <a:spcBef>
+          <a:spcPts val="0"/>
+        </a:spcBef>
+        <a:spcAft>
+          <a:spcPts val="0"/>
+        </a:spcAft>
+        <a:buNone/>
+        <a:tabLst/>
+        <a:defRPr sz="1800" b="0" i="0" u="none" strike="noStrike" kern="1" spc="0" baseline="0">
+          <a:solidFill>
+            <a:schemeClr val="tx1"/>
+          </a:solidFill>
+          <a:effectLst/>
+          <a:latin typeface="Calibri" pitchFamily="2" charset="0"/>
+          <a:ea typeface="SimSun" pitchFamily="0" charset="0"/>
+          <a:cs typeface="Times New Roman" pitchFamily="1" charset="0"/>
+        </a:defRPr>
+      </a:lvl2pPr>
+      <a:lvl3pPr marL="914400" marR="0" indent="0" algn="l" defTabSz="449580">
+        <a:lnSpc>
+          <a:spcPct val="100000"/>
+        </a:lnSpc>
+        <a:spcBef>
+          <a:spcPts val="0"/>
+        </a:spcBef>
+        <a:spcAft>
+          <a:spcPts val="0"/>
+        </a:spcAft>
+        <a:buNone/>
+        <a:tabLst/>
+        <a:defRPr sz="1800" b="0" i="0" u="none" strike="noStrike" kern="1" spc="0" baseline="0">
+          <a:solidFill>
+            <a:schemeClr val="tx1"/>
+          </a:solidFill>
+          <a:effectLst/>
+          <a:latin typeface="Calibri" pitchFamily="2" charset="0"/>
+          <a:ea typeface="SimSun" pitchFamily="0" charset="0"/>
+          <a:cs typeface="Times New Roman" pitchFamily="1" charset="0"/>
+        </a:defRPr>
+      </a:lvl3pPr>
+      <a:lvl4pPr marL="1371600" marR="0" indent="0" algn="l" defTabSz="449580">
+        <a:lnSpc>
+          <a:spcPct val="100000"/>
+        </a:lnSpc>
+        <a:spcBef>
+          <a:spcPts val="0"/>
+        </a:spcBef>
+        <a:spcAft>
+          <a:spcPts val="0"/>
+        </a:spcAft>
+        <a:buNone/>
+        <a:tabLst/>
+        <a:defRPr sz="1800" b="0" i="0" u="none" strike="noStrike" kern="1" spc="0" baseline="0">
+          <a:solidFill>
+            <a:schemeClr val="tx1"/>
+          </a:solidFill>
+          <a:effectLst/>
+          <a:latin typeface="Calibri" pitchFamily="2" charset="0"/>
+          <a:ea typeface="SimSun" pitchFamily="0" charset="0"/>
+          <a:cs typeface="Times New Roman" pitchFamily="1" charset="0"/>
+        </a:defRPr>
+      </a:lvl4pPr>
+      <a:lvl5pPr marL="1828800" marR="0" indent="0" algn="l" defTabSz="449580">
+        <a:lnSpc>
+          <a:spcPct val="100000"/>
+        </a:lnSpc>
+        <a:spcBef>
+          <a:spcPts val="0"/>
+        </a:spcBef>
+        <a:spcAft>
+          <a:spcPts val="0"/>
+        </a:spcAft>
+        <a:buNone/>
+        <a:tabLst/>
+        <a:defRPr sz="1800" b="0" i="0" u="none" strike="noStrike" kern="1" spc="0" baseline="0">
+          <a:solidFill>
+            <a:schemeClr val="tx1"/>
+          </a:solidFill>
+          <a:effectLst/>
+          <a:latin typeface="Calibri" pitchFamily="2" charset="0"/>
+          <a:ea typeface="SimSun" pitchFamily="0" charset="0"/>
+          <a:cs typeface="Times New Roman" pitchFamily="1" charset="0"/>
+        </a:defRPr>
+      </a:lvl5pPr>
+      <a:lvl6pPr marL="2286000" marR="0" indent="0" algn="l" defTabSz="449580">
+        <a:lnSpc>
+          <a:spcPct val="100000"/>
+        </a:lnSpc>
+        <a:spcBef>
+          <a:spcPts val="0"/>
+        </a:spcBef>
+        <a:spcAft>
+          <a:spcPts val="0"/>
+        </a:spcAft>
+        <a:buNone/>
+        <a:tabLst/>
+        <a:defRPr sz="1800" b="0" i="0" u="none" strike="noStrike" kern="1" spc="0" baseline="0">
+          <a:solidFill>
+            <a:schemeClr val="tx1"/>
+          </a:solidFill>
+          <a:effectLst/>
+          <a:latin typeface="Calibri" pitchFamily="2" charset="0"/>
+          <a:ea typeface="SimSun" pitchFamily="0" charset="0"/>
+          <a:cs typeface="Times New Roman" pitchFamily="1" charset="0"/>
+        </a:defRPr>
+      </a:lvl6pPr>
+      <a:lvl7pPr marL="2743200" marR="0" indent="0" algn="l" defTabSz="449580">
+        <a:lnSpc>
+          <a:spcPct val="100000"/>
+        </a:lnSpc>
+        <a:spcBef>
+          <a:spcPts val="0"/>
+        </a:spcBef>
+        <a:spcAft>
+          <a:spcPts val="0"/>
+        </a:spcAft>
+        <a:buNone/>
+        <a:tabLst/>
+        <a:defRPr sz="1800" b="0" i="0" u="none" strike="noStrike" kern="1" spc="0" baseline="0">
+          <a:solidFill>
+            <a:schemeClr val="tx1"/>
+          </a:solidFill>
+          <a:effectLst/>
+          <a:latin typeface="Calibri" pitchFamily="2" charset="0"/>
+          <a:ea typeface="SimSun" pitchFamily="0" charset="0"/>
+          <a:cs typeface="Times New Roman" pitchFamily="1" charset="0"/>
+        </a:defRPr>
+      </a:lvl7pPr>
+      <a:lvl8pPr marL="3200400" marR="0" indent="0" algn="l" defTabSz="449580">
+        <a:lnSpc>
+          <a:spcPct val="100000"/>
+        </a:lnSpc>
+        <a:spcBef>
+          <a:spcPts val="0"/>
+        </a:spcBef>
+        <a:spcAft>
+          <a:spcPts val="0"/>
+        </a:spcAft>
+        <a:buNone/>
+        <a:tabLst/>
+        <a:defRPr sz="1800" b="0" i="0" u="none" strike="noStrike" kern="1" spc="0" baseline="0">
+          <a:solidFill>
+            <a:schemeClr val="tx1"/>
+          </a:solidFill>
+          <a:effectLst/>
+          <a:latin typeface="Calibri" pitchFamily="2" charset="0"/>
+          <a:ea typeface="SimSun" pitchFamily="0" charset="0"/>
+          <a:cs typeface="Times New Roman" pitchFamily="1" charset="0"/>
+        </a:defRPr>
+      </a:lvl8pPr>
+      <a:lvl9pPr marL="3657600" marR="0" indent="0" algn="l" defTabSz="449580">
+        <a:lnSpc>
+          <a:spcPct val="100000"/>
+        </a:lnSpc>
+        <a:spcBef>
+          <a:spcPts val="0"/>
+        </a:spcBef>
+        <a:spcAft>
+          <a:spcPts val="0"/>
+        </a:spcAft>
+        <a:buNone/>
+        <a:tabLst/>
+        <a:defRPr sz="1800" b="0" i="0" u="none" strike="noStrike" kern="1" spc="0" baseline="0">
+          <a:solidFill>
+            <a:schemeClr val="tx1"/>
+          </a:solidFill>
+          <a:effectLst/>
+          <a:latin typeface="Calibri" pitchFamily="2" charset="0"/>
+          <a:ea typeface="SimSun" pitchFamily="0" charset="0"/>
+          <a:cs typeface="Times New Roman" pitchFamily="1" charset="0"/>
+        </a:defRPr>
+      </a:lvl9pPr>
     </p:titleStyle>
     <p:bodyStyle>
       <a:lvl1pPr marL="342900" marR="0" indent="-342900" algn="l" defTabSz="449580">
@@ -3566,7 +3708,7 @@
             <a:spLocks noGrp="1" noChangeArrowheads="1"/>
             <a:extLst>
               <a:ext uri="smNativeData">
-                <pr:smNativeData xmlns:pr="smNativeData" val="SMDATA_13_FAOrYBMAAAAlAAAAZAAAAA8BAAAAkAAAAEgAAACQAAAASAAAAAAAAAABAAAAAAAAAAEAAABQAAAAAAAAAAAA4D8AAAAAAADgPwAAAAAAAOA/AAAAAAAA4D8AAAAAAADgPwAAAAAAAOA/AAAAAAAA4D8AAAAAAADgPwAAAAAAAOA/AAAAAAAA4D8CAAAAjAAAAAAAAAAAAAAAu+DjDP///wgAAAAAAAAAAAAAAAAAAAAAAAAAAAAAAAAAAAAAZAAAAAEAAABAAAAAAAAAAAAAAAAAAAAAAAAAAAAAAAAAAAAAAAAAAAAAAAAAAAAAAAAAAAAAAAAAAAAAAAAAAAAAAAAAAAAAAAAAAAAAAAAAAAAAAAAAAAAAAAAAAAAAFAAAADwAAAAAAAAAAAAAAAAAAAkUAAAAAQAAABQAAAAUAAAAFAAAAAEAAAAAAAAAZAAAAGQAAAAAAAAAZAAAAGQAAAAVAAAAYAAAAAAAAAAAAAAADwAAACADAAAAAAAAAAAAAAEAAACgMgAAVgcAAKr4//8BAAAAf39/AAEAAABkAAAAAAAAABQAAABAHwAAAAAAACYAAAAAAAAAwOD//wAAAAAmAAAAZAAAABYAAABMAAAAAAAAAAAAAAAEAAAAAAAAAAEAAACAgIAKAAAAACgAAAAoAAAAZAAAAGQAAAAAAAAAzMzMAAAAAABQAAAAUAAAAGQAAABkAAAAAAAAABcAAAAUAAAAAAAAAAAAAAD/fwAA/38AAAAAAAAJAAAABAAAAAMAih0MAAAAEAAAAAAAAAAAAAAAAAAAAAAAAAAeAAAAaAAAAAAAAAAAAAAAAAAAAAAAAAAAAAAAECcAABAnAAAAAAAAAAAAAAAAAAAAAAAAAAAAAAAAAAAAAAAAAAAAABQAAAAAAAAAwMD/AAAAAABkAAAAMgAAAAAAAABkAAAAAAAAAH9/fwAKAAAAHwAAAFQAAAAzZswFAACZAQAAAAAAAAAAAAAAAAAAAAAAAAAAAAAAAAAAAAAAAAAA////An9/fwAAM2YDzMzMAMDA/wB/f38AAAAAAAAAAAAAAAAAAAAAAAAAAAAhAAAAGAAAABQAAAA4BAAAGg0AAAg0AAAmFgAAAAAAACYAAAAIAAAAAAAAAAAAAAA="/>
+                <pr:smNativeData xmlns:pr="smNativeData" val="SMDATA_13_HjisYBMAAAAlAAAAZAAAAA8BAAAAkAAAAEgAAACQAAAASAAAAAAAAAABAAAAAAAAAAEAAABQAAAAAAAAAAAA4D8AAAAAAADgPwAAAAAAAOA/AAAAAAAA4D8AAAAAAADgPwAAAAAAAOA/AAAAAAAA4D8AAAAAAADgPwAAAAAAAOA/AAAAAAAA4D8CAAAAjAAAAAAAAAAAAAAAu+DjDP///wgAAAAAAAAAAAAAAAAAAAAAAAAAAAAAAAAAAAAAZAAAAAEAAABAAAAAAAAAAAAAAAAAAAAAAAAAAAAAAAAAAAAAAAAAAAAAAAAAAAAAAAAAAAAAAAAAAAAAAAAAAAAAAAAAAAAAAAAAAAAAAAAAAAAAAAAAAAAAAAAAAAAAFAAAADwAAAAAAAAAAAAAAAAAAAkUAAAAAQAAABQAAAAUAAAAFAAAAAEAAAAAAAAAZAAAAGQAAAAAAAAAZAAAAGQAAAAVAAAAYAAAAAAAAAAAAAAADwAAACADAAAAAAAAAAAAAAEAAACgMgAAVgcAAKr4//8BAAAAf39/AAEAAABkAAAAAAAAABQAAABAHwAAAAAAACYAAAAAAAAAwOD//wAAAAAmAAAAZAAAABYAAABMAAAAAAAAAAAAAAAEAAAAAAAAAAEAAACAgIAKAAAAACgAAAAoAAAAZAAAAGQAAAAAAAAAzMzMAAAAAABQAAAAUAAAAGQAAABkAAAAAAAAABcAAAAUAAAAAAAAAAAAAAD/fwAA/38AAAAAAAAJAAAABAAAAAMAih0MAAAAEAAAAAAAAAAAAAAAAAAAAAAAAAAeAAAAaAAAAAAAAAAAAAAAAAAAAAAAAAAAAAAAECcAABAnAAAAAAAAAAAAAAAAAAAAAAAAAAAAAAAAAAAAAAAAAAAAABQAAAAAAAAAwMD/AAAAAABkAAAAMgAAAAAAAABkAAAAAAAAAH9/fwAKAAAAHwAAAFQAAAAzZswFAACZAQAAAAAAAAAAAAAAAAAAAAAAAAAAAAAAAAAAAAAAAAAA////An9/fwAAM2YDzMzMAMDA/wB/f38AAAAAAAAAAAAAAAAAAAAAAAAAAAAhAAAAGAAAABQAAAA4BAAAGg0AAAg0AAAmFgAAEAAAACYAAAAIAAAAAAAAAAAAAAA="/>
               </a:ext>
             </a:extLst>
           </p:cNvSpPr>
@@ -3599,7 +3741,7 @@
             <a:spLocks noGrp="1" noChangeArrowheads="1"/>
             <a:extLst>
               <a:ext uri="smNativeData">
-                <pr:smNativeData xmlns:pr="smNativeData" val="SMDATA_13_FAOrYBMAAAAlAAAAZAAAAA8BAAAAkAAAAEgAAACQAAAASAAAAAAAAAAAAAAAAAAAAAEAAABQAAAAAAAAAAAA4D8AAAAAAADgPwAAAAAAAOA/AAAAAAAA4D8AAAAAAADgPwAAAAAAAOA/AAAAAAAA4D8AAAAAAADgPwAAAAAAAOA/AAAAAAAA4D8CAAAAjAAAAAAAAAAAAAAAu+DjDP///wgAAAAAAAAAAAAAAAAAAAAAAAAAAAAAAAAAAAAAZAAAAAEAAABAAAAAAAAAAAAAAAAAAAAAAAAAAAAAAAAAAAAAAAAAAAAAAAAAAAAAAAAAAAAAAAAAAAAAAAAAAAAAAAAAAAAAAAAAAAAAAAAAAAAAAAAAAAAAAAAAAAAAFAAAADwAAAAAAAAAAAAAAAAAAAkUAAAAAQAAABQAAAAUAAAAFAAAAAEAAAAAAAAAZAAAAGQAAAAAAAAAZAAAAGQAAAAVAAAAYAAAAAAAAAAAAAAADwAAACADAAAAAAAAAAAAAAEAAACgMgAAVgcAAKr4//8BAAAAf39/AAEAAABkAAAAAAAAABQAAABAHwAAAAAAACYAAAAAAAAAwOD//wAAAAAmAAAAZAAAABYAAABMAAAAAAAAAAAAAAAEAAAAAAAAAAEAAACAgIAKAAAAACgAAAAoAAAAZAAAAGQAAAAAAAAAzMzMAAAAAABQAAAAUAAAAGQAAABkAAAAAAAAABcAAAAUAAAAAAAAAAAAAAD/fwAA/38AAAAAAAAJAAAABAAAAAAAAAAMAAAAEAAAAAAAAAAAAAAAAAAAAAAAAAAeAAAAaAAAAAAAAAAAAAAAAAAAAAAAAAAAAAAAECcAABAnAAAAAAAAAAAAAAAAAAAAAAAAAAAAAAAAAAAAAAAAAAAAABQAAAAAAAAAwMD/AAAAAABkAAAAMgAAAAAAAABkAAAAAAAAAH9/fwAKAAAAHwAAAFQAAAAzZswFAACZAQAAAAAAAAAAAAAAAAAAAAAAAAAAAAAAAAAAAAAAAAAA////An9/fwAAM2YDzMzMAMDA/wB/f38AAAAAAAAAAAAAAAAAAAAAAAAAAAAhAAAAGAAAABQAAABwCAAA6BcAANAvAACwIgAAAAAAACYAAAAIAAAAAAAAAAAAAAA="/>
+                <pr:smNativeData xmlns:pr="smNativeData" val="SMDATA_13_HjisYBMAAAAlAAAAZAAAAA8BAAAAkAAAAEgAAACQAAAASAAAAAAAAAAAAAAAAAAAAAEAAABQAAAAAAAAAAAA4D8AAAAAAADgPwAAAAAAAOA/AAAAAAAA4D8AAAAAAADgPwAAAAAAAOA/AAAAAAAA4D8AAAAAAADgPwAAAAAAAOA/AAAAAAAA4D8CAAAAjAAAAAAAAAAAAAAAu+DjDP///wgAAAAAAAAAAAAAAAAAAAAAAAAAAAAAAAAAAAAAZAAAAAEAAABAAAAAAAAAAAAAAAAAAAAAAAAAAAAAAAAAAAAAAAAAAAAAAAAAAAAAAAAAAAAAAAAAAAAAAAAAAAAAAAAAAAAAAAAAAAAAAAAAAAAAAAAAAAAAAAAAAAAAFAAAADwAAAAAAAAAAAAAAAAAAAkUAAAAAQAAABQAAAAUAAAAFAAAAAEAAAAAAAAAZAAAAGQAAAAAAAAAZAAAAGQAAAAVAAAAYAAAAAAAAAAAAAAADwAAACADAAAAAAAAAAAAAAEAAACgMgAAVgcAAKr4//8BAAAAf39/AAEAAABkAAAAAAAAABQAAABAHwAAAAAAACYAAAAAAAAAwOD//wAAAAAmAAAAZAAAABYAAABMAAAAAAAAAAAAAAAEAAAAAAAAAAEAAACAgIAKAAAAACgAAAAoAAAAZAAAAGQAAAAAAAAAzMzMAAAAAABQAAAAUAAAAGQAAABkAAAAAAAAABcAAAAUAAAAAAAAAAAAAAD/fwAA/38AAAAAAAAJAAAABAAAAAAAAAAMAAAAEAAAAAAAAAAAAAAAAAAAAAAAAAAeAAAAaAAAAAAAAAAAAAAAAAAAAAAAAAAAAAAAECcAABAnAAAAAAAAAAAAAAAAAAAAAAAAAAAAAAAAAAAAAAAAAAAAABQAAAAAAAAAwMD/AAAAAABkAAAAMgAAAAAAAABkAAAAAAAAAH9/fwAKAAAAHwAAAFQAAAAzZswFAACZAQAAAAAAAAAAAAAAAAAAAAAAAAAAAAAAAAAAAAAAAAAA////An9/fwAAM2YDzMzMAMDA/wB/f38AAAAAAAAAAAAAAAAAAAAAAAAAAAAhAAAAGAAAABQAAABwCAAA6BcAANAvAACwIgAAEAAAACYAAAAIAAAAAAAAAAAAAAA="/>
               </a:ext>
             </a:extLst>
           </p:cNvSpPr>
@@ -3664,7 +3806,200 @@
             <a:spLocks noGrp="1" noChangeArrowheads="1"/>
             <a:extLst>
               <a:ext uri="smNativeData">
-                <pr:smNativeData xmlns:pr="smNativeData" val="SMDATA_13_FAOrYBMAAAAlAAAAZAAAAA8BAAAAkAAAAEgAAACQAAAASAAAAAAAAAACAAAAAAAAAAEAAABQAAAAAAAAAAAA4D8AAAAAAADgPwAAAAAAAOA/AAAAAAAA4D8AAAAAAADgPwAAAAAAAOA/AAAAAAAA4D8AAAAAAADgPwAAAAAAAOA/AAAAAAAA4D8CAAAAjAAAAAAAAAAAAAAAu+DjDP///wgAAAAAAAAAAAAAAAAAAAAAAAAAAAAAAAAAAAAAZAAAAAEAAABAAAAAAAAAAAAAAAAAAAAAAAAAAAAAAAAAAAAAAAAAAAAAAAAAAAAAAAAAAAAAAAAAAAAAAAAAAAAAAAAAAAAAAAAAAAAAAAAAAAAAAAAAAAAAAAAAAAAAFAAAADwAAAAAAAAAAAAAAAAAAAkUAAAAAQAAABQAAAAUAAAAFAAAAAEAAAAAAAAAZAAAAGQAAAAAAAAAZAAAAGQAAAAVAAAAYAAAAAAAAAAAAAAADwAAACADAAAAAAAAAAAAAAEAAACgMgAAVgcAAKr4//8BAAAAf39/AAEAAABkAAAAAAAAABQAAABAHwAAAAAAACYAAAAAAAAAwOD//wAAAAAmAAAAZAAAABYAAABMAAAAAAAAAAAAAAAEAAAAAAAAAAEAAACAgIAKAAAAACgAAAAoAAAAZAAAAGQAAAAAAAAAzMzMAAAAAABQAAAAUAAAAGQAAABkAAAAAAAAABcAAAAUAAAAAAAAAAAAAAD/fwAA/38AAAAAAAAJAAAABAAAAAAAAAAMAAAAEAAAAAAAAAAAAAAAAAAAAAAAAAAeAAAAaAAAAAAAAAAAAAAAAAAAAAAAAAAAAAAAECcAABAnAAAAAAAAAAAAAAAAAAAAAAAAAAAAAAAAAAAAAAAAAAAAABQAAAAAAAAAwMD/AAAAAABkAAAAMgAAAAAAAABkAAAAAAAAAH9/fwAKAAAAHwAAAFQAAABgWXsFZmaZAQAAAAAAAAAAAAAAAAAAAAAAAAAAAAAAAAAAAAAAAAAA////An9/fwA+PlwDzMzMAMDA/wB/f38AAAAAAAAAAAAAAAAAAAAAAAAAAAAhAAAAGAAAABQAAADQAgAArgEAAFIVAADUCAAAAAAAACYAAAAIAAAAAAAAAAAAAAA="/>
+                <pr:smNativeData xmlns:pr="smNativeData" val="SMDATA_13_HjisYBMAAAAlAAAAZAAAAA8BAAAAkAAAAEgAAACQAAAASAAAAAAAAAABAAAAAAAAAAEAAABQAAAAAAAAAAAA4D8AAAAAAADgPwAAAAAAAOA/AAAAAAAA4D8AAAAAAADgPwAAAAAAAOA/AAAAAAAA4D8AAAAAAADgPwAAAAAAAOA/AAAAAAAA4D8CAAAAjAAAAAAAAAAAAAAAu+DjDP///wgAAAAAAAAAAAAAAAAAAAAAAAAAAAAAAAAAAAAAZAAAAAEAAABAAAAAAAAAAAAAAAAAAAAAAAAAAAAAAAAAAAAAAAAAAAAAAAAAAAAAAAAAAAAAAAAAAAAAAAAAAAAAAAAAAAAAAAAAAAAAAAAAAAAAAAAAAAAAAAAAAAAAFAAAADwAAAAAAAAAAAAAAAAAAAkUAAAAAQAAABQAAAAUAAAAFAAAAAEAAAAAAAAAZAAAAGQAAAAAAAAAZAAAAGQAAAAVAAAAYAAAAAAAAAAAAAAADwAAACADAAAAAAAAAAAAAAEAAACgMgAAVgcAAKr4//8BAAAAf39/AAEAAABkAAAAAAAAABQAAABAHwAAAAAAACYAAAAAAAAAwOD//wAAAAAmAAAAZAAAABYAAABMAAAAAAAAAAAAAAAEAAAAAAAAAAEAAACAgIAKAAAAACgAAAAoAAAAZAAAAGQAAAAAAAAAzMzMAAAAAABQAAAAUAAAAGQAAABkAAAAAAAAABcAAAAUAAAAAAAAAAAAAAD/fwAA/38AAAAAAAAJAAAABAAAAAAAAAAMAAAAEAAAAAAAAAAAAAAAAAAAAAAAAAAeAAAAaAAAAAAAAAAAAAAAAAAAAAAAAAAAAAAAECcAABAnAAAAAAAAAAAAAAAAAAAAAAAAAAAAAAAAAAAAAAAAAAAAABQAAAAAAAAAwMD/AAAAAABkAAAAMgAAAAAAAABkAAAAAAAAAH9/fwAKAAAAHwAAAFQAAAC74OMF////AQAAAAAAAAAAAAAAAAAAAAAAAAAAAAAAAAAAAAAAAAAAAAAAAn9/fwCAgIADzMzMAMDA/wB/f38AAAAAAAAAAAAAAAAAAAAAAAAAAAAhAAAAGAAAABQAAADQAgAAsAEAAHA1AAC4CAAAAAAAACYAAAAIAAAAAQAAAAAAAAA="/>
+              </a:ext>
+            </a:extLst>
+          </p:cNvSpPr>
+          <p:nvPr>
+            <p:ph type="title"/>
+          </p:nvPr>
+        </p:nvSpPr>
+        <p:spPr>
+          <a:xfrm>
+            <a:off x="457200" y="274320"/>
+            <a:ext cx="8229600" cy="1143000"/>
+          </a:xfrm>
+        </p:spPr>
+        <p:txBody>
+          <a:bodyPr/>
+          <a:lstStyle/>
+          <a:p>
+            <a:pPr/>
+            <a:r>
+              <a:t>MY SCHEDULE IN TRELLO</a:t>
+            </a:r>
+          </a:p>
+        </p:txBody>
+      </p:sp>
+      <p:pic>
+        <p:nvPicPr>
+          <p:cNvPr id="3" name="Picture1"/>
+          <p:cNvPicPr>
+            <a:picLocks noChangeAspect="1"/>
+            <a:extLst>
+              <a:ext uri="smNativeData">
+                <pr:smNativeData xmlns:pr="smNativeData" val="SMDATA_15_HjisYBMAAAAlAAAAEQAAAC8BAAAAkAAAAEgAAACQAAAASAAAAAAAAAAAAAAAAAAAAAEAAABQAAAAAAAAAAAA4D8AAAAAAADgPwAAAAAAAOA/AAAAAAAA4D8AAAAAAADgPwAAAAAAAOA/AAAAAAAA4D8AAAAAAADgPwAAAAAAAOA/AAAAAAAA4D8CAAAAjAAAAAAAAAAAAAAAu+DjDP///wgAAAAAAAAAAAAAAAAAAAAAAAAAAAAAAAAAAAAAZAAAAAEAAABAAAAAAAAAAAAAAAAAAAAAAAAAAAAAAAAAAAAAAAAAAAAAAAAAAAAAAAAAAAAAAAAAAAAAAAAAAAAAAAAAAAAAAAAAAAAAAAAAAAAAAAAAAAAAAAAAAAAAFAAAADwAAAAAAAAAAAAAAAAAAAkUAAAAAQAAABQAAAAUAAAAFAAAAAEAAAAAAAAAZAAAAGQAAAAAAAAAZAAAAGQAAAAVAAAAYAAAAAAAAAAAAAAADwAAACADAAAAAAAAAAAAAAEAAACgMgAAVgcAAKr4//8BAAAAf39/AAEAAABkAAAAAAAAABQAAABAHwAAAAAAACYAAAAAAAAAwOD//wAAAAAmAAAAZAAAABYAAABMAAAAAAAAAAAAAAAEAAAAAAAAAAEAAACAgIAKAAAAACgAAAAoAAAAZAAAAGQAAAAAAAAAzMzMAAAAAABQAAAAUAAAAGQAAABkAAAAAAAAAAcAAAA4AAAAAAAAAAAAAAAAAAAA////AAAAAAAAAAAAAAAAAAAAAAAAAAAAAAAAAAAAAABkAAAAZAAAAAAAAAAjAAAABAAAAGQAAAAXAAAAFAAAAAAAAAAAAAAA/38AAP9/AAAAAAAACQAAAAQAAAAAAAAADAAAABAAAAAAAAAAAAAAAAAAAAAAAAAAHgAAAGgAAAAAAAAAAAAAAAAAAAAAAAAAAAAAABAnAAAQJwAAAAAAAAAAAAAAAAAAAAAAAAAAAAAAAAAAAAAAAAAAAAAUAAAAAAAAAMDA/wAAAAAAZAAAADIAAAAAAAAAZAAAAAAAAAB/f38ACgAAAB8AAABUAAAAu+DjBf///wEAAAAAAAAAAAAAAAAAAAAAAAAAAAAAAAAAAAAAAAAAAAAAAAJ/f38AgICAA8zMzADAwP8Af39/AAAAAAAAAAAAAAAAAP///wAAAAAAIQAAABgAAAAUAAAAAAAAAPYKAAA/OAAAZyYAAAAAAAAmAAAACAAAAP//////////"/>
+              </a:ext>
+            </a:extLst>
+          </p:cNvPicPr>
+          <p:nvPr/>
+        </p:nvPicPr>
+        <p:blipFill>
+          <a:blip r:embed="rId2"/>
+          <a:stretch>
+            <a:fillRect/>
+          </a:stretch>
+        </p:blipFill>
+        <p:spPr>
+          <a:xfrm>
+            <a:off x="0" y="1781810"/>
+            <a:ext cx="9143365" cy="4460875"/>
+          </a:xfrm>
+          <a:prstGeom prst="rect">
+            <a:avLst/>
+          </a:prstGeom>
+          <a:noFill/>
+          <a:ln>
+            <a:noFill/>
+          </a:ln>
+          <a:effectLst/>
+        </p:spPr>
+      </p:pic>
+    </p:spTree>
+  </p:cSld>
+  <p:clrMapOvr>
+    <a:masterClrMapping/>
+  </p:clrMapOvr>
+  <p:timing>
+    <p:tnLst>
+      <p:par>
+        <p:cTn id="1" dur="indefinite" restart="never" nodeType="tmRoot"/>
+      </p:par>
+    </p:tnLst>
+  </p:timing>
+</p:sld>
+</file>
+
+<file path=ppt/slides/slide3.xml><?xml version="1.0" encoding="utf-8"?>
+<p:sld xmlns:p="http://schemas.openxmlformats.org/presentationml/2006/main" xmlns:p14="http://schemas.microsoft.com/office/powerpoint/2010/main" xmlns:r="http://schemas.openxmlformats.org/officeDocument/2006/relationships" xmlns:a="http://schemas.openxmlformats.org/drawingml/2006/main">
+  <p:cSld>
+    <p:spTree>
+      <p:nvGrpSpPr>
+        <p:cNvPr id="1" name=""/>
+        <p:cNvGrpSpPr/>
+        <p:nvPr/>
+      </p:nvGrpSpPr>
+      <p:grpSpPr>
+        <a:xfrm>
+          <a:off x="0" y="0"/>
+          <a:ext cx="0" cy="0"/>
+          <a:chOff x="0" y="0"/>
+          <a:chExt cx="0" cy="0"/>
+        </a:xfrm>
+      </p:grpSpPr>
+      <p:sp>
+        <p:nvSpPr>
+          <p:cNvPr id="2" name="SlideTitle1"/>
+          <p:cNvSpPr>
+            <a:spLocks noGrp="1" noChangeArrowheads="1"/>
+            <a:extLst>
+              <a:ext uri="smNativeData">
+                <pr:smNativeData xmlns:pr="smNativeData" val="SMDATA_13_HjisYBMAAAAlAAAAZAAAAA8BAAAAkAAAAEgAAACQAAAASAAAAAAAAAABAAAAAAAAAAEAAABQAAAAAAAAAAAA4D8AAAAAAADgPwAAAAAAAOA/AAAAAAAA4D8AAAAAAADgPwAAAAAAAOA/AAAAAAAA4D8AAAAAAADgPwAAAAAAAOA/AAAAAAAA4D8CAAAAjAAAAAAAAAAAAAAAu+DjDP///wgAAAAAAAAAAAAAAAAAAAAAAAAAAAAAAAAAAAAAZAAAAAEAAABAAAAAAAAAAAAAAAAAAAAAAAAAAAAAAAAAAAAAAAAAAAAAAAAAAAAAAAAAAAAAAAAAAAAAAAAAAAAAAAAAAAAAAAAAAAAAAAAAAAAAAAAAAAAAAAAAAAAAFAAAADwAAAAAAAAAAAAAAAAAAAkUAAAAAQAAABQAAAAUAAAAFAAAAAEAAAAAAAAAZAAAAGQAAAAAAAAAZAAAAGQAAAAVAAAAYAAAAAAAAAAAAAAADwAAACADAAAAAAAAAAAAAAEAAACgMgAAVgcAAKr4//8BAAAAf39/AAEAAABkAAAAAAAAABQAAABAHwAAAAAAACYAAAAAAAAAwOD//wAAAAAmAAAAZAAAABYAAABMAAAAAAAAAAAAAAAEAAAAAAAAAAEAAACAgIAKAAAAACgAAAAoAAAAZAAAAGQAAAAAAAAAzMzMAAAAAABQAAAAUAAAAGQAAABkAAAAAAAAABcAAAAUAAAAAAAAAAAAAAD/fwAA/38AAAAAAAAJAAAABAAAAAAAAAAMAAAAEAAAAAAAAAAAAAAAAAAAAAAAAAAeAAAAaAAAAAAAAAAAAAAAAAAAAAAAAAAAAAAAECcAABAnAAAAAAAAAAAAAAAAAAAAAAAAAAAAAAAAAAAAAAAAAAAAABQAAAAAAAAAwMD/AAAAAABkAAAAMgAAAAAAAABkAAAAAAAAAH9/fwAKAAAAHwAAAFQAAAD///cF///ZAQAAAAAAAAAAAAAAAAAAAAAAAAAAAAAAAAAAAAAAAAAAAAAAAn9/fwB3d3cDzMzMAMDA/wB/f38AAAAAAAAAAAAAAAAAAAAAAAAAAAAhAAAAGAAAABQAAADQAgAAsAEAAHA1AAC4CAAAAAAAACYAAAAIAAAAAQAAAAAAAAA="/>
+              </a:ext>
+            </a:extLst>
+          </p:cNvSpPr>
+          <p:nvPr>
+            <p:ph type="title"/>
+          </p:nvPr>
+        </p:nvSpPr>
+        <p:spPr>
+          <a:xfrm>
+            <a:off x="457200" y="274320"/>
+            <a:ext cx="8229600" cy="1143000"/>
+          </a:xfrm>
+        </p:spPr>
+        <p:txBody>
+          <a:bodyPr/>
+          <a:lstStyle/>
+          <a:p>
+            <a:pPr/>
+          </a:p>
+        </p:txBody>
+      </p:sp>
+      <p:pic>
+        <p:nvPicPr>
+          <p:cNvPr id="3" name="Picture1"/>
+          <p:cNvPicPr>
+            <a:picLocks noChangeAspect="1"/>
+            <a:extLst>
+              <a:ext uri="smNativeData">
+                <pr:smNativeData xmlns:pr="smNativeData" val="SMDATA_15_HjisYBMAAAAlAAAAEQAAAC8BAAAAkAAAAEgAAACQAAAASAAAAAAAAAAAAAAAAAAAAAEAAABQAAAAAAAAAAAA4D8AAAAAAADgPwAAAAAAAOA/AAAAAAAA4D8AAAAAAADgPwAAAAAAAOA/AAAAAAAA4D8AAAAAAADgPwAAAAAAAOA/AAAAAAAA4D8CAAAAjAAAAAAAAAAAAAAAu+DjDP///wgAAAAAAAAAAAAAAAAAAAAAAAAAAAAAAAAAAAAAZAAAAAEAAABAAAAAAAAAAAAAAAAAAAAAAAAAAAAAAAAAAAAAAAAAAAAAAAAAAAAAAAAAAAAAAAAAAAAAAAAAAAAAAAAAAAAAAAAAAAAAAAAAAAAAAAAAAAAAAAAAAAAAFAAAADwAAAAAAAAAAAAAAAAAAAkUAAAAAQAAABQAAAAUAAAAFAAAAAEAAAAAAAAAZAAAAGQAAAAAAAAAZAAAAGQAAAAVAAAAYAAAAAAAAAAAAAAADwAAACADAAAAAAAAAAAAAAEAAACgMgAAVgcAAKr4//8BAAAAf39/AAEAAABkAAAAAAAAABQAAABAHwAAAAAAACYAAAAAAAAAwOD//wAAAAAmAAAAZAAAABYAAABMAAAAAAAAAAAAAAAEAAAAAAAAAAEAAACAgIAKAAAAACgAAAAoAAAAZAAAAGQAAAAAAAAAzMzMAAAAAABQAAAAUAAAAGQAAABkAAAAAAAAAAcAAAA4AAAAAAAAAAAAAAAAAAAA////AAAAAAAAAAAAAAAAAAAAAAAAAAAAAAAAAAAAAABkAAAAZAAAAAAAAAAjAAAABAAAAGQAAAAXAAAAFAAAAAAAAAAAAAAA/38AAP9/AAAAAAAACQAAAAQAAABhbD0iDAAAABAAAAAAAAAAAAAAAAAAAAAAAAAAHgAAAGgAAAAAAAAAAAAAAAAAAAAAAAAAAAAAABAnAAAQJwAAAAAAAAAAAAAAAAAAAAAAAAAAAAAAAAAAAAAAAAAAAAAUAAAAAAAAAMDA/wAAAAAAZAAAADIAAAAAAAAAZAAAAAAAAAB/f38ACgAAAB8AAABUAAAA///3Bf//2QEAAAAAAAAAAAAAAAAAAAAAAAAAAAAAAAAAAAAAAAAAAAAAAAJ/f38Ad3d3A8zMzADAwP8Af39/AAAAAAAAAAAAAAAAAP///wAAAAAAIQAAABgAAAAUAAAAhw4AAAAAAABIKAAAMCoAAAAAAAAmAAAACAAAAP//////////"/>
+              </a:ext>
+            </a:extLst>
+          </p:cNvPicPr>
+          <p:nvPr/>
+        </p:nvPicPr>
+        <p:blipFill>
+          <a:blip r:embed="rId2"/>
+          <a:stretch>
+            <a:fillRect/>
+          </a:stretch>
+        </p:blipFill>
+        <p:spPr>
+          <a:xfrm>
+            <a:off x="2361565" y="0"/>
+            <a:ext cx="4186555" cy="6858000"/>
+          </a:xfrm>
+          <a:prstGeom prst="rect">
+            <a:avLst/>
+          </a:prstGeom>
+          <a:noFill/>
+          <a:ln>
+            <a:noFill/>
+          </a:ln>
+          <a:effectLst/>
+        </p:spPr>
+      </p:pic>
+    </p:spTree>
+  </p:cSld>
+  <p:clrMapOvr>
+    <a:overrideClrMapping bg1="lt1" tx1="dk1" bg2="lt2" tx2="dk2" accent1="accent1" accent2="accent2" accent3="accent3" accent4="accent4" accent5="accent5" accent6="accent6" hlink="hlink" folHlink="folHlink"/>
+  </p:clrMapOvr>
+  <p:timing>
+    <p:tnLst>
+      <p:par>
+        <p:cTn id="1" dur="indefinite" restart="never" nodeType="tmRoot"/>
+      </p:par>
+    </p:tnLst>
+  </p:timing>
+</p:sld>
+</file>
+
+<file path=ppt/slides/slide4.xml><?xml version="1.0" encoding="utf-8"?>
+<p:sld xmlns:p="http://schemas.openxmlformats.org/presentationml/2006/main" xmlns:p14="http://schemas.microsoft.com/office/powerpoint/2010/main" xmlns:r="http://schemas.openxmlformats.org/officeDocument/2006/relationships" xmlns:a="http://schemas.openxmlformats.org/drawingml/2006/main">
+  <p:cSld>
+    <p:spTree>
+      <p:nvGrpSpPr>
+        <p:cNvPr id="1" name=""/>
+        <p:cNvGrpSpPr/>
+        <p:nvPr/>
+      </p:nvGrpSpPr>
+      <p:grpSpPr>
+        <a:xfrm>
+          <a:off x="0" y="0"/>
+          <a:ext cx="0" cy="0"/>
+          <a:chOff x="0" y="0"/>
+          <a:chExt cx="0" cy="0"/>
+        </a:xfrm>
+      </p:grpSpPr>
+      <p:sp>
+        <p:nvSpPr>
+          <p:cNvPr id="2" name="SlideTitle1"/>
+          <p:cNvSpPr>
+            <a:spLocks noGrp="1" noChangeArrowheads="1"/>
+            <a:extLst>
+              <a:ext uri="smNativeData">
+                <pr:smNativeData xmlns:pr="smNativeData" val="SMDATA_13_HjisYBMAAAAlAAAAZAAAAA8BAAAAkAAAAEgAAACQAAAASAAAAAAAAAACAAAAAAAAAAEAAABQAAAAAAAAAAAA4D8AAAAAAADgPwAAAAAAAOA/AAAAAAAA4D8AAAAAAADgPwAAAAAAAOA/AAAAAAAA4D8AAAAAAADgPwAAAAAAAOA/AAAAAAAA4D8CAAAAjAAAAAAAAAAAAAAAu+DjDP///wgAAAAAAAAAAAAAAAAAAAAAAAAAAAAAAAAAAAAAZAAAAAEAAABAAAAAAAAAAAAAAAAAAAAAAAAAAAAAAAAAAAAAAAAAAAAAAAAAAAAAAAAAAAAAAAAAAAAAAAAAAAAAAAAAAAAAAAAAAAAAAAAAAAAAAAAAAAAAAAAAAAAAFAAAADwAAAAAAAAAAAAAAAAAAAkUAAAAAQAAABQAAAAUAAAAFAAAAAEAAAAAAAAAZAAAAGQAAAAAAAAAZAAAAGQAAAAVAAAAYAAAAAAAAAAAAAAADwAAACADAAAAAAAAAAAAAAEAAACgMgAAVgcAAKr4//8BAAAAf39/AAEAAABkAAAAAAAAABQAAABAHwAAAAAAACYAAAAAAAAAwOD//wAAAAAmAAAAZAAAABYAAABMAAAAAAAAAAAAAAAEAAAAAAAAAAEAAACAgIAKAAAAACgAAAAoAAAAZAAAAGQAAAAAAAAAzMzMAAAAAABQAAAAUAAAAGQAAABkAAAAAAAAABcAAAAUAAAAAAAAAAAAAAD/fwAA/38AAAAAAAAJAAAABAAAAAAAAAAMAAAAEAAAAAAAAAAAAAAAAAAAAAAAAAAeAAAAaAAAAAAAAAAAAAAAAAAAAAAAAAAAAAAAECcAABAnAAAAAAAAAAAAAAAAAAAAAAAAAAAAAAAAAAAAAAAAAAAAABQAAAAAAAAAwMD/AAAAAABkAAAAMgAAAAAAAABkAAAAAAAAAH9/fwAKAAAAHwAAAFQAAABgWXsFZmaZAQAAAAAAAAAAAAAAAAAAAAAAAAAAAAAAAAAAAAAAAAAA////An9/fwA+PlwDzMzMAMDA/wB/f38AAAAAAAAAAAAAAAAAAAAAAAAAAAAhAAAAGAAAABQAAADQAgAArgEAAFIVAADUCAAAEAAAACYAAAAIAAAAAAAAAAAAAAA="/>
               </a:ext>
             </a:extLst>
           </p:cNvSpPr>
@@ -3695,7 +4030,7 @@
             <a:spLocks noGrp="1" noChangeArrowheads="1"/>
             <a:extLst>
               <a:ext uri="smNativeData">
-                <pr:smNativeData xmlns:pr="smNativeData" val="SMDATA_13_FAOrYBMAAAAlAAAAZAAAAA8BAAAAkAAAAEgAAACQAAAASAAAAAAAAAAAAAAAAAAAAAEAAABQAAAAAAAAAAAA4D8AAAAAAADgPwAAAAAAAOA/AAAAAAAA4D8AAAAAAADgPwAAAAAAAOA/AAAAAAAA4D8AAAAAAADgPwAAAAAAAOA/AAAAAAAA4D8CAAAAjAAAAAAAAAAAAAAAu+DjDP///wgAAAAAAAAAAAAAAAAAAAAAAAAAAAAAAAAAAAAAZAAAAAEAAABAAAAAAAAAAAAAAAAAAAAAAAAAAAAAAAAAAAAAAAAAAAAAAAAAAAAAAAAAAAAAAAAAAAAAAAAAAAAAAAAAAAAAAAAAAAAAAAAAAAAAAAAAAAAAAAAAAAAAFAAAADwAAAAAAAAAAAAAAAAAAAkUAAAAAQAAABQAAAAUAAAAFAAAAAEAAAAAAAAAZAAAAGQAAAAAAAAAZAAAAGQAAAAVAAAAYAAAAAAAAAAAAAAADwAAACADAAAAAAAAAAAAAAEAAACgMgAAVgcAAKr4//8BAAAAf39/AAEAAABkAAAAAAAAABQAAABAHwAAAAAAACYAAAAAAAAAwOD//wAAAAAmAAAAZAAAABYAAABMAAAAAAAAAAAAAAAEAAAAAAAAAAEAAACAgIAKAAAAACgAAAAoAAAAZAAAAGQAAAAAAAAAzMzMAAAAAABQAAAAUAAAAGQAAABkAAAAAAAAABcAAAAUAAAAAAAAAAAAAAD/fwAA/38AAAAAAAAJAAAABAAAAAAAAAAMAAAAEAAAAAAAAAAAAAAAAAAAAAAAAAAeAAAAaAAAAAAAAAAAAAAAAAAAAAAAAAAAAAAAECcAABAnAAAAAAAAAAAAAAAAAAAAAAAAAAAAAAAAAAAAAAAAAAAAABQAAAAAAAAAwMD/AAAAAABkAAAAMgAAAAAAAABkAAAAAAAAAH9/fwAKAAAAHwAAAFQAAABgWXsFZmaZAQAAAAAAAAAAAAAAAAAAAAAAAAAAAAAAAAAAAAAAAAAA////An9/fwA+PlwDzMzMAMDA/wB/f38AAAAAAAAAAAAAAAAAAAAAAAAAAAAhAAAAGAAAABQAAAD+FQAArgEAAHA1AACwJQAAAAAAACYAAAAIAAAAAYAAAAAAAAA="/>
+                <pr:smNativeData xmlns:pr="smNativeData" val="SMDATA_13_HjisYBMAAAAlAAAAZAAAAA8BAAAAkAAAAEgAAACQAAAASAAAAAAAAAAAAAAAAAAAAAEAAABQAAAAAAAAAAAA4D8AAAAAAADgPwAAAAAAAOA/AAAAAAAA4D8AAAAAAADgPwAAAAAAAOA/AAAAAAAA4D8AAAAAAADgPwAAAAAAAOA/AAAAAAAA4D8CAAAAjAAAAAAAAAAAAAAAu+DjDP///wgAAAAAAAAAAAAAAAAAAAAAAAAAAAAAAAAAAAAAZAAAAAEAAABAAAAAAAAAAAAAAAAAAAAAAAAAAAAAAAAAAAAAAAAAAAAAAAAAAAAAAAAAAAAAAAAAAAAAAAAAAAAAAAAAAAAAAAAAAAAAAAAAAAAAAAAAAAAAAAAAAAAAFAAAADwAAAAAAAAAAAAAAAAAAAkUAAAAAQAAABQAAAAUAAAAFAAAAAEAAAAAAAAAZAAAAGQAAAAAAAAAZAAAAGQAAAAVAAAAYAAAAAAAAAAAAAAADwAAACADAAAAAAAAAAAAAAEAAACgMgAAVgcAAKr4//8BAAAAf39/AAEAAABkAAAAAAAAABQAAABAHwAAAAAAACYAAAAAAAAAwOD//wAAAAAmAAAAZAAAABYAAABMAAAAAAAAAAAAAAAEAAAAAAAAAAEAAACAgIAKAAAAACgAAAAoAAAAZAAAAGQAAAAAAAAAzMzMAAAAAABQAAAAUAAAAGQAAABkAAAAAAAAABcAAAAUAAAAAAAAAAAAAAD/fwAA/38AAAAAAAAJAAAABAAAAAAAAAAMAAAAEAAAAAAAAAAAAAAAAAAAAAAAAAAeAAAAaAAAAAAAAAAAAAAAAAAAAAAAAAAAAAAAECcAABAnAAAAAAAAAAAAAAAAAAAAAAAAAAAAAAAAAAAAAAAAAAAAABQAAAAAAAAAwMD/AAAAAABkAAAAMgAAAAAAAABkAAAAAAAAAH9/fwAKAAAAHwAAAFQAAABgWXsFZmaZAQAAAAAAAAAAAAAAAAAAAAAAAAAAAAAAAAAAAAAAAAAA////An9/fwA+PlwDzMzMAMDA/wB/f38AAAAAAAAAAAAAAAAAAAAAAAAAAAAhAAAAGAAAABQAAAD+FQAArgEAAHA1AACwJQAAEAAAACYAAAAIAAAAAYAAAAAAAAA="/>
               </a:ext>
             </a:extLst>
           </p:cNvSpPr>
@@ -3776,12 +4111,12 @@
             <a:spLocks noGrp="1" noChangeArrowheads="1"/>
             <a:extLst>
               <a:ext uri="smNativeData">
-                <pr:smNativeData xmlns:pr="smNativeData" val="SMDATA_13_FAOrYBMAAAAlAAAAZAAAAA8BAAAAkAAAAEgAAACQAAAASAAAAAAAAAAAAAAAAAAAAAEAAABQAAAAAAAAAAAA4D8AAAAAAADgPwAAAAAAAOA/AAAAAAAA4D8AAAAAAADgPwAAAAAAAOA/AAAAAAAA4D8AAAAAAADgPwAAAAAAAOA/AAAAAAAA4D8CAAAAjAAAAAAAAAAAAAAAu+DjDP///wgAAAAAAAAAAAAAAAAAAAAAAAAAAAAAAAAAAAAAZAAAAAEAAABAAAAAAAAAAAAAAAAAAAAAAAAAAAAAAAAAAAAAAAAAAAAAAAAAAAAAAAAAAAAAAAAAAAAAAAAAAAAAAAAAAAAAAAAAAAAAAAAAAAAAAAAAAAAAAAAAAAAAFAAAADwAAAAAAAAAAAAAAAAAAAkUAAAAAQAAABQAAAAUAAAAFAAAAAEAAAAAAAAAZAAAAGQAAAAAAAAAZAAAAGQAAAAVAAAAYAAAAAAAAAAAAAAADwAAACADAAAAAAAAAAAAAAEAAACgMgAAVgcAAKr4//8BAAAAf39/AAEAAABkAAAAAAAAABQAAABAHwAAAAAAACYAAAAAAAAAwOD//wAAAAAmAAAAZAAAABYAAABMAAAAAAAAAAAAAAAEAAAAAAAAAAEAAACAgIAKAAAAACgAAAAoAAAAZAAAAGQAAAAAAAAAzMzMAAAAAABQAAAAUAAAAGQAAABkAAAAAAAAABcAAAAUAAAAAAAAAAAAAAD/fwAA/38AAAAAAAAJAAAABAAAAEkAIAAMAAAAEAAAAAAAAAAAAAAAAAAAAAAAAAAeAAAAaAAAAAAAAAAAAAAAAAAAAAAAAAAAAAAAECcAABAnAAAAAAAAAAAAAAAAAAAAAAAAAAAAAAAAAAAAAAAAAAAAABQAAAAAAAAAwMD/AAAAAABkAAAAMgAAAAAAAABkAAAAAAAAAH9/fwAKAAAAHwAAAFQAAABgWXsFZmaZAQAAAAAAAAAAAAAAAAAAAAAAAAAAAAAAAAAAAAAAAAAA////An9/fwA+PlwDzMzMAMDA/wB/f38AAAAAAAAAAAAAAAAAAAAAAAAAAAAhAAAAGAAAABQAAADQAgAA1AgAAFIVAACwJQAAAAAAACYAAAAIAAAAAAAAAAAAAAA="/>
-              </a:ext>
-            </a:extLst>
-          </p:cNvSpPr>
-          <p:nvPr>
-            <p:ph type="body" sz="half" idx="2"/>
+                <pr:smNativeData xmlns:pr="smNativeData" val="SMDATA_13_HjisYBMAAAAlAAAAZAAAAA8BAAAAkAAAAEgAAACQAAAASAAAAAAAAAAAAAAAAAAAAAEAAABQAAAAAAAAAAAA4D8AAAAAAADgPwAAAAAAAOA/AAAAAAAA4D8AAAAAAADgPwAAAAAAAOA/AAAAAAAA4D8AAAAAAADgPwAAAAAAAOA/AAAAAAAA4D8CAAAAjAAAAAAAAAAAAAAAu+DjDP///wgAAAAAAAAAAAAAAAAAAAAAAAAAAAAAAAAAAAAAZAAAAAEAAABAAAAAAAAAAAAAAAAAAAAAAAAAAAAAAAAAAAAAAAAAAAAAAAAAAAAAAAAAAAAAAAAAAAAAAAAAAAAAAAAAAAAAAAAAAAAAAAAAAAAAAAAAAAAAAAAAAAAAFAAAADwAAAAAAAAAAAAAAAAAAAkUAAAAAQAAABQAAAAUAAAAFAAAAAEAAAAAAAAAZAAAAGQAAAAAAAAAZAAAAGQAAAAVAAAAYAAAAAAAAAAAAAAADwAAACADAAAAAAAAAAAAAAEAAACgMgAAVgcAAKr4//8BAAAAf39/AAEAAABkAAAAAAAAABQAAABAHwAAAAAAACYAAAAAAAAAwOD//wAAAAAmAAAAZAAAABYAAABMAAAAAAAAAAAAAAAEAAAAAAAAAAEAAACAgIAKAAAAACgAAAAoAAAAZAAAAGQAAAAAAAAAzMzMAAAAAABQAAAAUAAAAGQAAABkAAAAAAAAABcAAAAUAAAAAAAAAAAAAAD/fwAA/38AAAAAAAAJAAAABAAAAEkAIAAMAAAAEAAAAAAAAAAAAAAAAAAAAAAAAAAeAAAAaAAAAAAAAAAAAAAAAAAAAAAAAAAAAAAAECcAABAnAAAAAAAAAAAAAAAAAAAAAAAAAAAAAAAAAAAAAAAAAAAAABQAAAAAAAAAwMD/AAAAAABkAAAAMgAAAAAAAABkAAAAAAAAAH9/fwAKAAAAHwAAAFQAAABgWXsFZmaZAQAAAAAAAAAAAAAAAAAAAAAAAAAAAAAAAAAAAAAAAAAA////An9/fwA+PlwDzMzMAMDA/wB/f38AAAAAAAAAAAAAAAAAAAAAAAAAAAAhAAAAGAAAABQAAADQAgAA1AgAAFIVAACwJQAAEAAAACYAAAAIAAAAAAAAAAAAAAA="/>
+              </a:ext>
+            </a:extLst>
+          </p:cNvSpPr>
+          <p:nvPr>
+            <p:ph type="body" idx="2"/>
           </p:nvPr>
         </p:nvSpPr>
         <p:spPr/>
@@ -3849,7 +4184,7 @@
 </p:sld>
 </file>
 
-<file path=ppt/slides/slide3.xml><?xml version="1.0" encoding="utf-8"?>
+<file path=ppt/slides/slide5.xml><?xml version="1.0" encoding="utf-8"?>
 <p:sld xmlns:p="http://schemas.openxmlformats.org/presentationml/2006/main" xmlns:p14="http://schemas.microsoft.com/office/powerpoint/2010/main" xmlns:r="http://schemas.openxmlformats.org/officeDocument/2006/relationships" xmlns:a="http://schemas.openxmlformats.org/drawingml/2006/main">
   <p:cSld>
     <p:bg>
@@ -3881,7 +4216,7 @@
             <a:spLocks noGrp="1" noChangeArrowheads="1"/>
             <a:extLst>
               <a:ext uri="smNativeData">
-                <pr:smNativeData xmlns:pr="smNativeData" val="SMDATA_13_FAOrYBMAAAAlAAAAZAAAAA8BAAAAkAAAAEgAAACQAAAASAAAAAAAAAABAAAAAAAAAAEAAABQAAAAAAAAAAAA4D8AAAAAAADgPwAAAAAAAOA/AAAAAAAA4D8AAAAAAADgPwAAAAAAAOA/AAAAAAAA4D8AAAAAAADgPwAAAAAAAOA/AAAAAAAA4D8CAAAAjAAAAAAAAAAAAAAAu+DjDP///wgAAAAAAAAAAAAAAAAAAAAAAAAAAAAAAAAAAAAAZAAAAAEAAABAAAAAAAAAAAAAAAAAAAAAAAAAAAAAAAAAAAAAAAAAAAAAAAAAAAAAAAAAAAAAAAAAAAAAAAAAAAAAAAAAAAAAAAAAAAAAAAAAAAAAAAAAAAAAAAAAAAAAFAAAADwAAAAAAAAAAAAAAAAAAAkUAAAAAQAAABQAAAAUAAAAFAAAAAEAAAAAAAAAZAAAAGQAAAAAAAAAZAAAAGQAAAAVAAAAYAAAAAAAAAAAAAAADwAAACADAAAAAAAAAAAAAAEAAACgMgAAVgcAAKr4//8BAAAAf39/AAEAAABkAAAAAAAAABQAAABAHwAAAAAAACYAAAAAAAAAwOD//wAAAAAmAAAAZAAAABYAAABMAAAAAAAAAAAAAAAEAAAAAAAAAAEAAACAgIAKAAAAACgAAAAoAAAAZAAAAGQAAAAAAAAAzMzMAAAAAABQAAAAUAAAAGQAAABkAAAAAAAAABcAAAAUAAAAAAAAAAAAAAD/fwAA/38AAAAAAAAJAAAABAAAAAAAAAAMAAAAEAAAAAAAAAAAAAAAAAAAAAAAAAAeAAAAaAAAAAAAAAAAAAAAAAAAAAAAAAAAAAAAECcAABAnAAAAAAAAAAAAAAAAAAAAAAAAAAAAAAAAAAAAAAAAAAAAABQAAAAAAAAAwMD/AAAAAABkAAAAMgAAAAAAAABkAAAAAAAAAH9/fwAKAAAAHwAAAFQAAAD///cF///ZAQAAAAAAAAAAAAAAAAAAAAAAAAAAAAAAAAAAAAAAAAAAAAAAAn9/fwB3d3cDzMzMAMDA/wB/f38AAAAAAAAAAAAAAAAAAAAAAAAAAAAhAAAAGAAAABQAAAA4BAAAGg0AAAg0AAAmFgAAAAAAACYAAAAIAAAAAAAAAAAAAAA="/>
+                <pr:smNativeData xmlns:pr="smNativeData" val="SMDATA_13_HjisYBMAAAAlAAAAZAAAAA8BAAAAkAAAAEgAAACQAAAASAAAAAAAAAABAAAAAAAAAAEAAABQAAAAAAAAAAAA4D8AAAAAAADgPwAAAAAAAOA/AAAAAAAA4D8AAAAAAADgPwAAAAAAAOA/AAAAAAAA4D8AAAAAAADgPwAAAAAAAOA/AAAAAAAA4D8CAAAAjAAAAAAAAAAAAAAAu+DjDP///wgAAAAAAAAAAAAAAAAAAAAAAAAAAAAAAAAAAAAAZAAAAAEAAABAAAAAAAAAAAAAAAAAAAAAAAAAAAAAAAAAAAAAAAAAAAAAAAAAAAAAAAAAAAAAAAAAAAAAAAAAAAAAAAAAAAAAAAAAAAAAAAAAAAAAAAAAAAAAAAAAAAAAFAAAADwAAAAAAAAAAAAAAAAAAAkUAAAAAQAAABQAAAAUAAAAFAAAAAEAAAAAAAAAZAAAAGQAAAAAAAAAZAAAAGQAAAAVAAAAYAAAAAAAAAAAAAAADwAAACADAAAAAAAAAAAAAAEAAACgMgAAVgcAAKr4//8BAAAAf39/AAEAAABkAAAAAAAAABQAAABAHwAAAAAAACYAAAAAAAAAwOD//wAAAAAmAAAAZAAAABYAAABMAAAAAAAAAAAAAAAEAAAAAAAAAAEAAACAgIAKAAAAACgAAAAoAAAAZAAAAGQAAAAAAAAAzMzMAAAAAABQAAAAUAAAAGQAAABkAAAAAAAAABcAAAAUAAAAAAAAAAAAAAD/fwAA/38AAAAAAAAJAAAABAAAAAAAAAAMAAAAEAAAAAAAAAAAAAAAAAAAAAAAAAAeAAAAaAAAAAAAAAAAAAAAAAAAAAAAAAAAAAAAECcAABAnAAAAAAAAAAAAAAAAAAAAAAAAAAAAAAAAAAAAAAAAAAAAABQAAAAAAAAAwMD/AAAAAABkAAAAMgAAAAAAAABkAAAAAAAAAH9/fwAKAAAAHwAAAFQAAAD///cF///ZAQAAAAAAAAAAAAAAAAAAAAAAAAAAAAAAAAAAAAAAAAAAAAAAAn9/fwB3d3cDzMzMAMDA/wB/f38AAAAAAAAAAAAAAAAAAAAAAAAAAAAhAAAAGAAAABQAAAA4BAAAGg0AAAg0AAAmFgAAEAAAACYAAAAIAAAAAAAAAAAAAAA="/>
               </a:ext>
             </a:extLst>
           </p:cNvSpPr>
@@ -3910,7 +4245,7 @@
             <a:spLocks noGrp="1" noChangeArrowheads="1"/>
             <a:extLst>
               <a:ext uri="smNativeData">
-                <pr:smNativeData xmlns:pr="smNativeData" val="SMDATA_13_FAOrYBMAAAAlAAAAZAAAAA8BAAAAkAAAAEgAAACQAAAASAAAAAAAAAAAAAAAAAAAAAEAAABQAAAAAAAAAAAA4D8AAAAAAADgPwAAAAAAAOA/AAAAAAAA4D8AAAAAAADgPwAAAAAAAOA/AAAAAAAA4D8AAAAAAADgPwAAAAAAAOA/AAAAAAAA4D8CAAAAjAAAAAAAAAAAAAAAu+DjDP///wgAAAAAAAAAAAAAAAAAAAAAAAAAAAAAAAAAAAAAZAAAAAEAAABAAAAAAAAAAAAAAAAAAAAAAAAAAAAAAAAAAAAAAAAAAAAAAAAAAAAAAAAAAAAAAAAAAAAAAAAAAAAAAAAAAAAAAAAAAAAAAAAAAAAAAAAAAAAAAAAAAAAAFAAAADwAAAAAAAAAAAAAAAAAAAkUAAAAAQAAABQAAAAUAAAAFAAAAAEAAAAAAAAAZAAAAGQAAAAAAAAAZAAAAGQAAAAVAAAAYAAAAAAAAAAAAAAADwAAACADAAAAAAAAAAAAAAEAAACgMgAAVgcAAKr4//8BAAAAf39/AAEAAABkAAAAAAAAABQAAABAHwAAAAAAACYAAAAAAAAAwOD//wAAAAAmAAAAZAAAABYAAABMAAAAAAAAAAAAAAAEAAAAAAAAAAEAAACAgIAKAAAAACgAAAAoAAAAZAAAAGQAAAAAAAAAzMzMAAAAAABQAAAAUAAAAGQAAABkAAAAAAAAABcAAAAUAAAAAAAAAAAAAAD/fwAA/38AAAAAAAAJAAAABAAAAAAAAAAMAAAAEAAAAAAAAAAAAAAAAAAAAAAAAAAeAAAAaAAAAAAAAAAAAAAAAAAAAAAAAAAAAAAAECcAABAnAAAAAAAAAAAAAAAAAAAAAAAAAAAAAAAAAAAAAAAAAAAAABQAAAAAAAAAwMD/AAAAAABkAAAAMgAAAAAAAABkAAAAAAAAAH9/fwAKAAAAHwAAAFQAAAD///cF///ZAQAAAAAAAAAAAAAAAAAAAAAAAAAAAAAAAAAAAAAAAAAAAAAAAn9/fwB3d3cDzMzMAMDA/wB/f38AAAAAAAAAAAAAAAAAAAAAAAAAAAAhAAAAGAAAABQAAABwCAAA6BcAANAvAACwIgAAAAAAACYAAAAIAAAAAAAAAAAAAAA="/>
+                <pr:smNativeData xmlns:pr="smNativeData" val="SMDATA_13_HjisYBMAAAAlAAAAZAAAAA8BAAAAkAAAAEgAAACQAAAASAAAAAAAAAAAAAAAAAAAAAEAAABQAAAAAAAAAAAA4D8AAAAAAADgPwAAAAAAAOA/AAAAAAAA4D8AAAAAAADgPwAAAAAAAOA/AAAAAAAA4D8AAAAAAADgPwAAAAAAAOA/AAAAAAAA4D8CAAAAjAAAAAAAAAAAAAAAu+DjDP///wgAAAAAAAAAAAAAAAAAAAAAAAAAAAAAAAAAAAAAZAAAAAEAAABAAAAAAAAAAAAAAAAAAAAAAAAAAAAAAAAAAAAAAAAAAAAAAAAAAAAAAAAAAAAAAAAAAAAAAAAAAAAAAAAAAAAAAAAAAAAAAAAAAAAAAAAAAAAAAAAAAAAAFAAAADwAAAAAAAAAAAAAAAAAAAkUAAAAAQAAABQAAAAUAAAAFAAAAAEAAAAAAAAAZAAAAGQAAAAAAAAAZAAAAGQAAAAVAAAAYAAAAAAAAAAAAAAADwAAACADAAAAAAAAAAAAAAEAAACgMgAAVgcAAKr4//8BAAAAf39/AAEAAABkAAAAAAAAABQAAABAHwAAAAAAACYAAAAAAAAAwOD//wAAAAAmAAAAZAAAABYAAABMAAAAAAAAAAAAAAAEAAAAAAAAAAEAAACAgIAKAAAAACgAAAAoAAAAZAAAAGQAAAAAAAAAzMzMAAAAAABQAAAAUAAAAGQAAABkAAAAAAAAABcAAAAUAAAAAAAAAAAAAAD/fwAA/38AAAAAAAAJAAAABAAAAAAAAAAMAAAAEAAAAAAAAAAAAAAAAAAAAAAAAAAeAAAAaAAAAAAAAAAAAAAAAAAAAAAAAAAAAAAAECcAABAnAAAAAAAAAAAAAAAAAAAAAAAAAAAAAAAAAAAAAAAAAAAAABQAAAAAAAAAwMD/AAAAAABkAAAAMgAAAAAAAABkAAAAAAAAAH9/fwAKAAAAHwAAAFQAAAD///cF///ZAQAAAAAAAAAAAAAAAAAAAAAAAAAAAAAAAAAAAAAAAAAAAAAAAn9/fwB3d3cDzMzMAMDA/wB/f38AAAAAAAAAAAAAAAAAAAAAAAAAAAAhAAAAGAAAABQAAABwCAAA6BcAANAvAACwIgAAEAAAACYAAAAIAAAAAAAAAAAAAAA="/>
               </a:ext>
             </a:extLst>
           </p:cNvSpPr>
@@ -3955,7 +4290,7 @@
 </p:sld>
 </file>
 
-<file path=ppt/slides/slide4.xml><?xml version="1.0" encoding="utf-8"?>
+<file path=ppt/slides/slide6.xml><?xml version="1.0" encoding="utf-8"?>
 <p:sld xmlns:p="http://schemas.openxmlformats.org/presentationml/2006/main" xmlns:p14="http://schemas.microsoft.com/office/powerpoint/2010/main" xmlns:r="http://schemas.openxmlformats.org/officeDocument/2006/relationships" xmlns:a="http://schemas.openxmlformats.org/drawingml/2006/main">
   <p:cSld>
     <p:bg>
@@ -3987,7 +4322,7 @@
             <a:spLocks noGrp="1" noChangeArrowheads="1"/>
             <a:extLst>
               <a:ext uri="smNativeData">
-                <pr:smNativeData xmlns:pr="smNativeData" val="SMDATA_13_FAOrYBMAAAAlAAAAZAAAAA8BAAAAkAAAAEgAAACQAAAASAAAAAAAAAABAAAAAAAAAAEAAABQAAAAAAAAAAAA4D8AAAAAAADgPwAAAAAAAOA/AAAAAAAA4D8AAAAAAADgPwAAAAAAAOA/AAAAAAAA4D8AAAAAAADgPwAAAAAAAOA/AAAAAAAA4D8CAAAAjAAAAAAAAAAAAAAAu+DjDP///wgAAAAAAAAAAAAAAAAAAAAAAAAAAAAAAAAAAAAAZAAAAAEAAABAAAAAAAAAAAAAAAAAAAAAAAAAAAAAAAAAAAAAAAAAAAAAAAAAAAAAAAAAAAAAAAAAAAAAAAAAAAAAAAAAAAAAAAAAAAAAAAAAAAAAAAAAAAAAAAAAAAAAFAAAADwAAAAAAAAAAAAAAAAAAAkUAAAAAQAAABQAAAAUAAAAFAAAAAEAAAAAAAAAZAAAAGQAAAAAAAAAZAAAAGQAAAAVAAAAYAAAAAAAAAAAAAAADwAAACADAAAAAAAAAAAAAAEAAACgMgAAVgcAAKr4//8BAAAAf39/AAEAAABkAAAAAAAAABQAAABAHwAAAAAAACYAAAAAAAAAwOD//wAAAAAmAAAAZAAAABYAAABMAAAAAAAAAAAAAAAEAAAAAAAAAAEAAACAgIAKAAAAACgAAAAoAAAAZAAAAGQAAAAAAAAAzMzMAAAAAABQAAAAUAAAAGQAAABkAAAAAAAAABcAAAAUAAAAAAAAAAAAAAD/fwAA/38AAAAAAAAJAAAABAAAAAAAAAAMAAAAEAAAAAAAAAAAAAAAAAAAAAAAAAAeAAAAaAAAAAAAAAAAAAAAAAAAAAAAAAAAAAAAECcAABAnAAAAAAAAAAAAAAAAAAAAAAAAAAAAAAAAAAAAAAAAAAAAABQAAAAAAAAAwMD/AAAAAABkAAAAMgAAAAAAAABkAAAAAAAAAH9/fwAKAAAAHwAAAFQAAAC74OMF////AQAAAAAAAAAAAAAAAAAAAAAAAAAAAAAAAAAAAAAAAAAAAAAAAn9/fwCAgIADzMzMAMDA/wB/f38AAAAAAAAAAAAAAAAAAAAAAAAAAAAhAAAAGAAAABQAAADQAgAAsAEAAHA1AAC4CAAAAAAAACYAAAAIAAAAAAAAAAAAAAA="/>
+                <pr:smNativeData xmlns:pr="smNativeData" val="SMDATA_13_HjisYBMAAAAlAAAAZAAAAA8BAAAAkAAAAEgAAACQAAAASAAAAAAAAAABAAAAAAAAAAEAAABQAAAAAAAAAAAA4D8AAAAAAADgPwAAAAAAAOA/AAAAAAAA4D8AAAAAAADgPwAAAAAAAOA/AAAAAAAA4D8AAAAAAADgPwAAAAAAAOA/AAAAAAAA4D8CAAAAjAAAAAAAAAAAAAAAu+DjDP///wgAAAAAAAAAAAAAAAAAAAAAAAAAAAAAAAAAAAAAZAAAAAEAAABAAAAAAAAAAAAAAAAAAAAAAAAAAAAAAAAAAAAAAAAAAAAAAAAAAAAAAAAAAAAAAAAAAAAAAAAAAAAAAAAAAAAAAAAAAAAAAAAAAAAAAAAAAAAAAAAAAAAAFAAAADwAAAAAAAAAAAAAAAAAAAkUAAAAAQAAABQAAAAUAAAAFAAAAAEAAAAAAAAAZAAAAGQAAAAAAAAAZAAAAGQAAAAVAAAAYAAAAAAAAAAAAAAADwAAACADAAAAAAAAAAAAAAEAAACgMgAAVgcAAKr4//8BAAAAf39/AAEAAABkAAAAAAAAABQAAABAHwAAAAAAACYAAAAAAAAAwOD//wAAAAAmAAAAZAAAABYAAABMAAAAAAAAAAAAAAAEAAAAAAAAAAEAAACAgIAKAAAAACgAAAAoAAAAZAAAAGQAAAAAAAAAzMzMAAAAAABQAAAAUAAAAGQAAABkAAAAAAAAABcAAAAUAAAAAAAAAAAAAAD/fwAA/38AAAAAAAAJAAAABAAAAAAAAAAMAAAAEAAAAAAAAAAAAAAAAAAAAAAAAAAeAAAAaAAAAAAAAAAAAAAAAAAAAAAAAAAAAAAAECcAABAnAAAAAAAAAAAAAAAAAAAAAAAAAAAAAAAAAAAAAAAAAAAAABQAAAAAAAAAwMD/AAAAAABkAAAAMgAAAAAAAABkAAAAAAAAAH9/fwAKAAAAHwAAAFQAAAC74OMF////AQAAAAAAAAAAAAAAAAAAAAAAAAAAAAAAAAAAAAAAAAAAAAAAAn9/fwCAgIADzMzMAMDA/wB/f38AAAAAAAAAAAAAAAAAAAAAAAAAAAAhAAAAGAAAABQAAADQAgAAsAEAAHA1AAC4CAAAEAAAACYAAAAIAAAAAAAAAAAAAAA="/>
               </a:ext>
             </a:extLst>
           </p:cNvSpPr>
@@ -4014,7 +4349,7 @@
             <a:spLocks noGrp="1" noChangeArrowheads="1"/>
             <a:extLst>
               <a:ext uri="smNativeData">
-                <pr:smNativeData xmlns:pr="smNativeData" val="SMDATA_13_FAOrYBMAAAAlAAAAZAAAAA8BAAAAkAAAAEgAAACQAAAASAAAAAAAAAACAAAAAAAAAAEAAABQAAAAAAAAAAAA4D8AAAAAAADgPwAAAAAAAOA/AAAAAAAA4D8AAAAAAADgPwAAAAAAAOA/AAAAAAAA4D8AAAAAAADgPwAAAAAAAOA/AAAAAAAA4D8CAAAAjAAAAAAAAAAAAAAAu+DjDP///wgAAAAAAAAAAAAAAAAAAAAAAAAAAAAAAAAAAAAAZAAAAAEAAABAAAAAAAAAAAAAAAAAAAAAAAAAAAAAAAAAAAAAAAAAAAAAAAAAAAAAAAAAAAAAAAAAAAAAAAAAAAAAAAAAAAAAAAAAAAAAAAAAAAAAAAAAAAAAAAAAAAAAFAAAADwAAAAAAAAAAAAAAAAAAAkUAAAAAQAAABQAAAAUAAAAFAAAAAEAAAAAAAAAZAAAAGQAAAAAAAAAZAAAAGQAAAAVAAAAYAAAAAAAAAAAAAAADwAAACADAAAAAAAAAAAAAAEAAACgMgAAVgcAAKr4//8BAAAAf39/AAEAAABkAAAAAAAAABQAAABAHwAAAAAAACYAAAAAAAAAwOD//wAAAAAmAAAAZAAAABYAAABMAAAAAAAAAAAAAAAEAAAAAAAAAAEAAACAgIAKAAAAACgAAAAoAAAAZAAAAGQAAAAAAAAAzMzMAAAAAABQAAAAUAAAAGQAAABkAAAAAAAAABcAAAAUAAAAAAAAAAAAAAD/fwAA/38AAAAAAAAJAAAABAAAAAAAAAAMAAAAEAAAAAAAAAAAAAAAAAAAAAAAAAAeAAAAaAAAAAAAAAAAAAAAAAAAAAAAAAAAAAAAECcAABAnAAAAAAAAAAAAAAAAAAAAAAAAAAAAAAAAAAAAAAAAAAAAABQAAAAAAAAAwMD/AAAAAABkAAAAMgAAAAAAAABkAAAAAAAAAH9/fwAKAAAAHwAAAFQAAAC74OMF////AQAAAAAAAAAAAAAAAAAAAAAAAAAAAAAAAAAAAAAAAAAAAAAAAn9/fwCAgIADzMzMAMDA/wB/f38AAAAAAAAAAAAAAAAAAAAAAAAAAAAhAAAAGAAAABQAAADQAgAAcQkAAKobAABhDQAAAAAAACYAAAAIAAAAgYAAAAAAAAA="/>
+                <pr:smNativeData xmlns:pr="smNativeData" val="SMDATA_13_HjisYBMAAAAlAAAAZAAAAA8BAAAAkAAAAEgAAACQAAAASAAAAAAAAAACAAAAAAAAAAEAAABQAAAAAAAAAAAA4D8AAAAAAADgPwAAAAAAAOA/AAAAAAAA4D8AAAAAAADgPwAAAAAAAOA/AAAAAAAA4D8AAAAAAADgPwAAAAAAAOA/AAAAAAAA4D8CAAAAjAAAAAAAAAAAAAAAu+DjDP///wgAAAAAAAAAAAAAAAAAAAAAAAAAAAAAAAAAAAAAZAAAAAEAAABAAAAAAAAAAAAAAAAAAAAAAAAAAAAAAAAAAAAAAAAAAAAAAAAAAAAAAAAAAAAAAAAAAAAAAAAAAAAAAAAAAAAAAAAAAAAAAAAAAAAAAAAAAAAAAAAAAAAAFAAAADwAAAAAAAAAAAAAAAAAAAkUAAAAAQAAABQAAAAUAAAAFAAAAAEAAAAAAAAAZAAAAGQAAAAAAAAAZAAAAGQAAAAVAAAAYAAAAAAAAAAAAAAADwAAACADAAAAAAAAAAAAAAEAAACgMgAAVgcAAKr4//8BAAAAf39/AAEAAABkAAAAAAAAABQAAABAHwAAAAAAACYAAAAAAAAAwOD//wAAAAAmAAAAZAAAABYAAABMAAAAAAAAAAAAAAAEAAAAAAAAAAEAAACAgIAKAAAAACgAAAAoAAAAZAAAAGQAAAAAAAAAzMzMAAAAAABQAAAAUAAAAGQAAABkAAAAAAAAABcAAAAUAAAAAAAAAAAAAAD/fwAA/38AAAAAAAAJAAAABAAAAAAAAAAMAAAAEAAAAAAAAAAAAAAAAAAAAAAAAAAeAAAAaAAAAAAAAAAAAAAAAAAAAAAAAAAAAAAAECcAABAnAAAAAAAAAAAAAAAAAAAAAAAAAAAAAAAAAAAAAAAAAAAAABQAAAAAAAAAwMD/AAAAAABkAAAAMgAAAAAAAABkAAAAAAAAAH9/fwAKAAAAHwAAAFQAAAC74OMF////AQAAAAAAAAAAAAAAAAAAAAAAAAAAAAAAAAAAAAAAAAAAAAAAAn9/fwCAgIADzMzMAMDA/wB/f38AAAAAAAAAAAAAAAAAAAAAAAAAAAAhAAAAGAAAABQAAADQAgAAcQkAAKobAABhDQAAEAAAACYAAAAIAAAAgYAAAAAAAAA="/>
               </a:ext>
             </a:extLst>
           </p:cNvSpPr>
@@ -4084,12 +4419,12 @@
             <a:spLocks noGrp="1" noChangeArrowheads="1"/>
             <a:extLst>
               <a:ext uri="smNativeData">
-                <pr:smNativeData xmlns:pr="smNativeData" val="SMDATA_13_FAOrYBMAAAAlAAAAZAAAAA8BAAAAkAAAAEgAAACQAAAASAAAAAAAAAAAAAAAAAAAAAEAAABQAAAAAAAAAAAA4D8AAAAAAADgPwAAAAAAAOA/AAAAAAAA4D8AAAAAAADgPwAAAAAAAOA/AAAAAAAA4D8AAAAAAADgPwAAAAAAAOA/AAAAAAAA4D8CAAAAjAAAAAAAAAAAAAAAu+DjDP///wgAAAAAAAAAAAAAAAAAAAAAAAAAAAAAAAAAAAAAZAAAAAEAAABAAAAAAAAAAAAAAAAAAAAAAAAAAAAAAAAAAAAAAAAAAAAAAAAAAAAAAAAAAAAAAAAAAAAAAAAAAAAAAAAAAAAAAAAAAAAAAAAAAAAAAAAAAAAAAAAAAAAAFAAAADwAAAAAAAAAAAAAAAAAAAkUAAAAAQAAABQAAAAUAAAAFAAAAAEAAAAAAAAAZAAAAGQAAAAAAAAAZAAAAGQAAAAVAAAAYAAAAAAAAAAAAAAADwAAACADAAAAAAAAAAAAAAEAAACgMgAAVgcAAKr4//8BAAAAf39/AAEAAABkAAAAAAAAABQAAABAHwAAAAAAACYAAAAAAAAAwOD//wAAAAAmAAAAZAAAABYAAABMAAAAAAAAAAAAAAAEAAAAAAAAAAEAAACAgIAKAAAAACgAAAAoAAAAZAAAAGQAAAAAAAAAzMzMAAAAAABQAAAAUAAAAGQAAABkAAAAAAAAABcAAAAUAAAAAAAAAAAAAAD/fwAA/38AAAAAAAAJAAAABAAAAAAAAAAMAAAAEAAAAAAAAAAAAAAAAAAAAAAAAAAeAAAAaAAAAAAAAAAAAAAAAAAAAAAAAAAAAAAAECcAABAnAAAAAAAAAAAAAAAAAAAAAAAAAAAAAAAAAAAAAAAAAAAAABQAAAAAAAAAwMD/AAAAAABkAAAAMgAAAAAAAABkAAAAAAAAAH9/fwAKAAAAHwAAAFQAAAC74OMF////AQAAAAAAAAAAAAAAAAAAAAAAAAAAAAAAAAAAAAAAAAAAAAAAAn9/fwCAgIADzMzMAMDA/wB/f38AAAAAAAAAAAAAAAAAAAAAAAAAAAAhAAAAGAAAABQAAADQAgAAYQ0AAKobAACwJQAAAAAAACYAAAAIAAAAAYAAAAAAAAA="/>
-              </a:ext>
-            </a:extLst>
-          </p:cNvSpPr>
-          <p:nvPr>
-            <p:ph type="body" sz="half" idx="2"/>
+                <pr:smNativeData xmlns:pr="smNativeData" val="SMDATA_13_HjisYBMAAAAlAAAAZAAAAA8BAAAAkAAAAEgAAACQAAAASAAAAAAAAAAAAAAAAAAAAAEAAABQAAAAAAAAAAAA4D8AAAAAAADgPwAAAAAAAOA/AAAAAAAA4D8AAAAAAADgPwAAAAAAAOA/AAAAAAAA4D8AAAAAAADgPwAAAAAAAOA/AAAAAAAA4D8CAAAAjAAAAAAAAAAAAAAAu+DjDP///wgAAAAAAAAAAAAAAAAAAAAAAAAAAAAAAAAAAAAAZAAAAAEAAABAAAAAAAAAAAAAAAAAAAAAAAAAAAAAAAAAAAAAAAAAAAAAAAAAAAAAAAAAAAAAAAAAAAAAAAAAAAAAAAAAAAAAAAAAAAAAAAAAAAAAAAAAAAAAAAAAAAAAFAAAADwAAAAAAAAAAAAAAAAAAAkUAAAAAQAAABQAAAAUAAAAFAAAAAEAAAAAAAAAZAAAAGQAAAAAAAAAZAAAAGQAAAAVAAAAYAAAAAAAAAAAAAAADwAAACADAAAAAAAAAAAAAAEAAACgMgAAVgcAAKr4//8BAAAAf39/AAEAAABkAAAAAAAAABQAAABAHwAAAAAAACYAAAAAAAAAwOD//wAAAAAmAAAAZAAAABYAAABMAAAAAAAAAAAAAAAEAAAAAAAAAAEAAACAgIAKAAAAACgAAAAoAAAAZAAAAGQAAAAAAAAAzMzMAAAAAABQAAAAUAAAAGQAAABkAAAAAAAAABcAAAAUAAAAAAAAAAAAAAD/fwAA/38AAAAAAAAJAAAABAAAAAAAAAAMAAAAEAAAAAAAAAAAAAAAAAAAAAAAAAAeAAAAaAAAAAAAAAAAAAAAAAAAAAAAAAAAAAAAECcAABAnAAAAAAAAAAAAAAAAAAAAAAAAAAAAAAAAAAAAAAAAAAAAABQAAAAAAAAAwMD/AAAAAABkAAAAMgAAAAAAAABkAAAAAAAAAH9/fwAKAAAAHwAAAFQAAAC74OMF////AQAAAAAAAAAAAAAAAAAAAAAAAAAAAAAAAAAAAAAAAAAAAAAAAn9/fwCAgIADzMzMAMDA/wB/f38AAAAAAAAAAAAAAAAAAAAAAAAAAAAhAAAAGAAAABQAAADQAgAAYQ0AAKobAACwJQAAEAAAACYAAAAIAAAAAYAAAAAAAAA="/>
+              </a:ext>
+            </a:extLst>
+          </p:cNvSpPr>
+          <p:nvPr>
+            <p:ph type="body" idx="2"/>
           </p:nvPr>
         </p:nvSpPr>
         <p:spPr>
@@ -4160,7 +4495,7 @@
             <a:spLocks noGrp="1" noChangeArrowheads="1"/>
             <a:extLst>
               <a:ext uri="smNativeData">
-                <pr:smNativeData xmlns:pr="smNativeData" val="SMDATA_13_FAOrYBMAAAAlAAAAZAAAAA8BAAAAkAAAAEgAAACQAAAASAAAAAAAAAACAAAAAAAAAAEAAABQAAAAAAAAAAAA4D8AAAAAAADgPwAAAAAAAOA/AAAAAAAA4D8AAAAAAADgPwAAAAAAAOA/AAAAAAAA4D8AAAAAAADgPwAAAAAAAOA/AAAAAAAA4D8CAAAAjAAAAAAAAAAAAAAAu+DjDP///wgAAAAAAAAAAAAAAAAAAAAAAAAAAAAAAAAAAAAAZAAAAAEAAABAAAAAAAAAAAAAAAAAAAAAAAAAAAAAAAAAAAAAAAAAAAAAAAAAAAAAAAAAAAAAAAAAAAAAAAAAAAAAAAAAAAAAAAAAAAAAAAAAAAAAAAAAAAAAAAAAAAAAFAAAADwAAAAAAAAAAAAAAAAAAAkUAAAAAQAAABQAAAAUAAAAFAAAAAEAAAAAAAAAZAAAAGQAAAAAAAAAZAAAAGQAAAAVAAAAYAAAAAAAAAAAAAAADwAAACADAAAAAAAAAAAAAAEAAACgMgAAVgcAAKr4//8BAAAAf39/AAEAAABkAAAAAAAAABQAAABAHwAAAAAAACYAAAAAAAAAwOD//wAAAAAmAAAAZAAAABYAAABMAAAAAAAAAAAAAAAEAAAAAAAAAAEAAACAgIAKAAAAACgAAAAoAAAAZAAAAGQAAAAAAAAAzMzMAAAAAABQAAAAUAAAAGQAAABkAAAAAAAAABcAAAAUAAAAAAAAAAAAAAD/fwAA/38AAAAAAAAJAAAABAAAAAAAAAAMAAAAEAAAAAAAAAAAAAAAAAAAAAAAAAAeAAAAaAAAAAAAAAAAAAAAAAAAAAAAAAAAAAAAECcAABAnAAAAAAAAAAAAAAAAAAAAAAAAAAAAAAAAAAAAAAAAAAAAABQAAAAAAAAAwMD/AAAAAABkAAAAMgAAAAAAAABkAAAAAAAAAH9/fwAKAAAAHwAAAFQAAAC74OMF////AQAAAAAAAAAAAAAAAAAAAAAAAAAAAAAAAAAAAAAAAAAAAAAAAn9/fwCAgIADzMzMAMDA/wB/f38AAAAAAAAAAAAAAAAAAAAAAAAAAAAhAAAAGAAAABQAAACWHAAAcQkAAHA1AABhDQAAAAAAACYAAAAIAAAAgYAAAAAAAAA="/>
+                <pr:smNativeData xmlns:pr="smNativeData" val="SMDATA_13_HjisYBMAAAAlAAAAZAAAAA8BAAAAkAAAAEgAAACQAAAASAAAAAAAAAACAAAAAAAAAAEAAABQAAAAAAAAAAAA4D8AAAAAAADgPwAAAAAAAOA/AAAAAAAA4D8AAAAAAADgPwAAAAAAAOA/AAAAAAAA4D8AAAAAAADgPwAAAAAAAOA/AAAAAAAA4D8CAAAAjAAAAAAAAAAAAAAAu+DjDP///wgAAAAAAAAAAAAAAAAAAAAAAAAAAAAAAAAAAAAAZAAAAAEAAABAAAAAAAAAAAAAAAAAAAAAAAAAAAAAAAAAAAAAAAAAAAAAAAAAAAAAAAAAAAAAAAAAAAAAAAAAAAAAAAAAAAAAAAAAAAAAAAAAAAAAAAAAAAAAAAAAAAAAFAAAADwAAAAAAAAAAAAAAAAAAAkUAAAAAQAAABQAAAAUAAAAFAAAAAEAAAAAAAAAZAAAAGQAAAAAAAAAZAAAAGQAAAAVAAAAYAAAAAAAAAAAAAAADwAAACADAAAAAAAAAAAAAAEAAACgMgAAVgcAAKr4//8BAAAAf39/AAEAAABkAAAAAAAAABQAAABAHwAAAAAAACYAAAAAAAAAwOD//wAAAAAmAAAAZAAAABYAAABMAAAAAAAAAAAAAAAEAAAAAAAAAAEAAACAgIAKAAAAACgAAAAoAAAAZAAAAGQAAAAAAAAAzMzMAAAAAABQAAAAUAAAAGQAAABkAAAAAAAAABcAAAAUAAAAAAAAAAAAAAD/fwAA/38AAAAAAAAJAAAABAAAAAAAAAAMAAAAEAAAAAAAAAAAAAAAAAAAAAAAAAAeAAAAaAAAAAAAAAAAAAAAAAAAAAAAAAAAAAAAECcAABAnAAAAAAAAAAAAAAAAAAAAAAAAAAAAAAAAAAAAAAAAAAAAABQAAAAAAAAAwMD/AAAAAABkAAAAMgAAAAAAAABkAAAAAAAAAH9/fwAKAAAAHwAAAFQAAAC74OMF////AQAAAAAAAAAAAAAAAAAAAAAAAAAAAAAAAAAAAAAAAAAAAAAAAn9/fwCAgIADzMzMAMDA/wB/f38AAAAAAAAAAAAAAAAAAAAAAAAAAAAhAAAAGAAAABQAAACWHAAAcQkAAHA1AABhDQAAEAAAACYAAAAIAAAAgYAAAAAAAAA="/>
               </a:ext>
             </a:extLst>
           </p:cNvSpPr>
@@ -4230,12 +4565,12 @@
             <a:spLocks noGrp="1" noChangeArrowheads="1"/>
             <a:extLst>
               <a:ext uri="smNativeData">
-                <pr:smNativeData xmlns:pr="smNativeData" val="SMDATA_13_FAOrYBMAAAAlAAAAZAAAAA8BAAAAkAAAAEgAAACQAAAASAAAAAAAAAAAAAAAAAAAAAEAAABQAAAAAAAAAAAA4D8AAAAAAADgPwAAAAAAAOA/AAAAAAAA4D8AAAAAAADgPwAAAAAAAOA/AAAAAAAA4D8AAAAAAADgPwAAAAAAAOA/AAAAAAAA4D8CAAAAjAAAAAAAAAAAAAAAu+DjDP///wgAAAAAAAAAAAAAAAAAAAAAAAAAAAAAAAAAAAAAZAAAAAEAAABAAAAAAAAAAAAAAAAAAAAAAAAAAAAAAAAAAAAAAAAAAAAAAAAAAAAAAAAAAAAAAAAAAAAAAAAAAAAAAAAAAAAAAAAAAAAAAAAAAAAAAAAAAAAAAAAAAAAAFAAAADwAAAAAAAAAAAAAAAAAAAkUAAAAAQAAABQAAAAUAAAAFAAAAAEAAAAAAAAAZAAAAGQAAAAAAAAAZAAAAGQAAAAVAAAAYAAAAAAAAAAAAAAADwAAACADAAAAAAAAAAAAAAEAAACgMgAAVgcAAKr4//8BAAAAf39/AAEAAABkAAAAAAAAABQAAABAHwAAAAAAACYAAAAAAAAAwOD//wAAAAAmAAAAZAAAABYAAABMAAAAAAAAAAAAAAAEAAAAAAAAAAEAAACAgIAKAAAAACgAAAAoAAAAZAAAAGQAAAAAAAAAzMzMAAAAAABQAAAAUAAAAGQAAABkAAAAAAAAABcAAAAUAAAAAAAAAAAAAAD/fwAA/38AAAAAAAAJAAAABAAAAAAAAAAMAAAAEAAAAAAAAAAAAAAAAAAAAAAAAAAeAAAAaAAAAAAAAAAAAAAAAAAAAAAAAAAAAAAAECcAABAnAAAAAAAAAAAAAAAAAAAAAAAAAAAAAAAAAAAAAAAAAAAAABQAAAAAAAAAwMD/AAAAAABkAAAAMgAAAAAAAABkAAAAAAAAAH9/fwAKAAAAHwAAAFQAAAC74OMF////AQAAAAAAAAAAAAAAAAAAAAAAAAAAAAAAAAAAAAAAAAAAAAAAAn9/fwCAgIADzMzMAMDA/wB/f38AAAAAAAAAAAAAAAAAAAAAAAAAAAAhAAAAGAAAABQAAACWHAAAYQ0AAHA1AACwJQAAAAAAACYAAAAIAAAAAAAAAAAAAAA="/>
-              </a:ext>
-            </a:extLst>
-          </p:cNvSpPr>
-          <p:nvPr>
-            <p:ph type="body" sz="half" idx="4"/>
+                <pr:smNativeData xmlns:pr="smNativeData" val="SMDATA_13_HjisYBMAAAAlAAAAZAAAAA8BAAAAkAAAAEgAAACQAAAASAAAAAAAAAAAAAAAAAAAAAEAAABQAAAAAAAAAAAA4D8AAAAAAADgPwAAAAAAAOA/AAAAAAAA4D8AAAAAAADgPwAAAAAAAOA/AAAAAAAA4D8AAAAAAADgPwAAAAAAAOA/AAAAAAAA4D8CAAAAjAAAAAAAAAAAAAAAu+DjDP///wgAAAAAAAAAAAAAAAAAAAAAAAAAAAAAAAAAAAAAZAAAAAEAAABAAAAAAAAAAAAAAAAAAAAAAAAAAAAAAAAAAAAAAAAAAAAAAAAAAAAAAAAAAAAAAAAAAAAAAAAAAAAAAAAAAAAAAAAAAAAAAAAAAAAAAAAAAAAAAAAAAAAAFAAAADwAAAAAAAAAAAAAAAAAAAkUAAAAAQAAABQAAAAUAAAAFAAAAAEAAAAAAAAAZAAAAGQAAAAAAAAAZAAAAGQAAAAVAAAAYAAAAAAAAAAAAAAADwAAACADAAAAAAAAAAAAAAEAAACgMgAAVgcAAKr4//8BAAAAf39/AAEAAABkAAAAAAAAABQAAABAHwAAAAAAACYAAAAAAAAAwOD//wAAAAAmAAAAZAAAABYAAABMAAAAAAAAAAAAAAAEAAAAAAAAAAEAAACAgIAKAAAAACgAAAAoAAAAZAAAAGQAAAAAAAAAzMzMAAAAAABQAAAAUAAAAGQAAABkAAAAAAAAABcAAAAUAAAAAAAAAAAAAAD/fwAA/38AAAAAAAAJAAAABAAAAAAAAAAMAAAAEAAAAAAAAAAAAAAAAAAAAAAAAAAeAAAAaAAAAAAAAAAAAAAAAAAAAAAAAAAAAAAAECcAABAnAAAAAAAAAAAAAAAAAAAAAAAAAAAAAAAAAAAAAAAAAAAAABQAAAAAAAAAwMD/AAAAAABkAAAAMgAAAAAAAABkAAAAAAAAAH9/fwAKAAAAHwAAAFQAAAC74OMF////AQAAAAAAAAAAAAAAAAAAAAAAAAAAAAAAAAAAAAAAAAAAAAAAAn9/fwCAgIADzMzMAMDA/wB/f38AAAAAAAAAAAAAAAAAAAAAAAAAAAAhAAAAGAAAABQAAACWHAAAYQ0AAHA1AACwJQAAEAAAACYAAAAIAAAAAAAAAAAAAAA="/>
+              </a:ext>
+            </a:extLst>
+          </p:cNvSpPr>
+          <p:nvPr>
+            <p:ph type="body" idx="4"/>
           </p:nvPr>
         </p:nvSpPr>
         <p:spPr/>
@@ -4272,7 +4607,7 @@
 </p:sld>
 </file>
 
-<file path=ppt/slides/slide5.xml><?xml version="1.0" encoding="utf-8"?>
+<file path=ppt/slides/slide7.xml><?xml version="1.0" encoding="utf-8"?>
 <p:sld xmlns:p="http://schemas.openxmlformats.org/presentationml/2006/main" xmlns:p14="http://schemas.microsoft.com/office/powerpoint/2010/main" xmlns:r="http://schemas.openxmlformats.org/officeDocument/2006/relationships" xmlns:a="http://schemas.openxmlformats.org/drawingml/2006/main">
   <p:cSld>
     <p:bg>
@@ -4304,7 +4639,7 @@
             <a:spLocks noGrp="1" noChangeArrowheads="1"/>
             <a:extLst>
               <a:ext uri="smNativeData">
-                <pr:smNativeData xmlns:pr="smNativeData" val="SMDATA_13_FAOrYBMAAAAlAAAAZAAAAA8BAAAAkAAAAEgAAACQAAAASAAAAAAAAAABAAAAAAAAAAEAAABQAAAAAAAAAAAA4D8AAAAAAADgPwAAAAAAAOA/AAAAAAAA4D8AAAAAAADgPwAAAAAAAOA/AAAAAAAA4D8AAAAAAADgPwAAAAAAAOA/AAAAAAAA4D8CAAAAjAAAAAAAAAAAAAAAu+DjDP///wgAAAAAAAAAAAAAAAAAAAAAAAAAAAAAAAAAAAAAZAAAAAEAAABAAAAAAAAAAAAAAAAAAAAAAAAAAAAAAAAAAAAAAAAAAAAAAAAAAAAAAAAAAAAAAAAAAAAAAAAAAAAAAAAAAAAAAAAAAAAAAAAAAAAAAAAAAAAAAAAAAAAAFAAAADwAAAAAAAAAAAAAAAAAAAkUAAAAAQAAABQAAAAUAAAAFAAAAAEAAAAAAAAAZAAAAGQAAAAAAAAAZAAAAGQAAAAVAAAAYAAAAAAAAAAAAAAADwAAACADAAAAAAAAAAAAAAEAAACgMgAAVgcAAKr4//8BAAAAf39/AAEAAABkAAAAAAAAABQAAABAHwAAAAAAACYAAAAAAAAAwOD//wAAAAAmAAAAZAAAABYAAABMAAAAAAAAAAAAAAAEAAAAAAAAAAEAAACAgIAKAAAAACgAAAAoAAAAZAAAAGQAAAAAAAAAzMzMAAAAAABQAAAAUAAAAGQAAABkAAAAAAAAABcAAAAUAAAAAAAAAAAAAAD/fwAA/38AAAAAAAAJAAAABAAAAAAAAAAMAAAAEAAAAAAAAAAAAAAAAAAAAAAAAAAeAAAAaAAAAAAAAAAAAAAAAAAAAAAAAAAAAAAAECcAABAnAAAAAAAAAAAAAAAAAAAAAAAAAAAAAAAAAAAAAAAAAAAAABQAAAAAAAAAwMD/AAAAAABkAAAAMgAAAAAAAABkAAAAAAAAAH9/fwAKAAAAHwAAAFQAAABgWXsFZmaZAQAAAAAAAAAAAAAAAAAAAAAAAAAAAAAAAAAAAAAAAAAA////An9/fwA+PlwDzMzMAMDA/wB/f38AAAAAAAAAAAAAAAAAAAAAAAAAAAAhAAAAGAAAABQAAADQAgAAsAEAAHA1AAC4CAAAAAAAACYAAAAIAAAAAAAAAAAAAAA="/>
+                <pr:smNativeData xmlns:pr="smNativeData" val="SMDATA_13_HjisYBMAAAAlAAAAZAAAAA8BAAAAkAAAAEgAAACQAAAASAAAAAAAAAABAAAAAAAAAAEAAABQAAAAAAAAAAAA4D8AAAAAAADgPwAAAAAAAOA/AAAAAAAA4D8AAAAAAADgPwAAAAAAAOA/AAAAAAAA4D8AAAAAAADgPwAAAAAAAOA/AAAAAAAA4D8CAAAAjAAAAAAAAAAAAAAAu+DjDP///wgAAAAAAAAAAAAAAAAAAAAAAAAAAAAAAAAAAAAAZAAAAAEAAABAAAAAAAAAAAAAAAAAAAAAAAAAAAAAAAAAAAAAAAAAAAAAAAAAAAAAAAAAAAAAAAAAAAAAAAAAAAAAAAAAAAAAAAAAAAAAAAAAAAAAAAAAAAAAAAAAAAAAFAAAADwAAAAAAAAAAAAAAAAAAAkUAAAAAQAAABQAAAAUAAAAFAAAAAEAAAAAAAAAZAAAAGQAAAAAAAAAZAAAAGQAAAAVAAAAYAAAAAAAAAAAAAAADwAAACADAAAAAAAAAAAAAAEAAACgMgAAVgcAAKr4//8BAAAAf39/AAEAAABkAAAAAAAAABQAAABAHwAAAAAAACYAAAAAAAAAwOD//wAAAAAmAAAAZAAAABYAAABMAAAAAAAAAAAAAAAEAAAAAAAAAAEAAACAgIAKAAAAACgAAAAoAAAAZAAAAGQAAAAAAAAAzMzMAAAAAABQAAAAUAAAAGQAAABkAAAAAAAAABcAAAAUAAAAAAAAAAAAAAD/fwAA/38AAAAAAAAJAAAABAAAAAAAAAAMAAAAEAAAAAAAAAAAAAAAAAAAAAAAAAAeAAAAaAAAAAAAAAAAAAAAAAAAAAAAAAAAAAAAECcAABAnAAAAAAAAAAAAAAAAAAAAAAAAAAAAAAAAAAAAAAAAAAAAABQAAAAAAAAAwMD/AAAAAABkAAAAMgAAAAAAAABkAAAAAAAAAH9/fwAKAAAAHwAAAFQAAAAAAAAFAAAAAQAAAAAAAAAAAAAAAAAAAAAAAAAAAAAAAAAAAAAAAAAAAAAAAn9/fwAAAAADzMzMAMDA/wB/f38AAAAAAAAAAAAAAAAAAAAAAAAAAAAhAAAAGAAAABQAAADQAgAAsAEAAHA1AAC4CAAAEAAAACYAAAAIAAAAAAAAAAAAAAA="/>
               </a:ext>
             </a:extLst>
           </p:cNvSpPr>
@@ -4331,7 +4666,7 @@
             <a:spLocks noGrp="1" noChangeArrowheads="1"/>
             <a:extLst>
               <a:ext uri="smNativeData">
-                <pr:smNativeData xmlns:pr="smNativeData" val="SMDATA_13_FAOrYBMAAAAlAAAAZAAAAA8BAAAAkAAAAEgAAACQAAAASAAAAAAAAAACAAAAAAAAAAEAAABQAAAAAAAAAAAA4D8AAAAAAADgPwAAAAAAAOA/AAAAAAAA4D8AAAAAAADgPwAAAAAAAOA/AAAAAAAA4D8AAAAAAADgPwAAAAAAAOA/AAAAAAAA4D8CAAAAjAAAAAAAAAAAAAAAu+DjDP///wgAAAAAAAAAAAAAAAAAAAAAAAAAAAAAAAAAAAAAZAAAAAEAAABAAAAAAAAAAAAAAAAAAAAAAAAAAAAAAAAAAAAAAAAAAAAAAAAAAAAAAAAAAAAAAAAAAAAAAAAAAAAAAAAAAAAAAAAAAAAAAAAAAAAAAAAAAAAAAAAAAAAAFAAAADwAAAAAAAAAAAAAAAAAAAkUAAAAAQAAABQAAAAUAAAAFAAAAAEAAAAAAAAAZAAAAGQAAAAAAAAAZAAAAGQAAAAVAAAAYAAAAAAAAAAAAAAADwAAACADAAAAAAAAAAAAAAEAAACgMgAAVgcAAKr4//8BAAAAf39/AAEAAABkAAAAAAAAABQAAABAHwAAAAAAACYAAAAAAAAAwOD//wAAAAAmAAAAZAAAABYAAABMAAAAAAAAAAAAAAAEAAAAAAAAAAEAAACAgIAKAAAAACgAAAAoAAAAZAAAAGQAAAAAAAAAzMzMAAAAAABQAAAAUAAAAGQAAABkAAAAAAAAABcAAAAUAAAAAAAAAAAAAAD/fwAA/38AAAAAAAAJAAAABAAAAAAAAAAMAAAAEAAAAAAAAAAAAAAAAAAAAAAAAAAeAAAAaAAAAAAAAAAAAAAAAAAAAAAAAAAAAAAAECcAABAnAAAAAAAAAAAAAAAAAAAAAAAAAAAAAAAAAAAAAAAAAAAAABQAAAAAAAAAwMD/AAAAAABkAAAAMgAAAAAAAABkAAAAAAAAAH9/fwAKAAAAHwAAAFQAAABgWXsFZmaZAQAAAAAAAAAAAAAAAAAAAAAAAAAAAAAAAAAAAAAAAAAA////An9/fwA+PlwDzMzMAMDA/wB/f38AAAAAAAAAAAAAAAAAAAAAAAAAAAAhAAAAGAAAABQAAADQAgAAcQkAAKobAABhDQAAAAAAACYAAAAIAAAAgYAAAAAAAAA="/>
+                <pr:smNativeData xmlns:pr="smNativeData" val="SMDATA_13_HjisYBMAAAAlAAAAZAAAAA8BAAAAkAAAAEgAAACQAAAASAAAAAAAAAACAAAAAAAAAAEAAABQAAAAAAAAAAAA4D8AAAAAAADgPwAAAAAAAOA/AAAAAAAA4D8AAAAAAADgPwAAAAAAAOA/AAAAAAAA4D8AAAAAAADgPwAAAAAAAOA/AAAAAAAA4D8CAAAAjAAAAAAAAAAAAAAAu+DjDP///wgAAAAAAAAAAAAAAAAAAAAAAAAAAAAAAAAAAAAAZAAAAAEAAABAAAAAAAAAAAAAAAAAAAAAAAAAAAAAAAAAAAAAAAAAAAAAAAAAAAAAAAAAAAAAAAAAAAAAAAAAAAAAAAAAAAAAAAAAAAAAAAAAAAAAAAAAAAAAAAAAAAAAFAAAADwAAAAAAAAAAAAAAAAAAAkUAAAAAQAAABQAAAAUAAAAFAAAAAEAAAAAAAAAZAAAAGQAAAAAAAAAZAAAAGQAAAAVAAAAYAAAAAAAAAAAAAAADwAAACADAAAAAAAAAAAAAAEAAACgMgAAVgcAAKr4//8BAAAAf39/AAEAAABkAAAAAAAAABQAAABAHwAAAAAAACYAAAAAAAAAwOD//wAAAAAmAAAAZAAAABYAAABMAAAAAAAAAAAAAAAEAAAAAAAAAAEAAACAgIAKAAAAACgAAAAoAAAAZAAAAGQAAAAAAAAAzMzMAAAAAABQAAAAUAAAAGQAAABkAAAAAAAAABcAAAAUAAAAAAAAAAAAAAD/fwAA/38AAAAAAAAJAAAABAAAAAAAAAAMAAAAEAAAAAAAAAAAAAAAAAAAAAAAAAAeAAAAaAAAAAAAAAAAAAAAAAAAAAAAAAAAAAAAECcAABAnAAAAAAAAAAAAAAAAAAAAAAAAAAAAAAAAAAAAAAAAAAAAABQAAAAAAAAAwMD/AAAAAABkAAAAMgAAAAAAAABkAAAAAAAAAH9/fwAKAAAAHwAAAFQAAAAAAAAFAAAAAQAAAAAAAAAAAAAAAAAAAAAAAAAAAAAAAAAAAAAAAAAAAAAAAn9/fwAAAAADzMzMAMDA/wB/f38AAAAAAAAAAAAAAAAAAAAAAAAAAAAhAAAAGAAAABQAAADQAgAAcQkAAKobAABhDQAAEAAAACYAAAAIAAAAgYAAAAAAAAA="/>
               </a:ext>
             </a:extLst>
           </p:cNvSpPr>
@@ -4404,12 +4739,12 @@
             <a:spLocks noGrp="1" noChangeArrowheads="1"/>
             <a:extLst>
               <a:ext uri="smNativeData">
-                <pr:smNativeData xmlns:pr="smNativeData" val="SMDATA_13_FAOrYBMAAAAlAAAAZAAAAA8BAAAAkAAAAEgAAACQAAAASAAAAAAAAAAAAAAAAAAAAAEAAABQAAAAAAAAAAAA4D8AAAAAAADgPwAAAAAAAOA/AAAAAAAA4D8AAAAAAADgPwAAAAAAAOA/AAAAAAAA4D8AAAAAAADgPwAAAAAAAOA/AAAAAAAA4D8CAAAAjAAAAAAAAAAAAAAAu+DjDP///wgAAAAAAAAAAAAAAAAAAAAAAAAAAAAAAAAAAAAAZAAAAAEAAABAAAAAAAAAAAAAAAAAAAAAAAAAAAAAAAAAAAAAAAAAAAAAAAAAAAAAAAAAAAAAAAAAAAAAAAAAAAAAAAAAAAAAAAAAAAAAAAAAAAAAAAAAAAAAAAAAAAAAFAAAADwAAAAAAAAAAAAAAAAAAAkUAAAAAQAAABQAAAAUAAAAFAAAAAEAAAAAAAAAZAAAAGQAAAAAAAAAZAAAAGQAAAAVAAAAYAAAAAAAAAAAAAAADwAAACADAAAAAAAAAAAAAAEAAACgMgAAVgcAAKr4//8BAAAAf39/AAEAAABkAAAAAAAAABQAAABAHwAAAAAAACYAAAAAAAAAwOD//wAAAAAmAAAAZAAAABYAAABMAAAAAAAAAAAAAAAEAAAAAAAAAAEAAACAgIAKAAAAACgAAAAoAAAAZAAAAGQAAAAAAAAAzMzMAAAAAABQAAAAUAAAAGQAAABkAAAAAAAAABcAAAAUAAAAAAAAAAAAAAD/fwAA/38AAAAAAAAJAAAABAAAAAAAAAAMAAAAEAAAAAAAAAAAAAAAAAAAAAAAAAAeAAAAaAAAAAAAAAAAAAAAAAAAAAAAAAAAAAAAECcAABAnAAAAAAAAAAAAAAAAAAAAAAAAAAAAAAAAAAAAAAAAAAAAABQAAAAAAAAAwMD/AAAAAABkAAAAMgAAAAAAAABkAAAAAAAAAH9/fwAKAAAAHwAAAFQAAABgWXsFZmaZAQAAAAAAAAAAAAAAAAAAAAAAAAAAAAAAAAAAAAAAAAAA////An9/fwA+PlwDzMzMAMDA/wB/f38AAAAAAAAAAAAAAAAAAAAAAAAAAAAhAAAAGAAAABQAAADQAgAAYQ0AAKobAACwJQAAAAAAACYAAAAIAAAAAYAAAAAAAAA="/>
-              </a:ext>
-            </a:extLst>
-          </p:cNvSpPr>
-          <p:nvPr>
-            <p:ph type="body" sz="half" idx="2"/>
+                <pr:smNativeData xmlns:pr="smNativeData" val="SMDATA_13_HjisYBMAAAAlAAAAZAAAAA8BAAAAkAAAAEgAAACQAAAASAAAAAAAAAAAAAAAAAAAAAEAAABQAAAAAAAAAAAA4D8AAAAAAADgPwAAAAAAAOA/AAAAAAAA4D8AAAAAAADgPwAAAAAAAOA/AAAAAAAA4D8AAAAAAADgPwAAAAAAAOA/AAAAAAAA4D8CAAAAjAAAAAAAAAAAAAAAu+DjDP///wgAAAAAAAAAAAAAAAAAAAAAAAAAAAAAAAAAAAAAZAAAAAEAAABAAAAAAAAAAAAAAAAAAAAAAAAAAAAAAAAAAAAAAAAAAAAAAAAAAAAAAAAAAAAAAAAAAAAAAAAAAAAAAAAAAAAAAAAAAAAAAAAAAAAAAAAAAAAAAAAAAAAAFAAAADwAAAAAAAAAAAAAAAAAAAkUAAAAAQAAABQAAAAUAAAAFAAAAAEAAAAAAAAAZAAAAGQAAAAAAAAAZAAAAGQAAAAVAAAAYAAAAAAAAAAAAAAADwAAACADAAAAAAAAAAAAAAEAAACgMgAAVgcAAKr4//8BAAAAf39/AAEAAABkAAAAAAAAABQAAABAHwAAAAAAACYAAAAAAAAAwOD//wAAAAAmAAAAZAAAABYAAABMAAAAAAAAAAAAAAAEAAAAAAAAAAEAAACAgIAKAAAAACgAAAAoAAAAZAAAAGQAAAAAAAAAzMzMAAAAAABQAAAAUAAAAGQAAABkAAAAAAAAABcAAAAUAAAAAAAAAAAAAAD/fwAA/38AAAAAAAAJAAAABAAAAAAAAAAMAAAAEAAAAAAAAAAAAAAAAAAAAAAAAAAeAAAAaAAAAAAAAAAAAAAAAAAAAAAAAAAAAAAAECcAABAnAAAAAAAAAAAAAAAAAAAAAAAAAAAAAAAAAAAAAAAAAAAAABQAAAAAAAAAwMD/AAAAAABkAAAAMgAAAAAAAABkAAAAAAAAAH9/fwAKAAAAHwAAAFQAAAAAAAAFAAAAAQAAAAAAAAAAAAAAAAAAAAAAAAAAAAAAAAAAAAAAAAAAAAAAAn9/fwAAAAADzMzMAMDA/wB/f38AAAAAAAAAAAAAAAAAAAAAAAAAAAAhAAAAGAAAABQAAADQAgAAYQ0AAKobAACwJQAAEAAAACYAAAAIAAAAAYAAAAAAAAA="/>
+              </a:ext>
+            </a:extLst>
+          </p:cNvSpPr>
+          <p:nvPr>
+            <p:ph type="body" idx="2"/>
           </p:nvPr>
         </p:nvSpPr>
         <p:spPr>
@@ -4467,7 +4802,7 @@
             <a:spLocks noGrp="1" noChangeArrowheads="1"/>
             <a:extLst>
               <a:ext uri="smNativeData">
-                <pr:smNativeData xmlns:pr="smNativeData" val="SMDATA_13_FAOrYBMAAAAlAAAAZAAAAA8BAAAAkAAAAEgAAACQAAAASAAAAAAAAAACAAAAAAAAAAEAAABQAAAAAAAAAAAA4D8AAAAAAADgPwAAAAAAAOA/AAAAAAAA4D8AAAAAAADgPwAAAAAAAOA/AAAAAAAA4D8AAAAAAADgPwAAAAAAAOA/AAAAAAAA4D8CAAAAjAAAAAAAAAAAAAAAu+DjDP///wgAAAAAAAAAAAAAAAAAAAAAAAAAAAAAAAAAAAAAZAAAAAEAAABAAAAAAAAAAAAAAAAAAAAAAAAAAAAAAAAAAAAAAAAAAAAAAAAAAAAAAAAAAAAAAAAAAAAAAAAAAAAAAAAAAAAAAAAAAAAAAAAAAAAAAAAAAAAAAAAAAAAAFAAAADwAAAAAAAAAAAAAAAAAAAkUAAAAAQAAABQAAAAUAAAAFAAAAAEAAAAAAAAAZAAAAGQAAAAAAAAAZAAAAGQAAAAVAAAAYAAAAAAAAAAAAAAADwAAACADAAAAAAAAAAAAAAEAAACgMgAAVgcAAKr4//8BAAAAf39/AAEAAABkAAAAAAAAABQAAABAHwAAAAAAACYAAAAAAAAAwOD//wAAAAAmAAAAZAAAABYAAABMAAAAAAAAAAAAAAAEAAAAAAAAAAEAAACAgIAKAAAAACgAAAAoAAAAZAAAAGQAAAAAAAAAzMzMAAAAAABQAAAAUAAAAGQAAABkAAAAAAAAABcAAAAUAAAAAAAAAAAAAAD/fwAA/38AAAAAAAAJAAAABAAAAAAAAAAMAAAAEAAAAAAAAAAAAAAAAAAAAAAAAAAeAAAAaAAAAAAAAAAAAAAAAAAAAAAAAAAAAAAAECcAABAnAAAAAAAAAAAAAAAAAAAAAAAAAAAAAAAAAAAAAAAAAAAAABQAAAAAAAAAwMD/AAAAAABkAAAAMgAAAAAAAABkAAAAAAAAAH9/fwAKAAAAHwAAAFQAAABgWXsFZmaZAQAAAAAAAAAAAAAAAAAAAAAAAAAAAAAAAAAAAAAAAAAA////An9/fwA+PlwDzMzMAMDA/wB/f38AAAAAAAAAAAAAAAAAAAAAAAAAAAAhAAAAGAAAABQAAACWHAAAcQkAAHA1AABhDQAAAAAAACYAAAAIAAAAgYAAAAAAAAA="/>
+                <pr:smNativeData xmlns:pr="smNativeData" val="SMDATA_13_HjisYBMAAAAlAAAAZAAAAA8BAAAAkAAAAEgAAACQAAAASAAAAAAAAAACAAAAAAAAAAEAAABQAAAAAAAAAAAA4D8AAAAAAADgPwAAAAAAAOA/AAAAAAAA4D8AAAAAAADgPwAAAAAAAOA/AAAAAAAA4D8AAAAAAADgPwAAAAAAAOA/AAAAAAAA4D8CAAAAjAAAAAAAAAAAAAAAu+DjDP///wgAAAAAAAAAAAAAAAAAAAAAAAAAAAAAAAAAAAAAZAAAAAEAAABAAAAAAAAAAAAAAAAAAAAAAAAAAAAAAAAAAAAAAAAAAAAAAAAAAAAAAAAAAAAAAAAAAAAAAAAAAAAAAAAAAAAAAAAAAAAAAAAAAAAAAAAAAAAAAAAAAAAAFAAAADwAAAAAAAAAAAAAAAAAAAkUAAAAAQAAABQAAAAUAAAAFAAAAAEAAAAAAAAAZAAAAGQAAAAAAAAAZAAAAGQAAAAVAAAAYAAAAAAAAAAAAAAADwAAACADAAAAAAAAAAAAAAEAAACgMgAAVgcAAKr4//8BAAAAf39/AAEAAABkAAAAAAAAABQAAABAHwAAAAAAACYAAAAAAAAAwOD//wAAAAAmAAAAZAAAABYAAABMAAAAAAAAAAAAAAAEAAAAAAAAAAEAAACAgIAKAAAAACgAAAAoAAAAZAAAAGQAAAAAAAAAzMzMAAAAAABQAAAAUAAAAGQAAABkAAAAAAAAABcAAAAUAAAAAAAAAAAAAAD/fwAA/38AAAAAAAAJAAAABAAAAAAAAAAMAAAAEAAAAAAAAAAAAAAAAAAAAAAAAAAeAAAAaAAAAAAAAAAAAAAAAAAAAAAAAAAAAAAAECcAABAnAAAAAAAAAAAAAAAAAAAAAAAAAAAAAAAAAAAAAAAAAAAAABQAAAAAAAAAwMD/AAAAAABkAAAAMgAAAAAAAABkAAAAAAAAAH9/fwAKAAAAHwAAAFQAAAAAAAAFAAAAAQAAAAAAAAAAAAAAAAAAAAAAAAAAAAAAAAAAAAAAAAAAAAAAAn9/fwAAAAADzMzMAMDA/wB/f38AAAAAAAAAAAAAAAAAAAAAAAAAAAAhAAAAGAAAABQAAACWHAAAcQkAAHA1AABhDQAAEAAAACYAAAAIAAAAgYAAAAAAAAA="/>
               </a:ext>
             </a:extLst>
           </p:cNvSpPr>
@@ -4540,15 +4875,20 @@
             <a:spLocks noGrp="1" noChangeArrowheads="1"/>
             <a:extLst>
               <a:ext uri="smNativeData">
-                <pr:smNativeData xmlns:pr="smNativeData" val="SMDATA_13_FAOrYBMAAAAlAAAAZAAAAA8BAAAAkAAAAEgAAACQAAAASAAAAAAAAAAAAAAAAAAAAAEAAABQAAAAAAAAAAAA4D8AAAAAAADgPwAAAAAAAOA/AAAAAAAA4D8AAAAAAADgPwAAAAAAAOA/AAAAAAAA4D8AAAAAAADgPwAAAAAAAOA/AAAAAAAA4D8CAAAAjAAAAAAAAAAAAAAAu+DjDP///wgAAAAAAAAAAAAAAAAAAAAAAAAAAAAAAAAAAAAAZAAAAAEAAABAAAAAAAAAAAAAAAAAAAAAAAAAAAAAAAAAAAAAAAAAAAAAAAAAAAAAAAAAAAAAAAAAAAAAAAAAAAAAAAAAAAAAAAAAAAAAAAAAAAAAAAAAAAAAAAAAAAAAFAAAADwAAAAAAAAAAAAAAAAAAAkUAAAAAQAAABQAAAAUAAAAFAAAAAEAAAAAAAAAZAAAAGQAAAAAAAAAZAAAAGQAAAAVAAAAYAAAAAAAAAAAAAAADwAAACADAAAAAAAAAAAAAAEAAACgMgAAVgcAAKr4//8BAAAAf39/AAEAAABkAAAAAAAAABQAAABAHwAAAAAAACYAAAAAAAAAwOD//wAAAAAmAAAAZAAAABYAAABMAAAAAAAAAAAAAAAEAAAAAAAAAAEAAACAgIAKAAAAACgAAAAoAAAAZAAAAGQAAAAAAAAAzMzMAAAAAABQAAAAUAAAAGQAAABkAAAAAAAAABcAAAAUAAAAAAAAAAAAAAD/fwAA/38AAAAAAAAJAAAABAAAAAAAAAAMAAAAEAAAAAAAAAAAAAAAAAAAAAAAAAAeAAAAaAAAAAAAAAAAAAAAAAAAAAAAAAAAAAAAECcAABAnAAAAAAAAAAAAAAAAAAAAAAAAAAAAAAAAAAAAAAAAAAAAABQAAAAAAAAAwMD/AAAAAABkAAAAMgAAAAAAAABkAAAAAAAAAH9/fwAKAAAAHwAAAFQAAABgWXsFZmaZAQAAAAAAAAAAAAAAAAAAAAAAAAAAAAAAAAAAAAAAAAAA////An9/fwA+PlwDzMzMAMDA/wB/f38AAAAAAAAAAAAAAAAAAAAAAAAAAAAhAAAAGAAAABQAAACWHAAAYQ0AAHA1AACwJQAAAAAAACYAAAAIAAAAAAAAAAAAAAA="/>
-              </a:ext>
-            </a:extLst>
-          </p:cNvSpPr>
-          <p:nvPr>
-            <p:ph type="body" sz="half" idx="4"/>
-          </p:nvPr>
-        </p:nvSpPr>
-        <p:spPr/>
+                <pr:smNativeData xmlns:pr="smNativeData" val="SMDATA_13_HjisYBMAAAAlAAAAZAAAAA8BAAAAkAAAAEgAAACQAAAASAAAAAAAAAAAAAAAAAAAAAEAAABQAAAAAAAAAAAA4D8AAAAAAADgPwAAAAAAAOA/AAAAAAAA4D8AAAAAAADgPwAAAAAAAOA/AAAAAAAA4D8AAAAAAADgPwAAAAAAAOA/AAAAAAAA4D8CAAAAjAAAAAAAAAAAAAAAu+DjDP///wgAAAAAAAAAAAAAAAAAAAAAAAAAAAAAAAAAAAAAZAAAAAEAAABAAAAAAAAAAAAAAAAAAAAAAAAAAAAAAAAAAAAAAAAAAAAAAAAAAAAAAAAAAAAAAAAAAAAAAAAAAAAAAAAAAAAAAAAAAAAAAAAAAAAAAAAAAAAAAAAAAAAAFAAAADwAAAAAAAAAAAAAAAAAAAkUAAAAAQAAABQAAAAUAAAAFAAAAAEAAAAAAAAAZAAAAGQAAAAAAAAAZAAAAGQAAAAVAAAAYAAAAAAAAAAAAAAADwAAACADAAAAAAAAAAAAAAEAAACgMgAAVgcAAKr4//8BAAAAf39/AAEAAABkAAAAAAAAABQAAABAHwAAAAAAACYAAAAAAAAAwOD//wAAAAAmAAAAZAAAABYAAABMAAAAAAAAAAAAAAAEAAAAAAAAAAEAAACAgIAKAAAAACgAAAAoAAAAZAAAAGQAAAAAAAAAzMzMAAAAAABQAAAAUAAAAGQAAABkAAAAAAAAABcAAAAUAAAAAAAAAAAAAAD/fwAA/38AAAAAAAAJAAAABAAAAAAAAAAMAAAAEAAAAAAAAAAAAAAAAAAAAAAAAAAeAAAAaAAAAAAAAAAAAAAAAAAAAAAAAAAAAAAAECcAABAnAAAAAAAAAAAAAAAAAAAAAAAAAAAAAAAAAAAAAAAAAAAAABQAAAAAAAAAwMD/AAAAAABkAAAAMgAAAAAAAABkAAAAAAAAAH9/fwAKAAAAHwAAAFQAAAAAAAAFAAAAAQAAAAAAAAAAAAAAAAAAAAAAAAAAAAAAAAAAAAAAAAAAAAAAAn9/fwAAAAADzMzMAMDA/wB/f38AAAAAAAAAAAAAAAAAAAAAAAAAAAAhAAAAGAAAABQAAACWHAAAYQ0AAHA1AACwJQAAAAAAACYAAAAIAAAAAQAAAAAAAAA="/>
+              </a:ext>
+            </a:extLst>
+          </p:cNvSpPr>
+          <p:nvPr>
+            <p:ph type="body" idx="4"/>
+          </p:nvPr>
+        </p:nvSpPr>
+        <p:spPr>
+          <a:xfrm>
+            <a:off x="4646930" y="2174875"/>
+            <a:ext cx="4039870" cy="3951605"/>
+          </a:xfrm>
+        </p:spPr>
         <p:txBody>
           <a:bodyPr/>
           <a:lstStyle/>
@@ -4560,11 +4900,14 @@
           </a:p>
           <a:p>
             <a:pPr/>
-          </a:p>
-          <a:p>
-            <a:pPr/>
-            <a:r>
-              <a:t>I have understood the power of OOP now! I could have used different files per different classes, like for the player, monster, inventory rather than use only one big long file</a:t>
+            <a:r>
+              <a:t>I have understood the power of OOP now! I could have used different files for each different classes, like for the player, monster, inventory rather than use only one big long file</a:t>
+            </a:r>
+          </a:p>
+          <a:p>
+            <a:pPr/>
+            <a:r>
+              <a:t>It can be done more efficiently</a:t>
             </a:r>
           </a:p>
         </p:txBody>
@@ -4584,7 +4927,7 @@
 </p:sld>
 </file>
 
-<file path=ppt/slides/slide6.xml><?xml version="1.0" encoding="utf-8"?>
+<file path=ppt/slides/slide8.xml><?xml version="1.0" encoding="utf-8"?>
 <p:sld xmlns:p="http://schemas.openxmlformats.org/presentationml/2006/main" xmlns:p14="http://schemas.microsoft.com/office/powerpoint/2010/main" xmlns:r="http://schemas.openxmlformats.org/officeDocument/2006/relationships" xmlns:a="http://schemas.openxmlformats.org/drawingml/2006/main">
   <p:cSld>
     <p:bg>
@@ -4616,7 +4959,7 @@
             <a:spLocks noGrp="1" noChangeArrowheads="1"/>
             <a:extLst>
               <a:ext uri="smNativeData">
-                <pr:smNativeData xmlns:pr="smNativeData" val="SMDATA_13_FAOrYBMAAAAlAAAAZAAAAA8BAAAAkAAAAEgAAACQAAAASAAAAAAAAAABAAAAAAAAAAEAAABQAAAAAAAAAAAA4D8AAAAAAADgPwAAAAAAAOA/AAAAAAAA4D8AAAAAAADgPwAAAAAAAOA/AAAAAAAA4D8AAAAAAADgPwAAAAAAAOA/AAAAAAAA4D8CAAAAjAAAAAAAAAAAAAAAu+DjDP///wgAAAAAAAAAAAAAAAAAAAAAAAAAAAAAAAAAAAAAZAAAAAEAAABAAAAAAAAAAAAAAAAAAAAAAAAAAAAAAAAAAAAAAAAAAAAAAAAAAAAAAAAAAAAAAAAAAAAAAAAAAAAAAAAAAAAAAAAAAAAAAAAAAAAAAAAAAAAAAAAAAAAAFAAAADwAAAAAAAAAAAAAAAAAAAkUAAAAAQAAABQAAAAUAAAAFAAAAAEAAAAAAAAAZAAAAGQAAAAAAAAAZAAAAGQAAAAVAAAAYAAAAAAAAAAAAAAADwAAACADAAAAAAAAAAAAAAEAAACgMgAAVgcAAKr4//8BAAAAf39/AAEAAABkAAAAAAAAABQAAABAHwAAAAAAACYAAAAAAAAAwOD//wAAAAAmAAAAZAAAABYAAABMAAAAAAAAAAAAAAAEAAAAAAAAAAEAAACAgIAKAAAAACgAAAAoAAAAZAAAAGQAAAAAAAAAzMzMAAAAAABQAAAAUAAAAGQAAABkAAAAAAAAABcAAAAUAAAAAAAAAAAAAAD/fwAA/38AAAAAAAAJAAAABAAAAAAAAAAMAAAAEAAAAAAAAAAAAAAAAAAAAAAAAAAeAAAAaAAAAAAAAAAAAAAAAAAAAAAAAAAAAAAAECcAABAnAAAAAAAAAAAAAAAAAAAAAAAAAAAAAAAAAAAAAAAAAAAAABQAAAAAAAAAwMD/AAAAAABkAAAAMgAAAAAAAABkAAAAAAAAAH9/fwAKAAAAHwAAAFQAAADMMwAFgAAAAQAAAAAAAAAAAAAAAAAAAAAAAAAAAAAAAAAAAAAAAAAA////An9/fwBcHwADzMzMAMDA/wB/f38AAAAAAAAAAAAAAAAAAAAAAAAAAAAhAAAAGAAAABQAAADQAgAAsAEAAHA1AAC4CAAAAAAAACYAAAAIAAAAAAAAAAAAAAA="/>
+                <pr:smNativeData xmlns:pr="smNativeData" val="SMDATA_13_HjisYBMAAAAlAAAAZAAAAA8BAAAAkAAAAEgAAACQAAAASAAAAAAAAAABAAAAAAAAAAEAAABQAAAAAAAAAAAA4D8AAAAAAADgPwAAAAAAAOA/AAAAAAAA4D8AAAAAAADgPwAAAAAAAOA/AAAAAAAA4D8AAAAAAADgPwAAAAAAAOA/AAAAAAAA4D8CAAAAjAAAAAAAAAAAAAAAu+DjDP///wgAAAAAAAAAAAAAAAAAAAAAAAAAAAAAAAAAAAAAZAAAAAEAAABAAAAAAAAAAAAAAAAAAAAAAAAAAAAAAAAAAAAAAAAAAAAAAAAAAAAAAAAAAAAAAAAAAAAAAAAAAAAAAAAAAAAAAAAAAAAAAAAAAAAAAAAAAAAAAAAAAAAAFAAAADwAAAAAAAAAAAAAAAAAAAkUAAAAAQAAABQAAAAUAAAAFAAAAAEAAAAAAAAAZAAAAGQAAAAAAAAAZAAAAGQAAAAVAAAAYAAAAAAAAAAAAAAADwAAACADAAAAAAAAAAAAAAEAAACgMgAAVgcAAKr4//8BAAAAf39/AAEAAABkAAAAAAAAABQAAABAHwAAAAAAACYAAAAAAAAAwOD//wAAAAAmAAAAZAAAABYAAABMAAAAAAAAAAAAAAAEAAAAAAAAAAEAAACAgIAKAAAAACgAAAAoAAAAZAAAAGQAAAAAAAAAzMzMAAAAAABQAAAAUAAAAGQAAABkAAAAAAAAABcAAAAUAAAAAAAAAAAAAAD/fwAA/38AAAAAAAAJAAAABAAAAAAAAAAMAAAAEAAAAAAAAAAAAAAAAAAAAAAAAAAeAAAAaAAAAAAAAAAAAAAAAAAAAAAAAAAAAAAAECcAABAnAAAAAAAAAAAAAAAAAAAAAAAAAAAAAAAAAAAAAAAAAAAAABQAAAAAAAAAwMD/AAAAAABkAAAAMgAAAAAAAABkAAAAAAAAAH9/fwAKAAAAHwAAAFQAAAAAAAAFAAAAAQAAAAAAAAAAAAAAAAAAAAAAAAAAAAAAAAAAAAAAAAAAAAAAAn9/fwAAAAADzMzMAMDA/wB/f38AAAAAAAAAAAAAAAAAAAAAAAAAAAAhAAAAGAAAABQAAADQAgAAsAEAAHA1AAC4CAAAEAAAACYAAAAIAAAAAAAAAAAAAAA="/>
               </a:ext>
             </a:extLst>
           </p:cNvSpPr>
@@ -4640,7 +4983,7 @@
             <a:spLocks noGrp="1" noChangeArrowheads="1"/>
             <a:extLst>
               <a:ext uri="smNativeData">
-                <pr:smNativeData xmlns:pr="smNativeData" val="SMDATA_13_FAOrYBMAAAAlAAAAZAAAAA8BAAAAkAAAAEgAAACQAAAASAAAAAAAAAAAAAAAAAAAAAEAAABQAAAAAAAAAAAA4D8AAAAAAADgPwAAAAAAAOA/AAAAAAAA4D8AAAAAAADgPwAAAAAAAOA/AAAAAAAA4D8AAAAAAADgPwAAAAAAAOA/AAAAAAAA4D8CAAAAjAAAAAAAAAAAAAAAu+DjDP///wgAAAAAAAAAAAAAAAAAAAAAAAAAAAAAAAAAAAAAZAAAAAEAAABAAAAAAAAAAAAAAAAAAAAAAAAAAAAAAAAAAAAAAAAAAAAAAAAAAAAAAAAAAAAAAAAAAAAAAAAAAAAAAAAAAAAAAAAAAAAAAAAAAAAAAAAAAAAAAAAAAAAAFAAAADwAAAAAAAAAAAAAAAAAAAkUAAAAAQAAABQAAAAUAAAAFAAAAAEAAAAAAAAAZAAAAGQAAAAAAAAAZAAAAGQAAAAVAAAAYAAAAAAAAAAAAAAADwAAACADAAAAAAAAAAAAAAEAAACgMgAAVgcAAKr4//8BAAAAf39/AAEAAABkAAAAAAAAABQAAABAHwAAAAAAACYAAAAAAAAAwOD//wAAAAAmAAAAZAAAABYAAABMAAAAAAAAAAAAAAAEAAAAAAAAAAEAAACAgIAKAAAAACgAAAAoAAAAZAAAAGQAAAAAAAAAzMzMAAAAAABQAAAAUAAAAGQAAABkAAAAAAAAABcAAAAUAAAAAAAAAAAAAAD/fwAA/38AAAAAAAAJAAAABAAAAAAAAAAMAAAAEAAAAAAAAAAAAAAAAAAAAAAAAAAeAAAAaAAAAAAAAAAAAAAAAAAAAAAAAAAAAAAAECcAABAnAAAAAAAAAAAAAAAAAAAAAAAAAAAAAAAAAAAAAAAAAAAAABQAAAAAAAAAwMD/AAAAAABkAAAAMgAAAAAAAABkAAAAAAAAAH9/fwAKAAAAHwAAAFQAAADMMwAFgAAAAQAAAAAAAAAAAAAAAAAAAAAAAAAAAAAAAAAAAAAAAAAA////An9/fwBcHwADzMzMAMDA/wB/f38AAAAAAAAAAAAAAAAAAAAAAAAAAAAhAAAAGAAAABQAAADQAgAA2AkAAHA1AACwJQAAAAAAACYAAAAIAAAAAAAAAAAAAAA="/>
+                <pr:smNativeData xmlns:pr="smNativeData" val="SMDATA_13_HjisYBMAAAAlAAAAZAAAAA8BAAAAkAAAAEgAAACQAAAASAAAAAAAAAAAAAAAAAAAAAEAAABQAAAAAAAAAAAA4D8AAAAAAADgPwAAAAAAAOA/AAAAAAAA4D8AAAAAAADgPwAAAAAAAOA/AAAAAAAA4D8AAAAAAADgPwAAAAAAAOA/AAAAAAAA4D8CAAAAjAAAAAAAAAAAAAAAu+DjDP///wgAAAAAAAAAAAAAAAAAAAAAAAAAAAAAAAAAAAAAZAAAAAEAAABAAAAAAAAAAAAAAAAAAAAAAAAAAAAAAAAAAAAAAAAAAAAAAAAAAAAAAAAAAAAAAAAAAAAAAAAAAAAAAAAAAAAAAAAAAAAAAAAAAAAAAAAAAAAAAAAAAAAAFAAAADwAAAAAAAAAAAAAAAAAAAkUAAAAAQAAABQAAAAUAAAAFAAAAAEAAAAAAAAAZAAAAGQAAAAAAAAAZAAAAGQAAAAVAAAAYAAAAAAAAAAAAAAADwAAACADAAAAAAAAAAAAAAEAAACgMgAAVgcAAKr4//8BAAAAf39/AAEAAABkAAAAAAAAABQAAABAHwAAAAAAACYAAAAAAAAAwOD//wAAAAAmAAAAZAAAABYAAABMAAAAAAAAAAAAAAAEAAAAAAAAAAEAAACAgIAKAAAAACgAAAAoAAAAZAAAAGQAAAAAAAAAzMzMAAAAAABQAAAAUAAAAGQAAABkAAAAAAAAABcAAAAUAAAAAAAAAAAAAAD/fwAA/38AAAAAAAAJAAAABAAAAAAAAAAMAAAAEAAAAAAAAAAAAAAAAAAAAAAAAAAeAAAAaAAAAAAAAAAAAAAAAAAAAAAAAAAAAAAAECcAABAnAAAAAAAAAAAAAAAAAAAAAAAAAAAAAAAAAAAAAAAAAAAAABQAAAAAAAAAwMD/AAAAAABkAAAAMgAAAAAAAABkAAAAAAAAAH9/fwAKAAAAHwAAAFQAAAAAAAAFAAAAAQAAAAAAAAAAAAAAAAAAAAAAAAAAAAAAAAAAAAAAAAAAAAAAAn9/fwAAAAADzMzMAMDA/wB/f38AAAAAAAAAAAAAAAAAAAAAAAAAAAAhAAAAGAAAABQAAADQAgAA2AkAAHA1AACwJQAAEAAAACYAAAAIAAAAAAAAAAAAAAA="/>
               </a:ext>
             </a:extLst>
           </p:cNvSpPr>
@@ -4687,7 +5030,7 @@
 <file path=ppt/theme/theme1.xml><?xml version="1.0" encoding="utf-8"?>
 <a:theme xmlns:a="http://schemas.openxmlformats.org/drawingml/2006/main" name="Presentation">
   <a:themeElements>
-    <a:clrScheme name="Presentation 12">
+    <a:clrScheme name="Presentation 1">
       <a:dk1>
         <a:srgbClr val="000000"/>
       </a:dk1>
@@ -4947,6 +5290,47 @@
           <a:srgbClr val="000000"/>
         </a:dk2>
         <a:lt2>
+          <a:srgbClr val="808080"/>
+        </a:lt2>
+        <a:accent1>
+          <a:srgbClr val="BBE0E3"/>
+        </a:accent1>
+        <a:accent2>
+          <a:srgbClr val="333399"/>
+        </a:accent2>
+        <a:accent3>
+          <a:srgbClr val="535379"/>
+        </a:accent3>
+        <a:accent4>
+          <a:srgbClr val="737359"/>
+        </a:accent4>
+        <a:accent5>
+          <a:srgbClr val="939339"/>
+        </a:accent5>
+        <a:accent6>
+          <a:srgbClr val="B3B319"/>
+        </a:accent6>
+        <a:hlink>
+          <a:srgbClr val="009999"/>
+        </a:hlink>
+        <a:folHlink>
+          <a:srgbClr val="99CC00"/>
+        </a:folHlink>
+      </a:clrScheme>
+      <a:clrMap bg1="lt1" tx1="dk1" bg2="lt2" tx2="dk2" accent1="accent1" accent2="accent2" accent3="accent3" accent4="accent4" accent5="accent5" accent6="accent6" hlink="hlink" folHlink="folHlink"/>
+    </a:extraClrScheme>
+    <a:extraClrScheme>
+      <a:clrScheme name="Presentation 2">
+        <a:dk1>
+          <a:srgbClr val="000000"/>
+        </a:dk1>
+        <a:lt1>
+          <a:srgbClr val="FFFFFF"/>
+        </a:lt1>
+        <a:dk2>
+          <a:srgbClr val="000000"/>
+        </a:dk2>
+        <a:lt2>
           <a:srgbClr val="969696"/>
         </a:lt2>
         <a:accent1>
@@ -4977,7 +5361,7 @@
       <a:clrMap bg1="lt1" tx1="dk1" bg2="lt2" tx2="dk2" accent1="accent1" accent2="accent2" accent3="accent3" accent4="accent4" accent5="accent5" accent6="accent6" hlink="hlink" folHlink="folHlink"/>
     </a:extraClrScheme>
     <a:extraClrScheme>
-      <a:clrScheme name="Presentation 2">
+      <a:clrScheme name="Presentation 3">
         <a:dk1>
           <a:srgbClr val="000000"/>
         </a:dk1>
@@ -5018,7 +5402,7 @@
       <a:clrMap bg1="lt1" tx1="dk1" bg2="lt2" tx2="dk2" accent1="accent1" accent2="accent2" accent3="accent3" accent4="accent4" accent5="accent5" accent6="accent6" hlink="hlink" folHlink="folHlink"/>
     </a:extraClrScheme>
     <a:extraClrScheme>
-      <a:clrScheme name="Presentation 3">
+      <a:clrScheme name="Presentation 4">
         <a:dk1>
           <a:srgbClr val="000000"/>
         </a:dk1>
@@ -5059,7 +5443,7 @@
       <a:clrMap bg1="lt1" tx1="dk1" bg2="lt2" tx2="dk2" accent1="accent1" accent2="accent2" accent3="accent3" accent4="accent4" accent5="accent5" accent6="accent6" hlink="hlink" folHlink="folHlink"/>
     </a:extraClrScheme>
     <a:extraClrScheme>
-      <a:clrScheme name="Presentation 4">
+      <a:clrScheme name="Presentation 5">
         <a:dk1>
           <a:srgbClr val="000000"/>
         </a:dk1>
@@ -5100,7 +5484,7 @@
       <a:clrMap bg1="lt1" tx1="dk1" bg2="lt2" tx2="dk2" accent1="accent1" accent2="accent2" accent3="accent3" accent4="accent4" accent5="accent5" accent6="accent6" hlink="hlink" folHlink="folHlink"/>
     </a:extraClrScheme>
     <a:extraClrScheme>
-      <a:clrScheme name="Presentation 5">
+      <a:clrScheme name="Presentation 6">
         <a:dk1>
           <a:srgbClr val="FFFFFF"/>
         </a:dk1>
@@ -5141,7 +5525,7 @@
       <a:clrMap bg1="lt1" tx1="dk1" bg2="lt2" tx2="dk2" accent1="accent1" accent2="accent2" accent3="accent3" accent4="accent4" accent5="accent5" accent6="accent6" hlink="hlink" folHlink="folHlink"/>
     </a:extraClrScheme>
     <a:extraClrScheme>
-      <a:clrScheme name="Presentation 6">
+      <a:clrScheme name="Presentation 7">
         <a:dk1>
           <a:srgbClr val="FFFFFF"/>
         </a:dk1>
@@ -5182,7 +5566,7 @@
       <a:clrMap bg1="lt1" tx1="dk1" bg2="lt2" tx2="dk2" accent1="accent1" accent2="accent2" accent3="accent3" accent4="accent4" accent5="accent5" accent6="accent6" hlink="hlink" folHlink="folHlink"/>
     </a:extraClrScheme>
     <a:extraClrScheme>
-      <a:clrScheme name="Presentation 7">
+      <a:clrScheme name="Presentation 8">
         <a:dk1>
           <a:srgbClr val="FFFFFF"/>
         </a:dk1>
@@ -5223,7 +5607,7 @@
       <a:clrMap bg1="lt1" tx1="dk1" bg2="lt2" tx2="dk2" accent1="accent1" accent2="accent2" accent3="accent3" accent4="accent4" accent5="accent5" accent6="accent6" hlink="hlink" folHlink="folHlink"/>
     </a:extraClrScheme>
     <a:extraClrScheme>
-      <a:clrScheme name="Presentation 8">
+      <a:clrScheme name="Presentation 9">
         <a:dk1>
           <a:srgbClr val="FFFFFF"/>
         </a:dk1>
@@ -5264,7 +5648,7 @@
       <a:clrMap bg1="lt1" tx1="dk1" bg2="lt2" tx2="dk2" accent1="accent1" accent2="accent2" accent3="accent3" accent4="accent4" accent5="accent5" accent6="accent6" hlink="hlink" folHlink="folHlink"/>
     </a:extraClrScheme>
     <a:extraClrScheme>
-      <a:clrScheme name="Presentation 9">
+      <a:clrScheme name="Presentation 10">
         <a:dk1>
           <a:srgbClr val="FFFFFF"/>
         </a:dk1>
@@ -5305,7 +5689,7 @@
       <a:clrMap bg1="lt1" tx1="dk1" bg2="lt2" tx2="dk2" accent1="accent1" accent2="accent2" accent3="accent3" accent4="accent4" accent5="accent5" accent6="accent6" hlink="hlink" folHlink="folHlink"/>
     </a:extraClrScheme>
     <a:extraClrScheme>
-      <a:clrScheme name="Presentation 10">
+      <a:clrScheme name="Presentation 11">
         <a:dk1>
           <a:srgbClr val="FFFFFF"/>
         </a:dk1>
@@ -5346,7 +5730,7 @@
       <a:clrMap bg1="lt1" tx1="dk1" bg2="lt2" tx2="dk2" accent1="accent1" accent2="accent2" accent3="accent3" accent4="accent4" accent5="accent5" accent6="accent6" hlink="hlink" folHlink="folHlink"/>
     </a:extraClrScheme>
     <a:extraClrScheme>
-      <a:clrScheme name="Presentation 11">
+      <a:clrScheme name="Presentation 12">
         <a:dk1>
           <a:srgbClr val="FFFFFF"/>
         </a:dk1>
@@ -5387,7 +5771,7 @@
       <a:clrMap bg1="lt1" tx1="dk1" bg2="lt2" tx2="dk2" accent1="accent1" accent2="accent2" accent3="accent3" accent4="accent4" accent5="accent5" accent6="accent6" hlink="hlink" folHlink="folHlink"/>
     </a:extraClrScheme>
     <a:extraClrScheme>
-      <a:clrScheme name="Presentation 12">
+      <a:clrScheme name="Presentation 13">
         <a:dk1>
           <a:srgbClr val="000000"/>
         </a:dk1>
@@ -5433,7 +5817,7 @@
 
 <file path=ppt/theme/themeOverride1.xml><?xml version="1.0" encoding="utf-8"?>
 <a:themeOverride xmlns:a="http://schemas.openxmlformats.org/drawingml/2006/main">
-  <a:clrScheme name="Presentation">
+  <a:clrScheme name="Presentation 1">
     <a:dk1>
       <a:srgbClr val="000099"/>
     </a:dk1>
@@ -5478,6 +5862,49 @@
 <a:themeOverride xmlns:a="http://schemas.openxmlformats.org/drawingml/2006/main">
   <a:clrScheme name="Presentation">
     <a:dk1>
+      <a:srgbClr val="000000"/>
+    </a:dk1>
+    <a:lt1>
+      <a:srgbClr val="FFFFD9"/>
+    </a:lt1>
+    <a:dk2>
+      <a:srgbClr val="000000"/>
+    </a:dk2>
+    <a:lt2>
+      <a:srgbClr val="777777"/>
+    </a:lt2>
+    <a:accent1>
+      <a:srgbClr val="FFFFF7"/>
+    </a:accent1>
+    <a:accent2>
+      <a:srgbClr val="33CCCC"/>
+    </a:accent2>
+    <a:accent3>
+      <a:srgbClr val="53ACAC"/>
+    </a:accent3>
+    <a:accent4>
+      <a:srgbClr val="738C8C"/>
+    </a:accent4>
+    <a:accent5>
+      <a:srgbClr val="936C6C"/>
+    </a:accent5>
+    <a:accent6>
+      <a:srgbClr val="B34C4C"/>
+    </a:accent6>
+    <a:hlink>
+      <a:srgbClr val="FF5050"/>
+    </a:hlink>
+    <a:folHlink>
+      <a:srgbClr val="FF9900"/>
+    </a:folHlink>
+  </a:clrScheme>
+</a:themeOverride>
+</file>
+
+<file path=ppt/theme/themeOverride3.xml><?xml version="1.0" encoding="utf-8"?>
+<a:themeOverride xmlns:a="http://schemas.openxmlformats.org/drawingml/2006/main">
+  <a:clrScheme name="Presentation 1">
+    <a:dk1>
       <a:srgbClr val="666699"/>
     </a:dk1>
     <a:lt1>
@@ -5517,9 +5944,9 @@
 </a:themeOverride>
 </file>
 
-<file path=ppt/theme/themeOverride3.xml><?xml version="1.0" encoding="utf-8"?>
+<file path=ppt/theme/themeOverride4.xml><?xml version="1.0" encoding="utf-8"?>
 <a:themeOverride xmlns:a="http://schemas.openxmlformats.org/drawingml/2006/main">
-  <a:clrScheme name="Presentation">
+  <a:clrScheme name="Presentation 1">
     <a:dk1>
       <a:srgbClr val="000000"/>
     </a:dk1>
@@ -5560,9 +5987,9 @@
 </a:themeOverride>
 </file>
 
-<file path=ppt/theme/themeOverride4.xml><?xml version="1.0" encoding="utf-8"?>
+<file path=ppt/theme/themeOverride5.xml><?xml version="1.0" encoding="utf-8"?>
 <a:themeOverride xmlns:a="http://schemas.openxmlformats.org/drawingml/2006/main">
-  <a:clrScheme name="Presentation">
+  <a:clrScheme name="Presentation 1">
     <a:dk1>
       <a:srgbClr val="666699"/>
     </a:dk1>
@@ -5603,9 +6030,9 @@
 </a:themeOverride>
 </file>
 
-<file path=ppt/theme/themeOverride5.xml><?xml version="1.0" encoding="utf-8"?>
+<file path=ppt/theme/themeOverride6.xml><?xml version="1.0" encoding="utf-8"?>
 <a:themeOverride xmlns:a="http://schemas.openxmlformats.org/drawingml/2006/main">
-  <a:clrScheme name="Presentation">
+  <a:clrScheme name="Presentation 1">
     <a:dk1>
       <a:srgbClr val="800000"/>
     </a:dk1>

</xml_diff>

<commit_message>
fixed the presentation and the part five function of the story
</commit_message>
<xml_diff>
--- a/WELCOME TO THE FANTASY ADVENTURE.pptx
+++ b/WELCOME TO THE FANTASY ADVENTURE.pptx
@@ -243,7 +243,7 @@
             <a:spLocks noGrp="1" noChangeArrowheads="1"/>
             <a:extLst>
               <a:ext uri="smNativeData">
-                <pr:smNativeData xmlns:pr="smNativeData" val="SMDATA_13_KVOsYBMAAAAlAAAAZAAAAA8BAAAAkAAAAEgAAACQAAAASAAAAAAAAAABAAAAAAAAAAEAAABQAAAAAAAAAAAA4D8AAAAAAADgPwAAAAAAAOA/AAAAAAAA4D8AAAAAAADgPwAAAAAAAOA/AAAAAAAA4D8AAAAAAADgPwAAAAAAAOA/AAAAAAAA4D8CAAAAjAAAAAAAAAAAAAAAu+DjDP///wgAAAAAAAAAAAAAAAAAAAAAAAAAAAAAAAAAAAAAZAAAAAEAAABAAAAAAAAAAAAAAAAAAAAAAAAAAAAAAAAAAAAAAAAAAAAAAAAAAAAAAAAAAAAAAAAAAAAAAAAAAAAAAAAAAAAAAAAAAAAAAAAAAAAAAAAAAAAAAAAAAAAAFAAAADwAAAAAAAAAAAAAAAAAAAkUAAAAAQAAABQAAAAUAAAAFAAAAAEAAAAAAAAAZAAAAGQAAAAAAAAAZAAAAGQAAAAVAAAAYAAAAAAAAAAAAAAADwAAACADAAAAAAAAAAAAAAEAAACgMgAAVgcAAKr4//8BAAAAf39/AAEAAABkAAAAAAAAABQAAABAHwAAAAAAACYAAAAAAAAAwOD//wAAAAAmAAAAZAAAABYAAABMAAAAAAAAAAAAAAAEAAAAAAAAAAEAAACAgIAKAAAAACgAAAAoAAAAZAAAAGQAAAAAAAAAzMzMAAAAAABQAAAAUAAAAGQAAABkAAAAAAAAABcAAAAUAAAAAAAAAAAAAAD/fwAA/38AAAAAAAAJAAAABAAAAAAAAAAMAAAAEAAAAAAAAAAAAAAAAAAAAAAAAAAeAAAAaAAAAAAAAAAAAAAAAAAAAAAAAAAAAAAAECcAABAnAAAAAAAAAAAAAAAAAAAAAAAAAAAAAAAAAAAAAAAAAAAAABQAAAAAAAAAwMD/AAAAAABkAAAAMgAAAAAAAABkAAAAAAAAAH9/fwAKAAAAHwAAAFQAAAAAAAAFAAAAAQAAAAAAAAAAAAAAAAAAAAAAAAAAAAAAAAAAAAAAAAAAAAAAAn9/fwAAAAADzMzMAMDA/wB/f38AAAAAAAAAAAAAAAAAAAAAAAAAAAAhAAAAGAAAABQAAAA4BAAAGg0AAAg0AAAmFgAAEAAAACYAAAAIAAAAAQAAAAAAAAA="/>
+                <pr:smNativeData xmlns:pr="smNativeData" val="SMDATA_13_NmGsYBMAAAAlAAAAZAAAAA8BAAAAkAAAAEgAAACQAAAASAAAAAAAAAABAAAAAAAAAAEAAABQAAAAAAAAAAAA4D8AAAAAAADgPwAAAAAAAOA/AAAAAAAA4D8AAAAAAADgPwAAAAAAAOA/AAAAAAAA4D8AAAAAAADgPwAAAAAAAOA/AAAAAAAA4D8CAAAAjAAAAAAAAAAAAAAAu+DjDP///wgAAAAAAAAAAAAAAAAAAAAAAAAAAAAAAAAAAAAAZAAAAAEAAABAAAAAAAAAAAAAAAAAAAAAAAAAAAAAAAAAAAAAAAAAAAAAAAAAAAAAAAAAAAAAAAAAAAAAAAAAAAAAAAAAAAAAAAAAAAAAAAAAAAAAAAAAAAAAAAAAAAAAFAAAADwAAAAAAAAAAAAAAAAAAAkUAAAAAQAAABQAAAAUAAAAFAAAAAEAAAAAAAAAZAAAAGQAAAAAAAAAZAAAAGQAAAAVAAAAYAAAAAAAAAAAAAAADwAAACADAAAAAAAAAAAAAAEAAACgMgAAVgcAAKr4//8BAAAAf39/AAEAAABkAAAAAAAAABQAAABAHwAAAAAAACYAAAAAAAAAwOD//wAAAAAmAAAAZAAAABYAAABMAAAAAAAAAAAAAAAEAAAAAAAAAAEAAACAgIAKAAAAACgAAAAoAAAAZAAAAGQAAAAAAAAAzMzMAAAAAABQAAAAUAAAAGQAAABkAAAAAAAAABcAAAAUAAAAAAAAAAAAAAD/fwAA/38AAAAAAAAJAAAABAAAAAAAAAAMAAAAEAAAAAAAAAAAAAAAAAAAAAAAAAAeAAAAaAAAAAAAAAAAAAAAAAAAAAAAAAAAAAAAECcAABAnAAAAAAAAAAAAAAAAAAAAAAAAAAAAAAAAAAAAAAAAAAAAABQAAAAAAAAAwMD/AAAAAABkAAAAMgAAAAAAAABkAAAAAAAAAH9/fwAKAAAAHwAAAFQAAAAAAAAFAAAAAQAAAAAAAAAAAAAAAAAAAAAAAAAAAAAAAAAAAAAAAAAAAAAAAn9/fwAAAAADzMzMAMDA/wB/f38AAAAAAAAAAAAAAAAAAAAAAAAAAAAhAAAAGAAAABQAAAA4BAAAGg0AAAg0AAAmFgAAEAAAACYAAAAIAAAAAQAAAAAAAAA="/>
               </a:ext>
             </a:extLst>
           </p:cNvSpPr>
@@ -275,7 +275,7 @@
             <a:spLocks noGrp="1" noChangeArrowheads="1"/>
             <a:extLst>
               <a:ext uri="smNativeData">
-                <pr:smNativeData xmlns:pr="smNativeData" val="SMDATA_13_KVOsYBMAAAAlAAAAZAAAAA8BAAAAkAAAAEgAAACQAAAASAAAAAAAAAAAAAAAAAAAAAEAAABQAAAAAAAAAAAA4D8AAAAAAADgPwAAAAAAAOA/AAAAAAAA4D8AAAAAAADgPwAAAAAAAOA/AAAAAAAA4D8AAAAAAADgPwAAAAAAAOA/AAAAAAAA4D8CAAAAjAAAAAAAAAAAAAAAu+DjDP///wgAAAAAAAAAAAAAAAAAAAAAAAAAAAAAAAAAAAAAZAAAAAEAAABAAAAAAAAAAAAAAAAAAAAAAAAAAAAAAAAAAAAAAAAAAAAAAAAAAAAAAAAAAAAAAAAAAAAAAAAAAAAAAAAAAAAAAAAAAAAAAAAAAAAAAAAAAAAAAAAAAAAAFAAAADwAAAAAAAAAAAAAAAAAAAkUAAAAAQAAABQAAAAUAAAAFAAAAAEAAAAAAAAAZAAAAGQAAAAAAAAAZAAAAGQAAAAVAAAAYAAAAAAAAAAAAAAADwAAACADAAAAAAAAAAAAAAEAAACgMgAAVgcAAKr4//8BAAAAf39/AAEAAABkAAAAAAAAABQAAABAHwAAAAAAACYAAAAAAAAAwOD//wAAAAAmAAAAZAAAABYAAABMAAAAAAAAAAAAAAAEAAAAAAAAAAEAAACAgIAKAAAAACgAAAAoAAAAZAAAAGQAAAAAAAAAzMzMAAAAAABQAAAAUAAAAGQAAABkAAAAAAAAABcAAAAUAAAAAAAAAAAAAAD/fwAA/38AAAAAAAAJAAAABAAAAAAAAAAMAAAAEAAAAAAAAAAAAAAAAAAAAAAAAAAeAAAAaAAAAAAAAAAAAAAAAAAAAAAAAAAAAAAAECcAABAnAAAAAAAAAAAAAAAAAAAAAAAAAAAAAAAAAAAAAAAAAAAAABQAAAAAAAAAwMD/AAAAAABkAAAAMgAAAAAAAABkAAAAAAAAAH9/fwAKAAAAHwAAAFQAAAAAAAAFAAAAAQAAAAAAAAAAAAAAAAAAAAAAAAAAAAAAAAAAAAAAAAAAAAAAAn9/fwAAAAADzMzMAMDA/wB/f38AAAAAAAAAAAAAAAAAAAAAAAAAAAAhAAAAGAAAABQAAABwCAAA6BcAANAvAACwIgAAEAAAACYAAAAIAAAAAYAAAAAAAAA="/>
+                <pr:smNativeData xmlns:pr="smNativeData" val="SMDATA_13_NmGsYBMAAAAlAAAAZAAAAA8BAAAAkAAAAEgAAACQAAAASAAAAAAAAAAAAAAAAAAAAAEAAABQAAAAAAAAAAAA4D8AAAAAAADgPwAAAAAAAOA/AAAAAAAA4D8AAAAAAADgPwAAAAAAAOA/AAAAAAAA4D8AAAAAAADgPwAAAAAAAOA/AAAAAAAA4D8CAAAAjAAAAAAAAAAAAAAAu+DjDP///wgAAAAAAAAAAAAAAAAAAAAAAAAAAAAAAAAAAAAAZAAAAAEAAABAAAAAAAAAAAAAAAAAAAAAAAAAAAAAAAAAAAAAAAAAAAAAAAAAAAAAAAAAAAAAAAAAAAAAAAAAAAAAAAAAAAAAAAAAAAAAAAAAAAAAAAAAAAAAAAAAAAAAFAAAADwAAAAAAAAAAAAAAAAAAAkUAAAAAQAAABQAAAAUAAAAFAAAAAEAAAAAAAAAZAAAAGQAAAAAAAAAZAAAAGQAAAAVAAAAYAAAAAAAAAAAAAAADwAAACADAAAAAAAAAAAAAAEAAACgMgAAVgcAAKr4//8BAAAAf39/AAEAAABkAAAAAAAAABQAAABAHwAAAAAAACYAAAAAAAAAwOD//wAAAAAmAAAAZAAAABYAAABMAAAAAAAAAAAAAAAEAAAAAAAAAAEAAACAgIAKAAAAACgAAAAoAAAAZAAAAGQAAAAAAAAAzMzMAAAAAABQAAAAUAAAAGQAAABkAAAAAAAAABcAAAAUAAAAAAAAAAAAAAD/fwAA/38AAAAAAAAJAAAABAAAAAAAAAAMAAAAEAAAAAAAAAAAAAAAAAAAAAAAAAAeAAAAaAAAAAAAAAAAAAAAAAAAAAAAAAAAAAAAECcAABAnAAAAAAAAAAAAAAAAAAAAAAAAAAAAAAAAAAAAAAAAAAAAABQAAAAAAAAAwMD/AAAAAABkAAAAMgAAAAAAAABkAAAAAAAAAH9/fwAKAAAAHwAAAFQAAAAAAAAFAAAAAQAAAAAAAAAAAAAAAAAAAAAAAAAAAAAAAAAAAAAAAAAAAAAAAn9/fwAAAAADzMzMAMDA/wB/f38AAAAAAAAAAAAAAAAAAAAAAAAAAAAhAAAAGAAAABQAAABwCAAA6BcAANAvAACwIgAAEAAAACYAAAAIAAAAAYAAAAAAAAA="/>
               </a:ext>
             </a:extLst>
           </p:cNvSpPr>
@@ -335,7 +335,7 @@
             <a:spLocks noGrp="1" noChangeArrowheads="1"/>
             <a:extLst>
               <a:ext uri="smNativeData">
-                <pr:smNativeData xmlns:pr="smNativeData" val="SMDATA_13_KVOsYBMAAAAlAAAAZAAAAA8BAAAAkAAAAEgAAACQAAAASAAAAAAAAAABAAAAAAAAAAEAAABQAAAAAAAAAAAA4D8AAAAAAADgPwAAAAAAAOA/AAAAAAAA4D8AAAAAAADgPwAAAAAAAOA/AAAAAAAA4D8AAAAAAADgPwAAAAAAAOA/AAAAAAAA4D8CAAAAjAAAAAAAAAAAAAAAu+DjDP///wgAAAAAAAAAAAAAAAAAAAAAAAAAAAAAAAAAAAAAZAAAAAEAAABAAAAAAAAAAAAAAAAAAAAAAAAAAAAAAAAAAAAAAAAAAAAAAAAAAAAAAAAAAAAAAAAAAAAAAAAAAAAAAAAAAAAAAAAAAAAAAAAAAAAAAAAAAAAAAAAAAAAAFAAAADwAAAAAAAAAAAAAAAAAAAkUAAAAAQAAABQAAAAUAAAAFAAAAAEAAAAAAAAAZAAAAGQAAAAAAAAAZAAAAGQAAAAVAAAAYAAAAAAAAAAAAAAADwAAACADAAAAAAAAAAAAAAEAAACgMgAAVgcAAKr4//8BAAAAf39/AAEAAABkAAAAAAAAABQAAABAHwAAAAAAACYAAAAAAAAAwOD//wAAAAAmAAAAZAAAABYAAABMAAAAAAAAAAAAAAAEAAAAAAAAAAEAAACAgIAKAAAAACgAAAAoAAAAZAAAAGQAAAAAAAAAzMzMAAAAAABQAAAAUAAAAGQAAABkAAAAAAAAABcAAAAUAAAAAAAAAAAAAAD/fwAA/38AAAAAAAAJAAAABAAAAAAAAAAMAAAAEAAAAAAAAAAAAAAAAAAAAAAAAAAeAAAAaAAAAAAAAAAAAAAAAAAAAAAAAAAAAAAAECcAABAnAAAAAAAAAAAAAAAAAAAAAAAAAAAAAAAAAAAAAAAAAAAAABQAAAAAAAAAwMD/AAAAAABkAAAAMgAAAAAAAABkAAAAAAAAAH9/fwAKAAAAHwAAAFQAAAAAAAAFAAAAAQAAAAAAAAAAAAAAAAAAAAAAAAAAAAAAAAAAAAAAAAAAAAAAAn9/fwAAAAADzMzMAMDA/wB/f38AAAAAAAAAAAAAAAAAAAAAAAAAAAAhAAAAGAAAABQAAADQAgAAGycAAPAPAABZKQAAEAAAACYAAAAIAAAAAAAAAAAAAAA="/>
+                <pr:smNativeData xmlns:pr="smNativeData" val="SMDATA_13_NmGsYBMAAAAlAAAAZAAAAA8BAAAAkAAAAEgAAACQAAAASAAAAAAAAAABAAAAAAAAAAEAAABQAAAAAAAAAAAA4D8AAAAAAADgPwAAAAAAAOA/AAAAAAAA4D8AAAAAAADgPwAAAAAAAOA/AAAAAAAA4D8AAAAAAADgPwAAAAAAAOA/AAAAAAAA4D8CAAAAjAAAAAAAAAAAAAAAu+DjDP///wgAAAAAAAAAAAAAAAAAAAAAAAAAAAAAAAAAAAAAZAAAAAEAAABAAAAAAAAAAAAAAAAAAAAAAAAAAAAAAAAAAAAAAAAAAAAAAAAAAAAAAAAAAAAAAAAAAAAAAAAAAAAAAAAAAAAAAAAAAAAAAAAAAAAAAAAAAAAAAAAAAAAAFAAAADwAAAAAAAAAAAAAAAAAAAkUAAAAAQAAABQAAAAUAAAAFAAAAAEAAAAAAAAAZAAAAGQAAAAAAAAAZAAAAGQAAAAVAAAAYAAAAAAAAAAAAAAADwAAACADAAAAAAAAAAAAAAEAAACgMgAAVgcAAKr4//8BAAAAf39/AAEAAABkAAAAAAAAABQAAABAHwAAAAAAACYAAAAAAAAAwOD//wAAAAAmAAAAZAAAABYAAABMAAAAAAAAAAAAAAAEAAAAAAAAAAEAAACAgIAKAAAAACgAAAAoAAAAZAAAAGQAAAAAAAAAzMzMAAAAAABQAAAAUAAAAGQAAABkAAAAAAAAABcAAAAUAAAAAAAAAAAAAAD/fwAA/38AAAAAAAAJAAAABAAAAAAAAAAMAAAAEAAAAAAAAAAAAAAAAAAAAAAAAAAeAAAAaAAAAAAAAAAAAAAAAAAAAAAAAAAAAAAAECcAABAnAAAAAAAAAAAAAAAAAAAAAAAAAAAAAAAAAAAAAAAAAAAAABQAAAAAAAAAwMD/AAAAAABkAAAAMgAAAAAAAABkAAAAAAAAAH9/fwAKAAAAHwAAAFQAAAAAAAAFAAAAAQAAAAAAAAAAAAAAAAAAAAAAAAAAAAAAAAAAAAAAAAAAAAAAAn9/fwAAAAADzMzMAMDA/wB/f38AAAAAAAAAAAAAAAAAAAAAAAAAAAAhAAAAGAAAABQAAADQAgAAGycAAPAPAABZKQAAEAAAACYAAAAIAAAAAAAAAAAAAAA="/>
               </a:ext>
             </a:extLst>
           </p:cNvSpPr>
@@ -349,7 +349,7 @@
           <a:lstStyle/>
           <a:p>
             <a:pPr/>
-            <a:fld id="{3FED230E-40D2-B8D5-9C55-B6806D1B6AE3}" type="datetime1">
+            <a:fld id="{3FD455B4-FAD2-81A3-9C6C-0CF61B226A59}" type="datetime1">
               <a:t/>
             </a:fld>
           </a:p>
@@ -362,7 +362,7 @@
             <a:spLocks noGrp="1" noChangeArrowheads="1"/>
             <a:extLst>
               <a:ext uri="smNativeData">
-                <pr:smNativeData xmlns:pr="smNativeData" val="SMDATA_13_KVOsYBMAAAAlAAAAZAAAAA8BAAAAkAAAAEgAAACQAAAASAAAAAAAAAABAAAAAAAAAAEAAABQAAAAAAAAAAAA4D8AAAAAAADgPwAAAAAAAOA/AAAAAAAA4D8AAAAAAADgPwAAAAAAAOA/AAAAAAAA4D8AAAAAAADgPwAAAAAAAOA/AAAAAAAA4D8CAAAAjAAAAAAAAAAAAAAAu+DjDP///wgAAAAAAAAAAAAAAAAAAAAAAAAAAAAAAAAAAAAAZAAAAAEAAABAAAAAAAAAAAAAAAAAAAAAAAAAAAAAAAAAAAAAAAAAAAAAAAAAAAAAAAAAAAAAAAAAAAAAAAAAAAAAAAAAAAAAAAAAAAAAAAAAAAAAAAAAAAAAAAAAAAAAFAAAADwAAAAAAAAAAAAAAAAAAAkUAAAAAQAAABQAAAAUAAAAFAAAAAEAAAAAAAAAZAAAAGQAAAAAAAAAZAAAAGQAAAAVAAAAYAAAAAAAAAAAAAAADwAAACADAAAAAAAAAAAAAAEAAACgMgAAVgcAAKr4//8BAAAAf39/AAEAAABkAAAAAAAAABQAAABAHwAAAAAAACYAAAAAAAAAwOD//wAAAAAmAAAAZAAAABYAAABMAAAAAAAAAAAAAAAEAAAAAAAAAAEAAACAgIAKAAAAACgAAAAoAAAAZAAAAGQAAAAAAAAAzMzMAAAAAABQAAAAUAAAAGQAAABkAAAAAAAAABcAAAAUAAAAAAAAAAAAAAD/fwAA/38AAAAAAAAJAAAABAAAAAAAAAAMAAAAEAAAAAAAAAAAAAAAAAAAAAAAAAAeAAAAaAAAAAAAAAAAAAAAAAAAAAAAAAAAAAAAECcAABAnAAAAAAAAAAAAAAAAAAAAAAAAAAAAAAAAAAAAAAAAAAAAABQAAAAAAAAAwMD/AAAAAABkAAAAMgAAAAAAAABkAAAAAAAAAH9/fwAKAAAAHwAAAFQAAAAAAAAFAAAAAQAAAAAAAAAAAAAAAAAAAAAAAAAAAAAAAAAAAAAAAAAAAAAAAn9/fwAAAAADzMzMAMDA/wB/f38AAAAAAAAAAAAAAAAAAAAAAAAAAAAhAAAAGAAAABQAAAA4EwAAGycAAAglAABZKQAAEAAAACYAAAAIAAAAAAAAAAAAAAA="/>
+                <pr:smNativeData xmlns:pr="smNativeData" val="SMDATA_13_NmGsYBMAAAAlAAAAZAAAAA8BAAAAkAAAAEgAAACQAAAASAAAAAAAAAABAAAAAAAAAAEAAABQAAAAAAAAAAAA4D8AAAAAAADgPwAAAAAAAOA/AAAAAAAA4D8AAAAAAADgPwAAAAAAAOA/AAAAAAAA4D8AAAAAAADgPwAAAAAAAOA/AAAAAAAA4D8CAAAAjAAAAAAAAAAAAAAAu+DjDP///wgAAAAAAAAAAAAAAAAAAAAAAAAAAAAAAAAAAAAAZAAAAAEAAABAAAAAAAAAAAAAAAAAAAAAAAAAAAAAAAAAAAAAAAAAAAAAAAAAAAAAAAAAAAAAAAAAAAAAAAAAAAAAAAAAAAAAAAAAAAAAAAAAAAAAAAAAAAAAAAAAAAAAFAAAADwAAAAAAAAAAAAAAAAAAAkUAAAAAQAAABQAAAAUAAAAFAAAAAEAAAAAAAAAZAAAAGQAAAAAAAAAZAAAAGQAAAAVAAAAYAAAAAAAAAAAAAAADwAAACADAAAAAAAAAAAAAAEAAACgMgAAVgcAAKr4//8BAAAAf39/AAEAAABkAAAAAAAAABQAAABAHwAAAAAAACYAAAAAAAAAwOD//wAAAAAmAAAAZAAAABYAAABMAAAAAAAAAAAAAAAEAAAAAAAAAAEAAACAgIAKAAAAACgAAAAoAAAAZAAAAGQAAAAAAAAAzMzMAAAAAABQAAAAUAAAAGQAAABkAAAAAAAAABcAAAAUAAAAAAAAAAAAAAD/fwAA/38AAAAAAAAJAAAABAAAAAAAAAAMAAAAEAAAAAAAAAAAAAAAAAAAAAAAAAAeAAAAaAAAAAAAAAAAAAAAAAAAAAAAAAAAAAAAECcAABAnAAAAAAAAAAAAAAAAAAAAAAAAAAAAAAAAAAAAAAAAAAAAABQAAAAAAAAAwMD/AAAAAABkAAAAMgAAAAAAAABkAAAAAAAAAH9/fwAKAAAAHwAAAFQAAAAAAAAFAAAAAQAAAAAAAAAAAAAAAAAAAAAAAAAAAAAAAAAAAAAAAAAAAAAAAn9/fwAAAAADzMzMAMDA/wB/f38AAAAAAAAAAAAAAAAAAAAAAAAAAAAhAAAAGAAAABQAAAA4EwAAGycAAAglAABZKQAAEAAAACYAAAAIAAAAAAAAAAAAAAA="/>
               </a:ext>
             </a:extLst>
           </p:cNvSpPr>
@@ -386,7 +386,7 @@
             <a:spLocks noGrp="1" noChangeArrowheads="1"/>
             <a:extLst>
               <a:ext uri="smNativeData">
-                <pr:smNativeData xmlns:pr="smNativeData" val="SMDATA_13_KVOsYBMAAAAlAAAAZAAAAA8BAAAAkAAAAEgAAACQAAAASAAAAAAAAAABAAAAAAAAAAEAAABQAAAAAAAAAAAA4D8AAAAAAADgPwAAAAAAAOA/AAAAAAAA4D8AAAAAAADgPwAAAAAAAOA/AAAAAAAA4D8AAAAAAADgPwAAAAAAAOA/AAAAAAAA4D8CAAAAjAAAAAAAAAAAAAAAu+DjDP///wgAAAAAAAAAAAAAAAAAAAAAAAAAAAAAAAAAAAAAZAAAAAEAAABAAAAAAAAAAAAAAAAAAAAAAAAAAAAAAAAAAAAAAAAAAAAAAAAAAAAAAAAAAAAAAAAAAAAAAAAAAAAAAAAAAAAAAAAAAAAAAAAAAAAAAAAAAAAAAAAAAAAAFAAAADwAAAAAAAAAAAAAAAAAAAkUAAAAAQAAABQAAAAUAAAAFAAAAAEAAAAAAAAAZAAAAGQAAAAAAAAAZAAAAGQAAAAVAAAAYAAAAAAAAAAAAAAADwAAACADAAAAAAAAAAAAAAEAAACgMgAAVgcAAKr4//8BAAAAf39/AAEAAABkAAAAAAAAABQAAABAHwAAAAAAACYAAAAAAAAAwOD//wAAAAAmAAAAZAAAABYAAABMAAAAAAAAAAAAAAAEAAAAAAAAAAEAAACAgIAKAAAAACgAAAAoAAAAZAAAAGQAAAAAAAAAzMzMAAAAAABQAAAAUAAAAGQAAABkAAAAAAAAABcAAAAUAAAAAAAAAAAAAAD/fwAA/38AAAAAAAAJAAAABAAAAAAAAAAMAAAAEAAAAAAAAAAAAAAAAAAAAAAAAAAeAAAAaAAAAAAAAAAAAAAAAAAAAAAAAAAAAAAAECcAABAnAAAAAAAAAAAAAAAAAAAAAAAAAAAAAAAAAAAAAAAAAAAAABQAAAAAAAAAwMD/AAAAAABkAAAAMgAAAAAAAABkAAAAAAAAAH9/fwAKAAAAHwAAAFQAAAAAAAAFAAAAAQAAAAAAAAAAAAAAAAAAAAAAAAAAAAAAAAAAAAAAAAAAAAAAAn9/fwAAAAADzMzMAMDA/wB/f38AAAAAAAAAAAAAAAAAAAAAAAAAAAAhAAAAGAAAABQAAABQKAAAGycAAHA1AABZKQAAEAAAACYAAAAIAAAAAAAAAAAAAAA="/>
+                <pr:smNativeData xmlns:pr="smNativeData" val="SMDATA_13_NmGsYBMAAAAlAAAAZAAAAA8BAAAAkAAAAEgAAACQAAAASAAAAAAAAAABAAAAAAAAAAEAAABQAAAAAAAAAAAA4D8AAAAAAADgPwAAAAAAAOA/AAAAAAAA4D8AAAAAAADgPwAAAAAAAOA/AAAAAAAA4D8AAAAAAADgPwAAAAAAAOA/AAAAAAAA4D8CAAAAjAAAAAAAAAAAAAAAu+DjDP///wgAAAAAAAAAAAAAAAAAAAAAAAAAAAAAAAAAAAAAZAAAAAEAAABAAAAAAAAAAAAAAAAAAAAAAAAAAAAAAAAAAAAAAAAAAAAAAAAAAAAAAAAAAAAAAAAAAAAAAAAAAAAAAAAAAAAAAAAAAAAAAAAAAAAAAAAAAAAAAAAAAAAAFAAAADwAAAAAAAAAAAAAAAAAAAkUAAAAAQAAABQAAAAUAAAAFAAAAAEAAAAAAAAAZAAAAGQAAAAAAAAAZAAAAGQAAAAVAAAAYAAAAAAAAAAAAAAADwAAACADAAAAAAAAAAAAAAEAAACgMgAAVgcAAKr4//8BAAAAf39/AAEAAABkAAAAAAAAABQAAABAHwAAAAAAACYAAAAAAAAAwOD//wAAAAAmAAAAZAAAABYAAABMAAAAAAAAAAAAAAAEAAAAAAAAAAEAAACAgIAKAAAAACgAAAAoAAAAZAAAAGQAAAAAAAAAzMzMAAAAAABQAAAAUAAAAGQAAABkAAAAAAAAABcAAAAUAAAAAAAAAAAAAAD/fwAA/38AAAAAAAAJAAAABAAAAAAAAAAMAAAAEAAAAAAAAAAAAAAAAAAAAAAAAAAeAAAAaAAAAAAAAAAAAAAAAAAAAAAAAAAAAAAAECcAABAnAAAAAAAAAAAAAAAAAAAAAAAAAAAAAAAAAAAAAAAAAAAAABQAAAAAAAAAwMD/AAAAAABkAAAAMgAAAAAAAABkAAAAAAAAAH9/fwAKAAAAHwAAAFQAAAAAAAAFAAAAAQAAAAAAAAAAAAAAAAAAAAAAAAAAAAAAAAAAAAAAAAAAAAAAAn9/fwAAAAADzMzMAMDA/wB/f38AAAAAAAAAAAAAAAAAAAAAAAAAAAAhAAAAGAAAABQAAABQKAAAGycAAHA1AABZKQAAEAAAACYAAAAIAAAAAAAAAAAAAAA="/>
               </a:ext>
             </a:extLst>
           </p:cNvSpPr>
@@ -400,7 +400,7 @@
           <a:lstStyle/>
           <a:p>
             <a:pPr/>
-            <a:fld id="{3FED58EB-A5D2-B8AE-9C55-53FB161B6A06}" type="slidenum">
+            <a:fld id="{3FD451FA-B4D2-81A7-9C6C-42F21F226A17}" type="slidenum">
               <a:t/>
             </a:fld>
           </a:p>
@@ -438,7 +438,7 @@
             <a:spLocks noGrp="1" noChangeArrowheads="1"/>
             <a:extLst>
               <a:ext uri="smNativeData">
-                <pr:smNativeData xmlns:pr="smNativeData" val="SMDATA_13_KVOsYBMAAAAlAAAAZAAAAA8BAAAAkAAAAEgAAACQAAAASAAAAAAAAAABAAAAAAAAAAEAAABQAAAAAAAAAAAA4D8AAAAAAADgPwAAAAAAAOA/AAAAAAAA4D8AAAAAAADgPwAAAAAAAOA/AAAAAAAA4D8AAAAAAADgPwAAAAAAAOA/AAAAAAAA4D8CAAAAjAAAAAAAAAAAAAAAu+DjDP///wgAAAAAAAAAAAAAAAAAAAAAAAAAAAAAAAAAAAAAZAAAAAEAAABAAAAAAAAAAAAAAAAAAAAAAAAAAAAAAAAAAAAAAAAAAAAAAAAAAAAAAAAAAAAAAAAAAAAAAAAAAAAAAAAAAAAAAAAAAAAAAAAAAAAAAAAAAAAAAAAAAAAAFAAAADwAAAAAAAAAAAAAAAAAAAkUAAAAAQAAABQAAAAUAAAAFAAAAAEAAAAAAAAAZAAAAGQAAAAAAAAAZAAAAGQAAAAVAAAAYAAAAAAAAAAAAAAADwAAACADAAAAAAAAAAAAAAEAAACgMgAAVgcAAKr4//8BAAAAf39/AAEAAABkAAAAAAAAABQAAABAHwAAAAAAACYAAAAAAAAAwOD//wAAAAAmAAAAZAAAABYAAABMAAAAAAAAAAAAAAAEAAAAAAAAAAEAAACAgIAKAAAAACgAAAAoAAAAZAAAAGQAAAAAAAAAzMzMAAAAAABQAAAAUAAAAGQAAABkAAAAAAAAABcAAAAUAAAAAAAAAAAAAAD/fwAA/38AAAAAAAAJAAAABAAAAKI+BAAMAAAAEAAAAAAAAAAAAAAAAAAAAAAAAAAeAAAAaAAAAAAAAAAAAAAAAAAAAAAAAAAAAAAAECcAABAnAAAAAAAAAAAAAAAAAAAAAAAAAAAAAAAAAAAAAAAAAAAAABQAAAAAAAAAwMD/AAAAAABkAAAAMgAAAAAAAABkAAAAAAAAAH9/fwAKAAAAHwAAAFQAAAAAAAAFAAAAAQAAAAAAAAAAAAAAAAAAAAAAAAAAAAAAAAAAAAAAAAAAAAAAAn9/fwAAAAADzMzMAMDA/wB/f38AAAAAAAAAAAAAAAAAAAAAAAAAAAAhAAAAGAAAABQAAADQAgAAsAEAAHA1AAC4CAAAEAAAACYAAAAIAAAAAAAAAAAAAAA="/>
+                <pr:smNativeData xmlns:pr="smNativeData" val="SMDATA_13_NmGsYBMAAAAlAAAAZAAAAA8BAAAAkAAAAEgAAACQAAAASAAAAAAAAAABAAAAAAAAAAEAAABQAAAAAAAAAAAA4D8AAAAAAADgPwAAAAAAAOA/AAAAAAAA4D8AAAAAAADgPwAAAAAAAOA/AAAAAAAA4D8AAAAAAADgPwAAAAAAAOA/AAAAAAAA4D8CAAAAjAAAAAAAAAAAAAAAu+DjDP///wgAAAAAAAAAAAAAAAAAAAAAAAAAAAAAAAAAAAAAZAAAAAEAAABAAAAAAAAAAAAAAAAAAAAAAAAAAAAAAAAAAAAAAAAAAAAAAAAAAAAAAAAAAAAAAAAAAAAAAAAAAAAAAAAAAAAAAAAAAAAAAAAAAAAAAAAAAAAAAAAAAAAAFAAAADwAAAAAAAAAAAAAAAAAAAkUAAAAAQAAABQAAAAUAAAAFAAAAAEAAAAAAAAAZAAAAGQAAAAAAAAAZAAAAGQAAAAVAAAAYAAAAAAAAAAAAAAADwAAACADAAAAAAAAAAAAAAEAAACgMgAAVgcAAKr4//8BAAAAf39/AAEAAABkAAAAAAAAABQAAABAHwAAAAAAACYAAAAAAAAAwOD//wAAAAAmAAAAZAAAABYAAABMAAAAAAAAAAAAAAAEAAAAAAAAAAEAAACAgIAKAAAAACgAAAAoAAAAZAAAAGQAAAAAAAAAzMzMAAAAAABQAAAAUAAAAGQAAABkAAAAAAAAABcAAAAUAAAAAAAAAAAAAAD/fwAA/38AAAAAAAAJAAAABAAAAKI+BAAMAAAAEAAAAAAAAAAAAAAAAAAAAAAAAAAeAAAAaAAAAAAAAAAAAAAAAAAAAAAAAAAAAAAAECcAABAnAAAAAAAAAAAAAAAAAAAAAAAAAAAAAAAAAAAAAAAAAAAAABQAAAAAAAAAwMD/AAAAAABkAAAAMgAAAAAAAABkAAAAAAAAAH9/fwAKAAAAHwAAAFQAAAAAAAAFAAAAAQAAAAAAAAAAAAAAAAAAAAAAAAAAAAAAAAAAAAAAAAAAAAAAAn9/fwAAAAADzMzMAMDA/wB/f38AAAAAAAAAAAAAAAAAAAAAAAAAAAAhAAAAGAAAABQAAADQAgAAsAEAAHA1AAC4CAAAEAAAACYAAAAIAAAAAAAAAAAAAAA="/>
               </a:ext>
             </a:extLst>
           </p:cNvSpPr>
@@ -465,7 +465,7 @@
             <a:spLocks noGrp="1" noChangeArrowheads="1"/>
             <a:extLst>
               <a:ext uri="smNativeData">
-                <pr:smNativeData xmlns:pr="smNativeData" val="SMDATA_13_KVOsYBMAAAAlAAAAZAAAAA8BAAAAkAAAAEgAAACQAAAASAAAAAAAAAAAAAAAAQAAAAEAAABQAAAAAAAAAAAA4D8AAAAAAADgPwAAAAAAAOA/AAAAAAAA4D8AAAAAAADgPwAAAAAAAOA/AAAAAAAA4D8AAAAAAADgPwAAAAAAAOA/AAAAAAAA4D8CAAAAjAAAAAAAAAAAAAAAu+DjDP///wgAAAAAAAAAAAAAAAAAAAAAAAAAAAAAAAAAAAAAZAAAAAEAAABAAAAAAAAAAAAAAAAAAAAAAAAAAAAAAAAAAAAAAAAAAAAAAAAAAAAAAAAAAAAAAAAAAAAAAAAAAAAAAAAAAAAAAAAAAAAAAAAAAAAAAAAAAAAAAAAAAAAAFAAAADwAAAAAAAAAAAAAAAAAAAkUAAAAAQAAABQAAAAUAAAAFAAAAAEAAAAAAAAAZAAAAGQAAAAAAAAAZAAAAGQAAAAVAAAAYAAAAAAAAAAAAAAADwAAACADAAAAAAAAAAAAAAEAAACgMgAAVgcAAKr4//8BAAAAf39/AAEAAABkAAAAAAAAABQAAABAHwAAAAAAACYAAAAAAAAAwOD//wAAAAAmAAAAZAAAABYAAABMAAAAAAAAAAAAAAAEAAAAAAAAAAEAAACAgIAKAAAAACgAAAAoAAAAZAAAAGQAAAAAAAAAzMzMAAAAAABQAAAAUAAAAGQAAABkAAAAAAAAABcAAAAUAAAAAAAAAAAAAAD/fwAA/38AAAAAAAAJAAAABAAAAAAAAAAMAAAAEAAAAAAAAAAAAAAAAAAAAAAAAAAeAAAAaAAAAAAAAAAAAAAAAAAAAAAAAAAAAAAAECcAABAnAAAAAAAAAAAAAAAAAAAAAAAAAAAAAAAAAAAAAAAAAAAAABQAAAAAAAAAwMD/AAAAAABkAAAAMgAAAAAAAABkAAAAAAAAAH9/fwAKAAAAHwAAAFQAAAAAAAAFAAAAAQAAAAAAAAAAAAAAAAAAAAAAAAAAAAAAAAAAAAAAAAAAAAAAAn9/fwAAAAADzMzMAMDA/wB/f38AAAAAAAAAAAAAAAAAAAAAAAAAAAAhAAAAGAAAABQAAADQAgAA2AkAAHA1AACwJQAAEAAAACYAAAAIAAAAAgAAAAAAAAA="/>
+                <pr:smNativeData xmlns:pr="smNativeData" val="SMDATA_13_NmGsYBMAAAAlAAAAZAAAAA8BAAAAkAAAAEgAAACQAAAASAAAAAAAAAAAAAAAAQAAAAEAAABQAAAAAAAAAAAA4D8AAAAAAADgPwAAAAAAAOA/AAAAAAAA4D8AAAAAAADgPwAAAAAAAOA/AAAAAAAA4D8AAAAAAADgPwAAAAAAAOA/AAAAAAAA4D8CAAAAjAAAAAAAAAAAAAAAu+DjDP///wgAAAAAAAAAAAAAAAAAAAAAAAAAAAAAAAAAAAAAZAAAAAEAAABAAAAAAAAAAAAAAAAAAAAAAAAAAAAAAAAAAAAAAAAAAAAAAAAAAAAAAAAAAAAAAAAAAAAAAAAAAAAAAAAAAAAAAAAAAAAAAAAAAAAAAAAAAAAAAAAAAAAAFAAAADwAAAAAAAAAAAAAAAAAAAkUAAAAAQAAABQAAAAUAAAAFAAAAAEAAAAAAAAAZAAAAGQAAAAAAAAAZAAAAGQAAAAVAAAAYAAAAAAAAAAAAAAADwAAACADAAAAAAAAAAAAAAEAAACgMgAAVgcAAKr4//8BAAAAf39/AAEAAABkAAAAAAAAABQAAABAHwAAAAAAACYAAAAAAAAAwOD//wAAAAAmAAAAZAAAABYAAABMAAAAAAAAAAAAAAAEAAAAAAAAAAEAAACAgIAKAAAAACgAAAAoAAAAZAAAAGQAAAAAAAAAzMzMAAAAAABQAAAAUAAAAGQAAABkAAAAAAAAABcAAAAUAAAAAAAAAAAAAAD/fwAA/38AAAAAAAAJAAAABAAAAAAAAAAMAAAAEAAAAAAAAAAAAAAAAAAAAAAAAAAeAAAAaAAAAAAAAAAAAAAAAAAAAAAAAAAAAAAAECcAABAnAAAAAAAAAAAAAAAAAAAAAAAAAAAAAAAAAAAAAAAAAAAAABQAAAAAAAAAwMD/AAAAAABkAAAAMgAAAAAAAABkAAAAAAAAAH9/fwAKAAAAHwAAAFQAAAAAAAAFAAAAAQAAAAAAAAAAAAAAAAAAAAAAAAAAAAAAAAAAAAAAAAAAAAAAAn9/fwAAAAADzMzMAMDA/wB/f38AAAAAAAAAAAAAAAAAAAAAAAAAAAAhAAAAGAAAABQAAADQAgAA2AkAAHA1AACwJQAAEAAAACYAAAAIAAAAAgAAAAAAAAA="/>
               </a:ext>
             </a:extLst>
           </p:cNvSpPr>
@@ -520,7 +520,7 @@
             <a:spLocks noGrp="1" noChangeArrowheads="1"/>
             <a:extLst>
               <a:ext uri="smNativeData">
-                <pr:smNativeData xmlns:pr="smNativeData" val="SMDATA_13_KVOsYBMAAAAlAAAAZAAAAA8BAAAAkAAAAEgAAACQAAAASAAAAAAAAAABAAAAAAAAAAEAAABQAAAAAAAAAAAA4D8AAAAAAADgPwAAAAAAAOA/AAAAAAAA4D8AAAAAAADgPwAAAAAAAOA/AAAAAAAA4D8AAAAAAADgPwAAAAAAAOA/AAAAAAAA4D8CAAAAjAAAAAAAAAAAAAAAu+DjDP///wgAAAAAAAAAAAAAAAAAAAAAAAAAAAAAAAAAAAAAZAAAAAEAAABAAAAAAAAAAAAAAAAAAAAAAAAAAAAAAAAAAAAAAAAAAAAAAAAAAAAAAAAAAAAAAAAAAAAAAAAAAAAAAAAAAAAAAAAAAAAAAAAAAAAAAAAAAAAAAAAAAAAAFAAAADwAAAAAAAAAAAAAAAAAAAkUAAAAAQAAABQAAAAUAAAAFAAAAAEAAAAAAAAAZAAAAGQAAAAAAAAAZAAAAGQAAAAVAAAAYAAAAAAAAAAAAAAADwAAACADAAAAAAAAAAAAAAEAAACgMgAAVgcAAKr4//8BAAAAf39/AAEAAABkAAAAAAAAABQAAABAHwAAAAAAACYAAAAAAAAAwOD//wAAAAAmAAAAZAAAABYAAABMAAAAAAAAAAAAAAAEAAAAAAAAAAEAAACAgIAKAAAAACgAAAAoAAAAZAAAAGQAAAAAAAAAzMzMAAAAAABQAAAAUAAAAGQAAABkAAAAAAAAABcAAAAUAAAAAAAAAAAAAAD/fwAA/38AAAAAAAAJAAAABAAAAAAAAAAMAAAAEAAAAAAAAAAAAAAAAAAAAAAAAAAeAAAAaAAAAAAAAAAAAAAAAAAAAAAAAAAAAAAAECcAABAnAAAAAAAAAAAAAAAAAAAAAAAAAAAAAAAAAAAAAAAAAAAAABQAAAAAAAAAwMD/AAAAAABkAAAAMgAAAAAAAABkAAAAAAAAAH9/fwAKAAAAHwAAAFQAAAAAAAAFAAAAAQAAAAAAAAAAAAAAAAAAAAAAAAAAAAAAAAAAAAAAAAAAAAAAAn9/fwAAAAADzMzMAMDA/wB/f38AAAAAAAAAAAAAAAAAAAAAAAAAAAAhAAAAGAAAABQAAADQAgAAGycAAPAPAABZKQAAEAAAACYAAAAIAAAAAAAAAAAAAAA="/>
+                <pr:smNativeData xmlns:pr="smNativeData" val="SMDATA_13_NmGsYBMAAAAlAAAAZAAAAA8BAAAAkAAAAEgAAACQAAAASAAAAAAAAAABAAAAAAAAAAEAAABQAAAAAAAAAAAA4D8AAAAAAADgPwAAAAAAAOA/AAAAAAAA4D8AAAAAAADgPwAAAAAAAOA/AAAAAAAA4D8AAAAAAADgPwAAAAAAAOA/AAAAAAAA4D8CAAAAjAAAAAAAAAAAAAAAu+DjDP///wgAAAAAAAAAAAAAAAAAAAAAAAAAAAAAAAAAAAAAZAAAAAEAAABAAAAAAAAAAAAAAAAAAAAAAAAAAAAAAAAAAAAAAAAAAAAAAAAAAAAAAAAAAAAAAAAAAAAAAAAAAAAAAAAAAAAAAAAAAAAAAAAAAAAAAAAAAAAAAAAAAAAAFAAAADwAAAAAAAAAAAAAAAAAAAkUAAAAAQAAABQAAAAUAAAAFAAAAAEAAAAAAAAAZAAAAGQAAAAAAAAAZAAAAGQAAAAVAAAAYAAAAAAAAAAAAAAADwAAACADAAAAAAAAAAAAAAEAAACgMgAAVgcAAKr4//8BAAAAf39/AAEAAABkAAAAAAAAABQAAABAHwAAAAAAACYAAAAAAAAAwOD//wAAAAAmAAAAZAAAABYAAABMAAAAAAAAAAAAAAAEAAAAAAAAAAEAAACAgIAKAAAAACgAAAAoAAAAZAAAAGQAAAAAAAAAzMzMAAAAAABQAAAAUAAAAGQAAABkAAAAAAAAABcAAAAUAAAAAAAAAAAAAAD/fwAA/38AAAAAAAAJAAAABAAAAAAAAAAMAAAAEAAAAAAAAAAAAAAAAAAAAAAAAAAeAAAAaAAAAAAAAAAAAAAAAAAAAAAAAAAAAAAAECcAABAnAAAAAAAAAAAAAAAAAAAAAAAAAAAAAAAAAAAAAAAAAAAAABQAAAAAAAAAwMD/AAAAAABkAAAAMgAAAAAAAABkAAAAAAAAAH9/fwAKAAAAHwAAAFQAAAAAAAAFAAAAAQAAAAAAAAAAAAAAAAAAAAAAAAAAAAAAAAAAAAAAAAAAAAAAAn9/fwAAAAADzMzMAMDA/wB/f38AAAAAAAAAAAAAAAAAAAAAAAAAAAAhAAAAGAAAABQAAADQAgAAGycAAPAPAABZKQAAEAAAACYAAAAIAAAAAAAAAAAAAAA="/>
               </a:ext>
             </a:extLst>
           </p:cNvSpPr>
@@ -534,7 +534,7 @@
           <a:lstStyle/>
           <a:p>
             <a:pPr/>
-            <a:fld id="{3FED583A-74D2-B8AE-9C55-82FB161B6AD7}" type="datetime1">
+            <a:fld id="{3FD45D39-77D2-81AB-9C6C-81FE13226AD4}" type="datetime1">
               <a:t/>
             </a:fld>
           </a:p>
@@ -547,7 +547,7 @@
             <a:spLocks noGrp="1" noChangeArrowheads="1"/>
             <a:extLst>
               <a:ext uri="smNativeData">
-                <pr:smNativeData xmlns:pr="smNativeData" val="SMDATA_13_KVOsYBMAAAAlAAAAZAAAAA8BAAAAkAAAAEgAAACQAAAASAAAAAAAAAABAAAAAAAAAAEAAABQAAAAAAAAAAAA4D8AAAAAAADgPwAAAAAAAOA/AAAAAAAA4D8AAAAAAADgPwAAAAAAAOA/AAAAAAAA4D8AAAAAAADgPwAAAAAAAOA/AAAAAAAA4D8CAAAAjAAAAAAAAAAAAAAAu+DjDP///wgAAAAAAAAAAAAAAAAAAAAAAAAAAAAAAAAAAAAAZAAAAAEAAABAAAAAAAAAAAAAAAAAAAAAAAAAAAAAAAAAAAAAAAAAAAAAAAAAAAAAAAAAAAAAAAAAAAAAAAAAAAAAAAAAAAAAAAAAAAAAAAAAAAAAAAAAAAAAAAAAAAAAFAAAADwAAAAAAAAAAAAAAAAAAAkUAAAAAQAAABQAAAAUAAAAFAAAAAEAAAAAAAAAZAAAAGQAAAAAAAAAZAAAAGQAAAAVAAAAYAAAAAAAAAAAAAAADwAAACADAAAAAAAAAAAAAAEAAACgMgAAVgcAAKr4//8BAAAAf39/AAEAAABkAAAAAAAAABQAAABAHwAAAAAAACYAAAAAAAAAwOD//wAAAAAmAAAAZAAAABYAAABMAAAAAAAAAAAAAAAEAAAAAAAAAAEAAACAgIAKAAAAACgAAAAoAAAAZAAAAGQAAAAAAAAAzMzMAAAAAABQAAAAUAAAAGQAAABkAAAAAAAAABcAAAAUAAAAAAAAAAAAAAD/fwAA/38AAAAAAAAJAAAABAAAADM/bWMMAAAAEAAAAAAAAAAAAAAAAAAAAAAAAAAeAAAAaAAAAAAAAAAAAAAAAAAAAAAAAAAAAAAAECcAABAnAAAAAAAAAAAAAAAAAAAAAAAAAAAAAAAAAAAAAAAAAAAAABQAAAAAAAAAwMD/AAAAAABkAAAAMgAAAAAAAABkAAAAAAAAAH9/fwAKAAAAHwAAAFQAAAAAAAAFAAAAAQAAAAAAAAAAAAAAAAAAAAAAAAAAAAAAAAAAAAAAAAAAAAAAAn9/fwAAAAADzMzMAMDA/wB/f38AAAAAAAAAAAAAAAAAAAAAAAAAAAAhAAAAGAAAABQAAAA4EwAAGycAAAglAABZKQAAEAAAACYAAAAIAAAAAAAAAAAAAAA="/>
+                <pr:smNativeData xmlns:pr="smNativeData" val="SMDATA_13_NmGsYBMAAAAlAAAAZAAAAA8BAAAAkAAAAEgAAACQAAAASAAAAAAAAAABAAAAAAAAAAEAAABQAAAAAAAAAAAA4D8AAAAAAADgPwAAAAAAAOA/AAAAAAAA4D8AAAAAAADgPwAAAAAAAOA/AAAAAAAA4D8AAAAAAADgPwAAAAAAAOA/AAAAAAAA4D8CAAAAjAAAAAAAAAAAAAAAu+DjDP///wgAAAAAAAAAAAAAAAAAAAAAAAAAAAAAAAAAAAAAZAAAAAEAAABAAAAAAAAAAAAAAAAAAAAAAAAAAAAAAAAAAAAAAAAAAAAAAAAAAAAAAAAAAAAAAAAAAAAAAAAAAAAAAAAAAAAAAAAAAAAAAAAAAAAAAAAAAAAAAAAAAAAAFAAAADwAAAAAAAAAAAAAAAAAAAkUAAAAAQAAABQAAAAUAAAAFAAAAAEAAAAAAAAAZAAAAGQAAAAAAAAAZAAAAGQAAAAVAAAAYAAAAAAAAAAAAAAADwAAACADAAAAAAAAAAAAAAEAAACgMgAAVgcAAKr4//8BAAAAf39/AAEAAABkAAAAAAAAABQAAABAHwAAAAAAACYAAAAAAAAAwOD//wAAAAAmAAAAZAAAABYAAABMAAAAAAAAAAAAAAAEAAAAAAAAAAEAAACAgIAKAAAAACgAAAAoAAAAZAAAAGQAAAAAAAAAzMzMAAAAAABQAAAAUAAAAGQAAABkAAAAAAAAABcAAAAUAAAAAAAAAAAAAAD/fwAA/38AAAAAAAAJAAAABAAAADM/bWMMAAAAEAAAAAAAAAAAAAAAAAAAAAAAAAAeAAAAaAAAAAAAAAAAAAAAAAAAAAAAAAAAAAAAECcAABAnAAAAAAAAAAAAAAAAAAAAAAAAAAAAAAAAAAAAAAAAAAAAABQAAAAAAAAAwMD/AAAAAABkAAAAMgAAAAAAAABkAAAAAAAAAH9/fwAKAAAAHwAAAFQAAAAAAAAFAAAAAQAAAAAAAAAAAAAAAAAAAAAAAAAAAAAAAAAAAAAAAAAAAAAAAn9/fwAAAAADzMzMAMDA/wB/f38AAAAAAAAAAAAAAAAAAAAAAAAAAAAhAAAAGAAAABQAAAA4EwAAGycAAAglAABZKQAAEAAAACYAAAAIAAAAAAAAAAAAAAA="/>
               </a:ext>
             </a:extLst>
           </p:cNvSpPr>
@@ -571,7 +571,7 @@
             <a:spLocks noGrp="1" noChangeArrowheads="1"/>
             <a:extLst>
               <a:ext uri="smNativeData">
-                <pr:smNativeData xmlns:pr="smNativeData" val="SMDATA_13_KVOsYBMAAAAlAAAAZAAAAA8BAAAAkAAAAEgAAACQAAAASAAAAAAAAAABAAAAAAAAAAEAAABQAAAAAAAAAAAA4D8AAAAAAADgPwAAAAAAAOA/AAAAAAAA4D8AAAAAAADgPwAAAAAAAOA/AAAAAAAA4D8AAAAAAADgPwAAAAAAAOA/AAAAAAAA4D8CAAAAjAAAAAAAAAAAAAAAu+DjDP///wgAAAAAAAAAAAAAAAAAAAAAAAAAAAAAAAAAAAAAZAAAAAEAAABAAAAAAAAAAAAAAAAAAAAAAAAAAAAAAAAAAAAAAAAAAAAAAAAAAAAAAAAAAAAAAAAAAAAAAAAAAAAAAAAAAAAAAAAAAAAAAAAAAAAAAAAAAAAAAAAAAAAAFAAAADwAAAAAAAAAAAAAAAAAAAkUAAAAAQAAABQAAAAUAAAAFAAAAAEAAAAAAAAAZAAAAGQAAAAAAAAAZAAAAGQAAAAVAAAAYAAAAAAAAAAAAAAADwAAACADAAAAAAAAAAAAAAEAAACgMgAAVgcAAKr4//8BAAAAf39/AAEAAABkAAAAAAAAABQAAABAHwAAAAAAACYAAAAAAAAAwOD//wAAAAAmAAAAZAAAABYAAABMAAAAAAAAAAAAAAAEAAAAAAAAAAEAAACAgIAKAAAAACgAAAAoAAAAZAAAAGQAAAAAAAAAzMzMAAAAAABQAAAAUAAAAGQAAABkAAAAAAAAABcAAAAUAAAAAAAAAAAAAAD/fwAA/38AAAAAAAAJAAAABAAAAAAAAAAMAAAAEAAAAAAAAAAAAAAAAAAAAAAAAAAeAAAAaAAAAAAAAAAAAAAAAAAAAAAAAAAAAAAAECcAABAnAAAAAAAAAAAAAAAAAAAAAAAAAAAAAAAAAAAAAAAAAAAAABQAAAAAAAAAwMD/AAAAAABkAAAAMgAAAAAAAABkAAAAAAAAAH9/fwAKAAAAHwAAAFQAAAAAAAAFAAAAAQAAAAAAAAAAAAAAAAAAAAAAAAAAAAAAAAAAAAAAAAAAAAAAAn9/fwAAAAADzMzMAMDA/wB/f38AAAAAAAAAAAAAAAAAAAAAAAAAAAAhAAAAGAAAABQAAABQKAAAGycAAHA1AABZKQAAEAAAACYAAAAIAAAAAAAAAAAAAAA="/>
+                <pr:smNativeData xmlns:pr="smNativeData" val="SMDATA_13_NmGsYBMAAAAlAAAAZAAAAA8BAAAAkAAAAEgAAACQAAAASAAAAAAAAAABAAAAAAAAAAEAAABQAAAAAAAAAAAA4D8AAAAAAADgPwAAAAAAAOA/AAAAAAAA4D8AAAAAAADgPwAAAAAAAOA/AAAAAAAA4D8AAAAAAADgPwAAAAAAAOA/AAAAAAAA4D8CAAAAjAAAAAAAAAAAAAAAu+DjDP///wgAAAAAAAAAAAAAAAAAAAAAAAAAAAAAAAAAAAAAZAAAAAEAAABAAAAAAAAAAAAAAAAAAAAAAAAAAAAAAAAAAAAAAAAAAAAAAAAAAAAAAAAAAAAAAAAAAAAAAAAAAAAAAAAAAAAAAAAAAAAAAAAAAAAAAAAAAAAAAAAAAAAAFAAAADwAAAAAAAAAAAAAAAAAAAkUAAAAAQAAABQAAAAUAAAAFAAAAAEAAAAAAAAAZAAAAGQAAAAAAAAAZAAAAGQAAAAVAAAAYAAAAAAAAAAAAAAADwAAACADAAAAAAAAAAAAAAEAAACgMgAAVgcAAKr4//8BAAAAf39/AAEAAABkAAAAAAAAABQAAABAHwAAAAAAACYAAAAAAAAAwOD//wAAAAAmAAAAZAAAABYAAABMAAAAAAAAAAAAAAAEAAAAAAAAAAEAAACAgIAKAAAAACgAAAAoAAAAZAAAAGQAAAAAAAAAzMzMAAAAAABQAAAAUAAAAGQAAABkAAAAAAAAABcAAAAUAAAAAAAAAAAAAAD/fwAA/38AAAAAAAAJAAAABAAAAAAAAAAMAAAAEAAAAAAAAAAAAAAAAAAAAAAAAAAeAAAAaAAAAAAAAAAAAAAAAAAAAAAAAAAAAAAAECcAABAnAAAAAAAAAAAAAAAAAAAAAAAAAAAAAAAAAAAAAAAAAAAAABQAAAAAAAAAwMD/AAAAAABkAAAAMgAAAAAAAABkAAAAAAAAAH9/fwAKAAAAHwAAAFQAAAAAAAAFAAAAAQAAAAAAAAAAAAAAAAAAAAAAAAAAAAAAAAAAAAAAAAAAAAAAAn9/fwAAAAADzMzMAMDA/wB/f38AAAAAAAAAAAAAAAAAAAAAAAAAAAAhAAAAGAAAABQAAABQKAAAGycAAHA1AABZKQAAEAAAACYAAAAIAAAAAAAAAAAAAAA="/>
               </a:ext>
             </a:extLst>
           </p:cNvSpPr>
@@ -585,7 +585,7 @@
           <a:lstStyle/>
           <a:p>
             <a:pPr/>
-            <a:fld id="{3FED5418-56D2-B8A2-9C55-A0F71A1B6AF5}" type="slidenum">
+            <a:fld id="{3FD43865-2BD2-81CE-9C6C-DD9B76226A88}" type="slidenum">
               <a:t/>
             </a:fld>
           </a:p>
@@ -623,7 +623,7 @@
             <a:spLocks noGrp="1" noChangeArrowheads="1"/>
             <a:extLst>
               <a:ext uri="smNativeData">
-                <pr:smNativeData xmlns:pr="smNativeData" val="SMDATA_13_KVOsYBMAAAAlAAAAZAAAAA8BAAAAkAAAAEgAAACQAAAASAAAAAAAAAACAAAAAQAAAAEAAABQAAAAAAAAAAAA4D8AAAAAAADgPwAAAAAAAOA/AAAAAAAA4D8AAAAAAADgPwAAAAAAAOA/AAAAAAAA4D8AAAAAAADgPwAAAAAAAOA/AAAAAAAA4D8CAAAAjAAAAAAAAAAAAAAAu+DjDP///wgAAAAAAAAAAAAAAAAAAAAAAAAAAAAAAAAAAAAAZAAAAAEAAABAAAAAAAAAAAAAAAAAAAAAAAAAAAAAAAAAAAAAAAAAAAAAAAAAAAAAAAAAAAAAAAAAAAAAAAAAAAAAAAAAAAAAAAAAAAAAAAAAAAAAAAAAAAAAAAAAAAAAFAAAADwAAAAAAAAAAAAAAAAAAAkUAAAAAQAAABQAAAAUAAAAFAAAAAEAAAAAAAAAZAAAAGQAAAAAAAAAZAAAAGQAAAAVAAAAYAAAAAAAAAAAAAAADwAAACADAAAAAAAAAAAAAAEAAACgMgAAVgcAAKr4//8BAAAAf39/AAEAAABkAAAAAAAAABQAAABAHwAAAAAAACYAAAAAAAAAwOD//wAAAAAmAAAAZAAAABYAAABMAAAAAAAAAAAAAAAEAAAAAAAAAAEAAACAgIAKAAAAACgAAAAoAAAAZAAAAGQAAAAAAAAAzMzMAAAAAABQAAAAUAAAAGQAAABkAAAAAAAAABcAAAAUAAAAAAAAAAAAAAD/fwAA/38AAAAAAAAJAAAABAAAAAAAAAAMAAAAEAAAAAAAAAAAAAAAAAAAAAAAAAAeAAAAaAAAAAAAAAAAAAAAAAAAAAAAAAAAAAAAECcAABAnAAAAAAAAAAAAAAAAAAAAAAAAAAAAAAAAAAAAAAAAAAAAABQAAAAAAAAAwMD/AAAAAABkAAAAMgAAAAAAAABkAAAAAAAAAH9/fwAKAAAAHwAAAFQAAAAAAAAFAAAAAQAAAAAAAAAAAAAAAAAAAAAAAAAAAAAAAAAAAAAAAAAAAAAAAn9/fwAAAAADzMzMAMDA/wB/f38AAAAAAAAAAAAAAAAAAAAAAAAAAAAhAAAAGAAAABQAAADIKAAAsAEAAHA1AACwJQAAEAAAACYAAAAIAAAAgwAAAAAAAAA="/>
+                <pr:smNativeData xmlns:pr="smNativeData" val="SMDATA_13_NmGsYBMAAAAlAAAAZAAAAA8BAAAAkAAAAEgAAACQAAAASAAAAAAAAAACAAAAAQAAAAEAAABQAAAAAAAAAAAA4D8AAAAAAADgPwAAAAAAAOA/AAAAAAAA4D8AAAAAAADgPwAAAAAAAOA/AAAAAAAA4D8AAAAAAADgPwAAAAAAAOA/AAAAAAAA4D8CAAAAjAAAAAAAAAAAAAAAu+DjDP///wgAAAAAAAAAAAAAAAAAAAAAAAAAAAAAAAAAAAAAZAAAAAEAAABAAAAAAAAAAAAAAAAAAAAAAAAAAAAAAAAAAAAAAAAAAAAAAAAAAAAAAAAAAAAAAAAAAAAAAAAAAAAAAAAAAAAAAAAAAAAAAAAAAAAAAAAAAAAAAAAAAAAAFAAAADwAAAAAAAAAAAAAAAAAAAkUAAAAAQAAABQAAAAUAAAAFAAAAAEAAAAAAAAAZAAAAGQAAAAAAAAAZAAAAGQAAAAVAAAAYAAAAAAAAAAAAAAADwAAACADAAAAAAAAAAAAAAEAAACgMgAAVgcAAKr4//8BAAAAf39/AAEAAABkAAAAAAAAABQAAABAHwAAAAAAACYAAAAAAAAAwOD//wAAAAAmAAAAZAAAABYAAABMAAAAAAAAAAAAAAAEAAAAAAAAAAEAAACAgIAKAAAAACgAAAAoAAAAZAAAAGQAAAAAAAAAzMzMAAAAAABQAAAAUAAAAGQAAABkAAAAAAAAABcAAAAUAAAAAAAAAAAAAAD/fwAA/38AAAAAAAAJAAAABAAAAAAAAAAMAAAAEAAAAAAAAAAAAAAAAAAAAAAAAAAeAAAAaAAAAAAAAAAAAAAAAAAAAAAAAAAAAAAAECcAABAnAAAAAAAAAAAAAAAAAAAAAAAAAAAAAAAAAAAAAAAAAAAAABQAAAAAAAAAwMD/AAAAAABkAAAAMgAAAAAAAABkAAAAAAAAAH9/fwAKAAAAHwAAAFQAAAAAAAAFAAAAAQAAAAAAAAAAAAAAAAAAAAAAAAAAAAAAAAAAAAAAAAAAAAAAAn9/fwAAAAADzMzMAMDA/wB/f38AAAAAAAAAAAAAAAAAAAAAAAAAAAAhAAAAGAAAABQAAADIKAAAsAEAAHA1AACwJQAAEAAAACYAAAAIAAAAgwAAAAAAAAA="/>
               </a:ext>
             </a:extLst>
           </p:cNvSpPr>
@@ -659,7 +659,7 @@
             <a:spLocks noGrp="1" noChangeArrowheads="1"/>
             <a:extLst>
               <a:ext uri="smNativeData">
-                <pr:smNativeData xmlns:pr="smNativeData" val="SMDATA_13_KVOsYBMAAAAlAAAAZAAAAA8BAAAAkAAAAEgAAACQAAAASAAAAAAAAAAAAAAAAQAAAAEAAABQAAAAAAAAAAAA4D8AAAAAAADgPwAAAAAAAOA/AAAAAAAA4D8AAAAAAADgPwAAAAAAAOA/AAAAAAAA4D8AAAAAAADgPwAAAAAAAOA/AAAAAAAA4D8CAAAAjAAAAAAAAAAAAAAAu+DjDP///wgAAAAAAAAAAAAAAAAAAAAAAAAAAAAAAAAAAAAAZAAAAAEAAABAAAAAAAAAAAAAAAAAAAAAAAAAAAAAAAAAAAAAAAAAAAAAAAAAAAAAAAAAAAAAAAAAAAAAAAAAAAAAAAAAAAAAAAAAAAAAAAAAAAAAAAAAAAAAAAAAAAAAFAAAADwAAAAAAAAAAAAAAAAAAAkUAAAAAQAAABQAAAAUAAAAFAAAAAEAAAAAAAAAZAAAAGQAAAAAAAAAZAAAAGQAAAAVAAAAYAAAAAAAAAAAAAAADwAAACADAAAAAAAAAAAAAAEAAACgMgAAVgcAAKr4//8BAAAAf39/AAEAAABkAAAAAAAAABQAAABAHwAAAAAAACYAAAAAAAAAwOD//wAAAAAmAAAAZAAAABYAAABMAAAAAAAAAAAAAAAEAAAAAAAAAAEAAACAgIAKAAAAACgAAAAoAAAAZAAAAGQAAAAAAAAAzMzMAAAAAABQAAAAUAAAAGQAAABkAAAAAAAAABcAAAAUAAAAAAAAAAAAAAD/fwAA/38AAAAAAAAJAAAABAAAAAAAAAAMAAAAEAAAAAAAAAAAAAAAAAAAAAAAAAAeAAAAaAAAAAAAAAAAAAAAAAAAAAAAAAAAAAAAECcAABAnAAAAAAAAAAAAAAAAAAAAAAAAAAAAAAAAAAAAAAAAAAAAABQAAAAAAAAAwMD/AAAAAABkAAAAMgAAAAAAAABkAAAAAAAAAH9/fwAKAAAAHwAAAFQAAAAAAAAFAAAAAQAAAAAAAAAAAAAAAAAAAAAAAAAAAAAAAAAAAAAAAAAAAAAAAn9/fwAAAAADzMzMAMDA/wB/f38AAAAAAAAAAAAAAAAAAAAAAAAAAAAhAAAAGAAAABQAAADQAgAAsAEAANgnAACwJQAAEAAAACYAAAAIAAAAAwAAAAAAAAA="/>
+                <pr:smNativeData xmlns:pr="smNativeData" val="SMDATA_13_NmGsYBMAAAAlAAAAZAAAAA8BAAAAkAAAAEgAAACQAAAASAAAAAAAAAAAAAAAAQAAAAEAAABQAAAAAAAAAAAA4D8AAAAAAADgPwAAAAAAAOA/AAAAAAAA4D8AAAAAAADgPwAAAAAAAOA/AAAAAAAA4D8AAAAAAADgPwAAAAAAAOA/AAAAAAAA4D8CAAAAjAAAAAAAAAAAAAAAu+DjDP///wgAAAAAAAAAAAAAAAAAAAAAAAAAAAAAAAAAAAAAZAAAAAEAAABAAAAAAAAAAAAAAAAAAAAAAAAAAAAAAAAAAAAAAAAAAAAAAAAAAAAAAAAAAAAAAAAAAAAAAAAAAAAAAAAAAAAAAAAAAAAAAAAAAAAAAAAAAAAAAAAAAAAAFAAAADwAAAAAAAAAAAAAAAAAAAkUAAAAAQAAABQAAAAUAAAAFAAAAAEAAAAAAAAAZAAAAGQAAAAAAAAAZAAAAGQAAAAVAAAAYAAAAAAAAAAAAAAADwAAACADAAAAAAAAAAAAAAEAAACgMgAAVgcAAKr4//8BAAAAf39/AAEAAABkAAAAAAAAABQAAABAHwAAAAAAACYAAAAAAAAAwOD//wAAAAAmAAAAZAAAABYAAABMAAAAAAAAAAAAAAAEAAAAAAAAAAEAAACAgIAKAAAAACgAAAAoAAAAZAAAAGQAAAAAAAAAzMzMAAAAAABQAAAAUAAAAGQAAABkAAAAAAAAABcAAAAUAAAAAAAAAAAAAAD/fwAA/38AAAAAAAAJAAAABAAAAAAAAAAMAAAAEAAAAAAAAAAAAAAAAAAAAAAAAAAeAAAAaAAAAAAAAAAAAAAAAAAAAAAAAAAAAAAAECcAABAnAAAAAAAAAAAAAAAAAAAAAAAAAAAAAAAAAAAAAAAAAAAAABQAAAAAAAAAwMD/AAAAAABkAAAAMgAAAAAAAABkAAAAAAAAAH9/fwAKAAAAHwAAAFQAAAAAAAAFAAAAAQAAAAAAAAAAAAAAAAAAAAAAAAAAAAAAAAAAAAAAAAAAAAAAAn9/fwAAAAADzMzMAMDA/wB/f38AAAAAAAAAAAAAAAAAAAAAAAAAAAAhAAAAGAAAABQAAADQAgAAsAEAANgnAACwJQAAEAAAACYAAAAIAAAAAwAAAAAAAAA="/>
               </a:ext>
             </a:extLst>
           </p:cNvSpPr>
@@ -719,7 +719,7 @@
             <a:spLocks noGrp="1" noChangeArrowheads="1"/>
             <a:extLst>
               <a:ext uri="smNativeData">
-                <pr:smNativeData xmlns:pr="smNativeData" val="SMDATA_13_KVOsYBMAAAAlAAAAZAAAAA8BAAAAkAAAAEgAAACQAAAASAAAAAAAAAABAAAAAAAAAAEAAABQAAAAAAAAAAAA4D8AAAAAAADgPwAAAAAAAOA/AAAAAAAA4D8AAAAAAADgPwAAAAAAAOA/AAAAAAAA4D8AAAAAAADgPwAAAAAAAOA/AAAAAAAA4D8CAAAAjAAAAAAAAAAAAAAAu+DjDP///wgAAAAAAAAAAAAAAAAAAAAAAAAAAAAAAAAAAAAAZAAAAAEAAABAAAAAAAAAAAAAAAAAAAAAAAAAAAAAAAAAAAAAAAAAAAAAAAAAAAAAAAAAAAAAAAAAAAAAAAAAAAAAAAAAAAAAAAAAAAAAAAAAAAAAAAAAAAAAAAAAAAAAFAAAADwAAAAAAAAAAAAAAAAAAAkUAAAAAQAAABQAAAAUAAAAFAAAAAEAAAAAAAAAZAAAAGQAAAAAAAAAZAAAAGQAAAAVAAAAYAAAAAAAAAAAAAAADwAAACADAAAAAAAAAAAAAAEAAACgMgAAVgcAAKr4//8BAAAAf39/AAEAAABkAAAAAAAAABQAAABAHwAAAAAAACYAAAAAAAAAwOD//wAAAAAmAAAAZAAAABYAAABMAAAAAAAAAAAAAAAEAAAAAAAAAAEAAACAgIAKAAAAACgAAAAoAAAAZAAAAGQAAAAAAAAAzMzMAAAAAABQAAAAUAAAAGQAAABkAAAAAAAAABcAAAAUAAAAAAAAAAAAAAD/fwAA/38AAAAAAAAJAAAABAAAAAAAAAAMAAAAEAAAAAAAAAAAAAAAAAAAAAAAAAAeAAAAaAAAAAAAAAAAAAAAAAAAAAAAAAAAAAAAECcAABAnAAAAAAAAAAAAAAAAAAAAAAAAAAAAAAAAAAAAAAAAAAAAABQAAAAAAAAAwMD/AAAAAABkAAAAMgAAAAAAAABkAAAAAAAAAH9/fwAKAAAAHwAAAFQAAAAAAAAFAAAAAQAAAAAAAAAAAAAAAAAAAAAAAAAAAAAAAAAAAAAAAAAAAAAAAn9/fwAAAAADzMzMAMDA/wB/f38AAAAAAAAAAAAAAAAAAAAAAAAAAAAhAAAAGAAAABQAAADQAgAAGycAAPAPAABZKQAAEAAAACYAAAAIAAAAAAAAAAAAAAA="/>
+                <pr:smNativeData xmlns:pr="smNativeData" val="SMDATA_13_NmGsYBMAAAAlAAAAZAAAAA8BAAAAkAAAAEgAAACQAAAASAAAAAAAAAABAAAAAAAAAAEAAABQAAAAAAAAAAAA4D8AAAAAAADgPwAAAAAAAOA/AAAAAAAA4D8AAAAAAADgPwAAAAAAAOA/AAAAAAAA4D8AAAAAAADgPwAAAAAAAOA/AAAAAAAA4D8CAAAAjAAAAAAAAAAAAAAAu+DjDP///wgAAAAAAAAAAAAAAAAAAAAAAAAAAAAAAAAAAAAAZAAAAAEAAABAAAAAAAAAAAAAAAAAAAAAAAAAAAAAAAAAAAAAAAAAAAAAAAAAAAAAAAAAAAAAAAAAAAAAAAAAAAAAAAAAAAAAAAAAAAAAAAAAAAAAAAAAAAAAAAAAAAAAFAAAADwAAAAAAAAAAAAAAAAAAAkUAAAAAQAAABQAAAAUAAAAFAAAAAEAAAAAAAAAZAAAAGQAAAAAAAAAZAAAAGQAAAAVAAAAYAAAAAAAAAAAAAAADwAAACADAAAAAAAAAAAAAAEAAACgMgAAVgcAAKr4//8BAAAAf39/AAEAAABkAAAAAAAAABQAAABAHwAAAAAAACYAAAAAAAAAwOD//wAAAAAmAAAAZAAAABYAAABMAAAAAAAAAAAAAAAEAAAAAAAAAAEAAACAgIAKAAAAACgAAAAoAAAAZAAAAGQAAAAAAAAAzMzMAAAAAABQAAAAUAAAAGQAAABkAAAAAAAAABcAAAAUAAAAAAAAAAAAAAD/fwAA/38AAAAAAAAJAAAABAAAAAAAAAAMAAAAEAAAAAAAAAAAAAAAAAAAAAAAAAAeAAAAaAAAAAAAAAAAAAAAAAAAAAAAAAAAAAAAECcAABAnAAAAAAAAAAAAAAAAAAAAAAAAAAAAAAAAAAAAAAAAAAAAABQAAAAAAAAAwMD/AAAAAABkAAAAMgAAAAAAAABkAAAAAAAAAH9/fwAKAAAAHwAAAFQAAAAAAAAFAAAAAQAAAAAAAAAAAAAAAAAAAAAAAAAAAAAAAAAAAAAAAAAAAAAAAn9/fwAAAAADzMzMAMDA/wB/f38AAAAAAAAAAAAAAAAAAAAAAAAAAAAhAAAAGAAAABQAAADQAgAAGycAAPAPAABZKQAAEAAAACYAAAAIAAAAAAAAAAAAAAA="/>
               </a:ext>
             </a:extLst>
           </p:cNvSpPr>
@@ -733,7 +733,7 @@
           <a:lstStyle/>
           <a:p>
             <a:pPr/>
-            <a:fld id="{3FED5665-2BD2-B8A0-9C55-DDF5181B6A88}" type="datetime1">
+            <a:fld id="{3FD46684-CAD2-8190-9C6C-3CC528226A69}" type="datetime1">
               <a:t/>
             </a:fld>
           </a:p>
@@ -746,7 +746,7 @@
             <a:spLocks noGrp="1" noChangeArrowheads="1"/>
             <a:extLst>
               <a:ext uri="smNativeData">
-                <pr:smNativeData xmlns:pr="smNativeData" val="SMDATA_13_KVOsYBMAAAAlAAAAZAAAAA8BAAAAkAAAAEgAAACQAAAASAAAAAAAAAABAAAAAAAAAAEAAABQAAAAAAAAAAAA4D8AAAAAAADgPwAAAAAAAOA/AAAAAAAA4D8AAAAAAADgPwAAAAAAAOA/AAAAAAAA4D8AAAAAAADgPwAAAAAAAOA/AAAAAAAA4D8CAAAAjAAAAAAAAAAAAAAAu+DjDP///wgAAAAAAAAAAAAAAAAAAAAAAAAAAAAAAAAAAAAAZAAAAAEAAABAAAAAAAAAAAAAAAAAAAAAAAAAAAAAAAAAAAAAAAAAAAAAAAAAAAAAAAAAAAAAAAAAAAAAAAAAAAAAAAAAAAAAAAAAAAAAAAAAAAAAAAAAAAAAAAAAAAAAFAAAADwAAAAAAAAAAAAAAAAAAAkUAAAAAQAAABQAAAAUAAAAFAAAAAEAAAAAAAAAZAAAAGQAAAAAAAAAZAAAAGQAAAAVAAAAYAAAAAAAAAAAAAAADwAAACADAAAAAAAAAAAAAAEAAACgMgAAVgcAAKr4//8BAAAAf39/AAEAAABkAAAAAAAAABQAAABAHwAAAAAAACYAAAAAAAAAwOD//wAAAAAmAAAAZAAAABYAAABMAAAAAAAAAAAAAAAEAAAAAAAAAAEAAACAgIAKAAAAACgAAAAoAAAAZAAAAGQAAAAAAAAAzMzMAAAAAABQAAAAUAAAAGQAAABkAAAAAAAAABcAAAAUAAAAAAAAAAAAAAD/fwAA/38AAAAAAAAJAAAABAAAAIZZAwAMAAAAEAAAAAAAAAAAAAAAAAAAAAAAAAAeAAAAaAAAAAAAAAAAAAAAAAAAAAAAAAAAAAAAECcAABAnAAAAAAAAAAAAAAAAAAAAAAAAAAAAAAAAAAAAAAAAAAAAABQAAAAAAAAAwMD/AAAAAABkAAAAMgAAAAAAAABkAAAAAAAAAH9/fwAKAAAAHwAAAFQAAAAAAAAFAAAAAQAAAAAAAAAAAAAAAAAAAAAAAAAAAAAAAAAAAAAAAAAAAAAAAn9/fwAAAAADzMzMAMDA/wB/f38AAAAAAAAAAAAAAAAAAAAAAAAAAAAhAAAAGAAAABQAAAA4EwAAGycAAAglAABZKQAAEAAAACYAAAAIAAAAAAAAAAAAAAA="/>
+                <pr:smNativeData xmlns:pr="smNativeData" val="SMDATA_13_NmGsYBMAAAAlAAAAZAAAAA8BAAAAkAAAAEgAAACQAAAASAAAAAAAAAABAAAAAAAAAAEAAABQAAAAAAAAAAAA4D8AAAAAAADgPwAAAAAAAOA/AAAAAAAA4D8AAAAAAADgPwAAAAAAAOA/AAAAAAAA4D8AAAAAAADgPwAAAAAAAOA/AAAAAAAA4D8CAAAAjAAAAAAAAAAAAAAAu+DjDP///wgAAAAAAAAAAAAAAAAAAAAAAAAAAAAAAAAAAAAAZAAAAAEAAABAAAAAAAAAAAAAAAAAAAAAAAAAAAAAAAAAAAAAAAAAAAAAAAAAAAAAAAAAAAAAAAAAAAAAAAAAAAAAAAAAAAAAAAAAAAAAAAAAAAAAAAAAAAAAAAAAAAAAFAAAADwAAAAAAAAAAAAAAAAAAAkUAAAAAQAAABQAAAAUAAAAFAAAAAEAAAAAAAAAZAAAAGQAAAAAAAAAZAAAAGQAAAAVAAAAYAAAAAAAAAAAAAAADwAAACADAAAAAAAAAAAAAAEAAACgMgAAVgcAAKr4//8BAAAAf39/AAEAAABkAAAAAAAAABQAAABAHwAAAAAAACYAAAAAAAAAwOD//wAAAAAmAAAAZAAAABYAAABMAAAAAAAAAAAAAAAEAAAAAAAAAAEAAACAgIAKAAAAACgAAAAoAAAAZAAAAGQAAAAAAAAAzMzMAAAAAABQAAAAUAAAAGQAAABkAAAAAAAAABcAAAAUAAAAAAAAAAAAAAD/fwAA/38AAAAAAAAJAAAABAAAAIZZAwAMAAAAEAAAAAAAAAAAAAAAAAAAAAAAAAAeAAAAaAAAAAAAAAAAAAAAAAAAAAAAAAAAAAAAECcAABAnAAAAAAAAAAAAAAAAAAAAAAAAAAAAAAAAAAAAAAAAAAAAABQAAAAAAAAAwMD/AAAAAABkAAAAMgAAAAAAAABkAAAAAAAAAH9/fwAKAAAAHwAAAFQAAAAAAAAFAAAAAQAAAAAAAAAAAAAAAAAAAAAAAAAAAAAAAAAAAAAAAAAAAAAAAn9/fwAAAAADzMzMAMDA/wB/f38AAAAAAAAAAAAAAAAAAAAAAAAAAAAhAAAAGAAAABQAAAA4EwAAGycAAAglAABZKQAAEAAAACYAAAAIAAAAAAAAAAAAAAA="/>
               </a:ext>
             </a:extLst>
           </p:cNvSpPr>
@@ -770,7 +770,7 @@
             <a:spLocks noGrp="1" noChangeArrowheads="1"/>
             <a:extLst>
               <a:ext uri="smNativeData">
-                <pr:smNativeData xmlns:pr="smNativeData" val="SMDATA_13_KVOsYBMAAAAlAAAAZAAAAA8BAAAAkAAAAEgAAACQAAAASAAAAAAAAAABAAAAAAAAAAEAAABQAAAAAAAAAAAA4D8AAAAAAADgPwAAAAAAAOA/AAAAAAAA4D8AAAAAAADgPwAAAAAAAOA/AAAAAAAA4D8AAAAAAADgPwAAAAAAAOA/AAAAAAAA4D8CAAAAjAAAAAAAAAAAAAAAu+DjDP///wgAAAAAAAAAAAAAAAAAAAAAAAAAAAAAAAAAAAAAZAAAAAEAAABAAAAAAAAAAAAAAAAAAAAAAAAAAAAAAAAAAAAAAAAAAAAAAAAAAAAAAAAAAAAAAAAAAAAAAAAAAAAAAAAAAAAAAAAAAAAAAAAAAAAAAAAAAAAAAAAAAAAAFAAAADwAAAAAAAAAAAAAAAAAAAkUAAAAAQAAABQAAAAUAAAAFAAAAAEAAAAAAAAAZAAAAGQAAAAAAAAAZAAAAGQAAAAVAAAAYAAAAAAAAAAAAAAADwAAACADAAAAAAAAAAAAAAEAAACgMgAAVgcAAKr4//8BAAAAf39/AAEAAABkAAAAAAAAABQAAABAHwAAAAAAACYAAAAAAAAAwOD//wAAAAAmAAAAZAAAABYAAABMAAAAAAAAAAAAAAAEAAAAAAAAAAEAAACAgIAKAAAAACgAAAAoAAAAZAAAAGQAAAAAAAAAzMzMAAAAAABQAAAAUAAAAGQAAABkAAAAAAAAABcAAAAUAAAAAAAAAAAAAAD/fwAA/38AAAAAAAAJAAAABAAAAAAAAAAMAAAAEAAAAAAAAAAAAAAAAAAAAAAAAAAeAAAAaAAAAAAAAAAAAAAAAAAAAAAAAAAAAAAAECcAABAnAAAAAAAAAAAAAAAAAAAAAAAAAAAAAAAAAAAAAAAAAAAAABQAAAAAAAAAwMD/AAAAAABkAAAAMgAAAAAAAABkAAAAAAAAAH9/fwAKAAAAHwAAAFQAAAAAAAAFAAAAAQAAAAAAAAAAAAAAAAAAAAAAAAAAAAAAAAAAAAAAAAAAAAAAAn9/fwAAAAADzMzMAMDA/wB/f38AAAAAAAAAAAAAAAAAAAAAAAAAAAAhAAAAGAAAABQAAABQKAAAGycAAHA1AABZKQAAEAAAACYAAAAIAAAAAAAAAAAAAAA="/>
+                <pr:smNativeData xmlns:pr="smNativeData" val="SMDATA_13_NmGsYBMAAAAlAAAAZAAAAA8BAAAAkAAAAEgAAACQAAAASAAAAAAAAAABAAAAAAAAAAEAAABQAAAAAAAAAAAA4D8AAAAAAADgPwAAAAAAAOA/AAAAAAAA4D8AAAAAAADgPwAAAAAAAOA/AAAAAAAA4D8AAAAAAADgPwAAAAAAAOA/AAAAAAAA4D8CAAAAjAAAAAAAAAAAAAAAu+DjDP///wgAAAAAAAAAAAAAAAAAAAAAAAAAAAAAAAAAAAAAZAAAAAEAAABAAAAAAAAAAAAAAAAAAAAAAAAAAAAAAAAAAAAAAAAAAAAAAAAAAAAAAAAAAAAAAAAAAAAAAAAAAAAAAAAAAAAAAAAAAAAAAAAAAAAAAAAAAAAAAAAAAAAAFAAAADwAAAAAAAAAAAAAAAAAAAkUAAAAAQAAABQAAAAUAAAAFAAAAAEAAAAAAAAAZAAAAGQAAAAAAAAAZAAAAGQAAAAVAAAAYAAAAAAAAAAAAAAADwAAACADAAAAAAAAAAAAAAEAAACgMgAAVgcAAKr4//8BAAAAf39/AAEAAABkAAAAAAAAABQAAABAHwAAAAAAACYAAAAAAAAAwOD//wAAAAAmAAAAZAAAABYAAABMAAAAAAAAAAAAAAAEAAAAAAAAAAEAAACAgIAKAAAAACgAAAAoAAAAZAAAAGQAAAAAAAAAzMzMAAAAAABQAAAAUAAAAGQAAABkAAAAAAAAABcAAAAUAAAAAAAAAAAAAAD/fwAA/38AAAAAAAAJAAAABAAAAAAAAAAMAAAAEAAAAAAAAAAAAAAAAAAAAAAAAAAeAAAAaAAAAAAAAAAAAAAAAAAAAAAAAAAAAAAAECcAABAnAAAAAAAAAAAAAAAAAAAAAAAAAAAAAAAAAAAAAAAAAAAAABQAAAAAAAAAwMD/AAAAAABkAAAAMgAAAAAAAABkAAAAAAAAAH9/fwAKAAAAHwAAAFQAAAAAAAAFAAAAAQAAAAAAAAAAAAAAAAAAAAAAAAAAAAAAAAAAAAAAAAAAAAAAAn9/fwAAAAADzMzMAMDA/wB/f38AAAAAAAAAAAAAAAAAAAAAAAAAAAAhAAAAGAAAABQAAABQKAAAGycAAHA1AABZKQAAEAAAACYAAAAIAAAAAAAAAAAAAAA="/>
               </a:ext>
             </a:extLst>
           </p:cNvSpPr>
@@ -784,7 +784,7 @@
           <a:lstStyle/>
           <a:p>
             <a:pPr/>
-            <a:fld id="{3FED09E6-A8D2-B8FF-9C55-5EAA471B6A0B}" type="slidenum">
+            <a:fld id="{3FD410C1-8FD2-81E6-9C6C-79B35E226A2C}" type="slidenum">
               <a:t/>
             </a:fld>
           </a:p>
@@ -822,7 +822,7 @@
             <a:spLocks noGrp="1" noChangeArrowheads="1"/>
             <a:extLst>
               <a:ext uri="smNativeData">
-                <pr:smNativeData xmlns:pr="smNativeData" val="SMDATA_13_KVOsYBMAAAAlAAAAZAAAAA8BAAAAkAAAAEgAAACQAAAASAAAAAAAAAABAAAAAAAAAAEAAABQAAAAAAAAAAAA4D8AAAAAAADgPwAAAAAAAOA/AAAAAAAA4D8AAAAAAADgPwAAAAAAAOA/AAAAAAAA4D8AAAAAAADgPwAAAAAAAOA/AAAAAAAA4D8CAAAAjAAAAAAAAAAAAAAAu+DjDP///wgAAAAAAAAAAAAAAAAAAAAAAAAAAAAAAAAAAAAAZAAAAAEAAABAAAAAAAAAAAAAAAAAAAAAAAAAAAAAAAAAAAAAAAAAAAAAAAAAAAAAAAAAAAAAAAAAAAAAAAAAAAAAAAAAAAAAAAAAAAAAAAAAAAAAAAAAAAAAAAAAAAAAFAAAADwAAAAAAAAAAAAAAAAAAAkUAAAAAQAAABQAAAAUAAAAFAAAAAEAAAAAAAAAZAAAAGQAAAAAAAAAZAAAAGQAAAAVAAAAYAAAAAAAAAAAAAAADwAAACADAAAAAAAAAAAAAAEAAACgMgAAVgcAAKr4//8BAAAAf39/AAEAAABkAAAAAAAAABQAAABAHwAAAAAAACYAAAAAAAAAwOD//wAAAAAmAAAAZAAAABYAAABMAAAAAAAAAAAAAAAEAAAAAAAAAAEAAACAgIAKAAAAACgAAAAoAAAAZAAAAGQAAAAAAAAAzMzMAAAAAABQAAAAUAAAAGQAAABkAAAAAAAAABcAAAAUAAAAAAAAAAAAAAD/fwAA/38AAAAAAAAJAAAABAAAAAAAAAAMAAAAEAAAAAAAAAAAAAAAAAAAAAAAAAAeAAAAaAAAAAAAAAAAAAAAAAAAAAAAAAAAAAAAECcAABAnAAAAAAAAAAAAAAAAAAAAAAAAAAAAAAAAAAAAAAAAAAAAABQAAAAAAAAAwMD/AAAAAABkAAAAMgAAAAAAAABkAAAAAAAAAH9/fwAKAAAAHwAAAFQAAAAAAAAFAAAAAQAAAAAAAAAAAAAAAAAAAAAAAAAAAAAAAAAAAAAAAAAAAAAAAn9/fwAAAAADzMzMAMDA/wB/f38AAAAAAAAAAAAAAAAAAAAAAAAAAAAhAAAAGAAAABQAAADQAgAAsAEAAHA1AAC4CAAAEAAAACYAAAAIAAAAAAAAAAAAAAA="/>
+                <pr:smNativeData xmlns:pr="smNativeData" val="SMDATA_13_NmGsYBMAAAAlAAAAZAAAAA8BAAAAkAAAAEgAAACQAAAASAAAAAAAAAABAAAAAAAAAAEAAABQAAAAAAAAAAAA4D8AAAAAAADgPwAAAAAAAOA/AAAAAAAA4D8AAAAAAADgPwAAAAAAAOA/AAAAAAAA4D8AAAAAAADgPwAAAAAAAOA/AAAAAAAA4D8CAAAAjAAAAAAAAAAAAAAAu+DjDP///wgAAAAAAAAAAAAAAAAAAAAAAAAAAAAAAAAAAAAAZAAAAAEAAABAAAAAAAAAAAAAAAAAAAAAAAAAAAAAAAAAAAAAAAAAAAAAAAAAAAAAAAAAAAAAAAAAAAAAAAAAAAAAAAAAAAAAAAAAAAAAAAAAAAAAAAAAAAAAAAAAAAAAFAAAADwAAAAAAAAAAAAAAAAAAAkUAAAAAQAAABQAAAAUAAAAFAAAAAEAAAAAAAAAZAAAAGQAAAAAAAAAZAAAAGQAAAAVAAAAYAAAAAAAAAAAAAAADwAAACADAAAAAAAAAAAAAAEAAACgMgAAVgcAAKr4//8BAAAAf39/AAEAAABkAAAAAAAAABQAAABAHwAAAAAAACYAAAAAAAAAwOD//wAAAAAmAAAAZAAAABYAAABMAAAAAAAAAAAAAAAEAAAAAAAAAAEAAACAgIAKAAAAACgAAAAoAAAAZAAAAGQAAAAAAAAAzMzMAAAAAABQAAAAUAAAAGQAAABkAAAAAAAAABcAAAAUAAAAAAAAAAAAAAD/fwAA/38AAAAAAAAJAAAABAAAAAAAAAAMAAAAEAAAAAAAAAAAAAAAAAAAAAAAAAAeAAAAaAAAAAAAAAAAAAAAAAAAAAAAAAAAAAAAECcAABAnAAAAAAAAAAAAAAAAAAAAAAAAAAAAAAAAAAAAAAAAAAAAABQAAAAAAAAAwMD/AAAAAABkAAAAMgAAAAAAAABkAAAAAAAAAH9/fwAKAAAAHwAAAFQAAAAAAAAFAAAAAQAAAAAAAAAAAAAAAAAAAAAAAAAAAAAAAAAAAAAAAAAAAAAAAn9/fwAAAAADzMzMAMDA/wB/f38AAAAAAAAAAAAAAAAAAAAAAAAAAAAhAAAAGAAAABQAAADQAgAAsAEAAHA1AAC4CAAAEAAAACYAAAAIAAAAAAAAAAAAAAA="/>
               </a:ext>
             </a:extLst>
           </p:cNvSpPr>
@@ -849,7 +849,7 @@
             <a:spLocks noGrp="1" noChangeArrowheads="1"/>
             <a:extLst>
               <a:ext uri="smNativeData">
-                <pr:smNativeData xmlns:pr="smNativeData" val="SMDATA_13_KVOsYBMAAAAlAAAAZAAAAA8BAAAAkAAAAEgAAACQAAAASAAAAAAAAAAAAAAAAAAAAAEAAABQAAAAAAAAAAAA4D8AAAAAAADgPwAAAAAAAOA/AAAAAAAA4D8AAAAAAADgPwAAAAAAAOA/AAAAAAAA4D8AAAAAAADgPwAAAAAAAOA/AAAAAAAA4D8CAAAAjAAAAAAAAAAAAAAAu+DjDP///wgAAAAAAAAAAAAAAAAAAAAAAAAAAAAAAAAAAAAAZAAAAAEAAABAAAAAAAAAAAAAAAAAAAAAAAAAAAAAAAAAAAAAAAAAAAAAAAAAAAAAAAAAAAAAAAAAAAAAAAAAAAAAAAAAAAAAAAAAAAAAAAAAAAAAAAAAAAAAAAAAAAAAFAAAADwAAAAAAAAAAAAAAAAAAAkUAAAAAQAAABQAAAAUAAAAFAAAAAEAAAAAAAAAZAAAAGQAAAAAAAAAZAAAAGQAAAAVAAAAYAAAAAAAAAAAAAAADwAAACADAAAAAAAAAAAAAAEAAACgMgAAVgcAAKr4//8BAAAAf39/AAEAAABkAAAAAAAAABQAAABAHwAAAAAAACYAAAAAAAAAwOD//wAAAAAmAAAAZAAAABYAAABMAAAAAAAAAAAAAAAEAAAAAAAAAAEAAACAgIAKAAAAACgAAAAoAAAAZAAAAGQAAAAAAAAAzMzMAAAAAABQAAAAUAAAAGQAAABkAAAAAAAAABcAAAAUAAAAAAAAAAAAAAD/fwAA/38AAAAAAAAJAAAABAAAAAAAAAAMAAAAEAAAAAAAAAAAAAAAAAAAAAAAAAAeAAAAaAAAAAAAAAAAAAAAAAAAAAAAAAAAAAAAECcAABAnAAAAAAAAAAAAAAAAAAAAAAAAAAAAAAAAAAAAAAAAAAAAABQAAAAAAAAAwMD/AAAAAABkAAAAMgAAAAAAAABkAAAAAAAAAH9/fwAKAAAAHwAAAFQAAAAAAAAFAAAAAQAAAAAAAAAAAAAAAAAAAAAAAAAAAAAAAAAAAAAAAAAAAAAAAn9/fwAAAAADzMzMAMDA/wB/f38AAAAAAAAAAAAAAAAAAAAAAAAAAAAhAAAAGAAAABQAAADQAgAA2AkAAHA1AACwJQAAEAAAACYAAAAIAAAAAAAAAAAAAAA="/>
+                <pr:smNativeData xmlns:pr="smNativeData" val="SMDATA_13_NmGsYBMAAAAlAAAAZAAAAA8BAAAAkAAAAEgAAACQAAAASAAAAAAAAAAAAAAAAAAAAAEAAABQAAAAAAAAAAAA4D8AAAAAAADgPwAAAAAAAOA/AAAAAAAA4D8AAAAAAADgPwAAAAAAAOA/AAAAAAAA4D8AAAAAAADgPwAAAAAAAOA/AAAAAAAA4D8CAAAAjAAAAAAAAAAAAAAAu+DjDP///wgAAAAAAAAAAAAAAAAAAAAAAAAAAAAAAAAAAAAAZAAAAAEAAABAAAAAAAAAAAAAAAAAAAAAAAAAAAAAAAAAAAAAAAAAAAAAAAAAAAAAAAAAAAAAAAAAAAAAAAAAAAAAAAAAAAAAAAAAAAAAAAAAAAAAAAAAAAAAAAAAAAAAFAAAADwAAAAAAAAAAAAAAAAAAAkUAAAAAQAAABQAAAAUAAAAFAAAAAEAAAAAAAAAZAAAAGQAAAAAAAAAZAAAAGQAAAAVAAAAYAAAAAAAAAAAAAAADwAAACADAAAAAAAAAAAAAAEAAACgMgAAVgcAAKr4//8BAAAAf39/AAEAAABkAAAAAAAAABQAAABAHwAAAAAAACYAAAAAAAAAwOD//wAAAAAmAAAAZAAAABYAAABMAAAAAAAAAAAAAAAEAAAAAAAAAAEAAACAgIAKAAAAACgAAAAoAAAAZAAAAGQAAAAAAAAAzMzMAAAAAABQAAAAUAAAAGQAAABkAAAAAAAAABcAAAAUAAAAAAAAAAAAAAD/fwAA/38AAAAAAAAJAAAABAAAAAAAAAAMAAAAEAAAAAAAAAAAAAAAAAAAAAAAAAAeAAAAaAAAAAAAAAAAAAAAAAAAAAAAAAAAAAAAECcAABAnAAAAAAAAAAAAAAAAAAAAAAAAAAAAAAAAAAAAAAAAAAAAABQAAAAAAAAAwMD/AAAAAABkAAAAMgAAAAAAAABkAAAAAAAAAH9/fwAKAAAAHwAAAFQAAAAAAAAFAAAAAQAAAAAAAAAAAAAAAAAAAAAAAAAAAAAAAAAAAAAAAAAAAAAAAn9/fwAAAAADzMzMAMDA/wB/f38AAAAAAAAAAAAAAAAAAAAAAAAAAAAhAAAAGAAAABQAAADQAgAA2AkAAHA1AACwJQAAEAAAACYAAAAIAAAAAAAAAAAAAAA="/>
               </a:ext>
             </a:extLst>
           </p:cNvSpPr>
@@ -900,7 +900,7 @@
             <a:spLocks noGrp="1" noChangeArrowheads="1"/>
             <a:extLst>
               <a:ext uri="smNativeData">
-                <pr:smNativeData xmlns:pr="smNativeData" val="SMDATA_13_KVOsYBMAAAAlAAAAZAAAAA8BAAAAkAAAAEgAAACQAAAASAAAAAAAAAABAAAAAAAAAAEAAABQAAAAAAAAAAAA4D8AAAAAAADgPwAAAAAAAOA/AAAAAAAA4D8AAAAAAADgPwAAAAAAAOA/AAAAAAAA4D8AAAAAAADgPwAAAAAAAOA/AAAAAAAA4D8CAAAAjAAAAAAAAAAAAAAAu+DjDP///wgAAAAAAAAAAAAAAAAAAAAAAAAAAAAAAAAAAAAAZAAAAAEAAABAAAAAAAAAAAAAAAAAAAAAAAAAAAAAAAAAAAAAAAAAAAAAAAAAAAAAAAAAAAAAAAAAAAAAAAAAAAAAAAAAAAAAAAAAAAAAAAAAAAAAAAAAAAAAAAAAAAAAFAAAADwAAAAAAAAAAAAAAAAAAAkUAAAAAQAAABQAAAAUAAAAFAAAAAEAAAAAAAAAZAAAAGQAAAAAAAAAZAAAAGQAAAAVAAAAYAAAAAAAAAAAAAAADwAAACADAAAAAAAAAAAAAAEAAACgMgAAVgcAAKr4//8BAAAAf39/AAEAAABkAAAAAAAAABQAAABAHwAAAAAAACYAAAAAAAAAwOD//wAAAAAmAAAAZAAAABYAAABMAAAAAAAAAAAAAAAEAAAAAAAAAAEAAACAgIAKAAAAACgAAAAoAAAAZAAAAGQAAAAAAAAAzMzMAAAAAABQAAAAUAAAAGQAAABkAAAAAAAAABcAAAAUAAAAAAAAAAAAAAD/fwAA/38AAAAAAAAJAAAABAAAAHQAIAAMAAAAEAAAAAAAAAAAAAAAAAAAAAAAAAAeAAAAaAAAAAAAAAAAAAAAAAAAAAAAAAAAAAAAECcAABAnAAAAAAAAAAAAAAAAAAAAAAAAAAAAAAAAAAAAAAAAAAAAABQAAAAAAAAAwMD/AAAAAABkAAAAMgAAAAAAAABkAAAAAAAAAH9/fwAKAAAAHwAAAFQAAAAAAAAFAAAAAQAAAAAAAAAAAAAAAAAAAAAAAAAAAAAAAAAAAAAAAAAAAAAAAn9/fwAAAAADzMzMAMDA/wB/f38AAAAAAAAAAAAAAAAAAAAAAAAAAAAhAAAAGAAAABQAAADQAgAAGycAAPAPAABZKQAAEAAAACYAAAAIAAAAAAAAAAAAAAA="/>
+                <pr:smNativeData xmlns:pr="smNativeData" val="SMDATA_13_NmGsYBMAAAAlAAAAZAAAAA8BAAAAkAAAAEgAAACQAAAASAAAAAAAAAABAAAAAAAAAAEAAABQAAAAAAAAAAAA4D8AAAAAAADgPwAAAAAAAOA/AAAAAAAA4D8AAAAAAADgPwAAAAAAAOA/AAAAAAAA4D8AAAAAAADgPwAAAAAAAOA/AAAAAAAA4D8CAAAAjAAAAAAAAAAAAAAAu+DjDP///wgAAAAAAAAAAAAAAAAAAAAAAAAAAAAAAAAAAAAAZAAAAAEAAABAAAAAAAAAAAAAAAAAAAAAAAAAAAAAAAAAAAAAAAAAAAAAAAAAAAAAAAAAAAAAAAAAAAAAAAAAAAAAAAAAAAAAAAAAAAAAAAAAAAAAAAAAAAAAAAAAAAAAFAAAADwAAAAAAAAAAAAAAAAAAAkUAAAAAQAAABQAAAAUAAAAFAAAAAEAAAAAAAAAZAAAAGQAAAAAAAAAZAAAAGQAAAAVAAAAYAAAAAAAAAAAAAAADwAAACADAAAAAAAAAAAAAAEAAACgMgAAVgcAAKr4//8BAAAAf39/AAEAAABkAAAAAAAAABQAAABAHwAAAAAAACYAAAAAAAAAwOD//wAAAAAmAAAAZAAAABYAAABMAAAAAAAAAAAAAAAEAAAAAAAAAAEAAACAgIAKAAAAACgAAAAoAAAAZAAAAGQAAAAAAAAAzMzMAAAAAABQAAAAUAAAAGQAAABkAAAAAAAAABcAAAAUAAAAAAAAAAAAAAD/fwAA/38AAAAAAAAJAAAABAAAAHQAIAAMAAAAEAAAAAAAAAAAAAAAAAAAAAAAAAAeAAAAaAAAAAAAAAAAAAAAAAAAAAAAAAAAAAAAECcAABAnAAAAAAAAAAAAAAAAAAAAAAAAAAAAAAAAAAAAAAAAAAAAABQAAAAAAAAAwMD/AAAAAABkAAAAMgAAAAAAAABkAAAAAAAAAH9/fwAKAAAAHwAAAFQAAAAAAAAFAAAAAQAAAAAAAAAAAAAAAAAAAAAAAAAAAAAAAAAAAAAAAAAAAAAAAn9/fwAAAAADzMzMAMDA/wB/f38AAAAAAAAAAAAAAAAAAAAAAAAAAAAhAAAAGAAAABQAAADQAgAAGycAAPAPAABZKQAAEAAAACYAAAAIAAAAAAAAAAAAAAA="/>
               </a:ext>
             </a:extLst>
           </p:cNvSpPr>
@@ -914,7 +914,7 @@
           <a:lstStyle/>
           <a:p>
             <a:pPr/>
-            <a:fld id="{3FED64CC-82D2-B892-9C55-74C72A1B6A21}" type="datetime1">
+            <a:fld id="{3FD41AE3-ADD2-81EC-9C6C-5BB954226A0E}" type="datetime1">
               <a:t/>
             </a:fld>
           </a:p>
@@ -927,7 +927,7 @@
             <a:spLocks noGrp="1" noChangeArrowheads="1"/>
             <a:extLst>
               <a:ext uri="smNativeData">
-                <pr:smNativeData xmlns:pr="smNativeData" val="SMDATA_13_KVOsYBMAAAAlAAAAZAAAAA8BAAAAkAAAAEgAAACQAAAASAAAAAAAAAABAAAAAAAAAAEAAABQAAAAAAAAAAAA4D8AAAAAAADgPwAAAAAAAOA/AAAAAAAA4D8AAAAAAADgPwAAAAAAAOA/AAAAAAAA4D8AAAAAAADgPwAAAAAAAOA/AAAAAAAA4D8CAAAAjAAAAAAAAAAAAAAAu+DjDP///wgAAAAAAAAAAAAAAAAAAAAAAAAAAAAAAAAAAAAAZAAAAAEAAABAAAAAAAAAAAAAAAAAAAAAAAAAAAAAAAAAAAAAAAAAAAAAAAAAAAAAAAAAAAAAAAAAAAAAAAAAAAAAAAAAAAAAAAAAAAAAAAAAAAAAAAAAAAAAAAAAAAAAFAAAADwAAAAAAAAAAAAAAAAAAAkUAAAAAQAAABQAAAAUAAAAFAAAAAEAAAAAAAAAZAAAAGQAAAAAAAAAZAAAAGQAAAAVAAAAYAAAAAAAAAAAAAAADwAAACADAAAAAAAAAAAAAAEAAACgMgAAVgcAAKr4//8BAAAAf39/AAEAAABkAAAAAAAAABQAAABAHwAAAAAAACYAAAAAAAAAwOD//wAAAAAmAAAAZAAAABYAAABMAAAAAAAAAAAAAAAEAAAAAAAAAAEAAACAgIAKAAAAACgAAAAoAAAAZAAAAGQAAAAAAAAAzMzMAAAAAABQAAAAUAAAAGQAAABkAAAAAAAAABcAAAAUAAAAAAAAAAAAAAD/fwAA/38AAAAAAAAJAAAABAAAAAAAAAAMAAAAEAAAAAAAAAAAAAAAAAAAAAAAAAAeAAAAaAAAAAAAAAAAAAAAAAAAAAAAAAAAAAAAECcAABAnAAAAAAAAAAAAAAAAAAAAAAAAAAAAAAAAAAAAAAAAAAAAABQAAAAAAAAAwMD/AAAAAABkAAAAMgAAAAAAAABkAAAAAAAAAH9/fwAKAAAAHwAAAFQAAAAAAAAFAAAAAQAAAAAAAAAAAAAAAAAAAAAAAAAAAAAAAAAAAAAAAAAAAAAAAn9/fwAAAAADzMzMAMDA/wB/f38AAAAAAAAAAAAAAAAAAAAAAAAAAAAhAAAAGAAAABQAAAA4EwAAGycAAAglAABZKQAAEAAAACYAAAAIAAAAAAAAAAAAAAA="/>
+                <pr:smNativeData xmlns:pr="smNativeData" val="SMDATA_13_NmGsYBMAAAAlAAAAZAAAAA8BAAAAkAAAAEgAAACQAAAASAAAAAAAAAABAAAAAAAAAAEAAABQAAAAAAAAAAAA4D8AAAAAAADgPwAAAAAAAOA/AAAAAAAA4D8AAAAAAADgPwAAAAAAAOA/AAAAAAAA4D8AAAAAAADgPwAAAAAAAOA/AAAAAAAA4D8CAAAAjAAAAAAAAAAAAAAAu+DjDP///wgAAAAAAAAAAAAAAAAAAAAAAAAAAAAAAAAAAAAAZAAAAAEAAABAAAAAAAAAAAAAAAAAAAAAAAAAAAAAAAAAAAAAAAAAAAAAAAAAAAAAAAAAAAAAAAAAAAAAAAAAAAAAAAAAAAAAAAAAAAAAAAAAAAAAAAAAAAAAAAAAAAAAFAAAADwAAAAAAAAAAAAAAAAAAAkUAAAAAQAAABQAAAAUAAAAFAAAAAEAAAAAAAAAZAAAAGQAAAAAAAAAZAAAAGQAAAAVAAAAYAAAAAAAAAAAAAAADwAAACADAAAAAAAAAAAAAAEAAACgMgAAVgcAAKr4//8BAAAAf39/AAEAAABkAAAAAAAAABQAAABAHwAAAAAAACYAAAAAAAAAwOD//wAAAAAmAAAAZAAAABYAAABMAAAAAAAAAAAAAAAEAAAAAAAAAAEAAACAgIAKAAAAACgAAAAoAAAAZAAAAGQAAAAAAAAAzMzMAAAAAABQAAAAUAAAAGQAAABkAAAAAAAAABcAAAAUAAAAAAAAAAAAAAD/fwAA/38AAAAAAAAJAAAABAAAAAAAAAAMAAAAEAAAAAAAAAAAAAAAAAAAAAAAAAAeAAAAaAAAAAAAAAAAAAAAAAAAAAAAAAAAAAAAECcAABAnAAAAAAAAAAAAAAAAAAAAAAAAAAAAAAAAAAAAAAAAAAAAABQAAAAAAAAAwMD/AAAAAABkAAAAMgAAAAAAAABkAAAAAAAAAH9/fwAKAAAAHwAAAFQAAAAAAAAFAAAAAQAAAAAAAAAAAAAAAAAAAAAAAAAAAAAAAAAAAAAAAAAAAAAAAn9/fwAAAAADzMzMAMDA/wB/f38AAAAAAAAAAAAAAAAAAAAAAAAAAAAhAAAAGAAAABQAAAA4EwAAGycAAAglAABZKQAAEAAAACYAAAAIAAAAAAAAAAAAAAA="/>
               </a:ext>
             </a:extLst>
           </p:cNvSpPr>
@@ -951,7 +951,7 @@
             <a:spLocks noGrp="1" noChangeArrowheads="1"/>
             <a:extLst>
               <a:ext uri="smNativeData">
-                <pr:smNativeData xmlns:pr="smNativeData" val="SMDATA_13_KVOsYBMAAAAlAAAAZAAAAA8BAAAAkAAAAEgAAACQAAAASAAAAAAAAAABAAAAAAAAAAEAAABQAAAAAAAAAAAA4D8AAAAAAADgPwAAAAAAAOA/AAAAAAAA4D8AAAAAAADgPwAAAAAAAOA/AAAAAAAA4D8AAAAAAADgPwAAAAAAAOA/AAAAAAAA4D8CAAAAjAAAAAAAAAAAAAAAu+DjDP///wgAAAAAAAAAAAAAAAAAAAAAAAAAAAAAAAAAAAAAZAAAAAEAAABAAAAAAAAAAAAAAAAAAAAAAAAAAAAAAAAAAAAAAAAAAAAAAAAAAAAAAAAAAAAAAAAAAAAAAAAAAAAAAAAAAAAAAAAAAAAAAAAAAAAAAAAAAAAAAAAAAAAAFAAAADwAAAAAAAAAAAAAAAAAAAkUAAAAAQAAABQAAAAUAAAAFAAAAAEAAAAAAAAAZAAAAGQAAAAAAAAAZAAAAGQAAAAVAAAAYAAAAAAAAAAAAAAADwAAACADAAAAAAAAAAAAAAEAAACgMgAAVgcAAKr4//8BAAAAf39/AAEAAABkAAAAAAAAABQAAABAHwAAAAAAACYAAAAAAAAAwOD//wAAAAAmAAAAZAAAABYAAABMAAAAAAAAAAAAAAAEAAAAAAAAAAEAAACAgIAKAAAAACgAAAAoAAAAZAAAAGQAAAAAAAAAzMzMAAAAAABQAAAAUAAAAGQAAABkAAAAAAAAABcAAAAUAAAAAAAAAAAAAAD/fwAA/38AAAAAAAAJAAAABAAAAAAAAAAMAAAAEAAAAAAAAAAAAAAAAAAAAAAAAAAeAAAAaAAAAAAAAAAAAAAAAAAAAAAAAAAAAAAAECcAABAnAAAAAAAAAAAAAAAAAAAAAAAAAAAAAAAAAAAAAAAAAAAAABQAAAAAAAAAwMD/AAAAAABkAAAAMgAAAAAAAABkAAAAAAAAAH9/fwAKAAAAHwAAAFQAAAAAAAAFAAAAAQAAAAAAAAAAAAAAAAAAAAAAAAAAAAAAAAAAAAAAAAAAAAAAAn9/fwAAAAADzMzMAMDA/wB/f38AAAAAAAAAAAAAAAAAAAAAAAAAAAAhAAAAGAAAABQAAABQKAAAGycAAHA1AABZKQAAEAAAACYAAAAIAAAAAAAAAAAAAAA="/>
+                <pr:smNativeData xmlns:pr="smNativeData" val="SMDATA_13_NmGsYBMAAAAlAAAAZAAAAA8BAAAAkAAAAEgAAACQAAAASAAAAAAAAAABAAAAAAAAAAEAAABQAAAAAAAAAAAA4D8AAAAAAADgPwAAAAAAAOA/AAAAAAAA4D8AAAAAAADgPwAAAAAAAOA/AAAAAAAA4D8AAAAAAADgPwAAAAAAAOA/AAAAAAAA4D8CAAAAjAAAAAAAAAAAAAAAu+DjDP///wgAAAAAAAAAAAAAAAAAAAAAAAAAAAAAAAAAAAAAZAAAAAEAAABAAAAAAAAAAAAAAAAAAAAAAAAAAAAAAAAAAAAAAAAAAAAAAAAAAAAAAAAAAAAAAAAAAAAAAAAAAAAAAAAAAAAAAAAAAAAAAAAAAAAAAAAAAAAAAAAAAAAAFAAAADwAAAAAAAAAAAAAAAAAAAkUAAAAAQAAABQAAAAUAAAAFAAAAAEAAAAAAAAAZAAAAGQAAAAAAAAAZAAAAGQAAAAVAAAAYAAAAAAAAAAAAAAADwAAACADAAAAAAAAAAAAAAEAAACgMgAAVgcAAKr4//8BAAAAf39/AAEAAABkAAAAAAAAABQAAABAHwAAAAAAACYAAAAAAAAAwOD//wAAAAAmAAAAZAAAABYAAABMAAAAAAAAAAAAAAAEAAAAAAAAAAEAAACAgIAKAAAAACgAAAAoAAAAZAAAAGQAAAAAAAAAzMzMAAAAAABQAAAAUAAAAGQAAABkAAAAAAAAABcAAAAUAAAAAAAAAAAAAAD/fwAA/38AAAAAAAAJAAAABAAAAAAAAAAMAAAAEAAAAAAAAAAAAAAAAAAAAAAAAAAeAAAAaAAAAAAAAAAAAAAAAAAAAAAAAAAAAAAAECcAABAnAAAAAAAAAAAAAAAAAAAAAAAAAAAAAAAAAAAAAAAAAAAAABQAAAAAAAAAwMD/AAAAAABkAAAAMgAAAAAAAABkAAAAAAAAAH9/fwAKAAAAHwAAAFQAAAAAAAAFAAAAAQAAAAAAAAAAAAAAAAAAAAAAAAAAAAAAAAAAAAAAAAAAAAAAAn9/fwAAAAADzMzMAMDA/wB/f38AAAAAAAAAAAAAAAAAAAAAAAAAAAAhAAAAGAAAABQAAABQKAAAGycAAHA1AABZKQAAEAAAACYAAAAIAAAAAAAAAAAAAAA="/>
               </a:ext>
             </a:extLst>
           </p:cNvSpPr>
@@ -965,7 +965,7 @@
           <a:lstStyle/>
           <a:p>
             <a:pPr/>
-            <a:fld id="{3FED3311-5FD2-B8C5-9C55-A9907D1B6AFC}" type="slidenum">
+            <a:fld id="{3FD446CB-85D2-81B0-9C6C-73E508226A26}" type="slidenum">
               <a:t/>
             </a:fld>
           </a:p>
@@ -1003,7 +1003,7 @@
             <a:spLocks noGrp="1" noChangeArrowheads="1"/>
             <a:extLst>
               <a:ext uri="smNativeData">
-                <pr:smNativeData xmlns:pr="smNativeData" val="SMDATA_13_KVOsYBMAAAAlAAAAZAAAAA8BAAAAkAAAAEgAAACQAAAASAAAAAAAAAAAAAAAAAAAAAEAAABQAAAAAAAAAAAA4D8AAAAAAADgPwAAAAAAAOA/AAAAAAAA4D8AAAAAAADgPwAAAAAAAOA/AAAAAAAA4D8AAAAAAADgPwAAAAAAAOA/AAAAAAAA4D8CAAAAjAAAAAAAAAAAAAAAu+DjDP///wgAAAAAAAAAAAAAAAAAAAAAAAAAAAAAAAAAAAAAZAAAAAEAAABAAAAAAAAAAAAAAAAAAAAAAAAAAAAAAAAAAAAAAAAAAAAAAAAAAAAAAAAAAAAAAAAAAAAAAAAAAAAAAAAAAAAAAAAAAAAAAAAAAAAAAAAAAAAAAAAAAAAAFAAAADwAAAAAAAAAAAAAAAAAAAkUAAAAAQAAABQAAAAUAAAAFAAAAAEAAAAAAAAAZAAAAGQAAAAAAAAAZAAAAGQAAAAVAAAAYAAAAAAAAAAAAAAADwAAACADAAAAAAAAAAAAAAEAAACgMgAAVgcAAKr4//8BAAAAf39/AAEAAABkAAAAAAAAABQAAABAHwAAAAAAACYAAAAAAAAAwOD//wAAAAAmAAAAZAAAABYAAABMAAAAAAAAAAAAAAAEAAAAAAAAAAEAAACAgIAKAAAAACgAAAAoAAAAZAAAAGQAAAAAAAAAzMzMAAAAAABQAAAAUAAAAGQAAABkAAAAAAAAABcAAAAUAAAAAAAAAAAAAAD/fwAA/38AAAAAAAAJAAAABAAAAAAAAAAMAAAAEAAAAAAAAAAAAAAAAAAAAAAAAAAeAAAAaAAAAAAAAAAAAAAAAAAAAAAAAAAAAAAAECcAABAnAAAAAAAAAAAAAAAAAAAAAAAAAAAAAAAAAAAAAAAAAAAAABQAAAAAAAAAwMD/AAAAAABkAAAAMgAAAAAAAABkAAAAAAAAAH9/fwAKAAAAHwAAAFQAAAAAAAAFAAAAAQAAAAAAAAAAAAAAAAAAAAAAAAAAAAAAAAAAAAAAAAAAAAAAAn9/fwAAAAADzMzMAMDA/wB/f38AAAAAAAAAAAAAAAAAAAAAAAAAAAAhAAAAGAAAABQAAAByBAAAHBsAAEI0AAB9IwAAEAAAACYAAAAIAAAAgYAAAAAAAAA="/>
+                <pr:smNativeData xmlns:pr="smNativeData" val="SMDATA_13_NmGsYBMAAAAlAAAAZAAAAA8BAAAAkAAAAEgAAACQAAAASAAAAAAAAAAAAAAAAAAAAAEAAABQAAAAAAAAAAAA4D8AAAAAAADgPwAAAAAAAOA/AAAAAAAA4D8AAAAAAADgPwAAAAAAAOA/AAAAAAAA4D8AAAAAAADgPwAAAAAAAOA/AAAAAAAA4D8CAAAAjAAAAAAAAAAAAAAAu+DjDP///wgAAAAAAAAAAAAAAAAAAAAAAAAAAAAAAAAAAAAAZAAAAAEAAABAAAAAAAAAAAAAAAAAAAAAAAAAAAAAAAAAAAAAAAAAAAAAAAAAAAAAAAAAAAAAAAAAAAAAAAAAAAAAAAAAAAAAAAAAAAAAAAAAAAAAAAAAAAAAAAAAAAAAFAAAADwAAAAAAAAAAAAAAAAAAAkUAAAAAQAAABQAAAAUAAAAFAAAAAEAAAAAAAAAZAAAAGQAAAAAAAAAZAAAAGQAAAAVAAAAYAAAAAAAAAAAAAAADwAAACADAAAAAAAAAAAAAAEAAACgMgAAVgcAAKr4//8BAAAAf39/AAEAAABkAAAAAAAAABQAAABAHwAAAAAAACYAAAAAAAAAwOD//wAAAAAmAAAAZAAAABYAAABMAAAAAAAAAAAAAAAEAAAAAAAAAAEAAACAgIAKAAAAACgAAAAoAAAAZAAAAGQAAAAAAAAAzMzMAAAAAABQAAAAUAAAAGQAAABkAAAAAAAAABcAAAAUAAAAAAAAAAAAAAD/fwAA/38AAAAAAAAJAAAABAAAAAAAAAAMAAAAEAAAAAAAAAAAAAAAAAAAAAAAAAAeAAAAaAAAAAAAAAAAAAAAAAAAAAAAAAAAAAAAECcAABAnAAAAAAAAAAAAAAAAAAAAAAAAAAAAAAAAAAAAAAAAAAAAABQAAAAAAAAAwMD/AAAAAABkAAAAMgAAAAAAAABkAAAAAAAAAH9/fwAKAAAAHwAAAFQAAAAAAAAFAAAAAQAAAAAAAAAAAAAAAAAAAAAAAAAAAAAAAAAAAAAAAAAAAAAAAn9/fwAAAAADzMzMAMDA/wB/f38AAAAAAAAAAAAAAAAAAAAAAAAAAAAhAAAAGAAAABQAAAByBAAAHBsAAEI0AAB9IwAAEAAAACYAAAAIAAAAgYAAAAAAAAA="/>
               </a:ext>
             </a:extLst>
           </p:cNvSpPr>
@@ -1045,7 +1045,7 @@
             <a:spLocks noGrp="1" noChangeArrowheads="1"/>
             <a:extLst>
               <a:ext uri="smNativeData">
-                <pr:smNativeData xmlns:pr="smNativeData" val="SMDATA_13_KVOsYBMAAAAlAAAAZAAAAA8BAAAAkAAAAEgAAACQAAAASAAAAAAAAAACAAAAAAAAAAEAAABQAAAAAAAAAAAA4D8AAAAAAADgPwAAAAAAAOA/AAAAAAAA4D8AAAAAAADgPwAAAAAAAOA/AAAAAAAA4D8AAAAAAADgPwAAAAAAAOA/AAAAAAAA4D8CAAAAjAAAAAAAAAAAAAAAu+DjDP///wgAAAAAAAAAAAAAAAAAAAAAAAAAAAAAAAAAAAAAZAAAAAEAAABAAAAAAAAAAAAAAAAAAAAAAAAAAAAAAAAAAAAAAAAAAAAAAAAAAAAAAAAAAAAAAAAAAAAAAAAAAAAAAAAAAAAAAAAAAAAAAAAAAAAAAAAAAAAAAAAAAAAAFAAAADwAAAAAAAAAAAAAAAAAAAkUAAAAAQAAABQAAAAUAAAAFAAAAAEAAAAAAAAAZAAAAGQAAAAAAAAAZAAAAGQAAAAVAAAAYAAAAAAAAAAAAAAADwAAACADAAAAAAAAAAAAAAEAAACgMgAAVgcAAKr4//8BAAAAf39/AAEAAABkAAAAAAAAABQAAABAHwAAAAAAACYAAAAAAAAAwOD//wAAAAAmAAAAZAAAABYAAABMAAAAAAAAAAAAAAAEAAAAAAAAAAEAAACAgIAKAAAAACgAAAAoAAAAZAAAAGQAAAAAAAAAzMzMAAAAAABQAAAAUAAAAGQAAABkAAAAAAAAABcAAAAUAAAAAAAAAAAAAAD/fwAA/38AAAAAAAAJAAAABAAAAAAAAAAMAAAAEAAAAAAAAAAAAAAAAAAAAAAAAAAeAAAAaAAAAAAAAAAAAAAAAAAAAAAAAAAAAAAAECcAABAnAAAAAAAAAAAAAAAAAAAAAAAAAAAAAAAAAAAAAAAAAAAAABQAAAAAAAAAwMD/AAAAAABkAAAAMgAAAAAAAABkAAAAAAAAAH9/fwAKAAAAHwAAAFQAAAAAAAAFAAAAAQAAAAAAAAAAAAAAAAAAAAAAAAAAAAAAAAAAAAAAAAAAAAAAAn9/fwAAAAADzMzMAMDA/wB/f38AAAAAAAAAAAAAAAAAAAAAAAAAAAAhAAAAGAAAABQAAAByBAAA4REAAEI0AAAcGwAAEAAAACYAAAAIAAAAgYAAAAAAAAA="/>
+                <pr:smNativeData xmlns:pr="smNativeData" val="SMDATA_13_NmGsYBMAAAAlAAAAZAAAAA8BAAAAkAAAAEgAAACQAAAASAAAAAAAAAACAAAAAAAAAAEAAABQAAAAAAAAAAAA4D8AAAAAAADgPwAAAAAAAOA/AAAAAAAA4D8AAAAAAADgPwAAAAAAAOA/AAAAAAAA4D8AAAAAAADgPwAAAAAAAOA/AAAAAAAA4D8CAAAAjAAAAAAAAAAAAAAAu+DjDP///wgAAAAAAAAAAAAAAAAAAAAAAAAAAAAAAAAAAAAAZAAAAAEAAABAAAAAAAAAAAAAAAAAAAAAAAAAAAAAAAAAAAAAAAAAAAAAAAAAAAAAAAAAAAAAAAAAAAAAAAAAAAAAAAAAAAAAAAAAAAAAAAAAAAAAAAAAAAAAAAAAAAAAFAAAADwAAAAAAAAAAAAAAAAAAAkUAAAAAQAAABQAAAAUAAAAFAAAAAEAAAAAAAAAZAAAAGQAAAAAAAAAZAAAAGQAAAAVAAAAYAAAAAAAAAAAAAAADwAAACADAAAAAAAAAAAAAAEAAACgMgAAVgcAAKr4//8BAAAAf39/AAEAAABkAAAAAAAAABQAAABAHwAAAAAAACYAAAAAAAAAwOD//wAAAAAmAAAAZAAAABYAAABMAAAAAAAAAAAAAAAEAAAAAAAAAAEAAACAgIAKAAAAACgAAAAoAAAAZAAAAGQAAAAAAAAAzMzMAAAAAABQAAAAUAAAAGQAAABkAAAAAAAAABcAAAAUAAAAAAAAAAAAAAD/fwAA/38AAAAAAAAJAAAABAAAAAAAAAAMAAAAEAAAAAAAAAAAAAAAAAAAAAAAAAAeAAAAaAAAAAAAAAAAAAAAAAAAAAAAAAAAAAAAECcAABAnAAAAAAAAAAAAAAAAAAAAAAAAAAAAAAAAAAAAAAAAAAAAABQAAAAAAAAAwMD/AAAAAABkAAAAMgAAAAAAAABkAAAAAAAAAH9/fwAKAAAAHwAAAFQAAAAAAAAFAAAAAQAAAAAAAAAAAAAAAAAAAAAAAAAAAAAAAAAAAAAAAAAAAAAAAn9/fwAAAAADzMzMAMDA/wB/f38AAAAAAAAAAAAAAAAAAAAAAAAAAAAhAAAAGAAAABQAAAByBAAA4REAAEI0AAAcGwAAEAAAACYAAAAIAAAAgYAAAAAAAAA="/>
               </a:ext>
             </a:extLst>
           </p:cNvSpPr>
@@ -1118,7 +1118,7 @@
             <a:spLocks noGrp="1" noChangeArrowheads="1"/>
             <a:extLst>
               <a:ext uri="smNativeData">
-                <pr:smNativeData xmlns:pr="smNativeData" val="SMDATA_13_KVOsYBMAAAAlAAAAZAAAAA8BAAAAkAAAAEgAAACQAAAASAAAAAAAAAABAAAAAAAAAAEAAABQAAAAAAAAAAAA4D8AAAAAAADgPwAAAAAAAOA/AAAAAAAA4D8AAAAAAADgPwAAAAAAAOA/AAAAAAAA4D8AAAAAAADgPwAAAAAAAOA/AAAAAAAA4D8CAAAAjAAAAAAAAAAAAAAAu+DjDP///wgAAAAAAAAAAAAAAAAAAAAAAAAAAAAAAAAAAAAAZAAAAAEAAABAAAAAAAAAAAAAAAAAAAAAAAAAAAAAAAAAAAAAAAAAAAAAAAAAAAAAAAAAAAAAAAAAAAAAAAAAAAAAAAAAAAAAAAAAAAAAAAAAAAAAAAAAAAAAAAAAAAAAFAAAADwAAAAAAAAAAAAAAAAAAAkUAAAAAQAAABQAAAAUAAAAFAAAAAEAAAAAAAAAZAAAAGQAAAAAAAAAZAAAAGQAAAAVAAAAYAAAAAAAAAAAAAAADwAAACADAAAAAAAAAAAAAAEAAACgMgAAVgcAAKr4//8BAAAAf39/AAEAAABkAAAAAAAAABQAAABAHwAAAAAAACYAAAAAAAAAwOD//wAAAAAmAAAAZAAAABYAAABMAAAAAAAAAAAAAAAEAAAAAAAAAAEAAACAgIAKAAAAACgAAAAoAAAAZAAAAGQAAAAAAAAAzMzMAAAAAABQAAAAUAAAAGQAAABkAAAAAAAAABcAAAAUAAAAAAAAAAAAAAD/fwAA/38AAAAAAAAJAAAABAAAAAAAAAAMAAAAEAAAAAAAAAAAAAAAAAAAAAAAAAAeAAAAaAAAAAAAAAAAAAAAAAAAAAAAAAAAAAAAECcAABAnAAAAAAAAAAAAAAAAAAAAAAAAAAAAAAAAAAAAAAAAAAAAABQAAAAAAAAAwMD/AAAAAABkAAAAMgAAAAAAAABkAAAAAAAAAH9/fwAKAAAAHwAAAFQAAAAAAAAFAAAAAQAAAAAAAAAAAAAAAAAAAAAAAAAAAAAAAAAAAAAAAAAAAAAAAn9/fwAAAAADzMzMAMDA/wB/f38AAAAAAAAAAAAAAAAAAAAAAAAAAAAhAAAAGAAAABQAAADQAgAAGycAAPAPAABZKQAAEAAAACYAAAAIAAAAAAAAAAAAAAA="/>
+                <pr:smNativeData xmlns:pr="smNativeData" val="SMDATA_13_NmGsYBMAAAAlAAAAZAAAAA8BAAAAkAAAAEgAAACQAAAASAAAAAAAAAABAAAAAAAAAAEAAABQAAAAAAAAAAAA4D8AAAAAAADgPwAAAAAAAOA/AAAAAAAA4D8AAAAAAADgPwAAAAAAAOA/AAAAAAAA4D8AAAAAAADgPwAAAAAAAOA/AAAAAAAA4D8CAAAAjAAAAAAAAAAAAAAAu+DjDP///wgAAAAAAAAAAAAAAAAAAAAAAAAAAAAAAAAAAAAAZAAAAAEAAABAAAAAAAAAAAAAAAAAAAAAAAAAAAAAAAAAAAAAAAAAAAAAAAAAAAAAAAAAAAAAAAAAAAAAAAAAAAAAAAAAAAAAAAAAAAAAAAAAAAAAAAAAAAAAAAAAAAAAFAAAADwAAAAAAAAAAAAAAAAAAAkUAAAAAQAAABQAAAAUAAAAFAAAAAEAAAAAAAAAZAAAAGQAAAAAAAAAZAAAAGQAAAAVAAAAYAAAAAAAAAAAAAAADwAAACADAAAAAAAAAAAAAAEAAACgMgAAVgcAAKr4//8BAAAAf39/AAEAAABkAAAAAAAAABQAAABAHwAAAAAAACYAAAAAAAAAwOD//wAAAAAmAAAAZAAAABYAAABMAAAAAAAAAAAAAAAEAAAAAAAAAAEAAACAgIAKAAAAACgAAAAoAAAAZAAAAGQAAAAAAAAAzMzMAAAAAABQAAAAUAAAAGQAAABkAAAAAAAAABcAAAAUAAAAAAAAAAAAAAD/fwAA/38AAAAAAAAJAAAABAAAAAAAAAAMAAAAEAAAAAAAAAAAAAAAAAAAAAAAAAAeAAAAaAAAAAAAAAAAAAAAAAAAAAAAAAAAAAAAECcAABAnAAAAAAAAAAAAAAAAAAAAAAAAAAAAAAAAAAAAAAAAAAAAABQAAAAAAAAAwMD/AAAAAABkAAAAMgAAAAAAAABkAAAAAAAAAH9/fwAKAAAAHwAAAFQAAAAAAAAFAAAAAQAAAAAAAAAAAAAAAAAAAAAAAAAAAAAAAAAAAAAAAAAAAAAAAn9/fwAAAAADzMzMAMDA/wB/f38AAAAAAAAAAAAAAAAAAAAAAAAAAAAhAAAAGAAAABQAAADQAgAAGycAAPAPAABZKQAAEAAAACYAAAAIAAAAAAAAAAAAAAA="/>
               </a:ext>
             </a:extLst>
           </p:cNvSpPr>
@@ -1132,7 +1132,7 @@
           <a:lstStyle/>
           <a:p>
             <a:pPr/>
-            <a:fld id="{3FED0B9C-D2D2-B8FD-9C55-24A8451B6A71}" type="datetime1">
+            <a:fld id="{3FD4667B-35D2-8190-9C6C-C3C528226A96}" type="datetime1">
               <a:t/>
             </a:fld>
           </a:p>
@@ -1145,7 +1145,7 @@
             <a:spLocks noGrp="1" noChangeArrowheads="1"/>
             <a:extLst>
               <a:ext uri="smNativeData">
-                <pr:smNativeData xmlns:pr="smNativeData" val="SMDATA_13_KVOsYBMAAAAlAAAAZAAAAA8BAAAAkAAAAEgAAACQAAAASAAAAAAAAAABAAAAAAAAAAEAAABQAAAAAAAAAAAA4D8AAAAAAADgPwAAAAAAAOA/AAAAAAAA4D8AAAAAAADgPwAAAAAAAOA/AAAAAAAA4D8AAAAAAADgPwAAAAAAAOA/AAAAAAAA4D8CAAAAjAAAAAAAAAAAAAAAu+DjDP///wgAAAAAAAAAAAAAAAAAAAAAAAAAAAAAAAAAAAAAZAAAAAEAAABAAAAAAAAAAAAAAAAAAAAAAAAAAAAAAAAAAAAAAAAAAAAAAAAAAAAAAAAAAAAAAAAAAAAAAAAAAAAAAAAAAAAAAAAAAAAAAAAAAAAAAAAAAAAAAAAAAAAAFAAAADwAAAAAAAAAAAAAAAAAAAkUAAAAAQAAABQAAAAUAAAAFAAAAAEAAAAAAAAAZAAAAGQAAAAAAAAAZAAAAGQAAAAVAAAAYAAAAAAAAAAAAAAADwAAACADAAAAAAAAAAAAAAEAAACgMgAAVgcAAKr4//8BAAAAf39/AAEAAABkAAAAAAAAABQAAABAHwAAAAAAACYAAAAAAAAAwOD//wAAAAAmAAAAZAAAABYAAABMAAAAAAAAAAAAAAAEAAAAAAAAAAEAAACAgIAKAAAAACgAAAAoAAAAZAAAAGQAAAAAAAAAzMzMAAAAAABQAAAAUAAAAGQAAABkAAAAAAAAABcAAAAUAAAAAAAAAAAAAAD/fwAA/38AAAAAAAAJAAAABAAAAGKZAwAMAAAAEAAAAAAAAAAAAAAAAAAAAAAAAAAeAAAAaAAAAAAAAAAAAAAAAAAAAAAAAAAAAAAAECcAABAnAAAAAAAAAAAAAAAAAAAAAAAAAAAAAAAAAAAAAAAAAAAAABQAAAAAAAAAwMD/AAAAAABkAAAAMgAAAAAAAABkAAAAAAAAAH9/fwAKAAAAHwAAAFQAAAAAAAAFAAAAAQAAAAAAAAAAAAAAAAAAAAAAAAAAAAAAAAAAAAAAAAAAAAAAAn9/fwAAAAADzMzMAMDA/wB/f38AAAAAAAAAAAAAAAAAAAAAAAAAAAAhAAAAGAAAABQAAAA4EwAAGycAAAglAABZKQAAEAAAACYAAAAIAAAAAAAAAAAAAAA="/>
+                <pr:smNativeData xmlns:pr="smNativeData" val="SMDATA_13_NmGsYBMAAAAlAAAAZAAAAA8BAAAAkAAAAEgAAACQAAAASAAAAAAAAAABAAAAAAAAAAEAAABQAAAAAAAAAAAA4D8AAAAAAADgPwAAAAAAAOA/AAAAAAAA4D8AAAAAAADgPwAAAAAAAOA/AAAAAAAA4D8AAAAAAADgPwAAAAAAAOA/AAAAAAAA4D8CAAAAjAAAAAAAAAAAAAAAu+DjDP///wgAAAAAAAAAAAAAAAAAAAAAAAAAAAAAAAAAAAAAZAAAAAEAAABAAAAAAAAAAAAAAAAAAAAAAAAAAAAAAAAAAAAAAAAAAAAAAAAAAAAAAAAAAAAAAAAAAAAAAAAAAAAAAAAAAAAAAAAAAAAAAAAAAAAAAAAAAAAAAAAAAAAAFAAAADwAAAAAAAAAAAAAAAAAAAkUAAAAAQAAABQAAAAUAAAAFAAAAAEAAAAAAAAAZAAAAGQAAAAAAAAAZAAAAGQAAAAVAAAAYAAAAAAAAAAAAAAADwAAACADAAAAAAAAAAAAAAEAAACgMgAAVgcAAKr4//8BAAAAf39/AAEAAABkAAAAAAAAABQAAABAHwAAAAAAACYAAAAAAAAAwOD//wAAAAAmAAAAZAAAABYAAABMAAAAAAAAAAAAAAAEAAAAAAAAAAEAAACAgIAKAAAAACgAAAAoAAAAZAAAAGQAAAAAAAAAzMzMAAAAAABQAAAAUAAAAGQAAABkAAAAAAAAABcAAAAUAAAAAAAAAAAAAAD/fwAA/38AAAAAAAAJAAAABAAAAGKZAwAMAAAAEAAAAAAAAAAAAAAAAAAAAAAAAAAeAAAAaAAAAAAAAAAAAAAAAAAAAAAAAAAAAAAAECcAABAnAAAAAAAAAAAAAAAAAAAAAAAAAAAAAAAAAAAAAAAAAAAAABQAAAAAAAAAwMD/AAAAAABkAAAAMgAAAAAAAABkAAAAAAAAAH9/fwAKAAAAHwAAAFQAAAAAAAAFAAAAAQAAAAAAAAAAAAAAAAAAAAAAAAAAAAAAAAAAAAAAAAAAAAAAAn9/fwAAAAADzMzMAMDA/wB/f38AAAAAAAAAAAAAAAAAAAAAAAAAAAAhAAAAGAAAABQAAAA4EwAAGycAAAglAABZKQAAEAAAACYAAAAIAAAAAAAAAAAAAAA="/>
               </a:ext>
             </a:extLst>
           </p:cNvSpPr>
@@ -1169,7 +1169,7 @@
             <a:spLocks noGrp="1" noChangeArrowheads="1"/>
             <a:extLst>
               <a:ext uri="smNativeData">
-                <pr:smNativeData xmlns:pr="smNativeData" val="SMDATA_13_KVOsYBMAAAAlAAAAZAAAAA8BAAAAkAAAAEgAAACQAAAASAAAAAAAAAABAAAAAAAAAAEAAABQAAAAAAAAAAAA4D8AAAAAAADgPwAAAAAAAOA/AAAAAAAA4D8AAAAAAADgPwAAAAAAAOA/AAAAAAAA4D8AAAAAAADgPwAAAAAAAOA/AAAAAAAA4D8CAAAAjAAAAAAAAAAAAAAAu+DjDP///wgAAAAAAAAAAAAAAAAAAAAAAAAAAAAAAAAAAAAAZAAAAAEAAABAAAAAAAAAAAAAAAAAAAAAAAAAAAAAAAAAAAAAAAAAAAAAAAAAAAAAAAAAAAAAAAAAAAAAAAAAAAAAAAAAAAAAAAAAAAAAAAAAAAAAAAAAAAAAAAAAAAAAFAAAADwAAAAAAAAAAAAAAAAAAAkUAAAAAQAAABQAAAAUAAAAFAAAAAEAAAAAAAAAZAAAAGQAAAAAAAAAZAAAAGQAAAAVAAAAYAAAAAAAAAAAAAAADwAAACADAAAAAAAAAAAAAAEAAACgMgAAVgcAAKr4//8BAAAAf39/AAEAAABkAAAAAAAAABQAAABAHwAAAAAAACYAAAAAAAAAwOD//wAAAAAmAAAAZAAAABYAAABMAAAAAAAAAAAAAAAEAAAAAAAAAAEAAACAgIAKAAAAACgAAAAoAAAAZAAAAGQAAAAAAAAAzMzMAAAAAABQAAAAUAAAAGQAAABkAAAAAAAAABcAAAAUAAAAAAAAAAAAAAD/fwAA/38AAAAAAAAJAAAABAAAAAMAhj4MAAAAEAAAAAAAAAAAAAAAAAAAAAAAAAAeAAAAaAAAAAAAAAAAAAAAAAAAAAAAAAAAAAAAECcAABAnAAAAAAAAAAAAAAAAAAAAAAAAAAAAAAAAAAAAAAAAAAAAABQAAAAAAAAAwMD/AAAAAABkAAAAMgAAAAAAAABkAAAAAAAAAH9/fwAKAAAAHwAAAFQAAAAAAAAFAAAAAQAAAAAAAAAAAAAAAAAAAAAAAAAAAAAAAAAAAAAAAAAAAAAAAn9/fwAAAAADzMzMAMDA/wB/f38AAAAAAAAAAAAAAAAAAAAAAAAAAAAhAAAAGAAAABQAAABQKAAAGycAAHA1AABZKQAAEAAAACYAAAAIAAAAAAAAAAAAAAA="/>
+                <pr:smNativeData xmlns:pr="smNativeData" val="SMDATA_13_NmGsYBMAAAAlAAAAZAAAAA8BAAAAkAAAAEgAAACQAAAASAAAAAAAAAABAAAAAAAAAAEAAABQAAAAAAAAAAAA4D8AAAAAAADgPwAAAAAAAOA/AAAAAAAA4D8AAAAAAADgPwAAAAAAAOA/AAAAAAAA4D8AAAAAAADgPwAAAAAAAOA/AAAAAAAA4D8CAAAAjAAAAAAAAAAAAAAAu+DjDP///wgAAAAAAAAAAAAAAAAAAAAAAAAAAAAAAAAAAAAAZAAAAAEAAABAAAAAAAAAAAAAAAAAAAAAAAAAAAAAAAAAAAAAAAAAAAAAAAAAAAAAAAAAAAAAAAAAAAAAAAAAAAAAAAAAAAAAAAAAAAAAAAAAAAAAAAAAAAAAAAAAAAAAFAAAADwAAAAAAAAAAAAAAAAAAAkUAAAAAQAAABQAAAAUAAAAFAAAAAEAAAAAAAAAZAAAAGQAAAAAAAAAZAAAAGQAAAAVAAAAYAAAAAAAAAAAAAAADwAAACADAAAAAAAAAAAAAAEAAACgMgAAVgcAAKr4//8BAAAAf39/AAEAAABkAAAAAAAAABQAAABAHwAAAAAAACYAAAAAAAAAwOD//wAAAAAmAAAAZAAAABYAAABMAAAAAAAAAAAAAAAEAAAAAAAAAAEAAACAgIAKAAAAACgAAAAoAAAAZAAAAGQAAAAAAAAAzMzMAAAAAABQAAAAUAAAAGQAAABkAAAAAAAAABcAAAAUAAAAAAAAAAAAAAD/fwAA/38AAAAAAAAJAAAABAAAAAMAhj4MAAAAEAAAAAAAAAAAAAAAAAAAAAAAAAAeAAAAaAAAAAAAAAAAAAAAAAAAAAAAAAAAAAAAECcAABAnAAAAAAAAAAAAAAAAAAAAAAAAAAAAAAAAAAAAAAAAAAAAABQAAAAAAAAAwMD/AAAAAABkAAAAMgAAAAAAAABkAAAAAAAAAH9/fwAKAAAAHwAAAFQAAAAAAAAFAAAAAQAAAAAAAAAAAAAAAAAAAAAAAAAAAAAAAAAAAAAAAAAAAAAAAn9/fwAAAAADzMzMAMDA/wB/f38AAAAAAAAAAAAAAAAAAAAAAAAAAAAhAAAAGAAAABQAAABQKAAAGycAAHA1AABZKQAAEAAAACYAAAAIAAAAAAAAAAAAAAA="/>
               </a:ext>
             </a:extLst>
           </p:cNvSpPr>
@@ -1183,7 +1183,7 @@
           <a:lstStyle/>
           <a:p>
             <a:pPr/>
-            <a:fld id="{3FED1CB8-F6D2-B8EA-9C55-00BF521B6A55}" type="slidenum">
+            <a:fld id="{3FD456E2-ACD2-81A0-9C6C-5AF518226A0F}" type="slidenum">
               <a:t/>
             </a:fld>
           </a:p>
@@ -1221,7 +1221,7 @@
             <a:spLocks noGrp="1" noChangeArrowheads="1"/>
             <a:extLst>
               <a:ext uri="smNativeData">
-                <pr:smNativeData xmlns:pr="smNativeData" val="SMDATA_13_KVOsYBMAAAAlAAAAZAAAAA8BAAAAkAAAAEgAAACQAAAASAAAAAAAAAABAAAAAAAAAAEAAABQAAAAAAAAAAAA4D8AAAAAAADgPwAAAAAAAOA/AAAAAAAA4D8AAAAAAADgPwAAAAAAAOA/AAAAAAAA4D8AAAAAAADgPwAAAAAAAOA/AAAAAAAA4D8CAAAAjAAAAAAAAAAAAAAAu+DjDP///wgAAAAAAAAAAAAAAAAAAAAAAAAAAAAAAAAAAAAAZAAAAAEAAABAAAAAAAAAAAAAAAAAAAAAAAAAAAAAAAAAAAAAAAAAAAAAAAAAAAAAAAAAAAAAAAAAAAAAAAAAAAAAAAAAAAAAAAAAAAAAAAAAAAAAAAAAAAAAAAAAAAAAFAAAADwAAAAAAAAAAAAAAAAAAAkUAAAAAQAAABQAAAAUAAAAFAAAAAEAAAAAAAAAZAAAAGQAAAAAAAAAZAAAAGQAAAAVAAAAYAAAAAAAAAAAAAAADwAAACADAAAAAAAAAAAAAAEAAACgMgAAVgcAAKr4//8BAAAAf39/AAEAAABkAAAAAAAAABQAAABAHwAAAAAAACYAAAAAAAAAwOD//wAAAAAmAAAAZAAAABYAAABMAAAAAAAAAAAAAAAEAAAAAAAAAAEAAACAgIAKAAAAACgAAAAoAAAAZAAAAGQAAAAAAAAAzMzMAAAAAABQAAAAUAAAAGQAAABkAAAAAAAAABcAAAAUAAAAAAAAAAAAAAD/fwAA/38AAAAAAAAJAAAABAAAAPBCT4sMAAAAEAAAAAAAAAAAAAAAAAAAAAAAAAAeAAAAaAAAAAAAAAAAAAAAAAAAAAAAAAAAAAAAECcAABAnAAAAAAAAAAAAAAAAAAAAAAAAAAAAAAAAAAAAAAAAAAAAABQAAAAAAAAAwMD/AAAAAABkAAAAMgAAAAAAAABkAAAAAAAAAH9/fwAKAAAAHwAAAFQAAAAAAAAFAAAAAQAAAAAAAAAAAAAAAAAAAAAAAAAAAAAAAAAAAAAAAAAAAAAAAn9/fwAAAAADzMzMAMDA/wB/f38AAAAAAAAAAAAAAAAAAAAAAAAAAAAhAAAAGAAAABQAAADQAgAAsAEAAHA1AAC4CAAAEAAAACYAAAAIAAAAAAAAAAAAAAA="/>
+                <pr:smNativeData xmlns:pr="smNativeData" val="SMDATA_13_NmGsYBMAAAAlAAAAZAAAAA8BAAAAkAAAAEgAAACQAAAASAAAAAAAAAABAAAAAAAAAAEAAABQAAAAAAAAAAAA4D8AAAAAAADgPwAAAAAAAOA/AAAAAAAA4D8AAAAAAADgPwAAAAAAAOA/AAAAAAAA4D8AAAAAAADgPwAAAAAAAOA/AAAAAAAA4D8CAAAAjAAAAAAAAAAAAAAAu+DjDP///wgAAAAAAAAAAAAAAAAAAAAAAAAAAAAAAAAAAAAAZAAAAAEAAABAAAAAAAAAAAAAAAAAAAAAAAAAAAAAAAAAAAAAAAAAAAAAAAAAAAAAAAAAAAAAAAAAAAAAAAAAAAAAAAAAAAAAAAAAAAAAAAAAAAAAAAAAAAAAAAAAAAAAFAAAADwAAAAAAAAAAAAAAAAAAAkUAAAAAQAAABQAAAAUAAAAFAAAAAEAAAAAAAAAZAAAAGQAAAAAAAAAZAAAAGQAAAAVAAAAYAAAAAAAAAAAAAAADwAAACADAAAAAAAAAAAAAAEAAACgMgAAVgcAAKr4//8BAAAAf39/AAEAAABkAAAAAAAAABQAAABAHwAAAAAAACYAAAAAAAAAwOD//wAAAAAmAAAAZAAAABYAAABMAAAAAAAAAAAAAAAEAAAAAAAAAAEAAACAgIAKAAAAACgAAAAoAAAAZAAAAGQAAAAAAAAAzMzMAAAAAABQAAAAUAAAAGQAAABkAAAAAAAAABcAAAAUAAAAAAAAAAAAAAD/fwAA/38AAAAAAAAJAAAABAAAAPBCT4sMAAAAEAAAAAAAAAAAAAAAAAAAAAAAAAAeAAAAaAAAAAAAAAAAAAAAAAAAAAAAAAAAAAAAECcAABAnAAAAAAAAAAAAAAAAAAAAAAAAAAAAAAAAAAAAAAAAAAAAABQAAAAAAAAAwMD/AAAAAABkAAAAMgAAAAAAAABkAAAAAAAAAH9/fwAKAAAAHwAAAFQAAAAAAAAFAAAAAQAAAAAAAAAAAAAAAAAAAAAAAAAAAAAAAAAAAAAAAAAAAAAAAn9/fwAAAAADzMzMAMDA/wB/f38AAAAAAAAAAAAAAAAAAAAAAAAAAAAhAAAAGAAAABQAAADQAgAAsAEAAHA1AAC4CAAAEAAAACYAAAAIAAAAAAAAAAAAAAA="/>
               </a:ext>
             </a:extLst>
           </p:cNvSpPr>
@@ -1248,7 +1248,7 @@
             <a:spLocks noGrp="1" noChangeArrowheads="1"/>
             <a:extLst>
               <a:ext uri="smNativeData">
-                <pr:smNativeData xmlns:pr="smNativeData" val="SMDATA_13_KVOsYBMAAAAlAAAAZAAAAA8BAAAAkAAAAEgAAACQAAAASAAAAAAAAAAAAAAAAAAAAAEAAABQAAAAAAAAAAAA4D8AAAAAAADgPwAAAAAAAOA/AAAAAAAA4D8AAAAAAADgPwAAAAAAAOA/AAAAAAAA4D8AAAAAAADgPwAAAAAAAOA/AAAAAAAA4D8CAAAAjAAAAAAAAAAAAAAAu+DjDP///wgAAAAAAAAAAAAAAAAAAAAAAAAAAAAAAAAAAAAAZAAAAAEAAABAAAAAAAAAAAAAAAAAAAAAAAAAAAAAAAAAAAAAAAAAAAAAAAAAAAAAAAAAAAAAAAAAAAAAAAAAAAAAAAAAAAAAAAAAAAAAAAAAAAAAAAAAAAAAAAAAAAAAFAAAADwAAAAAAAAAAAAAAAAAAAkUAAAAAQAAABQAAAAUAAAAFAAAAAEAAAAAAAAAZAAAAGQAAAAAAAAAZAAAAGQAAAAVAAAAYAAAAAAAAAAAAAAADwAAACADAAAAAAAAAAAAAAEAAACgMgAAVgcAAKr4//8BAAAAf39/AAEAAABkAAAAAAAAABQAAABAHwAAAAAAACYAAAAAAAAAwOD//wAAAAAmAAAAZAAAABYAAABMAAAAAAAAAAAAAAAEAAAAAAAAAAEAAACAgIAKAAAAACgAAAAoAAAAZAAAAGQAAAAAAAAAzMzMAAAAAABQAAAAUAAAAGQAAABkAAAAAAAAABcAAAAUAAAAAAAAAAAAAAD/fwAA/38AAAAAAAAJAAAABAAAAOJ+AwAMAAAAEAAAAAAAAAAAAAAAAAAAAAAAAAAeAAAAaAAAAAAAAAAAAAAAAAAAAAAAAAAAAAAAECcAABAnAAAAAAAAAAAAAAAAAAAAAAAAAAAAAAAAAAAAAAAAAAAAABQAAAAAAAAAwMD/AAAAAABkAAAAMgAAAAAAAABkAAAAAAAAAH9/fwAKAAAAHwAAAFQAAAAAAAAFAAAAAQAAAAAAAAAAAAAAAAAAAAAAAAAAAAAAAAAAAAAAAAAAAAAAAn9/fwAAAAADzMzMAMDA/wB/f38AAAAAAAAAAAAAAAAAAAAAAAAAAAAhAAAAGAAAABQAAADQAgAA2AkAAKgbAACwJQAAEAAAACYAAAAIAAAAAYAAAAAAAAA="/>
+                <pr:smNativeData xmlns:pr="smNativeData" val="SMDATA_13_NmGsYBMAAAAlAAAAZAAAAA8BAAAAkAAAAEgAAACQAAAASAAAAAAAAAAAAAAAAAAAAAEAAABQAAAAAAAAAAAA4D8AAAAAAADgPwAAAAAAAOA/AAAAAAAA4D8AAAAAAADgPwAAAAAAAOA/AAAAAAAA4D8AAAAAAADgPwAAAAAAAOA/AAAAAAAA4D8CAAAAjAAAAAAAAAAAAAAAu+DjDP///wgAAAAAAAAAAAAAAAAAAAAAAAAAAAAAAAAAAAAAZAAAAAEAAABAAAAAAAAAAAAAAAAAAAAAAAAAAAAAAAAAAAAAAAAAAAAAAAAAAAAAAAAAAAAAAAAAAAAAAAAAAAAAAAAAAAAAAAAAAAAAAAAAAAAAAAAAAAAAAAAAAAAAFAAAADwAAAAAAAAAAAAAAAAAAAkUAAAAAQAAABQAAAAUAAAAFAAAAAEAAAAAAAAAZAAAAGQAAAAAAAAAZAAAAGQAAAAVAAAAYAAAAAAAAAAAAAAADwAAACADAAAAAAAAAAAAAAEAAACgMgAAVgcAAKr4//8BAAAAf39/AAEAAABkAAAAAAAAABQAAABAHwAAAAAAACYAAAAAAAAAwOD//wAAAAAmAAAAZAAAABYAAABMAAAAAAAAAAAAAAAEAAAAAAAAAAEAAACAgIAKAAAAACgAAAAoAAAAZAAAAGQAAAAAAAAAzMzMAAAAAABQAAAAUAAAAGQAAABkAAAAAAAAABcAAAAUAAAAAAAAAAAAAAD/fwAA/38AAAAAAAAJAAAABAAAAOJ+AwAMAAAAEAAAAAAAAAAAAAAAAAAAAAAAAAAeAAAAaAAAAAAAAAAAAAAAAAAAAAAAAAAAAAAAECcAABAnAAAAAAAAAAAAAAAAAAAAAAAAAAAAAAAAAAAAAAAAAAAAABQAAAAAAAAAwMD/AAAAAABkAAAAMgAAAAAAAABkAAAAAAAAAH9/fwAKAAAAHwAAAFQAAAAAAAAFAAAAAQAAAAAAAAAAAAAAAAAAAAAAAAAAAAAAAAAAAAAAAAAAAAAAAn9/fwAAAAADzMzMAMDA/wB/f38AAAAAAAAAAAAAAAAAAAAAAAAAAAAhAAAAGAAAABQAAADQAgAA2AkAAKgbAACwJQAAEAAAACYAAAAIAAAAAYAAAAAAAAA="/>
               </a:ext>
             </a:extLst>
           </p:cNvSpPr>
@@ -1332,7 +1332,7 @@
             <a:spLocks noGrp="1" noChangeArrowheads="1"/>
             <a:extLst>
               <a:ext uri="smNativeData">
-                <pr:smNativeData xmlns:pr="smNativeData" val="SMDATA_13_KVOsYBMAAAAlAAAAZAAAAA8BAAAAkAAAAEgAAACQAAAASAAAAAAAAAAAAAAAAAAAAAEAAABQAAAAAAAAAAAA4D8AAAAAAADgPwAAAAAAAOA/AAAAAAAA4D8AAAAAAADgPwAAAAAAAOA/AAAAAAAA4D8AAAAAAADgPwAAAAAAAOA/AAAAAAAA4D8CAAAAjAAAAAAAAAAAAAAAu+DjDP///wgAAAAAAAAAAAAAAAAAAAAAAAAAAAAAAAAAAAAAZAAAAAEAAABAAAAAAAAAAAAAAAAAAAAAAAAAAAAAAAAAAAAAAAAAAAAAAAAAAAAAAAAAAAAAAAAAAAAAAAAAAAAAAAAAAAAAAAAAAAAAAAAAAAAAAAAAAAAAAAAAAAAAFAAAADwAAAAAAAAAAAAAAAAAAAkUAAAAAQAAABQAAAAUAAAAFAAAAAEAAAAAAAAAZAAAAGQAAAAAAAAAZAAAAGQAAAAVAAAAYAAAAAAAAAAAAAAADwAAACADAAAAAAAAAAAAAAEAAACgMgAAVgcAAKr4//8BAAAAf39/AAEAAABkAAAAAAAAABQAAABAHwAAAAAAACYAAAAAAAAAwOD//wAAAAAmAAAAZAAAABYAAABMAAAAAAAAAAAAAAAEAAAAAAAAAAEAAACAgIAKAAAAACgAAAAoAAAAZAAAAGQAAAAAAAAAzMzMAAAAAABQAAAAUAAAAGQAAABkAAAAAAAAABcAAAAUAAAAAAAAAAAAAAD/fwAA/38AAAAAAAAJAAAABAAAAAMAbkEMAAAAEAAAAAAAAAAAAAAAAAAAAAAAAAAeAAAAaAAAAAAAAAAAAAAAAAAAAAAAAAAAAAAAECcAABAnAAAAAAAAAAAAAAAAAAAAAAAAAAAAAAAAAAAAAAAAAAAAABQAAAAAAAAAwMD/AAAAAABkAAAAMgAAAAAAAABkAAAAAAAAAH9/fwAKAAAAHwAAAFQAAAAAAAAFAAAAAQAAAAAAAAAAAAAAAAAAAAAAAAAAAAAAAAAAAAAAAAAAAAAAAn9/fwAAAAADzMzMAMDA/wB/f38AAAAAAAAAAAAAAAAAAAAAAAAAAAAhAAAAGAAAABQAAACYHAAA2AkAAHA1AACwJQAAEAAAACYAAAAIAAAAAYAAAAAAAAA="/>
+                <pr:smNativeData xmlns:pr="smNativeData" val="SMDATA_13_NmGsYBMAAAAlAAAAZAAAAA8BAAAAkAAAAEgAAACQAAAASAAAAAAAAAAAAAAAAAAAAAEAAABQAAAAAAAAAAAA4D8AAAAAAADgPwAAAAAAAOA/AAAAAAAA4D8AAAAAAADgPwAAAAAAAOA/AAAAAAAA4D8AAAAAAADgPwAAAAAAAOA/AAAAAAAA4D8CAAAAjAAAAAAAAAAAAAAAu+DjDP///wgAAAAAAAAAAAAAAAAAAAAAAAAAAAAAAAAAAAAAZAAAAAEAAABAAAAAAAAAAAAAAAAAAAAAAAAAAAAAAAAAAAAAAAAAAAAAAAAAAAAAAAAAAAAAAAAAAAAAAAAAAAAAAAAAAAAAAAAAAAAAAAAAAAAAAAAAAAAAAAAAAAAAFAAAADwAAAAAAAAAAAAAAAAAAAkUAAAAAQAAABQAAAAUAAAAFAAAAAEAAAAAAAAAZAAAAGQAAAAAAAAAZAAAAGQAAAAVAAAAYAAAAAAAAAAAAAAADwAAACADAAAAAAAAAAAAAAEAAACgMgAAVgcAAKr4//8BAAAAf39/AAEAAABkAAAAAAAAABQAAABAHwAAAAAAACYAAAAAAAAAwOD//wAAAAAmAAAAZAAAABYAAABMAAAAAAAAAAAAAAAEAAAAAAAAAAEAAACAgIAKAAAAACgAAAAoAAAAZAAAAGQAAAAAAAAAzMzMAAAAAABQAAAAUAAAAGQAAABkAAAAAAAAABcAAAAUAAAAAAAAAAAAAAD/fwAA/38AAAAAAAAJAAAABAAAAAMAbkEMAAAAEAAAAAAAAAAAAAAAAAAAAAAAAAAeAAAAaAAAAAAAAAAAAAAAAAAAAAAAAAAAAAAAECcAABAnAAAAAAAAAAAAAAAAAAAAAAAAAAAAAAAAAAAAAAAAAAAAABQAAAAAAAAAwMD/AAAAAABkAAAAMgAAAAAAAABkAAAAAAAAAH9/fwAKAAAAHwAAAFQAAAAAAAAFAAAAAQAAAAAAAAAAAAAAAAAAAAAAAAAAAAAAAAAAAAAAAAAAAAAAAn9/fwAAAAADzMzMAMDA/wB/f38AAAAAAAAAAAAAAAAAAAAAAAAAAAAhAAAAGAAAABQAAACYHAAA2AkAAHA1AACwJQAAEAAAACYAAAAIAAAAAYAAAAAAAAA="/>
               </a:ext>
             </a:extLst>
           </p:cNvSpPr>
@@ -1416,7 +1416,7 @@
             <a:spLocks noGrp="1" noChangeArrowheads="1"/>
             <a:extLst>
               <a:ext uri="smNativeData">
-                <pr:smNativeData xmlns:pr="smNativeData" val="SMDATA_13_KVOsYBMAAAAlAAAAZAAAAA8BAAAAkAAAAEgAAACQAAAASAAAAAAAAAABAAAAAAAAAAEAAABQAAAAAAAAAAAA4D8AAAAAAADgPwAAAAAAAOA/AAAAAAAA4D8AAAAAAADgPwAAAAAAAOA/AAAAAAAA4D8AAAAAAADgPwAAAAAAAOA/AAAAAAAA4D8CAAAAjAAAAAAAAAAAAAAAu+DjDP///wgAAAAAAAAAAAAAAAAAAAAAAAAAAAAAAAAAAAAAZAAAAAEAAABAAAAAAAAAAAAAAAAAAAAAAAAAAAAAAAAAAAAAAAAAAAAAAAAAAAAAAAAAAAAAAAAAAAAAAAAAAAAAAAAAAAAAAAAAAAAAAAAAAAAAAAAAAAAAAAAAAAAAFAAAADwAAAAAAAAAAAAAAAAAAAkUAAAAAQAAABQAAAAUAAAAFAAAAAEAAAAAAAAAZAAAAGQAAAAAAAAAZAAAAGQAAAAVAAAAYAAAAAAAAAAAAAAADwAAACADAAAAAAAAAAAAAAEAAACgMgAAVgcAAKr4//8BAAAAf39/AAEAAABkAAAAAAAAABQAAABAHwAAAAAAACYAAAAAAAAAwOD//wAAAAAmAAAAZAAAABYAAABMAAAAAAAAAAAAAAAEAAAAAAAAAAEAAACAgIAKAAAAACgAAAAoAAAAZAAAAGQAAAAAAAAAzMzMAAAAAABQAAAAUAAAAGQAAABkAAAAAAAAABcAAAAUAAAAAAAAAAAAAAD/fwAA/38AAAAAAAAJAAAABAAAAB5eAwAMAAAAEAAAAAAAAAAAAAAAAAAAAAAAAAAeAAAAaAAAAAAAAAAAAAAAAAAAAAAAAAAAAAAAECcAABAnAAAAAAAAAAAAAAAAAAAAAAAAAAAAAAAAAAAAAAAAAAAAABQAAAAAAAAAwMD/AAAAAABkAAAAMgAAAAAAAABkAAAAAAAAAH9/fwAKAAAAHwAAAFQAAAAAAAAFAAAAAQAAAAAAAAAAAAAAAAAAAAAAAAAAAAAAAAAAAAAAAAAAAAAAAn9/fwAAAAADzMzMAMDA/wB/f38AAAAAAAAAAAAAAAAAAAAAAAAAAAAhAAAAGAAAABQAAADQAgAAGycAAPAPAABZKQAAEAAAACYAAAAIAAAAAAAAAAAAAAA="/>
+                <pr:smNativeData xmlns:pr="smNativeData" val="SMDATA_13_NmGsYBMAAAAlAAAAZAAAAA8BAAAAkAAAAEgAAACQAAAASAAAAAAAAAABAAAAAAAAAAEAAABQAAAAAAAAAAAA4D8AAAAAAADgPwAAAAAAAOA/AAAAAAAA4D8AAAAAAADgPwAAAAAAAOA/AAAAAAAA4D8AAAAAAADgPwAAAAAAAOA/AAAAAAAA4D8CAAAAjAAAAAAAAAAAAAAAu+DjDP///wgAAAAAAAAAAAAAAAAAAAAAAAAAAAAAAAAAAAAAZAAAAAEAAABAAAAAAAAAAAAAAAAAAAAAAAAAAAAAAAAAAAAAAAAAAAAAAAAAAAAAAAAAAAAAAAAAAAAAAAAAAAAAAAAAAAAAAAAAAAAAAAAAAAAAAAAAAAAAAAAAAAAAFAAAADwAAAAAAAAAAAAAAAAAAAkUAAAAAQAAABQAAAAUAAAAFAAAAAEAAAAAAAAAZAAAAGQAAAAAAAAAZAAAAGQAAAAVAAAAYAAAAAAAAAAAAAAADwAAACADAAAAAAAAAAAAAAEAAACgMgAAVgcAAKr4//8BAAAAf39/AAEAAABkAAAAAAAAABQAAABAHwAAAAAAACYAAAAAAAAAwOD//wAAAAAmAAAAZAAAABYAAABMAAAAAAAAAAAAAAAEAAAAAAAAAAEAAACAgIAKAAAAACgAAAAoAAAAZAAAAGQAAAAAAAAAzMzMAAAAAABQAAAAUAAAAGQAAABkAAAAAAAAABcAAAAUAAAAAAAAAAAAAAD/fwAA/38AAAAAAAAJAAAABAAAAB5eAwAMAAAAEAAAAAAAAAAAAAAAAAAAAAAAAAAeAAAAaAAAAAAAAAAAAAAAAAAAAAAAAAAAAAAAECcAABAnAAAAAAAAAAAAAAAAAAAAAAAAAAAAAAAAAAAAAAAAAAAAABQAAAAAAAAAwMD/AAAAAABkAAAAMgAAAAAAAABkAAAAAAAAAH9/fwAKAAAAHwAAAFQAAAAAAAAFAAAAAQAAAAAAAAAAAAAAAAAAAAAAAAAAAAAAAAAAAAAAAAAAAAAAAn9/fwAAAAADzMzMAMDA/wB/f38AAAAAAAAAAAAAAAAAAAAAAAAAAAAhAAAAGAAAABQAAADQAgAAGycAAPAPAABZKQAAEAAAACYAAAAIAAAAAAAAAAAAAAA="/>
               </a:ext>
             </a:extLst>
           </p:cNvSpPr>
@@ -1430,7 +1430,7 @@
           <a:lstStyle/>
           <a:p>
             <a:pPr/>
-            <a:fld id="{3FED66B7-F9D2-B890-9C55-0FC5281B6A5A}" type="datetime1">
+            <a:fld id="{3FD404EC-A2D2-81F2-9C6C-54A74A226A01}" type="datetime1">
               <a:t/>
             </a:fld>
           </a:p>
@@ -1443,7 +1443,7 @@
             <a:spLocks noGrp="1" noChangeArrowheads="1"/>
             <a:extLst>
               <a:ext uri="smNativeData">
-                <pr:smNativeData xmlns:pr="smNativeData" val="SMDATA_13_KVOsYBMAAAAlAAAAZAAAAA8BAAAAkAAAAEgAAACQAAAASAAAAAAAAAABAAAAAAAAAAEAAABQAAAAAAAAAAAA4D8AAAAAAADgPwAAAAAAAOA/AAAAAAAA4D8AAAAAAADgPwAAAAAAAOA/AAAAAAAA4D8AAAAAAADgPwAAAAAAAOA/AAAAAAAA4D8CAAAAjAAAAAAAAAAAAAAAu+DjDP///wgAAAAAAAAAAAAAAAAAAAAAAAAAAAAAAAAAAAAAZAAAAAEAAABAAAAAAAAAAAAAAAAAAAAAAAAAAAAAAAAAAAAAAAAAAAAAAAAAAAAAAAAAAAAAAAAAAAAAAAAAAAAAAAAAAAAAAAAAAAAAAAAAAAAAAAAAAAAAAAAAAAAAFAAAADwAAAAAAAAAAAAAAAAAAAkUAAAAAQAAABQAAAAUAAAAFAAAAAEAAAAAAAAAZAAAAGQAAAAAAAAAZAAAAGQAAAAVAAAAYAAAAAAAAAAAAAAADwAAACADAAAAAAAAAAAAAAEAAACgMgAAVgcAAKr4//8BAAAAf39/AAEAAABkAAAAAAAAABQAAABAHwAAAAAAACYAAAAAAAAAwOD//wAAAAAmAAAAZAAAABYAAABMAAAAAAAAAAAAAAAEAAAAAAAAAAEAAACAgIAKAAAAACgAAAAoAAAAZAAAAGQAAAAAAAAAzMzMAAAAAABQAAAAUAAAAGQAAABkAAAAAAAAABcAAAAUAAAAAAAAAAAAAAD/fwAA/38AAAAAAAAJAAAABAAAAKVG86EMAAAAEAAAAAAAAAAAAAAAAAAAAAAAAAAeAAAAaAAAAAAAAAAAAAAAAAAAAAAAAAAAAAAAECcAABAnAAAAAAAAAAAAAAAAAAAAAAAAAAAAAAAAAAAAAAAAAAAAABQAAAAAAAAAwMD/AAAAAABkAAAAMgAAAAAAAABkAAAAAAAAAH9/fwAKAAAAHwAAAFQAAAAAAAAFAAAAAQAAAAAAAAAAAAAAAAAAAAAAAAAAAAAAAAAAAAAAAAAAAAAAAn9/fwAAAAADzMzMAMDA/wB/f38AAAAAAAAAAAAAAAAAAAAAAAAAAAAhAAAAGAAAABQAAAA4EwAAGycAAAglAABZKQAAEAAAACYAAAAIAAAAAAAAAAAAAAA="/>
+                <pr:smNativeData xmlns:pr="smNativeData" val="SMDATA_13_NmGsYBMAAAAlAAAAZAAAAA8BAAAAkAAAAEgAAACQAAAASAAAAAAAAAABAAAAAAAAAAEAAABQAAAAAAAAAAAA4D8AAAAAAADgPwAAAAAAAOA/AAAAAAAA4D8AAAAAAADgPwAAAAAAAOA/AAAAAAAA4D8AAAAAAADgPwAAAAAAAOA/AAAAAAAA4D8CAAAAjAAAAAAAAAAAAAAAu+DjDP///wgAAAAAAAAAAAAAAAAAAAAAAAAAAAAAAAAAAAAAZAAAAAEAAABAAAAAAAAAAAAAAAAAAAAAAAAAAAAAAAAAAAAAAAAAAAAAAAAAAAAAAAAAAAAAAAAAAAAAAAAAAAAAAAAAAAAAAAAAAAAAAAAAAAAAAAAAAAAAAAAAAAAAFAAAADwAAAAAAAAAAAAAAAAAAAkUAAAAAQAAABQAAAAUAAAAFAAAAAEAAAAAAAAAZAAAAGQAAAAAAAAAZAAAAGQAAAAVAAAAYAAAAAAAAAAAAAAADwAAACADAAAAAAAAAAAAAAEAAACgMgAAVgcAAKr4//8BAAAAf39/AAEAAABkAAAAAAAAABQAAABAHwAAAAAAACYAAAAAAAAAwOD//wAAAAAmAAAAZAAAABYAAABMAAAAAAAAAAAAAAAEAAAAAAAAAAEAAACAgIAKAAAAACgAAAAoAAAAZAAAAGQAAAAAAAAAzMzMAAAAAABQAAAAUAAAAGQAAABkAAAAAAAAABcAAAAUAAAAAAAAAAAAAAD/fwAA/38AAAAAAAAJAAAABAAAAKVG86EMAAAAEAAAAAAAAAAAAAAAAAAAAAAAAAAeAAAAaAAAAAAAAAAAAAAAAAAAAAAAAAAAAAAAECcAABAnAAAAAAAAAAAAAAAAAAAAAAAAAAAAAAAAAAAAAAAAAAAAABQAAAAAAAAAwMD/AAAAAABkAAAAMgAAAAAAAABkAAAAAAAAAH9/fwAKAAAAHwAAAFQAAAAAAAAFAAAAAQAAAAAAAAAAAAAAAAAAAAAAAAAAAAAAAAAAAAAAAAAAAAAAAn9/fwAAAAADzMzMAMDA/wB/f38AAAAAAAAAAAAAAAAAAAAAAAAAAAAhAAAAGAAAABQAAAA4EwAAGycAAAglAABZKQAAEAAAACYAAAAIAAAAAAAAAAAAAAA="/>
               </a:ext>
             </a:extLst>
           </p:cNvSpPr>
@@ -1467,7 +1467,7 @@
             <a:spLocks noGrp="1" noChangeArrowheads="1"/>
             <a:extLst>
               <a:ext uri="smNativeData">
-                <pr:smNativeData xmlns:pr="smNativeData" val="SMDATA_13_KVOsYBMAAAAlAAAAZAAAAA8BAAAAkAAAAEgAAACQAAAASAAAAAAAAAABAAAAAAAAAAEAAABQAAAAAAAAAAAA4D8AAAAAAADgPwAAAAAAAOA/AAAAAAAA4D8AAAAAAADgPwAAAAAAAOA/AAAAAAAA4D8AAAAAAADgPwAAAAAAAOA/AAAAAAAA4D8CAAAAjAAAAAAAAAAAAAAAu+DjDP///wgAAAAAAAAAAAAAAAAAAAAAAAAAAAAAAAAAAAAAZAAAAAEAAABAAAAAAAAAAAAAAAAAAAAAAAAAAAAAAAAAAAAAAAAAAAAAAAAAAAAAAAAAAAAAAAAAAAAAAAAAAAAAAAAAAAAAAAAAAAAAAAAAAAAAAAAAAAAAAAAAAAAAFAAAADwAAAAAAAAAAAAAAAAAAAkUAAAAAQAAABQAAAAUAAAAFAAAAAEAAAAAAAAAZAAAAGQAAAAAAAAAZAAAAGQAAAAVAAAAYAAAAAAAAAAAAAAADwAAACADAAAAAAAAAAAAAAEAAACgMgAAVgcAAKr4//8BAAAAf39/AAEAAABkAAAAAAAAABQAAABAHwAAAAAAACYAAAAAAAAAwOD//wAAAAAmAAAAZAAAABYAAABMAAAAAAAAAAAAAAAEAAAAAAAAAAEAAACAgIAKAAAAACgAAAAoAAAAZAAAAGQAAAAAAAAAzMzMAAAAAABQAAAAUAAAAGQAAABkAAAAAAAAABcAAAAUAAAAAAAAAAAAAAD/fwAA/38AAAAAAAAJAAAABAAAAM9Ay2gMAAAAEAAAAAAAAAAAAAAAAAAAAAAAAAAeAAAAaAAAAAAAAAAAAAAAAAAAAAAAAAAAAAAAECcAABAnAAAAAAAAAAAAAAAAAAAAAAAAAAAAAAAAAAAAAAAAAAAAABQAAAAAAAAAwMD/AAAAAABkAAAAMgAAAAAAAABkAAAAAAAAAH9/fwAKAAAAHwAAAFQAAAAAAAAFAAAAAQAAAAAAAAAAAAAAAAAAAAAAAAAAAAAAAAAAAAAAAAAAAAAAAn9/fwAAAAADzMzMAMDA/wB/f38AAAAAAAAAAAAAAAAAAAAAAAAAAAAhAAAAGAAAABQAAABQKAAAGycAAHA1AABZKQAAEAAAACYAAAAIAAAAAAAAAAAAAAA="/>
+                <pr:smNativeData xmlns:pr="smNativeData" val="SMDATA_13_NmGsYBMAAAAlAAAAZAAAAA8BAAAAkAAAAEgAAACQAAAASAAAAAAAAAABAAAAAAAAAAEAAABQAAAAAAAAAAAA4D8AAAAAAADgPwAAAAAAAOA/AAAAAAAA4D8AAAAAAADgPwAAAAAAAOA/AAAAAAAA4D8AAAAAAADgPwAAAAAAAOA/AAAAAAAA4D8CAAAAjAAAAAAAAAAAAAAAu+DjDP///wgAAAAAAAAAAAAAAAAAAAAAAAAAAAAAAAAAAAAAZAAAAAEAAABAAAAAAAAAAAAAAAAAAAAAAAAAAAAAAAAAAAAAAAAAAAAAAAAAAAAAAAAAAAAAAAAAAAAAAAAAAAAAAAAAAAAAAAAAAAAAAAAAAAAAAAAAAAAAAAAAAAAAFAAAADwAAAAAAAAAAAAAAAAAAAkUAAAAAQAAABQAAAAUAAAAFAAAAAEAAAAAAAAAZAAAAGQAAAAAAAAAZAAAAGQAAAAVAAAAYAAAAAAAAAAAAAAADwAAACADAAAAAAAAAAAAAAEAAACgMgAAVgcAAKr4//8BAAAAf39/AAEAAABkAAAAAAAAABQAAABAHwAAAAAAACYAAAAAAAAAwOD//wAAAAAmAAAAZAAAABYAAABMAAAAAAAAAAAAAAAEAAAAAAAAAAEAAACAgIAKAAAAACgAAAAoAAAAZAAAAGQAAAAAAAAAzMzMAAAAAABQAAAAUAAAAGQAAABkAAAAAAAAABcAAAAUAAAAAAAAAAAAAAD/fwAA/38AAAAAAAAJAAAABAAAAM9Ay2gMAAAAEAAAAAAAAAAAAAAAAAAAAAAAAAAeAAAAaAAAAAAAAAAAAAAAAAAAAAAAAAAAAAAAECcAABAnAAAAAAAAAAAAAAAAAAAAAAAAAAAAAAAAAAAAAAAAAAAAABQAAAAAAAAAwMD/AAAAAABkAAAAMgAAAAAAAABkAAAAAAAAAH9/fwAKAAAAHwAAAFQAAAAAAAAFAAAAAQAAAAAAAAAAAAAAAAAAAAAAAAAAAAAAAAAAAAAAAAAAAAAAAn9/fwAAAAADzMzMAMDA/wB/f38AAAAAAAAAAAAAAAAAAAAAAAAAAAAhAAAAGAAAABQAAABQKAAAGycAAHA1AABZKQAAEAAAACYAAAAIAAAAAAAAAAAAAAA="/>
               </a:ext>
             </a:extLst>
           </p:cNvSpPr>
@@ -1481,7 +1481,7 @@
           <a:lstStyle/>
           <a:p>
             <a:pPr/>
-            <a:fld id="{3FED7413-5DD2-B882-9C55-ABD73A1B6AFE}" type="slidenum">
+            <a:fld id="{3FD471D6-98D2-8187-9C6C-6ED23F226A3B}" type="slidenum">
               <a:t/>
             </a:fld>
           </a:p>
@@ -1519,7 +1519,7 @@
             <a:spLocks noGrp="1" noChangeArrowheads="1"/>
             <a:extLst>
               <a:ext uri="smNativeData">
-                <pr:smNativeData xmlns:pr="smNativeData" val="SMDATA_13_KVOsYBMAAAAlAAAAZAAAAA8BAAAAkAAAAEgAAACQAAAASAAAAAAAAAABAAAAAAAAAAEAAABQAAAAAAAAAAAA4D8AAAAAAADgPwAAAAAAAOA/AAAAAAAA4D8AAAAAAADgPwAAAAAAAOA/AAAAAAAA4D8AAAAAAADgPwAAAAAAAOA/AAAAAAAA4D8CAAAAjAAAAAAAAAAAAAAAu+DjDP///wgAAAAAAAAAAAAAAAAAAAAAAAAAAAAAAAAAAAAAZAAAAAEAAABAAAAAAAAAAAAAAAAAAAAAAAAAAAAAAAAAAAAAAAAAAAAAAAAAAAAAAAAAAAAAAAAAAAAAAAAAAAAAAAAAAAAAAAAAAAAAAAAAAAAAAAAAAAAAAAAAAAAAFAAAADwAAAAAAAAAAAAAAAAAAAkUAAAAAQAAABQAAAAUAAAAFAAAAAEAAAAAAAAAZAAAAGQAAAAAAAAAZAAAAGQAAAAVAAAAYAAAAAAAAAAAAAAADwAAACADAAAAAAAAAAAAAAEAAACgMgAAVgcAAKr4//8BAAAAf39/AAEAAABkAAAAAAAAABQAAABAHwAAAAAAACYAAAAAAAAAwOD//wAAAAAmAAAAZAAAABYAAABMAAAAAAAAAAAAAAAEAAAAAAAAAAEAAACAgIAKAAAAACgAAAAoAAAAZAAAAGQAAAAAAAAAzMzMAAAAAABQAAAAUAAAAGQAAABkAAAAAAAAABcAAAAUAAAAAAAAAAAAAAD/fwAA/38AAAAAAAAJAAAABAAAAAMAhUEMAAAAEAAAAAAAAAAAAAAAAAAAAAAAAAAeAAAAaAAAAAAAAAAAAAAAAAAAAAAAAAAAAAAAECcAABAnAAAAAAAAAAAAAAAAAAAAAAAAAAAAAAAAAAAAAAAAAAAAABQAAAAAAAAAwMD/AAAAAABkAAAAMgAAAAAAAABkAAAAAAAAAH9/fwAKAAAAHwAAAFQAAAAAAAAFAAAAAQAAAAAAAAAAAAAAAAAAAAAAAAAAAAAAAAAAAAAAAAAAAAAAAn9/fwAAAAADzMzMAMDA/wB/f38AAAAAAAAAAAAAAAAAAAAAAAAAAAAhAAAAGAAAABQAAADQAgAAsAEAAHA1AAC4CAAAEAAAACYAAAAIAAAAAAAAAAAAAAA="/>
+                <pr:smNativeData xmlns:pr="smNativeData" val="SMDATA_13_NmGsYBMAAAAlAAAAZAAAAA8BAAAAkAAAAEgAAACQAAAASAAAAAAAAAABAAAAAAAAAAEAAABQAAAAAAAAAAAA4D8AAAAAAADgPwAAAAAAAOA/AAAAAAAA4D8AAAAAAADgPwAAAAAAAOA/AAAAAAAA4D8AAAAAAADgPwAAAAAAAOA/AAAAAAAA4D8CAAAAjAAAAAAAAAAAAAAAu+DjDP///wgAAAAAAAAAAAAAAAAAAAAAAAAAAAAAAAAAAAAAZAAAAAEAAABAAAAAAAAAAAAAAAAAAAAAAAAAAAAAAAAAAAAAAAAAAAAAAAAAAAAAAAAAAAAAAAAAAAAAAAAAAAAAAAAAAAAAAAAAAAAAAAAAAAAAAAAAAAAAAAAAAAAAFAAAADwAAAAAAAAAAAAAAAAAAAkUAAAAAQAAABQAAAAUAAAAFAAAAAEAAAAAAAAAZAAAAGQAAAAAAAAAZAAAAGQAAAAVAAAAYAAAAAAAAAAAAAAADwAAACADAAAAAAAAAAAAAAEAAACgMgAAVgcAAKr4//8BAAAAf39/AAEAAABkAAAAAAAAABQAAABAHwAAAAAAACYAAAAAAAAAwOD//wAAAAAmAAAAZAAAABYAAABMAAAAAAAAAAAAAAAEAAAAAAAAAAEAAACAgIAKAAAAACgAAAAoAAAAZAAAAGQAAAAAAAAAzMzMAAAAAABQAAAAUAAAAGQAAABkAAAAAAAAABcAAAAUAAAAAAAAAAAAAAD/fwAA/38AAAAAAAAJAAAABAAAAAMAhUEMAAAAEAAAAAAAAAAAAAAAAAAAAAAAAAAeAAAAaAAAAAAAAAAAAAAAAAAAAAAAAAAAAAAAECcAABAnAAAAAAAAAAAAAAAAAAAAAAAAAAAAAAAAAAAAAAAAAAAAABQAAAAAAAAAwMD/AAAAAABkAAAAMgAAAAAAAABkAAAAAAAAAH9/fwAKAAAAHwAAAFQAAAAAAAAFAAAAAQAAAAAAAAAAAAAAAAAAAAAAAAAAAAAAAAAAAAAAAAAAAAAAAn9/fwAAAAADzMzMAMDA/wB/f38AAAAAAAAAAAAAAAAAAAAAAAAAAAAhAAAAGAAAABQAAADQAgAAsAEAAHA1AAC4CAAAEAAAACYAAAAIAAAAAAAAAAAAAAA="/>
               </a:ext>
             </a:extLst>
           </p:cNvSpPr>
@@ -1546,7 +1546,7 @@
             <a:spLocks noGrp="1" noChangeArrowheads="1"/>
             <a:extLst>
               <a:ext uri="smNativeData">
-                <pr:smNativeData xmlns:pr="smNativeData" val="SMDATA_13_KVOsYBMAAAAlAAAAZAAAAA8BAAAAkAAAAEgAAACQAAAASAAAAAAAAAACAAAAAAAAAAEAAABQAAAAAAAAAAAA4D8AAAAAAADgPwAAAAAAAOA/AAAAAAAA4D8AAAAAAADgPwAAAAAAAOA/AAAAAAAA4D8AAAAAAADgPwAAAAAAAOA/AAAAAAAA4D8CAAAAjAAAAAAAAAAAAAAAu+DjDP///wgAAAAAAAAAAAAAAAAAAAAAAAAAAAAAAAAAAAAAZAAAAAEAAABAAAAAAAAAAAAAAAAAAAAAAAAAAAAAAAAAAAAAAAAAAAAAAAAAAAAAAAAAAAAAAAAAAAAAAAAAAAAAAAAAAAAAAAAAAAAAAAAAAAAAAAAAAAAAAAAAAAAAFAAAADwAAAAAAAAAAAAAAAAAAAkUAAAAAQAAABQAAAAUAAAAFAAAAAEAAAAAAAAAZAAAAGQAAAAAAAAAZAAAAGQAAAAVAAAAYAAAAAAAAAAAAAAADwAAACADAAAAAAAAAAAAAAEAAACgMgAAVgcAAKr4//8BAAAAf39/AAEAAABkAAAAAAAAABQAAABAHwAAAAAAACYAAAAAAAAAwOD//wAAAAAmAAAAZAAAABYAAABMAAAAAAAAAAAAAAAEAAAAAAAAAAEAAACAgIAKAAAAACgAAAAoAAAAZAAAAGQAAAAAAAAAzMzMAAAAAABQAAAAUAAAAGQAAABkAAAAAAAAABcAAAAUAAAAAAAAAAAAAAD/fwAA/38AAAAAAAAJAAAABAAAAAMAjgwMAAAAEAAAAAAAAAAAAAAAAAAAAAAAAAAeAAAAaAAAAAAAAAAAAAAAAAAAAAAAAAAAAAAAECcAABAnAAAAAAAAAAAAAAAAAAAAAAAAAAAAAAAAAAAAAAAAAAAAABQAAAAAAAAAwMD/AAAAAABkAAAAMgAAAAAAAABkAAAAAAAAAH9/fwAKAAAAHwAAAFQAAAAAAAAFAAAAAQAAAAAAAAAAAAAAAAAAAAAAAAAAAAAAAAAAAAAAAAAAAAAAAn9/fwAAAAADzMzMAMDA/wB/f38AAAAAAAAAAAAAAAAAAAAAAAAAAAAhAAAAGAAAABQAAADQAgAAcQkAAKobAABhDQAAEAAAACYAAAAIAAAAgYAAAAAAAAA="/>
+                <pr:smNativeData xmlns:pr="smNativeData" val="SMDATA_13_NmGsYBMAAAAlAAAAZAAAAA8BAAAAkAAAAEgAAACQAAAASAAAAAAAAAACAAAAAAAAAAEAAABQAAAAAAAAAAAA4D8AAAAAAADgPwAAAAAAAOA/AAAAAAAA4D8AAAAAAADgPwAAAAAAAOA/AAAAAAAA4D8AAAAAAADgPwAAAAAAAOA/AAAAAAAA4D8CAAAAjAAAAAAAAAAAAAAAu+DjDP///wgAAAAAAAAAAAAAAAAAAAAAAAAAAAAAAAAAAAAAZAAAAAEAAABAAAAAAAAAAAAAAAAAAAAAAAAAAAAAAAAAAAAAAAAAAAAAAAAAAAAAAAAAAAAAAAAAAAAAAAAAAAAAAAAAAAAAAAAAAAAAAAAAAAAAAAAAAAAAAAAAAAAAFAAAADwAAAAAAAAAAAAAAAAAAAkUAAAAAQAAABQAAAAUAAAAFAAAAAEAAAAAAAAAZAAAAGQAAAAAAAAAZAAAAGQAAAAVAAAAYAAAAAAAAAAAAAAADwAAACADAAAAAAAAAAAAAAEAAACgMgAAVgcAAKr4//8BAAAAf39/AAEAAABkAAAAAAAAABQAAABAHwAAAAAAACYAAAAAAAAAwOD//wAAAAAmAAAAZAAAABYAAABMAAAAAAAAAAAAAAAEAAAAAAAAAAEAAACAgIAKAAAAACgAAAAoAAAAZAAAAGQAAAAAAAAAzMzMAAAAAABQAAAAUAAAAGQAAABkAAAAAAAAABcAAAAUAAAAAAAAAAAAAAD/fwAA/38AAAAAAAAJAAAABAAAAAMAjgwMAAAAEAAAAAAAAAAAAAAAAAAAAAAAAAAeAAAAaAAAAAAAAAAAAAAAAAAAAAAAAAAAAAAAECcAABAnAAAAAAAAAAAAAAAAAAAAAAAAAAAAAAAAAAAAAAAAAAAAABQAAAAAAAAAwMD/AAAAAABkAAAAMgAAAAAAAABkAAAAAAAAAH9/fwAKAAAAHwAAAFQAAAAAAAAFAAAAAQAAAAAAAAAAAAAAAAAAAAAAAAAAAAAAAAAAAAAAAAAAAAAAAn9/fwAAAAADzMzMAMDA/wB/f38AAAAAAAAAAAAAAAAAAAAAAAAAAAAhAAAAGAAAABQAAADQAgAAcQkAAKobAABhDQAAEAAAACYAAAAIAAAAgYAAAAAAAAA="/>
               </a:ext>
             </a:extLst>
           </p:cNvSpPr>
@@ -1619,7 +1619,7 @@
             <a:spLocks noGrp="1" noChangeArrowheads="1"/>
             <a:extLst>
               <a:ext uri="smNativeData">
-                <pr:smNativeData xmlns:pr="smNativeData" val="SMDATA_13_KVOsYBMAAAAlAAAAZAAAAA8BAAAAkAAAAEgAAACQAAAASAAAAAAAAAAAAAAAAAAAAAEAAABQAAAAAAAAAAAA4D8AAAAAAADgPwAAAAAAAOA/AAAAAAAA4D8AAAAAAADgPwAAAAAAAOA/AAAAAAAA4D8AAAAAAADgPwAAAAAAAOA/AAAAAAAA4D8CAAAAjAAAAAAAAAAAAAAAu+DjDP///wgAAAAAAAAAAAAAAAAAAAAAAAAAAAAAAAAAAAAAZAAAAAEAAABAAAAAAAAAAAAAAAAAAAAAAAAAAAAAAAAAAAAAAAAAAAAAAAAAAAAAAAAAAAAAAAAAAAAAAAAAAAAAAAAAAAAAAAAAAAAAAAAAAAAAAAAAAAAAAAAAAAAAFAAAADwAAAAAAAAAAAAAAAAAAAkUAAAAAQAAABQAAAAUAAAAFAAAAAEAAAAAAAAAZAAAAGQAAAAAAAAAZAAAAGQAAAAVAAAAYAAAAAAAAAAAAAAADwAAACADAAAAAAAAAAAAAAEAAACgMgAAVgcAAKr4//8BAAAAf39/AAEAAABkAAAAAAAAABQAAABAHwAAAAAAACYAAAAAAAAAwOD//wAAAAAmAAAAZAAAABYAAABMAAAAAAAAAAAAAAAEAAAAAAAAAAEAAACAgIAKAAAAACgAAAAoAAAAZAAAAGQAAAAAAAAAzMzMAAAAAABQAAAAUAAAAGQAAABkAAAAAAAAABcAAAAUAAAAAAAAAAAAAAD/fwAA/38AAAAAAAAJAAAABAAAAJJHd9YMAAAAEAAAAAAAAAAAAAAAAAAAAAAAAAAeAAAAaAAAAAAAAAAAAAAAAAAAAAAAAAAAAAAAECcAABAnAAAAAAAAAAAAAAAAAAAAAAAAAAAAAAAAAAAAAAAAAAAAABQAAAAAAAAAwMD/AAAAAABkAAAAMgAAAAAAAABkAAAAAAAAAH9/fwAKAAAAHwAAAFQAAAAAAAAFAAAAAQAAAAAAAAAAAAAAAAAAAAAAAAAAAAAAAAAAAAAAAAAAAAAAAn9/fwAAAAADzMzMAMDA/wB/f38AAAAAAAAAAAAAAAAAAAAAAAAAAAAhAAAAGAAAABQAAADQAgAAYQ0AAKobAACwJQAAEAAAACYAAAAIAAAAAYAAAAAAAAA="/>
+                <pr:smNativeData xmlns:pr="smNativeData" val="SMDATA_13_NmGsYBMAAAAlAAAAZAAAAA8BAAAAkAAAAEgAAACQAAAASAAAAAAAAAAAAAAAAAAAAAEAAABQAAAAAAAAAAAA4D8AAAAAAADgPwAAAAAAAOA/AAAAAAAA4D8AAAAAAADgPwAAAAAAAOA/AAAAAAAA4D8AAAAAAADgPwAAAAAAAOA/AAAAAAAA4D8CAAAAjAAAAAAAAAAAAAAAu+DjDP///wgAAAAAAAAAAAAAAAAAAAAAAAAAAAAAAAAAAAAAZAAAAAEAAABAAAAAAAAAAAAAAAAAAAAAAAAAAAAAAAAAAAAAAAAAAAAAAAAAAAAAAAAAAAAAAAAAAAAAAAAAAAAAAAAAAAAAAAAAAAAAAAAAAAAAAAAAAAAAAAAAAAAAFAAAADwAAAAAAAAAAAAAAAAAAAkUAAAAAQAAABQAAAAUAAAAFAAAAAEAAAAAAAAAZAAAAGQAAAAAAAAAZAAAAGQAAAAVAAAAYAAAAAAAAAAAAAAADwAAACADAAAAAAAAAAAAAAEAAACgMgAAVgcAAKr4//8BAAAAf39/AAEAAABkAAAAAAAAABQAAABAHwAAAAAAACYAAAAAAAAAwOD//wAAAAAmAAAAZAAAABYAAABMAAAAAAAAAAAAAAAEAAAAAAAAAAEAAACAgIAKAAAAACgAAAAoAAAAZAAAAGQAAAAAAAAAzMzMAAAAAABQAAAAUAAAAGQAAABkAAAAAAAAABcAAAAUAAAAAAAAAAAAAAD/fwAA/38AAAAAAAAJAAAABAAAAJJHd9YMAAAAEAAAAAAAAAAAAAAAAAAAAAAAAAAeAAAAaAAAAAAAAAAAAAAAAAAAAAAAAAAAAAAAECcAABAnAAAAAAAAAAAAAAAAAAAAAAAAAAAAAAAAAAAAAAAAAAAAABQAAAAAAAAAwMD/AAAAAABkAAAAMgAAAAAAAABkAAAAAAAAAH9/fwAKAAAAHwAAAFQAAAAAAAAFAAAAAQAAAAAAAAAAAAAAAAAAAAAAAAAAAAAAAAAAAAAAAAAAAAAAAn9/fwAAAAADzMzMAMDA/wB/f38AAAAAAAAAAAAAAAAAAAAAAAAAAAAhAAAAGAAAABQAAADQAgAAYQ0AAKobAACwJQAAEAAAACYAAAAIAAAAAYAAAAAAAAA="/>
               </a:ext>
             </a:extLst>
           </p:cNvSpPr>
@@ -1703,7 +1703,7 @@
             <a:spLocks noGrp="1" noChangeArrowheads="1"/>
             <a:extLst>
               <a:ext uri="smNativeData">
-                <pr:smNativeData xmlns:pr="smNativeData" val="SMDATA_13_KVOsYBMAAAAlAAAAZAAAAA8BAAAAkAAAAEgAAACQAAAASAAAAAAAAAACAAAAAAAAAAEAAABQAAAAAAAAAAAA4D8AAAAAAADgPwAAAAAAAOA/AAAAAAAA4D8AAAAAAADgPwAAAAAAAOA/AAAAAAAA4D8AAAAAAADgPwAAAAAAAOA/AAAAAAAA4D8CAAAAjAAAAAAAAAAAAAAAu+DjDP///wgAAAAAAAAAAAAAAAAAAAAAAAAAAAAAAAAAAAAAZAAAAAEAAABAAAAAAAAAAAAAAAAAAAAAAAAAAAAAAAAAAAAAAAAAAAAAAAAAAAAAAAAAAAAAAAAAAAAAAAAAAAAAAAAAAAAAAAAAAAAAAAAAAAAAAAAAAAAAAAAAAAAAFAAAADwAAAAAAAAAAAAAAAAAAAkUAAAAAQAAABQAAAAUAAAAFAAAAAEAAAAAAAAAZAAAAGQAAAAAAAAAZAAAAGQAAAAVAAAAYAAAAAAAAAAAAAAADwAAACADAAAAAAAAAAAAAAEAAACgMgAAVgcAAKr4//8BAAAAf39/AAEAAABkAAAAAAAAABQAAABAHwAAAAAAACYAAAAAAAAAwOD//wAAAAAmAAAAZAAAABYAAABMAAAAAAAAAAAAAAAEAAAAAAAAAAEAAACAgIAKAAAAACgAAAAoAAAAZAAAAGQAAAAAAAAAzMzMAAAAAABQAAAAUAAAAGQAAABkAAAAAAAAABcAAAAUAAAAAAAAAAAAAAD/fwAA/38AAAAAAAAJAAAABAAAAGvGAwAMAAAAEAAAAAAAAAAAAAAAAAAAAAAAAAAeAAAAaAAAAAAAAAAAAAAAAAAAAAAAAAAAAAAAECcAABAnAAAAAAAAAAAAAAAAAAAAAAAAAAAAAAAAAAAAAAAAAAAAABQAAAAAAAAAwMD/AAAAAABkAAAAMgAAAAAAAABkAAAAAAAAAH9/fwAKAAAAHwAAAFQAAAAAAAAFAAAAAQAAAAAAAAAAAAAAAAAAAAAAAAAAAAAAAAAAAAAAAAAAAAAAAn9/fwAAAAADzMzMAMDA/wB/f38AAAAAAAAAAAAAAAAAAAAAAAAAAAAhAAAAGAAAABQAAACWHAAAcQkAAHA1AABhDQAAEAAAACYAAAAIAAAAgYAAAAAAAAA="/>
+                <pr:smNativeData xmlns:pr="smNativeData" val="SMDATA_13_NmGsYBMAAAAlAAAAZAAAAA8BAAAAkAAAAEgAAACQAAAASAAAAAAAAAACAAAAAAAAAAEAAABQAAAAAAAAAAAA4D8AAAAAAADgPwAAAAAAAOA/AAAAAAAA4D8AAAAAAADgPwAAAAAAAOA/AAAAAAAA4D8AAAAAAADgPwAAAAAAAOA/AAAAAAAA4D8CAAAAjAAAAAAAAAAAAAAAu+DjDP///wgAAAAAAAAAAAAAAAAAAAAAAAAAAAAAAAAAAAAAZAAAAAEAAABAAAAAAAAAAAAAAAAAAAAAAAAAAAAAAAAAAAAAAAAAAAAAAAAAAAAAAAAAAAAAAAAAAAAAAAAAAAAAAAAAAAAAAAAAAAAAAAAAAAAAAAAAAAAAAAAAAAAAFAAAADwAAAAAAAAAAAAAAAAAAAkUAAAAAQAAABQAAAAUAAAAFAAAAAEAAAAAAAAAZAAAAGQAAAAAAAAAZAAAAGQAAAAVAAAAYAAAAAAAAAAAAAAADwAAACADAAAAAAAAAAAAAAEAAACgMgAAVgcAAKr4//8BAAAAf39/AAEAAABkAAAAAAAAABQAAABAHwAAAAAAACYAAAAAAAAAwOD//wAAAAAmAAAAZAAAABYAAABMAAAAAAAAAAAAAAAEAAAAAAAAAAEAAACAgIAKAAAAACgAAAAoAAAAZAAAAGQAAAAAAAAAzMzMAAAAAABQAAAAUAAAAGQAAABkAAAAAAAAABcAAAAUAAAAAAAAAAAAAAD/fwAA/38AAAAAAAAJAAAABAAAAGvGAwAMAAAAEAAAAAAAAAAAAAAAAAAAAAAAAAAeAAAAaAAAAAAAAAAAAAAAAAAAAAAAAAAAAAAAECcAABAnAAAAAAAAAAAAAAAAAAAAAAAAAAAAAAAAAAAAAAAAAAAAABQAAAAAAAAAwMD/AAAAAABkAAAAMgAAAAAAAABkAAAAAAAAAH9/fwAKAAAAHwAAAFQAAAAAAAAFAAAAAQAAAAAAAAAAAAAAAAAAAAAAAAAAAAAAAAAAAAAAAAAAAAAAAn9/fwAAAAADzMzMAMDA/wB/f38AAAAAAAAAAAAAAAAAAAAAAAAAAAAhAAAAGAAAABQAAACWHAAAcQkAAHA1AABhDQAAEAAAACYAAAAIAAAAgYAAAAAAAAA="/>
               </a:ext>
             </a:extLst>
           </p:cNvSpPr>
@@ -1776,7 +1776,7 @@
             <a:spLocks noGrp="1" noChangeArrowheads="1"/>
             <a:extLst>
               <a:ext uri="smNativeData">
-                <pr:smNativeData xmlns:pr="smNativeData" val="SMDATA_13_KVOsYBMAAAAlAAAAZAAAAA8BAAAAkAAAAEgAAACQAAAASAAAAAAAAAAAAAAAAAAAAAEAAABQAAAAAAAAAAAA4D8AAAAAAADgPwAAAAAAAOA/AAAAAAAA4D8AAAAAAADgPwAAAAAAAOA/AAAAAAAA4D8AAAAAAADgPwAAAAAAAOA/AAAAAAAA4D8CAAAAjAAAAAAAAAAAAAAAu+DjDP///wgAAAAAAAAAAAAAAAAAAAAAAAAAAAAAAAAAAAAAZAAAAAEAAABAAAAAAAAAAAAAAAAAAAAAAAAAAAAAAAAAAAAAAAAAAAAAAAAAAAAAAAAAAAAAAAAAAAAAAAAAAAAAAAAAAAAAAAAAAAAAAAAAAAAAAAAAAAAAAAAAAAAAFAAAADwAAAAAAAAAAAAAAAAAAAkUAAAAAQAAABQAAAAUAAAAFAAAAAEAAAAAAAAAZAAAAGQAAAAAAAAAZAAAAGQAAAAVAAAAYAAAAAAAAAAAAAAADwAAACADAAAAAAAAAAAAAAEAAACgMgAAVgcAAKr4//8BAAAAf39/AAEAAABkAAAAAAAAABQAAABAHwAAAAAAACYAAAAAAAAAwOD//wAAAAAmAAAAZAAAABYAAABMAAAAAAAAAAAAAAAEAAAAAAAAAAEAAACAgIAKAAAAACgAAAAoAAAAZAAAAGQAAAAAAAAAzMzMAAAAAABQAAAAUAAAAGQAAABkAAAAAAAAABcAAAAUAAAAAAAAAAAAAAD/fwAA/38AAAAAAAAJAAAABAAAAD8wAwAMAAAAEAAAAAAAAAAAAAAAAAAAAAAAAAAeAAAAaAAAAAAAAAAAAAAAAAAAAAAAAAAAAAAAECcAABAnAAAAAAAAAAAAAAAAAAAAAAAAAAAAAAAAAAAAAAAAAAAAABQAAAAAAAAAwMD/AAAAAABkAAAAMgAAAAAAAABkAAAAAAAAAH9/fwAKAAAAHwAAAFQAAAAAAAAFAAAAAQAAAAAAAAAAAAAAAAAAAAAAAAAAAAAAAAAAAAAAAAAAAAAAAn9/fwAAAAADzMzMAMDA/wB/f38AAAAAAAAAAAAAAAAAAAAAAAAAAAAhAAAAGAAAABQAAACWHAAAYQ0AAHA1AACwJQAAEAAAACYAAAAIAAAAAYAAAAAAAAA="/>
+                <pr:smNativeData xmlns:pr="smNativeData" val="SMDATA_13_NmGsYBMAAAAlAAAAZAAAAA8BAAAAkAAAAEgAAACQAAAASAAAAAAAAAAAAAAAAAAAAAEAAABQAAAAAAAAAAAA4D8AAAAAAADgPwAAAAAAAOA/AAAAAAAA4D8AAAAAAADgPwAAAAAAAOA/AAAAAAAA4D8AAAAAAADgPwAAAAAAAOA/AAAAAAAA4D8CAAAAjAAAAAAAAAAAAAAAu+DjDP///wgAAAAAAAAAAAAAAAAAAAAAAAAAAAAAAAAAAAAAZAAAAAEAAABAAAAAAAAAAAAAAAAAAAAAAAAAAAAAAAAAAAAAAAAAAAAAAAAAAAAAAAAAAAAAAAAAAAAAAAAAAAAAAAAAAAAAAAAAAAAAAAAAAAAAAAAAAAAAAAAAAAAAFAAAADwAAAAAAAAAAAAAAAAAAAkUAAAAAQAAABQAAAAUAAAAFAAAAAEAAAAAAAAAZAAAAGQAAAAAAAAAZAAAAGQAAAAVAAAAYAAAAAAAAAAAAAAADwAAACADAAAAAAAAAAAAAAEAAACgMgAAVgcAAKr4//8BAAAAf39/AAEAAABkAAAAAAAAABQAAABAHwAAAAAAACYAAAAAAAAAwOD//wAAAAAmAAAAZAAAABYAAABMAAAAAAAAAAAAAAAEAAAAAAAAAAEAAACAgIAKAAAAACgAAAAoAAAAZAAAAGQAAAAAAAAAzMzMAAAAAABQAAAAUAAAAGQAAABkAAAAAAAAABcAAAAUAAAAAAAAAAAAAAD/fwAA/38AAAAAAAAJAAAABAAAAD8wAwAMAAAAEAAAAAAAAAAAAAAAAAAAAAAAAAAeAAAAaAAAAAAAAAAAAAAAAAAAAAAAAAAAAAAAECcAABAnAAAAAAAAAAAAAAAAAAAAAAAAAAAAAAAAAAAAAAAAAAAAABQAAAAAAAAAwMD/AAAAAABkAAAAMgAAAAAAAABkAAAAAAAAAH9/fwAKAAAAHwAAAFQAAAAAAAAFAAAAAQAAAAAAAAAAAAAAAAAAAAAAAAAAAAAAAAAAAAAAAAAAAAAAAn9/fwAAAAADzMzMAMDA/wB/f38AAAAAAAAAAAAAAAAAAAAAAAAAAAAhAAAAGAAAABQAAACWHAAAYQ0AAHA1AACwJQAAEAAAACYAAAAIAAAAAYAAAAAAAAA="/>
               </a:ext>
             </a:extLst>
           </p:cNvSpPr>
@@ -1860,7 +1860,7 @@
             <a:spLocks noGrp="1" noChangeArrowheads="1"/>
             <a:extLst>
               <a:ext uri="smNativeData">
-                <pr:smNativeData xmlns:pr="smNativeData" val="SMDATA_13_KVOsYBMAAAAlAAAAZAAAAA8BAAAAkAAAAEgAAACQAAAASAAAAAAAAAABAAAAAAAAAAEAAABQAAAAAAAAAAAA4D8AAAAAAADgPwAAAAAAAOA/AAAAAAAA4D8AAAAAAADgPwAAAAAAAOA/AAAAAAAA4D8AAAAAAADgPwAAAAAAAOA/AAAAAAAA4D8CAAAAjAAAAAAAAAAAAAAAu+DjDP///wgAAAAAAAAAAAAAAAAAAAAAAAAAAAAAAAAAAAAAZAAAAAEAAABAAAAAAAAAAAAAAAAAAAAAAAAAAAAAAAAAAAAAAAAAAAAAAAAAAAAAAAAAAAAAAAAAAAAAAAAAAAAAAAAAAAAAAAAAAAAAAAAAAAAAAAAAAAAAAAAAAAAAFAAAADwAAAAAAAAAAAAAAAAAAAkUAAAAAQAAABQAAAAUAAAAFAAAAAEAAAAAAAAAZAAAAGQAAAAAAAAAZAAAAGQAAAAVAAAAYAAAAAAAAAAAAAAADwAAACADAAAAAAAAAAAAAAEAAACgMgAAVgcAAKr4//8BAAAAf39/AAEAAABkAAAAAAAAABQAAABAHwAAAAAAACYAAAAAAAAAwOD//wAAAAAmAAAAZAAAABYAAABMAAAAAAAAAAAAAAAEAAAAAAAAAAEAAACAgIAKAAAAACgAAAAoAAAAZAAAAGQAAAAAAAAAzMzMAAAAAABQAAAAUAAAAGQAAABkAAAAAAAAABcAAAAUAAAAAAAAAAAAAAD/fwAA/38AAAAAAAAJAAAABAAAAAMAf0oMAAAAEAAAAAAAAAAAAAAAAAAAAAAAAAAeAAAAaAAAAAAAAAAAAAAAAAAAAAAAAAAAAAAAECcAABAnAAAAAAAAAAAAAAAAAAAAAAAAAAAAAAAAAAAAAAAAAAAAABQAAAAAAAAAwMD/AAAAAABkAAAAMgAAAAAAAABkAAAAAAAAAH9/fwAKAAAAHwAAAFQAAAAAAAAFAAAAAQAAAAAAAAAAAAAAAAAAAAAAAAAAAAAAAAAAAAAAAAAAAAAAAn9/fwAAAAADzMzMAMDA/wB/f38AAAAAAAAAAAAAAAAAAAAAAAAAAAAhAAAAGAAAABQAAADQAgAAGycAAPAPAABZKQAAEAAAACYAAAAIAAAAAAAAAAAAAAA="/>
+                <pr:smNativeData xmlns:pr="smNativeData" val="SMDATA_13_NmGsYBMAAAAlAAAAZAAAAA8BAAAAkAAAAEgAAACQAAAASAAAAAAAAAABAAAAAAAAAAEAAABQAAAAAAAAAAAA4D8AAAAAAADgPwAAAAAAAOA/AAAAAAAA4D8AAAAAAADgPwAAAAAAAOA/AAAAAAAA4D8AAAAAAADgPwAAAAAAAOA/AAAAAAAA4D8CAAAAjAAAAAAAAAAAAAAAu+DjDP///wgAAAAAAAAAAAAAAAAAAAAAAAAAAAAAAAAAAAAAZAAAAAEAAABAAAAAAAAAAAAAAAAAAAAAAAAAAAAAAAAAAAAAAAAAAAAAAAAAAAAAAAAAAAAAAAAAAAAAAAAAAAAAAAAAAAAAAAAAAAAAAAAAAAAAAAAAAAAAAAAAAAAAFAAAADwAAAAAAAAAAAAAAAAAAAkUAAAAAQAAABQAAAAUAAAAFAAAAAEAAAAAAAAAZAAAAGQAAAAAAAAAZAAAAGQAAAAVAAAAYAAAAAAAAAAAAAAADwAAACADAAAAAAAAAAAAAAEAAACgMgAAVgcAAKr4//8BAAAAf39/AAEAAABkAAAAAAAAABQAAABAHwAAAAAAACYAAAAAAAAAwOD//wAAAAAmAAAAZAAAABYAAABMAAAAAAAAAAAAAAAEAAAAAAAAAAEAAACAgIAKAAAAACgAAAAoAAAAZAAAAGQAAAAAAAAAzMzMAAAAAABQAAAAUAAAAGQAAABkAAAAAAAAABcAAAAUAAAAAAAAAAAAAAD/fwAA/38AAAAAAAAJAAAABAAAAAMAf0oMAAAAEAAAAAAAAAAAAAAAAAAAAAAAAAAeAAAAaAAAAAAAAAAAAAAAAAAAAAAAAAAAAAAAECcAABAnAAAAAAAAAAAAAAAAAAAAAAAAAAAAAAAAAAAAAAAAAAAAABQAAAAAAAAAwMD/AAAAAABkAAAAMgAAAAAAAABkAAAAAAAAAH9/fwAKAAAAHwAAAFQAAAAAAAAFAAAAAQAAAAAAAAAAAAAAAAAAAAAAAAAAAAAAAAAAAAAAAAAAAAAAAn9/fwAAAAADzMzMAMDA/wB/f38AAAAAAAAAAAAAAAAAAAAAAAAAAAAhAAAAGAAAABQAAADQAgAAGycAAPAPAABZKQAAEAAAACYAAAAIAAAAAAAAAAAAAAA="/>
               </a:ext>
             </a:extLst>
           </p:cNvSpPr>
@@ -1874,7 +1874,7 @@
           <a:lstStyle/>
           <a:p>
             <a:pPr/>
-            <a:fld id="{3FED7407-49D2-B882-9C55-BFD73A1B6AEA}" type="datetime1">
+            <a:fld id="{3FD47FF5-BBD2-8189-9C6C-4DDC31226A18}" type="datetime1">
               <a:t/>
             </a:fld>
           </a:p>
@@ -1887,7 +1887,7 @@
             <a:spLocks noGrp="1" noChangeArrowheads="1"/>
             <a:extLst>
               <a:ext uri="smNativeData">
-                <pr:smNativeData xmlns:pr="smNativeData" val="SMDATA_13_KVOsYBMAAAAlAAAAZAAAAA8BAAAAkAAAAEgAAACQAAAASAAAAAAAAAABAAAAAAAAAAEAAABQAAAAAAAAAAAA4D8AAAAAAADgPwAAAAAAAOA/AAAAAAAA4D8AAAAAAADgPwAAAAAAAOA/AAAAAAAA4D8AAAAAAADgPwAAAAAAAOA/AAAAAAAA4D8CAAAAjAAAAAAAAAAAAAAAu+DjDP///wgAAAAAAAAAAAAAAAAAAAAAAAAAAAAAAAAAAAAAZAAAAAEAAABAAAAAAAAAAAAAAAAAAAAAAAAAAAAAAAAAAAAAAAAAAAAAAAAAAAAAAAAAAAAAAAAAAAAAAAAAAAAAAAAAAAAAAAAAAAAAAAAAAAAAAAAAAAAAAAAAAAAAFAAAADwAAAAAAAAAAAAAAAAAAAkUAAAAAQAAABQAAAAUAAAAFAAAAAEAAAAAAAAAZAAAAGQAAAAAAAAAZAAAAGQAAAAVAAAAYAAAAAAAAAAAAAAADwAAACADAAAAAAAAAAAAAAEAAACgMgAAVgcAAKr4//8BAAAAf39/AAEAAABkAAAAAAAAABQAAABAHwAAAAAAACYAAAAAAAAAwOD//wAAAAAmAAAAZAAAABYAAABMAAAAAAAAAAAAAAAEAAAAAAAAAAEAAACAgIAKAAAAACgAAAAoAAAAZAAAAGQAAAAAAAAAzMzMAAAAAABQAAAAUAAAAGQAAABkAAAAAAAAABcAAAAUAAAAAAAAAAAAAAD/fwAA/38AAAAAAAAJAAAABAAAAJ4RBAAMAAAAEAAAAAAAAAAAAAAAAAAAAAAAAAAeAAAAaAAAAAAAAAAAAAAAAAAAAAAAAAAAAAAAECcAABAnAAAAAAAAAAAAAAAAAAAAAAAAAAAAAAAAAAAAAAAAAAAAABQAAAAAAAAAwMD/AAAAAABkAAAAMgAAAAAAAABkAAAAAAAAAH9/fwAKAAAAHwAAAFQAAAAAAAAFAAAAAQAAAAAAAAAAAAAAAAAAAAAAAAAAAAAAAAAAAAAAAAAAAAAAAn9/fwAAAAADzMzMAMDA/wB/f38AAAAAAAAAAAAAAAAAAAAAAAAAAAAhAAAAGAAAABQAAAA4EwAAGycAAAglAABZKQAAEAAAACYAAAAIAAAAAAAAAAAAAAA="/>
+                <pr:smNativeData xmlns:pr="smNativeData" val="SMDATA_13_NmGsYBMAAAAlAAAAZAAAAA8BAAAAkAAAAEgAAACQAAAASAAAAAAAAAABAAAAAAAAAAEAAABQAAAAAAAAAAAA4D8AAAAAAADgPwAAAAAAAOA/AAAAAAAA4D8AAAAAAADgPwAAAAAAAOA/AAAAAAAA4D8AAAAAAADgPwAAAAAAAOA/AAAAAAAA4D8CAAAAjAAAAAAAAAAAAAAAu+DjDP///wgAAAAAAAAAAAAAAAAAAAAAAAAAAAAAAAAAAAAAZAAAAAEAAABAAAAAAAAAAAAAAAAAAAAAAAAAAAAAAAAAAAAAAAAAAAAAAAAAAAAAAAAAAAAAAAAAAAAAAAAAAAAAAAAAAAAAAAAAAAAAAAAAAAAAAAAAAAAAAAAAAAAAFAAAADwAAAAAAAAAAAAAAAAAAAkUAAAAAQAAABQAAAAUAAAAFAAAAAEAAAAAAAAAZAAAAGQAAAAAAAAAZAAAAGQAAAAVAAAAYAAAAAAAAAAAAAAADwAAACADAAAAAAAAAAAAAAEAAACgMgAAVgcAAKr4//8BAAAAf39/AAEAAABkAAAAAAAAABQAAABAHwAAAAAAACYAAAAAAAAAwOD//wAAAAAmAAAAZAAAABYAAABMAAAAAAAAAAAAAAAEAAAAAAAAAAEAAACAgIAKAAAAACgAAAAoAAAAZAAAAGQAAAAAAAAAzMzMAAAAAABQAAAAUAAAAGQAAABkAAAAAAAAABcAAAAUAAAAAAAAAAAAAAD/fwAA/38AAAAAAAAJAAAABAAAAJ4RBAAMAAAAEAAAAAAAAAAAAAAAAAAAAAAAAAAeAAAAaAAAAAAAAAAAAAAAAAAAAAAAAAAAAAAAECcAABAnAAAAAAAAAAAAAAAAAAAAAAAAAAAAAAAAAAAAAAAAAAAAABQAAAAAAAAAwMD/AAAAAABkAAAAMgAAAAAAAABkAAAAAAAAAH9/fwAKAAAAHwAAAFQAAAAAAAAFAAAAAQAAAAAAAAAAAAAAAAAAAAAAAAAAAAAAAAAAAAAAAAAAAAAAAn9/fwAAAAADzMzMAMDA/wB/f38AAAAAAAAAAAAAAAAAAAAAAAAAAAAhAAAAGAAAABQAAAA4EwAAGycAAAglAABZKQAAEAAAACYAAAAIAAAAAAAAAAAAAAA="/>
               </a:ext>
             </a:extLst>
           </p:cNvSpPr>
@@ -1911,7 +1911,7 @@
             <a:spLocks noGrp="1" noChangeArrowheads="1"/>
             <a:extLst>
               <a:ext uri="smNativeData">
-                <pr:smNativeData xmlns:pr="smNativeData" val="SMDATA_13_KVOsYBMAAAAlAAAAZAAAAA8BAAAAkAAAAEgAAACQAAAASAAAAAAAAAABAAAAAAAAAAEAAABQAAAAAAAAAAAA4D8AAAAAAADgPwAAAAAAAOA/AAAAAAAA4D8AAAAAAADgPwAAAAAAAOA/AAAAAAAA4D8AAAAAAADgPwAAAAAAAOA/AAAAAAAA4D8CAAAAjAAAAAAAAAAAAAAAu+DjDP///wgAAAAAAAAAAAAAAAAAAAAAAAAAAAAAAAAAAAAAZAAAAAEAAABAAAAAAAAAAAAAAAAAAAAAAAAAAAAAAAAAAAAAAAAAAAAAAAAAAAAAAAAAAAAAAAAAAAAAAAAAAAAAAAAAAAAAAAAAAAAAAAAAAAAAAAAAAAAAAAAAAAAAFAAAADwAAAAAAAAAAAAAAAAAAAkUAAAAAQAAABQAAAAUAAAAFAAAAAEAAAAAAAAAZAAAAGQAAAAAAAAAZAAAAGQAAAAVAAAAYAAAAAAAAAAAAAAADwAAACADAAAAAAAAAAAAAAEAAACgMgAAVgcAAKr4//8BAAAAf39/AAEAAABkAAAAAAAAABQAAABAHwAAAAAAACYAAAAAAAAAwOD//wAAAAAmAAAAZAAAABYAAABMAAAAAAAAAAAAAAAEAAAAAAAAAAEAAACAgIAKAAAAACgAAAAoAAAAZAAAAGQAAAAAAAAAzMzMAAAAAABQAAAAUAAAAGQAAABkAAAAAAAAABcAAAAUAAAAAAAAAAAAAAD/fwAA/38AAAAAAAAJAAAABAAAAAQAxWgMAAAAEAAAAAAAAAAAAAAAAAAAAAAAAAAeAAAAaAAAAAAAAAAAAAAAAAAAAAAAAAAAAAAAECcAABAnAAAAAAAAAAAAAAAAAAAAAAAAAAAAAAAAAAAAAAAAAAAAABQAAAAAAAAAwMD/AAAAAABkAAAAMgAAAAAAAABkAAAAAAAAAH9/fwAKAAAAHwAAAFQAAAAAAAAFAAAAAQAAAAAAAAAAAAAAAAAAAAAAAAAAAAAAAAAAAAAAAAAAAAAAAn9/fwAAAAADzMzMAMDA/wB/f38AAAAAAAAAAAAAAAAAAAAAAAAAAAAhAAAAGAAAABQAAABQKAAAGycAAHA1AABZKQAAEAAAACYAAAAIAAAAAAAAAAAAAAA="/>
+                <pr:smNativeData xmlns:pr="smNativeData" val="SMDATA_13_NmGsYBMAAAAlAAAAZAAAAA8BAAAAkAAAAEgAAACQAAAASAAAAAAAAAABAAAAAAAAAAEAAABQAAAAAAAAAAAA4D8AAAAAAADgPwAAAAAAAOA/AAAAAAAA4D8AAAAAAADgPwAAAAAAAOA/AAAAAAAA4D8AAAAAAADgPwAAAAAAAOA/AAAAAAAA4D8CAAAAjAAAAAAAAAAAAAAAu+DjDP///wgAAAAAAAAAAAAAAAAAAAAAAAAAAAAAAAAAAAAAZAAAAAEAAABAAAAAAAAAAAAAAAAAAAAAAAAAAAAAAAAAAAAAAAAAAAAAAAAAAAAAAAAAAAAAAAAAAAAAAAAAAAAAAAAAAAAAAAAAAAAAAAAAAAAAAAAAAAAAAAAAAAAAFAAAADwAAAAAAAAAAAAAAAAAAAkUAAAAAQAAABQAAAAUAAAAFAAAAAEAAAAAAAAAZAAAAGQAAAAAAAAAZAAAAGQAAAAVAAAAYAAAAAAAAAAAAAAADwAAACADAAAAAAAAAAAAAAEAAACgMgAAVgcAAKr4//8BAAAAf39/AAEAAABkAAAAAAAAABQAAABAHwAAAAAAACYAAAAAAAAAwOD//wAAAAAmAAAAZAAAABYAAABMAAAAAAAAAAAAAAAEAAAAAAAAAAEAAACAgIAKAAAAACgAAAAoAAAAZAAAAGQAAAAAAAAAzMzMAAAAAABQAAAAUAAAAGQAAABkAAAAAAAAABcAAAAUAAAAAAAAAAAAAAD/fwAA/38AAAAAAAAJAAAABAAAAAQAxWgMAAAAEAAAAAAAAAAAAAAAAAAAAAAAAAAeAAAAaAAAAAAAAAAAAAAAAAAAAAAAAAAAAAAAECcAABAnAAAAAAAAAAAAAAAAAAAAAAAAAAAAAAAAAAAAAAAAAAAAABQAAAAAAAAAwMD/AAAAAABkAAAAMgAAAAAAAABkAAAAAAAAAH9/fwAKAAAAHwAAAFQAAAAAAAAFAAAAAQAAAAAAAAAAAAAAAAAAAAAAAAAAAAAAAAAAAAAAAAAAAAAAAn9/fwAAAAADzMzMAMDA/wB/f38AAAAAAAAAAAAAAAAAAAAAAAAAAAAhAAAAGAAAABQAAABQKAAAGycAAHA1AABZKQAAEAAAACYAAAAIAAAAAAAAAAAAAAA="/>
               </a:ext>
             </a:extLst>
           </p:cNvSpPr>
@@ -1925,7 +1925,7 @@
           <a:lstStyle/>
           <a:p>
             <a:pPr/>
-            <a:fld id="{3FED7DE6-A8D2-B88B-9C55-5EDE331B6A0B}" type="slidenum">
+            <a:fld id="{3FD4159E-D0D2-81E3-9C6C-26B65B226A73}" type="slidenum">
               <a:t/>
             </a:fld>
           </a:p>
@@ -1963,7 +1963,7 @@
             <a:spLocks noGrp="1" noChangeArrowheads="1"/>
             <a:extLst>
               <a:ext uri="smNativeData">
-                <pr:smNativeData xmlns:pr="smNativeData" val="SMDATA_13_KVOsYBMAAAAlAAAAZAAAAA8BAAAAkAAAAEgAAACQAAAASAAAAAAAAAABAAAAAAAAAAEAAABQAAAAAAAAAAAA4D8AAAAAAADgPwAAAAAAAOA/AAAAAAAA4D8AAAAAAADgPwAAAAAAAOA/AAAAAAAA4D8AAAAAAADgPwAAAAAAAOA/AAAAAAAA4D8CAAAAjAAAAAAAAAAAAAAAu+DjDP///wgAAAAAAAAAAAAAAAAAAAAAAAAAAAAAAAAAAAAAZAAAAAEAAABAAAAAAAAAAAAAAAAAAAAAAAAAAAAAAAAAAAAAAAAAAAAAAAAAAAAAAAAAAAAAAAAAAAAAAAAAAAAAAAAAAAAAAAAAAAAAAAAAAAAAAAAAAAAAAAAAAAAAFAAAADwAAAAAAAAAAAAAAAAAAAkUAAAAAQAAABQAAAAUAAAAFAAAAAEAAAAAAAAAZAAAAGQAAAAAAAAAZAAAAGQAAAAVAAAAYAAAAAAAAAAAAAAADwAAACADAAAAAAAAAAAAAAEAAACgMgAAVgcAAKr4//8BAAAAf39/AAEAAABkAAAAAAAAABQAAABAHwAAAAAAACYAAAAAAAAAwOD//wAAAAAmAAAAZAAAABYAAABMAAAAAAAAAAAAAAAEAAAAAAAAAAEAAACAgIAKAAAAACgAAAAoAAAAZAAAAGQAAAAAAAAAzMzMAAAAAABQAAAAUAAAAGQAAABkAAAAAAAAABcAAAAUAAAAAAAAAAAAAAD/fwAA/38AAAAAAAAJAAAABAAAAPhLhyMMAAAAEAAAAAAAAAAAAAAAAAAAAAAAAAAeAAAAaAAAAAAAAAAAAAAAAAAAAAAAAAAAAAAAECcAABAnAAAAAAAAAAAAAAAAAAAAAAAAAAAAAAAAAAAAAAAAAAAAABQAAAAAAAAAwMD/AAAAAABkAAAAMgAAAAAAAABkAAAAAAAAAH9/fwAKAAAAHwAAAFQAAAAAAAAFAAAAAQAAAAAAAAAAAAAAAAAAAAAAAAAAAAAAAAAAAAAAAAAAAAAAAn9/fwAAAAADzMzMAMDA/wB/f38AAAAAAAAAAAAAAAAAAAAAAAAAAAAhAAAAGAAAABQAAADQAgAAsAEAAHA1AAC4CAAAEAAAACYAAAAIAAAAAAAAAAAAAAA="/>
+                <pr:smNativeData xmlns:pr="smNativeData" val="SMDATA_13_NmGsYBMAAAAlAAAAZAAAAA8BAAAAkAAAAEgAAACQAAAASAAAAAAAAAABAAAAAAAAAAEAAABQAAAAAAAAAAAA4D8AAAAAAADgPwAAAAAAAOA/AAAAAAAA4D8AAAAAAADgPwAAAAAAAOA/AAAAAAAA4D8AAAAAAADgPwAAAAAAAOA/AAAAAAAA4D8CAAAAjAAAAAAAAAAAAAAAu+DjDP///wgAAAAAAAAAAAAAAAAAAAAAAAAAAAAAAAAAAAAAZAAAAAEAAABAAAAAAAAAAAAAAAAAAAAAAAAAAAAAAAAAAAAAAAAAAAAAAAAAAAAAAAAAAAAAAAAAAAAAAAAAAAAAAAAAAAAAAAAAAAAAAAAAAAAAAAAAAAAAAAAAAAAAFAAAADwAAAAAAAAAAAAAAAAAAAkUAAAAAQAAABQAAAAUAAAAFAAAAAEAAAAAAAAAZAAAAGQAAAAAAAAAZAAAAGQAAAAVAAAAYAAAAAAAAAAAAAAADwAAACADAAAAAAAAAAAAAAEAAACgMgAAVgcAAKr4//8BAAAAf39/AAEAAABkAAAAAAAAABQAAABAHwAAAAAAACYAAAAAAAAAwOD//wAAAAAmAAAAZAAAABYAAABMAAAAAAAAAAAAAAAEAAAAAAAAAAEAAACAgIAKAAAAACgAAAAoAAAAZAAAAGQAAAAAAAAAzMzMAAAAAABQAAAAUAAAAGQAAABkAAAAAAAAABcAAAAUAAAAAAAAAAAAAAD/fwAA/38AAAAAAAAJAAAABAAAAPhLhyMMAAAAEAAAAAAAAAAAAAAAAAAAAAAAAAAeAAAAaAAAAAAAAAAAAAAAAAAAAAAAAAAAAAAAECcAABAnAAAAAAAAAAAAAAAAAAAAAAAAAAAAAAAAAAAAAAAAAAAAABQAAAAAAAAAwMD/AAAAAABkAAAAMgAAAAAAAABkAAAAAAAAAH9/fwAKAAAAHwAAAFQAAAAAAAAFAAAAAQAAAAAAAAAAAAAAAAAAAAAAAAAAAAAAAAAAAAAAAAAAAAAAAn9/fwAAAAADzMzMAMDA/wB/f38AAAAAAAAAAAAAAAAAAAAAAAAAAAAhAAAAGAAAABQAAADQAgAAsAEAAHA1AAC4CAAAEAAAACYAAAAIAAAAAAAAAAAAAAA="/>
               </a:ext>
             </a:extLst>
           </p:cNvSpPr>
@@ -1990,7 +1990,7 @@
             <a:spLocks noGrp="1" noChangeArrowheads="1"/>
             <a:extLst>
               <a:ext uri="smNativeData">
-                <pr:smNativeData xmlns:pr="smNativeData" val="SMDATA_13_KVOsYBMAAAAlAAAAZAAAAA8BAAAAkAAAAEgAAACQAAAASAAAAAAAAAABAAAAAAAAAAEAAABQAAAAAAAAAAAA4D8AAAAAAADgPwAAAAAAAOA/AAAAAAAA4D8AAAAAAADgPwAAAAAAAOA/AAAAAAAA4D8AAAAAAADgPwAAAAAAAOA/AAAAAAAA4D8CAAAAjAAAAAAAAAAAAAAAu+DjDP///wgAAAAAAAAAAAAAAAAAAAAAAAAAAAAAAAAAAAAAZAAAAAEAAABAAAAAAAAAAAAAAAAAAAAAAAAAAAAAAAAAAAAAAAAAAAAAAAAAAAAAAAAAAAAAAAAAAAAAAAAAAAAAAAAAAAAAAAAAAAAAAAAAAAAAAAAAAAAAAAAAAAAAFAAAADwAAAAAAAAAAAAAAAAAAAkUAAAAAQAAABQAAAAUAAAAFAAAAAEAAAAAAAAAZAAAAGQAAAAAAAAAZAAAAGQAAAAVAAAAYAAAAAAAAAAAAAAADwAAACADAAAAAAAAAAAAAAEAAACgMgAAVgcAAKr4//8BAAAAf39/AAEAAABkAAAAAAAAABQAAABAHwAAAAAAACYAAAAAAAAAwOD//wAAAAAmAAAAZAAAABYAAABMAAAAAAAAAAAAAAAEAAAAAAAAAAEAAACAgIAKAAAAACgAAAAoAAAAZAAAAGQAAAAAAAAAzMzMAAAAAABQAAAAUAAAAGQAAABkAAAAAAAAABcAAAAUAAAAAAAAAAAAAAD/fwAA/38AAAAAAAAJAAAABAAAANMZg0QMAAAAEAAAAAAAAAAAAAAAAAAAAAAAAAAeAAAAaAAAAAAAAAAAAAAAAAAAAAAAAAAAAAAAECcAABAnAAAAAAAAAAAAAAAAAAAAAAAAAAAAAAAAAAAAAAAAAAAAABQAAAAAAAAAwMD/AAAAAABkAAAAMgAAAAAAAABkAAAAAAAAAH9/fwAKAAAAHwAAAFQAAAAAAAAFAAAAAQAAAAAAAAAAAAAAAAAAAAAAAAAAAAAAAAAAAAAAAAAAAAAAAn9/fwAAAAADzMzMAMDA/wB/f38AAAAAAAAAAAAAAAAAAAAAAAAAAAAhAAAAGAAAABQAAADQAgAAGycAAPAPAABZKQAAEAAAACYAAAAIAAAAAAAAAAAAAAA="/>
+                <pr:smNativeData xmlns:pr="smNativeData" val="SMDATA_13_NmGsYBMAAAAlAAAAZAAAAA8BAAAAkAAAAEgAAACQAAAASAAAAAAAAAABAAAAAAAAAAEAAABQAAAAAAAAAAAA4D8AAAAAAADgPwAAAAAAAOA/AAAAAAAA4D8AAAAAAADgPwAAAAAAAOA/AAAAAAAA4D8AAAAAAADgPwAAAAAAAOA/AAAAAAAA4D8CAAAAjAAAAAAAAAAAAAAAu+DjDP///wgAAAAAAAAAAAAAAAAAAAAAAAAAAAAAAAAAAAAAZAAAAAEAAABAAAAAAAAAAAAAAAAAAAAAAAAAAAAAAAAAAAAAAAAAAAAAAAAAAAAAAAAAAAAAAAAAAAAAAAAAAAAAAAAAAAAAAAAAAAAAAAAAAAAAAAAAAAAAAAAAAAAAFAAAADwAAAAAAAAAAAAAAAAAAAkUAAAAAQAAABQAAAAUAAAAFAAAAAEAAAAAAAAAZAAAAGQAAAAAAAAAZAAAAGQAAAAVAAAAYAAAAAAAAAAAAAAADwAAACADAAAAAAAAAAAAAAEAAACgMgAAVgcAAKr4//8BAAAAf39/AAEAAABkAAAAAAAAABQAAABAHwAAAAAAACYAAAAAAAAAwOD//wAAAAAmAAAAZAAAABYAAABMAAAAAAAAAAAAAAAEAAAAAAAAAAEAAACAgIAKAAAAACgAAAAoAAAAZAAAAGQAAAAAAAAAzMzMAAAAAABQAAAAUAAAAGQAAABkAAAAAAAAABcAAAAUAAAAAAAAAAAAAAD/fwAA/38AAAAAAAAJAAAABAAAANMZg0QMAAAAEAAAAAAAAAAAAAAAAAAAAAAAAAAeAAAAaAAAAAAAAAAAAAAAAAAAAAAAAAAAAAAAECcAABAnAAAAAAAAAAAAAAAAAAAAAAAAAAAAAAAAAAAAAAAAAAAAABQAAAAAAAAAwMD/AAAAAABkAAAAMgAAAAAAAABkAAAAAAAAAH9/fwAKAAAAHwAAAFQAAAAAAAAFAAAAAQAAAAAAAAAAAAAAAAAAAAAAAAAAAAAAAAAAAAAAAAAAAAAAAn9/fwAAAAADzMzMAMDA/wB/f38AAAAAAAAAAAAAAAAAAAAAAAAAAAAhAAAAGAAAABQAAADQAgAAGycAAPAPAABZKQAAEAAAACYAAAAIAAAAAAAAAAAAAAA="/>
               </a:ext>
             </a:extLst>
           </p:cNvSpPr>
@@ -2004,7 +2004,7 @@
           <a:lstStyle/>
           <a:p>
             <a:pPr/>
-            <a:fld id="{3FED49A9-E7D2-B8BF-9C55-11EA071B6A44}" type="datetime1">
+            <a:fld id="{3FD446E8-A6D2-81B0-9C6C-50E508226A05}" type="datetime1">
               <a:t/>
             </a:fld>
           </a:p>
@@ -2017,7 +2017,7 @@
             <a:spLocks noGrp="1" noChangeArrowheads="1"/>
             <a:extLst>
               <a:ext uri="smNativeData">
-                <pr:smNativeData xmlns:pr="smNativeData" val="SMDATA_13_KVOsYBMAAAAlAAAAZAAAAA8BAAAAkAAAAEgAAACQAAAASAAAAAAAAAABAAAAAAAAAAEAAABQAAAAAAAAAAAA4D8AAAAAAADgPwAAAAAAAOA/AAAAAAAA4D8AAAAAAADgPwAAAAAAAOA/AAAAAAAA4D8AAAAAAADgPwAAAAAAAOA/AAAAAAAA4D8CAAAAjAAAAAAAAAAAAAAAu+DjDP///wgAAAAAAAAAAAAAAAAAAAAAAAAAAAAAAAAAAAAAZAAAAAEAAABAAAAAAAAAAAAAAAAAAAAAAAAAAAAAAAAAAAAAAAAAAAAAAAAAAAAAAAAAAAAAAAAAAAAAAAAAAAAAAAAAAAAAAAAAAAAAAAAAAAAAAAAAAAAAAAAAAAAAFAAAADwAAAAAAAAAAAAAAAAAAAkUAAAAAQAAABQAAAAUAAAAFAAAAAEAAAAAAAAAZAAAAGQAAAAAAAAAZAAAAGQAAAAVAAAAYAAAAAAAAAAAAAAADwAAACADAAAAAAAAAAAAAAEAAACgMgAAVgcAAKr4//8BAAAAf39/AAEAAABkAAAAAAAAABQAAABAHwAAAAAAACYAAAAAAAAAwOD//wAAAAAmAAAAZAAAABYAAABMAAAAAAAAAAAAAAAEAAAAAAAAAAEAAACAgIAKAAAAACgAAAAoAAAAZAAAAGQAAAAAAAAAzMzMAAAAAABQAAAAUAAAAGQAAABkAAAAAAAAABcAAAAUAAAAAAAAAAAAAAD/fwAA/38AAAAAAAAJAAAABAAAANd5BAAMAAAAEAAAAAAAAAAAAAAAAAAAAAAAAAAeAAAAaAAAAAAAAAAAAAAAAAAAAAAAAAAAAAAAECcAABAnAAAAAAAAAAAAAAAAAAAAAAAAAAAAAAAAAAAAAAAAAAAAABQAAAAAAAAAwMD/AAAAAABkAAAAMgAAAAAAAABkAAAAAAAAAH9/fwAKAAAAHwAAAFQAAAAAAAAFAAAAAQAAAAAAAAAAAAAAAAAAAAAAAAAAAAAAAAAAAAAAAAAAAAAAAn9/fwAAAAADzMzMAMDA/wB/f38AAAAAAAAAAAAAAAAAAAAAAAAAAAAhAAAAGAAAABQAAAA4EwAAGycAAAglAABZKQAAEAAAACYAAAAIAAAAAAAAAAAAAAA="/>
+                <pr:smNativeData xmlns:pr="smNativeData" val="SMDATA_13_NmGsYBMAAAAlAAAAZAAAAA8BAAAAkAAAAEgAAACQAAAASAAAAAAAAAABAAAAAAAAAAEAAABQAAAAAAAAAAAA4D8AAAAAAADgPwAAAAAAAOA/AAAAAAAA4D8AAAAAAADgPwAAAAAAAOA/AAAAAAAA4D8AAAAAAADgPwAAAAAAAOA/AAAAAAAA4D8CAAAAjAAAAAAAAAAAAAAAu+DjDP///wgAAAAAAAAAAAAAAAAAAAAAAAAAAAAAAAAAAAAAZAAAAAEAAABAAAAAAAAAAAAAAAAAAAAAAAAAAAAAAAAAAAAAAAAAAAAAAAAAAAAAAAAAAAAAAAAAAAAAAAAAAAAAAAAAAAAAAAAAAAAAAAAAAAAAAAAAAAAAAAAAAAAAFAAAADwAAAAAAAAAAAAAAAAAAAkUAAAAAQAAABQAAAAUAAAAFAAAAAEAAAAAAAAAZAAAAGQAAAAAAAAAZAAAAGQAAAAVAAAAYAAAAAAAAAAAAAAADwAAACADAAAAAAAAAAAAAAEAAACgMgAAVgcAAKr4//8BAAAAf39/AAEAAABkAAAAAAAAABQAAABAHwAAAAAAACYAAAAAAAAAwOD//wAAAAAmAAAAZAAAABYAAABMAAAAAAAAAAAAAAAEAAAAAAAAAAEAAACAgIAKAAAAACgAAAAoAAAAZAAAAGQAAAAAAAAAzMzMAAAAAABQAAAAUAAAAGQAAABkAAAAAAAAABcAAAAUAAAAAAAAAAAAAAD/fwAA/38AAAAAAAAJAAAABAAAANd5BAAMAAAAEAAAAAAAAAAAAAAAAAAAAAAAAAAeAAAAaAAAAAAAAAAAAAAAAAAAAAAAAAAAAAAAECcAABAnAAAAAAAAAAAAAAAAAAAAAAAAAAAAAAAAAAAAAAAAAAAAABQAAAAAAAAAwMD/AAAAAABkAAAAMgAAAAAAAABkAAAAAAAAAH9/fwAKAAAAHwAAAFQAAAAAAAAFAAAAAQAAAAAAAAAAAAAAAAAAAAAAAAAAAAAAAAAAAAAAAAAAAAAAAn9/fwAAAAADzMzMAMDA/wB/f38AAAAAAAAAAAAAAAAAAAAAAAAAAAAhAAAAGAAAABQAAAA4EwAAGycAAAglAABZKQAAEAAAACYAAAAIAAAAAAAAAAAAAAA="/>
               </a:ext>
             </a:extLst>
           </p:cNvSpPr>
@@ -2041,7 +2041,7 @@
             <a:spLocks noGrp="1" noChangeArrowheads="1"/>
             <a:extLst>
               <a:ext uri="smNativeData">
-                <pr:smNativeData xmlns:pr="smNativeData" val="SMDATA_13_KVOsYBMAAAAlAAAAZAAAAA8BAAAAkAAAAEgAAACQAAAASAAAAAAAAAABAAAAAAAAAAEAAABQAAAAAAAAAAAA4D8AAAAAAADgPwAAAAAAAOA/AAAAAAAA4D8AAAAAAADgPwAAAAAAAOA/AAAAAAAA4D8AAAAAAADgPwAAAAAAAOA/AAAAAAAA4D8CAAAAjAAAAAAAAAAAAAAAu+DjDP///wgAAAAAAAAAAAAAAAAAAAAAAAAAAAAAAAAAAAAAZAAAAAEAAABAAAAAAAAAAAAAAAAAAAAAAAAAAAAAAAAAAAAAAAAAAAAAAAAAAAAAAAAAAAAAAAAAAAAAAAAAAAAAAAAAAAAAAAAAAAAAAAAAAAAAAAAAAAAAAAAAAAAAFAAAADwAAAAAAAAAAAAAAAAAAAkUAAAAAQAAABQAAAAUAAAAFAAAAAEAAAAAAAAAZAAAAGQAAAAAAAAAZAAAAGQAAAAVAAAAYAAAAAAAAAAAAAAADwAAACADAAAAAAAAAAAAAAEAAACgMgAAVgcAAKr4//8BAAAAf39/AAEAAABkAAAAAAAAABQAAABAHwAAAAAAACYAAAAAAAAAwOD//wAAAAAmAAAAZAAAABYAAABMAAAAAAAAAAAAAAAEAAAAAAAAAAEAAACAgIAKAAAAACgAAAAoAAAAZAAAAGQAAAAAAAAAzMzMAAAAAABQAAAAUAAAAGQAAABkAAAAAAAAABcAAAAUAAAAAAAAAAAAAAD/fwAA/38AAAAAAAAJAAAABAAAAP////8MAAAAEAAAAAAAAAAAAAAAAAAAAAAAAAAeAAAAaAAAAAAAAAAAAAAAAAAAAAAAAAAAAAAAECcAABAnAAAAAAAAAAAAAAAAAAAAAAAAAAAAAAAAAAAAAAAAAAAAABQAAAAAAAAAwMD/AAAAAABkAAAAMgAAAAAAAABkAAAAAAAAAH9/fwAKAAAAHwAAAFQAAAAAAAAFAAAAAQAAAAAAAAAAAAAAAAAAAAAAAAAAAAAAAAAAAAAAAAAAAAAAAn9/fwAAAAADzMzMAMDA/wB/f38AAAAAAAAAAAAAAAAAAAAAAAAAAAAhAAAAGAAAABQAAABQKAAAGycAAHA1AABZKQAAEAAAACYAAAAIAAAAAAAAAAAAAAA="/>
+                <pr:smNativeData xmlns:pr="smNativeData" val="SMDATA_13_NmGsYBMAAAAlAAAAZAAAAA8BAAAAkAAAAEgAAACQAAAASAAAAAAAAAABAAAAAAAAAAEAAABQAAAAAAAAAAAA4D8AAAAAAADgPwAAAAAAAOA/AAAAAAAA4D8AAAAAAADgPwAAAAAAAOA/AAAAAAAA4D8AAAAAAADgPwAAAAAAAOA/AAAAAAAA4D8CAAAAjAAAAAAAAAAAAAAAu+DjDP///wgAAAAAAAAAAAAAAAAAAAAAAAAAAAAAAAAAAAAAZAAAAAEAAABAAAAAAAAAAAAAAAAAAAAAAAAAAAAAAAAAAAAAAAAAAAAAAAAAAAAAAAAAAAAAAAAAAAAAAAAAAAAAAAAAAAAAAAAAAAAAAAAAAAAAAAAAAAAAAAAAAAAAFAAAADwAAAAAAAAAAAAAAAAAAAkUAAAAAQAAABQAAAAUAAAAFAAAAAEAAAAAAAAAZAAAAGQAAAAAAAAAZAAAAGQAAAAVAAAAYAAAAAAAAAAAAAAADwAAACADAAAAAAAAAAAAAAEAAACgMgAAVgcAAKr4//8BAAAAf39/AAEAAABkAAAAAAAAABQAAABAHwAAAAAAACYAAAAAAAAAwOD//wAAAAAmAAAAZAAAABYAAABMAAAAAAAAAAAAAAAEAAAAAAAAAAEAAACAgIAKAAAAACgAAAAoAAAAZAAAAGQAAAAAAAAAzMzMAAAAAABQAAAAUAAAAGQAAABkAAAAAAAAABcAAAAUAAAAAAAAAAAAAAD/fwAA/38AAAAAAAAJAAAABAAAAP////8MAAAAEAAAAAAAAAAAAAAAAAAAAAAAAAAeAAAAaAAAAAAAAAAAAAAAAAAAAAAAAAAAAAAAECcAABAnAAAAAAAAAAAAAAAAAAAAAAAAAAAAAAAAAAAAAAAAAAAAABQAAAAAAAAAwMD/AAAAAABkAAAAMgAAAAAAAABkAAAAAAAAAH9/fwAKAAAAHwAAAFQAAAAAAAAFAAAAAQAAAAAAAAAAAAAAAAAAAAAAAAAAAAAAAAAAAAAAAAAAAAAAAn9/fwAAAAADzMzMAMDA/wB/f38AAAAAAAAAAAAAAAAAAAAAAAAAAAAhAAAAGAAAABQAAABQKAAAGycAAHA1AABZKQAAEAAAACYAAAAIAAAAAAAAAAAAAAA="/>
               </a:ext>
             </a:extLst>
           </p:cNvSpPr>
@@ -2055,7 +2055,7 @@
           <a:lstStyle/>
           <a:p>
             <a:pPr/>
-            <a:fld id="{3FED128C-C2D2-B8E4-9C55-34B15C1B6A61}" type="slidenum">
+            <a:fld id="{3FD44476-38D2-81B2-9C6C-CEE70A226A9B}" type="slidenum">
               <a:t/>
             </a:fld>
           </a:p>
@@ -2093,7 +2093,7 @@
             <a:spLocks noGrp="1" noChangeArrowheads="1"/>
             <a:extLst>
               <a:ext uri="smNativeData">
-                <pr:smNativeData xmlns:pr="smNativeData" val="SMDATA_13_KVOsYBMAAAAlAAAAZAAAAA8BAAAAkAAAAEgAAACQAAAASAAAAAAAAAABAAAAAAAAAAEAAABQAAAAAAAAAAAA4D8AAAAAAADgPwAAAAAAAOA/AAAAAAAA4D8AAAAAAADgPwAAAAAAAOA/AAAAAAAA4D8AAAAAAADgPwAAAAAAAOA/AAAAAAAA4D8CAAAAjAAAAAAAAAAAAAAAu+DjDP///wgAAAAAAAAAAAAAAAAAAAAAAAAAAAAAAAAAAAAAZAAAAAEAAABAAAAAAAAAAAAAAAAAAAAAAAAAAAAAAAAAAAAAAAAAAAAAAAAAAAAAAAAAAAAAAAAAAAAAAAAAAAAAAAAAAAAAAAAAAAAAAAAAAAAAAAAAAAAAAAAAAAAAFAAAADwAAAAAAAAAAAAAAAAAAAkUAAAAAQAAABQAAAAUAAAAFAAAAAEAAAAAAAAAZAAAAGQAAAAAAAAAZAAAAGQAAAAVAAAAYAAAAAAAAAAAAAAADwAAACADAAAAAAAAAAAAAAEAAACgMgAAVgcAAKr4//8BAAAAf39/AAEAAABkAAAAAAAAABQAAABAHwAAAAAAACYAAAAAAAAAwOD//wAAAAAmAAAAZAAAABYAAABMAAAAAAAAAAAAAAAEAAAAAAAAAAEAAACAgIAKAAAAACgAAAAoAAAAZAAAAGQAAAAAAAAAzMzMAAAAAABQAAAAUAAAAGQAAABkAAAAAAAAABcAAAAUAAAAAAAAAAAAAAD/fwAA/38AAAAAAAAJAAAABAAAAAQACUoMAAAAEAAAAAAAAAAAAAAAAAAAAAAAAAAeAAAAaAAAAAAAAAAAAAAAAAAAAAAAAAAAAAAAECcAABAnAAAAAAAAAAAAAAAAAAAAAAAAAAAAAAAAAAAAAAAAAAAAABQAAAAAAAAAwMD/AAAAAABkAAAAMgAAAAAAAABkAAAAAAAAAH9/fwAKAAAAHwAAAFQAAAAAAAAFAAAAAQAAAAAAAAAAAAAAAAAAAAAAAAAAAAAAAAAAAAAAAAAAAAAAAn9/fwAAAAADzMzMAMDA/wB/f38AAAAAAAAAAAAAAAAAAAAAAAAAAAAhAAAAGAAAABQAAADQAgAAGycAAPAPAABZKQAAEAAAACYAAAAIAAAAAAAAAAAAAAA="/>
+                <pr:smNativeData xmlns:pr="smNativeData" val="SMDATA_13_NmGsYBMAAAAlAAAAZAAAAA8BAAAAkAAAAEgAAACQAAAASAAAAAAAAAABAAAAAAAAAAEAAABQAAAAAAAAAAAA4D8AAAAAAADgPwAAAAAAAOA/AAAAAAAA4D8AAAAAAADgPwAAAAAAAOA/AAAAAAAA4D8AAAAAAADgPwAAAAAAAOA/AAAAAAAA4D8CAAAAjAAAAAAAAAAAAAAAu+DjDP///wgAAAAAAAAAAAAAAAAAAAAAAAAAAAAAAAAAAAAAZAAAAAEAAABAAAAAAAAAAAAAAAAAAAAAAAAAAAAAAAAAAAAAAAAAAAAAAAAAAAAAAAAAAAAAAAAAAAAAAAAAAAAAAAAAAAAAAAAAAAAAAAAAAAAAAAAAAAAAAAAAAAAAFAAAADwAAAAAAAAAAAAAAAAAAAkUAAAAAQAAABQAAAAUAAAAFAAAAAEAAAAAAAAAZAAAAGQAAAAAAAAAZAAAAGQAAAAVAAAAYAAAAAAAAAAAAAAADwAAACADAAAAAAAAAAAAAAEAAACgMgAAVgcAAKr4//8BAAAAf39/AAEAAABkAAAAAAAAABQAAABAHwAAAAAAACYAAAAAAAAAwOD//wAAAAAmAAAAZAAAABYAAABMAAAAAAAAAAAAAAAEAAAAAAAAAAEAAACAgIAKAAAAACgAAAAoAAAAZAAAAGQAAAAAAAAAzMzMAAAAAABQAAAAUAAAAGQAAABkAAAAAAAAABcAAAAUAAAAAAAAAAAAAAD/fwAA/38AAAAAAAAJAAAABAAAAAQACUoMAAAAEAAAAAAAAAAAAAAAAAAAAAAAAAAeAAAAaAAAAAAAAAAAAAAAAAAAAAAAAAAAAAAAECcAABAnAAAAAAAAAAAAAAAAAAAAAAAAAAAAAAAAAAAAAAAAAAAAABQAAAAAAAAAwMD/AAAAAABkAAAAMgAAAAAAAABkAAAAAAAAAH9/fwAKAAAAHwAAAFQAAAAAAAAFAAAAAQAAAAAAAAAAAAAAAAAAAAAAAAAAAAAAAAAAAAAAAAAAAAAAAn9/fwAAAAADzMzMAMDA/wB/f38AAAAAAAAAAAAAAAAAAAAAAAAAAAAhAAAAGAAAABQAAADQAgAAGycAAPAPAABZKQAAEAAAACYAAAAIAAAAAAAAAAAAAAA="/>
               </a:ext>
             </a:extLst>
           </p:cNvSpPr>
@@ -2107,7 +2107,7 @@
           <a:lstStyle/>
           <a:p>
             <a:pPr/>
-            <a:fld id="{3FED2E6B-25D2-B8D8-9C55-D38D601B6A86}" type="datetime1">
+            <a:fld id="{3FD4605D-13D2-8196-9C6C-E5C32E226AB0}" type="datetime1">
               <a:t/>
             </a:fld>
           </a:p>
@@ -2120,7 +2120,7 @@
             <a:spLocks noGrp="1" noChangeArrowheads="1"/>
             <a:extLst>
               <a:ext uri="smNativeData">
-                <pr:smNativeData xmlns:pr="smNativeData" val="SMDATA_13_KVOsYBMAAAAlAAAAZAAAAA8BAAAAkAAAAEgAAACQAAAASAAAAAAAAAABAAAAAAAAAAEAAABQAAAAAAAAAAAA4D8AAAAAAADgPwAAAAAAAOA/AAAAAAAA4D8AAAAAAADgPwAAAAAAAOA/AAAAAAAA4D8AAAAAAADgPwAAAAAAAOA/AAAAAAAA4D8CAAAAjAAAAAAAAAAAAAAAu+DjDP///wgAAAAAAAAAAAAAAAAAAAAAAAAAAAAAAAAAAAAAZAAAAAEAAABAAAAAAAAAAAAAAAAAAAAAAAAAAAAAAAAAAAAAAAAAAAAAAAAAAAAAAAAAAAAAAAAAAAAAAAAAAAAAAAAAAAAAAAAAAAAAAAAAAAAAAAAAAAAAAAAAAAAAFAAAADwAAAAAAAAAAAAAAAAAAAkUAAAAAQAAABQAAAAUAAAAFAAAAAEAAAAAAAAAZAAAAGQAAAAAAAAAZAAAAGQAAAAVAAAAYAAAAAAAAAAAAAAADwAAACADAAAAAAAAAAAAAAEAAACgMgAAVgcAAKr4//8BAAAAf39/AAEAAABkAAAAAAAAABQAAABAHwAAAAAAACYAAAAAAAAAwOD//wAAAAAmAAAAZAAAABYAAABMAAAAAAAAAAAAAAAEAAAAAAAAAAEAAACAgIAKAAAAACgAAAAoAAAAZAAAAGQAAAAAAAAAzMzMAAAAAABQAAAAUAAAAGQAAABkAAAAAAAAABcAAAAUAAAAAAAAAAAAAAD/fwAA/38AAAAAAAAJAAAABAAAAP////8MAAAAEAAAAAAAAAAAAAAAAAAAAAAAAAAeAAAAaAAAAAAAAAAAAAAAAAAAAAAAAAAAAAAAECcAABAnAAAAAAAAAAAAAAAAAAAAAAAAAAAAAAAAAAAAAAAAAAAAABQAAAAAAAAAwMD/AAAAAABkAAAAMgAAAAAAAABkAAAAAAAAAH9/fwAKAAAAHwAAAFQAAAAAAAAFAAAAAQAAAAAAAAAAAAAAAAAAAAAAAAAAAAAAAAAAAAAAAAAAAAAAAn9/fwAAAAADzMzMAMDA/wB/f38AAAAAAAAAAAAAAAAAAAAAAAAAAAAhAAAAGAAAABQAAAA4EwAAGycAAAglAABZKQAAEAAAACYAAAAIAAAAAAAAAAAAAAA="/>
+                <pr:smNativeData xmlns:pr="smNativeData" val="SMDATA_13_NmGsYBMAAAAlAAAAZAAAAA8BAAAAkAAAAEgAAACQAAAASAAAAAAAAAABAAAAAAAAAAEAAABQAAAAAAAAAAAA4D8AAAAAAADgPwAAAAAAAOA/AAAAAAAA4D8AAAAAAADgPwAAAAAAAOA/AAAAAAAA4D8AAAAAAADgPwAAAAAAAOA/AAAAAAAA4D8CAAAAjAAAAAAAAAAAAAAAu+DjDP///wgAAAAAAAAAAAAAAAAAAAAAAAAAAAAAAAAAAAAAZAAAAAEAAABAAAAAAAAAAAAAAAAAAAAAAAAAAAAAAAAAAAAAAAAAAAAAAAAAAAAAAAAAAAAAAAAAAAAAAAAAAAAAAAAAAAAAAAAAAAAAAAAAAAAAAAAAAAAAAAAAAAAAFAAAADwAAAAAAAAAAAAAAAAAAAkUAAAAAQAAABQAAAAUAAAAFAAAAAEAAAAAAAAAZAAAAGQAAAAAAAAAZAAAAGQAAAAVAAAAYAAAAAAAAAAAAAAADwAAACADAAAAAAAAAAAAAAEAAACgMgAAVgcAAKr4//8BAAAAf39/AAEAAABkAAAAAAAAABQAAABAHwAAAAAAACYAAAAAAAAAwOD//wAAAAAmAAAAZAAAABYAAABMAAAAAAAAAAAAAAAEAAAAAAAAAAEAAACAgIAKAAAAACgAAAAoAAAAZAAAAGQAAAAAAAAAzMzMAAAAAABQAAAAUAAAAGQAAABkAAAAAAAAABcAAAAUAAAAAAAAAAAAAAD/fwAA/38AAAAAAAAJAAAABAAAAP////8MAAAAEAAAAAAAAAAAAAAAAAAAAAAAAAAeAAAAaAAAAAAAAAAAAAAAAAAAAAAAAAAAAAAAECcAABAnAAAAAAAAAAAAAAAAAAAAAAAAAAAAAAAAAAAAAAAAAAAAABQAAAAAAAAAwMD/AAAAAABkAAAAMgAAAAAAAABkAAAAAAAAAH9/fwAKAAAAHwAAAFQAAAAAAAAFAAAAAQAAAAAAAAAAAAAAAAAAAAAAAAAAAAAAAAAAAAAAAAAAAAAAAn9/fwAAAAADzMzMAMDA/wB/f38AAAAAAAAAAAAAAAAAAAAAAAAAAAAhAAAAGAAAABQAAAA4EwAAGycAAAglAABZKQAAEAAAACYAAAAIAAAAAAAAAAAAAAA="/>
               </a:ext>
             </a:extLst>
           </p:cNvSpPr>
@@ -2144,7 +2144,7 @@
             <a:spLocks noGrp="1" noChangeArrowheads="1"/>
             <a:extLst>
               <a:ext uri="smNativeData">
-                <pr:smNativeData xmlns:pr="smNativeData" val="SMDATA_13_KVOsYBMAAAAlAAAAZAAAAA8BAAAAkAAAAEgAAACQAAAASAAAAAAAAAABAAAAAAAAAAEAAABQAAAAAAAAAAAA4D8AAAAAAADgPwAAAAAAAOA/AAAAAAAA4D8AAAAAAADgPwAAAAAAAOA/AAAAAAAA4D8AAAAAAADgPwAAAAAAAOA/AAAAAAAA4D8CAAAAjAAAAAAAAAAAAAAAu+DjDP///wgAAAAAAAAAAAAAAAAAAAAAAAAAAAAAAAAAAAAAZAAAAAEAAABAAAAAAAAAAAAAAAAAAAAAAAAAAAAAAAAAAAAAAAAAAAAAAAAAAAAAAAAAAAAAAAAAAAAAAAAAAAAAAAAAAAAAAAAAAAAAAAAAAAAAAAAAAAAAAAAAAAAAFAAAADwAAAAAAAAAAAAAAAAAAAkUAAAAAQAAABQAAAAUAAAAFAAAAAEAAAAAAAAAZAAAAGQAAAAAAAAAZAAAAGQAAAAVAAAAYAAAAAAAAAAAAAAADwAAACADAAAAAAAAAAAAAAEAAACgMgAAVgcAAKr4//8BAAAAf39/AAEAAABkAAAAAAAAABQAAABAHwAAAAAAACYAAAAAAAAAwOD//wAAAAAmAAAAZAAAABYAAABMAAAAAAAAAAAAAAAEAAAAAAAAAAEAAACAgIAKAAAAACgAAAAoAAAAZAAAAGQAAAAAAAAAzMzMAAAAAABQAAAAUAAAAGQAAABkAAAAAAAAABcAAAAUAAAAAAAAAAAAAAD/fwAA/38AAAAAAAAJAAAABAAAAP////8MAAAAEAAAAAAAAAAAAAAAAAAAAAAAAAAeAAAAaAAAAAAAAAAAAAAAAAAAAAAAAAAAAAAAECcAABAnAAAAAAAAAAAAAAAAAAAAAAAAAAAAAAAAAAAAAAAAAAAAABQAAAAAAAAAwMD/AAAAAABkAAAAMgAAAAAAAABkAAAAAAAAAH9/fwAKAAAAHwAAAFQAAAAAAAAFAAAAAQAAAAAAAAAAAAAAAAAAAAAAAAAAAAAAAAAAAAAAAAAAAAAAAn9/fwAAAAADzMzMAMDA/wB/f38AAAAAAAAAAAAAAAAAAAAAAAAAAAAhAAAAGAAAABQAAABQKAAAGycAAHA1AABZKQAAEAAAACYAAAAIAAAAAAAAAAAAAAA="/>
+                <pr:smNativeData xmlns:pr="smNativeData" val="SMDATA_13_NmGsYBMAAAAlAAAAZAAAAA8BAAAAkAAAAEgAAACQAAAASAAAAAAAAAABAAAAAAAAAAEAAABQAAAAAAAAAAAA4D8AAAAAAADgPwAAAAAAAOA/AAAAAAAA4D8AAAAAAADgPwAAAAAAAOA/AAAAAAAA4D8AAAAAAADgPwAAAAAAAOA/AAAAAAAA4D8CAAAAjAAAAAAAAAAAAAAAu+DjDP///wgAAAAAAAAAAAAAAAAAAAAAAAAAAAAAAAAAAAAAZAAAAAEAAABAAAAAAAAAAAAAAAAAAAAAAAAAAAAAAAAAAAAAAAAAAAAAAAAAAAAAAAAAAAAAAAAAAAAAAAAAAAAAAAAAAAAAAAAAAAAAAAAAAAAAAAAAAAAAAAAAAAAAFAAAADwAAAAAAAAAAAAAAAAAAAkUAAAAAQAAABQAAAAUAAAAFAAAAAEAAAAAAAAAZAAAAGQAAAAAAAAAZAAAAGQAAAAVAAAAYAAAAAAAAAAAAAAADwAAACADAAAAAAAAAAAAAAEAAACgMgAAVgcAAKr4//8BAAAAf39/AAEAAABkAAAAAAAAABQAAABAHwAAAAAAACYAAAAAAAAAwOD//wAAAAAmAAAAZAAAABYAAABMAAAAAAAAAAAAAAAEAAAAAAAAAAEAAACAgIAKAAAAACgAAAAoAAAAZAAAAGQAAAAAAAAAzMzMAAAAAABQAAAAUAAAAGQAAABkAAAAAAAAABcAAAAUAAAAAAAAAAAAAAD/fwAA/38AAAAAAAAJAAAABAAAAP////8MAAAAEAAAAAAAAAAAAAAAAAAAAAAAAAAeAAAAaAAAAAAAAAAAAAAAAAAAAAAAAAAAAAAAECcAABAnAAAAAAAAAAAAAAAAAAAAAAAAAAAAAAAAAAAAAAAAAAAAABQAAAAAAAAAwMD/AAAAAABkAAAAMgAAAAAAAABkAAAAAAAAAH9/fwAKAAAAHwAAAFQAAAAAAAAFAAAAAQAAAAAAAAAAAAAAAAAAAAAAAAAAAAAAAAAAAAAAAAAAAAAAAn9/fwAAAAADzMzMAMDA/wB/f38AAAAAAAAAAAAAAAAAAAAAAAAAAAAhAAAAGAAAABQAAABQKAAAGycAAHA1AABZKQAAEAAAACYAAAAIAAAAAAAAAAAAAAA="/>
               </a:ext>
             </a:extLst>
           </p:cNvSpPr>
@@ -2158,7 +2158,7 @@
           <a:lstStyle/>
           <a:p>
             <a:pPr/>
-            <a:fld id="{3FED1A09-47D2-B8EC-9C55-B1B9541B6AE4}" type="slidenum">
+            <a:fld id="{3FD4480E-40D2-81BE-9C6C-B6EB06226AE3}" type="slidenum">
               <a:t/>
             </a:fld>
           </a:p>
@@ -2196,7 +2196,7 @@
             <a:spLocks noGrp="1" noChangeArrowheads="1"/>
             <a:extLst>
               <a:ext uri="smNativeData">
-                <pr:smNativeData xmlns:pr="smNativeData" val="SMDATA_13_KVOsYBMAAAAlAAAAZAAAAA8BAAAAkAAAAEgAAACQAAAASAAAAAAAAAACAAAAAAAAAAEAAABQAAAAAAAAAAAA4D8AAAAAAADgPwAAAAAAAOA/AAAAAAAA4D8AAAAAAADgPwAAAAAAAOA/AAAAAAAA4D8AAAAAAADgPwAAAAAAAOA/AAAAAAAA4D8CAAAAjAAAAAAAAAAAAAAAu+DjDP///wgAAAAAAAAAAAAAAAAAAAAAAAAAAAAAAAAAAAAAZAAAAAEAAABAAAAAAAAAAAAAAAAAAAAAAAAAAAAAAAAAAAAAAAAAAAAAAAAAAAAAAAAAAAAAAAAAAAAAAAAAAAAAAAAAAAAAAAAAAAAAAAAAAAAAAAAAAAAAAAAAAAAAFAAAADwAAAAAAAAAAAAAAAAAAAkUAAAAAQAAABQAAAAUAAAAFAAAAAEAAAAAAAAAZAAAAGQAAAAAAAAAZAAAAGQAAAAVAAAAYAAAAAAAAAAAAAAADwAAACADAAAAAAAAAAAAAAEAAACgMgAAVgcAAKr4//8BAAAAf39/AAEAAABkAAAAAAAAABQAAABAHwAAAAAAACYAAAAAAAAAwOD//wAAAAAmAAAAZAAAABYAAABMAAAAAAAAAAAAAAAEAAAAAAAAAAEAAACAgIAKAAAAACgAAAAoAAAAZAAAAGQAAAAAAAAAzMzMAAAAAABQAAAAUAAAAGQAAABkAAAAAAAAABcAAAAUAAAAAAAAAAAAAAD/fwAA/38AAAAAAAAJAAAABAAAAItEHmgMAAAAEAAAAAAAAAAAAAAAAAAAAAAAAAAeAAAAaAAAAAAAAAAAAAAAAAAAAAAAAAAAAAAAECcAABAnAAAAAAAAAAAAAAAAAAAAAAAAAAAAAAAAAAAAAAAAAAAAABQAAAAAAAAAwMD/AAAAAABkAAAAMgAAAAAAAABkAAAAAAAAAH9/fwAKAAAAHwAAAFQAAAAAAAAFAAAAAQAAAAAAAAAAAAAAAAAAAAAAAAAAAAAAAAAAAAAAAAAAAAAAAn9/fwAAAAADzMzMAMDA/wB/f38AAAAAAAAAAAAAAAAAAAAAAAAAAAAhAAAAGAAAABQAAADQAgAArgEAAFIVAADUCAAAEAAAACYAAAAIAAAAgYAAAAAAAAA="/>
+                <pr:smNativeData xmlns:pr="smNativeData" val="SMDATA_13_NmGsYBMAAAAlAAAAZAAAAA8BAAAAkAAAAEgAAACQAAAASAAAAAAAAAACAAAAAAAAAAEAAABQAAAAAAAAAAAA4D8AAAAAAADgPwAAAAAAAOA/AAAAAAAA4D8AAAAAAADgPwAAAAAAAOA/AAAAAAAA4D8AAAAAAADgPwAAAAAAAOA/AAAAAAAA4D8CAAAAjAAAAAAAAAAAAAAAu+DjDP///wgAAAAAAAAAAAAAAAAAAAAAAAAAAAAAAAAAAAAAZAAAAAEAAABAAAAAAAAAAAAAAAAAAAAAAAAAAAAAAAAAAAAAAAAAAAAAAAAAAAAAAAAAAAAAAAAAAAAAAAAAAAAAAAAAAAAAAAAAAAAAAAAAAAAAAAAAAAAAAAAAAAAAFAAAADwAAAAAAAAAAAAAAAAAAAkUAAAAAQAAABQAAAAUAAAAFAAAAAEAAAAAAAAAZAAAAGQAAAAAAAAAZAAAAGQAAAAVAAAAYAAAAAAAAAAAAAAADwAAACADAAAAAAAAAAAAAAEAAACgMgAAVgcAAKr4//8BAAAAf39/AAEAAABkAAAAAAAAABQAAABAHwAAAAAAACYAAAAAAAAAwOD//wAAAAAmAAAAZAAAABYAAABMAAAAAAAAAAAAAAAEAAAAAAAAAAEAAACAgIAKAAAAACgAAAAoAAAAZAAAAGQAAAAAAAAAzMzMAAAAAABQAAAAUAAAAGQAAABkAAAAAAAAABcAAAAUAAAAAAAAAAAAAAD/fwAA/38AAAAAAAAJAAAABAAAAItEHmgMAAAAEAAAAAAAAAAAAAAAAAAAAAAAAAAeAAAAaAAAAAAAAAAAAAAAAAAAAAAAAAAAAAAAECcAABAnAAAAAAAAAAAAAAAAAAAAAAAAAAAAAAAAAAAAAAAAAAAAABQAAAAAAAAAwMD/AAAAAABkAAAAMgAAAAAAAABkAAAAAAAAAH9/fwAKAAAAHwAAAFQAAAAAAAAFAAAAAQAAAAAAAAAAAAAAAAAAAAAAAAAAAAAAAAAAAAAAAAAAAAAAAn9/fwAAAAADzMzMAMDA/wB/f38AAAAAAAAAAAAAAAAAAAAAAAAAAAAhAAAAGAAAABQAAADQAgAArgEAAFIVAADUCAAAEAAAACYAAAAIAAAAgYAAAAAAAAA="/>
               </a:ext>
             </a:extLst>
           </p:cNvSpPr>
@@ -2236,7 +2236,7 @@
             <a:spLocks noGrp="1" noChangeArrowheads="1"/>
             <a:extLst>
               <a:ext uri="smNativeData">
-                <pr:smNativeData xmlns:pr="smNativeData" val="SMDATA_13_KVOsYBMAAAAlAAAAZAAAAA8BAAAAkAAAAEgAAACQAAAASAAAAAAAAAAAAAAAAAAAAAEAAABQAAAAAAAAAAAA4D8AAAAAAADgPwAAAAAAAOA/AAAAAAAA4D8AAAAAAADgPwAAAAAAAOA/AAAAAAAA4D8AAAAAAADgPwAAAAAAAOA/AAAAAAAA4D8CAAAAjAAAAAAAAAAAAAAAu+DjDP///wgAAAAAAAAAAAAAAAAAAAAAAAAAAAAAAAAAAAAAZAAAAAEAAABAAAAAAAAAAAAAAAAAAAAAAAAAAAAAAAAAAAAAAAAAAAAAAAAAAAAAAAAAAAAAAAAAAAAAAAAAAAAAAAAAAAAAAAAAAAAAAAAAAAAAAAAAAAAAAAAAAAAAFAAAADwAAAAAAAAAAAAAAAAAAAkUAAAAAQAAABQAAAAUAAAAFAAAAAEAAAAAAAAAZAAAAGQAAAAAAAAAZAAAAGQAAAAVAAAAYAAAAAAAAAAAAAAADwAAACADAAAAAAAAAAAAAAEAAACgMgAAVgcAAKr4//8BAAAAf39/AAEAAABkAAAAAAAAABQAAABAHwAAAAAAACYAAAAAAAAAwOD//wAAAAAmAAAAZAAAABYAAABMAAAAAAAAAAAAAAAEAAAAAAAAAAEAAACAgIAKAAAAACgAAAAoAAAAZAAAAGQAAAAAAAAAzMzMAAAAAABQAAAAUAAAAGQAAABkAAAAAAAAABcAAAAUAAAAAAAAAAAAAAD/fwAA/38AAAAAAAAJAAAABAAAAAAAAAAMAAAAEAAAAAAAAAAAAAAAAAAAAAAAAAAeAAAAaAAAAAAAAAAAAAAAAAAAAAAAAAAAAAAAECcAABAnAAAAAAAAAAAAAAAAAAAAAAAAAAAAAAAAAAAAAAAAAAAAABQAAAAAAAAAwMD/AAAAAABkAAAAMgAAAAAAAABkAAAAAAAAAH9/fwAKAAAAHwAAAFQAAAAAAAAFAAAAAQAAAAAAAAAAAAAAAAAAAAAAAAAAAAAAAAAAAAAAAAAAAAAAAn9/fwAAAAADzMzMAMDA/wB/f38AAAAAAAAAAAAAAAAAAAAAAAAAAAAhAAAAGAAAABQAAAD+FQAArgEAAHA1AACwJQAAEAAAACYAAAAIAAAAAYAAAAAAAAA="/>
+                <pr:smNativeData xmlns:pr="smNativeData" val="SMDATA_13_NmGsYBMAAAAlAAAAZAAAAA8BAAAAkAAAAEgAAACQAAAASAAAAAAAAAAAAAAAAAAAAAEAAABQAAAAAAAAAAAA4D8AAAAAAADgPwAAAAAAAOA/AAAAAAAA4D8AAAAAAADgPwAAAAAAAOA/AAAAAAAA4D8AAAAAAADgPwAAAAAAAOA/AAAAAAAA4D8CAAAAjAAAAAAAAAAAAAAAu+DjDP///wgAAAAAAAAAAAAAAAAAAAAAAAAAAAAAAAAAAAAAZAAAAAEAAABAAAAAAAAAAAAAAAAAAAAAAAAAAAAAAAAAAAAAAAAAAAAAAAAAAAAAAAAAAAAAAAAAAAAAAAAAAAAAAAAAAAAAAAAAAAAAAAAAAAAAAAAAAAAAAAAAAAAAFAAAADwAAAAAAAAAAAAAAAAAAAkUAAAAAQAAABQAAAAUAAAAFAAAAAEAAAAAAAAAZAAAAGQAAAAAAAAAZAAAAGQAAAAVAAAAYAAAAAAAAAAAAAAADwAAACADAAAAAAAAAAAAAAEAAACgMgAAVgcAAKr4//8BAAAAf39/AAEAAABkAAAAAAAAABQAAABAHwAAAAAAACYAAAAAAAAAwOD//wAAAAAmAAAAZAAAABYAAABMAAAAAAAAAAAAAAAEAAAAAAAAAAEAAACAgIAKAAAAACgAAAAoAAAAZAAAAGQAAAAAAAAAzMzMAAAAAABQAAAAUAAAAGQAAABkAAAAAAAAABcAAAAUAAAAAAAAAAAAAAD/fwAA/38AAAAAAAAJAAAABAAAAAAAAAAMAAAAEAAAAAAAAAAAAAAAAAAAAAAAAAAeAAAAaAAAAAAAAAAAAAAAAAAAAAAAAAAAAAAAECcAABAnAAAAAAAAAAAAAAAAAAAAAAAAAAAAAAAAAAAAAAAAAAAAABQAAAAAAAAAwMD/AAAAAABkAAAAMgAAAAAAAABkAAAAAAAAAH9/fwAKAAAAHwAAAFQAAAAAAAAFAAAAAQAAAAAAAAAAAAAAAAAAAAAAAAAAAAAAAAAAAAAAAAAAAAAAAn9/fwAAAAADzMzMAMDA/wB/f38AAAAAAAAAAAAAAAAAAAAAAAAAAAAhAAAAGAAAABQAAAD+FQAArgEAAHA1AACwJQAAEAAAACYAAAAIAAAAAYAAAAAAAAA="/>
               </a:ext>
             </a:extLst>
           </p:cNvSpPr>
@@ -2320,7 +2320,7 @@
             <a:spLocks noGrp="1" noChangeArrowheads="1"/>
             <a:extLst>
               <a:ext uri="smNativeData">
-                <pr:smNativeData xmlns:pr="smNativeData" val="SMDATA_13_KVOsYBMAAAAlAAAAZAAAAA8BAAAAkAAAAEgAAACQAAAASAAAAAAAAAAAAAAAAAAAAAEAAABQAAAAAAAAAAAA4D8AAAAAAADgPwAAAAAAAOA/AAAAAAAA4D8AAAAAAADgPwAAAAAAAOA/AAAAAAAA4D8AAAAAAADgPwAAAAAAAOA/AAAAAAAA4D8CAAAAjAAAAAAAAAAAAAAAu+DjDP///wgAAAAAAAAAAAAAAAAAAAAAAAAAAAAAAAAAAAAAZAAAAAEAAABAAAAAAAAAAAAAAAAAAAAAAAAAAAAAAAAAAAAAAAAAAAAAAAAAAAAAAAAAAAAAAAAAAAAAAAAAAAAAAAAAAAAAAAAAAAAAAAAAAAAAAAAAAAAAAAAAAAAAFAAAADwAAAAAAAAAAAAAAAAAAAkUAAAAAQAAABQAAAAUAAAAFAAAAAEAAAAAAAAAZAAAAGQAAAAAAAAAZAAAAGQAAAAVAAAAYAAAAAAAAAAAAAAADwAAACADAAAAAAAAAAAAAAEAAACgMgAAVgcAAKr4//8BAAAAf39/AAEAAABkAAAAAAAAABQAAABAHwAAAAAAACYAAAAAAAAAwOD//wAAAAAmAAAAZAAAABYAAABMAAAAAAAAAAAAAAAEAAAAAAAAAAEAAACAgIAKAAAAACgAAAAoAAAAZAAAAGQAAAAAAAAAzMzMAAAAAABQAAAAUAAAAGQAAABkAAAAAAAAABcAAAAUAAAAAAAAAAAAAAD/fwAA/38AAAAAAAAJAAAABAAAAAAAAAAMAAAAEAAAAAAAAAAAAAAAAAAAAAAAAAAeAAAAaAAAAAAAAAAAAAAAAAAAAAAAAAAAAAAAECcAABAnAAAAAAAAAAAAAAAAAAAAAAAAAAAAAAAAAAAAAAAAAAAAABQAAAAAAAAAwMD/AAAAAABkAAAAMgAAAAAAAABkAAAAAAAAAH9/fwAKAAAAHwAAAFQAAAAAAAAFAAAAAQAAAAAAAAAAAAAAAAAAAAAAAAAAAAAAAAAAAAAAAAAAAAAAAn9/fwAAAAADzMzMAMDA/wB/f38AAAAAAAAAAAAAAAAAAAAAAAAAAAAhAAAAGAAAABQAAADQAgAA1AgAAFIVAACwJQAAEAAAACYAAAAIAAAAAYAAAAAAAAA="/>
+                <pr:smNativeData xmlns:pr="smNativeData" val="SMDATA_13_NmGsYBMAAAAlAAAAZAAAAA8BAAAAkAAAAEgAAACQAAAASAAAAAAAAAAAAAAAAAAAAAEAAABQAAAAAAAAAAAA4D8AAAAAAADgPwAAAAAAAOA/AAAAAAAA4D8AAAAAAADgPwAAAAAAAOA/AAAAAAAA4D8AAAAAAADgPwAAAAAAAOA/AAAAAAAA4D8CAAAAjAAAAAAAAAAAAAAAu+DjDP///wgAAAAAAAAAAAAAAAAAAAAAAAAAAAAAAAAAAAAAZAAAAAEAAABAAAAAAAAAAAAAAAAAAAAAAAAAAAAAAAAAAAAAAAAAAAAAAAAAAAAAAAAAAAAAAAAAAAAAAAAAAAAAAAAAAAAAAAAAAAAAAAAAAAAAAAAAAAAAAAAAAAAAFAAAADwAAAAAAAAAAAAAAAAAAAkUAAAAAQAAABQAAAAUAAAAFAAAAAEAAAAAAAAAZAAAAGQAAAAAAAAAZAAAAGQAAAAVAAAAYAAAAAAAAAAAAAAADwAAACADAAAAAAAAAAAAAAEAAACgMgAAVgcAAKr4//8BAAAAf39/AAEAAABkAAAAAAAAABQAAABAHwAAAAAAACYAAAAAAAAAwOD//wAAAAAmAAAAZAAAABYAAABMAAAAAAAAAAAAAAAEAAAAAAAAAAEAAACAgIAKAAAAACgAAAAoAAAAZAAAAGQAAAAAAAAAzMzMAAAAAABQAAAAUAAAAGQAAABkAAAAAAAAABcAAAAUAAAAAAAAAAAAAAD/fwAA/38AAAAAAAAJAAAABAAAAAAAAAAMAAAAEAAAAAAAAAAAAAAAAAAAAAAAAAAeAAAAaAAAAAAAAAAAAAAAAAAAAAAAAAAAAAAAECcAABAnAAAAAAAAAAAAAAAAAAAAAAAAAAAAAAAAAAAAAAAAAAAAABQAAAAAAAAAwMD/AAAAAABkAAAAMgAAAAAAAABkAAAAAAAAAH9/fwAKAAAAHwAAAFQAAAAAAAAFAAAAAQAAAAAAAAAAAAAAAAAAAAAAAAAAAAAAAAAAAAAAAAAAAAAAAn9/fwAAAAADzMzMAMDA/wB/f38AAAAAAAAAAAAAAAAAAAAAAAAAAAAhAAAAGAAAABQAAADQAgAA1AgAAFIVAACwJQAAEAAAACYAAAAIAAAAAYAAAAAAAAA="/>
               </a:ext>
             </a:extLst>
           </p:cNvSpPr>
@@ -2389,7 +2389,7 @@
             <a:spLocks noGrp="1" noChangeArrowheads="1"/>
             <a:extLst>
               <a:ext uri="smNativeData">
-                <pr:smNativeData xmlns:pr="smNativeData" val="SMDATA_13_KVOsYBMAAAAlAAAAZAAAAA8BAAAAkAAAAEgAAACQAAAASAAAAAAAAAABAAAAAAAAAAEAAABQAAAAAAAAAAAA4D8AAAAAAADgPwAAAAAAAOA/AAAAAAAA4D8AAAAAAADgPwAAAAAAAOA/AAAAAAAA4D8AAAAAAADgPwAAAAAAAOA/AAAAAAAA4D8CAAAAjAAAAAAAAAAAAAAAu+DjDP///wgAAAAAAAAAAAAAAAAAAAAAAAAAAAAAAAAAAAAAZAAAAAEAAABAAAAAAAAAAAAAAAAAAAAAAAAAAAAAAAAAAAAAAAAAAAAAAAAAAAAAAAAAAAAAAAAAAAAAAAAAAAAAAAAAAAAAAAAAAAAAAAAAAAAAAAAAAAAAAAAAAAAAFAAAADwAAAAAAAAAAAAAAAAAAAkUAAAAAQAAABQAAAAUAAAAFAAAAAEAAAAAAAAAZAAAAGQAAAAAAAAAZAAAAGQAAAAVAAAAYAAAAAAAAAAAAAAADwAAACADAAAAAAAAAAAAAAEAAACgMgAAVgcAAKr4//8BAAAAf39/AAEAAABkAAAAAAAAABQAAABAHwAAAAAAACYAAAAAAAAAwOD//wAAAAAmAAAAZAAAABYAAABMAAAAAAAAAAAAAAAEAAAAAAAAAAEAAACAgIAKAAAAACgAAAAoAAAAZAAAAGQAAAAAAAAAzMzMAAAAAABQAAAAUAAAAGQAAABkAAAAAAAAABcAAAAUAAAAAAAAAAAAAAD/fwAA/38AAAAAAAAJAAAABAAAAAAAAAAMAAAAEAAAAAAAAAAAAAAAAAAAAAAAAAAeAAAAaAAAAAAAAAAAAAAAAAAAAAAAAAAAAAAAECcAABAnAAAAAAAAAAAAAAAAAAAAAAAAAAAAAAAAAAAAAAAAAAAAABQAAAAAAAAAwMD/AAAAAABkAAAAMgAAAAAAAABkAAAAAAAAAH9/fwAKAAAAHwAAAFQAAAAAAAAFAAAAAQAAAAAAAAAAAAAAAAAAAAAAAAAAAAAAAAAAAAAAAAAAAAAAAn9/fwAAAAADzMzMAMDA/wB/f38AAAAAAAAAAAAAAAAAAAAAAAAAAAAhAAAAGAAAABQAAADQAgAAGycAAPAPAABZKQAAEAAAACYAAAAIAAAAAAAAAAAAAAA="/>
+                <pr:smNativeData xmlns:pr="smNativeData" val="SMDATA_13_NmGsYBMAAAAlAAAAZAAAAA8BAAAAkAAAAEgAAACQAAAASAAAAAAAAAABAAAAAAAAAAEAAABQAAAAAAAAAAAA4D8AAAAAAADgPwAAAAAAAOA/AAAAAAAA4D8AAAAAAADgPwAAAAAAAOA/AAAAAAAA4D8AAAAAAADgPwAAAAAAAOA/AAAAAAAA4D8CAAAAjAAAAAAAAAAAAAAAu+DjDP///wgAAAAAAAAAAAAAAAAAAAAAAAAAAAAAAAAAAAAAZAAAAAEAAABAAAAAAAAAAAAAAAAAAAAAAAAAAAAAAAAAAAAAAAAAAAAAAAAAAAAAAAAAAAAAAAAAAAAAAAAAAAAAAAAAAAAAAAAAAAAAAAAAAAAAAAAAAAAAAAAAAAAAFAAAADwAAAAAAAAAAAAAAAAAAAkUAAAAAQAAABQAAAAUAAAAFAAAAAEAAAAAAAAAZAAAAGQAAAAAAAAAZAAAAGQAAAAVAAAAYAAAAAAAAAAAAAAADwAAACADAAAAAAAAAAAAAAEAAACgMgAAVgcAAKr4//8BAAAAf39/AAEAAABkAAAAAAAAABQAAABAHwAAAAAAACYAAAAAAAAAwOD//wAAAAAmAAAAZAAAABYAAABMAAAAAAAAAAAAAAAEAAAAAAAAAAEAAACAgIAKAAAAACgAAAAoAAAAZAAAAGQAAAAAAAAAzMzMAAAAAABQAAAAUAAAAGQAAABkAAAAAAAAABcAAAAUAAAAAAAAAAAAAAD/fwAA/38AAAAAAAAJAAAABAAAAAAAAAAMAAAAEAAAAAAAAAAAAAAAAAAAAAAAAAAeAAAAaAAAAAAAAAAAAAAAAAAAAAAAAAAAAAAAECcAABAnAAAAAAAAAAAAAAAAAAAAAAAAAAAAAAAAAAAAAAAAAAAAABQAAAAAAAAAwMD/AAAAAABkAAAAMgAAAAAAAABkAAAAAAAAAH9/fwAKAAAAHwAAAFQAAAAAAAAFAAAAAQAAAAAAAAAAAAAAAAAAAAAAAAAAAAAAAAAAAAAAAAAAAAAAAn9/fwAAAAADzMzMAMDA/wB/f38AAAAAAAAAAAAAAAAAAAAAAAAAAAAhAAAAGAAAABQAAADQAgAAGycAAPAPAABZKQAAEAAAACYAAAAIAAAAAAAAAAAAAAA="/>
               </a:ext>
             </a:extLst>
           </p:cNvSpPr>
@@ -2403,7 +2403,7 @@
           <a:lstStyle/>
           <a:p>
             <a:pPr/>
-            <a:fld id="{3FED6903-4DD2-B89F-9C55-BBCA271B6AEE}" type="datetime1">
+            <a:fld id="{3FD450A0-EED2-81A6-9C6C-18F31E226A4D}" type="datetime1">
               <a:t/>
             </a:fld>
           </a:p>
@@ -2416,7 +2416,7 @@
             <a:spLocks noGrp="1" noChangeArrowheads="1"/>
             <a:extLst>
               <a:ext uri="smNativeData">
-                <pr:smNativeData xmlns:pr="smNativeData" val="SMDATA_13_KVOsYBMAAAAlAAAAZAAAAA8BAAAAkAAAAEgAAACQAAAASAAAAAAAAAABAAAAAAAAAAEAAABQAAAAAAAAAAAA4D8AAAAAAADgPwAAAAAAAOA/AAAAAAAA4D8AAAAAAADgPwAAAAAAAOA/AAAAAAAA4D8AAAAAAADgPwAAAAAAAOA/AAAAAAAA4D8CAAAAjAAAAAAAAAAAAAAAu+DjDP///wgAAAAAAAAAAAAAAAAAAAAAAAAAAAAAAAAAAAAAZAAAAAEAAABAAAAAAAAAAAAAAAAAAAAAAAAAAAAAAAAAAAAAAAAAAAAAAAAAAAAAAAAAAAAAAAAAAAAAAAAAAAAAAAAAAAAAAAAAAAAAAAAAAAAAAAAAAAAAAAAAAAAAFAAAADwAAAAAAAAAAAAAAAAAAAkUAAAAAQAAABQAAAAUAAAAFAAAAAEAAAAAAAAAZAAAAGQAAAAAAAAAZAAAAGQAAAAVAAAAYAAAAAAAAAAAAAAADwAAACADAAAAAAAAAAAAAAEAAACgMgAAVgcAAKr4//8BAAAAf39/AAEAAABkAAAAAAAAABQAAABAHwAAAAAAACYAAAAAAAAAwOD//wAAAAAmAAAAZAAAABYAAABMAAAAAAAAAAAAAAAEAAAAAAAAAAEAAACAgIAKAAAAACgAAAAoAAAAZAAAAGQAAAAAAAAAzMzMAAAAAABQAAAAUAAAAGQAAABkAAAAAAAAABcAAAAUAAAAAAAAAAAAAAD/fwAA/38AAAAAAAAJAAAABAAAAP////8MAAAAEAAAAAAAAAAAAAAAAAAAAAAAAAAeAAAAaAAAAAAAAAAAAAAAAAAAAAAAAAAAAAAAECcAABAnAAAAAAAAAAAAAAAAAAAAAAAAAAAAAAAAAAAAAAAAAAAAABQAAAAAAAAAwMD/AAAAAABkAAAAMgAAAAAAAABkAAAAAAAAAH9/fwAKAAAAHwAAAFQAAAAAAAAFAAAAAQAAAAAAAAAAAAAAAAAAAAAAAAAAAAAAAAAAAAAAAAAAAAAAAn9/fwAAAAADzMzMAMDA/wB/f38AAAAAAAAAAAAAAAAAAAAAAAAAAAAhAAAAGAAAABQAAAA4EwAAGycAAAglAABZKQAAEAAAACYAAAAIAAAAAAAAAAAAAAA="/>
+                <pr:smNativeData xmlns:pr="smNativeData" val="SMDATA_13_NmGsYBMAAAAlAAAAZAAAAA8BAAAAkAAAAEgAAACQAAAASAAAAAAAAAABAAAAAAAAAAEAAABQAAAAAAAAAAAA4D8AAAAAAADgPwAAAAAAAOA/AAAAAAAA4D8AAAAAAADgPwAAAAAAAOA/AAAAAAAA4D8AAAAAAADgPwAAAAAAAOA/AAAAAAAA4D8CAAAAjAAAAAAAAAAAAAAAu+DjDP///wgAAAAAAAAAAAAAAAAAAAAAAAAAAAAAAAAAAAAAZAAAAAEAAABAAAAAAAAAAAAAAAAAAAAAAAAAAAAAAAAAAAAAAAAAAAAAAAAAAAAAAAAAAAAAAAAAAAAAAAAAAAAAAAAAAAAAAAAAAAAAAAAAAAAAAAAAAAAAAAAAAAAAFAAAADwAAAAAAAAAAAAAAAAAAAkUAAAAAQAAABQAAAAUAAAAFAAAAAEAAAAAAAAAZAAAAGQAAAAAAAAAZAAAAGQAAAAVAAAAYAAAAAAAAAAAAAAADwAAACADAAAAAAAAAAAAAAEAAACgMgAAVgcAAKr4//8BAAAAf39/AAEAAABkAAAAAAAAABQAAABAHwAAAAAAACYAAAAAAAAAwOD//wAAAAAmAAAAZAAAABYAAABMAAAAAAAAAAAAAAAEAAAAAAAAAAEAAACAgIAKAAAAACgAAAAoAAAAZAAAAGQAAAAAAAAAzMzMAAAAAABQAAAAUAAAAGQAAABkAAAAAAAAABcAAAAUAAAAAAAAAAAAAAD/fwAA/38AAAAAAAAJAAAABAAAAP////8MAAAAEAAAAAAAAAAAAAAAAAAAAAAAAAAeAAAAaAAAAAAAAAAAAAAAAAAAAAAAAAAAAAAAECcAABAnAAAAAAAAAAAAAAAAAAAAAAAAAAAAAAAAAAAAAAAAAAAAABQAAAAAAAAAwMD/AAAAAABkAAAAMgAAAAAAAABkAAAAAAAAAH9/fwAKAAAAHwAAAFQAAAAAAAAFAAAAAQAAAAAAAAAAAAAAAAAAAAAAAAAAAAAAAAAAAAAAAAAAAAAAAn9/fwAAAAADzMzMAMDA/wB/f38AAAAAAAAAAAAAAAAAAAAAAAAAAAAhAAAAGAAAABQAAAA4EwAAGycAAAglAABZKQAAEAAAACYAAAAIAAAAAAAAAAAAAAA="/>
               </a:ext>
             </a:extLst>
           </p:cNvSpPr>
@@ -2440,7 +2440,7 @@
             <a:spLocks noGrp="1" noChangeArrowheads="1"/>
             <a:extLst>
               <a:ext uri="smNativeData">
-                <pr:smNativeData xmlns:pr="smNativeData" val="SMDATA_13_KVOsYBMAAAAlAAAAZAAAAA8BAAAAkAAAAEgAAACQAAAASAAAAAAAAAABAAAAAAAAAAEAAABQAAAAAAAAAAAA4D8AAAAAAADgPwAAAAAAAOA/AAAAAAAA4D8AAAAAAADgPwAAAAAAAOA/AAAAAAAA4D8AAAAAAADgPwAAAAAAAOA/AAAAAAAA4D8CAAAAjAAAAAAAAAAAAAAAu+DjDP///wgAAAAAAAAAAAAAAAAAAAAAAAAAAAAAAAAAAAAAZAAAAAEAAABAAAAAAAAAAAAAAAAAAAAAAAAAAAAAAAAAAAAAAAAAAAAAAAAAAAAAAAAAAAAAAAAAAAAAAAAAAAAAAAAAAAAAAAAAAAAAAAAAAAAAAAAAAAAAAAAAAAAAFAAAADwAAAAAAAAAAAAAAAAAAAkUAAAAAQAAABQAAAAUAAAAFAAAAAEAAAAAAAAAZAAAAGQAAAAAAAAAZAAAAGQAAAAVAAAAYAAAAAAAAAAAAAAADwAAACADAAAAAAAAAAAAAAEAAACgMgAAVgcAAKr4//8BAAAAf39/AAEAAABkAAAAAAAAABQAAABAHwAAAAAAACYAAAAAAAAAwOD//wAAAAAmAAAAZAAAABYAAABMAAAAAAAAAAAAAAAEAAAAAAAAAAEAAACAgIAKAAAAACgAAAAoAAAAZAAAAGQAAAAAAAAAzMzMAAAAAABQAAAAUAAAAGQAAABkAAAAAAAAABcAAAAUAAAAAAAAAAAAAAD/fwAA/38AAAAAAAAJAAAABAAAAAAAAAAMAAAAEAAAAAAAAAAAAAAAAAAAAAAAAAAeAAAAaAAAAAAAAAAAAAAAAAAAAAAAAAAAAAAAECcAABAnAAAAAAAAAAAAAAAAAAAAAAAAAAAAAAAAAAAAAAAAAAAAABQAAAAAAAAAwMD/AAAAAABkAAAAMgAAAAAAAABkAAAAAAAAAH9/fwAKAAAAHwAAAFQAAAAAAAAFAAAAAQAAAAAAAAAAAAAAAAAAAAAAAAAAAAAAAAAAAAAAAAAAAAAAAn9/fwAAAAADzMzMAMDA/wB/f38AAAAAAAAAAAAAAAAAAAAAAAAAAAAhAAAAGAAAABQAAABQKAAAGycAAHA1AABZKQAAEAAAACYAAAAIAAAAAAAAAAAAAAA="/>
+                <pr:smNativeData xmlns:pr="smNativeData" val="SMDATA_13_NmGsYBMAAAAlAAAAZAAAAA8BAAAAkAAAAEgAAACQAAAASAAAAAAAAAABAAAAAAAAAAEAAABQAAAAAAAAAAAA4D8AAAAAAADgPwAAAAAAAOA/AAAAAAAA4D8AAAAAAADgPwAAAAAAAOA/AAAAAAAA4D8AAAAAAADgPwAAAAAAAOA/AAAAAAAA4D8CAAAAjAAAAAAAAAAAAAAAu+DjDP///wgAAAAAAAAAAAAAAAAAAAAAAAAAAAAAAAAAAAAAZAAAAAEAAABAAAAAAAAAAAAAAAAAAAAAAAAAAAAAAAAAAAAAAAAAAAAAAAAAAAAAAAAAAAAAAAAAAAAAAAAAAAAAAAAAAAAAAAAAAAAAAAAAAAAAAAAAAAAAAAAAAAAAFAAAADwAAAAAAAAAAAAAAAAAAAkUAAAAAQAAABQAAAAUAAAAFAAAAAEAAAAAAAAAZAAAAGQAAAAAAAAAZAAAAGQAAAAVAAAAYAAAAAAAAAAAAAAADwAAACADAAAAAAAAAAAAAAEAAACgMgAAVgcAAKr4//8BAAAAf39/AAEAAABkAAAAAAAAABQAAABAHwAAAAAAACYAAAAAAAAAwOD//wAAAAAmAAAAZAAAABYAAABMAAAAAAAAAAAAAAAEAAAAAAAAAAEAAACAgIAKAAAAACgAAAAoAAAAZAAAAGQAAAAAAAAAzMzMAAAAAABQAAAAUAAAAGQAAABkAAAAAAAAABcAAAAUAAAAAAAAAAAAAAD/fwAA/38AAAAAAAAJAAAABAAAAAAAAAAMAAAAEAAAAAAAAAAAAAAAAAAAAAAAAAAeAAAAaAAAAAAAAAAAAAAAAAAAAAAAAAAAAAAAECcAABAnAAAAAAAAAAAAAAAAAAAAAAAAAAAAAAAAAAAAAAAAAAAAABQAAAAAAAAAwMD/AAAAAABkAAAAMgAAAAAAAABkAAAAAAAAAH9/fwAKAAAAHwAAAFQAAAAAAAAFAAAAAQAAAAAAAAAAAAAAAAAAAAAAAAAAAAAAAAAAAAAAAAAAAAAAAn9/fwAAAAADzMzMAMDA/wB/f38AAAAAAAAAAAAAAAAAAAAAAAAAAAAhAAAAGAAAABQAAABQKAAAGycAAHA1AABZKQAAEAAAACYAAAAIAAAAAAAAAAAAAAA="/>
               </a:ext>
             </a:extLst>
           </p:cNvSpPr>
@@ -2454,7 +2454,7 @@
           <a:lstStyle/>
           <a:p>
             <a:pPr/>
-            <a:fld id="{3FED7F8D-C3D2-B889-9C55-35DC311B6A60}" type="slidenum">
+            <a:fld id="{3FD478F8-B6D2-818E-9C6C-40DB36226A15}" type="slidenum">
               <a:t/>
             </a:fld>
           </a:p>
@@ -2492,7 +2492,7 @@
             <a:spLocks noGrp="1" noChangeArrowheads="1"/>
             <a:extLst>
               <a:ext uri="smNativeData">
-                <pr:smNativeData xmlns:pr="smNativeData" val="SMDATA_13_KVOsYBMAAAAlAAAAZAAAAA8BAAAAkAAAAEgAAACQAAAASAAAAAAAAAACAAAAAAAAAAEAAABQAAAAAAAAAAAA4D8AAAAAAADgPwAAAAAAAOA/AAAAAAAA4D8AAAAAAADgPwAAAAAAAOA/AAAAAAAA4D8AAAAAAADgPwAAAAAAAOA/AAAAAAAA4D8CAAAAjAAAAAAAAAAAAAAAu+DjDP///wgAAAAAAAAAAAAAAAAAAAAAAAAAAAAAAAAAAAAAZAAAAAEAAABAAAAAAAAAAAAAAAAAAAAAAAAAAAAAAAAAAAAAAAAAAAAAAAAAAAAAAAAAAAAAAAAAAAAAAAAAAAAAAAAAAAAAAAAAAAAAAAAAAAAAAAAAAAAAAAAAAAAAFAAAADwAAAAAAAAAAAAAAAAAAAkUAAAAAQAAABQAAAAUAAAAFAAAAAEAAAAAAAAAZAAAAGQAAAAAAAAAZAAAAGQAAAAVAAAAYAAAAAAAAAAAAAAADwAAACADAAAAAAAAAAAAAAEAAACgMgAAVgcAAKr4//8BAAAAf39/AAEAAABkAAAAAAAAABQAAABAHwAAAAAAACYAAAAAAAAAwOD//wAAAAAmAAAAZAAAABYAAABMAAAAAAAAAAAAAAAEAAAAAAAAAAEAAACAgIAKAAAAACgAAAAoAAAAZAAAAGQAAAAAAAAAzMzMAAAAAABQAAAAUAAAAGQAAABkAAAAAAAAABcAAAAUAAAAAAAAAAAAAAD/fwAA/38AAAAAAAAJAAAABAAAAAAAAAAMAAAAEAAAAAAAAAAAAAAAAAAAAAAAAAAeAAAAaAAAAAAAAAAAAAAAAAAAAAAAAAAAAAAAECcAABAnAAAAAAAAAAAAAAAAAAAAAAAAAAAAAAAAAAAAAAAAAAAAABQAAAAAAAAAwMD/AAAAAABkAAAAMgAAAAAAAABkAAAAAAAAAH9/fwAKAAAAHwAAAFQAAAAAAAAFAAAAAQAAAAAAAAAAAAAAAAAAAAAAAAAAAAAAAAAAAAAAAAAAAAAAAn9/fwAAAAADzMzMAMDA/wB/f38AAAAAAAAAAAAAAAAAAAAAAAAAAAAhAAAAGAAAABQAAAAGCwAAiB0AAMYsAAAEIQAAEAAAACYAAAAIAAAAgYAAAAAAAAA="/>
+                <pr:smNativeData xmlns:pr="smNativeData" val="SMDATA_13_NmGsYBMAAAAlAAAAZAAAAA8BAAAAkAAAAEgAAACQAAAASAAAAAAAAAACAAAAAAAAAAEAAABQAAAAAAAAAAAA4D8AAAAAAADgPwAAAAAAAOA/AAAAAAAA4D8AAAAAAADgPwAAAAAAAOA/AAAAAAAA4D8AAAAAAADgPwAAAAAAAOA/AAAAAAAA4D8CAAAAjAAAAAAAAAAAAAAAu+DjDP///wgAAAAAAAAAAAAAAAAAAAAAAAAAAAAAAAAAAAAAZAAAAAEAAABAAAAAAAAAAAAAAAAAAAAAAAAAAAAAAAAAAAAAAAAAAAAAAAAAAAAAAAAAAAAAAAAAAAAAAAAAAAAAAAAAAAAAAAAAAAAAAAAAAAAAAAAAAAAAAAAAAAAAFAAAADwAAAAAAAAAAAAAAAAAAAkUAAAAAQAAABQAAAAUAAAAFAAAAAEAAAAAAAAAZAAAAGQAAAAAAAAAZAAAAGQAAAAVAAAAYAAAAAAAAAAAAAAADwAAACADAAAAAAAAAAAAAAEAAACgMgAAVgcAAKr4//8BAAAAf39/AAEAAABkAAAAAAAAABQAAABAHwAAAAAAACYAAAAAAAAAwOD//wAAAAAmAAAAZAAAABYAAABMAAAAAAAAAAAAAAAEAAAAAAAAAAEAAACAgIAKAAAAACgAAAAoAAAAZAAAAGQAAAAAAAAAzMzMAAAAAABQAAAAUAAAAGQAAABkAAAAAAAAABcAAAAUAAAAAAAAAAAAAAD/fwAA/38AAAAAAAAJAAAABAAAAAAAAAAMAAAAEAAAAAAAAAAAAAAAAAAAAAAAAAAeAAAAaAAAAAAAAAAAAAAAAAAAAAAAAAAAAAAAECcAABAnAAAAAAAAAAAAAAAAAAAAAAAAAAAAAAAAAAAAAAAAAAAAABQAAAAAAAAAwMD/AAAAAABkAAAAMgAAAAAAAABkAAAAAAAAAH9/fwAKAAAAHwAAAFQAAAAAAAAFAAAAAQAAAAAAAAAAAAAAAAAAAAAAAAAAAAAAAAAAAAAAAAAAAAAAAn9/fwAAAAADzMzMAMDA/wB/f38AAAAAAAAAAAAAAAAAAAAAAAAAAAAhAAAAGAAAABQAAAAGCwAAiB0AAMYsAAAEIQAAEAAAACYAAAAIAAAAgYAAAAAAAAA="/>
               </a:ext>
             </a:extLst>
           </p:cNvSpPr>
@@ -2532,7 +2532,7 @@
             <a:spLocks noGrp="1" noChangeArrowheads="1"/>
             <a:extLst>
               <a:ext uri="smNativeData">
-                <pr:smNativeData xmlns:pr="smNativeData" val="SMDATA_13_KVOsYBMAAAAlAAAAZAAAAA8BAAAAkAAAAEgAAACQAAAASAAAAAAAAAAAAAAAAAAAAAEAAABQAAAAAAAAAAAA4D8AAAAAAADgPwAAAAAAAOA/AAAAAAAA4D8AAAAAAADgPwAAAAAAAOA/AAAAAAAA4D8AAAAAAADgPwAAAAAAAOA/AAAAAAAA4D8CAAAAjAAAAAAAAAAAAAAAu+DjDP///wgAAAAAAAAAAAAAAAAAAAAAAAAAAAAAAAAAAAAAZAAAAAEAAABAAAAAAAAAAAAAAAAAAAAAAAAAAAAAAAAAAAAAAAAAAAAAAAAAAAAAAAAAAAAAAAAAAAAAAAAAAAAAAAAAAAAAAAAAAAAAAAAAAAAAAAAAAAAAAAAAAAAAFAAAADwAAAAAAAAAAAAAAAAAAAkUAAAAAQAAABQAAAAUAAAAFAAAAAEAAAAAAAAAZAAAAGQAAAAAAAAAZAAAAGQAAAAVAAAAYAAAAAAAAAAAAAAADwAAACADAAAAAAAAAAAAAAEAAACgMgAAVgcAAKr4//8BAAAAf39/AAEAAABkAAAAAAAAABQAAABAHwAAAAAAACYAAAAAAAAAwOD//wAAAAAmAAAAZAAAABYAAABMAAAAAAAAAAAAAAAEAAAAAAAAAAEAAACAgIAKAAAAACgAAAAoAAAAZAAAAGQAAAAAAAAAzMzMAAAAAABQAAAAUAAAAGQAAABkAAAAAAAAABcAAAAUAAAAAAAAAAAAAAD/fwAA/38AAAAAAAAJAAAABAAAAAQAK0UMAAAAEAAAAAAAAAAAAAAAAAAAAAAAAAAeAAAAaAAAAAAAAAAAAAAAAAAAAAAAAAAAAAAAECcAABAnAAAAAAAAAAAAAAAAAAAAAAAAAAAAAAAAAAAAAAAAAAAAABQAAAAAAAAAwMD/AAAAAABkAAAAMgAAAAAAAABkAAAAAAAAAH9/fwAKAAAAHwAAAFQAAAAAAAAFAAAAAQAAAAAAAAAAAAAAAAAAAAAAAAAAAAAAAAAAAAAAAAAAAAAAAn9/fwAAAAADzMzMAMDA/wB/f38AAAAAAAAAAAAAAAAAAAAAAAAAAAAhAAAAGAAAABQAAAAGCwAAxgMAAMYsAAAWHQAAEAAAACYAAAAIAAAAAYAAAAAAAAA="/>
+                <pr:smNativeData xmlns:pr="smNativeData" val="SMDATA_13_NmGsYBMAAAAlAAAAZAAAAA8BAAAAkAAAAEgAAACQAAAASAAAAAAAAAAAAAAAAAAAAAEAAABQAAAAAAAAAAAA4D8AAAAAAADgPwAAAAAAAOA/AAAAAAAA4D8AAAAAAADgPwAAAAAAAOA/AAAAAAAA4D8AAAAAAADgPwAAAAAAAOA/AAAAAAAA4D8CAAAAjAAAAAAAAAAAAAAAu+DjDP///wgAAAAAAAAAAAAAAAAAAAAAAAAAAAAAAAAAAAAAZAAAAAEAAABAAAAAAAAAAAAAAAAAAAAAAAAAAAAAAAAAAAAAAAAAAAAAAAAAAAAAAAAAAAAAAAAAAAAAAAAAAAAAAAAAAAAAAAAAAAAAAAAAAAAAAAAAAAAAAAAAAAAAFAAAADwAAAAAAAAAAAAAAAAAAAkUAAAAAQAAABQAAAAUAAAAFAAAAAEAAAAAAAAAZAAAAGQAAAAAAAAAZAAAAGQAAAAVAAAAYAAAAAAAAAAAAAAADwAAACADAAAAAAAAAAAAAAEAAACgMgAAVgcAAKr4//8BAAAAf39/AAEAAABkAAAAAAAAABQAAABAHwAAAAAAACYAAAAAAAAAwOD//wAAAAAmAAAAZAAAABYAAABMAAAAAAAAAAAAAAAEAAAAAAAAAAEAAACAgIAKAAAAACgAAAAoAAAAZAAAAGQAAAAAAAAAzMzMAAAAAABQAAAAUAAAAGQAAABkAAAAAAAAABcAAAAUAAAAAAAAAAAAAAD/fwAA/38AAAAAAAAJAAAABAAAAAQAK0UMAAAAEAAAAAAAAAAAAAAAAAAAAAAAAAAeAAAAaAAAAAAAAAAAAAAAAAAAAAAAAAAAAAAAECcAABAnAAAAAAAAAAAAAAAAAAAAAAAAAAAAAAAAAAAAAAAAAAAAABQAAAAAAAAAwMD/AAAAAABkAAAAMgAAAAAAAABkAAAAAAAAAH9/fwAKAAAAHwAAAFQAAAAAAAAFAAAAAQAAAAAAAAAAAAAAAAAAAAAAAAAAAAAAAAAAAAAAAAAAAAAAAn9/fwAAAAADzMzMAMDA/wB/f38AAAAAAAAAAAAAAAAAAAAAAAAAAAAhAAAAGAAAABQAAAAGCwAAxgMAAMYsAAAWHQAAEAAAACYAAAAIAAAAAYAAAAAAAAA="/>
               </a:ext>
             </a:extLst>
           </p:cNvSpPr>
@@ -2601,7 +2601,7 @@
             <a:spLocks noGrp="1" noChangeArrowheads="1"/>
             <a:extLst>
               <a:ext uri="smNativeData">
-                <pr:smNativeData xmlns:pr="smNativeData" val="SMDATA_13_KVOsYBMAAAAlAAAAZAAAAA8BAAAAkAAAAEgAAACQAAAASAAAAAAAAAAAAAAAAAAAAAEAAABQAAAAAAAAAAAA4D8AAAAAAADgPwAAAAAAAOA/AAAAAAAA4D8AAAAAAADgPwAAAAAAAOA/AAAAAAAA4D8AAAAAAADgPwAAAAAAAOA/AAAAAAAA4D8CAAAAjAAAAAAAAAAAAAAAu+DjDP///wgAAAAAAAAAAAAAAAAAAAAAAAAAAAAAAAAAAAAAZAAAAAEAAABAAAAAAAAAAAAAAAAAAAAAAAAAAAAAAAAAAAAAAAAAAAAAAAAAAAAAAAAAAAAAAAAAAAAAAAAAAAAAAAAAAAAAAAAAAAAAAAAAAAAAAAAAAAAAAAAAAAAAFAAAADwAAAAAAAAAAAAAAAAAAAkUAAAAAQAAABQAAAAUAAAAFAAAAAEAAAAAAAAAZAAAAGQAAAAAAAAAZAAAAGQAAAAVAAAAYAAAAAAAAAAAAAAADwAAACADAAAAAAAAAAAAAAEAAACgMgAAVgcAAKr4//8BAAAAf39/AAEAAABkAAAAAAAAABQAAABAHwAAAAAAACYAAAAAAAAAwOD//wAAAAAmAAAAZAAAABYAAABMAAAAAAAAAAAAAAAEAAAAAAAAAAEAAACAgIAKAAAAACgAAAAoAAAAZAAAAGQAAAAAAAAAzMzMAAAAAABQAAAAUAAAAGQAAABkAAAAAAAAABcAAAAUAAAAAAAAAAAAAAD/fwAA/38AAAAAAAAJAAAABAAAAAhNxYMMAAAAEAAAAAAAAAAAAAAAAAAAAAAAAAAeAAAAaAAAAAAAAAAAAAAAAAAAAAAAAAAAAAAAECcAABAnAAAAAAAAAAAAAAAAAAAAAAAAAAAAAAAAAAAAAAAAAAAAABQAAAAAAAAAwMD/AAAAAABkAAAAMgAAAAAAAABkAAAAAAAAAH9/fwAKAAAAHwAAAFQAAAAAAAAFAAAAAQAAAAAAAAAAAAAAAAAAAAAAAAAAAAAAAAAAAAAAAAAAAAAAAn9/fwAAAAADzMzMAMDA/wB/f38AAAAAAAAAAAAAAAAAAAAAAAAAAAAhAAAAGAAAABQAAAAGCwAABCEAAMYsAAD4JQAAEAAAACYAAAAIAAAAAYAAAAAAAAA="/>
+                <pr:smNativeData xmlns:pr="smNativeData" val="SMDATA_13_NmGsYBMAAAAlAAAAZAAAAA8BAAAAkAAAAEgAAACQAAAASAAAAAAAAAAAAAAAAAAAAAEAAABQAAAAAAAAAAAA4D8AAAAAAADgPwAAAAAAAOA/AAAAAAAA4D8AAAAAAADgPwAAAAAAAOA/AAAAAAAA4D8AAAAAAADgPwAAAAAAAOA/AAAAAAAA4D8CAAAAjAAAAAAAAAAAAAAAu+DjDP///wgAAAAAAAAAAAAAAAAAAAAAAAAAAAAAAAAAAAAAZAAAAAEAAABAAAAAAAAAAAAAAAAAAAAAAAAAAAAAAAAAAAAAAAAAAAAAAAAAAAAAAAAAAAAAAAAAAAAAAAAAAAAAAAAAAAAAAAAAAAAAAAAAAAAAAAAAAAAAAAAAAAAAFAAAADwAAAAAAAAAAAAAAAAAAAkUAAAAAQAAABQAAAAUAAAAFAAAAAEAAAAAAAAAZAAAAGQAAAAAAAAAZAAAAGQAAAAVAAAAYAAAAAAAAAAAAAAADwAAACADAAAAAAAAAAAAAAEAAACgMgAAVgcAAKr4//8BAAAAf39/AAEAAABkAAAAAAAAABQAAABAHwAAAAAAACYAAAAAAAAAwOD//wAAAAAmAAAAZAAAABYAAABMAAAAAAAAAAAAAAAEAAAAAAAAAAEAAACAgIAKAAAAACgAAAAoAAAAZAAAAGQAAAAAAAAAzMzMAAAAAABQAAAAUAAAAGQAAABkAAAAAAAAABcAAAAUAAAAAAAAAAAAAAD/fwAA/38AAAAAAAAJAAAABAAAAAhNxYMMAAAAEAAAAAAAAAAAAAAAAAAAAAAAAAAeAAAAaAAAAAAAAAAAAAAAAAAAAAAAAAAAAAAAECcAABAnAAAAAAAAAAAAAAAAAAAAAAAAAAAAAAAAAAAAAAAAAAAAABQAAAAAAAAAwMD/AAAAAABkAAAAMgAAAAAAAABkAAAAAAAAAH9/fwAKAAAAHwAAAFQAAAAAAAAFAAAAAQAAAAAAAAAAAAAAAAAAAAAAAAAAAAAAAAAAAAAAAAAAAAAAAn9/fwAAAAADzMzMAMDA/wB/f38AAAAAAAAAAAAAAAAAAAAAAAAAAAAhAAAAGAAAABQAAAAGCwAABCEAAMYsAAD4JQAAEAAAACYAAAAIAAAAAYAAAAAAAAA="/>
               </a:ext>
             </a:extLst>
           </p:cNvSpPr>
@@ -2670,7 +2670,7 @@
             <a:spLocks noGrp="1" noChangeArrowheads="1"/>
             <a:extLst>
               <a:ext uri="smNativeData">
-                <pr:smNativeData xmlns:pr="smNativeData" val="SMDATA_13_KVOsYBMAAAAlAAAAZAAAAA8BAAAAkAAAAEgAAACQAAAASAAAAAAAAAABAAAAAAAAAAEAAABQAAAAAAAAAAAA4D8AAAAAAADgPwAAAAAAAOA/AAAAAAAA4D8AAAAAAADgPwAAAAAAAOA/AAAAAAAA4D8AAAAAAADgPwAAAAAAAOA/AAAAAAAA4D8CAAAAjAAAAAAAAAAAAAAAu+DjDP///wgAAAAAAAAAAAAAAAAAAAAAAAAAAAAAAAAAAAAAZAAAAAEAAABAAAAAAAAAAAAAAAAAAAAAAAAAAAAAAAAAAAAAAAAAAAAAAAAAAAAAAAAAAAAAAAAAAAAAAAAAAAAAAAAAAAAAAAAAAAAAAAAAAAAAAAAAAAAAAAAAAAAAFAAAADwAAAAAAAAAAAAAAAAAAAkUAAAAAQAAABQAAAAUAAAAFAAAAAEAAAAAAAAAZAAAAGQAAAAAAAAAZAAAAGQAAAAVAAAAYAAAAAAAAAAAAAAADwAAACADAAAAAAAAAAAAAAEAAACgMgAAVgcAAKr4//8BAAAAf39/AAEAAABkAAAAAAAAABQAAABAHwAAAAAAACYAAAAAAAAAwOD//wAAAAAmAAAAZAAAABYAAABMAAAAAAAAAAAAAAAEAAAAAAAAAAEAAACAgIAKAAAAACgAAAAoAAAAZAAAAGQAAAAAAAAAzMzMAAAAAABQAAAAUAAAAGQAAABkAAAAAAAAABcAAAAUAAAAAAAAAAAAAAD/fwAA/38AAAAAAAAJAAAABAAAAAAAAAAMAAAAEAAAAAAAAAAAAAAAAAAAAAAAAAAeAAAAaAAAAAAAAAAAAAAAAAAAAAAAAAAAAAAAECcAABAnAAAAAAAAAAAAAAAAAAAAAAAAAAAAAAAAAAAAAAAAAAAAABQAAAAAAAAAwMD/AAAAAABkAAAAMgAAAAAAAABkAAAAAAAAAH9/fwAKAAAAHwAAAFQAAAAAAAAFAAAAAQAAAAAAAAAAAAAAAAAAAAAAAAAAAAAAAAAAAAAAAAAAAAAAAn9/fwAAAAADzMzMAMDA/wB/f38AAAAAAAAAAAAAAAAAAAAAAAAAAAAhAAAAGAAAABQAAADQAgAAGycAAPAPAABZKQAAEAAAACYAAAAIAAAAAAAAAAAAAAA="/>
+                <pr:smNativeData xmlns:pr="smNativeData" val="SMDATA_13_NmGsYBMAAAAlAAAAZAAAAA8BAAAAkAAAAEgAAACQAAAASAAAAAAAAAABAAAAAAAAAAEAAABQAAAAAAAAAAAA4D8AAAAAAADgPwAAAAAAAOA/AAAAAAAA4D8AAAAAAADgPwAAAAAAAOA/AAAAAAAA4D8AAAAAAADgPwAAAAAAAOA/AAAAAAAA4D8CAAAAjAAAAAAAAAAAAAAAu+DjDP///wgAAAAAAAAAAAAAAAAAAAAAAAAAAAAAAAAAAAAAZAAAAAEAAABAAAAAAAAAAAAAAAAAAAAAAAAAAAAAAAAAAAAAAAAAAAAAAAAAAAAAAAAAAAAAAAAAAAAAAAAAAAAAAAAAAAAAAAAAAAAAAAAAAAAAAAAAAAAAAAAAAAAAFAAAADwAAAAAAAAAAAAAAAAAAAkUAAAAAQAAABQAAAAUAAAAFAAAAAEAAAAAAAAAZAAAAGQAAAAAAAAAZAAAAGQAAAAVAAAAYAAAAAAAAAAAAAAADwAAACADAAAAAAAAAAAAAAEAAACgMgAAVgcAAKr4//8BAAAAf39/AAEAAABkAAAAAAAAABQAAABAHwAAAAAAACYAAAAAAAAAwOD//wAAAAAmAAAAZAAAABYAAABMAAAAAAAAAAAAAAAEAAAAAAAAAAEAAACAgIAKAAAAACgAAAAoAAAAZAAAAGQAAAAAAAAAzMzMAAAAAABQAAAAUAAAAGQAAABkAAAAAAAAABcAAAAUAAAAAAAAAAAAAAD/fwAA/38AAAAAAAAJAAAABAAAAAAAAAAMAAAAEAAAAAAAAAAAAAAAAAAAAAAAAAAeAAAAaAAAAAAAAAAAAAAAAAAAAAAAAAAAAAAAECcAABAnAAAAAAAAAAAAAAAAAAAAAAAAAAAAAAAAAAAAAAAAAAAAABQAAAAAAAAAwMD/AAAAAABkAAAAMgAAAAAAAABkAAAAAAAAAH9/fwAKAAAAHwAAAFQAAAAAAAAFAAAAAQAAAAAAAAAAAAAAAAAAAAAAAAAAAAAAAAAAAAAAAAAAAAAAAn9/fwAAAAADzMzMAMDA/wB/f38AAAAAAAAAAAAAAAAAAAAAAAAAAAAhAAAAGAAAABQAAADQAgAAGycAAPAPAABZKQAAEAAAACYAAAAIAAAAAAAAAAAAAAA="/>
               </a:ext>
             </a:extLst>
           </p:cNvSpPr>
@@ -2684,7 +2684,7 @@
           <a:lstStyle/>
           <a:p>
             <a:pPr/>
-            <a:fld id="{3FED610B-45D2-B897-9C55-B3C22F1B6AE6}" type="datetime1">
+            <a:fld id="{3FD47D98-D6D2-818B-9C6C-20DE33226A75}" type="datetime1">
               <a:t/>
             </a:fld>
           </a:p>
@@ -2697,7 +2697,7 @@
             <a:spLocks noGrp="1" noChangeArrowheads="1"/>
             <a:extLst>
               <a:ext uri="smNativeData">
-                <pr:smNativeData xmlns:pr="smNativeData" val="SMDATA_13_KVOsYBMAAAAlAAAAZAAAAA8BAAAAkAAAAEgAAACQAAAASAAAAAAAAAABAAAAAAAAAAEAAABQAAAAAAAAAAAA4D8AAAAAAADgPwAAAAAAAOA/AAAAAAAA4D8AAAAAAADgPwAAAAAAAOA/AAAAAAAA4D8AAAAAAADgPwAAAAAAAOA/AAAAAAAA4D8CAAAAjAAAAAAAAAAAAAAAu+DjDP///wgAAAAAAAAAAAAAAAAAAAAAAAAAAAAAAAAAAAAAZAAAAAEAAABAAAAAAAAAAAAAAAAAAAAAAAAAAAAAAAAAAAAAAAAAAAAAAAAAAAAAAAAAAAAAAAAAAAAAAAAAAAAAAAAAAAAAAAAAAAAAAAAAAAAAAAAAAAAAAAAAAAAAFAAAADwAAAAAAAAAAAAAAAAAAAkUAAAAAQAAABQAAAAUAAAAFAAAAAEAAAAAAAAAZAAAAGQAAAAAAAAAZAAAAGQAAAAVAAAAYAAAAAAAAAAAAAAADwAAACADAAAAAAAAAAAAAAEAAACgMgAAVgcAAKr4//8BAAAAf39/AAEAAABkAAAAAAAAABQAAABAHwAAAAAAACYAAAAAAAAAwOD//wAAAAAmAAAAZAAAABYAAABMAAAAAAAAAAAAAAAEAAAAAAAAAAEAAACAgIAKAAAAACgAAAAoAAAAZAAAAGQAAAAAAAAAzMzMAAAAAABQAAAAUAAAAGQAAABkAAAAAAAAABcAAAAUAAAAAAAAAAAAAAD/fwAA/38AAAAAAAAJAAAABAAAAA9eBAAMAAAAEAAAAAAAAAAAAAAAAAAAAAAAAAAeAAAAaAAAAAAAAAAAAAAAAAAAAAAAAAAAAAAAECcAABAnAAAAAAAAAAAAAAAAAAAAAAAAAAAAAAAAAAAAAAAAAAAAABQAAAAAAAAAwMD/AAAAAABkAAAAMgAAAAAAAABkAAAAAAAAAH9/fwAKAAAAHwAAAFQAAAAAAAAFAAAAAQAAAAAAAAAAAAAAAAAAAAAAAAAAAAAAAAAAAAAAAAAAAAAAAn9/fwAAAAADzMzMAMDA/wB/f38AAAAAAAAAAAAAAAAAAAAAAAAAAAAhAAAAGAAAABQAAAA4EwAAGycAAAglAABZKQAAEAAAACYAAAAIAAAAAAAAAAAAAAA="/>
+                <pr:smNativeData xmlns:pr="smNativeData" val="SMDATA_13_NmGsYBMAAAAlAAAAZAAAAA8BAAAAkAAAAEgAAACQAAAASAAAAAAAAAABAAAAAAAAAAEAAABQAAAAAAAAAAAA4D8AAAAAAADgPwAAAAAAAOA/AAAAAAAA4D8AAAAAAADgPwAAAAAAAOA/AAAAAAAA4D8AAAAAAADgPwAAAAAAAOA/AAAAAAAA4D8CAAAAjAAAAAAAAAAAAAAAu+DjDP///wgAAAAAAAAAAAAAAAAAAAAAAAAAAAAAAAAAAAAAZAAAAAEAAABAAAAAAAAAAAAAAAAAAAAAAAAAAAAAAAAAAAAAAAAAAAAAAAAAAAAAAAAAAAAAAAAAAAAAAAAAAAAAAAAAAAAAAAAAAAAAAAAAAAAAAAAAAAAAAAAAAAAAFAAAADwAAAAAAAAAAAAAAAAAAAkUAAAAAQAAABQAAAAUAAAAFAAAAAEAAAAAAAAAZAAAAGQAAAAAAAAAZAAAAGQAAAAVAAAAYAAAAAAAAAAAAAAADwAAACADAAAAAAAAAAAAAAEAAACgMgAAVgcAAKr4//8BAAAAf39/AAEAAABkAAAAAAAAABQAAABAHwAAAAAAACYAAAAAAAAAwOD//wAAAAAmAAAAZAAAABYAAABMAAAAAAAAAAAAAAAEAAAAAAAAAAEAAACAgIAKAAAAACgAAAAoAAAAZAAAAGQAAAAAAAAAzMzMAAAAAABQAAAAUAAAAGQAAABkAAAAAAAAABcAAAAUAAAAAAAAAAAAAAD/fwAA/38AAAAAAAAJAAAABAAAAA9eBAAMAAAAEAAAAAAAAAAAAAAAAAAAAAAAAAAeAAAAaAAAAAAAAAAAAAAAAAAAAAAAAAAAAAAAECcAABAnAAAAAAAAAAAAAAAAAAAAAAAAAAAAAAAAAAAAAAAAAAAAABQAAAAAAAAAwMD/AAAAAABkAAAAMgAAAAAAAABkAAAAAAAAAH9/fwAKAAAAHwAAAFQAAAAAAAAFAAAAAQAAAAAAAAAAAAAAAAAAAAAAAAAAAAAAAAAAAAAAAAAAAAAAAn9/fwAAAAADzMzMAMDA/wB/f38AAAAAAAAAAAAAAAAAAAAAAAAAAAAhAAAAGAAAABQAAAA4EwAAGycAAAglAABZKQAAEAAAACYAAAAIAAAAAAAAAAAAAAA="/>
               </a:ext>
             </a:extLst>
           </p:cNvSpPr>
@@ -2721,7 +2721,7 @@
             <a:spLocks noGrp="1" noChangeArrowheads="1"/>
             <a:extLst>
               <a:ext uri="smNativeData">
-                <pr:smNativeData xmlns:pr="smNativeData" val="SMDATA_13_KVOsYBMAAAAlAAAAZAAAAA8BAAAAkAAAAEgAAACQAAAASAAAAAAAAAABAAAAAAAAAAEAAABQAAAAAAAAAAAA4D8AAAAAAADgPwAAAAAAAOA/AAAAAAAA4D8AAAAAAADgPwAAAAAAAOA/AAAAAAAA4D8AAAAAAADgPwAAAAAAAOA/AAAAAAAA4D8CAAAAjAAAAAAAAAAAAAAAu+DjDP///wgAAAAAAAAAAAAAAAAAAAAAAAAAAAAAAAAAAAAAZAAAAAEAAABAAAAAAAAAAAAAAAAAAAAAAAAAAAAAAAAAAAAAAAAAAAAAAAAAAAAAAAAAAAAAAAAAAAAAAAAAAAAAAAAAAAAAAAAAAAAAAAAAAAAAAAAAAAAAAAAAAAAAFAAAADwAAAAAAAAAAAAAAAAAAAkUAAAAAQAAABQAAAAUAAAAFAAAAAEAAAAAAAAAZAAAAGQAAAAAAAAAZAAAAGQAAAAVAAAAYAAAAAAAAAAAAAAADwAAACADAAAAAAAAAAAAAAEAAACgMgAAVgcAAKr4//8BAAAAf39/AAEAAABkAAAAAAAAABQAAABAHwAAAAAAACYAAAAAAAAAwOD//wAAAAAmAAAAZAAAABYAAABMAAAAAAAAAAAAAAAEAAAAAAAAAAEAAACAgIAKAAAAACgAAAAoAAAAZAAAAGQAAAAAAAAAzMzMAAAAAABQAAAAUAAAAGQAAABkAAAAAAAAABcAAAAUAAAAAAAAAAAAAAD/fwAA/38AAAAAAAAJAAAABAAAAIRJp0YMAAAAEAAAAAAAAAAAAAAAAAAAAAAAAAAeAAAAaAAAAAAAAAAAAAAAAAAAAAAAAAAAAAAAECcAABAnAAAAAAAAAAAAAAAAAAAAAAAAAAAAAAAAAAAAAAAAAAAAABQAAAAAAAAAwMD/AAAAAABkAAAAMgAAAAAAAABkAAAAAAAAAH9/fwAKAAAAHwAAAFQAAAAAAAAFAAAAAQAAAAAAAAAAAAAAAAAAAAAAAAAAAAAAAAAAAAAAAAAAAAAAAn9/fwAAAAADzMzMAMDA/wB/f38AAAAAAAAAAAAAAAAAAAAAAAAAAAAhAAAAGAAAABQAAABQKAAAGycAAHA1AABZKQAAEAAAACYAAAAIAAAAAAAAAAAAAAA="/>
+                <pr:smNativeData xmlns:pr="smNativeData" val="SMDATA_13_NmGsYBMAAAAlAAAAZAAAAA8BAAAAkAAAAEgAAACQAAAASAAAAAAAAAABAAAAAAAAAAEAAABQAAAAAAAAAAAA4D8AAAAAAADgPwAAAAAAAOA/AAAAAAAA4D8AAAAAAADgPwAAAAAAAOA/AAAAAAAA4D8AAAAAAADgPwAAAAAAAOA/AAAAAAAA4D8CAAAAjAAAAAAAAAAAAAAAu+DjDP///wgAAAAAAAAAAAAAAAAAAAAAAAAAAAAAAAAAAAAAZAAAAAEAAABAAAAAAAAAAAAAAAAAAAAAAAAAAAAAAAAAAAAAAAAAAAAAAAAAAAAAAAAAAAAAAAAAAAAAAAAAAAAAAAAAAAAAAAAAAAAAAAAAAAAAAAAAAAAAAAAAAAAAFAAAADwAAAAAAAAAAAAAAAAAAAkUAAAAAQAAABQAAAAUAAAAFAAAAAEAAAAAAAAAZAAAAGQAAAAAAAAAZAAAAGQAAAAVAAAAYAAAAAAAAAAAAAAADwAAACADAAAAAAAAAAAAAAEAAACgMgAAVgcAAKr4//8BAAAAf39/AAEAAABkAAAAAAAAABQAAABAHwAAAAAAACYAAAAAAAAAwOD//wAAAAAmAAAAZAAAABYAAABMAAAAAAAAAAAAAAAEAAAAAAAAAAEAAACAgIAKAAAAACgAAAAoAAAAZAAAAGQAAAAAAAAAzMzMAAAAAABQAAAAUAAAAGQAAABkAAAAAAAAABcAAAAUAAAAAAAAAAAAAAD/fwAA/38AAAAAAAAJAAAABAAAAIRJp0YMAAAAEAAAAAAAAAAAAAAAAAAAAAAAAAAeAAAAaAAAAAAAAAAAAAAAAAAAAAAAAAAAAAAAECcAABAnAAAAAAAAAAAAAAAAAAAAAAAAAAAAAAAAAAAAAAAAAAAAABQAAAAAAAAAwMD/AAAAAABkAAAAMgAAAAAAAABkAAAAAAAAAH9/fwAKAAAAHwAAAFQAAAAAAAAFAAAAAQAAAAAAAAAAAAAAAAAAAAAAAAAAAAAAAAAAAAAAAAAAAAAAAn9/fwAAAAADzMzMAMDA/wB/f38AAAAAAAAAAAAAAAAAAAAAAAAAAAAhAAAAGAAAABQAAABQKAAAGycAAHA1AABZKQAAEAAAACYAAAAIAAAAAAAAAAAAAAA="/>
               </a:ext>
             </a:extLst>
           </p:cNvSpPr>
@@ -2735,7 +2735,7 @@
           <a:lstStyle/>
           <a:p>
             <a:pPr/>
-            <a:fld id="{3FED490F-41D2-B8BF-9C55-B7EA071B6AE2}" type="slidenum">
+            <a:fld id="{3FD44B51-1FD2-81BD-9C6C-E9E805226ABC}" type="slidenum">
               <a:t/>
             </a:fld>
           </a:p>
@@ -2781,7 +2781,7 @@
             <a:spLocks noGrp="1" noChangeArrowheads="1"/>
             <a:extLst>
               <a:ext uri="smNativeData">
-                <pr:smNativeData xmlns:pr="smNativeData" val="SMDATA_13_KVOsYBMAAAAlAAAAZAAAAA8BAAAAkAAAAEgAAACQAAAASAAAAAAAAAABAAAAAAAAAAEAAABQAAAAAAAAAAAA4D8AAAAAAADgPwAAAAAAAOA/AAAAAAAA4D8AAAAAAADgPwAAAAAAAOA/AAAAAAAA4D8AAAAAAADgPwAAAAAAAOA/AAAAAAAA4D8CAAAAjAAAAAAAAAAAAAAAu+DjDP///wgAAAAAAAAAAAAAAAAAAAAAAAAAAAAAAAAAAAAAZAAAAAEAAABAAAAAAAAAAAAAAAAAAAAAAAAAAAAAAAAAAAAAAAAAAAAAAAAAAAAAAAAAAAAAAAAAAAAAAAAAAAAAAAAAAAAAAAAAAAAAAAAAAAAAAAAAAAAAAAAAAAAAFAAAADwAAAAAAAAAAAAAAAAAAAkUAAAAAQAAABQAAAAUAAAAFAAAAAEAAAAAAAAAZAAAAGQAAAAAAAAAZAAAAGQAAAAVAAAAYAAAAAAAAAAAAAAADwAAACADAAAAAAAAAAAAAAEAAACgMgAAVgcAAKr4//8BAAAAf39/AAEAAABkAAAAAAAAABQAAABAHwAAAAAAACYAAAAAAAAAwOD//wAAAAAmAAAAZAAAABYAAABMAAAAAAAAAAAAAAAEAAAAAAAAAAEAAACAgIAKAAAAACgAAAAoAAAAZAAAAGQAAAAAAAAAzMzMAAAAAABQAAAAUAAAAGQAAABkAAAAAAAAABcAAAAUAAAAAAAAAAAAAAD/fwAA/38AAAAAAAAJAAAABAAAAAAAAAAMAAAAEAAAAAAAAAAAAAAAAAAAAAAAAAAeAAAAaAAAAAAAAAAAAAAAAAAAAAAAAAAAAAAAECcAABAnAAAAAAAAAAAAAAAAAAAAAAAAAAAAAAAAAAAAAAAAAAAAABQAAAAAAAAAwMD/AAAAAABkAAAAMgAAAAAAAABkAAAAAAAAAH9/fwAKAAAAHwAAAFQAAAAAAAAFAAAAAQAAAAAAAAAAAAAAAAAAAAAAAAAAAAAAAAAAAAAAAAAAAAAAAn9/fwAAAAADzMzMAMDA/wB/f38AAAAAAAAAAAAAAAAAAAAAAAAAAAAhAAAAGAAAABQAAADQAgAAsAEAAHA1AAC4CAAAEAAAACYAAAAIAAAA//////////8="/>
+                <pr:smNativeData xmlns:pr="smNativeData" val="SMDATA_13_NmGsYBMAAAAlAAAAZAAAAA8BAAAAkAAAAEgAAACQAAAASAAAAAAAAAABAAAAAAAAAAEAAABQAAAAAAAAAAAA4D8AAAAAAADgPwAAAAAAAOA/AAAAAAAA4D8AAAAAAADgPwAAAAAAAOA/AAAAAAAA4D8AAAAAAADgPwAAAAAAAOA/AAAAAAAA4D8CAAAAjAAAAAAAAAAAAAAAu+DjDP///wgAAAAAAAAAAAAAAAAAAAAAAAAAAAAAAAAAAAAAZAAAAAEAAABAAAAAAAAAAAAAAAAAAAAAAAAAAAAAAAAAAAAAAAAAAAAAAAAAAAAAAAAAAAAAAAAAAAAAAAAAAAAAAAAAAAAAAAAAAAAAAAAAAAAAAAAAAAAAAAAAAAAAFAAAADwAAAAAAAAAAAAAAAAAAAkUAAAAAQAAABQAAAAUAAAAFAAAAAEAAAAAAAAAZAAAAGQAAAAAAAAAZAAAAGQAAAAVAAAAYAAAAAAAAAAAAAAADwAAACADAAAAAAAAAAAAAAEAAACgMgAAVgcAAKr4//8BAAAAf39/AAEAAABkAAAAAAAAABQAAABAHwAAAAAAACYAAAAAAAAAwOD//wAAAAAmAAAAZAAAABYAAABMAAAAAAAAAAAAAAAEAAAAAAAAAAEAAACAgIAKAAAAACgAAAAoAAAAZAAAAGQAAAAAAAAAzMzMAAAAAABQAAAAUAAAAGQAAABkAAAAAAAAABcAAAAUAAAAAAAAAAAAAAD/fwAA/38AAAAAAAAJAAAABAAAAAAAAAAMAAAAEAAAAAAAAAAAAAAAAAAAAAAAAAAeAAAAaAAAAAAAAAAAAAAAAAAAAAAAAAAAAAAAECcAABAnAAAAAAAAAAAAAAAAAAAAAAAAAAAAAAAAAAAAAAAAAAAAABQAAAAAAAAAwMD/AAAAAABkAAAAMgAAAAAAAABkAAAAAAAAAH9/fwAKAAAAHwAAAFQAAAAAAAAFAAAAAQAAAAAAAAAAAAAAAAAAAAAAAAAAAAAAAAAAAAAAAAAAAAAAAn9/fwAAAAADzMzMAMDA/wB/f38AAAAAAAAAAAAAAAAAAAAAAAAAAAAhAAAAGAAAABQAAADQAgAAsAEAAHA1AAC4CAAAEAAAACYAAAAIAAAA//////////8="/>
               </a:ext>
             </a:extLst>
           </p:cNvSpPr>
@@ -2825,7 +2825,7 @@
             <a:spLocks noGrp="1" noChangeArrowheads="1"/>
             <a:extLst>
               <a:ext uri="smNativeData">
-                <pr:smNativeData xmlns:pr="smNativeData" val="SMDATA_13_KVOsYBMAAAAlAAAAZAAAAA8BAAAAkAAAAEgAAACQAAAASAAAAAAAAAAAAAAAAAAAAAEAAABQAAAAAAAAAAAA4D8AAAAAAADgPwAAAAAAAOA/AAAAAAAA4D8AAAAAAADgPwAAAAAAAOA/AAAAAAAA4D8AAAAAAADgPwAAAAAAAOA/AAAAAAAA4D8CAAAAjAAAAAAAAAAAAAAAu+DjDP///wgAAAAAAAAAAAAAAAAAAAAAAAAAAAAAAAAAAAAAZAAAAAEAAABAAAAAAAAAAAAAAAAAAAAAAAAAAAAAAAAAAAAAAAAAAAAAAAAAAAAAAAAAAAAAAAAAAAAAAAAAAAAAAAAAAAAAAAAAAAAAAAAAAAAAAAAAAAAAAAAAAAAAFAAAADwAAAAAAAAAAAAAAAAAAAkUAAAAAQAAABQAAAAUAAAAFAAAAAEAAAAAAAAAZAAAAGQAAAAAAAAAZAAAAGQAAAAVAAAAYAAAAAAAAAAAAAAADwAAACADAAAAAAAAAAAAAAEAAACgMgAAVgcAAKr4//8BAAAAf39/AAEAAABkAAAAAAAAABQAAABAHwAAAAAAACYAAAAAAAAAwOD//wAAAAAmAAAAZAAAABYAAABMAAAAAAAAAAAAAAAEAAAAAAAAAAEAAACAgIAKAAAAACgAAAAoAAAAZAAAAGQAAAAAAAAAzMzMAAAAAABQAAAAUAAAAGQAAABkAAAAAAAAABcAAAAUAAAAAAAAAAAAAAD/fwAA/38AAAAAAAAJAAAABAAAAAAAAAAMAAAAEAAAAAAAAAAAAAAAAAAAAAAAAAAeAAAAaAAAAAAAAAAAAAAAAAAAAAAAAAAAAAAAECcAABAnAAAAAAAAAAAAAAAAAAAAAAAAAAAAAAAAAAAAAAAAAAAAABQAAAAAAAAAwMD/AAAAAABkAAAAMgAAAAAAAABkAAAAAAAAAH9/fwAKAAAAHwAAAFQAAAAAAAAFAAAAAQAAAAAAAAAAAAAAAAAAAAAAAAAAAAAAAAAAAAAAAAAAAAAAAn9/fwAAAAADzMzMAMDA/wB/f38AAAAAAAAAAAAAAAAAAAAAAAAAAAAhAAAAGAAAABQAAADQAgAA2AkAAHA1AACwJQAAEAAAACYAAAAIAAAA//////////8="/>
+                <pr:smNativeData xmlns:pr="smNativeData" val="SMDATA_13_NmGsYBMAAAAlAAAAZAAAAA8BAAAAkAAAAEgAAACQAAAASAAAAAAAAAAAAAAAAAAAAAEAAABQAAAAAAAAAAAA4D8AAAAAAADgPwAAAAAAAOA/AAAAAAAA4D8AAAAAAADgPwAAAAAAAOA/AAAAAAAA4D8AAAAAAADgPwAAAAAAAOA/AAAAAAAA4D8CAAAAjAAAAAAAAAAAAAAAu+DjDP///wgAAAAAAAAAAAAAAAAAAAAAAAAAAAAAAAAAAAAAZAAAAAEAAABAAAAAAAAAAAAAAAAAAAAAAAAAAAAAAAAAAAAAAAAAAAAAAAAAAAAAAAAAAAAAAAAAAAAAAAAAAAAAAAAAAAAAAAAAAAAAAAAAAAAAAAAAAAAAAAAAAAAAFAAAADwAAAAAAAAAAAAAAAAAAAkUAAAAAQAAABQAAAAUAAAAFAAAAAEAAAAAAAAAZAAAAGQAAAAAAAAAZAAAAGQAAAAVAAAAYAAAAAAAAAAAAAAADwAAACADAAAAAAAAAAAAAAEAAACgMgAAVgcAAKr4//8BAAAAf39/AAEAAABkAAAAAAAAABQAAABAHwAAAAAAACYAAAAAAAAAwOD//wAAAAAmAAAAZAAAABYAAABMAAAAAAAAAAAAAAAEAAAAAAAAAAEAAACAgIAKAAAAACgAAAAoAAAAZAAAAGQAAAAAAAAAzMzMAAAAAABQAAAAUAAAAGQAAABkAAAAAAAAABcAAAAUAAAAAAAAAAAAAAD/fwAA/38AAAAAAAAJAAAABAAAAAAAAAAMAAAAEAAAAAAAAAAAAAAAAAAAAAAAAAAeAAAAaAAAAAAAAAAAAAAAAAAAAAAAAAAAAAAAECcAABAnAAAAAAAAAAAAAAAAAAAAAAAAAAAAAAAAAAAAAAAAAAAAABQAAAAAAAAAwMD/AAAAAABkAAAAMgAAAAAAAABkAAAAAAAAAH9/fwAKAAAAHwAAAFQAAAAAAAAFAAAAAQAAAAAAAAAAAAAAAAAAAAAAAAAAAAAAAAAAAAAAAAAAAAAAAn9/fwAAAAADzMzMAMDA/wB/f38AAAAAAAAAAAAAAAAAAAAAAAAAAAAhAAAAGAAAABQAAADQAgAA2AkAAHA1AACwJQAAEAAAACYAAAAIAAAA//////////8="/>
               </a:ext>
             </a:extLst>
           </p:cNvSpPr>
@@ -2893,7 +2893,7 @@
             <a:spLocks noGrp="1" noChangeArrowheads="1"/>
             <a:extLst>
               <a:ext uri="smNativeData">
-                <pr:smNativeData xmlns:pr="smNativeData" val="SMDATA_13_KVOsYBMAAAAlAAAAZAAAAA8BAAAAkAAAAEgAAACQAAAASAAAAAAAAAABAAAAAAAAAAEAAABQAAAAAAAAAAAA4D8AAAAAAADgPwAAAAAAAOA/AAAAAAAA4D8AAAAAAADgPwAAAAAAAOA/AAAAAAAA4D8AAAAAAADgPwAAAAAAAOA/AAAAAAAA4D8CAAAAjAAAAAAAAAAAAAAAu+DjDP///wgAAAAAAAAAAAAAAAAAAAAAAAAAAAAAAAAAAAAAZAAAAAEAAABAAAAAAAAAAAAAAAAAAAAAAAAAAAAAAAAAAAAAAAAAAAAAAAAAAAAAAAAAAAAAAAAAAAAAAAAAAAAAAAAAAAAAAAAAAAAAAAAAAAAAAAAAAAAAAAAAAAAAFAAAADwAAAAAAAAAAAAAAAAAAAkUAAAAAQAAABQAAAAUAAAAFAAAAAEAAAAAAAAAZAAAAGQAAAAAAAAAZAAAAGQAAAAVAAAAYAAAAAAAAAAAAAAADwAAACADAAAAAAAAAAAAAAEAAACgMgAAVgcAAKr4//8BAAAAf39/AAEAAABkAAAAAAAAABQAAABAHwAAAAAAACYAAAAAAAAAwOD//wAAAAAmAAAAZAAAABYAAABMAAAAAAAAAAAAAAAEAAAAAAAAAAEAAACAgIAKAAAAACgAAAAoAAAAZAAAAGQAAAAAAAAAzMzMAAAAAABQAAAAUAAAAGQAAABkAAAAAAAAABcAAAAUAAAAAAAAAAAAAAD/fwAA/38AAAAAAAAJAAAABAAAAAAAAAAMAAAAEAAAAAAAAAAAAAAAAAAAAAAAAAAeAAAAaAAAAAAAAAAAAAAAAAAAAAAAAAAAAAAAECcAABAnAAAAAAAAAAAAAAAAAAAAAAAAAAAAAAAAAAAAAAAAAAAAABQAAAAAAAAAwMD/AAAAAABkAAAAMgAAAAAAAABkAAAAAAAAAH9/fwAKAAAAHwAAAFQAAAAAAAAFAAAAAQAAAAAAAAAAAAAAAAAAAAAAAAAAAAAAAAAAAAAAAAAAAAAAAn9/fwAAAAADzMzMAMDA/wB/f38AAAAAAAAAAAAAAAAAAAAAAAAAAAAhAAAAGAAAABQAAADQAgAAGycAAPAPAABZKQAAEAAAACYAAAAIAAAA//////////8="/>
+                <pr:smNativeData xmlns:pr="smNativeData" val="SMDATA_13_NmGsYBMAAAAlAAAAZAAAAA8BAAAAkAAAAEgAAACQAAAASAAAAAAAAAABAAAAAAAAAAEAAABQAAAAAAAAAAAA4D8AAAAAAADgPwAAAAAAAOA/AAAAAAAA4D8AAAAAAADgPwAAAAAAAOA/AAAAAAAA4D8AAAAAAADgPwAAAAAAAOA/AAAAAAAA4D8CAAAAjAAAAAAAAAAAAAAAu+DjDP///wgAAAAAAAAAAAAAAAAAAAAAAAAAAAAAAAAAAAAAZAAAAAEAAABAAAAAAAAAAAAAAAAAAAAAAAAAAAAAAAAAAAAAAAAAAAAAAAAAAAAAAAAAAAAAAAAAAAAAAAAAAAAAAAAAAAAAAAAAAAAAAAAAAAAAAAAAAAAAAAAAAAAAFAAAADwAAAAAAAAAAAAAAAAAAAkUAAAAAQAAABQAAAAUAAAAFAAAAAEAAAAAAAAAZAAAAGQAAAAAAAAAZAAAAGQAAAAVAAAAYAAAAAAAAAAAAAAADwAAACADAAAAAAAAAAAAAAEAAACgMgAAVgcAAKr4//8BAAAAf39/AAEAAABkAAAAAAAAABQAAABAHwAAAAAAACYAAAAAAAAAwOD//wAAAAAmAAAAZAAAABYAAABMAAAAAAAAAAAAAAAEAAAAAAAAAAEAAACAgIAKAAAAACgAAAAoAAAAZAAAAGQAAAAAAAAAzMzMAAAAAABQAAAAUAAAAGQAAABkAAAAAAAAABcAAAAUAAAAAAAAAAAAAAD/fwAA/38AAAAAAAAJAAAABAAAAAAAAAAMAAAAEAAAAAAAAAAAAAAAAAAAAAAAAAAeAAAAaAAAAAAAAAAAAAAAAAAAAAAAAAAAAAAAECcAABAnAAAAAAAAAAAAAAAAAAAAAAAAAAAAAAAAAAAAAAAAAAAAABQAAAAAAAAAwMD/AAAAAABkAAAAMgAAAAAAAABkAAAAAAAAAH9/fwAKAAAAHwAAAFQAAAAAAAAFAAAAAQAAAAAAAAAAAAAAAAAAAAAAAAAAAAAAAAAAAAAAAAAAAAAAAn9/fwAAAAADzMzMAMDA/wB/f38AAAAAAAAAAAAAAAAAAAAAAAAAAAAhAAAAGAAAABQAAADQAgAAGycAAPAPAABZKQAAEAAAACYAAAAIAAAA//////////8="/>
               </a:ext>
             </a:extLst>
           </p:cNvSpPr>
@@ -2928,7 +2928,7 @@
           </a:lstStyle>
           <a:p>
             <a:pPr/>
-            <a:fld id="{3FED6C43-0DD2-B89A-9C55-FBCF221B6AAE}" type="datetime1">
+            <a:fld id="{3FD4576A-24D2-81A1-9C6C-D2F419226A87}" type="datetime1">
               <a:t/>
             </a:fld>
           </a:p>
@@ -2941,7 +2941,7 @@
             <a:spLocks noGrp="1" noChangeArrowheads="1"/>
             <a:extLst>
               <a:ext uri="smNativeData">
-                <pr:smNativeData xmlns:pr="smNativeData" val="SMDATA_13_KVOsYBMAAAAlAAAAZAAAAA8BAAAAkAAAAEgAAACQAAAASAAAAAAAAAABAAAAAAAAAAEAAABQAAAAAAAAAAAA4D8AAAAAAADgPwAAAAAAAOA/AAAAAAAA4D8AAAAAAADgPwAAAAAAAOA/AAAAAAAA4D8AAAAAAADgPwAAAAAAAOA/AAAAAAAA4D8CAAAAjAAAAAAAAAAAAAAAu+DjDP///wgAAAAAAAAAAAAAAAAAAAAAAAAAAAAAAAAAAAAAZAAAAAEAAABAAAAAAAAAAAAAAAAAAAAAAAAAAAAAAAAAAAAAAAAAAAAAAAAAAAAAAAAAAAAAAAAAAAAAAAAAAAAAAAAAAAAAAAAAAAAAAAAAAAAAAAAAAAAAAAAAAAAAFAAAADwAAAAAAAAAAAAAAAAAAAkUAAAAAQAAABQAAAAUAAAAFAAAAAEAAAAAAAAAZAAAAGQAAAAAAAAAZAAAAGQAAAAVAAAAYAAAAAAAAAAAAAAADwAAACADAAAAAAAAAAAAAAEAAACgMgAAVgcAAKr4//8BAAAAf39/AAEAAABkAAAAAAAAABQAAABAHwAAAAAAACYAAAAAAAAAwOD//wAAAAAmAAAAZAAAABYAAABMAAAAAAAAAAAAAAAEAAAAAAAAAAEAAACAgIAKAAAAACgAAAAoAAAAZAAAAGQAAAAAAAAAzMzMAAAAAABQAAAAUAAAAGQAAABkAAAAAAAAABcAAAAUAAAAAAAAAAAAAAD/fwAA/38AAAAAAAAJAAAABAAAAAAAAAAMAAAAEAAAAAAAAAAAAAAAAAAAAAAAAAAeAAAAaAAAAAAAAAAAAAAAAAAAAAAAAAAAAAAAECcAABAnAAAAAAAAAAAAAAAAAAAAAAAAAAAAAAAAAAAAAAAAAAAAABQAAAAAAAAAwMD/AAAAAABkAAAAMgAAAAAAAABkAAAAAAAAAH9/fwAKAAAAHwAAAFQAAAAAAAAFAAAAAQAAAAAAAAAAAAAAAAAAAAAAAAAAAAAAAAAAAAAAAAAAAAAAAn9/fwAAAAADzMzMAMDA/wB/f38AAAAAAAAAAAAAAAAAAAAAAAAAAAAhAAAAGAAAABQAAAA4EwAAGycAAAglAABZKQAAEAAAACYAAAAIAAAA//////////8="/>
+                <pr:smNativeData xmlns:pr="smNativeData" val="SMDATA_13_NmGsYBMAAAAlAAAAZAAAAA8BAAAAkAAAAEgAAACQAAAASAAAAAAAAAABAAAAAAAAAAEAAABQAAAAAAAAAAAA4D8AAAAAAADgPwAAAAAAAOA/AAAAAAAA4D8AAAAAAADgPwAAAAAAAOA/AAAAAAAA4D8AAAAAAADgPwAAAAAAAOA/AAAAAAAA4D8CAAAAjAAAAAAAAAAAAAAAu+DjDP///wgAAAAAAAAAAAAAAAAAAAAAAAAAAAAAAAAAAAAAZAAAAAEAAABAAAAAAAAAAAAAAAAAAAAAAAAAAAAAAAAAAAAAAAAAAAAAAAAAAAAAAAAAAAAAAAAAAAAAAAAAAAAAAAAAAAAAAAAAAAAAAAAAAAAAAAAAAAAAAAAAAAAAFAAAADwAAAAAAAAAAAAAAAAAAAkUAAAAAQAAABQAAAAUAAAAFAAAAAEAAAAAAAAAZAAAAGQAAAAAAAAAZAAAAGQAAAAVAAAAYAAAAAAAAAAAAAAADwAAACADAAAAAAAAAAAAAAEAAACgMgAAVgcAAKr4//8BAAAAf39/AAEAAABkAAAAAAAAABQAAABAHwAAAAAAACYAAAAAAAAAwOD//wAAAAAmAAAAZAAAABYAAABMAAAAAAAAAAAAAAAEAAAAAAAAAAEAAACAgIAKAAAAACgAAAAoAAAAZAAAAGQAAAAAAAAAzMzMAAAAAABQAAAAUAAAAGQAAABkAAAAAAAAABcAAAAUAAAAAAAAAAAAAAD/fwAA/38AAAAAAAAJAAAABAAAAAAAAAAMAAAAEAAAAAAAAAAAAAAAAAAAAAAAAAAeAAAAaAAAAAAAAAAAAAAAAAAAAAAAAAAAAAAAECcAABAnAAAAAAAAAAAAAAAAAAAAAAAAAAAAAAAAAAAAAAAAAAAAABQAAAAAAAAAwMD/AAAAAABkAAAAMgAAAAAAAABkAAAAAAAAAH9/fwAKAAAAHwAAAFQAAAAAAAAFAAAAAQAAAAAAAAAAAAAAAAAAAAAAAAAAAAAAAAAAAAAAAAAAAAAAAn9/fwAAAAADzMzMAMDA/wB/f38AAAAAAAAAAAAAAAAAAAAAAAAAAAAhAAAAGAAAABQAAAA4EwAAGycAAAglAABZKQAAEAAAACYAAAAIAAAA//////////8="/>
               </a:ext>
             </a:extLst>
           </p:cNvSpPr>
@@ -2986,7 +2986,7 @@
             <a:spLocks noGrp="1" noChangeArrowheads="1"/>
             <a:extLst>
               <a:ext uri="smNativeData">
-                <pr:smNativeData xmlns:pr="smNativeData" val="SMDATA_13_KVOsYBMAAAAlAAAAZAAAAA8BAAAAkAAAAEgAAACQAAAASAAAAAAAAAABAAAAAAAAAAEAAABQAAAAAAAAAAAA4D8AAAAAAADgPwAAAAAAAOA/AAAAAAAA4D8AAAAAAADgPwAAAAAAAOA/AAAAAAAA4D8AAAAAAADgPwAAAAAAAOA/AAAAAAAA4D8CAAAAjAAAAAAAAAAAAAAAu+DjDP///wgAAAAAAAAAAAAAAAAAAAAAAAAAAAAAAAAAAAAAZAAAAAEAAABAAAAAAAAAAAAAAAAAAAAAAAAAAAAAAAAAAAAAAAAAAAAAAAAAAAAAAAAAAAAAAAAAAAAAAAAAAAAAAAAAAAAAAAAAAAAAAAAAAAAAAAAAAAAAAAAAAAAAFAAAADwAAAAAAAAAAAAAAAAAAAkUAAAAAQAAABQAAAAUAAAAFAAAAAEAAAAAAAAAZAAAAGQAAAAAAAAAZAAAAGQAAAAVAAAAYAAAAAAAAAAAAAAADwAAACADAAAAAAAAAAAAAAEAAACgMgAAVgcAAKr4//8BAAAAf39/AAEAAABkAAAAAAAAABQAAABAHwAAAAAAACYAAAAAAAAAwOD//wAAAAAmAAAAZAAAABYAAABMAAAAAAAAAAAAAAAEAAAAAAAAAAEAAACAgIAKAAAAACgAAAAoAAAAZAAAAGQAAAAAAAAAzMzMAAAAAABQAAAAUAAAAGQAAABkAAAAAAAAABcAAAAUAAAAAAAAAAAAAAD/fwAA/38AAAAAAAAJAAAABAAAAAAAAAAMAAAAEAAAAAAAAAAAAAAAAAAAAAAAAAAeAAAAaAAAAAAAAAAAAAAAAAAAAAAAAAAAAAAAECcAABAnAAAAAAAAAAAAAAAAAAAAAAAAAAAAAAAAAAAAAAAAAAAAABQAAAAAAAAAwMD/AAAAAABkAAAAMgAAAAAAAABkAAAAAAAAAH9/fwAKAAAAHwAAAFQAAAAAAAAFAAAAAQAAAAAAAAAAAAAAAAAAAAAAAAAAAAAAAAAAAAAAAAAAAAAAAn9/fwAAAAADzMzMAMDA/wB/f38AAAAAAAAAAAAAAAAAAAAAAAAAAAAhAAAAGAAAABQAAABQKAAAGycAAHA1AABZKQAAEAAAACYAAAAIAAAA//////////8="/>
+                <pr:smNativeData xmlns:pr="smNativeData" val="SMDATA_13_NmGsYBMAAAAlAAAAZAAAAA8BAAAAkAAAAEgAAACQAAAASAAAAAAAAAABAAAAAAAAAAEAAABQAAAAAAAAAAAA4D8AAAAAAADgPwAAAAAAAOA/AAAAAAAA4D8AAAAAAADgPwAAAAAAAOA/AAAAAAAA4D8AAAAAAADgPwAAAAAAAOA/AAAAAAAA4D8CAAAAjAAAAAAAAAAAAAAAu+DjDP///wgAAAAAAAAAAAAAAAAAAAAAAAAAAAAAAAAAAAAAZAAAAAEAAABAAAAAAAAAAAAAAAAAAAAAAAAAAAAAAAAAAAAAAAAAAAAAAAAAAAAAAAAAAAAAAAAAAAAAAAAAAAAAAAAAAAAAAAAAAAAAAAAAAAAAAAAAAAAAAAAAAAAAFAAAADwAAAAAAAAAAAAAAAAAAAkUAAAAAQAAABQAAAAUAAAAFAAAAAEAAAAAAAAAZAAAAGQAAAAAAAAAZAAAAGQAAAAVAAAAYAAAAAAAAAAAAAAADwAAACADAAAAAAAAAAAAAAEAAACgMgAAVgcAAKr4//8BAAAAf39/AAEAAABkAAAAAAAAABQAAABAHwAAAAAAACYAAAAAAAAAwOD//wAAAAAmAAAAZAAAABYAAABMAAAAAAAAAAAAAAAEAAAAAAAAAAEAAACAgIAKAAAAACgAAAAoAAAAZAAAAGQAAAAAAAAAzMzMAAAAAABQAAAAUAAAAGQAAABkAAAAAAAAABcAAAAUAAAAAAAAAAAAAAD/fwAA/38AAAAAAAAJAAAABAAAAAAAAAAMAAAAEAAAAAAAAAAAAAAAAAAAAAAAAAAeAAAAaAAAAAAAAAAAAAAAAAAAAAAAAAAAAAAAECcAABAnAAAAAAAAAAAAAAAAAAAAAAAAAAAAAAAAAAAAAAAAAAAAABQAAAAAAAAAwMD/AAAAAABkAAAAMgAAAAAAAABkAAAAAAAAAH9/fwAKAAAAHwAAAFQAAAAAAAAFAAAAAQAAAAAAAAAAAAAAAAAAAAAAAAAAAAAAAAAAAAAAAAAAAAAAAn9/fwAAAAADzMzMAMDA/wB/f38AAAAAAAAAAAAAAAAAAAAAAAAAAAAhAAAAGAAAABQAAABQKAAAGycAAHA1AABZKQAAEAAAACYAAAAIAAAA//////////8="/>
               </a:ext>
             </a:extLst>
           </p:cNvSpPr>
@@ -3021,7 +3021,7 @@
           </a:lstStyle>
           <a:p>
             <a:pPr/>
-            <a:fld id="{3FED01FF-B1D2-B8F7-9C55-47A24F1B6A12}" type="slidenum">
+            <a:fld id="{3FD40B02-4CD2-81FD-9C6C-BAA845226AEF}" type="slidenum">
               <a:t/>
             </a:fld>
           </a:p>
@@ -3708,7 +3708,7 @@
             <a:spLocks noGrp="1" noChangeArrowheads="1"/>
             <a:extLst>
               <a:ext uri="smNativeData">
-                <pr:smNativeData xmlns:pr="smNativeData" val="SMDATA_13_KVOsYBMAAAAlAAAAZAAAAA8BAAAAkAAAAEgAAACQAAAASAAAAAAAAAABAAAAAAAAAAEAAABQAAAAAAAAAAAA4D8AAAAAAADgPwAAAAAAAOA/AAAAAAAA4D8AAAAAAADgPwAAAAAAAOA/AAAAAAAA4D8AAAAAAADgPwAAAAAAAOA/AAAAAAAA4D8CAAAAjAAAAAAAAAAAAAAAu+DjDP///wgAAAAAAAAAAAAAAAAAAAAAAAAAAAAAAAAAAAAAZAAAAAEAAABAAAAAAAAAAAAAAAAAAAAAAAAAAAAAAAAAAAAAAAAAAAAAAAAAAAAAAAAAAAAAAAAAAAAAAAAAAAAAAAAAAAAAAAAAAAAAAAAAAAAAAAAAAAAAAAAAAAAAFAAAADwAAAAAAAAAAAAAAAAAAAkUAAAAAQAAABQAAAAUAAAAFAAAAAEAAAAAAAAAZAAAAGQAAAAAAAAAZAAAAGQAAAAVAAAAYAAAAAAAAAAAAAAADwAAACADAAAAAAAAAAAAAAEAAACgMgAAVgcAAKr4//8BAAAAf39/AAEAAABkAAAAAAAAABQAAABAHwAAAAAAACYAAAAAAAAAwOD//wAAAAAmAAAAZAAAABYAAABMAAAAAAAAAAAAAAAEAAAAAAAAAAEAAACAgIAKAAAAACgAAAAoAAAAZAAAAGQAAAAAAAAAzMzMAAAAAABQAAAAUAAAAGQAAABkAAAAAAAAABcAAAAUAAAAAAAAAAAAAAD/fwAA/38AAAAAAAAJAAAABAAAAAMAih0MAAAAEAAAAAAAAAAAAAAAAAAAAAAAAAAeAAAAaAAAAAAAAAAAAAAAAAAAAAAAAAAAAAAAECcAABAnAAAAAAAAAAAAAAAAAAAAAAAAAAAAAAAAAAAAAAAAAAAAABQAAAAAAAAAwMD/AAAAAABkAAAAMgAAAAAAAABkAAAAAAAAAH9/fwAKAAAAHwAAAFQAAAAzZswFAACZAQAAAAAAAAAAAAAAAAAAAAAAAAAAAAAAAAAAAAAAAAAA////An9/fwAAM2YDzMzMAMDA/wB/f38AAAAAAAAAAAAAAAAAAAAAAAAAAAAhAAAAGAAAABQAAAA4BAAAGg0AAAg0AAAmFgAAEAAAACYAAAAIAAAAAAAAAAAAAAA="/>
+                <pr:smNativeData xmlns:pr="smNativeData" val="SMDATA_13_NmGsYBMAAAAlAAAAZAAAAA8BAAAAkAAAAEgAAACQAAAASAAAAAAAAAABAAAAAAAAAAEAAABQAAAAAAAAAAAA4D8AAAAAAADgPwAAAAAAAOA/AAAAAAAA4D8AAAAAAADgPwAAAAAAAOA/AAAAAAAA4D8AAAAAAADgPwAAAAAAAOA/AAAAAAAA4D8CAAAAjAAAAAAAAAAAAAAAu+DjDP///wgAAAAAAAAAAAAAAAAAAAAAAAAAAAAAAAAAAAAAZAAAAAEAAABAAAAAAAAAAAAAAAAAAAAAAAAAAAAAAAAAAAAAAAAAAAAAAAAAAAAAAAAAAAAAAAAAAAAAAAAAAAAAAAAAAAAAAAAAAAAAAAAAAAAAAAAAAAAAAAAAAAAAFAAAADwAAAAAAAAAAAAAAAAAAAkUAAAAAQAAABQAAAAUAAAAFAAAAAEAAAAAAAAAZAAAAGQAAAAAAAAAZAAAAGQAAAAVAAAAYAAAAAAAAAAAAAAADwAAACADAAAAAAAAAAAAAAEAAACgMgAAVgcAAKr4//8BAAAAf39/AAEAAABkAAAAAAAAABQAAABAHwAAAAAAACYAAAAAAAAAwOD//wAAAAAmAAAAZAAAABYAAABMAAAAAAAAAAAAAAAEAAAAAAAAAAEAAACAgIAKAAAAACgAAAAoAAAAZAAAAGQAAAAAAAAAzMzMAAAAAABQAAAAUAAAAGQAAABkAAAAAAAAABcAAAAUAAAAAAAAAAAAAAD/fwAA/38AAAAAAAAJAAAABAAAAAMAih0MAAAAEAAAAAAAAAAAAAAAAAAAAAAAAAAeAAAAaAAAAAAAAAAAAAAAAAAAAAAAAAAAAAAAECcAABAnAAAAAAAAAAAAAAAAAAAAAAAAAAAAAAAAAAAAAAAAAAAAABQAAAAAAAAAwMD/AAAAAABkAAAAMgAAAAAAAABkAAAAAAAAAH9/fwAKAAAAHwAAAFQAAAAzZswFAACZAQAAAAAAAAAAAAAAAAAAAAAAAAAAAAAAAAAAAAAAAAAA////An9/fwAAM2YDzMzMAMDA/wB/f38AAAAAAAAAAAAAAAAAAAAAAAAAAAAhAAAAGAAAABQAAABGBAAAYAoAABY0AABsEwAAAAAAACYAAAAIAAAAAQAAAAAAAAA="/>
               </a:ext>
             </a:extLst>
           </p:cNvSpPr>
@@ -3716,7 +3716,12 @@
             <p:ph type="ctrTitle"/>
           </p:nvPr>
         </p:nvSpPr>
-        <p:spPr/>
+        <p:spPr>
+          <a:xfrm>
+            <a:off x="694690" y="1686560"/>
+            <a:ext cx="7772400" cy="1470660"/>
+          </a:xfrm>
+        </p:spPr>
         <p:txBody>
           <a:bodyPr/>
           <a:lstStyle/>
@@ -3732,6 +3737,18 @@
               <a:t>WELCOME TO THE FANTASY ADVENTURE!!!</a:t>
             </a:r>
           </a:p>
+          <a:p>
+            <a:pPr>
+              <a:defRPr sz="3600">
+                <a:solidFill>
+                  <a:srgbClr val="FF0000"/>
+                </a:solidFill>
+              </a:defRPr>
+            </a:pPr>
+            <a:r>
+              <a:t>A RPG TEXT GAME</a:t>
+            </a:r>
+          </a:p>
         </p:txBody>
       </p:sp>
       <p:sp>
@@ -3741,7 +3758,7 @@
             <a:spLocks noGrp="1" noChangeArrowheads="1"/>
             <a:extLst>
               <a:ext uri="smNativeData">
-                <pr:smNativeData xmlns:pr="smNativeData" val="SMDATA_13_KVOsYBMAAAAlAAAAZAAAAA8BAAAAkAAAAEgAAACQAAAASAAAAAAAAAAAAAAAAAAAAAEAAABQAAAAAAAAAAAA4D8AAAAAAADgPwAAAAAAAOA/AAAAAAAA4D8AAAAAAADgPwAAAAAAAOA/AAAAAAAA4D8AAAAAAADgPwAAAAAAAOA/AAAAAAAA4D8CAAAAjAAAAAAAAAAAAAAAu+DjDP///wgAAAAAAAAAAAAAAAAAAAAAAAAAAAAAAAAAAAAAZAAAAAEAAABAAAAAAAAAAAAAAAAAAAAAAAAAAAAAAAAAAAAAAAAAAAAAAAAAAAAAAAAAAAAAAAAAAAAAAAAAAAAAAAAAAAAAAAAAAAAAAAAAAAAAAAAAAAAAAAAAAAAAFAAAADwAAAAAAAAAAAAAAAAAAAkUAAAAAQAAABQAAAAUAAAAFAAAAAEAAAAAAAAAZAAAAGQAAAAAAAAAZAAAAGQAAAAVAAAAYAAAAAAAAAAAAAAADwAAACADAAAAAAAAAAAAAAEAAACgMgAAVgcAAKr4//8BAAAAf39/AAEAAABkAAAAAAAAABQAAABAHwAAAAAAACYAAAAAAAAAwOD//wAAAAAmAAAAZAAAABYAAABMAAAAAAAAAAAAAAAEAAAAAAAAAAEAAACAgIAKAAAAACgAAAAoAAAAZAAAAGQAAAAAAAAAzMzMAAAAAABQAAAAUAAAAGQAAABkAAAAAAAAABcAAAAUAAAAAAAAAAAAAAD/fwAA/38AAAAAAAAJAAAABAAAAAAAAAAMAAAAEAAAAAAAAAAAAAAAAAAAAAAAAAAeAAAAaAAAAAAAAAAAAAAAAAAAAAAAAAAAAAAAECcAABAnAAAAAAAAAAAAAAAAAAAAAAAAAAAAAAAAAAAAAAAAAAAAABQAAAAAAAAAwMD/AAAAAABkAAAAMgAAAAAAAABkAAAAAAAAAH9/fwAKAAAAHwAAAFQAAAAzZswFAACZAQAAAAAAAAAAAAAAAAAAAAAAAAAAAAAAAAAAAAAAAAAA////An9/fwAAM2YDzMzMAMDA/wB/f38AAAAAAAAAAAAAAAAAAAAAAAAAAAAhAAAAGAAAABQAAABwCAAA6BcAANAvAACwIgAAEAAAACYAAAAIAAAAAAAAAAAAAAA="/>
+                <pr:smNativeData xmlns:pr="smNativeData" val="SMDATA_13_NmGsYBMAAAAlAAAAZAAAAA8BAAAAkAAAAEgAAACQAAAASAAAAAAAAAAAAAAAAAAAAAEAAABQAAAAAAAAAAAA4D8AAAAAAADgPwAAAAAAAOA/AAAAAAAA4D8AAAAAAADgPwAAAAAAAOA/AAAAAAAA4D8AAAAAAADgPwAAAAAAAOA/AAAAAAAA4D8CAAAAjAAAAAAAAAAAAAAAu+DjDP///wgAAAAAAAAAAAAAAAAAAAAAAAAAAAAAAAAAAAAAZAAAAAEAAABAAAAAAAAAAAAAAAAAAAAAAAAAAAAAAAAAAAAAAAAAAAAAAAAAAAAAAAAAAAAAAAAAAAAAAAAAAAAAAAAAAAAAAAAAAAAAAAAAAAAAAAAAAAAAAAAAAAAAFAAAADwAAAAAAAAAAAAAAAAAAAkUAAAAAQAAABQAAAAUAAAAFAAAAAEAAAAAAAAAZAAAAGQAAAAAAAAAZAAAAGQAAAAVAAAAYAAAAAAAAAAAAAAADwAAACADAAAAAAAAAAAAAAEAAACgMgAAVgcAAKr4//8BAAAAf39/AAEAAABkAAAAAAAAABQAAABAHwAAAAAAACYAAAAAAAAAwOD//wAAAAAmAAAAZAAAABYAAABMAAAAAAAAAAAAAAAEAAAAAAAAAAEAAACAgIAKAAAAACgAAAAoAAAAZAAAAGQAAAAAAAAAzMzMAAAAAABQAAAAUAAAAGQAAABkAAAAAAAAABcAAAAUAAAAAAAAAAAAAAD/fwAA/38AAAAAAAAJAAAABAAAAAAAAAAMAAAAEAAAAAAAAAAAAAAAAAAAAAAAAAAeAAAAaAAAAAAAAAAAAAAAAAAAAAAAAAAAAAAAECcAABAnAAAAAAAAAAAAAAAAAAAAAAAAAAAAAAAAAAAAAAAAAAAAABQAAAAAAAAAwMD/AAAAAABkAAAAMgAAAAAAAABkAAAAAAAAAH9/fwAKAAAAHwAAAFQAAAAzZswFAACZAQAAAAAAAAAAAAAAAAAAAAAAAAAAAAAAAAAAAAAAAAAA////An9/fwAAM2YDzMzMAMDA/wB/f38AAAAAAAAAAAAAAAAAAAAAAAAAAAAhAAAAGAAAABQAAABwCAAA6BcAANAvAACwIgAAEAAAACYAAAAIAAAAAAAAAAAAAAA="/>
               </a:ext>
             </a:extLst>
           </p:cNvSpPr>
@@ -3806,7 +3823,7 @@
             <a:spLocks noGrp="1" noChangeArrowheads="1"/>
             <a:extLst>
               <a:ext uri="smNativeData">
-                <pr:smNativeData xmlns:pr="smNativeData" val="SMDATA_13_KVOsYBMAAAAlAAAAZAAAAA8BAAAAkAAAAEgAAACQAAAASAAAAAAAAAABAAAAAAAAAAEAAABQAAAAAAAAAAAA4D8AAAAAAADgPwAAAAAAAOA/AAAAAAAA4D8AAAAAAADgPwAAAAAAAOA/AAAAAAAA4D8AAAAAAADgPwAAAAAAAOA/AAAAAAAA4D8CAAAAjAAAAAAAAAAAAAAAu+DjDP///wgAAAAAAAAAAAAAAAAAAAAAAAAAAAAAAAAAAAAAZAAAAAEAAABAAAAAAAAAAAAAAAAAAAAAAAAAAAAAAAAAAAAAAAAAAAAAAAAAAAAAAAAAAAAAAAAAAAAAAAAAAAAAAAAAAAAAAAAAAAAAAAAAAAAAAAAAAAAAAAAAAAAAFAAAADwAAAAAAAAAAAAAAAAAAAkUAAAAAQAAABQAAAAUAAAAFAAAAAEAAAAAAAAAZAAAAGQAAAAAAAAAZAAAAGQAAAAVAAAAYAAAAAAAAAAAAAAADwAAACADAAAAAAAAAAAAAAEAAACgMgAAVgcAAKr4//8BAAAAf39/AAEAAABkAAAAAAAAABQAAABAHwAAAAAAACYAAAAAAAAAwOD//wAAAAAmAAAAZAAAABYAAABMAAAAAAAAAAAAAAAEAAAAAAAAAAEAAACAgIAKAAAAACgAAAAoAAAAZAAAAGQAAAAAAAAAzMzMAAAAAABQAAAAUAAAAGQAAABkAAAAAAAAABcAAAAUAAAAAAAAAAAAAAD/fwAA/38AAAAAAAAJAAAABAAAAAAAAAAMAAAAEAAAAAAAAAAAAAAAAAAAAAAAAAAeAAAAaAAAAAAAAAAAAAAAAAAAAAAAAAAAAAAAECcAABAnAAAAAAAAAAAAAAAAAAAAAAAAAAAAAAAAAAAAAAAAAAAAABQAAAAAAAAAwMD/AAAAAABkAAAAMgAAAAAAAABkAAAAAAAAAH9/fwAKAAAAHwAAAFQAAAC74OMF////AQAAAAAAAAAAAAAAAAAAAAAAAAAAAAAAAAAAAAAAAAAAAAAAAn9/fwCAgIADzMzMAMDA/wB/f38AAAAAAAAAAAAAAAAAAAAAAAAAAAAhAAAAGAAAABQAAADQAgAAsAEAAHA1AAC4CAAAEAAAACYAAAAIAAAAAAAAAAAAAAA="/>
+                <pr:smNativeData xmlns:pr="smNativeData" val="SMDATA_13_NmGsYBMAAAAlAAAAZAAAAA8BAAAAkAAAAEgAAACQAAAASAAAAAAAAAABAAAAAAAAAAEAAABQAAAAAAAAAAAA4D8AAAAAAADgPwAAAAAAAOA/AAAAAAAA4D8AAAAAAADgPwAAAAAAAOA/AAAAAAAA4D8AAAAAAADgPwAAAAAAAOA/AAAAAAAA4D8CAAAAjAAAAAAAAAAAAAAAu+DjDP///wgAAAAAAAAAAAAAAAAAAAAAAAAAAAAAAAAAAAAAZAAAAAEAAABAAAAAAAAAAAAAAAAAAAAAAAAAAAAAAAAAAAAAAAAAAAAAAAAAAAAAAAAAAAAAAAAAAAAAAAAAAAAAAAAAAAAAAAAAAAAAAAAAAAAAAAAAAAAAAAAAAAAAFAAAADwAAAAAAAAAAAAAAAAAAAkUAAAAAQAAABQAAAAUAAAAFAAAAAEAAAAAAAAAZAAAAGQAAAAAAAAAZAAAAGQAAAAVAAAAYAAAAAAAAAAAAAAADwAAACADAAAAAAAAAAAAAAEAAACgMgAAVgcAAKr4//8BAAAAf39/AAEAAABkAAAAAAAAABQAAABAHwAAAAAAACYAAAAAAAAAwOD//wAAAAAmAAAAZAAAABYAAABMAAAAAAAAAAAAAAAEAAAAAAAAAAEAAACAgIAKAAAAACgAAAAoAAAAZAAAAGQAAAAAAAAAzMzMAAAAAABQAAAAUAAAAGQAAABkAAAAAAAAABcAAAAUAAAAAAAAAAAAAAD/fwAA/38AAAAAAAAJAAAABAAAAAAAAAAMAAAAEAAAAAAAAAAAAAAAAAAAAAAAAAAeAAAAaAAAAAAAAAAAAAAAAAAAAAAAAAAAAAAAECcAABAnAAAAAAAAAAAAAAAAAAAAAAAAAAAAAAAAAAAAAAAAAAAAABQAAAAAAAAAwMD/AAAAAABkAAAAMgAAAAAAAABkAAAAAAAAAH9/fwAKAAAAHwAAAFQAAAC74OMF////AQAAAAAAAAAAAAAAAAAAAAAAAAAAAAAAAAAAAAAAAAAAAAAAAn9/fwCAgIADzMzMAMDA/wB/f38AAAAAAAAAAAAAAAAAAAAAAAAAAAAhAAAAGAAAABQAAADQAgAAsAEAAHA1AAC4CAAAEAAAACYAAAAIAAAAAAAAAAAAAAA="/>
               </a:ext>
             </a:extLst>
           </p:cNvSpPr>
@@ -3833,7 +3850,7 @@
             <a:picLocks noChangeAspect="1"/>
             <a:extLst>
               <a:ext uri="smNativeData">
-                <pr:smNativeData xmlns:pr="smNativeData" val="SMDATA_15_KVOsYBMAAAAlAAAAEQAAAC8BAAAAkAAAAEgAAACQAAAASAAAAAAAAAAAAAAAAAAAAAEAAABQAAAAAAAAAAAA4D8AAAAAAADgPwAAAAAAAOA/AAAAAAAA4D8AAAAAAADgPwAAAAAAAOA/AAAAAAAA4D8AAAAAAADgPwAAAAAAAOA/AAAAAAAA4D8CAAAAjAAAAAAAAAAAAAAAu+DjDP///wgAAAAAAAAAAAAAAAAAAAAAAAAAAAAAAAAAAAAAZAAAAAEAAABAAAAAAAAAAAAAAAAAAAAAAAAAAAAAAAAAAAAAAAAAAAAAAAAAAAAAAAAAAAAAAAAAAAAAAAAAAAAAAAAAAAAAAAAAAAAAAAAAAAAAAAAAAAAAAAAAAAAAFAAAADwAAAAAAAAAAAAAAAAAAAkUAAAAAQAAABQAAAAUAAAAFAAAAAEAAAAAAAAAZAAAAGQAAAAAAAAAZAAAAGQAAAAVAAAAYAAAAAAAAAAAAAAADwAAACADAAAAAAAAAAAAAAEAAACgMgAAVgcAAKr4//8BAAAAf39/AAEAAABkAAAAAAAAABQAAABAHwAAAAAAACYAAAAAAAAAwOD//wAAAAAmAAAAZAAAABYAAABMAAAAAAAAAAAAAAAEAAAAAAAAAAEAAACAgIAKAAAAACgAAAAoAAAAZAAAAGQAAAAAAAAAzMzMAAAAAABQAAAAUAAAAGQAAABkAAAAAAAAAAcAAAA4AAAAAAAAAAAAAAAAAAAA////AAAAAAAAAAAAAAAAAAAAAAAAAAAAAAAAAAAAAABkAAAAZAAAAAAAAAAjAAAABAAAAGQAAAAXAAAAFAAAAAAAAAAAAAAA/38AAP9/AAAAAAAACQAAAAQAAAAAAAAADAAAABAAAAAAAAAAAAAAAAAAAAAAAAAAHgAAAGgAAAAAAAAAAAAAAAAAAAAAAAAAAAAAABAnAAAQJwAAAAAAAAAAAAAAAAAAAAAAAAAAAAAAAAAAAAAAAAAAAAAUAAAAAAAAAMDA/wAAAAAAZAAAADIAAAAAAAAAZAAAAAAAAAB/f38ACgAAAB8AAABUAAAAu+DjBf///wEAAAAAAAAAAAAAAAAAAAAAAAAAAAAAAAAAAAAAAAAAAAAAAAJ/f38AgICAA8zMzADAwP8Af39/AAAAAAAAAAAAAAAAAP///wAAAAAAIQAAABgAAAAUAAAAAAAAAPYKAAA/OAAAZyYAABAAAAAmAAAACAAAAP//////////"/>
+                <pr:smNativeData xmlns:pr="smNativeData" val="SMDATA_15_NmGsYBMAAAAlAAAAEQAAAC8BAAAAkAAAAEgAAACQAAAASAAAAAAAAAAAAAAAAAAAAAEAAABQAAAAAAAAAAAA4D8AAAAAAADgPwAAAAAAAOA/AAAAAAAA4D8AAAAAAADgPwAAAAAAAOA/AAAAAAAA4D8AAAAAAADgPwAAAAAAAOA/AAAAAAAA4D8CAAAAjAAAAAAAAAAAAAAAu+DjDP///wgAAAAAAAAAAAAAAAAAAAAAAAAAAAAAAAAAAAAAZAAAAAEAAABAAAAAAAAAAAAAAAAAAAAAAAAAAAAAAAAAAAAAAAAAAAAAAAAAAAAAAAAAAAAAAAAAAAAAAAAAAAAAAAAAAAAAAAAAAAAAAAAAAAAAAAAAAAAAAAAAAAAAFAAAADwAAAAAAAAAAAAAAAAAAAkUAAAAAQAAABQAAAAUAAAAFAAAAAEAAAAAAAAAZAAAAGQAAAAAAAAAZAAAAGQAAAAVAAAAYAAAAAAAAAAAAAAADwAAACADAAAAAAAAAAAAAAEAAACgMgAAVgcAAKr4//8BAAAAf39/AAEAAABkAAAAAAAAABQAAABAHwAAAAAAACYAAAAAAAAAwOD//wAAAAAmAAAAZAAAABYAAABMAAAAAAAAAAAAAAAEAAAAAAAAAAEAAACAgIAKAAAAACgAAAAoAAAAZAAAAGQAAAAAAAAAzMzMAAAAAABQAAAAUAAAAGQAAABkAAAAAAAAAAcAAAA4AAAAAAAAAAAAAAAAAAAA////AAAAAAAAAAAAAAAAAAAAAAAAAAAAAAAAAAAAAABkAAAAZAAAAAAAAAAjAAAABAAAAGQAAAAXAAAAFAAAAAAAAAAAAAAA/38AAP9/AAAAAAAACQAAAAQAAAAAAAAADAAAABAAAAAAAAAAAAAAAAAAAAAAAAAAHgAAAGgAAAAAAAAAAAAAAAAAAAAAAAAAAAAAABAnAAAQJwAAAAAAAAAAAAAAAAAAAAAAAAAAAAAAAAAAAAAAAAAAAAAUAAAAAAAAAMDA/wAAAAAAZAAAADIAAAAAAAAAZAAAAAAAAAB/f38ACgAAAB8AAABUAAAAu+DjBf///wEAAAAAAAAAAAAAAAAAAAAAAAAAAAAAAAAAAAAAAAAAAAAAAAJ/f38AgICAA8zMzADAwP8Af39/AAAAAAAAAAAAAAAAAP///wAAAAAAIQAAABgAAAAUAAAAAAAAAPYKAAA/OAAAZyYAABAAAAAmAAAACAAAAP//////////"/>
               </a:ext>
             </a:extLst>
           </p:cNvPicPr>
@@ -3899,7 +3916,7 @@
             <a:spLocks noGrp="1" noChangeArrowheads="1"/>
             <a:extLst>
               <a:ext uri="smNativeData">
-                <pr:smNativeData xmlns:pr="smNativeData" val="SMDATA_13_KVOsYBMAAAAlAAAAZAAAAA8BAAAAkAAAAEgAAACQAAAASAAAAAAAAAABAAAAAAAAAAEAAABQAAAAAAAAAAAA4D8AAAAAAADgPwAAAAAAAOA/AAAAAAAA4D8AAAAAAADgPwAAAAAAAOA/AAAAAAAA4D8AAAAAAADgPwAAAAAAAOA/AAAAAAAA4D8CAAAAjAAAAAAAAAAAAAAAu+DjDP///wgAAAAAAAAAAAAAAAAAAAAAAAAAAAAAAAAAAAAAZAAAAAEAAABAAAAAAAAAAAAAAAAAAAAAAAAAAAAAAAAAAAAAAAAAAAAAAAAAAAAAAAAAAAAAAAAAAAAAAAAAAAAAAAAAAAAAAAAAAAAAAAAAAAAAAAAAAAAAAAAAAAAAFAAAADwAAAAAAAAAAAAAAAAAAAkUAAAAAQAAABQAAAAUAAAAFAAAAAEAAAAAAAAAZAAAAGQAAAAAAAAAZAAAAGQAAAAVAAAAYAAAAAAAAAAAAAAADwAAACADAAAAAAAAAAAAAAEAAACgMgAAVgcAAKr4//8BAAAAf39/AAEAAABkAAAAAAAAABQAAABAHwAAAAAAACYAAAAAAAAAwOD//wAAAAAmAAAAZAAAABYAAABMAAAAAAAAAAAAAAAEAAAAAAAAAAEAAACAgIAKAAAAACgAAAAoAAAAZAAAAGQAAAAAAAAAzMzMAAAAAABQAAAAUAAAAGQAAABkAAAAAAAAABcAAAAUAAAAAAAAAAAAAAD/fwAA/38AAAAAAAAJAAAABAAAAAAAAAAMAAAAEAAAAAAAAAAAAAAAAAAAAAAAAAAeAAAAaAAAAAAAAAAAAAAAAAAAAAAAAAAAAAAAECcAABAnAAAAAAAAAAAAAAAAAAAAAAAAAAAAAAAAAAAAAAAAAAAAABQAAAAAAAAAwMD/AAAAAABkAAAAMgAAAAAAAABkAAAAAAAAAH9/fwAKAAAAHwAAAFQAAAD///cF///ZAQAAAAAAAAAAAAAAAAAAAAAAAAAAAAAAAAAAAAAAAAAAAAAAAn9/fwB3d3cDzMzMAMDA/wB/f38AAAAAAAAAAAAAAAAAAAAAAAAAAAAhAAAAGAAAABQAAADQAgAAsAEAAHA1AAC4CAAAEAAAACYAAAAIAAAAAAAAAAAAAAA="/>
+                <pr:smNativeData xmlns:pr="smNativeData" val="SMDATA_13_NmGsYBMAAAAlAAAAZAAAAA8BAAAAkAAAAEgAAACQAAAASAAAAAAAAAABAAAAAAAAAAEAAABQAAAAAAAAAAAA4D8AAAAAAADgPwAAAAAAAOA/AAAAAAAA4D8AAAAAAADgPwAAAAAAAOA/AAAAAAAA4D8AAAAAAADgPwAAAAAAAOA/AAAAAAAA4D8CAAAAjAAAAAAAAAAAAAAAu+DjDP///wgAAAAAAAAAAAAAAAAAAAAAAAAAAAAAAAAAAAAAZAAAAAEAAABAAAAAAAAAAAAAAAAAAAAAAAAAAAAAAAAAAAAAAAAAAAAAAAAAAAAAAAAAAAAAAAAAAAAAAAAAAAAAAAAAAAAAAAAAAAAAAAAAAAAAAAAAAAAAAAAAAAAAFAAAADwAAAAAAAAAAAAAAAAAAAkUAAAAAQAAABQAAAAUAAAAFAAAAAEAAAAAAAAAZAAAAGQAAAAAAAAAZAAAAGQAAAAVAAAAYAAAAAAAAAAAAAAADwAAACADAAAAAAAAAAAAAAEAAACgMgAAVgcAAKr4//8BAAAAf39/AAEAAABkAAAAAAAAABQAAABAHwAAAAAAACYAAAAAAAAAwOD//wAAAAAmAAAAZAAAABYAAABMAAAAAAAAAAAAAAAEAAAAAAAAAAEAAACAgIAKAAAAACgAAAAoAAAAZAAAAGQAAAAAAAAAzMzMAAAAAABQAAAAUAAAAGQAAABkAAAAAAAAABcAAAAUAAAAAAAAAAAAAAD/fwAA/38AAAAAAAAJAAAABAAAAAAAAAAMAAAAEAAAAAAAAAAAAAAAAAAAAAAAAAAeAAAAaAAAAAAAAAAAAAAAAAAAAAAAAAAAAAAAECcAABAnAAAAAAAAAAAAAAAAAAAAAAAAAAAAAAAAAAAAAAAAAAAAABQAAAAAAAAAwMD/AAAAAABkAAAAMgAAAAAAAABkAAAAAAAAAH9/fwAKAAAAHwAAAFQAAAD///cF///ZAQAAAAAAAAAAAAAAAAAAAAAAAAAAAAAAAAAAAAAAAAAAAAAAAn9/fwB3d3cDzMzMAMDA/wB/f38AAAAAAAAAAAAAAAAAAAAAAAAAAAAhAAAAGAAAABQAAADQAgAAsAEAAHA1AAC4CAAAEAAAACYAAAAIAAAAAAAAAAAAAAA="/>
               </a:ext>
             </a:extLst>
           </p:cNvSpPr>
@@ -3923,7 +3940,7 @@
             <a:picLocks noChangeAspect="1"/>
             <a:extLst>
               <a:ext uri="smNativeData">
-                <pr:smNativeData xmlns:pr="smNativeData" val="SMDATA_15_KVOsYBMAAAAlAAAAEQAAAC8BAAAAkAAAAEgAAACQAAAASAAAAAAAAAAAAAAAAAAAAAEAAABQAAAAAAAAAAAA4D8AAAAAAADgPwAAAAAAAOA/AAAAAAAA4D8AAAAAAADgPwAAAAAAAOA/AAAAAAAA4D8AAAAAAADgPwAAAAAAAOA/AAAAAAAA4D8CAAAAjAAAAAAAAAAAAAAAu+DjDP///wgAAAAAAAAAAAAAAAAAAAAAAAAAAAAAAAAAAAAAZAAAAAEAAABAAAAAAAAAAAAAAAAAAAAAAAAAAAAAAAAAAAAAAAAAAAAAAAAAAAAAAAAAAAAAAAAAAAAAAAAAAAAAAAAAAAAAAAAAAAAAAAAAAAAAAAAAAAAAAAAAAAAAFAAAADwAAAAAAAAAAAAAAAAAAAkUAAAAAQAAABQAAAAUAAAAFAAAAAEAAAAAAAAAZAAAAGQAAAAAAAAAZAAAAGQAAAAVAAAAYAAAAAAAAAAAAAAADwAAACADAAAAAAAAAAAAAAEAAACgMgAAVgcAAKr4//8BAAAAf39/AAEAAABkAAAAAAAAABQAAABAHwAAAAAAACYAAAAAAAAAwOD//wAAAAAmAAAAZAAAABYAAABMAAAAAAAAAAAAAAAEAAAAAAAAAAEAAACAgIAKAAAAACgAAAAoAAAAZAAAAGQAAAAAAAAAzMzMAAAAAABQAAAAUAAAAGQAAABkAAAAAAAAAAcAAAA4AAAAAAAAAAAAAAAAAAAA////AAAAAAAAAAAAAAAAAAAAAAAAAAAAAAAAAAAAAABkAAAAZAAAAAAAAAAjAAAABAAAAGQAAAAXAAAAFAAAAAAAAAAAAAAA/38AAP9/AAAAAAAACQAAAAQAAAAAAAAADAAAABAAAAAAAAAAAAAAAAAAAAAAAAAAHgAAAGgAAAAAAAAAAAAAAAAAAAAAAAAAAAAAABAnAAAQJwAAAAAAAAAAAAAAAAAAAAAAAAAAAAAAAAAAAAAAAAAAAAAUAAAAAAAAAMDA/wAAAAAAZAAAADIAAAAAAAAAZAAAAAAAAAB/f38ACgAAAB8AAABUAAAA///3Bf//2QEAAAAAAAAAAAAAAAAAAAAAAAAAAAAAAAAAAAAAAAAAAAAAAAJ/f38Ad3d3A8zMzADAwP8Af39/AAAAAAAAAAAAAAAAAP///wAAAAAAIQAAABgAAAAUAAAANxEAAAAAAABgKAAALyoAAAAAAAAmAAAACAAAAP//////////"/>
+                <pr:smNativeData xmlns:pr="smNativeData" val="SMDATA_15_NmGsYBMAAAAlAAAAEQAAAC8BAAAAkAAAAEgAAACQAAAASAAAAAAAAAAAAAAAAAAAAAEAAABQAAAAAAAAAAAA4D8AAAAAAADgPwAAAAAAAOA/AAAAAAAA4D8AAAAAAADgPwAAAAAAAOA/AAAAAAAA4D8AAAAAAADgPwAAAAAAAOA/AAAAAAAA4D8CAAAAjAAAAAAAAAAAAAAAu+DjDP///wgAAAAAAAAAAAAAAAAAAAAAAAAAAAAAAAAAAAAAZAAAAAEAAABAAAAAAAAAAAAAAAAAAAAAAAAAAAAAAAAAAAAAAAAAAAAAAAAAAAAAAAAAAAAAAAAAAAAAAAAAAAAAAAAAAAAAAAAAAAAAAAAAAAAAAAAAAAAAAAAAAAAAFAAAADwAAAAAAAAAAAAAAAAAAAkUAAAAAQAAABQAAAAUAAAAFAAAAAEAAAAAAAAAZAAAAGQAAAAAAAAAZAAAAGQAAAAVAAAAYAAAAAAAAAAAAAAADwAAACADAAAAAAAAAAAAAAEAAACgMgAAVgcAAKr4//8BAAAAf39/AAEAAABkAAAAAAAAABQAAABAHwAAAAAAACYAAAAAAAAAwOD//wAAAAAmAAAAZAAAABYAAABMAAAAAAAAAAAAAAAEAAAAAAAAAAEAAACAgIAKAAAAACgAAAAoAAAAZAAAAGQAAAAAAAAAzMzMAAAAAABQAAAAUAAAAGQAAABkAAAAAAAAAAcAAAA4AAAAAAAAAAAAAAAAAAAA////AAAAAAAAAAAAAAAAAAAAAAAAAAAAAAAAAAAAAABkAAAAZAAAAAAAAAAjAAAABAAAAGQAAAAXAAAAFAAAAAAAAAAAAAAA/38AAP9/AAAAAAAACQAAAAQAAAAAAAAADAAAABAAAAAAAAAAAAAAAAAAAAAAAAAAHgAAAGgAAAAAAAAAAAAAAAAAAAAAAAAAAAAAABAnAAAQJwAAAAAAAAAAAAAAAAAAAAAAAAAAAAAAAAAAAAAAAAAAAAAUAAAAAAAAAMDA/wAAAAAAZAAAADIAAAAAAAAAZAAAAAAAAAB/f38ACgAAAB8AAABUAAAA///3Bf//2QEAAAAAAAAAAAAAAAAAAAAAAAAAAAAAAAAAAAAAAAAAAAAAAAJ/f38Ad3d3A8zMzADAwP8Af39/AAAAAAAAAAAAAAAAAP///wAAAAAAIQAAABgAAAAUAAAANxEAAAAAAABgKAAALyoAABAAAAAmAAAACAAAAP//////////"/>
               </a:ext>
             </a:extLst>
           </p:cNvPicPr>
@@ -3989,7 +4006,7 @@
             <a:spLocks noGrp="1" noChangeArrowheads="1"/>
             <a:extLst>
               <a:ext uri="smNativeData">
-                <pr:smNativeData xmlns:pr="smNativeData" val="SMDATA_13_KVOsYBMAAAAlAAAAZAAAAA8BAAAAkAAAAEgAAACQAAAASAAAAAAAAAACAAAAAAAAAAEAAABQAAAAAAAAAAAA4D8AAAAAAADgPwAAAAAAAOA/AAAAAAAA4D8AAAAAAADgPwAAAAAAAOA/AAAAAAAA4D8AAAAAAADgPwAAAAAAAOA/AAAAAAAA4D8CAAAAjAAAAAAAAAAAAAAAu+DjDP///wgAAAAAAAAAAAAAAAAAAAAAAAAAAAAAAAAAAAAAZAAAAAEAAABAAAAAAAAAAAAAAAAAAAAAAAAAAAAAAAAAAAAAAAAAAAAAAAAAAAAAAAAAAAAAAAAAAAAAAAAAAAAAAAAAAAAAAAAAAAAAAAAAAAAAAAAAAAAAAAAAAAAAFAAAADwAAAAAAAAAAAAAAAAAAAkUAAAAAQAAABQAAAAUAAAAFAAAAAEAAAAAAAAAZAAAAGQAAAAAAAAAZAAAAGQAAAAVAAAAYAAAAAAAAAAAAAAADwAAACADAAAAAAAAAAAAAAEAAACgMgAAVgcAAKr4//8BAAAAf39/AAEAAABkAAAAAAAAABQAAABAHwAAAAAAACYAAAAAAAAAwOD//wAAAAAmAAAAZAAAABYAAABMAAAAAAAAAAAAAAAEAAAAAAAAAAEAAACAgIAKAAAAACgAAAAoAAAAZAAAAGQAAAAAAAAAzMzMAAAAAABQAAAAUAAAAGQAAABkAAAAAAAAABcAAAAUAAAAAAAAAAAAAAD/fwAA/38AAAAAAAAJAAAABAAAAAAAAAAMAAAAEAAAAAAAAAAAAAAAAAAAAAAAAAAeAAAAaAAAAAAAAAAAAAAAAAAAAAAAAAAAAAAAECcAABAnAAAAAAAAAAAAAAAAAAAAAAAAAAAAAAAAAAAAAAAAAAAAABQAAAAAAAAAwMD/AAAAAABkAAAAMgAAAAAAAABkAAAAAAAAAH9/fwAKAAAAHwAAAFQAAABgWXsFZmaZAQAAAAAAAAAAAAAAAAAAAAAAAAAAAAAAAAAAAAAAAAAA////An9/fwA+PlwDzMzMAMDA/wB/f38AAAAAAAAAAAAAAAAAAAAAAAAAAAAhAAAAGAAAABQAAADQAgAArgEAAFIVAADUCAAAEAAAACYAAAAIAAAAAAAAAAAAAAA="/>
+                <pr:smNativeData xmlns:pr="smNativeData" val="SMDATA_13_NmGsYBMAAAAlAAAAZAAAAA8BAAAAkAAAAEgAAACQAAAASAAAAAAAAAACAAAAAAAAAAEAAABQAAAAAAAAAAAA4D8AAAAAAADgPwAAAAAAAOA/AAAAAAAA4D8AAAAAAADgPwAAAAAAAOA/AAAAAAAA4D8AAAAAAADgPwAAAAAAAOA/AAAAAAAA4D8CAAAAjAAAAAAAAAAAAAAAu+DjDP///wgAAAAAAAAAAAAAAAAAAAAAAAAAAAAAAAAAAAAAZAAAAAEAAABAAAAAAAAAAAAAAAAAAAAAAAAAAAAAAAAAAAAAAAAAAAAAAAAAAAAAAAAAAAAAAAAAAAAAAAAAAAAAAAAAAAAAAAAAAAAAAAAAAAAAAAAAAAAAAAAAAAAAFAAAADwAAAAAAAAAAAAAAAAAAAkUAAAAAQAAABQAAAAUAAAAFAAAAAEAAAAAAAAAZAAAAGQAAAAAAAAAZAAAAGQAAAAVAAAAYAAAAAAAAAAAAAAADwAAACADAAAAAAAAAAAAAAEAAACgMgAAVgcAAKr4//8BAAAAf39/AAEAAABkAAAAAAAAABQAAABAHwAAAAAAACYAAAAAAAAAwOD//wAAAAAmAAAAZAAAABYAAABMAAAAAAAAAAAAAAAEAAAAAAAAAAEAAACAgIAKAAAAACgAAAAoAAAAZAAAAGQAAAAAAAAAzMzMAAAAAABQAAAAUAAAAGQAAABkAAAAAAAAABcAAAAUAAAAAAAAAAAAAAD/fwAA/38AAAAAAAAJAAAABAAAAAAAAAAMAAAAEAAAAAAAAAAAAAAAAAAAAAAAAAAeAAAAaAAAAAAAAAAAAAAAAAAAAAAAAAAAAAAAECcAABAnAAAAAAAAAAAAAAAAAAAAAAAAAAAAAAAAAAAAAAAAAAAAABQAAAAAAAAAwMD/AAAAAABkAAAAMgAAAAAAAABkAAAAAAAAAH9/fwAKAAAAHwAAAFQAAABgWXsFZmaZAQAAAAAAAAAAAAAAAAAAAAAAAAAAAAAAAAAAAAAAAAAA////An9/fwA+PlwDzMzMAMDA/wB/f38AAAAAAAAAAAAAAAAAAAAAAAAAAAAhAAAAGAAAABQAAADQAgAArgEAAFIVAADUCAAAEAAAACYAAAAIAAAAAAAAAAAAAAA="/>
               </a:ext>
             </a:extLst>
           </p:cNvSpPr>
@@ -4020,7 +4037,7 @@
             <a:spLocks noGrp="1" noChangeArrowheads="1"/>
             <a:extLst>
               <a:ext uri="smNativeData">
-                <pr:smNativeData xmlns:pr="smNativeData" val="SMDATA_13_KVOsYBMAAAAlAAAAZAAAAA8BAAAAkAAAAEgAAACQAAAASAAAAAAAAAAAAAAAAAAAAAEAAABQAAAAAAAAAAAA4D8AAAAAAADgPwAAAAAAAOA/AAAAAAAA4D8AAAAAAADgPwAAAAAAAOA/AAAAAAAA4D8AAAAAAADgPwAAAAAAAOA/AAAAAAAA4D8CAAAAjAAAAAAAAAAAAAAAu+DjDP///wgAAAAAAAAAAAAAAAAAAAAAAAAAAAAAAAAAAAAAZAAAAAEAAABAAAAAAAAAAAAAAAAAAAAAAAAAAAAAAAAAAAAAAAAAAAAAAAAAAAAAAAAAAAAAAAAAAAAAAAAAAAAAAAAAAAAAAAAAAAAAAAAAAAAAAAAAAAAAAAAAAAAAFAAAADwAAAAAAAAAAAAAAAAAAAkUAAAAAQAAABQAAAAUAAAAFAAAAAEAAAAAAAAAZAAAAGQAAAAAAAAAZAAAAGQAAAAVAAAAYAAAAAAAAAAAAAAADwAAACADAAAAAAAAAAAAAAEAAACgMgAAVgcAAKr4//8BAAAAf39/AAEAAABkAAAAAAAAABQAAABAHwAAAAAAACYAAAAAAAAAwOD//wAAAAAmAAAAZAAAABYAAABMAAAAAAAAAAAAAAAEAAAAAAAAAAEAAACAgIAKAAAAACgAAAAoAAAAZAAAAGQAAAAAAAAAzMzMAAAAAABQAAAAUAAAAGQAAABkAAAAAAAAABcAAAAUAAAAAAAAAAAAAAD/fwAA/38AAAAAAAAJAAAABAAAAAAAAAAMAAAAEAAAAAAAAAAAAAAAAAAAAAAAAAAeAAAAaAAAAAAAAAAAAAAAAAAAAAAAAAAAAAAAECcAABAnAAAAAAAAAAAAAAAAAAAAAAAAAAAAAAAAAAAAAAAAAAAAABQAAAAAAAAAwMD/AAAAAABkAAAAMgAAAAAAAABkAAAAAAAAAH9/fwAKAAAAHwAAAFQAAABgWXsFZmaZAQAAAAAAAAAAAAAAAAAAAAAAAAAAAAAAAAAAAAAAAAAA////An9/fwA+PlwDzMzMAMDA/wB/f38AAAAAAAAAAAAAAAAAAAAAAAAAAAAhAAAAGAAAABQAAAD+FQAArgEAAHA1AACwJQAAEAAAACYAAAAIAAAAAYAAAAAAAAA="/>
+                <pr:smNativeData xmlns:pr="smNativeData" val="SMDATA_13_NmGsYBMAAAAlAAAAZAAAAA8BAAAAkAAAAEgAAACQAAAASAAAAAAAAAAAAAAAAAAAAAEAAABQAAAAAAAAAAAA4D8AAAAAAADgPwAAAAAAAOA/AAAAAAAA4D8AAAAAAADgPwAAAAAAAOA/AAAAAAAA4D8AAAAAAADgPwAAAAAAAOA/AAAAAAAA4D8CAAAAjAAAAAAAAAAAAAAAu+DjDP///wgAAAAAAAAAAAAAAAAAAAAAAAAAAAAAAAAAAAAAZAAAAAEAAABAAAAAAAAAAAAAAAAAAAAAAAAAAAAAAAAAAAAAAAAAAAAAAAAAAAAAAAAAAAAAAAAAAAAAAAAAAAAAAAAAAAAAAAAAAAAAAAAAAAAAAAAAAAAAAAAAAAAAFAAAADwAAAAAAAAAAAAAAAAAAAkUAAAAAQAAABQAAAAUAAAAFAAAAAEAAAAAAAAAZAAAAGQAAAAAAAAAZAAAAGQAAAAVAAAAYAAAAAAAAAAAAAAADwAAACADAAAAAAAAAAAAAAEAAACgMgAAVgcAAKr4//8BAAAAf39/AAEAAABkAAAAAAAAABQAAABAHwAAAAAAACYAAAAAAAAAwOD//wAAAAAmAAAAZAAAABYAAABMAAAAAAAAAAAAAAAEAAAAAAAAAAEAAACAgIAKAAAAACgAAAAoAAAAZAAAAGQAAAAAAAAAzMzMAAAAAABQAAAAUAAAAGQAAABkAAAAAAAAABcAAAAUAAAAAAAAAAAAAAD/fwAA/38AAAAAAAAJAAAABAAAAAAAAAAMAAAAEAAAAAAAAAAAAAAAAAAAAAAAAAAeAAAAaAAAAAAAAAAAAAAAAAAAAAAAAAAAAAAAECcAABAnAAAAAAAAAAAAAAAAAAAAAAAAAAAAAAAAAAAAAAAAAAAAABQAAAAAAAAAwMD/AAAAAABkAAAAMgAAAAAAAABkAAAAAAAAAH9/fwAKAAAAHwAAAFQAAABgWXsFZmaZAQAAAAAAAAAAAAAAAAAAAAAAAAAAAAAAAAAAAAAAAAAA////An9/fwA+PlwDzMzMAMDA/wB/f38AAAAAAAAAAAAAAAAAAAAAAAAAAAAhAAAAGAAAABQAAAD+FQAArgEAAHA1AACwJQAAEAAAACYAAAAIAAAAAYAAAAAAAAA="/>
               </a:ext>
             </a:extLst>
           </p:cNvSpPr>
@@ -4101,7 +4118,7 @@
             <a:spLocks noGrp="1" noChangeArrowheads="1"/>
             <a:extLst>
               <a:ext uri="smNativeData">
-                <pr:smNativeData xmlns:pr="smNativeData" val="SMDATA_13_KVOsYBMAAAAlAAAAZAAAAA8BAAAAkAAAAEgAAACQAAAASAAAAAAAAAAAAAAAAAAAAAEAAABQAAAAAAAAAAAA4D8AAAAAAADgPwAAAAAAAOA/AAAAAAAA4D8AAAAAAADgPwAAAAAAAOA/AAAAAAAA4D8AAAAAAADgPwAAAAAAAOA/AAAAAAAA4D8CAAAAjAAAAAAAAAAAAAAAu+DjDP///wgAAAAAAAAAAAAAAAAAAAAAAAAAAAAAAAAAAAAAZAAAAAEAAABAAAAAAAAAAAAAAAAAAAAAAAAAAAAAAAAAAAAAAAAAAAAAAAAAAAAAAAAAAAAAAAAAAAAAAAAAAAAAAAAAAAAAAAAAAAAAAAAAAAAAAAAAAAAAAAAAAAAAFAAAADwAAAAAAAAAAAAAAAAAAAkUAAAAAQAAABQAAAAUAAAAFAAAAAEAAAAAAAAAZAAAAGQAAAAAAAAAZAAAAGQAAAAVAAAAYAAAAAAAAAAAAAAADwAAACADAAAAAAAAAAAAAAEAAACgMgAAVgcAAKr4//8BAAAAf39/AAEAAABkAAAAAAAAABQAAABAHwAAAAAAACYAAAAAAAAAwOD//wAAAAAmAAAAZAAAABYAAABMAAAAAAAAAAAAAAAEAAAAAAAAAAEAAACAgIAKAAAAACgAAAAoAAAAZAAAAGQAAAAAAAAAzMzMAAAAAABQAAAAUAAAAGQAAABkAAAAAAAAABcAAAAUAAAAAAAAAAAAAAD/fwAA/38AAAAAAAAJAAAABAAAAEkAIAAMAAAAEAAAAAAAAAAAAAAAAAAAAAAAAAAeAAAAaAAAAAAAAAAAAAAAAAAAAAAAAAAAAAAAECcAABAnAAAAAAAAAAAAAAAAAAAAAAAAAAAAAAAAAAAAAAAAAAAAABQAAAAAAAAAwMD/AAAAAABkAAAAMgAAAAAAAABkAAAAAAAAAH9/fwAKAAAAHwAAAFQAAABgWXsFZmaZAQAAAAAAAAAAAAAAAAAAAAAAAAAAAAAAAAAAAAAAAAAA////An9/fwA+PlwDzMzMAMDA/wB/f38AAAAAAAAAAAAAAAAAAAAAAAAAAAAhAAAAGAAAABQAAADQAgAA1AgAAFIVAACwJQAAEAAAACYAAAAIAAAAAAAAAAAAAAA="/>
+                <pr:smNativeData xmlns:pr="smNativeData" val="SMDATA_13_NmGsYBMAAAAlAAAAZAAAAA8BAAAAkAAAAEgAAACQAAAASAAAAAAAAAAAAAAAAAAAAAEAAABQAAAAAAAAAAAA4D8AAAAAAADgPwAAAAAAAOA/AAAAAAAA4D8AAAAAAADgPwAAAAAAAOA/AAAAAAAA4D8AAAAAAADgPwAAAAAAAOA/AAAAAAAA4D8CAAAAjAAAAAAAAAAAAAAAu+DjDP///wgAAAAAAAAAAAAAAAAAAAAAAAAAAAAAAAAAAAAAZAAAAAEAAABAAAAAAAAAAAAAAAAAAAAAAAAAAAAAAAAAAAAAAAAAAAAAAAAAAAAAAAAAAAAAAAAAAAAAAAAAAAAAAAAAAAAAAAAAAAAAAAAAAAAAAAAAAAAAAAAAAAAAFAAAADwAAAAAAAAAAAAAAAAAAAkUAAAAAQAAABQAAAAUAAAAFAAAAAEAAAAAAAAAZAAAAGQAAAAAAAAAZAAAAGQAAAAVAAAAYAAAAAAAAAAAAAAADwAAACADAAAAAAAAAAAAAAEAAACgMgAAVgcAAKr4//8BAAAAf39/AAEAAABkAAAAAAAAABQAAABAHwAAAAAAACYAAAAAAAAAwOD//wAAAAAmAAAAZAAAABYAAABMAAAAAAAAAAAAAAAEAAAAAAAAAAEAAACAgIAKAAAAACgAAAAoAAAAZAAAAGQAAAAAAAAAzMzMAAAAAABQAAAAUAAAAGQAAABkAAAAAAAAABcAAAAUAAAAAAAAAAAAAAD/fwAA/38AAAAAAAAJAAAABAAAAEkAIAAMAAAAEAAAAAAAAAAAAAAAAAAAAAAAAAAeAAAAaAAAAAAAAAAAAAAAAAAAAAAAAAAAAAAAECcAABAnAAAAAAAAAAAAAAAAAAAAAAAAAAAAAAAAAAAAAAAAAAAAABQAAAAAAAAAwMD/AAAAAABkAAAAMgAAAAAAAABkAAAAAAAAAH9/fwAKAAAAHwAAAFQAAABgWXsFZmaZAQAAAAAAAAAAAAAAAAAAAAAAAAAAAAAAAAAAAAAAAAAA////An9/fwA+PlwDzMzMAMDA/wB/f38AAAAAAAAAAAAAAAAAAAAAAAAAAAAhAAAAGAAAABQAAADQAgAA1AgAAFIVAACwJQAAEAAAACYAAAAIAAAAAAAAAAAAAAA="/>
               </a:ext>
             </a:extLst>
           </p:cNvSpPr>
@@ -4206,7 +4223,7 @@
             <a:spLocks noGrp="1" noChangeArrowheads="1"/>
             <a:extLst>
               <a:ext uri="smNativeData">
-                <pr:smNativeData xmlns:pr="smNativeData" val="SMDATA_13_KVOsYBMAAAAlAAAAZAAAAA8BAAAAkAAAAEgAAACQAAAASAAAAAAAAAABAAAAAAAAAAEAAABQAAAAAAAAAAAA4D8AAAAAAADgPwAAAAAAAOA/AAAAAAAA4D8AAAAAAADgPwAAAAAAAOA/AAAAAAAA4D8AAAAAAADgPwAAAAAAAOA/AAAAAAAA4D8CAAAAjAAAAAAAAAAAAAAAu+DjDP///wgAAAAAAAAAAAAAAAAAAAAAAAAAAAAAAAAAAAAAZAAAAAEAAABAAAAAAAAAAAAAAAAAAAAAAAAAAAAAAAAAAAAAAAAAAAAAAAAAAAAAAAAAAAAAAAAAAAAAAAAAAAAAAAAAAAAAAAAAAAAAAAAAAAAAAAAAAAAAAAAAAAAAFAAAADwAAAAAAAAAAAAAAAAAAAkUAAAAAQAAABQAAAAUAAAAFAAAAAEAAAAAAAAAZAAAAGQAAAAAAAAAZAAAAGQAAAAVAAAAYAAAAAAAAAAAAAAADwAAACADAAAAAAAAAAAAAAEAAACgMgAAVgcAAKr4//8BAAAAf39/AAEAAABkAAAAAAAAABQAAABAHwAAAAAAACYAAAAAAAAAwOD//wAAAAAmAAAAZAAAABYAAABMAAAAAAAAAAAAAAAEAAAAAAAAAAEAAACAgIAKAAAAACgAAAAoAAAAZAAAAGQAAAAAAAAAzMzMAAAAAABQAAAAUAAAAGQAAABkAAAAAAAAABcAAAAUAAAAAAAAAAAAAAD/fwAA/38AAAAAAAAJAAAABAAAAAAAAAAMAAAAEAAAAAAAAAAAAAAAAAAAAAAAAAAeAAAAaAAAAAAAAAAAAAAAAAAAAAAAAAAAAAAAECcAABAnAAAAAAAAAAAAAAAAAAAAAAAAAAAAAAAAAAAAAAAAAAAAABQAAAAAAAAAwMD/AAAAAABkAAAAMgAAAAAAAABkAAAAAAAAAH9/fwAKAAAAHwAAAFQAAAAAAAAFAAAAAQAAAAAAAAAAAAAAAAAAAAAAAAAAAAAAAAAAAAAAAAAAAAAAAn9/fwAAAAADzMzMAMDA/wB/f38AAAAAAAAAAAAAAAAAAAAAAAAAAAAhAAAAGAAAABQAAAA4BAAAGg0AAAg0AAAmFgAAEAAAACYAAAAIAAAAAAAAAAAAAAA="/>
+                <pr:smNativeData xmlns:pr="smNativeData" val="SMDATA_13_NmGsYBMAAAAlAAAAZAAAAA8BAAAAkAAAAEgAAACQAAAASAAAAAAAAAABAAAAAAAAAAEAAABQAAAAAAAAAAAA4D8AAAAAAADgPwAAAAAAAOA/AAAAAAAA4D8AAAAAAADgPwAAAAAAAOA/AAAAAAAA4D8AAAAAAADgPwAAAAAAAOA/AAAAAAAA4D8CAAAAjAAAAAAAAAAAAAAAu+DjDP///wgAAAAAAAAAAAAAAAAAAAAAAAAAAAAAAAAAAAAAZAAAAAEAAABAAAAAAAAAAAAAAAAAAAAAAAAAAAAAAAAAAAAAAAAAAAAAAAAAAAAAAAAAAAAAAAAAAAAAAAAAAAAAAAAAAAAAAAAAAAAAAAAAAAAAAAAAAAAAAAAAAAAAFAAAADwAAAAAAAAAAAAAAAAAAAkUAAAAAQAAABQAAAAUAAAAFAAAAAEAAAAAAAAAZAAAAGQAAAAAAAAAZAAAAGQAAAAVAAAAYAAAAAAAAAAAAAAADwAAACADAAAAAAAAAAAAAAEAAACgMgAAVgcAAKr4//8BAAAAf39/AAEAAABkAAAAAAAAABQAAABAHwAAAAAAACYAAAAAAAAAwOD//wAAAAAmAAAAZAAAABYAAABMAAAAAAAAAAAAAAAEAAAAAAAAAAEAAACAgIAKAAAAACgAAAAoAAAAZAAAAGQAAAAAAAAAzMzMAAAAAABQAAAAUAAAAGQAAABkAAAAAAAAABcAAAAUAAAAAAAAAAAAAAD/fwAA/38AAAAAAAAJAAAABAAAAAAAAAAMAAAAEAAAAAAAAAAAAAAAAAAAAAAAAAAeAAAAaAAAAAAAAAAAAAAAAAAAAAAAAAAAAAAAECcAABAnAAAAAAAAAAAAAAAAAAAAAAAAAAAAAAAAAAAAAAAAAAAAABQAAAAAAAAAwMD/AAAAAABkAAAAMgAAAAAAAABkAAAAAAAAAH9/fwAKAAAAHwAAAFQAAAAAAAAFAAAAAQAAAAAAAAAAAAAAAAAAAAAAAAAAAAAAAAAAAAAAAAAAAAAAAn9/fwAAAAADzMzMAMDA/wB/f38AAAAAAAAAAAAAAAAAAAAAAAAAAAAhAAAAGAAAABQAAAA4BAAAGg0AAAg0AAAmFgAAEAAAACYAAAAIAAAAAAAAAAAAAAA="/>
               </a:ext>
             </a:extLst>
           </p:cNvSpPr>
@@ -4235,7 +4252,7 @@
             <a:spLocks noGrp="1" noChangeArrowheads="1"/>
             <a:extLst>
               <a:ext uri="smNativeData">
-                <pr:smNativeData xmlns:pr="smNativeData" val="SMDATA_13_KVOsYBMAAAAlAAAAZAAAAA8BAAAAkAAAAEgAAACQAAAASAAAAAAAAAAAAAAAAAAAAAEAAABQAAAAAAAAAAAA4D8AAAAAAADgPwAAAAAAAOA/AAAAAAAA4D8AAAAAAADgPwAAAAAAAOA/AAAAAAAA4D8AAAAAAADgPwAAAAAAAOA/AAAAAAAA4D8CAAAAjAAAAAAAAAAAAAAAu+DjDP///wgAAAAAAAAAAAAAAAAAAAAAAAAAAAAAAAAAAAAAZAAAAAEAAABAAAAAAAAAAAAAAAAAAAAAAAAAAAAAAAAAAAAAAAAAAAAAAAAAAAAAAAAAAAAAAAAAAAAAAAAAAAAAAAAAAAAAAAAAAAAAAAAAAAAAAAAAAAAAAAAAAAAAFAAAADwAAAAAAAAAAAAAAAAAAAkUAAAAAQAAABQAAAAUAAAAFAAAAAEAAAAAAAAAZAAAAGQAAAAAAAAAZAAAAGQAAAAVAAAAYAAAAAAAAAAAAAAADwAAACADAAAAAAAAAAAAAAEAAACgMgAAVgcAAKr4//8BAAAAf39/AAEAAABkAAAAAAAAABQAAABAHwAAAAAAACYAAAAAAAAAwOD//wAAAAAmAAAAZAAAABYAAABMAAAAAAAAAAAAAAAEAAAAAAAAAAEAAACAgIAKAAAAACgAAAAoAAAAZAAAAGQAAAAAAAAAzMzMAAAAAABQAAAAUAAAAGQAAABkAAAAAAAAABcAAAAUAAAAAAAAAAAAAAD/fwAA/38AAAAAAAAJAAAABAAAAAAAAAAMAAAAEAAAAAAAAAAAAAAAAAAAAAAAAAAeAAAAaAAAAAAAAAAAAAAAAAAAAAAAAAAAAAAAECcAABAnAAAAAAAAAAAAAAAAAAAAAAAAAAAAAAAAAAAAAAAAAAAAABQAAAAAAAAAwMD/AAAAAABkAAAAMgAAAAAAAABkAAAAAAAAAH9/fwAKAAAAHwAAAFQAAAAAAAAFAAAAAQAAAAAAAAAAAAAAAAAAAAAAAAAAAAAAAAAAAAAAAAAAAAAAAn9/fwAAAAADzMzMAMDA/wB/f38AAAAAAAAAAAAAAAAAAAAAAAAAAAAhAAAAGAAAABQAAABwCAAA6BcAANAvAACwIgAAEAAAACYAAAAIAAAAAAAAAAAAAAA="/>
+                <pr:smNativeData xmlns:pr="smNativeData" val="SMDATA_13_NmGsYBMAAAAlAAAAZAAAAA8BAAAAkAAAAEgAAACQAAAASAAAAAAAAAAAAAAAAAAAAAEAAABQAAAAAAAAAAAA4D8AAAAAAADgPwAAAAAAAOA/AAAAAAAA4D8AAAAAAADgPwAAAAAAAOA/AAAAAAAA4D8AAAAAAADgPwAAAAAAAOA/AAAAAAAA4D8CAAAAjAAAAAAAAAAAAAAAu+DjDP///wgAAAAAAAAAAAAAAAAAAAAAAAAAAAAAAAAAAAAAZAAAAAEAAABAAAAAAAAAAAAAAAAAAAAAAAAAAAAAAAAAAAAAAAAAAAAAAAAAAAAAAAAAAAAAAAAAAAAAAAAAAAAAAAAAAAAAAAAAAAAAAAAAAAAAAAAAAAAAAAAAAAAAFAAAADwAAAAAAAAAAAAAAAAAAAkUAAAAAQAAABQAAAAUAAAAFAAAAAEAAAAAAAAAZAAAAGQAAAAAAAAAZAAAAGQAAAAVAAAAYAAAAAAAAAAAAAAADwAAACADAAAAAAAAAAAAAAEAAACgMgAAVgcAAKr4//8BAAAAf39/AAEAAABkAAAAAAAAABQAAABAHwAAAAAAACYAAAAAAAAAwOD//wAAAAAmAAAAZAAAABYAAABMAAAAAAAAAAAAAAAEAAAAAAAAAAEAAACAgIAKAAAAACgAAAAoAAAAZAAAAGQAAAAAAAAAzMzMAAAAAABQAAAAUAAAAGQAAABkAAAAAAAAABcAAAAUAAAAAAAAAAAAAAD/fwAA/38AAAAAAAAJAAAABAAAAAAAAAAMAAAAEAAAAAAAAAAAAAAAAAAAAAAAAAAeAAAAaAAAAAAAAAAAAAAAAAAAAAAAAAAAAAAAECcAABAnAAAAAAAAAAAAAAAAAAAAAAAAAAAAAAAAAAAAAAAAAAAAABQAAAAAAAAAwMD/AAAAAABkAAAAMgAAAAAAAABkAAAAAAAAAH9/fwAKAAAAHwAAAFQAAAAAAAAFAAAAAQAAAAAAAAAAAAAAAAAAAAAAAAAAAAAAAAAAAAAAAAAAAAAAAn9/fwAAAAADzMzMAMDA/wB/f38AAAAAAAAAAAAAAAAAAAAAAAAAAAAhAAAAGAAAABQAAABwCAAA6BcAANAvAACwIgAAEAAAACYAAAAIAAAAAAAAAAAAAAA="/>
               </a:ext>
             </a:extLst>
           </p:cNvSpPr>
@@ -4312,7 +4329,7 @@
             <a:spLocks noGrp="1" noChangeArrowheads="1"/>
             <a:extLst>
               <a:ext uri="smNativeData">
-                <pr:smNativeData xmlns:pr="smNativeData" val="SMDATA_13_KVOsYBMAAAAlAAAAZAAAAA8BAAAAkAAAAEgAAACQAAAASAAAAAAAAAABAAAAAAAAAAEAAABQAAAAAAAAAAAA4D8AAAAAAADgPwAAAAAAAOA/AAAAAAAA4D8AAAAAAADgPwAAAAAAAOA/AAAAAAAA4D8AAAAAAADgPwAAAAAAAOA/AAAAAAAA4D8CAAAAjAAAAAAAAAAAAAAAu+DjDP///wgAAAAAAAAAAAAAAAAAAAAAAAAAAAAAAAAAAAAAZAAAAAEAAABAAAAAAAAAAAAAAAAAAAAAAAAAAAAAAAAAAAAAAAAAAAAAAAAAAAAAAAAAAAAAAAAAAAAAAAAAAAAAAAAAAAAAAAAAAAAAAAAAAAAAAAAAAAAAAAAAAAAAFAAAADwAAAAAAAAAAAAAAAAAAAkUAAAAAQAAABQAAAAUAAAAFAAAAAEAAAAAAAAAZAAAAGQAAAAAAAAAZAAAAGQAAAAVAAAAYAAAAAAAAAAAAAAADwAAACADAAAAAAAAAAAAAAEAAACgMgAAVgcAAKr4//8BAAAAf39/AAEAAABkAAAAAAAAABQAAABAHwAAAAAAACYAAAAAAAAAwOD//wAAAAAmAAAAZAAAABYAAABMAAAAAAAAAAAAAAAEAAAAAAAAAAEAAACAgIAKAAAAACgAAAAoAAAAZAAAAGQAAAAAAAAAzMzMAAAAAABQAAAAUAAAAGQAAABkAAAAAAAAABcAAAAUAAAAAAAAAAAAAAD/fwAA/38AAAAAAAAJAAAABAAAAAAAAAAMAAAAEAAAAAAAAAAAAAAAAAAAAAAAAAAeAAAAaAAAAAAAAAAAAAAAAAAAAAAAAAAAAAAAECcAABAnAAAAAAAAAAAAAAAAAAAAAAAAAAAAAAAAAAAAAAAAAAAAABQAAAAAAAAAwMD/AAAAAABkAAAAMgAAAAAAAABkAAAAAAAAAH9/fwAKAAAAHwAAAFQAAAAAAAAFAAAAAQAAAAAAAAAAAAAAAAAAAAAAAAAAAAAAAAAAAAAAAAAAAAAAAn9/fwAAAAADzMzMAMDA/wB/f38AAAAAAAAAAAAAAAAAAAAAAAAAAAAhAAAAGAAAABQAAADQAgAAsAEAAHA1AAC4CAAAEAAAACYAAAAIAAAAAAAAAAAAAAA="/>
+                <pr:smNativeData xmlns:pr="smNativeData" val="SMDATA_13_NmGsYBMAAAAlAAAAZAAAAA8BAAAAkAAAAEgAAACQAAAASAAAAAAAAAABAAAAAAAAAAEAAABQAAAAAAAAAAAA4D8AAAAAAADgPwAAAAAAAOA/AAAAAAAA4D8AAAAAAADgPwAAAAAAAOA/AAAAAAAA4D8AAAAAAADgPwAAAAAAAOA/AAAAAAAA4D8CAAAAjAAAAAAAAAAAAAAAu+DjDP///wgAAAAAAAAAAAAAAAAAAAAAAAAAAAAAAAAAAAAAZAAAAAEAAABAAAAAAAAAAAAAAAAAAAAAAAAAAAAAAAAAAAAAAAAAAAAAAAAAAAAAAAAAAAAAAAAAAAAAAAAAAAAAAAAAAAAAAAAAAAAAAAAAAAAAAAAAAAAAAAAAAAAAFAAAADwAAAAAAAAAAAAAAAAAAAkUAAAAAQAAABQAAAAUAAAAFAAAAAEAAAAAAAAAZAAAAGQAAAAAAAAAZAAAAGQAAAAVAAAAYAAAAAAAAAAAAAAADwAAACADAAAAAAAAAAAAAAEAAACgMgAAVgcAAKr4//8BAAAAf39/AAEAAABkAAAAAAAAABQAAABAHwAAAAAAACYAAAAAAAAAwOD//wAAAAAmAAAAZAAAABYAAABMAAAAAAAAAAAAAAAEAAAAAAAAAAEAAACAgIAKAAAAACgAAAAoAAAAZAAAAGQAAAAAAAAAzMzMAAAAAABQAAAAUAAAAGQAAABkAAAAAAAAABcAAAAUAAAAAAAAAAAAAAD/fwAA/38AAAAAAAAJAAAABAAAAAAAAAAMAAAAEAAAAAAAAAAAAAAAAAAAAAAAAAAeAAAAaAAAAAAAAAAAAAAAAAAAAAAAAAAAAAAAECcAABAnAAAAAAAAAAAAAAAAAAAAAAAAAAAAAAAAAAAAAAAAAAAAABQAAAAAAAAAwMD/AAAAAABkAAAAMgAAAAAAAABkAAAAAAAAAH9/fwAKAAAAHwAAAFQAAAAAAAAFAAAAAQAAAAAAAAAAAAAAAAAAAAAAAAAAAAAAAAAAAAAAAAAAAAAAAn9/fwAAAAADzMzMAMDA/wB/f38AAAAAAAAAAAAAAAAAAAAAAAAAAAAhAAAAGAAAABQAAADQAgAAsAEAAHA1AAC4CAAAEAAAACYAAAAIAAAAAAAAAAAAAAA="/>
               </a:ext>
             </a:extLst>
           </p:cNvSpPr>
@@ -4339,7 +4356,7 @@
             <a:spLocks noGrp="1" noChangeArrowheads="1"/>
             <a:extLst>
               <a:ext uri="smNativeData">
-                <pr:smNativeData xmlns:pr="smNativeData" val="SMDATA_13_KVOsYBMAAAAlAAAAZAAAAA8BAAAAkAAAAEgAAACQAAAASAAAAAAAAAACAAAAAAAAAAEAAABQAAAAAAAAAAAA4D8AAAAAAADgPwAAAAAAAOA/AAAAAAAA4D8AAAAAAADgPwAAAAAAAOA/AAAAAAAA4D8AAAAAAADgPwAAAAAAAOA/AAAAAAAA4D8CAAAAjAAAAAAAAAAAAAAAu+DjDP///wgAAAAAAAAAAAAAAAAAAAAAAAAAAAAAAAAAAAAAZAAAAAEAAABAAAAAAAAAAAAAAAAAAAAAAAAAAAAAAAAAAAAAAAAAAAAAAAAAAAAAAAAAAAAAAAAAAAAAAAAAAAAAAAAAAAAAAAAAAAAAAAAAAAAAAAAAAAAAAAAAAAAAFAAAADwAAAAAAAAAAAAAAAAAAAkUAAAAAQAAABQAAAAUAAAAFAAAAAEAAAAAAAAAZAAAAGQAAAAAAAAAZAAAAGQAAAAVAAAAYAAAAAAAAAAAAAAADwAAACADAAAAAAAAAAAAAAEAAACgMgAAVgcAAKr4//8BAAAAf39/AAEAAABkAAAAAAAAABQAAABAHwAAAAAAACYAAAAAAAAAwOD//wAAAAAmAAAAZAAAABYAAABMAAAAAAAAAAAAAAAEAAAAAAAAAAEAAACAgIAKAAAAACgAAAAoAAAAZAAAAGQAAAAAAAAAzMzMAAAAAABQAAAAUAAAAGQAAABkAAAAAAAAABcAAAAUAAAAAAAAAAAAAAD/fwAA/38AAAAAAAAJAAAABAAAAAAAAAAMAAAAEAAAAAAAAAAAAAAAAAAAAAAAAAAeAAAAaAAAAAAAAAAAAAAAAAAAAAAAAAAAAAAAECcAABAnAAAAAAAAAAAAAAAAAAAAAAAAAAAAAAAAAAAAAAAAAAAAABQAAAAAAAAAwMD/AAAAAABkAAAAMgAAAAAAAABkAAAAAAAAAH9/fwAKAAAAHwAAAFQAAAAAAAAFAAAAAQAAAAAAAAAAAAAAAAAAAAAAAAAAAAAAAAAAAAAAAAAAAAAAAn9/fwAAAAADzMzMAMDA/wB/f38AAAAAAAAAAAAAAAAAAAAAAAAAAAAhAAAAGAAAABQAAADQAgAAcQkAAKobAABhDQAAEAAAACYAAAAIAAAAgYAAAAAAAAA="/>
+                <pr:smNativeData xmlns:pr="smNativeData" val="SMDATA_13_NmGsYBMAAAAlAAAAZAAAAA8BAAAAkAAAAEgAAACQAAAASAAAAAAAAAACAAAAAAAAAAEAAABQAAAAAAAAAAAA4D8AAAAAAADgPwAAAAAAAOA/AAAAAAAA4D8AAAAAAADgPwAAAAAAAOA/AAAAAAAA4D8AAAAAAADgPwAAAAAAAOA/AAAAAAAA4D8CAAAAjAAAAAAAAAAAAAAAu+DjDP///wgAAAAAAAAAAAAAAAAAAAAAAAAAAAAAAAAAAAAAZAAAAAEAAABAAAAAAAAAAAAAAAAAAAAAAAAAAAAAAAAAAAAAAAAAAAAAAAAAAAAAAAAAAAAAAAAAAAAAAAAAAAAAAAAAAAAAAAAAAAAAAAAAAAAAAAAAAAAAAAAAAAAAFAAAADwAAAAAAAAAAAAAAAAAAAkUAAAAAQAAABQAAAAUAAAAFAAAAAEAAAAAAAAAZAAAAGQAAAAAAAAAZAAAAGQAAAAVAAAAYAAAAAAAAAAAAAAADwAAACADAAAAAAAAAAAAAAEAAACgMgAAVgcAAKr4//8BAAAAf39/AAEAAABkAAAAAAAAABQAAABAHwAAAAAAACYAAAAAAAAAwOD//wAAAAAmAAAAZAAAABYAAABMAAAAAAAAAAAAAAAEAAAAAAAAAAEAAACAgIAKAAAAACgAAAAoAAAAZAAAAGQAAAAAAAAAzMzMAAAAAABQAAAAUAAAAGQAAABkAAAAAAAAABcAAAAUAAAAAAAAAAAAAAD/fwAA/38AAAAAAAAJAAAABAAAAAAAAAAMAAAAEAAAAAAAAAAAAAAAAAAAAAAAAAAeAAAAaAAAAAAAAAAAAAAAAAAAAAAAAAAAAAAAECcAABAnAAAAAAAAAAAAAAAAAAAAAAAAAAAAAAAAAAAAAAAAAAAAABQAAAAAAAAAwMD/AAAAAABkAAAAMgAAAAAAAABkAAAAAAAAAH9/fwAKAAAAHwAAAFQAAAAAAAAFAAAAAQAAAAAAAAAAAAAAAAAAAAAAAAAAAAAAAAAAAAAAAAAAAAAAAn9/fwAAAAADzMzMAMDA/wB/f38AAAAAAAAAAAAAAAAAAAAAAAAAAAAhAAAAGAAAABQAAADQAgAAcQkAAKobAABhDQAAEAAAACYAAAAIAAAAgYAAAAAAAAA="/>
               </a:ext>
             </a:extLst>
           </p:cNvSpPr>
@@ -4409,7 +4426,7 @@
             <a:spLocks noGrp="1" noChangeArrowheads="1"/>
             <a:extLst>
               <a:ext uri="smNativeData">
-                <pr:smNativeData xmlns:pr="smNativeData" val="SMDATA_13_KVOsYBMAAAAlAAAAZAAAAA8BAAAAkAAAAEgAAACQAAAASAAAAAAAAAAAAAAAAAAAAAEAAABQAAAAAAAAAAAA4D8AAAAAAADgPwAAAAAAAOA/AAAAAAAA4D8AAAAAAADgPwAAAAAAAOA/AAAAAAAA4D8AAAAAAADgPwAAAAAAAOA/AAAAAAAA4D8CAAAAjAAAAAAAAAAAAAAAu+DjDP///wgAAAAAAAAAAAAAAAAAAAAAAAAAAAAAAAAAAAAAZAAAAAEAAABAAAAAAAAAAAAAAAAAAAAAAAAAAAAAAAAAAAAAAAAAAAAAAAAAAAAAAAAAAAAAAAAAAAAAAAAAAAAAAAAAAAAAAAAAAAAAAAAAAAAAAAAAAAAAAAAAAAAAFAAAADwAAAAAAAAAAAAAAAAAAAkUAAAAAQAAABQAAAAUAAAAFAAAAAEAAAAAAAAAZAAAAGQAAAAAAAAAZAAAAGQAAAAVAAAAYAAAAAAAAAAAAAAADwAAACADAAAAAAAAAAAAAAEAAACgMgAAVgcAAKr4//8BAAAAf39/AAEAAABkAAAAAAAAABQAAABAHwAAAAAAACYAAAAAAAAAwOD//wAAAAAmAAAAZAAAABYAAABMAAAAAAAAAAAAAAAEAAAAAAAAAAEAAACAgIAKAAAAACgAAAAoAAAAZAAAAGQAAAAAAAAAzMzMAAAAAABQAAAAUAAAAGQAAABkAAAAAAAAABcAAAAUAAAAAAAAAAAAAAD/fwAA/38AAAAAAAAJAAAABAAAAAAAAAAMAAAAEAAAAAAAAAAAAAAAAAAAAAAAAAAeAAAAaAAAAAAAAAAAAAAAAAAAAAAAAAAAAAAAECcAABAnAAAAAAAAAAAAAAAAAAAAAAAAAAAAAAAAAAAAAAAAAAAAABQAAAAAAAAAwMD/AAAAAABkAAAAMgAAAAAAAABkAAAAAAAAAH9/fwAKAAAAHwAAAFQAAAAAAAAFAAAAAQAAAAAAAAAAAAAAAAAAAAAAAAAAAAAAAAAAAAAAAAAAAAAAAn9/fwAAAAADzMzMAMDA/wB/f38AAAAAAAAAAAAAAAAAAAAAAAAAAAAhAAAAGAAAABQAAADQAgAAYQ0AAKobAACwJQAAEAAAACYAAAAIAAAAAYAAAAAAAAA="/>
+                <pr:smNativeData xmlns:pr="smNativeData" val="SMDATA_13_NmGsYBMAAAAlAAAAZAAAAA8BAAAAkAAAAEgAAACQAAAASAAAAAAAAAAAAAAAAAAAAAEAAABQAAAAAAAAAAAA4D8AAAAAAADgPwAAAAAAAOA/AAAAAAAA4D8AAAAAAADgPwAAAAAAAOA/AAAAAAAA4D8AAAAAAADgPwAAAAAAAOA/AAAAAAAA4D8CAAAAjAAAAAAAAAAAAAAAu+DjDP///wgAAAAAAAAAAAAAAAAAAAAAAAAAAAAAAAAAAAAAZAAAAAEAAABAAAAAAAAAAAAAAAAAAAAAAAAAAAAAAAAAAAAAAAAAAAAAAAAAAAAAAAAAAAAAAAAAAAAAAAAAAAAAAAAAAAAAAAAAAAAAAAAAAAAAAAAAAAAAAAAAAAAAFAAAADwAAAAAAAAAAAAAAAAAAAkUAAAAAQAAABQAAAAUAAAAFAAAAAEAAAAAAAAAZAAAAGQAAAAAAAAAZAAAAGQAAAAVAAAAYAAAAAAAAAAAAAAADwAAACADAAAAAAAAAAAAAAEAAACgMgAAVgcAAKr4//8BAAAAf39/AAEAAABkAAAAAAAAABQAAABAHwAAAAAAACYAAAAAAAAAwOD//wAAAAAmAAAAZAAAABYAAABMAAAAAAAAAAAAAAAEAAAAAAAAAAEAAACAgIAKAAAAACgAAAAoAAAAZAAAAGQAAAAAAAAAzMzMAAAAAABQAAAAUAAAAGQAAABkAAAAAAAAABcAAAAUAAAAAAAAAAAAAAD/fwAA/38AAAAAAAAJAAAABAAAAAAAAAAMAAAAEAAAAAAAAAAAAAAAAAAAAAAAAAAeAAAAaAAAAAAAAAAAAAAAAAAAAAAAAAAAAAAAECcAABAnAAAAAAAAAAAAAAAAAAAAAAAAAAAAAAAAAAAAAAAAAAAAABQAAAAAAAAAwMD/AAAAAABkAAAAMgAAAAAAAABkAAAAAAAAAH9/fwAKAAAAHwAAAFQAAAAAAAAFAAAAAQAAAAAAAAAAAAAAAAAAAAAAAAAAAAAAAAAAAAAAAAAAAAAAAn9/fwAAAAADzMzMAMDA/wB/f38AAAAAAAAAAAAAAAAAAAAAAAAAAAAhAAAAGAAAABQAAADQAgAAYQ0AAKobAACwJQAAEAAAACYAAAAIAAAAAYAAAAAAAAA="/>
               </a:ext>
             </a:extLst>
           </p:cNvSpPr>
@@ -4485,7 +4502,7 @@
             <a:spLocks noGrp="1" noChangeArrowheads="1"/>
             <a:extLst>
               <a:ext uri="smNativeData">
-                <pr:smNativeData xmlns:pr="smNativeData" val="SMDATA_13_KVOsYBMAAAAlAAAAZAAAAA8BAAAAkAAAAEgAAACQAAAASAAAAAAAAAACAAAAAAAAAAEAAABQAAAAAAAAAAAA4D8AAAAAAADgPwAAAAAAAOA/AAAAAAAA4D8AAAAAAADgPwAAAAAAAOA/AAAAAAAA4D8AAAAAAADgPwAAAAAAAOA/AAAAAAAA4D8CAAAAjAAAAAAAAAAAAAAAu+DjDP///wgAAAAAAAAAAAAAAAAAAAAAAAAAAAAAAAAAAAAAZAAAAAEAAABAAAAAAAAAAAAAAAAAAAAAAAAAAAAAAAAAAAAAAAAAAAAAAAAAAAAAAAAAAAAAAAAAAAAAAAAAAAAAAAAAAAAAAAAAAAAAAAAAAAAAAAAAAAAAAAAAAAAAFAAAADwAAAAAAAAAAAAAAAAAAAkUAAAAAQAAABQAAAAUAAAAFAAAAAEAAAAAAAAAZAAAAGQAAAAAAAAAZAAAAGQAAAAVAAAAYAAAAAAAAAAAAAAADwAAACADAAAAAAAAAAAAAAEAAACgMgAAVgcAAKr4//8BAAAAf39/AAEAAABkAAAAAAAAABQAAABAHwAAAAAAACYAAAAAAAAAwOD//wAAAAAmAAAAZAAAABYAAABMAAAAAAAAAAAAAAAEAAAAAAAAAAEAAACAgIAKAAAAACgAAAAoAAAAZAAAAGQAAAAAAAAAzMzMAAAAAABQAAAAUAAAAGQAAABkAAAAAAAAABcAAAAUAAAAAAAAAAAAAAD/fwAA/38AAAAAAAAJAAAABAAAAAAAAAAMAAAAEAAAAAAAAAAAAAAAAAAAAAAAAAAeAAAAaAAAAAAAAAAAAAAAAAAAAAAAAAAAAAAAECcAABAnAAAAAAAAAAAAAAAAAAAAAAAAAAAAAAAAAAAAAAAAAAAAABQAAAAAAAAAwMD/AAAAAABkAAAAMgAAAAAAAABkAAAAAAAAAH9/fwAKAAAAHwAAAFQAAAAAAAAFAAAAAQAAAAAAAAAAAAAAAAAAAAAAAAAAAAAAAAAAAAAAAAAAAAAAAn9/fwAAAAADzMzMAMDA/wB/f38AAAAAAAAAAAAAAAAAAAAAAAAAAAAhAAAAGAAAABQAAACWHAAAcQkAAHA1AABhDQAAEAAAACYAAAAIAAAAgYAAAAAAAAA="/>
+                <pr:smNativeData xmlns:pr="smNativeData" val="SMDATA_13_NmGsYBMAAAAlAAAAZAAAAA8BAAAAkAAAAEgAAACQAAAASAAAAAAAAAACAAAAAAAAAAEAAABQAAAAAAAAAAAA4D8AAAAAAADgPwAAAAAAAOA/AAAAAAAA4D8AAAAAAADgPwAAAAAAAOA/AAAAAAAA4D8AAAAAAADgPwAAAAAAAOA/AAAAAAAA4D8CAAAAjAAAAAAAAAAAAAAAu+DjDP///wgAAAAAAAAAAAAAAAAAAAAAAAAAAAAAAAAAAAAAZAAAAAEAAABAAAAAAAAAAAAAAAAAAAAAAAAAAAAAAAAAAAAAAAAAAAAAAAAAAAAAAAAAAAAAAAAAAAAAAAAAAAAAAAAAAAAAAAAAAAAAAAAAAAAAAAAAAAAAAAAAAAAAFAAAADwAAAAAAAAAAAAAAAAAAAkUAAAAAQAAABQAAAAUAAAAFAAAAAEAAAAAAAAAZAAAAGQAAAAAAAAAZAAAAGQAAAAVAAAAYAAAAAAAAAAAAAAADwAAACADAAAAAAAAAAAAAAEAAACgMgAAVgcAAKr4//8BAAAAf39/AAEAAABkAAAAAAAAABQAAABAHwAAAAAAACYAAAAAAAAAwOD//wAAAAAmAAAAZAAAABYAAABMAAAAAAAAAAAAAAAEAAAAAAAAAAEAAACAgIAKAAAAACgAAAAoAAAAZAAAAGQAAAAAAAAAzMzMAAAAAABQAAAAUAAAAGQAAABkAAAAAAAAABcAAAAUAAAAAAAAAAAAAAD/fwAA/38AAAAAAAAJAAAABAAAAAAAAAAMAAAAEAAAAAAAAAAAAAAAAAAAAAAAAAAeAAAAaAAAAAAAAAAAAAAAAAAAAAAAAAAAAAAAECcAABAnAAAAAAAAAAAAAAAAAAAAAAAAAAAAAAAAAAAAAAAAAAAAABQAAAAAAAAAwMD/AAAAAABkAAAAMgAAAAAAAABkAAAAAAAAAH9/fwAKAAAAHwAAAFQAAAAAAAAFAAAAAQAAAAAAAAAAAAAAAAAAAAAAAAAAAAAAAAAAAAAAAAAAAAAAAn9/fwAAAAADzMzMAMDA/wB/f38AAAAAAAAAAAAAAAAAAAAAAAAAAAAhAAAAGAAAABQAAACWHAAAcQkAAHA1AABhDQAAEAAAACYAAAAIAAAAgYAAAAAAAAA="/>
               </a:ext>
             </a:extLst>
           </p:cNvSpPr>
@@ -4555,7 +4572,7 @@
             <a:spLocks noGrp="1" noChangeArrowheads="1"/>
             <a:extLst>
               <a:ext uri="smNativeData">
-                <pr:smNativeData xmlns:pr="smNativeData" val="SMDATA_13_KVOsYBMAAAAlAAAAZAAAAA8BAAAAkAAAAEgAAACQAAAASAAAAAAAAAAAAAAAAAAAAAEAAABQAAAAAAAAAAAA4D8AAAAAAADgPwAAAAAAAOA/AAAAAAAA4D8AAAAAAADgPwAAAAAAAOA/AAAAAAAA4D8AAAAAAADgPwAAAAAAAOA/AAAAAAAA4D8CAAAAjAAAAAAAAAAAAAAAu+DjDP///wgAAAAAAAAAAAAAAAAAAAAAAAAAAAAAAAAAAAAAZAAAAAEAAABAAAAAAAAAAAAAAAAAAAAAAAAAAAAAAAAAAAAAAAAAAAAAAAAAAAAAAAAAAAAAAAAAAAAAAAAAAAAAAAAAAAAAAAAAAAAAAAAAAAAAAAAAAAAAAAAAAAAAFAAAADwAAAAAAAAAAAAAAAAAAAkUAAAAAQAAABQAAAAUAAAAFAAAAAEAAAAAAAAAZAAAAGQAAAAAAAAAZAAAAGQAAAAVAAAAYAAAAAAAAAAAAAAADwAAACADAAAAAAAAAAAAAAEAAACgMgAAVgcAAKr4//8BAAAAf39/AAEAAABkAAAAAAAAABQAAABAHwAAAAAAACYAAAAAAAAAwOD//wAAAAAmAAAAZAAAABYAAABMAAAAAAAAAAAAAAAEAAAAAAAAAAEAAACAgIAKAAAAACgAAAAoAAAAZAAAAGQAAAAAAAAAzMzMAAAAAABQAAAAUAAAAGQAAABkAAAAAAAAABcAAAAUAAAAAAAAAAAAAAD/fwAA/38AAAAAAAAJAAAABAAAAAAAAAAMAAAAEAAAAAAAAAAAAAAAAAAAAAAAAAAeAAAAaAAAAAAAAAAAAAAAAAAAAAAAAAAAAAAAECcAABAnAAAAAAAAAAAAAAAAAAAAAAAAAAAAAAAAAAAAAAAAAAAAABQAAAAAAAAAwMD/AAAAAABkAAAAMgAAAAAAAABkAAAAAAAAAH9/fwAKAAAAHwAAAFQAAAAAAAAFAAAAAQAAAAAAAAAAAAAAAAAAAAAAAAAAAAAAAAAAAAAAAAAAAAAAAn9/fwAAAAADzMzMAMDA/wB/f38AAAAAAAAAAAAAAAAAAAAAAAAAAAAhAAAAGAAAABQAAACWHAAAYQ0AAHA1AACwJQAAEAAAACYAAAAIAAAAAAAAAAAAAAA="/>
+                <pr:smNativeData xmlns:pr="smNativeData" val="SMDATA_13_NmGsYBMAAAAlAAAAZAAAAA8BAAAAkAAAAEgAAACQAAAASAAAAAAAAAAAAAAAAAAAAAEAAABQAAAAAAAAAAAA4D8AAAAAAADgPwAAAAAAAOA/AAAAAAAA4D8AAAAAAADgPwAAAAAAAOA/AAAAAAAA4D8AAAAAAADgPwAAAAAAAOA/AAAAAAAA4D8CAAAAjAAAAAAAAAAAAAAAu+DjDP///wgAAAAAAAAAAAAAAAAAAAAAAAAAAAAAAAAAAAAAZAAAAAEAAABAAAAAAAAAAAAAAAAAAAAAAAAAAAAAAAAAAAAAAAAAAAAAAAAAAAAAAAAAAAAAAAAAAAAAAAAAAAAAAAAAAAAAAAAAAAAAAAAAAAAAAAAAAAAAAAAAAAAAFAAAADwAAAAAAAAAAAAAAAAAAAkUAAAAAQAAABQAAAAUAAAAFAAAAAEAAAAAAAAAZAAAAGQAAAAAAAAAZAAAAGQAAAAVAAAAYAAAAAAAAAAAAAAADwAAACADAAAAAAAAAAAAAAEAAACgMgAAVgcAAKr4//8BAAAAf39/AAEAAABkAAAAAAAAABQAAABAHwAAAAAAACYAAAAAAAAAwOD//wAAAAAmAAAAZAAAABYAAABMAAAAAAAAAAAAAAAEAAAAAAAAAAEAAACAgIAKAAAAACgAAAAoAAAAZAAAAGQAAAAAAAAAzMzMAAAAAABQAAAAUAAAAGQAAABkAAAAAAAAABcAAAAUAAAAAAAAAAAAAAD/fwAA/38AAAAAAAAJAAAABAAAAAAAAAAMAAAAEAAAAAAAAAAAAAAAAAAAAAAAAAAeAAAAaAAAAAAAAAAAAAAAAAAAAAAAAAAAAAAAECcAABAnAAAAAAAAAAAAAAAAAAAAAAAAAAAAAAAAAAAAAAAAAAAAABQAAAAAAAAAwMD/AAAAAABkAAAAMgAAAAAAAABkAAAAAAAAAH9/fwAKAAAAHwAAAFQAAAAAAAAFAAAAAQAAAAAAAAAAAAAAAAAAAAAAAAAAAAAAAAAAAAAAAAAAAAAAAn9/fwAAAAADzMzMAMDA/wB/f38AAAAAAAAAAAAAAAAAAAAAAAAAAAAhAAAAGAAAABQAAACWHAAAYQ0AAHA1AACwJQAAEAAAACYAAAAIAAAAAAAAAAAAAAA="/>
               </a:ext>
             </a:extLst>
           </p:cNvSpPr>
@@ -4629,7 +4646,7 @@
             <a:spLocks noGrp="1" noChangeArrowheads="1"/>
             <a:extLst>
               <a:ext uri="smNativeData">
-                <pr:smNativeData xmlns:pr="smNativeData" val="SMDATA_13_KVOsYBMAAAAlAAAAZAAAAA8BAAAAkAAAAEgAAACQAAAASAAAAAAAAAABAAAAAAAAAAEAAABQAAAAAAAAAAAA4D8AAAAAAADgPwAAAAAAAOA/AAAAAAAA4D8AAAAAAADgPwAAAAAAAOA/AAAAAAAA4D8AAAAAAADgPwAAAAAAAOA/AAAAAAAA4D8CAAAAjAAAAAAAAAAAAAAAu+DjDP///wgAAAAAAAAAAAAAAAAAAAAAAAAAAAAAAAAAAAAAZAAAAAEAAABAAAAAAAAAAAAAAAAAAAAAAAAAAAAAAAAAAAAAAAAAAAAAAAAAAAAAAAAAAAAAAAAAAAAAAAAAAAAAAAAAAAAAAAAAAAAAAAAAAAAAAAAAAAAAAAAAAAAAFAAAADwAAAAAAAAAAAAAAAAAAAkUAAAAAQAAABQAAAAUAAAAFAAAAAEAAAAAAAAAZAAAAGQAAAAAAAAAZAAAAGQAAAAVAAAAYAAAAAAAAAAAAAAADwAAACADAAAAAAAAAAAAAAEAAACgMgAAVgcAAKr4//8BAAAAf39/AAEAAABkAAAAAAAAABQAAABAHwAAAAAAACYAAAAAAAAAwOD//wAAAAAmAAAAZAAAABYAAABMAAAAAAAAAAAAAAAEAAAAAAAAAAEAAACAgIAKAAAAACgAAAAoAAAAZAAAAGQAAAAAAAAAzMzMAAAAAABQAAAAUAAAAGQAAABkAAAAAAAAABcAAAAUAAAAAAAAAAAAAAD/fwAA/38AAAAAAAAJAAAABAAAAAAAAAAMAAAAEAAAAAAAAAAAAAAAAAAAAAAAAAAeAAAAaAAAAAAAAAAAAAAAAAAAAAAAAAAAAAAAECcAABAnAAAAAAAAAAAAAAAAAAAAAAAAAAAAAAAAAAAAAAAAAAAAABQAAAAAAAAAwMD/AAAAAABkAAAAMgAAAAAAAABkAAAAAAAAAH9/fwAKAAAAHwAAAFQAAAAAAAAFAAAAAQAAAAAAAAAAAAAAAAAAAAAAAAAAAAAAAAAAAAAAAAAAAAAAAn9/fwAAAAADzMzMAMDA/wB/f38AAAAAAAAAAAAAAAAAAAAAAAAAAAAhAAAAGAAAABQAAADQAgAAsAEAAHA1AAC4CAAAEAAAACYAAAAIAAAAAAAAAAAAAAA="/>
+                <pr:smNativeData xmlns:pr="smNativeData" val="SMDATA_13_NmGsYBMAAAAlAAAAZAAAAA8BAAAAkAAAAEgAAACQAAAASAAAAAAAAAABAAAAAAAAAAEAAABQAAAAAAAAAAAA4D8AAAAAAADgPwAAAAAAAOA/AAAAAAAA4D8AAAAAAADgPwAAAAAAAOA/AAAAAAAA4D8AAAAAAADgPwAAAAAAAOA/AAAAAAAA4D8CAAAAjAAAAAAAAAAAAAAAu+DjDP///wgAAAAAAAAAAAAAAAAAAAAAAAAAAAAAAAAAAAAAZAAAAAEAAABAAAAAAAAAAAAAAAAAAAAAAAAAAAAAAAAAAAAAAAAAAAAAAAAAAAAAAAAAAAAAAAAAAAAAAAAAAAAAAAAAAAAAAAAAAAAAAAAAAAAAAAAAAAAAAAAAAAAAFAAAADwAAAAAAAAAAAAAAAAAAAkUAAAAAQAAABQAAAAUAAAAFAAAAAEAAAAAAAAAZAAAAGQAAAAAAAAAZAAAAGQAAAAVAAAAYAAAAAAAAAAAAAAADwAAACADAAAAAAAAAAAAAAEAAACgMgAAVgcAAKr4//8BAAAAf39/AAEAAABkAAAAAAAAABQAAABAHwAAAAAAACYAAAAAAAAAwOD//wAAAAAmAAAAZAAAABYAAABMAAAAAAAAAAAAAAAEAAAAAAAAAAEAAACAgIAKAAAAACgAAAAoAAAAZAAAAGQAAAAAAAAAzMzMAAAAAABQAAAAUAAAAGQAAABkAAAAAAAAABcAAAAUAAAAAAAAAAAAAAD/fwAA/38AAAAAAAAJAAAABAAAAAAAAAAMAAAAEAAAAAAAAAAAAAAAAAAAAAAAAAAeAAAAaAAAAAAAAAAAAAAAAAAAAAAAAAAAAAAAECcAABAnAAAAAAAAAAAAAAAAAAAAAAAAAAAAAAAAAAAAAAAAAAAAABQAAAAAAAAAwMD/AAAAAABkAAAAMgAAAAAAAABkAAAAAAAAAH9/fwAKAAAAHwAAAFQAAAAAAAAFAAAAAQAAAAAAAAAAAAAAAAAAAAAAAAAAAAAAAAAAAAAAAAAAAAAAAn9/fwAAAAADzMzMAMDA/wB/f38AAAAAAAAAAAAAAAAAAAAAAAAAAAAhAAAAGAAAABQAAADQAgAAsAEAAHA1AAC4CAAAEAAAACYAAAAIAAAAAAAAAAAAAAA="/>
               </a:ext>
             </a:extLst>
           </p:cNvSpPr>
@@ -4656,7 +4673,7 @@
             <a:spLocks noGrp="1" noChangeArrowheads="1"/>
             <a:extLst>
               <a:ext uri="smNativeData">
-                <pr:smNativeData xmlns:pr="smNativeData" val="SMDATA_13_KVOsYBMAAAAlAAAAZAAAAA8BAAAAkAAAAEgAAACQAAAASAAAAAAAAAACAAAAAAAAAAEAAABQAAAAAAAAAAAA4D8AAAAAAADgPwAAAAAAAOA/AAAAAAAA4D8AAAAAAADgPwAAAAAAAOA/AAAAAAAA4D8AAAAAAADgPwAAAAAAAOA/AAAAAAAA4D8CAAAAjAAAAAAAAAAAAAAAu+DjDP///wgAAAAAAAAAAAAAAAAAAAAAAAAAAAAAAAAAAAAAZAAAAAEAAABAAAAAAAAAAAAAAAAAAAAAAAAAAAAAAAAAAAAAAAAAAAAAAAAAAAAAAAAAAAAAAAAAAAAAAAAAAAAAAAAAAAAAAAAAAAAAAAAAAAAAAAAAAAAAAAAAAAAAFAAAADwAAAAAAAAAAAAAAAAAAAkUAAAAAQAAABQAAAAUAAAAFAAAAAEAAAAAAAAAZAAAAGQAAAAAAAAAZAAAAGQAAAAVAAAAYAAAAAAAAAAAAAAADwAAACADAAAAAAAAAAAAAAEAAACgMgAAVgcAAKr4//8BAAAAf39/AAEAAABkAAAAAAAAABQAAABAHwAAAAAAACYAAAAAAAAAwOD//wAAAAAmAAAAZAAAABYAAABMAAAAAAAAAAAAAAAEAAAAAAAAAAEAAACAgIAKAAAAACgAAAAoAAAAZAAAAGQAAAAAAAAAzMzMAAAAAABQAAAAUAAAAGQAAABkAAAAAAAAABcAAAAUAAAAAAAAAAAAAAD/fwAA/38AAAAAAAAJAAAABAAAAAAAAAAMAAAAEAAAAAAAAAAAAAAAAAAAAAAAAAAeAAAAaAAAAAAAAAAAAAAAAAAAAAAAAAAAAAAAECcAABAnAAAAAAAAAAAAAAAAAAAAAAAAAAAAAAAAAAAAAAAAAAAAABQAAAAAAAAAwMD/AAAAAABkAAAAMgAAAAAAAABkAAAAAAAAAH9/fwAKAAAAHwAAAFQAAAAAAAAFAAAAAQAAAAAAAAAAAAAAAAAAAAAAAAAAAAAAAAAAAAAAAAAAAAAAAn9/fwAAAAADzMzMAMDA/wB/f38AAAAAAAAAAAAAAAAAAAAAAAAAAAAhAAAAGAAAABQAAADQAgAAcQkAAKobAABhDQAAEAAAACYAAAAIAAAAgYAAAAAAAAA="/>
+                <pr:smNativeData xmlns:pr="smNativeData" val="SMDATA_13_NmGsYBMAAAAlAAAAZAAAAA8BAAAAkAAAAEgAAACQAAAASAAAAAAAAAACAAAAAAAAAAEAAABQAAAAAAAAAAAA4D8AAAAAAADgPwAAAAAAAOA/AAAAAAAA4D8AAAAAAADgPwAAAAAAAOA/AAAAAAAA4D8AAAAAAADgPwAAAAAAAOA/AAAAAAAA4D8CAAAAjAAAAAAAAAAAAAAAu+DjDP///wgAAAAAAAAAAAAAAAAAAAAAAAAAAAAAAAAAAAAAZAAAAAEAAABAAAAAAAAAAAAAAAAAAAAAAAAAAAAAAAAAAAAAAAAAAAAAAAAAAAAAAAAAAAAAAAAAAAAAAAAAAAAAAAAAAAAAAAAAAAAAAAAAAAAAAAAAAAAAAAAAAAAAFAAAADwAAAAAAAAAAAAAAAAAAAkUAAAAAQAAABQAAAAUAAAAFAAAAAEAAAAAAAAAZAAAAGQAAAAAAAAAZAAAAGQAAAAVAAAAYAAAAAAAAAAAAAAADwAAACADAAAAAAAAAAAAAAEAAACgMgAAVgcAAKr4//8BAAAAf39/AAEAAABkAAAAAAAAABQAAABAHwAAAAAAACYAAAAAAAAAwOD//wAAAAAmAAAAZAAAABYAAABMAAAAAAAAAAAAAAAEAAAAAAAAAAEAAACAgIAKAAAAACgAAAAoAAAAZAAAAGQAAAAAAAAAzMzMAAAAAABQAAAAUAAAAGQAAABkAAAAAAAAABcAAAAUAAAAAAAAAAAAAAD/fwAA/38AAAAAAAAJAAAABAAAAAAAAAAMAAAAEAAAAAAAAAAAAAAAAAAAAAAAAAAeAAAAaAAAAAAAAAAAAAAAAAAAAAAAAAAAAAAAECcAABAnAAAAAAAAAAAAAAAAAAAAAAAAAAAAAAAAAAAAAAAAAAAAABQAAAAAAAAAwMD/AAAAAABkAAAAMgAAAAAAAABkAAAAAAAAAH9/fwAKAAAAHwAAAFQAAAAAAAAFAAAAAQAAAAAAAAAAAAAAAAAAAAAAAAAAAAAAAAAAAAAAAAAAAAAAAn9/fwAAAAADzMzMAMDA/wB/f38AAAAAAAAAAAAAAAAAAAAAAAAAAAAhAAAAGAAAABQAAADQAgAAcQkAAKobAABhDQAAEAAAACYAAAAIAAAAgYAAAAAAAAA="/>
               </a:ext>
             </a:extLst>
           </p:cNvSpPr>
@@ -4729,7 +4746,7 @@
             <a:spLocks noGrp="1" noChangeArrowheads="1"/>
             <a:extLst>
               <a:ext uri="smNativeData">
-                <pr:smNativeData xmlns:pr="smNativeData" val="SMDATA_13_KVOsYBMAAAAlAAAAZAAAAA8BAAAAkAAAAEgAAACQAAAASAAAAAAAAAAAAAAAAAAAAAEAAABQAAAAAAAAAAAA4D8AAAAAAADgPwAAAAAAAOA/AAAAAAAA4D8AAAAAAADgPwAAAAAAAOA/AAAAAAAA4D8AAAAAAADgPwAAAAAAAOA/AAAAAAAA4D8CAAAAjAAAAAAAAAAAAAAAu+DjDP///wgAAAAAAAAAAAAAAAAAAAAAAAAAAAAAAAAAAAAAZAAAAAEAAABAAAAAAAAAAAAAAAAAAAAAAAAAAAAAAAAAAAAAAAAAAAAAAAAAAAAAAAAAAAAAAAAAAAAAAAAAAAAAAAAAAAAAAAAAAAAAAAAAAAAAAAAAAAAAAAAAAAAAFAAAADwAAAAAAAAAAAAAAAAAAAkUAAAAAQAAABQAAAAUAAAAFAAAAAEAAAAAAAAAZAAAAGQAAAAAAAAAZAAAAGQAAAAVAAAAYAAAAAAAAAAAAAAADwAAACADAAAAAAAAAAAAAAEAAACgMgAAVgcAAKr4//8BAAAAf39/AAEAAABkAAAAAAAAABQAAABAHwAAAAAAACYAAAAAAAAAwOD//wAAAAAmAAAAZAAAABYAAABMAAAAAAAAAAAAAAAEAAAAAAAAAAEAAACAgIAKAAAAACgAAAAoAAAAZAAAAGQAAAAAAAAAzMzMAAAAAABQAAAAUAAAAGQAAABkAAAAAAAAABcAAAAUAAAAAAAAAAAAAAD/fwAA/38AAAAAAAAJAAAABAAAAAAAAAAMAAAAEAAAAAAAAAAAAAAAAAAAAAAAAAAeAAAAaAAAAAAAAAAAAAAAAAAAAAAAAAAAAAAAECcAABAnAAAAAAAAAAAAAAAAAAAAAAAAAAAAAAAAAAAAAAAAAAAAABQAAAAAAAAAwMD/AAAAAABkAAAAMgAAAAAAAABkAAAAAAAAAH9/fwAKAAAAHwAAAFQAAAAAAAAFAAAAAQAAAAAAAAAAAAAAAAAAAAAAAAAAAAAAAAAAAAAAAAAAAAAAAn9/fwAAAAADzMzMAMDA/wB/f38AAAAAAAAAAAAAAAAAAAAAAAAAAAAhAAAAGAAAABQAAADQAgAAYQ0AAKobAACwJQAAEAAAACYAAAAIAAAAAYAAAAAAAAA="/>
+                <pr:smNativeData xmlns:pr="smNativeData" val="SMDATA_13_NmGsYBMAAAAlAAAAZAAAAA8BAAAAkAAAAEgAAACQAAAASAAAAAAAAAAAAAAAAAAAAAEAAABQAAAAAAAAAAAA4D8AAAAAAADgPwAAAAAAAOA/AAAAAAAA4D8AAAAAAADgPwAAAAAAAOA/AAAAAAAA4D8AAAAAAADgPwAAAAAAAOA/AAAAAAAA4D8CAAAAjAAAAAAAAAAAAAAAu+DjDP///wgAAAAAAAAAAAAAAAAAAAAAAAAAAAAAAAAAAAAAZAAAAAEAAABAAAAAAAAAAAAAAAAAAAAAAAAAAAAAAAAAAAAAAAAAAAAAAAAAAAAAAAAAAAAAAAAAAAAAAAAAAAAAAAAAAAAAAAAAAAAAAAAAAAAAAAAAAAAAAAAAAAAAFAAAADwAAAAAAAAAAAAAAAAAAAkUAAAAAQAAABQAAAAUAAAAFAAAAAEAAAAAAAAAZAAAAGQAAAAAAAAAZAAAAGQAAAAVAAAAYAAAAAAAAAAAAAAADwAAACADAAAAAAAAAAAAAAEAAACgMgAAVgcAAKr4//8BAAAAf39/AAEAAABkAAAAAAAAABQAAABAHwAAAAAAACYAAAAAAAAAwOD//wAAAAAmAAAAZAAAABYAAABMAAAAAAAAAAAAAAAEAAAAAAAAAAEAAACAgIAKAAAAACgAAAAoAAAAZAAAAGQAAAAAAAAAzMzMAAAAAABQAAAAUAAAAGQAAABkAAAAAAAAABcAAAAUAAAAAAAAAAAAAAD/fwAA/38AAAAAAAAJAAAABAAAAAAAAAAMAAAAEAAAAAAAAAAAAAAAAAAAAAAAAAAeAAAAaAAAAAAAAAAAAAAAAAAAAAAAAAAAAAAAECcAABAnAAAAAAAAAAAAAAAAAAAAAAAAAAAAAAAAAAAAAAAAAAAAABQAAAAAAAAAwMD/AAAAAABkAAAAMgAAAAAAAABkAAAAAAAAAH9/fwAKAAAAHwAAAFQAAAAAAAAFAAAAAQAAAAAAAAAAAAAAAAAAAAAAAAAAAAAAAAAAAAAAAAAAAAAAAn9/fwAAAAADzMzMAMDA/wB/f38AAAAAAAAAAAAAAAAAAAAAAAAAAAAhAAAAGAAAABQAAADQAgAAYQ0AAKobAACwJQAAEAAAACYAAAAIAAAAAYAAAAAAAAA="/>
               </a:ext>
             </a:extLst>
           </p:cNvSpPr>
@@ -4792,7 +4809,7 @@
             <a:spLocks noGrp="1" noChangeArrowheads="1"/>
             <a:extLst>
               <a:ext uri="smNativeData">
-                <pr:smNativeData xmlns:pr="smNativeData" val="SMDATA_13_KVOsYBMAAAAlAAAAZAAAAA8BAAAAkAAAAEgAAACQAAAASAAAAAAAAAACAAAAAAAAAAEAAABQAAAAAAAAAAAA4D8AAAAAAADgPwAAAAAAAOA/AAAAAAAA4D8AAAAAAADgPwAAAAAAAOA/AAAAAAAA4D8AAAAAAADgPwAAAAAAAOA/AAAAAAAA4D8CAAAAjAAAAAAAAAAAAAAAu+DjDP///wgAAAAAAAAAAAAAAAAAAAAAAAAAAAAAAAAAAAAAZAAAAAEAAABAAAAAAAAAAAAAAAAAAAAAAAAAAAAAAAAAAAAAAAAAAAAAAAAAAAAAAAAAAAAAAAAAAAAAAAAAAAAAAAAAAAAAAAAAAAAAAAAAAAAAAAAAAAAAAAAAAAAAFAAAADwAAAAAAAAAAAAAAAAAAAkUAAAAAQAAABQAAAAUAAAAFAAAAAEAAAAAAAAAZAAAAGQAAAAAAAAAZAAAAGQAAAAVAAAAYAAAAAAAAAAAAAAADwAAACADAAAAAAAAAAAAAAEAAACgMgAAVgcAAKr4//8BAAAAf39/AAEAAABkAAAAAAAAABQAAABAHwAAAAAAACYAAAAAAAAAwOD//wAAAAAmAAAAZAAAABYAAABMAAAAAAAAAAAAAAAEAAAAAAAAAAEAAACAgIAKAAAAACgAAAAoAAAAZAAAAGQAAAAAAAAAzMzMAAAAAABQAAAAUAAAAGQAAABkAAAAAAAAABcAAAAUAAAAAAAAAAAAAAD/fwAA/38AAAAAAAAJAAAABAAAAAAAAAAMAAAAEAAAAAAAAAAAAAAAAAAAAAAAAAAeAAAAaAAAAAAAAAAAAAAAAAAAAAAAAAAAAAAAECcAABAnAAAAAAAAAAAAAAAAAAAAAAAAAAAAAAAAAAAAAAAAAAAAABQAAAAAAAAAwMD/AAAAAABkAAAAMgAAAAAAAABkAAAAAAAAAH9/fwAKAAAAHwAAAFQAAAAAAAAFAAAAAQAAAAAAAAAAAAAAAAAAAAAAAAAAAAAAAAAAAAAAAAAAAAAAAn9/fwAAAAADzMzMAMDA/wB/f38AAAAAAAAAAAAAAAAAAAAAAAAAAAAhAAAAGAAAABQAAACWHAAAcQkAAHA1AABhDQAAEAAAACYAAAAIAAAAgYAAAAAAAAA="/>
+                <pr:smNativeData xmlns:pr="smNativeData" val="SMDATA_13_NmGsYBMAAAAlAAAAZAAAAA8BAAAAkAAAAEgAAACQAAAASAAAAAAAAAACAAAAAAAAAAEAAABQAAAAAAAAAAAA4D8AAAAAAADgPwAAAAAAAOA/AAAAAAAA4D8AAAAAAADgPwAAAAAAAOA/AAAAAAAA4D8AAAAAAADgPwAAAAAAAOA/AAAAAAAA4D8CAAAAjAAAAAAAAAAAAAAAu+DjDP///wgAAAAAAAAAAAAAAAAAAAAAAAAAAAAAAAAAAAAAZAAAAAEAAABAAAAAAAAAAAAAAAAAAAAAAAAAAAAAAAAAAAAAAAAAAAAAAAAAAAAAAAAAAAAAAAAAAAAAAAAAAAAAAAAAAAAAAAAAAAAAAAAAAAAAAAAAAAAAAAAAAAAAFAAAADwAAAAAAAAAAAAAAAAAAAkUAAAAAQAAABQAAAAUAAAAFAAAAAEAAAAAAAAAZAAAAGQAAAAAAAAAZAAAAGQAAAAVAAAAYAAAAAAAAAAAAAAADwAAACADAAAAAAAAAAAAAAEAAACgMgAAVgcAAKr4//8BAAAAf39/AAEAAABkAAAAAAAAABQAAABAHwAAAAAAACYAAAAAAAAAwOD//wAAAAAmAAAAZAAAABYAAABMAAAAAAAAAAAAAAAEAAAAAAAAAAEAAACAgIAKAAAAACgAAAAoAAAAZAAAAGQAAAAAAAAAzMzMAAAAAABQAAAAUAAAAGQAAABkAAAAAAAAABcAAAAUAAAAAAAAAAAAAAD/fwAA/38AAAAAAAAJAAAABAAAAAAAAAAMAAAAEAAAAAAAAAAAAAAAAAAAAAAAAAAeAAAAaAAAAAAAAAAAAAAAAAAAAAAAAAAAAAAAECcAABAnAAAAAAAAAAAAAAAAAAAAAAAAAAAAAAAAAAAAAAAAAAAAABQAAAAAAAAAwMD/AAAAAABkAAAAMgAAAAAAAABkAAAAAAAAAH9/fwAKAAAAHwAAAFQAAAAAAAAFAAAAAQAAAAAAAAAAAAAAAAAAAAAAAAAAAAAAAAAAAAAAAAAAAAAAAn9/fwAAAAADzMzMAMDA/wB/f38AAAAAAAAAAAAAAAAAAAAAAAAAAAAhAAAAGAAAABQAAACWHAAAcQkAAHA1AABhDQAAEAAAACYAAAAIAAAAgYAAAAAAAAA="/>
               </a:ext>
             </a:extLst>
           </p:cNvSpPr>
@@ -4865,7 +4882,7 @@
             <a:spLocks noGrp="1" noChangeArrowheads="1"/>
             <a:extLst>
               <a:ext uri="smNativeData">
-                <pr:smNativeData xmlns:pr="smNativeData" val="SMDATA_13_KVOsYBMAAAAlAAAAZAAAAA8BAAAAkAAAAEgAAACQAAAASAAAAAAAAAAAAAAAAAAAAAEAAABQAAAAAAAAAAAA4D8AAAAAAADgPwAAAAAAAOA/AAAAAAAA4D8AAAAAAADgPwAAAAAAAOA/AAAAAAAA4D8AAAAAAADgPwAAAAAAAOA/AAAAAAAA4D8CAAAAjAAAAAAAAAAAAAAAu+DjDP///wgAAAAAAAAAAAAAAAAAAAAAAAAAAAAAAAAAAAAAZAAAAAEAAABAAAAAAAAAAAAAAAAAAAAAAAAAAAAAAAAAAAAAAAAAAAAAAAAAAAAAAAAAAAAAAAAAAAAAAAAAAAAAAAAAAAAAAAAAAAAAAAAAAAAAAAAAAAAAAAAAAAAAFAAAADwAAAAAAAAAAAAAAAAAAAkUAAAAAQAAABQAAAAUAAAAFAAAAAEAAAAAAAAAZAAAAGQAAAAAAAAAZAAAAGQAAAAVAAAAYAAAAAAAAAAAAAAADwAAACADAAAAAAAAAAAAAAEAAACgMgAAVgcAAKr4//8BAAAAf39/AAEAAABkAAAAAAAAABQAAABAHwAAAAAAACYAAAAAAAAAwOD//wAAAAAmAAAAZAAAABYAAABMAAAAAAAAAAAAAAAEAAAAAAAAAAEAAACAgIAKAAAAACgAAAAoAAAAZAAAAGQAAAAAAAAAzMzMAAAAAABQAAAAUAAAAGQAAABkAAAAAAAAABcAAAAUAAAAAAAAAAAAAAD/fwAA/38AAAAAAAAJAAAABAAAAAAAAAAMAAAAEAAAAAAAAAAAAAAAAAAAAAAAAAAeAAAAaAAAAAAAAAAAAAAAAAAAAAAAAAAAAAAAECcAABAnAAAAAAAAAAAAAAAAAAAAAAAAAAAAAAAAAAAAAAAAAAAAABQAAAAAAAAAwMD/AAAAAABkAAAAMgAAAAAAAABkAAAAAAAAAH9/fwAKAAAAHwAAAFQAAAAAAAAFAAAAAQAAAAAAAAAAAAAAAAAAAAAAAAAAAAAAAAAAAAAAAAAAAAAAAn9/fwAAAAADzMzMAMDA/wB/f38AAAAAAAAAAAAAAAAAAAAAAAAAAAAhAAAAGAAAABQAAACWHAAAYQ0AAHA1AACwJQAAEAAAACYAAAAIAAAAAAAAAAAAAAA="/>
+                <pr:smNativeData xmlns:pr="smNativeData" val="SMDATA_13_NmGsYBMAAAAlAAAAZAAAAA8BAAAAkAAAAEgAAACQAAAASAAAAAAAAAAAAAAAAAAAAAEAAABQAAAAAAAAAAAA4D8AAAAAAADgPwAAAAAAAOA/AAAAAAAA4D8AAAAAAADgPwAAAAAAAOA/AAAAAAAA4D8AAAAAAADgPwAAAAAAAOA/AAAAAAAA4D8CAAAAjAAAAAAAAAAAAAAAu+DjDP///wgAAAAAAAAAAAAAAAAAAAAAAAAAAAAAAAAAAAAAZAAAAAEAAABAAAAAAAAAAAAAAAAAAAAAAAAAAAAAAAAAAAAAAAAAAAAAAAAAAAAAAAAAAAAAAAAAAAAAAAAAAAAAAAAAAAAAAAAAAAAAAAAAAAAAAAAAAAAAAAAAAAAAFAAAADwAAAAAAAAAAAAAAAAAAAkUAAAAAQAAABQAAAAUAAAAFAAAAAEAAAAAAAAAZAAAAGQAAAAAAAAAZAAAAGQAAAAVAAAAYAAAAAAAAAAAAAAADwAAACADAAAAAAAAAAAAAAEAAACgMgAAVgcAAKr4//8BAAAAf39/AAEAAABkAAAAAAAAABQAAABAHwAAAAAAACYAAAAAAAAAwOD//wAAAAAmAAAAZAAAABYAAABMAAAAAAAAAAAAAAAEAAAAAAAAAAEAAACAgIAKAAAAACgAAAAoAAAAZAAAAGQAAAAAAAAAzMzMAAAAAABQAAAAUAAAAGQAAABkAAAAAAAAABcAAAAUAAAAAAAAAAAAAAD/fwAA/38AAAAAAAAJAAAABAAAAAAAAAAMAAAAEAAAAAAAAAAAAAAAAAAAAAAAAAAeAAAAaAAAAAAAAAAAAAAAAAAAAAAAAAAAAAAAECcAABAnAAAAAAAAAAAAAAAAAAAAAAAAAAAAAAAAAAAAAAAAAAAAABQAAAAAAAAAwMD/AAAAAABkAAAAMgAAAAAAAABkAAAAAAAAAH9/fwAKAAAAHwAAAFQAAAAAAAAFAAAAAQAAAAAAAAAAAAAAAAAAAAAAAAAAAAAAAAAAAAAAAAAAAAAAAn9/fwAAAAADzMzMAMDA/wB/f38AAAAAAAAAAAAAAAAAAAAAAAAAAAAhAAAAGAAAABQAAACWHAAAYQ0AAHA1AACwJQAAEAAAACYAAAAIAAAAAAAAAAAAAAA="/>
               </a:ext>
             </a:extLst>
           </p:cNvSpPr>
@@ -4944,7 +4961,7 @@
             <a:spLocks noGrp="1" noChangeArrowheads="1"/>
             <a:extLst>
               <a:ext uri="smNativeData">
-                <pr:smNativeData xmlns:pr="smNativeData" val="SMDATA_13_KVOsYBMAAAAlAAAAZAAAAA8BAAAAkAAAAEgAAACQAAAASAAAAAAAAAABAAAAAAAAAAEAAABQAAAAAAAAAAAA4D8AAAAAAADgPwAAAAAAAOA/AAAAAAAA4D8AAAAAAADgPwAAAAAAAOA/AAAAAAAA4D8AAAAAAADgPwAAAAAAAOA/AAAAAAAA4D8CAAAAjAAAAAAAAAAAAAAAu+DjDP///wgAAAAAAAAAAAAAAAAAAAAAAAAAAAAAAAAAAAAAZAAAAAEAAABAAAAAAAAAAAAAAAAAAAAAAAAAAAAAAAAAAAAAAAAAAAAAAAAAAAAAAAAAAAAAAAAAAAAAAAAAAAAAAAAAAAAAAAAAAAAAAAAAAAAAAAAAAAAAAAAAAAAAFAAAADwAAAAAAAAAAAAAAAAAAAkUAAAAAQAAABQAAAAUAAAAFAAAAAEAAAAAAAAAZAAAAGQAAAAAAAAAZAAAAGQAAAAVAAAAYAAAAAAAAAAAAAAADwAAACADAAAAAAAAAAAAAAEAAACgMgAAVgcAAKr4//8BAAAAf39/AAEAAABkAAAAAAAAABQAAABAHwAAAAAAACYAAAAAAAAAwOD//wAAAAAmAAAAZAAAABYAAABMAAAAAAAAAAAAAAAEAAAAAAAAAAEAAACAgIAKAAAAACgAAAAoAAAAZAAAAGQAAAAAAAAAzMzMAAAAAABQAAAAUAAAAGQAAABkAAAAAAAAABcAAAAUAAAAAAAAAAAAAAD/fwAA/38AAAAAAAAJAAAABAAAAAAAAAAMAAAAEAAAAAAAAAAAAAAAAAAAAAAAAAAeAAAAaAAAAAAAAAAAAAAAAAAAAAAAAAAAAAAAECcAABAnAAAAAAAAAAAAAAAAAAAAAAAAAAAAAAAAAAAAAAAAAAAAABQAAAAAAAAAwMD/AAAAAABkAAAAMgAAAAAAAABkAAAAAAAAAH9/fwAKAAAAHwAAAFQAAAAAAAAFAAAAAQAAAAAAAAAAAAAAAAAAAAAAAAAAAAAAAAAAAAAAAAAAAAAAAn9/fwAAAAADzMzMAMDA/wB/f38AAAAAAAAAAAAAAAAAAAAAAAAAAAAhAAAAGAAAABQAAADQAgAAsAEAAHA1AAC4CAAAEAAAACYAAAAIAAAAAAAAAAAAAAA="/>
+                <pr:smNativeData xmlns:pr="smNativeData" val="SMDATA_13_NmGsYBMAAAAlAAAAZAAAAA8BAAAAkAAAAEgAAACQAAAASAAAAAAAAAABAAAAAAAAAAEAAABQAAAAAAAAAAAA4D8AAAAAAADgPwAAAAAAAOA/AAAAAAAA4D8AAAAAAADgPwAAAAAAAOA/AAAAAAAA4D8AAAAAAADgPwAAAAAAAOA/AAAAAAAA4D8CAAAAjAAAAAAAAAAAAAAAu+DjDP///wgAAAAAAAAAAAAAAAAAAAAAAAAAAAAAAAAAAAAAZAAAAAEAAABAAAAAAAAAAAAAAAAAAAAAAAAAAAAAAAAAAAAAAAAAAAAAAAAAAAAAAAAAAAAAAAAAAAAAAAAAAAAAAAAAAAAAAAAAAAAAAAAAAAAAAAAAAAAAAAAAAAAAFAAAADwAAAAAAAAAAAAAAAAAAAkUAAAAAQAAABQAAAAUAAAAFAAAAAEAAAAAAAAAZAAAAGQAAAAAAAAAZAAAAGQAAAAVAAAAYAAAAAAAAAAAAAAADwAAACADAAAAAAAAAAAAAAEAAACgMgAAVgcAAKr4//8BAAAAf39/AAEAAABkAAAAAAAAABQAAABAHwAAAAAAACYAAAAAAAAAwOD//wAAAAAmAAAAZAAAABYAAABMAAAAAAAAAAAAAAAEAAAAAAAAAAEAAACAgIAKAAAAACgAAAAoAAAAZAAAAGQAAAAAAAAAzMzMAAAAAABQAAAAUAAAAGQAAABkAAAAAAAAABcAAAAUAAAAAAAAAAAAAAD/fwAA/38AAAAAAAAJAAAABAAAAAAAAAAMAAAAEAAAAAAAAAAAAAAAAAAAAAAAAAAeAAAAaAAAAAAAAAAAAAAAAAAAAAAAAAAAAAAAECcAABAnAAAAAAAAAAAAAAAAAAAAAAAAAAAAAAAAAAAAAAAAAAAAABQAAAAAAAAAwMD/AAAAAABkAAAAMgAAAAAAAABkAAAAAAAAAH9/fwAKAAAAHwAAAFQAAAAAAAAFAAAAAQAAAAAAAAAAAAAAAAAAAAAAAAAAAAAAAAAAAAAAAAAAAAAAAn9/fwAAAAADzMzMAMDA/wB/f38AAAAAAAAAAAAAAAAAAAAAAAAAAAAhAAAAGAAAABQAAADQAgAAsAEAAHA1AAC4CAAAEAAAACYAAAAIAAAAAAAAAAAAAAA="/>
               </a:ext>
             </a:extLst>
           </p:cNvSpPr>
@@ -4968,7 +4985,7 @@
             <a:spLocks noGrp="1" noChangeArrowheads="1"/>
             <a:extLst>
               <a:ext uri="smNativeData">
-                <pr:smNativeData xmlns:pr="smNativeData" val="SMDATA_13_KVOsYBMAAAAlAAAAZAAAAA8BAAAAkAAAAEgAAACQAAAASAAAAAAAAAAAAAAAAAAAAAEAAABQAAAAAAAAAAAA4D8AAAAAAADgPwAAAAAAAOA/AAAAAAAA4D8AAAAAAADgPwAAAAAAAOA/AAAAAAAA4D8AAAAAAADgPwAAAAAAAOA/AAAAAAAA4D8CAAAAjAAAAAAAAAAAAAAAu+DjDP///wgAAAAAAAAAAAAAAAAAAAAAAAAAAAAAAAAAAAAAZAAAAAEAAABAAAAAAAAAAAAAAAAAAAAAAAAAAAAAAAAAAAAAAAAAAAAAAAAAAAAAAAAAAAAAAAAAAAAAAAAAAAAAAAAAAAAAAAAAAAAAAAAAAAAAAAAAAAAAAAAAAAAAFAAAADwAAAAAAAAAAAAAAAAAAAkUAAAAAQAAABQAAAAUAAAAFAAAAAEAAAAAAAAAZAAAAGQAAAAAAAAAZAAAAGQAAAAVAAAAYAAAAAAAAAAAAAAADwAAACADAAAAAAAAAAAAAAEAAACgMgAAVgcAAKr4//8BAAAAf39/AAEAAABkAAAAAAAAABQAAABAHwAAAAAAACYAAAAAAAAAwOD//wAAAAAmAAAAZAAAABYAAABMAAAAAAAAAAAAAAAEAAAAAAAAAAEAAACAgIAKAAAAACgAAAAoAAAAZAAAAGQAAAAAAAAAzMzMAAAAAABQAAAAUAAAAGQAAABkAAAAAAAAABcAAAAUAAAAAAAAAAAAAAD/fwAA/38AAAAAAAAJAAAABAAAAAAAAAAMAAAAEAAAAAAAAAAAAAAAAAAAAAAAAAAeAAAAaAAAAAAAAAAAAAAAAAAAAAAAAAAAAAAAECcAABAnAAAAAAAAAAAAAAAAAAAAAAAAAAAAAAAAAAAAAAAAAAAAABQAAAAAAAAAwMD/AAAAAABkAAAAMgAAAAAAAABkAAAAAAAAAH9/fwAKAAAAHwAAAFQAAAAAAAAFAAAAAQAAAAAAAAAAAAAAAAAAAAAAAAAAAAAAAAAAAAAAAAAAAAAAAn9/fwAAAAADzMzMAMDA/wB/f38AAAAAAAAAAAAAAAAAAAAAAAAAAAAhAAAAGAAAABQAAADQAgAA2AkAAHA1AACwJQAAEAAAACYAAAAIAAAAAAAAAAAAAAA="/>
+                <pr:smNativeData xmlns:pr="smNativeData" val="SMDATA_13_NmGsYBMAAAAlAAAAZAAAAA8BAAAAkAAAAEgAAACQAAAASAAAAAAAAAAAAAAAAAAAAAEAAABQAAAAAAAAAAAA4D8AAAAAAADgPwAAAAAAAOA/AAAAAAAA4D8AAAAAAADgPwAAAAAAAOA/AAAAAAAA4D8AAAAAAADgPwAAAAAAAOA/AAAAAAAA4D8CAAAAjAAAAAAAAAAAAAAAu+DjDP///wgAAAAAAAAAAAAAAAAAAAAAAAAAAAAAAAAAAAAAZAAAAAEAAABAAAAAAAAAAAAAAAAAAAAAAAAAAAAAAAAAAAAAAAAAAAAAAAAAAAAAAAAAAAAAAAAAAAAAAAAAAAAAAAAAAAAAAAAAAAAAAAAAAAAAAAAAAAAAAAAAAAAAFAAAADwAAAAAAAAAAAAAAAAAAAkUAAAAAQAAABQAAAAUAAAAFAAAAAEAAAAAAAAAZAAAAGQAAAAAAAAAZAAAAGQAAAAVAAAAYAAAAAAAAAAAAAAADwAAACADAAAAAAAAAAAAAAEAAACgMgAAVgcAAKr4//8BAAAAf39/AAEAAABkAAAAAAAAABQAAABAHwAAAAAAACYAAAAAAAAAwOD//wAAAAAmAAAAZAAAABYAAABMAAAAAAAAAAAAAAAEAAAAAAAAAAEAAACAgIAKAAAAACgAAAAoAAAAZAAAAGQAAAAAAAAAzMzMAAAAAABQAAAAUAAAAGQAAABkAAAAAAAAABcAAAAUAAAAAAAAAAAAAAD/fwAA/38AAAAAAAAJAAAABAAAAAAAAAAMAAAAEAAAAAAAAAAAAAAAAAAAAAAAAAAeAAAAaAAAAAAAAAAAAAAAAAAAAAAAAAAAAAAAECcAABAnAAAAAAAAAAAAAAAAAAAAAAAAAAAAAAAAAAAAAAAAAAAAABQAAAAAAAAAwMD/AAAAAABkAAAAMgAAAAAAAABkAAAAAAAAAH9/fwAKAAAAHwAAAFQAAAAAAAAFAAAAAQAAAAAAAAAAAAAAAAAAAAAAAAAAAAAAAAAAAAAAAAAAAAAAAn9/fwAAAAADzMzMAMDA/wB/f38AAAAAAAAAAAAAAAAAAAAAAAAAAAAhAAAAGAAAABQAAADQAgAA2AkAAHA1AACwJQAAEAAAACYAAAAIAAAAAAAAAAAAAAA="/>
               </a:ext>
             </a:extLst>
           </p:cNvSpPr>
@@ -5837,6 +5854,47 @@
       </a:clrScheme>
       <a:clrMap bg1="lt1" tx1="dk1" bg2="lt2" tx2="dk2" accent1="accent1" accent2="accent2" accent3="accent3" accent4="accent4" accent5="accent5" accent6="accent6" hlink="hlink" folHlink="folHlink"/>
     </a:extraClrScheme>
+    <a:extraClrScheme>
+      <a:clrScheme name="Presentation 15">
+        <a:dk1>
+          <a:srgbClr val="000000"/>
+        </a:dk1>
+        <a:lt1>
+          <a:srgbClr val="FFFFFF"/>
+        </a:lt1>
+        <a:dk2>
+          <a:srgbClr val="000000"/>
+        </a:dk2>
+        <a:lt2>
+          <a:srgbClr val="808080"/>
+        </a:lt2>
+        <a:accent1>
+          <a:srgbClr val="BBE0E3"/>
+        </a:accent1>
+        <a:accent2>
+          <a:srgbClr val="333399"/>
+        </a:accent2>
+        <a:accent3>
+          <a:srgbClr val="535379"/>
+        </a:accent3>
+        <a:accent4>
+          <a:srgbClr val="737359"/>
+        </a:accent4>
+        <a:accent5>
+          <a:srgbClr val="939339"/>
+        </a:accent5>
+        <a:accent6>
+          <a:srgbClr val="B3B319"/>
+        </a:accent6>
+        <a:hlink>
+          <a:srgbClr val="009999"/>
+        </a:hlink>
+        <a:folHlink>
+          <a:srgbClr val="99CC00"/>
+        </a:folHlink>
+      </a:clrScheme>
+      <a:clrMap bg1="lt1" tx1="dk1" bg2="lt2" tx2="dk2" accent1="accent1" accent2="accent2" accent3="accent3" accent4="accent4" accent5="accent5" accent6="accent6" hlink="hlink" folHlink="folHlink"/>
+    </a:extraClrScheme>
   </a:extraClrSchemeLst>
 </a:theme>
 </file>

</xml_diff>